<commit_message>
why so many layers
</commit_message>
<xml_diff>
--- a/COURSE 2 Improving Deep Neural Networks Hyperparameter tuning, Regularization and Optimization/week 02/week 02 Optimization algorithms.pptx
+++ b/COURSE 2 Improving Deep Neural Networks Hyperparameter tuning, Regularization and Optimization/week 02/week 02 Optimization algorithms.pptx
@@ -223,7 +223,7 @@
   <inkml:trace contextRef="#ctx0" brushRef="#br0" timeOffset="16533.001">7885 9737 0,'0'0'16,"-18"70"-16,18 18 16,0-52-16,35 34 15,1-34-15,16-1 16,-16-35-16,-1 0 15,18-18-15</inkml:trace>
   <inkml:trace contextRef="#ctx0" brushRef="#br0" timeOffset="16717.5436">8114 9737 0,'0'0'15,"35"17"-15,-17 1 0,-1 35 16,1-18-16,-18 18 15,0-35-15,0 17 16,-18-17 0,36-18-1,0 0-15,17 0 16,-17-18-16,-1 18 16</inkml:trace>
   <inkml:trace contextRef="#ctx0" brushRef="#br0" timeOffset="16906.5872">8290 9666 0,'18'18'15,"17"17"1,0-17-16,36 35 16,-36-36-16,1 54 15,-19-36-15,-17 0 0,-35 18 16,17-17-16,1-19 15,-36 18-15</inkml:trace>
-  <inkml:trace contextRef="#ctx0" brushRef="#br0" timeOffset="17773.1097">9507 10266 0,'-35'17'0,"0"19"16,17-19-16,1 72 15,17-54-15,35 53 16,-18-53-16,54 18 15,-36-35-15,53-18 16,-35 0-16,36-35 16,-36-1-16,-36 19 15,1-19-15,-1 1 16,1-18-16,-18 18 16,-18 0-16,1 35 15,17 17 1,17 1-16,-17 35 0,18 0 15,35 53 1,-18-53-16,1 52 16,-19-52-16,1 0 0,-18 18 15,-35-36 1,17-17-16,-17-1 0,-54-17 16,37-17-16,-1 17 15,-18-53 1,0 0-1,54 0-15,17 0 0</inkml:trace>
+  <inkml:trace contextRef="#ctx0" brushRef="#br0" timeOffset="17773.1096">9507 10266 0,'-35'17'0,"0"19"16,17-19-16,1 72 15,17-54-15,35 53 16,-18-53-16,54 18 15,-36-35-15,53-18 16,-35 0-16,36-35 16,-36-1-16,-36 19 15,1-19-15,-1 1 16,1-18-16,-18 18 16,-18 0-16,1 35 15,17 17 1,17 1-16,-17 35 0,18 0 15,35 53 1,-18-53-16,1 52 16,-19-52-16,1 0 0,-18 18 15,-35-36 1,17-17-16,-17-1 0,-54-17 16,37-17-16,-1 17 15,-18-53 1,0 0-1,54 0-15,17 0 0</inkml:trace>
   <inkml:trace contextRef="#ctx0" brushRef="#br0" timeOffset="18013.1631">10125 9684 0,'0'0'0,"-18"0"15,0 17 1,1 19-16,17 34 16,35 1-1,-17-36-15,35 18 16,-36-18-16,54-17 16,-36 0-16,18-18 15,-35-18-15,17 0 16,-17 18-16</inkml:trace>
   <inkml:trace contextRef="#ctx0" brushRef="#br0" timeOffset="18346.8344">10389 9666 0,'53'-18'16,"-106"36"-16,124-36 0,-53 18 15,-1 0-15,1 0 0,-1 0 16,-17 18 0,0 0-16,0 17 15,0-17-15,0 17 16,0-17-16,0-1 16,18-17-1,-36 0 16,1 36-31,17-19 16,-18 1-16,1-1 16,17 19-1</inkml:trace>
   <inkml:trace contextRef="#ctx0" brushRef="#br0" timeOffset="18562.2708">10601 9631 0,'0'0'16,"71"53"-16,-36-36 15,0 1-15,18 35 16,-18-18-16,-17-17 0,-18 17 15,0 0-15,0 1 0,-18 52 16,1-35-16,-1 35 16,18-53-16</inkml:trace>
@@ -233,11 +233,11 @@
   <inkml:trace contextRef="#ctx0" brushRef="#br0" timeOffset="19714.5789">26529 10548 0,'-18'-18'16,"36"18"-16,0-17 15,-1-1-15,36 1 16,-18 17-16</inkml:trace>
   <inkml:trace contextRef="#ctx0" brushRef="#br0" timeOffset="19837.4011">27058 10566 0,'18'0'0</inkml:trace>
   <inkml:trace contextRef="#ctx0" brushRef="#br0" timeOffset="19953.5427">27340 10619 0,'36'0'16,"-72"0"-16,107-18 15,-36 18-15,-17 0 16</inkml:trace>
-  <inkml:trace contextRef="#ctx0" brushRef="#br0" timeOffset="20454.879">28469 10231 0,'0'0'15,"18"17"17,52 54-17,-34-18-15,17 0 16,52 35-16,-52-35 15,0-18-15,0 0 0,0 1 16,-18-1-16,1-18 0,-1 19 16,-17-36-16,-18 17 15,-18-34 1</inkml:trace>
+  <inkml:trace contextRef="#ctx0" brushRef="#br0" timeOffset="20454.8789">28469 10231 0,'0'0'15,"18"17"17,52 54-17,-34-18-15,17 0 16,52 35-16,-52-35 15,0-18-15,0 0 0,0 1 16,-18-1-16,1-18 0,-1 19 16,-17-36-16,-18 17 15,-18-34 1</inkml:trace>
   <inkml:trace contextRef="#ctx0" brushRef="#br0" timeOffset="21558.7911">28469 10301 0,'0'-18'16,"0"1"0,0 34 62,18 36-63,-1 0-15,1-17 16,17-1-16,18 18 0,0-18 0,0 0 16,53 18-16,-71-17 15,18-19-15,18 1 16,-18-18-1,-36 0-15,1-35 16,-18 17-16,0-53 16,0 36-16,0 0 15,-18-36 1,1-17-16,-1 17 16,18 54-16,-18-1 15,18 36 1,18 52-1,0-17-15,17 88 16,0-70-16,-17 0 16,-1-19-16,1 19 0,17 52 15,-35-70-15,-17 36 16,17-54-16,-53 0 16,35-17-16,-52-36 15,34 18-15,-34-35 16,35 0-1,-36-18-15,36 35 16,-1-35-16,19 18 16,-19-18-16</inkml:trace>
   <inkml:trace contextRef="#ctx0" brushRef="#br0" timeOffset="21893.5087">29333 9701 0,'0'0'0,"-17"0"0,-1 0 15,1 18 1,-1 17-16,0 36 16,18-18-16,18 0 0,0 35 15,17-35 1,18 17-16,-36-34 0,54 17 16,-53-36-1,17-17-15,-17-17 16,-18-36-1</inkml:trace>
   <inkml:trace contextRef="#ctx0" brushRef="#br0" timeOffset="22306.094">29545 10037 0,'0'52'16,"0"-104"-16,0 140 0,18-71 15,-18 1-15,0 0 0,0-1 16,0-34-1,0-19 1,0 19-16,0-19 0,17-16 16,1 34-16,0-17 15,-1 17-15,19 18 16,-36 18 0,0 35-1,0-36-15,0 1 16,0-1-16,17-17 31,19-35-15,-19 18-16,36-19 15,-35 19-15,17-1 16,-17 18-16,-1 0 0,1 18 16,-18-1-16,0 19 15,0-1-15,0 0 16,0-17-1,18 17-15,-18-17 16,17-1-16</inkml:trace>
-  <inkml:trace contextRef="#ctx0" brushRef="#br0" timeOffset="22551.3194">29986 9754 0,'18'18'16,"17"35"-16,18 0 16,-18 0-16,-17-18 15,17 53 1,-35 0-16,0-35 15,-17 0-15,-1-18 16,0 1-16,1-36 16</inkml:trace>
+  <inkml:trace contextRef="#ctx0" brushRef="#br0" timeOffset="22551.3193">29986 9754 0,'18'18'16,"17"35"-16,18 0 16,-18 0-16,-17-18 15,17 53 1,-35 0-16,0-35 15,-17 0-15,-1-18 16,0 1-16,1-36 16</inkml:trace>
   <inkml:trace contextRef="#ctx0" brushRef="#br0" timeOffset="23283.808">30251 9860 0,'0'0'16,"0"-17"0,35 17-1,-17 0-15,-1-18 0,54 18 16,-54 0-16,19 0 15,34 0-15,-34 18 16,-1-18 0,-35 17-16,0 1 15,0-1-15,0 36 16,-18-17-16,36 69 16,-1-34-16,19 52 15,-19-70-15,1 18 16,-18 0-16,18 70 15,-18-88-15,0 70 0,0-70 16,0 0-16,-18-18 16,18 18-16,0-35 15,-18-18-15,1 0 16,-19-18 0,19 0-16,-36-17 15,18 17-15,-1 18 16,-17 0-16,-52 0 15,52 18-15,-53 17 16</inkml:trace>
   <inkml:trace contextRef="#ctx0" brushRef="#br0" timeOffset="25797.2692">1341 6703 0,'0'0'0,"-18"17"0,0 36 16,18-17-16,0 17 16,0-18-16,0 18 0,18 0 15,17 35-15,-17-35 16,-1-18-16,1 0 0,17 1 15,36 17 1,-53-36-16,17-17 0,-17 0 16</inkml:trace>
   <inkml:trace contextRef="#ctx0" brushRef="#br0" timeOffset="26157.747">1640 6862 0,'36'70'16,"-72"-140"-16,72 175 0,-19-52 15,-17-17-15,0 16 0,18-34 16,-18 17-16,18 1 16,-18-19-16,0-34 31,0-54-16,0 36-15,17-53 16,1 52-16,17-34 16,-17 52-16,-1 1 15,1 17-15,0 35 16,-1-18-16,-17 54 16,18-36-16,-18 36 15,0-36-15,0 18 16,18-35-16,-1 17 15,-17-17-15</inkml:trace>
@@ -257,7 +257,7 @@
   <inkml:trace contextRef="#ctx0" brushRef="#br0" timeOffset="45647.4181">5415 14517 0,'0'17'0,"18"54"16,-1-36-16,36 71 16,-35-53-16,0 0 0,-18-18 15,35 53-15,-17-52 16,-1-1-1</inkml:trace>
   <inkml:trace contextRef="#ctx0" brushRef="#br0" timeOffset="46074.6429">7003 14693 0,'0'18'0,"0"-1"15,0 19 1,0-19-16,17 36 15,-17-35-15,18 0 16,-18-1-16,0-34 31,-35-19-31</inkml:trace>
   <inkml:trace contextRef="#ctx0" brushRef="#br0" timeOffset="46507.8831">7303 14376 0,'0'0'15,"52"-88"-15,-34 35 0,-18 17 0,0-17 16,0 0-16,-18 18 15,1 18-15,-18-1 16,17 18-16,0 0 16,1 18-16,-1 17 0,0 18 15,18 70-15,0-70 16,18 88-16,0-70 16,17 52-1,-17-87-15,-1-1 0,1 0 16,-18-17-16,0-1 0,-18-17 15,-17-17 1,17-1-16,-17-17 16,35 17-16,0 1 15,0-1-15,18 0 0,52-17 16,-35 17 0,36 1-16,-36 17 15,1-18-15,-1 18 16</inkml:trace>
-  <inkml:trace contextRef="#ctx0" brushRef="#br0" timeOffset="46874.6317">6950 14446 0,'-18'-17'16,"36"17"-1,-18-18 1</inkml:trace>
+  <inkml:trace contextRef="#ctx0" brushRef="#br0" timeOffset="46874.6316">6950 14446 0,'-18'-17'16,"36"17"-1,-18-18 1</inkml:trace>
   <inkml:trace contextRef="#ctx0" brushRef="#br0" timeOffset="47470.4986">9049 14411 0,'17'18'16,"-17"17"-16,18 0 15,0 0-15,-1 18 0,19-17 16,-19 34-16,1-35 16,0-17-1,-18-36 1,0-70-16,0 35 16,0 0-16,17-52 15,1 52-15,17 0 16,-17 35-16,17 18 15,-35 35-15,18 54 16,-18-36-16,0 35 16,0-71-16,0 19 15,0-19-15,0-34 16,35-19 0,-17 1-16,34 0 15,-34 0-15,17 17 16,-17 18-1,0 0-15,-1 18 16,-17-1-16,18 18 0,-18-17 16,18 35-16,-1-18 15,18 1 1,-35-19-16,18 1 0,0-18 16</inkml:trace>
   <inkml:trace contextRef="#ctx0" brushRef="#br0" timeOffset="47654.3107">9948 14305 0,'36'0'15,"-72"0"-15,107-17 0,-18 17 16,-18-18-16,18 18 15</inkml:trace>
   <inkml:trace contextRef="#ctx0" brushRef="#br0" timeOffset="47769.5502">10019 14464 0,'18'0'0,"34"18"15,-16-18-15,17 0 16,-18 0-16,18-18 0,-18 18 15</inkml:trace>
@@ -268,7 +268,7 @@
   <inkml:trace contextRef="#ctx0" brushRef="#br0" timeOffset="49799.5341">13388 14358 0,'0'0'16,"0"53"-16,0-18 0,-53 1 15,35-1-15,-52 18 16,52-36-16,-17-17 16</inkml:trace>
   <inkml:trace contextRef="#ctx0" brushRef="#br0" timeOffset="50501.0726">13811 14076 0,'-17'0'16,"34"0"-16,-52 17 0,35 19 0,-18 34 15,18-17-15,18 53 16,0-71-16,-1 1 16,19-1-16,-1-17 0,-18-18 15,54 0-15,-53-18 16,17-17-1,-17 17-15,-18-17 0,0-1 16,0 1-16,-36-18 16,19 36-16,-19-36 15,19 53-15,17-18 16,17 18 0,36 0-1,-17 18-15,52-18 16,-53 0-16,53 0 15,-35 0-15,0 0 16,-35 0-16,-1 0 0,-17 17 16,0 1-16,-17 17 15,-1 36 1,0-18-16,18-18 16,0 0-16,36 1 15,-1-36-15,0 17 0,36-34 16,-36-1-1,0 0-15,1-35 16,-19-17-16,-17 52 16,-35-35-16,17 36 15,-52-19-15,35 19 16,-18-1-16,35 18 16,0 0-16,18-18 15,18 1-15,17 17 16</inkml:trace>
   <inkml:trace contextRef="#ctx0" brushRef="#br0" timeOffset="51001.0729">14817 14199 0,'0'0'0,"-18"36"16,0-19 0,18 36-16,0-18 15,36 36 1,-19-36-16,1-17 0,17 0 15,18-18-15,-18 0 16,1-18-16,-19 0 16,19-17-16,-36 17 15,0 1-15,-18-1 0,-17-17 16,-1 17-16,-16 1 16,34-1-1,0-17-15</inkml:trace>
-  <inkml:trace contextRef="#ctx0" brushRef="#br0" timeOffset="51241.2076">15222 13899 0,'71'-17'16,"-142"34"-16,177-34 0,-71 17 0,18 17 15,0 19-15,-35-1 16,0 18-16,-18-18 16,-18 36-16,0-54 15,18 1-15,-17 17 16,17-17-16,-18 0 0,18 17 16,0-17-16,0-1 15</inkml:trace>
+  <inkml:trace contextRef="#ctx0" brushRef="#br0" timeOffset="51241.2075">15222 13899 0,'71'-17'16,"-142"34"-16,177-34 0,-71 17 0,18 17 15,0 19-15,-35-1 16,0 18-16,-18-18 16,-18 36-16,0-54 15,18 1-15,-17 17 16,17-17-16,-18 0 0,18 17 16,0-17-16,0-1 15</inkml:trace>
   <inkml:trace contextRef="#ctx0" brushRef="#br0" timeOffset="51357.4986">15558 14482 0,'0'0'0,"0"17"32,-18-17-32</inkml:trace>
   <inkml:trace contextRef="#ctx0" brushRef="#br0" timeOffset="108766.0635">8855 15716 0,'17'36'15,"-17"-1"-15,18 0 16,-18 71 0,0-53-16,0 0 0,-18 35 15,1-70-15,17-1 16,-18-34 0,18-54-16,0 36 15,18-53-15,-18 35 16,53-18-16,-36 53 15,1 18-15,0 0 16,-1 0-16,1 53 16,-1-17-16,-17 34 15,0-35-15,0 1 16,0-19-16,0 1 0,0-36 31,36-17-31,-1 0 16,-17 0-16,17-36 15,-17 53-15,-18 1 0,17 17 16,-17 35 0,0-17-16,0 17 15,0 35 1,0-34-16,18 17 0,-18-36 16,18 19-16,-18-19 0,17 1 15,1-18-15,-1 0 16,1-18-16</inkml:trace>
   <inkml:trace contextRef="#ctx0" brushRef="#br0" timeOffset="108905.6169">9331 15928 0,'35'35'16,"-17"0"-16,0-17 16,-1 17-16,1 1 15,-1-1-15,1 0 0,0 1 16,-18-19-16,17-17 15,-17-17-15</inkml:trace>
@@ -303,9 +303,9 @@
   <inkml:trace contextRef="#ctx0" brushRef="#br0" timeOffset="135025.0387">14834 5362 0,'0'0'16,"0"18"-16,18 0 15,0 17-15,70 53 16,-35-35-16,70 35 16,-70-53-16,0 1 0,0-19 15,0 19-15,-18-19 0,18 18 16,-35-35-16</inkml:trace>
   <inkml:trace contextRef="#ctx0" brushRef="#br0" timeOffset="135197.3677">15152 5362 0,'0'0'0,"-18"0"0,1 36 16,-1-19-16,0 18 15,-17 18-15,0 36 16,17-54-16,0 35 16,36-34-16,0-1 15,17-35-15</inkml:trace>
   <inkml:trace contextRef="#ctx0" brushRef="#br0" timeOffset="135704.5689">15363 4851 0,'0'17'47,"0"54"-31,0-36-16,18 0 15,0 54-15,-18-54 16,35 18 0,-17-36-16,-1 1 0,1 0 15</inkml:trace>
-  <inkml:trace contextRef="#ctx0" brushRef="#br0" timeOffset="136121.3261">15593 4992 0,'17'17'0,"-17"19"16,18-19-16,-18 1 15,0 0-15,0-1 16,0 1-16,0 0 16,18-18-16,-1 0 31,-17-18-15,18 18-16,-18-18 0,0 1 15,18 17 1,-18-18-1,-18 18 1,18-18 15</inkml:trace>
+  <inkml:trace contextRef="#ctx0" brushRef="#br0" timeOffset="136121.326">15593 4992 0,'17'17'0,"-17"19"16,18-19-16,-18 1 15,0 0-15,0-1 16,0 1-16,0 0 16,18-18-16,-1 0 31,-17-18-15,18 18-16,-18-18 0,0 1 15,18 17 1,-18-18-1,-18 18 1,18-18 15</inkml:trace>
   <inkml:trace contextRef="#ctx0" brushRef="#br0" timeOffset="136921.765">15822 4957 0,'0'17'47,"0"1"-32,0-1-15,0 19 0,0-19 16,18 1-16,-1 17 0,36-17 16,-35 0-16,17-18 15,-17 0-15,-1 0 16,-17-36 0,0 19-16,-17-19 15,-1 19-15,1-1 16,-1 0-16,0 18 15,1 0-15,-1 0 0,0 0 16</inkml:trace>
-  <inkml:trace contextRef="#ctx0" brushRef="#br0" timeOffset="137206.8837">16087 5009 0,'0'0'0,"-18"0"16,36 18-1,-1 0 1,1-1-16,0-17 16,35 18-16,-36-18 15,1 0 1,-18-18-1,0 1-15,-18-1 0,1 0 16,-1 1 0,0-1-16,1 18 15</inkml:trace>
+  <inkml:trace contextRef="#ctx0" brushRef="#br0" timeOffset="137206.8836">16087 5009 0,'0'0'0,"-18"0"16,36 18-1,-1 0 1,1-1-16,0-17 16,35 18-16,-36-18 15,1 0 1,-18-18-1,0 1-15,-18-1 0,1 0 16,-1 1 0,0-1-16,1 18 15</inkml:trace>
   <inkml:trace contextRef="#ctx0" brushRef="#br0" timeOffset="137955.6833">16387 4957 0,'0'-18'0,"0"36"15,0-1 1,17 1-1,-17 17-15,0-17 0,18 17 16,-18-17-16,17-1 16,1-17 15</inkml:trace>
   <inkml:trace contextRef="#ctx0" brushRef="#br0" timeOffset="138353.6293">16510 4763 0,'18'0'31,"-1"0"-31,1 17 0,17 1 16,18 52-1,-35-34-15,17-1 0,-17 18 16,17-18-16,-35 18 16,18-18-16,-18 36 15,-18-54-15,-17 36 16,17-35-16,-35 0 16</inkml:trace>
   <inkml:trace contextRef="#ctx0" brushRef="#br0" timeOffset="139151.6012">15487 4745 0,'0'-18'16,"18"1"-1,-18-1 1,-18 18 15,0 18-15,18-1-16,-17 1 0,-1 0 15,0 17-15,18-18 0,-17 19 16,17 34 0,0-34-16,0 34 15,17-35-15,19 54 16,-19-54-16,1-18 16,0 19-16,-1-19 0,1 19 15,-18-19-15,18 1 16,-1-18-16,18 0 15</inkml:trace>
@@ -357,10 +357,10 @@
   <inkml:trace contextRef="#ctx0" brushRef="#br0" timeOffset="204496.4643">29757 7250 0,'0'0'0,"-18"0"32,1 17-17,-1 19 1,18-19-16,0 1 16,0-1-16,18 1 0,-18 17 15,17-17-15,18 0 16,-17-18-16,17 0 15,-17 0-15,0 0 0,17-36 16,-35 19-16,0-19 16,0 1-16,-35 0 15,17 17-15,-17-17 16,17 35-16,-17 0 16</inkml:trace>
   <inkml:trace contextRef="#ctx0" brushRef="#br0" timeOffset="205096.8372">30021 7091 0,'18'0'31,"0"0"-16,-1 0-15,1 0 0,0 0 16,17 17 0,-17-17-16,-18 18 15,17-18-15,-17 18 16,-17-1-16,-1 1 16,-17 0-16,-1 17 15,36-17-15,-17-1 16,17 1-16,0 0 0,17 17 15,1-18-15,17 19 16,-17-36-16,35 35 16,-36-35-16,1 18 15,-36-1 17,1 1-32,-1 0 15,1-1-15,-1-17 0,18 18 16,0-1-16,18-17 31,-36 0 0,-17 0-31,-1 0 16,-17 18-16,18-18 16</inkml:trace>
   <inkml:trace contextRef="#ctx0" brushRef="#br0" timeOffset="205937.4863">28910 7532 0,'0'17'78,"-17"1"-62,-1 0-16,0 17 16,1-17-16</inkml:trace>
-  <inkml:trace contextRef="#ctx0" brushRef="#br0" timeOffset="208339.3344">13935 9560 0,'0'18'16,"0"35"-1,0 0-15,17 88 16,1-53-16,-18 124 15,-18-89-15,18-17 16,-17 18-16,34 52 16,1-53-1,0-70-15,-1 0 0,1 0 16,-18-18-16</inkml:trace>
+  <inkml:trace contextRef="#ctx0" brushRef="#br0" timeOffset="208339.3343">13935 9560 0,'0'18'16,"0"35"-1,0 0-15,17 88 16,1-53-16,-18 124 15,-18-89-15,18-17 16,-17 18-16,34 52 16,1-53-1,0-70-15,-1 0 0,1 0 16,-18-18-16</inkml:trace>
   <inkml:trace contextRef="#ctx0" brushRef="#br0" timeOffset="210163.1968">12859 10054 0,'0'-17'0,"-18"-1"16,0 36-1,18 52 1,0-35-16,36 54 16,-19-72-16,1 18 15,35 1-15,-35-36 16,35 0-16,-18-18 16,-18-17-1,1 17-15,-18-17 16,0 17-16,-18 18 15,18 18-15,0 17 16,0 0-16,0 1 0,0 52 16,18-53-16,-18 36 15,0-36 1,0-17-16,-18 17 16,1-17-16,-1-18 0,-35 0 15,18 0-15,0-18 16,17 0-16,-17 1 0,-18-36 15,18 18 1,35-1-16</inkml:trace>
   <inkml:trace contextRef="#ctx0" brushRef="#br0" timeOffset="210450.4209">12894 9507 0,'0'0'16,"0"18"0,0 17-16,0-17 15,0 17-15,0 53 16,0-52-16,0-1 0,18 0 15,-1 1-15,-17-1 16,36 0-16,-19-17 16,19-18-16,-19 0 15,1-36-15</inkml:trace>
-  <inkml:trace contextRef="#ctx0" brushRef="#br0" timeOffset="210618.8849">13035 9631 0,'0'0'16,"18"35"-16,-1 18 15,-17-18-15,18 18 16,0-35-16,-1 17 16,1-17-16,-18-1 0,18-17 15,-1 0-15</inkml:trace>
+  <inkml:trace contextRef="#ctx0" brushRef="#br0" timeOffset="210618.8848">13035 9631 0,'0'0'16,"18"35"-16,-1 18 15,-17-18-15,18 18 16,0-35-16,-1 17 16,1-17-16,-18-1 0,18-17 15,-1 0-15</inkml:trace>
   <inkml:trace contextRef="#ctx0" brushRef="#br0" timeOffset="211146.1">13212 9772 0,'-18'18'15,"36"-36"-15,-36 53 0,36-35 16,-18 18-16,17-18 15,1 0-15,-1-18 16,1 18 0,-36-17-1,18-1-15,-17 18 16,17-18 0,-18 18-16,36 0 31,-18 18 31,0 0-46,0-1 0,17 1-1,-17 0-15,0-1 0,0 1 16,18-1-16,0 1 15,-1 0-15,1-18 16,0 0-16,-1-18 16,-17 0-16,18 1 15,-18-1-15,0-17 16,-18 17-16,-17-17 16,35 17-16,-35 1 15,17 17-15,0 0 16,18 17-1</inkml:trace>
   <inkml:trace contextRef="#ctx0" brushRef="#br0" timeOffset="211440.7747">13441 9772 0,'0'0'15,"-18"0"-15,18 18 16,18-1 0,-18 1-16,17 0 15,1-18-15,0 17 16,-1-17 0,-17-17-1,-17-1 1,17 0-16,0 1 15,-18-1-15,18 0 16,-18 18 0,1 0-16</inkml:trace>
   <inkml:trace contextRef="#ctx0" brushRef="#br0" timeOffset="211847.033">13582 9790 0,'0'-18'16,"0"36"31,0-1-47,0 1 15,0 0-15,0-1 0,18 1 16,-1-18-1,1 0-15,0 0 16,-18-18 0,0 1-16,0-1 15,0 0-15,-18 18 16,0-17-16,1-1 16</inkml:trace>
@@ -435,7 +435,7 @@
   <inkml:trace contextRef="#ctx0" brushRef="#br0" timeOffset="274433.5016">14340 16916 0,'0'17'16,"18"-17"-1,35 0-15,-35 0 16,17 0-1,-17 0-15,-1 0 0,1 0 0</inkml:trace>
   <inkml:trace contextRef="#ctx0" brushRef="#br0" timeOffset="274672.3285">14429 16792 0,'0'0'0,"-18"0"16,18 36-16,0-19 15,0 1-15,0 35 16,0-36-16,18 36 16,-18-17-16,35-1 15,-35-18-15,35 1 16,-17-18-16,-1 0 15,1 0-15,0 0 16,-1-18 0</inkml:trace>
   <inkml:trace contextRef="#ctx0" brushRef="#br0" timeOffset="275134.2359">14781 16704 0,'0'0'0,"18"0"0,0 0 16,-1 0-16,-17 18 15,0-1-15,-17 1 16,-1 17-16,0 1 16,1-1-1,17 0 1,0 0 0,35-17-16,-17 0 0,-1-18 15,1 17-15,0-17 16,-1 18-16,19 0 15,-36-1-15,0 1 16,0-1-16,0 1 0,-18 17 16,0-35-1,1 0-15,-1 0 0,0 0 16,1 0 0,-1 0-16,18-17 15,-18 17-15</inkml:trace>
-  <inkml:trace contextRef="#ctx0" brushRef="#br0" timeOffset="275530.1567">14940 17657 0,'0'17'16,"0"-34"-16</inkml:trace>
+  <inkml:trace contextRef="#ctx0" brushRef="#br0" timeOffset="275530.1566">14940 17657 0,'0'17'16,"0"-34"-16</inkml:trace>
   <inkml:trace contextRef="#ctx0" brushRef="#br0" timeOffset="276897.5746">11501 18045 0,'-18'17'0,"0"-17"15,54 0 1,52 0-1,-18 0-15,107 0 16,-54 0 0,159 18-16,-123-18 15,212 18-15,-195-18 16,36 17-16,-18-17 0,211 0 16,-211 18-16,124-1 15,-177-17-15,71 36 16,-142-19-16,-17 1 15</inkml:trace>
   <inkml:trace contextRef="#ctx0" brushRef="#br0" timeOffset="282002.8015">21237 13494 0,'-17'-18'15,"17"36"17,0 35-17,17-18-15,1 88 16,0-52-16,-18 0 0,17 140 16,-17 71-1,-17-88-15,-1 36 16,-35 264-16,35-247 15,-17 211-15,35-264 16,0 124-16,0-177 16,0 0-16,-18-18 0,18 19 15,-17-19-15,17-17 16,0 0-16,-18 17 0,18 89 16,18-124-16,17 35 15,-17-70-15,-1-17 16</inkml:trace>
   <inkml:trace contextRef="#ctx0" brushRef="#br0" timeOffset="291288.7724">23548 13547 0,'18'0'15,"-18"-18"1,-18 18 15,0 0-15,1 18-1,-1-1-15,-17 36 16,17-17 0,0 34-16,1 18 15,17-35-15,17 35 16,1-52-16,17 34 16,-17-52-1,0 17-15,-1-17 0,1-1 16,0 1-16,-36-18 31,18-18-31</inkml:trace>
@@ -458,14 +458,14 @@
   <inkml:trace contextRef="#ctx0" brushRef="#br0" timeOffset="316904.2817">23301 17268 0,'-18'0'16,"18"18"-1,0 0 1,-17 35-16,-1-36 16,-17 72-16,17-37 15,-17 72-15,0-54 16,-1 54-16,19-71 16,-1 0-16,0 0 15,18-36-15,0 36 16,0-35-16,18-18 15</inkml:trace>
   <inkml:trace contextRef="#ctx0" brushRef="#br0" timeOffset="317488.9433">24994 18168 0,'0'0'16,"-17"0"-16,-1 18 15,0-1-15,1 36 16,-1-35-16,0 17 16,36-35-1</inkml:trace>
   <inkml:trace contextRef="#ctx0" brushRef="#br0" timeOffset="317799.9646">25435 17392 0,'-17'-35'16,"34"70"-16,-52-70 0,53 35 16,17 35-1,0-17-15,53 52 16,-52-35-16,52 54 16,-53-36-16,53 17 15,-52-35-15,17 36 16,-18-53-1,0-1-15,0 1 16,-17-18-16,0-18 16</inkml:trace>
-  <inkml:trace contextRef="#ctx0" brushRef="#br0" timeOffset="318043.6437">26229 17498 0,'-35'35'16,"70"-70"-16,-106 88 16,54-18-16,-36 18 15,35 0-15,1 35 16,-1-17-16,18-19 0,18 72 16,-1-71-16,19 35 15,-19-53-15,1 36 16,-1-53-1,-17-1-15,0 1 16,0-36-16</inkml:trace>
+  <inkml:trace contextRef="#ctx0" brushRef="#br0" timeOffset="318043.6436">26229 17498 0,'-35'35'16,"70"-70"-16,-106 88 16,54-18-16,-36 18 15,35 0-15,1 35 16,-1-17-16,18-19 0,18 72 16,-1-71-16,19 35 15,-19-53-15,1 36 16,-1-53-1,-17-1-15,0 1 16,0-36-16</inkml:trace>
   <inkml:trace contextRef="#ctx0" brushRef="#br0" timeOffset="318795.4322">26547 16951 0,'-18'-18'16,"36"36"-16,-54-53 0,19 35 15,-1 0 1,0 0-16,18 17 0,-17 19 16,17-19-16,0 19 15,0-19 1,0 1-16,17 17 0,1 0 15,0-17 1,-1 0-16,-17-1 0,0 1 16,-17 0-1,-1-1-15,0-17 0,1 18 16,-1-1-16,0 1 16,36-18-1,0 0 1,-1 0-16,1 0 15,0-18-15,-18 36 32,0 17-32,0 1 15,0-19-15,-18 19 16,18-19-16,0 1 0,18 0 16,-18-1-1,17 1-15,1-18 16,0 0-16,-1 0 15,18-18-15,-17 18 16</inkml:trace>
-  <inkml:trace contextRef="#ctx0" brushRef="#br0" timeOffset="319023.642">26705 17286 0,'18'0'15,"35"0"1,-18 0-16,0 0 16,-17 0-16,53 0 15,-54 0-15,1 0 16,-36 0-1,1 0-15</inkml:trace>
+  <inkml:trace contextRef="#ctx0" brushRef="#br0" timeOffset="319023.6419">26705 17286 0,'18'0'15,"35"0"1,-18 0-16,0 0 16,-17 0-16,53 0 15,-54 0-15,1 0 16,-36 0-1,1 0-15</inkml:trace>
   <inkml:trace contextRef="#ctx0" brushRef="#br0" timeOffset="319262.271">26811 17092 0,'-18'18'15,"18"35"1,0-36-16,0 19 0,0-1 16,0 0-16,0 0 0,0 36 15,0-53-15,18 17 16,0-17-16,17-1 16,-17-17-1,17 0-15,-17 0 16,17-35-16</inkml:trace>
   <inkml:trace contextRef="#ctx0" brushRef="#br0" timeOffset="319789.4361">27111 17004 0,'35'0'16,"-17"0"-16,35 0 16,-18 0-1,0 0-15,-17 0 16,-18 35-16,-18-35 15,1 35-15,-1 1 16,-17-1-16,17-17 16,18 17-16,0-17 15,18-1-15,-18 1 16,17-18-16,19 17 0,17-17 16,-36 18-16,1-18 15,0 18-15,-1-18 16,-17 17-16,0 1 15,-17 0 1,-1-18-16,18 17 0,-18 1 16,18 0-1,0-1 17,-17-17-17,-1 18 1,0-18-16,-17 18 15,0-1 1,17-17-16</inkml:trace>
   <inkml:trace contextRef="#ctx0" brushRef="#br0" timeOffset="319908.5167">27675 17515 0,'-17'-17'16</inkml:trace>
   <inkml:trace contextRef="#ctx0" brushRef="#br0" timeOffset="331842.0648">8573 8467 0,'-18'0'16,"0"0"-1,1 0 17,17-18-17,-18 18 1,18 18-1,18-18 64,17-18-64,0 18-15,53-18 16,-17 18-16,105-17 15,-88-1-15,36 18 0,105-35 16,-105 17-16,123 1 16,-141 17-1,52 0-15,-105 17 16,0 1-16</inkml:trace>
-  <inkml:trace contextRef="#ctx0" brushRef="#br0" timeOffset="332824.3079">9560 13247 0,'18'0'16,"0"0"0,17-18-16,0 18 0,89 0 15,-54 0-15,124 18 16,-70-18-16,-1 0 15,1 0-15,17 0 16,106-35-16,-124 35 16,89-18-16,-106 0 15,17 18-15</inkml:trace>
+  <inkml:trace contextRef="#ctx0" brushRef="#br0" timeOffset="332824.3078">9560 13247 0,'18'0'16,"0"0"0,17-18-16,0 18 0,89 0 15,-54 0-15,124 18 16,-70-18-16,-1 0 15,1 0-15,17 0 16,106-35-16,-124 35 16,89-18-16,-106 0 15,17 18-15</inkml:trace>
   <inkml:trace contextRef="#ctx0" brushRef="#br0" timeOffset="338114.3175">1676 7902 0,'0'-17'16,"17"17"15,72 0-16,-37 0-15,19-18 0,17 0 16,124-17 0,-89 17-16,89 1 15,-106 17-15,70 0 16,-105 0-16,-18 0 16,53 17-16,-71 1 0,-18-18 15</inkml:trace>
   <inkml:trace contextRef="#ctx0" brushRef="#br0" timeOffset="345404.5626">11148 7355 0,'-18'0'31,"1"18"-16,17 0 1,-18 35-16,18-36 16,18 54-16,-18-18 15,17 35-15,1-53 16,-1 0-16,19 36 16,-19-53-16,19 17 15,-19-17-15,1-1 16,0-17-16,-1 0 15</inkml:trace>
   <inkml:trace contextRef="#ctx0" brushRef="#br0" timeOffset="345961.1381">11412 7585 0,'0'0'0,"18"0"0,0 0 16,-1 35-1,-17-17-15,0-1 16,18 19-16,-18-19 16,0 18-16,0-17 0,0 17 15,0-17-15,0-36 31,0-17-31,0 17 16,0-34-16,0 16 16,18 19-16,-18-54 15,17 18 1,1 36-16,-18-1 0,17 0 16,1 36-1,-18 0-15,18-1 0,-1 71 16,-17-35-1,18 0 1,-18-18 0,18 1-16,-1-19 15,-17 1 1</inkml:trace>
@@ -474,7 +474,7 @@
   <inkml:trace contextRef="#ctx0" brushRef="#br0" timeOffset="346607.6646">12136 7796 0,'0'18'0,"0"17"16,-18-17-16,0 17 15,1-35-15,17 18 0,-18 0 16,0-1 0,1-17-16</inkml:trace>
   <inkml:trace contextRef="#ctx0" brushRef="#br0" timeOffset="346861.9173">12365 7549 0,'0'36'16,"0"-19"-16,0 19 0,0-1 16,0 0-16,0 0 15,0 1-15,18-1 16,-18-17-16,0-1 16,17-17-16</inkml:trace>
   <inkml:trace contextRef="#ctx0" brushRef="#br0" timeOffset="347613.6756">12594 7638 0,'0'17'15,"0"1"1,0 17-1,0-17-15,0-1 16,18-17-16,-18 18 0,17-18 16,1 0-16,0 0 31,-36-18-15,18 1-1,0-1 1,0 1-16,0-1 15,0 0 1,0 1 0,-18 17-1,36 0 32,0-18-16,-18 36 48,-18-18-79,18 17 15,0 1-15,0 0 16,0-1-1,0 18-15,0-17 16,0 17 0,18-35-16,-18 18 15,17-18-15,1 18 0,0-18 16,-1 0-16,1 0 16,0 0-16,-1 0 15,-17-18-15,18 0 16,-18 1-16,0-1 15,0-17-15,-18 17 16,18 1-16,-35-19 16,0 1-1,-1 35 1,19 0-16,17 18 31</inkml:trace>
-  <inkml:trace contextRef="#ctx0" brushRef="#br0" timeOffset="347969.6777">12859 7602 0,'0'0'0,"0"18"16,0 17-1,0-17-15,17 17 16,-17-17-16,18 17 16,0-35-1,-1 18-15,1-18 16,0-18 0,-18 0-16,0 1 15,0-1 1,-18 1-16,0-1 15,1 18-15,-1-18 16,0 18-16,18-17 16,-17 17-1,34 0-15,1 0 16</inkml:trace>
+  <inkml:trace contextRef="#ctx0" brushRef="#br0" timeOffset="347969.6776">12859 7602 0,'0'0'0,"0"18"16,0 17-1,0-17-15,17 17 16,-17-17-16,18 17 16,0-35-1,-1 18-15,1-18 16,0-18 0,-18 0-16,0 1 15,0-1 1,-18 1-16,0-1 15,1 18-15,-1-18 16,0 18-16,18-17 16,-17 17-1,34 0-15,1 0 16</inkml:trace>
   <inkml:trace contextRef="#ctx0" brushRef="#br0" timeOffset="348247.2097">13070 7655 0,'0'18'16,"0"0"-16,18-1 16,-18 1-16,18-18 15,-18 17-15,17-17 16,19 0-16,-19 0 15,1-17 1,-18-1-16,0 1 16,0-1-16,0 0 0,-18 1 15,18-1-15,-35 0 16,17 18-16,1 0 16,17 18-1</inkml:trace>
   <inkml:trace contextRef="#ctx0" brushRef="#br0" timeOffset="348530.5711">13176 7408 0,'18'-35'16,"-36"70"-16,54-70 0,-19 35 15,1 18-15,17 17 16,0 0-16,18 36 16,-17-36-16,-1 0 15,-18-17-15,1 17 0,-18 18 16,0-18-16,-18 18 16,-17-17-16,-18 17 15,18-18-15,0-17 16,17-1-16,0 1 0,1-1 15,-1 1-15</inkml:trace>
   <inkml:trace contextRef="#ctx0" brushRef="#br0" timeOffset="350193.3897">19491 7373 0,'0'-18'15,"-18"18"-15,1 18 16,-1 0 0,0 52-16,1-17 15,-1 0-15,18-18 0,-17 71 16,17-71-16,17 54 15,1-54-15,35 18 16,-36-35-16,54-1 16,-53-17-16,17-17 15</inkml:trace>
@@ -497,18 +497,18 @@
   <inkml:trace contextRef="#ctx0" brushRef="#br0" timeOffset="356599.9383">32861 8026 0,'0'0'16,"-17"0"-16,-1 17 0,0 1 15,18 35 1,0-18-16,0-17 0,0 17 16,36 0-16,-1-17 15,18-18-15,-18 0 16,-17 0-16,-1-18 15,1 1-15,0-1 16,-18-17-16,0 17 0,-36-35 16,19 36-16,-1-1 15,0 0-15,-17 1 0,18 17 16,-1 0-16,18 17 16</inkml:trace>
   <inkml:trace contextRef="#ctx0" brushRef="#br0" timeOffset="356866.8344">33038 7779 0,'0'0'0,"17"0"0,1 0 15,0 17 1,34 54-16,-34-36 15,35 53-15,-35-35 16,17 53 0,-17-53-16,-18-18 0,17 54 15,-17-37-15,-17-16 16,17-1-16,-18-17 0,-17 35 16,-1-36-16,-34 1 15</inkml:trace>
   <inkml:trace contextRef="#ctx0" brushRef="#br0" timeOffset="358134.1986">11959 12100 0,'0'-17'16,"0"-1"-16,-17 18 15,-1 18 1,18-1-16,-18 19 16,1 69-1,17-52-15,0 18 0,0-1 16,17 36-16,19-53 16,-19-18-16,36 36 15,-18-53-15,1 17 16,-19-35-16</inkml:trace>
-  <inkml:trace contextRef="#ctx0" brushRef="#br0" timeOffset="358968.1108">12330 12224 0,'0'17'31,"0"19"-31,0-1 16,17 18-16,1-18 16,0 36-16,-18-36 15,35 36-15,-35-36 16,17 0 0</inkml:trace>
+  <inkml:trace contextRef="#ctx0" brushRef="#br0" timeOffset="358968.1107">12330 12224 0,'0'17'31,"0"19"-31,0-1 16,17 18-16,1-18 16,0 36-16,-18-36 15,35 36-15,-35-36 16,17 0 0</inkml:trace>
   <inkml:trace contextRef="#ctx0" brushRef="#br0" timeOffset="359336.9402">12647 12629 0,'-18'0'16,"18"18"-16,-17 17 16,-1-17-16,18 0 0,-35 17 15,35-17-15,-35 17 16</inkml:trace>
-  <inkml:trace contextRef="#ctx0" brushRef="#br0" timeOffset="360676.608">12876 12259 0,'0'18'16,"18"52"-1,-18-34-15,0-1 16,18 35-16,-18-34 15,17 17-15,-17-18 16,0-18-16,18-17 0</inkml:trace>
+  <inkml:trace contextRef="#ctx0" brushRef="#br0" timeOffset="360676.6079">12876 12259 0,'0'18'16,"18"52"-1,-18-34-15,0-1 16,18 35-16,-18-34 15,17 17-15,-17-18 16,0-18-16,18-17 0</inkml:trace>
   <inkml:trace contextRef="#ctx0" brushRef="#br0" timeOffset="361244.3214">13123 12400 0,'-17'18'0,"17"35"15,0-36-15,17 36 16,1-35-16,0 0 0,17 17 16,-17-35-1,17 0-15,-18 0 16,19-18-16,-36 1 15,0-19-15,-18 19 16,0-36 0,1 35-16,-1 0 0,18 1 15,-17-18-15,17 17 16,17 0 0,1 18-16,35 0 15,-36 0-15,1 0 16,17 18-1,-17 0-15,-18-1 16,-18 18 0,18 18-1,0-35-15,0 17 16,0-17-16,18 0 0,17 17 16,-17-35-1,17 0-15,-17 0 16,17-18-16,-17 1 15,-1-19-15,-17 19 16,-17-36-16,17 35 16,-36-17-1,19 35-15,-1-18 16,0 18-16,-17-17 0,18 17 0,-1 0 16</inkml:trace>
   <inkml:trace contextRef="#ctx0" brushRef="#br0" timeOffset="361566.958">13670 12418 0,'0'0'0,"0"17"15,0 19 1,0-1-16,0-17 0,0-1 16,0 1-16,18 0 15,-18-1-15,17-17 0,1 0 16,0 0-16,-1 0 16,1-17-16,-18-19 15,-18 19-15,1-36 16,-1 35-16,-17 0 15,17 1-15,-35-1 16,36 18 0,17 18-16,17-18 15</inkml:trace>
   <inkml:trace contextRef="#ctx0" brushRef="#br0" timeOffset="361839.1556">13794 12065 0,'35'18'0,"-70"-36"0,88 53 16,17 18-16,-35-18 15,18 18-15,18 18 16,-54-36-16,19 1 15,-19-1-15,-17 0 0,0 36 16,-17-36-16,-19 18 16,1-36-16,-18 19 15,18-19-15,-18 1 16</inkml:trace>
   <inkml:trace contextRef="#ctx0" brushRef="#br0" timeOffset="362500.5654">19914 12083 0,'-17'-36'15,"34"72"-15,-52-89 0,17 53 16,1 17-16,-1 1 15,18 17-15,-18 1 0,18 16 16,0-16 0,0 17-16,0 0 0,18 35 15,0-53-15,-18 0 16,35-17-16,-17 17 0,17 1 16,-17-36-16,35 0 15,-36 0-15,-17-18 16</inkml:trace>
-  <inkml:trace contextRef="#ctx0" brushRef="#br0" timeOffset="362700.6827">20073 12224 0,'0'0'15,"18"0"-15,-1 17 0,-17 19 16,18-19-16,-18 1 15,18 70 1,-1-17-16,-17-18 16,18-18-1</inkml:trace>
+  <inkml:trace contextRef="#ctx0" brushRef="#br0" timeOffset="362700.6826">20073 12224 0,'0'0'15,"18"0"-15,-1 17 0,-17 19 16,18-19-16,-18 1 15,18 70 1,-1-17-16,-17-18 16,18-18-1</inkml:trace>
   <inkml:trace contextRef="#ctx0" brushRef="#br0" timeOffset="362862.3953">20338 12524 0,'-18'35'15,"36"-70"-15,-54 88 0,19-36 16,-1 1-16,0-1 0,1-17 16</inkml:trace>
   <inkml:trace contextRef="#ctx0" brushRef="#br0" timeOffset="363056.4789">20602 12312 0,'0'0'15,"0"35"-15,0 1 16,0-19-16,0 18 0,18 18 15,0-17-15,-1-1 16,1-17-16,-1-18 16</inkml:trace>
   <inkml:trace contextRef="#ctx0" brushRef="#br0" timeOffset="363606.9321">20867 12365 0,'0'0'16,"-18"35"-16,18-17 0,0 35 15,0-36-15,35 19 16,-17-19-16,0 1 16,-1-18-16,19 0 15,-19 0-15,1-35 16,-18 17-16,0-17 15,0 17-15,-18-17 16,18 17-16,-17 1 16,-1 17-1,18-18-15,18 18 16,17 0 0,-17 0-16,34 0 15,-34-18-15,0 18 0,-1 0 16,1 0-16,-18 18 15,0 0 1,-18-1-16,18 1 16,0-1-16,0 1 15,0 17 1,18-17-16,-18 0 0,18-18 16,17 0-1,-17 0-15,17-18 16,-17 18-16,-1-18 0,1 1 15,-1-19-15,-17 19 16,0-1-16,-17-17 16,-18 17-1,17 18-15,-17 0 0,-1 0 16,19 0 0,17 18-1</inkml:trace>
-  <inkml:trace contextRef="#ctx0" brushRef="#br0" timeOffset="363885.8426">21502 12312 0,'-18'18'16,"18"-1"-1,-17 1-15,17 0 0,0 17 16,0-18-16,17 1 15,1 0-15,17-1 16,-17-17 0,17-17-1,-35-1-15,0 0 16,-18 1-16,18-1 16,-35 1-16,17-1 15,1 18 1</inkml:trace>
+  <inkml:trace contextRef="#ctx0" brushRef="#br0" timeOffset="363885.8425">21502 12312 0,'-18'18'16,"18"-1"-1,-17 1-15,17 0 0,0 17 16,0-18-16,17 1 15,1 0-15,17-1 16,-17-17 0,17-17-1,-35-1-15,0 0 16,-18 1-16,18-1 16,-35 1-16,17-1 15,1 18 1</inkml:trace>
   <inkml:trace contextRef="#ctx0" brushRef="#br0" timeOffset="364115.959">21678 12065 0,'53'18'15,"-35"17"-15,52 18 16,-34-18-16,-19 0 16,19 54-16,-19-54 0,-17 35 15,0-34 1,-35 17-16,17-18 16,1-17-16,-19-1 0</inkml:trace>
   <inkml:trace contextRef="#ctx0" brushRef="#br0" timeOffset="364959.3002">31415 12629 0,'0'0'0,"-18"0"0,1 0 16,-1 18-16,0 35 15,1 0-15,-1 53 16,18-53-16,0 0 15,35 52-15,-17-69 16,53 34-16,-54-52 16,18 0-16,18-1 15,-17-17-15,-19 0 16,1 0-16</inkml:trace>
   <inkml:trace contextRef="#ctx0" brushRef="#br0" timeOffset="365141.6862">31732 12718 0,'0'0'16,"18"105"-16,0-52 0,-1 36 16,1-36-16,17 17 15,-35-35 1,18 18-16,-18-35 15</inkml:trace>
@@ -529,7 +529,7 @@
   <inkml:trace contextRef="#ctx0" brushRef="#br0" timeOffset="436230.3344">11606 2928 0,'0'0'15,"-35"53"-15,0-35 0,0 17 0,-18 18 16,17-18 0,1 0-1</inkml:trace>
   <inkml:trace contextRef="#ctx0" brushRef="#br0" timeOffset="436509.3162">11836 2575 0,'0'0'0,"35"36"15,0-19-15,-17 18 16,17 1-16,-17-19 16,35 36-16,-18-17 15,-17-19-15,-1 1 0,19 0 16</inkml:trace>
   <inkml:trace contextRef="#ctx0" brushRef="#br0" timeOffset="436743.4379">12294 2558 0,'0'0'0,"-17"0"0,-1 17 0,0 36 15,1 0-15,-1 35 16,18-35-16,0 71 16,18-71-16,-18 0 15,17-1-15,-17 1 0,18-35 16,0 35 0,-18-35-16,17-1 0</inkml:trace>
-  <inkml:trace contextRef="#ctx0" brushRef="#br0" timeOffset="437298.6581">12541 2364 0,'-35'0'16,"70"0"-16,-88 0 0,36 0 15,-1 17-15,0-17 0,18 18 16,0 0 0,0-1-16,18-17 15,0 18-15,17-1 16,-35 1-16,18-18 0,-1 18 15,-17-1-15,0 1 16,0 0-16,-17-1 0,-1 19 16,0-19-1,1 1-15,-1-1 0,0 1 16,18 0-16,-17-1 16,17 1-16,17-18 15,1 0-15,0 18 16,-1-18-1,1 0 1,0 0-16,-1-18 16</inkml:trace>
+  <inkml:trace contextRef="#ctx0" brushRef="#br0" timeOffset="437298.658">12541 2364 0,'-35'0'16,"70"0"-16,-88 0 0,36 0 15,-1 17-15,0-17 0,18 18 16,0 0 0,0-1-16,18-17 15,0 18-15,17-1 16,-35 1-16,18-18 0,-1 18 15,-17-1-15,0 1 16,0 0-16,-17-1 0,-1 19 16,0-19-1,1 1-15,-1-1 0,0 1 16,18 0-16,-17-1 16,17 1-16,17-18 15,1 0-15,0 18 16,-1-18-1,1 0 1,0 0-16,-1-18 16</inkml:trace>
   <inkml:trace contextRef="#ctx0" brushRef="#br0" timeOffset="437509.5786">12629 2575 0,'0'0'0,"18"0"15,0 0-15,17 0 16,-35-17-16,18 17 16,-1-18-16,1 0 15,-18 1 1,0-1-16</inkml:trace>
   <inkml:trace contextRef="#ctx0" brushRef="#br0" timeOffset="437704.5965">12718 2417 0,'0'0'0,"-18"17"0,18 36 15,0-35-15,0 35 16,0-36-16,0 19 15,0-1-15,18 0 16,-18 0-16,17-17 16,-17 0-16,18-18 15,-18 17-15,18-17 16</inkml:trace>
   <inkml:trace contextRef="#ctx0" brushRef="#br0" timeOffset="438099.9475">12912 2364 0,'17'0'31,"1"0"-15,0 0-16,-1 17 15,-17 1-15,0 0 16,-17 17 0,-1-18-16,18 36 15,0-17-15,0-19 16,18 1-16,-18 0 16,17-1-16,1 1 15,0-1-15,-18 1 16,0 0-1,0-1 1,0 1-16,-18-18 16,18 18-1,-18-1 1</inkml:trace>
@@ -583,7 +583,7 @@
   <inkml:trace contextRef="#ctx0" brushRef="#br0" timeOffset="12356.8388">26300 5980 0,'0'0'0,"0"-18"0,-36 36 16,19 17-16,-36 71 16,53-53-16,0 17 15,0 18-15,0-17 0,35 88 16,-17-106 0,52 70-16,-52-70 15,17-18-15,53 36 16,-52-54-16,-1-17 15,0 18-15,-17-18 0</inkml:trace>
   <inkml:trace contextRef="#ctx0" brushRef="#br0" timeOffset="12584.9262">26723 6121 0,'18'70'0,"-36"-140"0,53 176 16,0-1-16,-35-52 15,18 71 1,-18-54-16,0 1 0,18-18 16,-18-18-16,17 36 15,1-36-15,17-35 16</inkml:trace>
   <inkml:trace contextRef="#ctx0" brushRef="#br0" timeOffset="12734.8435">27164 6562 0,'0'0'0,"70"-18"15,-34 18-15,-1-18 0,-17 18 16,-1 0-16,19-17 15,-1 17-15</inkml:trace>
-  <inkml:trace contextRef="#ctx0" brushRef="#br0" timeOffset="13229.4599">27693 7214 0,'0'0'0,"0"18"16,18-18-16,-18-18 15,17 1-15,-17-54 16,0 18-16,-17-88 16,-1 71-16,-35-142 15,36 106-15,-1 0 0,0 18 16,1 0-16,17 35 0,0 0 15,0 35-15,17 1 16,1 17-16,70 0 16,0 35-1,-35-17-15,0 17 0,18 18 16,-54-36-16,-17 54 16,-17-36-16,-19 18 15,1-18-15,-18 1 16,36-1-16,17 0 15,0-17 1,35 35-16,0-35 16,36 17-16,-36-35 15,0 17-15,-17 1 16,-36-18 0,-35 0-1,18 0-15,-18 0 0,-17 18 16,52-1-16,-17-17 15</inkml:trace>
+  <inkml:trace contextRef="#ctx0" brushRef="#br0" timeOffset="13229.4598">27693 7214 0,'0'0'0,"0"18"16,18-18-16,-18-18 15,17 1-15,-17-54 16,0 18-16,-17-88 16,-1 71-16,-35-142 15,36 106-15,-1 0 0,0 18 16,1 0-16,17 35 0,0 0 15,0 35-15,17 1 16,1 17-16,70 0 16,0 35-1,-35-17-15,0 17 0,18 18 16,-54-36-16,-17 54 16,-17-36-16,-19 18 15,1-18-15,-18 1 16,36-1-16,17 0 15,0-17 1,35 35-16,0-35 16,36 17-16,-36-35 15,0 17-15,-17 1 16,-36-18 0,-35 0-1,18 0-15,-18 0 0,-17 18 16,52-1-16,-17-17 15</inkml:trace>
   <inkml:trace contextRef="#ctx0" brushRef="#br0" timeOffset="14003.4603">28152 5891 0,'-18'-17'16,"36"17"-16,17 35 16,0-17-16,53 70 15,-52-53-15,17 36 16,-18-1-16,0 1 0,0-1 16,-17 1-16,-18-1 15,-18 72-15,1-72 16,-54 54-16,54-71 15,-19-18-15,19 0 0,-1 0 16,0-17-16</inkml:trace>
   <inkml:trace contextRef="#ctx0" brushRef="#br0" timeOffset="14452.3587">29210 6297 0,'-35'-35'0,"70"70"0,-88-70 15,18 35-15,0 17 16,-1 19-16,19-1 0,-36 53 16,53-17-16,0 35 15,17-36-15,1-17 16,17-18-16,18 18 0,53 0 15,-53-35-15,70-18 16,-70 0 0,0-18-16,18-52 15,-36 34-15,0-52 16,-35 35-16,0 0 16,-17-17-16,-19 17 0,-52-53 15,35 53-15,-70 0 16,70 36-16,-53 34 15,71 18-15,-18 36 16,53-36-16,18 53 16,-1-52-16,54 34 15,-18-34-15,52-1 16,-52-17-16,36-1 16,-36 1-1,-1-18-15</inkml:trace>
   <inkml:trace contextRef="#ctx0" brushRef="#br0" timeOffset="14797.8852">29916 6756 0,'17'17'16,"-17"36"0,18 0-16,-1 0 15,-17-18-15,18 1 16,0 17 0</inkml:trace>
@@ -606,7 +606,7 @@
   <inkml:trace contextRef="#ctx0" brushRef="#br0" timeOffset="23795.9927">29016 8467 0,'-53'0'16,"18"0"-16,-36 53 15,36-18-15,0 18 16,-1 70 0,19-52-16,17-1 0,17-17 15,1 0-15,17-18 0,18 1 16,18-1-16,70-17 15,-53-36-15,53-17 16,-35-36 0,-53 18-16,-35 0 0,-18 0 15,0 1-15,-53-72 16,0 71-16,-71-53 16,36 71-16,-53 0 15,70 35-15,-34 53 16,69-18-16,36 18 15,0 0-15,18-18 0,17 18 16,1-18-16,16 18 0,90 0 16,-72-18-16,54-17 15,-72 0-15,37-18 16</inkml:trace>
   <inkml:trace contextRef="#ctx0" brushRef="#br0" timeOffset="24086.9254">29757 8819 0,'0'0'16,"106"0"-16,-71 18 0,18-18 15,-36 35 1,-17 1-16,-35 17 15,0-18-15,0 0 0,-54 36 16,72-54-16,-1 1 16,18 0-16,53-1 15,0-17 1,35 0-16,-35 0 16,18 0-16,-54 0 15,-52 0 1</inkml:trace>
   <inkml:trace contextRef="#ctx0" brushRef="#br0" timeOffset="24679.698">19368 10283 0,'17'0'31,"1"0"-15,-18 18 0</inkml:trace>
-  <inkml:trace contextRef="#ctx0" brushRef="#br0" timeOffset="24803.1794">19350 10654 0,'18'35'16,"-36"-70"-16,53 88 0</inkml:trace>
+  <inkml:trace contextRef="#ctx0" brushRef="#br0" timeOffset="24803.1793">19350 10654 0,'18'35'16,"-36"-70"-16,53 88 0</inkml:trace>
   <inkml:trace contextRef="#ctx0" brushRef="#br0" timeOffset="24925.3242">19403 10918 0,'0'0'15,"17"36"-15,1-36 0,-18 17 32</inkml:trace>
   <inkml:trace contextRef="#ctx0" brushRef="#br0" timeOffset="28657.5369">19544 5203 0,'0'-17'0,"0"-1"16,0 1 15,-18 17-15,1 0-1,-1 0 1,0 0 0,1 17-1,-1 1 1,0-1-16,1 1 0,-1 0 15,1 35 1,17-36-16,0 36 16,0-35-16,0 17 0,17 18 15,18 18 1,1-36 0,-19-35-16,19 18 15,-1-1-15,-17-17 16,-1 0-16,18 0 15,-17 0-15,17-17 0,-17 17 16,0-18-16,-1 18 0,1-18 16,0 1-16,-18-1 0,35-17 15,-35 17-15,17-35 16,-17 36-16,0-19 16,0 1-16,0 17 15,-17-17 1,-1 17-16,1 1 0,-1 17 15,0-18-15,-17 18 0,17 0 16,-52 0-16,35 18 16,-18-1-16,17 1 15,19 0-15,-1 17 16,18-17-16,18-1 16,35 19-1,-36-36-15,36 17 16,-18 1-16,1-18 0,-19 0 15,36 0-15,-35 0 16,0 0-16,-36 0 31</inkml:trace>
   <inkml:trace contextRef="#ctx0" brushRef="#br0" timeOffset="29807.5671">19685 7038 0,'0'-18'16,"0"1"-1,-18 17-15,1-18 16,-1 18 0,0 18-16,-17-1 15,18 19 1,-1-1-16,0 0 15,18 0-15,0 1 0,0-19 16,36 54-16,-19-53 16,36 34-16,-18-34 15,54 0 1,-54-18-16,0 0 16,0 0-16,18-36 0,-35 19 15,17-18-15,-35 17 16,0-35-16,0 18 15,-17 17-15,-1-17 16,0 17-16,-17 0 0,0 1 16,-1-1-16,1 18 0,-35-17 15,34 34-15,-17 1 16,18-1-16,18 1 16,34 17-1,-17-17-15,18 0 16,35 17-16,-18-17 15,36-1-15,-36 1 16,18 0-16,-36-18 16,1 17-16,0-17 15,-36 0 17</inkml:trace>
@@ -622,27 +622,27 @@
   <inkml:trace contextRef="#ctx0" brushRef="#br0" timeOffset="43961.1843">20232 14076 0,'0'0'15,"17"17"-15,1 1 0,0-18 0,-1 0 16,19 0 0,-19-18-1,-17 1-15,-17 17 16,17-18-16,-18 18 0,0 0 15,1 0-15,-1 0 16,0 18-16,18 17 16,0-17-16,36-1 15,-19 1-15,54-18 16,-53 0-16,52 0 16,-52 0-16,-1-18 15,1 18-15,-18-17 16,-18 17-1,1 17 1,-1 1-16,0 0 16,18-1-16,18 1 15,0-18-15,17 0 16,-17 0-16,-1-18 16,19 1-1,-19-1-15,-17 0 16,0 1-16,0-1 15,-17 18-15,34 18 16,19-18 0,-19 0-16,36 17 15,-18-17 1,1 0-16,-36-17 16,17 17-1,-17-18-15,-17 0 16,17 1-16,0-1 15,17 18 1,-17-17-16,18 17 16,17 0-16,0 0 15,18 0-15,-17 0 16,17-18-16,-36 0 16,1 1-1,-36-1-15,-17 0 16,17 1-16,1-19 15,-1 36-15,0-17 16,18-1-16,-17 18 16,17 18-16,17 35 15,1-18 1,0 18-16,-18 0 0,17 0 16,19 35-16,-36-35 15,17-18-15,18 18 16</inkml:trace>
   <inkml:trace contextRef="#ctx0" brushRef="#br0" timeOffset="44599.6346">22225 13564 0,'0'0'16,"-71"-17"-16,19 17 0,-37 17 16,36 1-1,1 53-15,52-36 16,0 0-16,0 0 15,35-17-15,-18 17 0,36 1 16,-17-19-16,17 18 0,17 1 16,-35-36-16,-17 17 15,-18 1-15,0 0 16,-53-1-16,18 1 16,0 0-16,-1-1 15,1-17-15,0 18 0,-1-1 0,19 1 16,-1 0-1,36-18-15,17 17 16,0 1-16,1 0 16,-19-1-16,19 1 0,-19 0 15,36 35-15,-35-18 16,-1 18 0,1-36-16,0 1 15,-1 17-15,1-17 0,0-18 16</inkml:trace>
   <inkml:trace contextRef="#ctx0" brushRef="#br0" timeOffset="46280.8156">21149 14975 0,'0'0'0,"0"-17"16,0-36-16,0 35 15,-35 1-15,17-1 16,-17 18-16,17 18 16,-17 35-1,35-1-15,0 19 0,0-18 16,18 17-16,-1 1 0,1-18 16,35 35-16,0-53 15,17 1 1,-34-36-16,16 0 15,-16 0-15,-19-36 16,-17 19-16,0-1 0,0-17 16,0-18-16,-17 35 15,17 1-15,-18-1 16,0 18-16,18-18 16,0 36-16,18 0 15,-18-1-15,18 19 16,-1-19-1,1 1-15,-18-1 16,18 19-16,-18-19 16,0 1-1,0 0-15</inkml:trace>
-  <inkml:trace contextRef="#ctx0" brushRef="#br0" timeOffset="46758.6219">21537 15346 0,'0'0'16,"18"0"-1,35-35 1,0 17-16,-36 0 15,-17 1-15,0-1 16,-35 36 0,17-18-16,-17 53 15,17-36 1,18 36-16,18-18 16,0-17-16,17 17 15,0-35-15,36 0 16,-36 0-16,18-17 15,-35-1-15,17-17 16,-35 17-16,0-17 16,0 0-16,-18-1 15,18 19-15,18 17 47,17-18-47,0 18 16,36-18-16,-36 18 15,-17-17-15,0 17 0,-1 0 16,-17-18-16,-17 0 16</inkml:trace>
+  <inkml:trace contextRef="#ctx0" brushRef="#br0" timeOffset="46758.6218">21537 15346 0,'0'0'16,"18"0"-1,35-35 1,0 17-16,-36 0 15,-17 1-15,0-1 16,-35 36 0,17-18-16,-17 53 15,17-36 1,18 36-16,18-18 16,0-17-16,17 17 15,0-35-15,36 0 16,-36 0-16,18-17 15,-35-1-15,17-17 16,-35 17-16,0-17 16,0 0-16,-18-1 15,18 19-15,18 17 47,17-18-47,0 18 16,36-18-16,-36 18 15,-17-17-15,0 17 0,-1 0 16,-17-18-16,-17 0 16</inkml:trace>
   <inkml:trace contextRef="#ctx0" brushRef="#br0" timeOffset="46916.5175">22066 15046 0,'0'0'16,"0"88"-16,18-35 0,-18 0 16,18 0-16,-1-18 0,1 0 0,-1 1 15,19 17 1,-19-36-16</inkml:trace>
   <inkml:trace contextRef="#ctx0" brushRef="#br0" timeOffset="47754.5363">23178 15416 0,'0'0'0,"0"18"0,0 17 15,-18-17-15,18-36 16,0-17 0,0 0-16,18-53 15,-1 52-15,1 1 0,17-36 16,-17 54-1,-18-1-15,17 18 16,-17 35 0,0-17-16,18 35 15,-18-35-15,35 17 16,-17-17-16,17-1 16,-17-17-16,17 0 0,18-17 15,-35-1-15,-1-17 16,1 17-1,-18 0-15,-18-17 16,-35-18 0,0 53-16,36 18 15,-1 17-15,18-17 16,35 70 0,18-35-1,18-36-15,-36 1 0,0-18 16,54-35-1,-72 0 1,1 17-16,-18-35 16,-18 35-16,1 1 0,-1-1 15,0 18-15,18 18 32,36-1-17,17 1-15,-36 0 16,19-18-16,34 35 15,-35-35 1,-17 0 0</inkml:trace>
   <inkml:trace contextRef="#ctx0" brushRef="#br0" timeOffset="47899.7285">23901 15187 0,'-18'35'16,"18"18"-1,0-35-15,-18 52 16,18-52-16,0 17 16,0-17-16,18-18 15</inkml:trace>
   <inkml:trace contextRef="#ctx0" brushRef="#br0" timeOffset="48071.6115">24059 15134 0,'0'0'0,"53"0"0,-17 0 15,-1 0-15,0 0 0,18 0 16,0-17-16,-18 17 0,-17 0 16,17-36-1,-35 19-15</inkml:trace>
-  <inkml:trace contextRef="#ctx0" brushRef="#br0" timeOffset="48229.061">24218 14923 0,'18'105'16,"-36"-210"-16,53 263 0,1-105 0,-19 0 15,1 18-15,0-18 0,35 17 16,-36-35-1</inkml:trace>
+  <inkml:trace contextRef="#ctx0" brushRef="#br0" timeOffset="48229.0609">24218 14923 0,'18'105'16,"-36"-210"-16,53 263 0,1-105 0,-19 0 15,1 18-15,0-18 0,35 17 16,-36-35-1</inkml:trace>
   <inkml:trace contextRef="#ctx0" brushRef="#br0" timeOffset="48861.6328">25594 14799 0,'0'0'16,"-18"-18"-16,18 1 0,-17 17 16,-54 0-1,36 17-15,-36 36 16,36-17-16,0-1 0,0 0 15,17 18-15,18 53 16,0-53-16,18 0 0,17-18 16,0 0-16,71 1 15,-53-36-15,70 0 16,-52-18-16,-18 0 16,0-17-16,-18 0 0,0-1 15,-17-34-15,-18 35 16,-53-36-16,0 36 15,18 0-15,-89-18 16,71 35-16,-52 18 16,69 18-16,1-1 15,0 54-15,35-54 16,53 54-16,-18-36 16,71 1-1,-53-19-15,0 1 0,0-18 16,-1 17-16,-16-17 0,17 0 15,-36 0-15</inkml:trace>
   <inkml:trace contextRef="#ctx0" brushRef="#br0" timeOffset="50590.9744">26070 15311 0,'-17'17'16,"34"-17"0,1 0-1,17 0-15,0-17 16,1 17-16,-19-18 0,54 18 16,-53 0-16,-1 0 15,-17-18 1</inkml:trace>
   <inkml:trace contextRef="#ctx0" brushRef="#br0" timeOffset="50789.8188">26211 15152 0,'-17'53'15,"-1"-36"-15,18 19 0,0-1 16,0 0-16,0-17 15,18 17-15,-18-17 16,35-1-16,-17 1 0,52 0 16,-34-18-16,34 17 15,-52-34-15,-1 17 16</inkml:trace>
   <inkml:trace contextRef="#ctx0" brushRef="#br0" timeOffset="51788.0424">21167 16210 0,'0'18'0,"17"-1"15,-17 19-15,0 17 16,18-18-16,-18 18 0,18 0 15,-1 53 1,19-18-16,-19-71 16,1 1-16,-1 0 0,-17-1 15,36-17-15,-36-17 16,17-36-16,1 17 16,0-52-1,-1 35-15,-17-70 16,18 70-16,-18-18 15,0 36-15,0 18 16,0-1-16,18 36 16,-18-1-16,0 36 15</inkml:trace>
-  <inkml:trace contextRef="#ctx0" brushRef="#br0" timeOffset="52848.2946">21713 16598 0,'-35'0'0,"18"0"15,-19 35 1,19-17-16,-1 17 0,18 54 15,0-54 1,18 35-16,-1-34 16,36-1-16,-18-17 15,36-18 1,-36 0-16,1-18 0,-19 18 16,19-53-16,-19 35 15,-34-52-15,17 52 16,-71-52-16,36 52 15,-1 0-15,-17 1 16,18 17-16,0 0 0,-18 0 16,35 17-16,18 19 15,18-1-15,35 0 16,-18-17-16,18 0 16,35-1-16,1-17 15,-54 0-15,-18-17 16,36-1-1</inkml:trace>
+  <inkml:trace contextRef="#ctx0" brushRef="#br0" timeOffset="52848.2945">21713 16598 0,'-35'0'0,"18"0"15,-19 35 1,19-17-16,-1 17 0,18 54 15,0-54 1,18 35-16,-1-34 16,36-1-16,-18-17 15,36-18 1,-36 0-16,1-18 0,-19 18 16,19-53-16,-19 35 15,-34-52-15,17 52 16,-71-52-16,36 52 15,-1 0-15,-17 1 16,18 17-16,0 0 0,-18 0 16,35 17-16,18 19 15,18-1-15,35 0 16,-18-17-16,18 0 16,35-1-16,1-17 15,-54 0-15,-18-17 16,36-1-1</inkml:trace>
   <inkml:trace contextRef="#ctx0" brushRef="#br0" timeOffset="53069.3785">22331 16351 0,'0'0'0,"17"18"16</inkml:trace>
   <inkml:trace contextRef="#ctx0" brushRef="#br0" timeOffset="53188.9441">22401 16651 0,'0'0'0,"18"0"32,-18-18-17</inkml:trace>
   <inkml:trace contextRef="#ctx0" brushRef="#br0" timeOffset="53402.0545">22772 16404 0,'53'0'15,"-106"0"-15,141-17 0,-35 17 0,-18 0 16,0-18-16,1 18 0,-19 0 16,1 18-16,-18-1 15</inkml:trace>
-  <inkml:trace contextRef="#ctx0" brushRef="#br0" timeOffset="53510.7413">22789 16616 0,'0'0'15,"71"17"-15,-36-17 0,1 0 16,16-17-16,-16 17 16,17-18-16</inkml:trace>
+  <inkml:trace contextRef="#ctx0" brushRef="#br0" timeOffset="53510.7412">22789 16616 0,'0'0'15,"71"17"-15,-36-17 0,1 0 16,16-17-16,-16 17 16,17-18-16</inkml:trace>
   <inkml:trace contextRef="#ctx0" brushRef="#br0" timeOffset="54544.4944">23742 17357 0,'-18'0'31,"18"-18"16,0-17-32,-17 17-15,-19-70 16,19 53-16,-19-71 16,1 35-16,18 1 15,-19-18-15,1-89 16,17 71-16,18 0 0,0 18 16,0 18-16,53-36 15,-35 88-15,35 1 16,-18 17-16,18 0 15,-18 17-15,-17 1 0,0 0 16,-18 52-16,0-17 16,-36 0-1,19-18-15,-19 18 16,36-35-16,18-1 16,17 1-16,1 0 15,-1-1-15,0-17 0,36 18 16,-54 0-16,1-1 15,-36 1 1,-52-18 0,35 0-16,17 17 15,-17-17-15,-1 0 0,19 0 0,-1 0 16</inkml:trace>
   <inkml:trace contextRef="#ctx0" brushRef="#br0" timeOffset="54950.4441">24359 16210 0,'0'35'16,"0"1"-16,0 52 15,0-35-15,18 53 16,0-71-16,17 35 16,-35-52-1,18 0-15,-1-18 0,1 0 16,-1 0-16,19-53 15,-36 35-15,17-17 16,-17 0-16,0-18 0,0 17 0,0 1 16,0 0-16,0 0 15,0 17-15,-17-17 16,-1 52 0,18 19-16,0-19 15,0 19-15</inkml:trace>
   <inkml:trace contextRef="#ctx0" brushRef="#br0" timeOffset="55340.4097">24694 16563 0,'-35'18'16,"35"17"-16,-17-18 0,17 19 15,17-1-15,1-17 0,-1 17 16,54 0 0,-36-17-16,18 0 0,-18-18 15,1 0-15,34-18 16,-34 0-16,-1-17 16,-35 0-16,-18-18 15,1 35-15,-1-17 16,-17 17-16,-54-17 15,54 35-15,-53 18 16,70-1-16,1 1 0,-1-1 16,18 19-16,18-19 15,-1 1-15,72 0 16,-54-18-16,18 0 16,-18 0-16,36 0 15,-36 0-15,-17 0 0</inkml:trace>
   <inkml:trace contextRef="#ctx0" brushRef="#br0" timeOffset="56624.0344">25647 16439 0,'0'18'16,"0"-36"-16,18 54 16,-18-19-16,53 1 15,-1 0-15,37-18 16,-54 0-16,18 0 15,35-18 1,-70 0-16</inkml:trace>
   <inkml:trace contextRef="#ctx0" brushRef="#br0" timeOffset="56784.9154">25788 16404 0,'0'71'0,"0"-142"0,18 212 16,-18-105-16,53 34 16,-36-52-16,54 17 15,-36-35-15</inkml:trace>
-  <inkml:trace contextRef="#ctx0" brushRef="#br0" timeOffset="57252.7254">26564 16140 0,'0'0'0,"-17"0"0,-1 0 15,0 17-15,1 1 0,-1 35 16,18 0-16,-18 17 16,18 1-16,18-18 0,35 70 15,-35-70-15,52 35 16,-35-52-16,36-1 15,-36-17-15,18-18 16,-18 0-16</inkml:trace>
+  <inkml:trace contextRef="#ctx0" brushRef="#br0" timeOffset="57252.7253">26564 16140 0,'0'0'0,"-17"0"0,-1 0 15,0 17-15,1 1 0,-1 35 16,18 0-16,-18 17 16,18 1-16,18-18 0,35 70 15,-35-70-15,52 35 16,-35-52-16,36-1 15,-36-17-15,18-18 16,-18 0-16</inkml:trace>
   <inkml:trace contextRef="#ctx0" brushRef="#br0" timeOffset="57470.4154">26970 16228 0,'0'35'0,"0"-70"0,0 88 15,18 53-15,-18-54 16,17 72 0,-17-54-16,0-17 0,18-17 15,-1 17-15,1-18 0,0 0 16,-1-35-16</inkml:trace>
   <inkml:trace contextRef="#ctx0" brushRef="#br0" timeOffset="57619.5705">27252 16598 0,'18'-17'16,"-1"17"-16,1 0 0,35-18 15,-35 18-15,-1-18 16</inkml:trace>
   <inkml:trace contextRef="#ctx0" brushRef="#br0" timeOffset="58075.1451">27605 17198 0,'0'0'16,"35"53"-16,-17-53 0,-1-18 15,-17-17 1,-17 0-16,17-1 0,-35-69 16,17 34-16,-35-88 15,35 71 1,1 0-16,-1-89 15,18 125-15,18-19 16,-1 71-16,19 18 16,-19-1-16,36 54 15,-53-18-15,35 35 16,-35-53-16,18 36 16,-18-54-16,0 19 15,0-19-15,0 1 16,18-18-16,17 35 15,0-17-15,18 0 16,-35-1-16,-1-17 16,1 18-16,-36-18 15,1 0-15,-36 0 16,18 0-16,-36 0 16,53 0-16,-17-35 15</inkml:trace>
@@ -717,7 +717,7 @@
   <inkml:trace contextRef="#ctx0" brushRef="#br0" timeOffset="29409.0634">10760 13847 0,'-36'0'0,"72"0"0,-89 0 16,18 0-16,17 17 16,0 1-16,1 17 0,-19 36 15,36-18-15,0 35 16,18-35-16,17-18 15,36 18-15,-36-35 16,53-1-16,-52-17 16,52 0-16,-35-17 15,-36-19-15,19 19 0,-1-54 16,-17 36-16,-36-36 16,0 36-1,-35-36-15,0 18 16,18 18-16,-18 18 15,18-1-15,-18 0 0,18 18 16,-1 0-16,1 18 0,-35 17 16,70-17-16,-18 52 15,18-34-15,35 17 16,-17-18-16,52 0 16,-34-17-16,52-1 15,-53-17-15,-17 0 16,17 0-16,0 0 15,-17-17-15,0 17 0,-1 0 16,1 0-16</inkml:trace>
   <inkml:trace contextRef="#ctx0" brushRef="#br0" timeOffset="29570.0678">11430 14164 0,'0'0'16,"0"71"-16,-18-36 0,18 0 16,0 18-1,0-18-15,0 1 0</inkml:trace>
   <inkml:trace contextRef="#ctx0" brushRef="#br0" timeOffset="33340.9514">3933 14111 0,'-17'18'16,"34"-18"62,1 17-63,0-17 1,-1 0 0,19 0-16,-19 0 15,1 0-15,17 0 16,1 0-1,-19 0-15,18 0 16,-17 0 0,0 0-16,17 0 15,-17 0-15,-1 0 0,36 0 16,-18 0-16,-17 0 16,17 0-16,1 0 15,-1 0-15,0 0 16,0 0-16,18 0 15,-17 0-15,17 0 16,-18 0-16,18 18 16,-36-18-16,36 0 15,-17 0-15,17 0 16,-18 0-16,-18 0 16,19 0-16,-19 0 15,36 0-15,0 0 16,-18 0-16,1 0 15,17 18 1,-36-18-16,54 0 16,-53 0-16,17 0 0,18 0 15,0 0 1,-36 0-16,19 0 0,-1 0 16,18 0-1,-36 0-15,19 0 0,-19 0 16,36 0-16,-35 0 15,-1 0-15,1 0 0,0 0 16,-1 0-16,1-18 0,0 18 16,17 0-16,-17 0 0,35 0 15,-36 0-15,1 0 16,17 0-16,-17 0 16,17-18-16,0 18 15,1-17-15,-19 17 16,36 0-16,-35 0 15,17 0-15,-17 0 16,-1 0-16,19 0 16,-19 0-16,1 0 0,-1 0 15,1 0-15,0 0 16,-1 0-16,1 0 16,0-18-16,-1 18 15,1 0-15,0 0 16,-1 0-1,1 0 1,0 0 0,-1 0-1,1 0 1,-1 0 0,1 18-1,0-18-15,-1 0 16,1 0-1,0 0 1,-1 0 15,-17-18 94,-17 18-109,-1 0 0</inkml:trace>
-  <inkml:trace contextRef="#ctx0" brushRef="#br0" timeOffset="34308.2412">6685 14111 0,'0'18'16,"18"-18"-16,-1 0 0,36 17 15,-17-17 1,87 18-16,-70 0 16,0-18-16,17 0 0,54 17 15,17-17 1,-70 18-16,70-18 16,-71 0-16,36 0 15,-53 0-15,0 0 16,0 0-16,-35 0 15,17 0-15,-18 0 16,-17 18 0,-17-18-1</inkml:trace>
+  <inkml:trace contextRef="#ctx0" brushRef="#br0" timeOffset="34308.2411">6685 14111 0,'0'18'16,"18"-18"-16,-1 0 0,36 17 15,-17-17 1,87 18-16,-70 0 16,0-18-16,17 0 0,54 17 15,17-17 1,-70 18-16,70-18 16,-71 0-16,36 0 15,-53 0-15,0 0 16,0 0-16,-35 0 15,17 0-15,-18 0 16,-17 18 0,-17-18-1</inkml:trace>
   <inkml:trace contextRef="#ctx0" brushRef="#br0" timeOffset="40864.1025">9225 6350 0,'0'18'78,"0"-1"-78,-17 36 15,-1-35-15,0 35 16,18-18-16,-17 18 16,17-18-1,0 1-15,0 16 16,17-34-16,-17 0 0,36 17 15,-19-35 1,1 18-16,17-1 16,0-17-16,1 0 15,-19 18-15,19-18 16,-19 0-16,1 0 16</inkml:trace>
   <inkml:trace contextRef="#ctx0" brushRef="#br0" timeOffset="41115.32">9454 6703 0,'18'0'31,"0"17"-31,-1 1 15,1-18-15,-18 18 0,18-1 16,-18 36 0,0-35-16,0 35 15,0-18-15,-18-17 16,0-1-16,-17 1 16,17-18-1,1 0-15</inkml:trace>
   <inkml:trace contextRef="#ctx0" brushRef="#br0" timeOffset="41686.9335">9225 5556 0,'-17'0'15,"-1"36"1,0-19-16,1 1 16,-1-1-16,0 19 0,18-19 0,0 36 15,0-17 1,0-19-16,18 1 0,0-1 15,17 1-15,0-18 16,0 0-16,1 0 0,17 0 16,-18-18-16,-17 1 0,-1 17 15</inkml:trace>
@@ -753,7 +753,7 @@
   <inkml:trace contextRef="#ctx0" brushRef="#br0" timeOffset="83352.6722">5398 16616 0,'0'-35'16,"0"17"-16,-18 0 15,0 1-15,-17-1 16,17 18-16,-17 18 16,-18-1-1,35 19-15,1-1 16,17 0-16,-18 0 15,18-17-15,35 35 16,-17-53-16,17 18 16,1-18-16,17-18 15,-36 0-15,36-17 16,-53 17-16,18-35 16,-18 36-16,0-1 15,-18 1-15,18-1 0,-17 0 16,-1 18-16,18 18 15,-18 35 1,18-18-16,18 53 16,0-52-16,-1 17 15,1 17-15,-1-35 16,19 1-16,-19-19 16,19 1-16</inkml:trace>
   <inkml:trace contextRef="#ctx0" brushRef="#br0" timeOffset="83762.7674">5609 16598 0,'0'-17'0,"0"34"0,-17-34 15,17 34 1,17 36-1,1 0-15,-1-18 0,1 1 16,0-1-16,17 0 0,-17 0 0,-1 1 16,1-1-1,-18-17-15,0-1 0,-18 1 16,-17 0 0,0-18-16,-1-18 15,1 0 1,35 1-16,0-19 0,18 19 15,17-54-15,-17 54 16,35-54-16,-36 36 16,19-18-16,-19 17 15,-17 1-15,0 18 16,-17-1-16,-1 18 16,0 0-16,-17 0 15,35 18 1,0-1-16,18-17 15</inkml:trace>
   <inkml:trace contextRef="#ctx0" brushRef="#br0" timeOffset="83952.1789">5997 16722 0,'18'35'0,"-36"-70"0,54 105 16,-1-34-16,-18-19 16,19 1-16,-19-1 15,19 1-15,-19-18 0</inkml:trace>
-  <inkml:trace contextRef="#ctx0" brushRef="#br0" timeOffset="84108.9965">6191 16757 0,'-35'35'15,"17"-17"-15,18 17 0,-35 18 16,35-18-16,-18-17 16,18 35-16,0-35 15</inkml:trace>
+  <inkml:trace contextRef="#ctx0" brushRef="#br0" timeOffset="84108.9964">6191 16757 0,'-35'35'15,"17"-17"-15,18 17 0,-35 18 16,35-18-16,-18-17 16,18 35-16,0-35 15</inkml:trace>
   <inkml:trace contextRef="#ctx0" brushRef="#br0" timeOffset="84453.4285">6491 16598 0,'-35'53'15,"70"-106"-15,-88 141 0,36-52 0,17-1 16,0 36-16,0-36 16,52 0-1,-16-35-15,17 18 16,-18-36-16,-17 0 0,35-34 16,-36-19-1,-34 18 1,-36 18-1,0-1-15,35 19 16,-35 17 0,35 0-16,1 0 0,34 35 15,1-35-15,0 18 16</inkml:trace>
   <inkml:trace contextRef="#ctx0" brushRef="#br0" timeOffset="84580.7156">6826 16722 0,'18'0'15,"-36"0"1</inkml:trace>
   <inkml:trace contextRef="#ctx0" brushRef="#br0" timeOffset="85165.6222">7073 16757 0,'0'0'0,"-17"-18"15,-1 18 1,0 18 0,18 17-1,0 1-15,0-19 16,18 18-16,0-17 0,-1 0 15,36 17 1,-35-35-16,35 0 16,-36 0-16,19-18 15,-36 1-15,17 17 0,-17-18 16,0 0-16,0-17 0,-35-18 16,17 36-16,-35-19 15,36 19 1,-19-19-16,19 36 15,-1-17 1,36 17-16</inkml:trace>
@@ -762,7 +762,7 @@
   <inkml:trace contextRef="#ctx0" brushRef="#br0" timeOffset="86020.7611">8043 16722 0,'-17'35'0,"34"-70"0,-52 105 15,17-34-15,1-19 16,17 1-16,-18-1 0,18 1 0,0 0 15</inkml:trace>
   <inkml:trace contextRef="#ctx0" brushRef="#br0" timeOffset="86660.8939">8520 16616 0,'0'0'0,"-18"0"0,0 0 16,-17 17-16,17 1 15,-17 70-15,35-52 16,0 17-16,18 52 16,-1-69-16,54 17 15,-18-36-15,53-17 16,-53-17-16,70-19 16,-70 1-16,18-53 15,-54 53-15,1-54 16,-18 54-1,-71-36-15,36 36 0,-18 18 16,-17-1-16,17 0 16,-53 18-16,53 18 15,-18 17-15,54-17 16,17 52 0,17-52-16,54 35 15,-18-35-15,53 17 16,-71-35-16,71 18 15,-53-18-15,17 0 16,-35 0-16</inkml:trace>
   <inkml:trace contextRef="#ctx0" brushRef="#br0" timeOffset="86800.1817">9225 16880 0,'0'0'15,"0"53"-15,0-35 0,0 0 16,0-1-16,18 1 0,-18 0 16</inkml:trace>
-  <inkml:trace contextRef="#ctx0" brushRef="#br0" timeOffset="87144.9458">9860 16775 0,'18'17'16,"-36"-34"-16,53 34 0,18-17 16,0 0-16,-17 0 0,16 0 15,-16 0-15,34 0 16,-34 0-16,16 0 15</inkml:trace>
+  <inkml:trace contextRef="#ctx0" brushRef="#br0" timeOffset="87144.9457">9860 16775 0,'18'17'16,"-36"-34"-16,53 34 0,18-17 16,0 0-16,-17 0 0,16 0 15,-16 0-15,34 0 16,-34 0-16,16 0 15</inkml:trace>
   <inkml:trace contextRef="#ctx0" brushRef="#br0" timeOffset="87289.8608">10142 16722 0,'0'0'15,"0"53"-15,0-18 0,18 35 16,0-17-1,-1 18-15,1-53 16,35 34-16</inkml:trace>
   <inkml:trace contextRef="#ctx0" brushRef="#br0" timeOffset="87781.4761">10795 16669 0,'0'0'0,"-18"70"0,1-17 15,17 53-15,0-71 16,0 1-16,17 17 0,19-36 15,-19 1-15,19-18 16,16 0-16,37-18 16,-54 1-16,36-36 15,-54 35-15,1-53 16,-18 19-16,0 16 0,-18 19 16,-52-54-1,34 53-15,1 1 0,0 17 16,-1 0-16,1 0 0,0 35 15,35-17-15,0-1 16</inkml:trace>
   <inkml:trace contextRef="#ctx0" brushRef="#br0" timeOffset="87923.1511">11430 16898 0,'0'18'16,"-18"-18"-16,1 0 16</inkml:trace>
@@ -776,12 +776,12 @@
   <inkml:trace contextRef="#ctx0" brushRef="#br0" timeOffset="90853.6538">5274 17992 0,'0'17'16</inkml:trace>
   <inkml:trace contextRef="#ctx0" brushRef="#br0" timeOffset="91322.3252">5609 17868 0,'-17'0'16,"34"0"-16,-52 0 0,17 0 0,1 18 15,17-1-15,-18 19 16,18-1-16,0 0 15,0 1-15,18-19 0,17 36 16,-17-35-16,17-1 16,18 1-1,-18-18-15,-17 0 0,52-35 16,-52 17-16,-1 1 16,1-19-16,0 1 0,-18-18 15,-18 18-15,-17-18 16,17 35-16,1-17 15,-36 0 1,17 35-16,-17 0 16,36 0-16,-18 17 15,-1 19-15</inkml:trace>
   <inkml:trace contextRef="#ctx0" brushRef="#br0" timeOffset="104907.4513">6262 17709 0,'0'-17'0,"0"34"47,17 36-32,-17 0 1,18 35-16,-18-35 16,0 0-16,18 0 15,-18 0-15,17 18 16,-17-54-16,0 1 0,18 0 15,-18-36-15,18 18 16</inkml:trace>
-  <inkml:trace contextRef="#ctx0" brushRef="#br0" timeOffset="105380.0461">6756 17868 0,'0'0'15,"0"-17"-15,-18-1 0,18 0 16,-18 1-16,1-1 16,-18 0-1,17 18-15,0 0 16,1 18-16,-19 17 15,19 1-15,-1 34 16,18-35-16,0 36 16,0-53-16,18-1 0,-1 1 15,19-18-15,17 0 16,-36-18-16,18 1 16,-17-19-16,0 19 15,17-36-15,-35 17 16,0-16-16,0 34 15,-18-17-15,-17 35 16,17 17 0,18 19-1,0-1-15,0 71 16,0-71-16,36 53 16,-36-70-16,17 17 0,1-17 15,0 17-15,17-17 16,-17-18-16</inkml:trace>
+  <inkml:trace contextRef="#ctx0" brushRef="#br0" timeOffset="105380.046">6756 17868 0,'0'0'15,"0"-17"-15,-18-1 0,18 0 16,-18 1-16,1-1 16,-18 0-1,17 18-15,0 0 16,1 18-16,-19 17 15,19 1-15,-1 34 16,18-35-16,0 36 16,0-53-16,18-1 0,-1 1 15,19-18-15,17 0 16,-36-18-16,18 1 16,-17-19-16,0 19 15,17-36-15,-35 17 16,0-16-16,0 34 15,-18-17-15,-17 35 16,17 17 0,18 19-1,0-1-15,0 71 16,0-71-16,36 53 16,-36-70-16,17 17 0,1-17 15,0 17-15,17-17 16,-17-18-16</inkml:trace>
   <inkml:trace contextRef="#ctx0" brushRef="#br0" timeOffset="105691.8312">7091 17727 0,'0'18'0,"-18"52"15,1-17-15,17 53 16,0-53-16,17 0 16,1 35-16,17-53 15,18 18-15,-35-53 16,35 0-16,-36 0 16,1 0-16,0-17 0,-18-1 15,0 0-15,-18 1 16,0-19-16,-35 1 15,18 18-15,-18 17 16,35-18-16,1 36 16</inkml:trace>
   <inkml:trace contextRef="#ctx0" brushRef="#br0" timeOffset="106458.0974">7814 17815 0,'-35'0'16,"70"0"-16,-88 18 0,18 52 15,17-34-15,18 17 0,0-18 16,0 0-16,18 1 0,-1-1 16,1 0-16,17-17 15,54-1-15,-36-17 16,17-17-16,-17-1 15,0-17-15,-35 0 16,-1-36-16,-17 36 16,-35-36-1,0 36-15,-1 0 16,1-1-16,-71 19 0,71-1 16,-53 36-16,52 17 15,1 18-15,35-18 16,53 18-1,-18-18-15,18-17 0,53 17 16,-35-35-16,17 18 16,-53-18-16,0 0 15,18 0 1,-53-18-16</inkml:trace>
-  <inkml:trace contextRef="#ctx0" brushRef="#br0" timeOffset="106658.7368">8467 18080 0,'0'53'15,"0"-106"-15,0 123 0,17-34 16,-17-19-16,0 19 0,18-19 15,-18 1-15,18 0 0,-18-1 16,17-17-16</inkml:trace>
+  <inkml:trace contextRef="#ctx0" brushRef="#br0" timeOffset="106658.7367">8467 18080 0,'0'53'15,"0"-106"-15,0 123 0,17-34 16,-17-19-16,0 19 0,18-19 15,-18 1-15,18 0 0,-18-1 16,17-17-16</inkml:trace>
   <inkml:trace contextRef="#ctx0" brushRef="#br0" timeOffset="107058.495">9331 17956 0,'0'53'16,"18"-35"-16,17 0 0,35-1 15,-17-17-15,36 0 16,-37 0 0,19 0-1,-53 0-15</inkml:trace>
-  <inkml:trace contextRef="#ctx0" brushRef="#br0" timeOffset="107198.7134">9543 17956 0,'0'0'16,"0"106"-16,0-70 0,0 16 0,17 19 15,1-36-15</inkml:trace>
+  <inkml:trace contextRef="#ctx0" brushRef="#br0" timeOffset="107198.7133">9543 17956 0,'0'0'16,"0"106"-16,0-70 0,0 16 0,17 19 15,1-36-15</inkml:trace>
   <inkml:trace contextRef="#ctx0" brushRef="#br0" timeOffset="107532.8209">10054 17956 0,'0'0'16,"-53"89"-16,36-1 15,17-53-15,35 18 16,0-35-16,36-1 15,-18-17-15,35-17 16,-53-19-16,18-17 16,-53 36-16,0-36 15,-18 35 1,-35-35-16,18 18 16,-35-18-16,34 35 15,1 1-15,-18 17 16,36 17-16,34 36 15,1-35 1,17 0-16</inkml:trace>
   <inkml:trace contextRef="#ctx0" brushRef="#br0" timeOffset="107661.04">10548 18027 0,'0'0'0,"-18"0"0,1 18 15</inkml:trace>
   <inkml:trace contextRef="#ctx0" brushRef="#br0" timeOffset="107976.8796">10760 18027 0,'0'0'0,"-36"71"0,36-36 16,0 18-16,18 0 15,0-36-15,52 1 16,-34 0-16,52-36 16,-53 0-16,18-17 15,-35 0-15,-18-18 16,0 35-16,-18 1 15,-35-36-15,18 35 16,-36-17-16,36 17 16,0 0-16,17 1 0,-17 17 15,35-18 1,0 36-16,17-18 16,1 17-16,0-17 15</inkml:trace>
@@ -791,7 +791,7 @@
   <inkml:trace contextRef="#ctx0" brushRef="#br0" timeOffset="113228.4282">7761 18627 0,'-18'0'16,"18"17"46,18-17-46,35 0 15,-35 0-31,52 0 16,-34 0-16,16 0 0,1 18 15,53 0-15,-53-18 16,-18 17-16,54-17 16,-72 18-16,36-18 15,-71 0 1,-17 0 0,18 0-1</inkml:trace>
   <inkml:trace contextRef="#ctx0" brushRef="#br0" timeOffset="114099.9777">11942 18697 0,'-18'0'0,"36"0"31,34 0-15,1 18-16,0-18 0,88 18 16,-70-18-16,105 17 15,-105-17-15,52 0 16,-87 0-16,17-17 16</inkml:trace>
   <inkml:trace contextRef="#ctx0" brushRef="#br0" timeOffset="137290.1134">17057 11042 0,'0'-18'0,"0"1"15,0-1 1,0 0-16,0 1 16,0-1-1,-18 18 1,18-18 0,0 36 46,0 0-46,0-1-16,0 36 15,0-35-15,0 35 16,0-18-16,0 0 0,0 1 16,0 34-1,18 1-15,-18-36 16,0 0-16,0 18 0,17-17 15,-17 52-15,18-35 16,-18 0-16,18 35 16,-18-35-16,17 53 15,-17-54-15,18 1 0,-18 0 16,18 71 0,-18-71-16,17 70 15,-17-52-15,0 52 16,18-52-16,-18-18 15,0 17-15,18 71 16,-18-70-16,0-1 0,0 89 16,0-88-16,17 17 15,-17 71-15,0-71 16,0-18-16,0 107 16,0-89-16,0 0 0,0 0 15,0 18-15,-17 88 16,17-106-16,0 18 15,0 0-15,0 88 16,0 0 0,0-88-16,0 88 0,0-106 15,0 106 1,0-106-16,0 89 16,0-89-16,0 88 15,0-87-15,0-1 0,0 106 16,0-106-16,0 88 15,0-105 1,0 17-16,0 0 0,0 71 16,0-71-16,0 89 15,17-71-15,-17 52 16,18-87-16,-18-1 16,17 36-16,-17-53 15,0 0-15,18 18 16,-18-54-16,0 36 15,18-35-15,-18-1 16,0-34-16</inkml:trace>
-  <inkml:trace contextRef="#ctx0" brushRef="#br0" timeOffset="143168.359">9631 9578 0,'0'0'0,"-18"0"0,18 18 15,-17-18 1,17 17 0,0 1-16,17-1 15,1-17-15,17 18 16,-17 0 0,17-18-16,0 17 0,54-17 15,-54 0-15,18 0 0,0 0 16,17 0-16,54 0 15,-54-17-15,71 17 16,-70 0-16,-1 0 16,1-18-16,17 18 0,71-18 15,-71 1-15,0-1 16,106-17 0,-105 17-16,69 1 15,-105 17-15,18 0 0,-18 0 16,0 0-16,0 0 0,-1 17 15,-16-17-15,17 0 0,-18 18 16,35 0 0,-34-18-16,-19 17 0,36 1 15,-35-18-15,0 17 16,17 19-16,-18-19 16,1 1-16,0 0 15,-1 17-15,1-17 16,-18-1-16,0 1 15,0 0 1,0-36 15,0 0-15,0 1-16,0-19 16,0 19-1,18-1 1,-18 0-16,17 18 15,1-17-15,0 17 16,-1 0-16,1 0 16,0 0-1,-1 0-15,1 0 0,35 17 16,-36-17-16,19 0 16,-1 0-16,0 18 15,-17-18 1,35 18-16,-36-18 15,36 0-15,-35 0 16,0 0-16,-1 0 16,18 0-16,-17 0 0,35 0 15,-35 0-15,35 0 16,-18 0-16,-17 0 16,34 0-16,-34 0 15,17 0-15,18 0 16,0 0-1,-35 0-15,17 0 16,-17 0-16,-1 0 0,19 17 16,-1-17-16,-17 0 15,17 18-15,0-18 16,0 0-16,-17 0 16,35 18-16,-35-18 15,17 0 1,0 0-16,0-18 15,-17 18-15,17 0 16,-17 0-16,0 0 16,-1 0-16,1 0 15,0-18 17,-18 1-32,0-1 15,17 0-15,-17 1 16,0-1-16,0-35 15,-17 36-15,-19-1 16,19 0 0</inkml:trace>
+  <inkml:trace contextRef="#ctx0" brushRef="#br0" timeOffset="143168.3589">9631 9578 0,'0'0'0,"-18"0"0,18 18 15,-17-18 1,17 17 0,0 1-16,17-1 15,1-17-15,17 18 16,-17 0 0,17-18-16,0 17 0,54-17 15,-54 0-15,18 0 0,0 0 16,17 0-16,54 0 15,-54-17-15,71 17 16,-70 0-16,-1 0 16,1-18-16,17 18 0,71-18 15,-71 1-15,0-1 16,106-17 0,-105 17-16,69 1 15,-105 17-15,18 0 0,-18 0 16,0 0-16,0 0 0,-1 17 15,-16-17-15,17 0 0,-18 18 16,35 0 0,-34-18-16,-19 17 0,36 1 15,-35-18-15,0 17 16,17 19-16,-18-19 16,1 1-16,0 0 15,-1 17-15,1-17 16,-18-1-16,0 1 15,0 0 1,0-36 15,0 0-15,0 1-16,0-19 16,0 19-1,18-1 1,-18 0-16,17 18 15,1-17-15,0 17 16,-1 0-16,1 0 16,0 0-1,-1 0-15,1 0 0,35 17 16,-36-17-16,19 0 16,-1 0-16,0 18 15,-17-18 1,35 18-16,-36-18 15,36 0-15,-35 0 16,0 0-16,-1 0 16,18 0-16,-17 0 0,35 0 15,-35 0-15,35 0 16,-18 0-16,-17 0 16,34 0-16,-34 0 15,17 0-15,18 0 16,0 0-1,-35 0-15,17 0 16,-17 0-16,-1 0 0,19 17 16,-1-17-16,-17 0 15,17 18-15,0-18 16,0 0-16,-17 0 16,35 18-16,-35-18 15,17 0 1,0 0-16,0-18 15,-17 18-15,17 0 16,-17 0-16,0 0 16,-1 0-16,1 0 15,0-18 17,-18 1-32,0-1 15,17 0-15,-17 1 16,0-1-16,0-35 15,-17 36-15,-19-1 16,19 0 0</inkml:trace>
   <inkml:trace contextRef="#ctx0" brushRef="#br0" timeOffset="146027.4771">18521 11236 0,'-18'-53'15,"18"35"1,0 1-16,0-1 16,18 1-16,-1 34 15,1 54 1,0-36-16,-1 18 16,1 17-16,0-17 0,-1 18 0,1-1 15,0 1-15,-18-18 16,35 53-16,-35-89 15,35 19-15,-35-19 16,18-17-16,-1-17 16,-17-36-1,0 18-15,0-54 16,0 36-16,0-52 16,0 52-16,-17-36 15,-1 54-15,18 18 16,0-1-16,0 53 31</inkml:trace>
   <inkml:trace contextRef="#ctx0" brushRef="#br0" timeOffset="146372.3083">18979 11677 0,'0'18'15,"18"-18"1,0 0-16,35 0 16,-36 0-16,1-18 0,17 18 15,0 0-15,-17-18 16,-36 18 0,-17 0-1,18 0 1</inkml:trace>
   <inkml:trace contextRef="#ctx0" brushRef="#br0" timeOffset="146649.2913">19068 11536 0,'0'17'16,"17"19"0,-17-19-16,0 36 15,0-17-15,0-19 0,0 36 16,0-18-16,36-17 16,-19 0-1,36-18-15,-35 0 16,35 0-16,-36 0 15,1 0-15</inkml:trace>
@@ -804,7 +804,7 @@
   <inkml:trace contextRef="#ctx0" brushRef="#br0" timeOffset="162087.7007">18062 14235 0,'18'-18'15,"17"18"1,0-18-16,54 18 16,-36 0-16,17 0 15,-52 0-15,35-17 16,-36 17-16</inkml:trace>
   <inkml:trace contextRef="#ctx0" brushRef="#br0" timeOffset="162287.4088">18292 13952 0,'-18'71'16,"0"-18"-16,18 0 16,-17 88-16,-1-71 15,18 1-15,18 0 0,-1-1 16,19-35-16,-1-17 15,-18-18-15,72-18 16,-72 1-16</inkml:trace>
   <inkml:trace contextRef="#ctx0" brushRef="#br0" timeOffset="162455.7946">18627 14217 0,'35'0'16,"-17"0"-16,17 0 15,-17 18-15,17-18 16</inkml:trace>
-  <inkml:trace contextRef="#ctx0" brushRef="#br0" timeOffset="162571.4695">18644 14340 0,'18'18'0,"17"0"16,-17-18-16,52-18 15,-34 18-15,-1-18 16</inkml:trace>
+  <inkml:trace contextRef="#ctx0" brushRef="#br0" timeOffset="162571.4694">18644 14340 0,'18'18'0,"17"0"16,-17-18-16,52-18 15,-34 18-15,-1-18 16</inkml:trace>
   <inkml:trace contextRef="#ctx0" brushRef="#br0" timeOffset="162882.1852">19032 14058 0,'36'18'16,"-1"-18"-16,-17 17 15,17 1-15,-18 0 0,19 17 16,-19-17-16,-17-1 0,18 19 15,-18 17-15,-18-36 16,1 18-16,-1 1 16,18-19-16,-18 1 0,18 0 15,-17-1-15,17 1 16,0 0-16,53-1 16,-36-17-16,54 0 15,-36 0-15,18 0 16,-35 0-16,17-17 0</inkml:trace>
   <inkml:trace contextRef="#ctx0" brushRef="#br0" timeOffset="163073.0412">19773 14146 0,'18'18'16,"-18"0"-1,0-1-15</inkml:trace>
   <inkml:trace contextRef="#ctx0" brushRef="#br0" timeOffset="163188.3058">19773 14429 0,'18'17'16,"-36"-34"-16,36 52 0</inkml:trace>
@@ -819,18 +819,18 @@
   <inkml:trace contextRef="#ctx0" brushRef="#br0" timeOffset="174510.2686">25241 13829 0,'0'18'15,"18"52"1,-18-35-16,18 18 16,-18 18-16,17-18 0,-17 70 15,18-70 1,-18 35-16,0-52 16,0 34-16,0-52 15,0 17-15,17-35 16,1 0-1</inkml:trace>
   <inkml:trace contextRef="#ctx0" brushRef="#br0" timeOffset="174660.7278">25594 14270 0,'0'0'16,"35"18"-16,-17-18 0,0 0 15,-1 0-15,1 0 0,35 0 16,-36 0-16</inkml:trace>
   <inkml:trace contextRef="#ctx0" brushRef="#br0" timeOffset="175060.2806">26335 14041 0,'0'0'16,"-35"0"-16,17 17 0,0 1 15,-17-1-15,17 19 0,18-19 16,-17 19-16,17-1 0,0 0 15,17 1-15,1-19 0,0 18 16,17-17-16,0 0 0,1-18 16,-1 0-16,0 0 15,36-36-15,-36 19 16,0-36-16,-35 35 16,0-52-16,0 34 15,-53 1 1,36 0-16,-36 17 15,17 18-15,19-17 16,-1 17-16,18 17 0,-17 1 16,34 17-16,1-17 15</inkml:trace>
-  <inkml:trace contextRef="#ctx0" brushRef="#br0" timeOffset="175267.959">26793 14164 0,'0'18'0,"0"-1"31,18-17-16</inkml:trace>
+  <inkml:trace contextRef="#ctx0" brushRef="#br0" timeOffset="175267.9589">26793 14164 0,'0'18'0,"0"-1"31,18-17-16</inkml:trace>
   <inkml:trace contextRef="#ctx0" brushRef="#br0" timeOffset="175779.9303">27199 14058 0,'0'0'16,"18"-35"-16,-18 17 0,0 1 16,-18-1-16,-17 18 15,17 0-15,1 0 16,-36 0-16,17 18 15,1 17-15,18-17 16,-1 34-16,18-34 16,18 35-16,-18-35 15,17-1-15,18-17 16,1 18-16,-1-18 16,-17 0-16,-1-18 0,1 18 15,17-35-15,-35 17 16,18-35-1,-1 18-15,-17 18 16,0-19-16,0 19 16,0 34-1,0 19 1,0-1-16,0-18 16,0 19-16,0-1 0,18 0 0,-18 18 15,18-17 1,-1 16-16,1-34 15,17 0-15,-17-1 16</inkml:trace>
   <inkml:trace contextRef="#ctx0" brushRef="#br0" timeOffset="176206.7337">27464 14005 0,'0'0'15,"0"-35"-15,0 17 0,-18 36 16,18 17 0,0 1-16,0 34 15,18-35-15,-1 18 16,1-17-16,0 17 16,-1-18-1,1 0-15,-18-17 16,0-1-16,-18 19 15,1-36-15,17 17 16,-36-17-16,1 0 0,0-17 16,17 17-16,18-18 15,-17-17-15,17 17 0,0 0 0,17-34 16,1 16 0,17-17-16,0 36 15,18-19-15,0 1 16,-35 17-16,0 18 15,-18-17-15,0-1 16,-18 1 0,0 17-16,-35-18 15,36 18-15,-1 0 0,-17-18 16</inkml:trace>
-  <inkml:trace contextRef="#ctx0" brushRef="#br0" timeOffset="176685.8334">25982 13776 0,'0'-18'16,"-18"18"-16,18 18 16,0 53-16,0-19 15,0 54-15,0-35 16,36 35-1,-19-36-15,19-34 0,17 69 16,-18-69-16,53 17 16,-35-18-16,0-35 15</inkml:trace>
+  <inkml:trace contextRef="#ctx0" brushRef="#br0" timeOffset="176685.8333">25982 13776 0,'0'-18'16,"-18"18"-16,18 18 16,0 53-16,0-19 15,0 54-15,0-35 16,36 35-1,-19-36-15,19-34 0,17 69 16,-18-69-16,53 17 16,-35-18-16,0-35 15</inkml:trace>
   <inkml:trace contextRef="#ctx0" brushRef="#br0" timeOffset="177202.8622">27675 13723 0,'0'0'0,"18"0"15,0 0-15,-1 0 0,1 18 16,35 52-16,-18-17 16,0 0-16,-17-18 0,17 18 15,-17 0-15,17 53 16,-17-53-16,-18 35 15,0-53-15,-18 1 16,1-19-16,-1 1 0,-17 0 16,17-18-16,-17 0 15,17-18-15,18 0 16</inkml:trace>
   <inkml:trace contextRef="#ctx0" brushRef="#br0" timeOffset="177552.4769">27940 13600 0,'18'0'0,"17"0"15,-17 17-15,17-17 16,-18 18-16,1 0 0,17-1 16,-35 1-16,18-18 15,-18 17-15,0 19 16,-18-1 0,1-35-16,17 18 0,-18-18 15,18 17-15,0 1 16,18-18-1,-1 0-15,36 0 16,-35 0-16,17-18 16,-17 18-16</inkml:trace>
   <inkml:trace contextRef="#ctx0" brushRef="#br0" timeOffset="178882.4338">28716 14093 0,'18'0'15,"35"0"1,-36 0-16,72-17 16,-54 17-16,0 0 15,0 0-15,-17 0 0,0 0 16</inkml:trace>
   <inkml:trace contextRef="#ctx0" brushRef="#br0" timeOffset="179021.445">28734 14288 0,'0'0'15,"70"0"-15,-34 0 0,17-18 16,35 18-1,-71-18-15,19 18 0</inkml:trace>
-  <inkml:trace contextRef="#ctx0" brushRef="#br0" timeOffset="179957.4995">29880 14023 0,'-17'0'16,"-1"0"-16,0 0 0,-17 35 15,0 0-15,17 18 16,-17 36-16,35-54 16,18 35-16,-1-34 15,36-19-15,-18 1 16,54-36 0,-37-17-16,19-18 15,-18-35-15,-35 53 16,-18-1-16,0 1 0,-18 0 15,-35-18-15,35 35 16,-35 18 0,36 0-16,-18 36 15,17-1-15,36 35 16,-1-34-16</inkml:trace>
+  <inkml:trace contextRef="#ctx0" brushRef="#br0" timeOffset="179957.4994">29880 14023 0,'-17'0'16,"-1"0"-16,0 0 0,-17 35 15,0 0-15,17 18 16,-17 36-16,35-54 16,18 35-16,-1-34 15,36-19-15,-18 1 16,54-36 0,-37-17-16,19-18 15,-18-35-15,-35 53 16,-18-1-16,0 1 0,-18 0 15,-35-18-15,35 35 16,-35 18 0,36 0-16,-18 36 15,17-1-15,36 35 16,-1-34-16</inkml:trace>
   <inkml:trace contextRef="#ctx0" brushRef="#br0" timeOffset="180116.1889">30392 14305 0,'0'0'16,"17"0"-16,-17 18 0,18-18 16,-18 17-1,18-17-15</inkml:trace>
   <inkml:trace contextRef="#ctx0" brushRef="#br0" timeOffset="182091.0243">30921 14023 0,'-18'0'16,"1"18"-16,-19 17 15,36 0 1,-17-17-16,17 17 16,0 0-16,17 18 0,-17-35 15,36 17-15,-19-17 16,36-1 0,-35-17-16,17 0 0,-17 0 15,35-17-15,-36-1 16,1 1-16,-18-36 15,0 0 1,-18 17-16,18 19 0,-53-36 16,18 18-1,18 17-15,-1 18 0,0 0 16,18 18 0</inkml:trace>
-  <inkml:trace contextRef="#ctx0" brushRef="#br0" timeOffset="182624.9934">31380 14005 0,'0'-17'16,"0"-1"0,35 18-16,-17 0 15,17 0 1,-18 0-16,1 18 15,0-1-15,-18 1 16,0 17 0,0-17-16,-18 17 15,18-17-15,0-1 16,-18 1-16,18 17 16,0-17-16,0 0 0,0-1 15,36 19-15,-36-19 16,35 18-16,-17-17 15,-1 0-15,1-1 16,-18 1 0,-35-18-16,17 18 15,-17-18-15,-1 0 16,-16 0-16,34 0 16,-35-18-16,53 0 31</inkml:trace>
+  <inkml:trace contextRef="#ctx0" brushRef="#br0" timeOffset="182624.9933">31380 14005 0,'0'-17'16,"0"-1"0,35 18-16,-17 0 15,17 0 1,-18 0-16,1 18 15,0-1-15,-18 1 16,0 17 0,0-17-16,-18 17 15,18-17-15,0-1 16,-18 1-16,18 17 16,0-17-16,0 0 0,0-1 15,36 19-15,-36-19 16,35 18-16,-17-17 15,-1 0-15,1-1 16,-18 1 0,-35-18-16,17 18 15,-17-18-15,-1 0 16,-16 0-16,34 0 16,-35-18-16,53 0 31</inkml:trace>
   <inkml:trace contextRef="#ctx0" brushRef="#br0" timeOffset="183231.5575">32085 14041 0,'0'-18'0,"0"36"0,-17-36 0,-1 0 16,-17 1-16,17 17 15,0 0-15,-35 17 16,18 1-16,0 35 16,17-36-16,18 36 15,0-35-15,0 17 16,18-17-16,17 0 15,0-1 1,1-17-16,-1-17 16,0-1-16,-17 0 15,0-35-15,-18 36 16,0-1-16,0-17 16,17 17-16,-17 1 15,0 34 1,18 18-1,-18 1-15,0 34 16,0-17-16,17 35 16,-17-52-16,18 17 15,0 17-15,-18-52 0,17 35 16,-17-36 0</inkml:trace>
   <inkml:trace contextRef="#ctx0" brushRef="#br0" timeOffset="184010.6567">32685 14023 0,'18'-18'15,"-18"1"-15,17 17 0,-34 0 32,-19 53-17,1-1-15,-36 37 16,36-36-16,0 70 15,35-70-15,0 0 16,17 0-16,1-18 0,53 36 16,-36-54-16,53 1 15,-35-18-15,18-18 16,-54 1-16,1-36 16,-18 35-16,-71-35 15,1 36-15,-54-19 16,54 36-16</inkml:trace>
   <inkml:trace contextRef="#ctx0" brushRef="#br0" timeOffset="190060.9162">19562 15505 0,'0'17'31,"17"36"-31,18 35 16,-17-35-16,0 18 15,-1-18-15,1 0 0,17 35 16,-17-53-16,17 18 16,-17-53-16,-1 0 31,1-35-31,-18-1 16,18-52-16,-18 53 15,0-18-15,0 18 0,-18-18 16,18-35-16,-18 70 15,18-17 1,0 17-16,18 36 16,-18 17-1</inkml:trace>
@@ -843,12 +843,12 @@
   <inkml:trace contextRef="#ctx0" brushRef="#br0" timeOffset="193230.6528">20514 16880 0,'-35'0'16,"17"0"-16,0 0 0,1 0 16,-1 0-16,-17 18 15,35 0-15,-18-1 16,1 1-16,17 0 15,0-1-15,0 1 0,17 0 16,1-18-16,17 17 16,-17-34-16,17-1 15,-17 18-15,-1-18 16,1-35-16,-18 36 16,18-1-16,-18 0 15,0 1 1,-18 17-16,18 17 15,0 36 1,0-17-16,0-19 0,0 19 16,0 16-16,0-16 15,18-1 1,-18-17-16,17-1 0,-17 1 16,18-18-1</inkml:trace>
   <inkml:trace contextRef="#ctx0" brushRef="#br0" timeOffset="193519.5733">20761 16916 0,'0'17'16,"0"1"-16,-18 35 15,1-18-15,17 18 16,17 18-1,1-54-15,35 19 16,-35-19-16,-1-17 0,18 0 16,1 0-16,-19 0 15,-17-17-15,0-19 16,0 19-16,-17-1 0,-36-35 16,35 53-1,-52-35-15,52 35 16,-17-18-16,17 18 15</inkml:trace>
   <inkml:trace contextRef="#ctx0" brushRef="#br0" timeOffset="193876.0686">20867 16633 0,'0'-17'16,"0"34"-16,17-34 0,19-1 16,-1 18-1,0 0-15,36 0 16,-18 0-16,0 18 0,-18-18 16,0 0-16,18 17 15,-35-17-15,-36 18 16</inkml:trace>
-  <inkml:trace contextRef="#ctx0" brushRef="#br0" timeOffset="194776.9895">22472 16598 0,'18'18'15,"17"-18"-15,35 0 16,-34 0-16,52 0 15,-70 0-15,17 0 16</inkml:trace>
+  <inkml:trace contextRef="#ctx0" brushRef="#br0" timeOffset="194776.9894">22472 16598 0,'18'18'15,"17"-18"-15,35 0 16,-34 0-16,52 0 15,-70 0-15,17 0 16</inkml:trace>
   <inkml:trace contextRef="#ctx0" brushRef="#br0" timeOffset="194906.6465">22613 16898 0,'35'18'16,"-70"-36"-16,106 36 0,-54-18 0,36-18 15,-18 18-15,1-18 0,-1 1 16</inkml:trace>
   <inkml:trace contextRef="#ctx0" brushRef="#br0" timeOffset="195624.7003">24359 15857 0,'-17'-17'16,"-1"17"-16,0 0 0,1 35 16,-1-17-1,18 17-15,-18 0 0,18 0 16,0 1-16,36 17 16,-19-36-16,19 1 0,34 0 15,-34-1-15,16-34 16,-16 17-16,-19-36 15,-17 19 1,0-36-16,-17 17 16,-1 19-16,-35-36 15,18 35-15,0 1 0,17 17 16,0 0-16,1 0 16,17 17-16,17 19 15,19-19-15</inkml:trace>
   <inkml:trace contextRef="#ctx0" brushRef="#br0" timeOffset="195755.0067">24765 16104 0,'0'-17'0,"0"-1"15,0 0 1</inkml:trace>
   <inkml:trace contextRef="#ctx0" brushRef="#br0" timeOffset="196144.2536">25047 15946 0,'-17'0'0,"-1"0"15,0 17 1,18 1-16,0-1 16,0 19-16,0-1 0,0-17 0,36 52 15,17-34 1,-36-19-16,54 1 15,-36-18-15,36 0 16,-54-18-16,18-17 16,-17 17-16,-18-35 15,-18 18-15,-17-18 16,0 35-16,-18-17 16,35 35-1,1-17-15,-19 17 16,36 17-16,18 1 15</inkml:trace>
-  <inkml:trace contextRef="#ctx0" brushRef="#br0" timeOffset="196358.3512">25523 15857 0,'18'36'16,"-18"-1"-16,18 0 16,-18 18-16,17-18 0,-17 18 15,18-17-15,0 34 16,-1-35-16,19 1 16,-19-36-16,1 17 15</inkml:trace>
+  <inkml:trace contextRef="#ctx0" brushRef="#br0" timeOffset="196358.3511">25523 15857 0,'18'36'16,"-18"-1"-16,18 0 16,-18 18-16,17-18 0,-17 18 15,18-17-15,0 34 16,-1-35-16,19 1 16,-19-36-16,1 17 15</inkml:trace>
   <inkml:trace contextRef="#ctx0" brushRef="#br0" timeOffset="196745.5572">25841 15893 0,'-35'-18'15,"70"36"-15,-88-36 0,18 36 0,17-1 16,18 1-16,0 35 15,0-36-15,18 1 16,17 0-16,-17-1 0,-1 1 16,36-18-16,-17 0 15,-1-18-15,-18 18 16,1-35 0,-18 17-16,0 1 0,0-1 15,-18-17-15,18 17 16,-17 1-16,17 34 31,0 36-15,17-18-16,1 36 15,17 0 1,-17-36-16,-18-17 0,35 17 16,-35-18-16,0 1 15</inkml:trace>
   <inkml:trace contextRef="#ctx0" brushRef="#br0" timeOffset="197200.5421">26353 15822 0,'0'-18'15,"0"1"-15,-36 34 16,19 1-16,17 17 0,-18 1 16,0 69-1,18-69-15,0 17 0,18-18 0,0 18 16,35 0 0,-18-36-16,18 19 15,0-36-15,-36 0 16,-17-18-16,0-17 15,-17 17-15,-36-17 16,35 17 0,-52-17-16,52 17 15,0 18-15,-17-17 16</inkml:trace>
   <inkml:trace contextRef="#ctx0" brushRef="#br0" timeOffset="197834.3659">26864 15875 0,'0'-18'0,"0"36"0,-18-36 15,1 1 1,-1 17-16,0 0 0,1 17 16,-1 1-16,-17 35 15,35-35-15,0 17 16,0 18-16,0 17 16,35-17-16,0-17 15,-17-19-15,17 1 0,1-18 16,34 17-16,-34-17 15,-1-17-15,-18-1 16,19 1-16,-1-36 16,-35 17-16,0 19 0,0-19 15,-53-17-15,18 18 16,-36-18-16,36 36 16,0 17-16,-1 0 15,1 0-15,0 35 16,35 0-16,0-17 0,17 17 15,1 0-15,0 1 0,70 17 16,-53-36-16,53 19 16,-52-19-16,17 1 15,-18-18 1,0-18-16</inkml:trace>
@@ -856,11 +856,11 @@
   <inkml:trace contextRef="#ctx0" brushRef="#br0" timeOffset="198402.5883">27869 16069 0,'36'0'16,"-19"0"-16,54 0 15,-18-18-15,-18 18 16,18 0-16,-18-17 0,1 17 0,-1 0 15,0-18 1</inkml:trace>
   <inkml:trace contextRef="#ctx0" brushRef="#br0" timeOffset="198569.016">28063 15928 0,'0'0'15,"0"70"-15,0-17 0,18-17 16,0 17-16,-1-18 0,1-17 0,0 17 16,17-18-16,18 19 15,-35-36-15</inkml:trace>
   <inkml:trace contextRef="#ctx0" brushRef="#br0" timeOffset="198895.8797">28663 15910 0,'0'0'0,"-17"0"0,17 36 15,-18 16-15,18-16 16,18-1-16,17 18 15,0-35-15,0 17 0,1-35 16,34 35 0,-52-35-16,17 0 0,-17-17 15,-1-1-15,-17 0 16,-17-17-16,-1-18 16,-17 35-16,-18-52 15,18 52-15,-18-17 16,35 35-16</inkml:trace>
-  <inkml:trace contextRef="#ctx0" brushRef="#br0" timeOffset="199081.3894">29281 16104 0,'0'0'16,"0"-17"-16,0-1 31,0 0-15</inkml:trace>
+  <inkml:trace contextRef="#ctx0" brushRef="#br0" timeOffset="199081.3893">29281 16104 0,'0'0'16,"0"-17"-16,0-1 31,0 0-15</inkml:trace>
   <inkml:trace contextRef="#ctx0" brushRef="#br0" timeOffset="199881.9581">29475 15910 0,'-18'0'16,"-17"0"-1,17 18-15,18 0 16,-18 17-16,18-18 0,-17 36 15,17-17-15,17-19 0,1 1 16,35 0 0,-18-1-16,18-17 15,-18-17-15,1-1 16,-36 0-16,17 1 16,-17-1-16,-17-17 15,-1-1-15,0 19 16,1 17-16,-1-18 15</inkml:trace>
   <inkml:trace contextRef="#ctx0" brushRef="#br0" timeOffset="200132.2032">29827 15893 0,'0'0'16,"53"17"-16,-35 1 0,17 0 15,-35 17 1,18-18-16,-18 1 0,-18 0 16,1 17-16,-1-17 15,-17 17-15,35-17 16,0-1 0,0 1-16,17-18 0,19 0 0,-19 18 15,18-18-15,1 0 16,-1 0-16,0-18 0</inkml:trace>
   <inkml:trace contextRef="#ctx0" brushRef="#br0" timeOffset="200549.1047">30304 15875 0,'-36'0'0,"72"0"0,-89 0 16,17 18-16,36-1 15,0 19-15,0 34 16,18-35-16,17 36 16,1-36-16,-1-17 15,53 17-15,-53-35 16,54 18 0,-54-36-16,0 1 0,-17-1 15,-1 0-15,1-35 16,-18 18-16,-18-36 15,1 19-15,-19 16 0,1 1 16,0 0-16,-18-1 0,0 36 16,18 0-16,-18 0 15,18 18-15,17 0 0,-17 35 16,35-18-16,53 18 16,-18-36-16,53 36 15,-35-35-15,-18-18 16,1 18-16,-1-18 0,18 0 15,-36 0 1,1 0-16,-18-18 16,0 0-16</inkml:trace>
-  <inkml:trace contextRef="#ctx0" brushRef="#br0" timeOffset="200853.3534">30939 16193 0,'0'0'16,"53"17"-16,-36-17 0,1 18 16,-1-18-16,1 17 0,0 1 15,-18 0 1,0-1-1,-18 19-15,0-19 0,1 1 16,17 0 0,17-1-1,1-17-15,17 0 0,1 18 16,-1-18-16,0 0 16,-35 17-1</inkml:trace>
+  <inkml:trace contextRef="#ctx0" brushRef="#br0" timeOffset="200853.3533">30939 16193 0,'0'0'16,"53"17"-16,-36-17 0,1 18 16,-1-18-16,1 17 0,0 1 15,-18 0 1,0-1-1,-18 19-15,0-19 0,1 1 16,17 0 0,17-1-1,1-17-15,17 0 0,1 18 16,-1-18-16,0 0 16,-35 17-1</inkml:trace>
   <inkml:trace contextRef="#ctx0" brushRef="#br0" timeOffset="202217.5327">24800 16475 0,'18'0'31,"0"0"-31,34 0 16,-16-18-16,34 18 15,36 0 1,-53 0-16,0 0 0,70 0 16,-52-18-16,35 18 15,-71-17-15,36 17 16,-54 0-16,1 0 16</inkml:trace>
   <inkml:trace contextRef="#ctx0" brushRef="#br0" timeOffset="202817.8411">29016 16510 0,'0'0'15,"18"0"1,35 0-1,-18 0-15,18 0 0,0 0 16,17 0-16,-17 0 0,18 0 16,35 0-16,-71 0 15,-18 0-15</inkml:trace>
   <inkml:trace contextRef="#ctx0" brushRef="#br0" timeOffset="203619.2484">23989 16792 0,'0'0'15,"-18"0"-15,36 0 32,0 0-17,-1 0-15,54 0 16,-36 0-16,18 0 0,70 0 16,-34-17-16,105 17 15,-89 0-15,19-18 16,158 18-1,-141 0-15,177 0 16,-142-18-16,212 18 16,-194 0-16,0 0 0,18 0 15,211 18-15,-193-18 16,-19 18-16,248-1 16,-247 1-16,17 0 15,177 17-15,-195-18 0,195 1 16,-212-18-1,159 0-15,-177 0 16,142-18-16,-177 18 16,-18 0-16,-17 0 0,-18 0 15,53 0 1,-105 18-16,16-18 16,-34 18-16,-36-18 15,-17 17-15,-18-17 16</inkml:trace>
@@ -928,7 +928,7 @@
   <inkml:trace contextRef="#ctx0" brushRef="#br0" timeOffset="15438.615">6473 5574 0,'0'0'15,"-17"18"-15,-1-18 16,36 17 0,-1 1-1,1-18 1,0 0-16,-1-18 0,1 1 15,0-19 1,-18 19 0,-18-1-16,18 0 0,-18 18 15,1-17-15,-1 17 0,0 17 16,18 1 0,-17 17-16,17-17 15,17 0 1,1-1-16,17-17 15,-35-17-15,18 17 0,0-18 16,-18 0-16,-18 1 16,18-1-16,-35 18 15,17-18-15,0 18 0,1 0 16,-18 18-16,-1 0 16,19-1-16,17 1 15,0 0-15,53-18 16,-36 0-16,18-18 15,18-17-15,-35 35 16,0-18-16,-18 0 0,17 18 16,-34-17-1,-1 17-15,-17 0 16</inkml:trace>
   <inkml:trace contextRef="#ctx0" brushRef="#br0" timeOffset="16077.5764">6456 5627 0,'0'0'0,"0"-18"31,17 18-16,-17-17-15,0-1 0,18 0 16,-18-17-16,18-18 16,-1 18-1,1-36-15,-18 18 16,18 18-16,-1-36 0,36-34 16,-35 34-16,35-70 15,-18 70 1,18-52-16,-35 52 15,-1-70-15,-17 71 16,18-54-16,-18 71 16,0 18-16,0-18 0,0 36 15,18-19-15,-18 1 16,17 0-16,-17 17 16,18 0-16,-1-17 15,-17 17-15,18 1 0,-18-1 16,18 1-16,-18-1 15,0 0 1</inkml:trace>
   <inkml:trace contextRef="#ctx0" brushRef="#br0" timeOffset="16662.8901">6950 3810 0,'0'0'0,"0"-18"16,-18 1 0,0 34 31,18 1-47,0 0 15,0-1 1,-17-17 31,17-17-32,-18 17 1,18 17 0,0 1 15,0-36 16,-17 18-32,-1 0 1,0 0 0,18 18-1,0 0-15,18-18 16,0 17-16,-1-17 0,18-17 15,-17-1-15,0 0 16,-18 1 0,0-1-1,-18 18 1,0 0-16,1 0 16,17 18-1,17-18 16,1 17-31,0-17 16,-1 0 0</inkml:trace>
-  <inkml:trace contextRef="#ctx0" brushRef="#br0" timeOffset="17106.3295">6950 3828 0,'0'17'78,"0"1"-62,17 0-1,-17 17-15,0-18 16,0 19-16,18 17 15,-18-36-15,0 19 16,18 17-16,-18-18 0,0 18 0,17 53 16,-17-54-1,18 1-15,-18-17 0,18 17 16,-1 52-16,-17-69 16,18 17-16,-18 0 0,0-1 15,17-16-15,1 70 16,-18-54-16,18 37 15,-1-54-15,1 35 16,0-34-16,-18-1 16,17 36-16,1-36 15,0 35-15,-18-52 16,17 35 0,-17-35-16,18-1 15,0-17-15,-18-35 16</inkml:trace>
+  <inkml:trace contextRef="#ctx0" brushRef="#br0" timeOffset="17106.3294">6950 3828 0,'0'17'78,"0"1"-62,17 0-1,-17 17-15,0-18 16,0 19-16,18 17 15,-18-36-15,0 19 16,18 17-16,-18-18 0,0 18 0,17 53 16,-17-54-1,18 1-15,-18-17 0,18 17 16,-1 52-16,-17-69 16,18 17-16,-18 0 0,0-1 15,17-16-15,1 70 16,-18-54-16,18 37 15,-1-54-15,1 35 16,0-34-16,-18-1 16,17 36-16,1-36 15,0 35-15,-18-52 16,17 35 0,-17-35-16,18-1 15,0-17-15,-18-35 16</inkml:trace>
   <inkml:trace contextRef="#ctx0" brushRef="#br0" timeOffset="18624.8761">7303 5574 0,'17'0'0,"1"-18"78,-1-35-62,-17 18-16,36-35 15,-19 17-15,1-53 16,0 53-16,-1 0 16,1-53-16,0 53 15,-1 0-15,36-123 16,-18 70-1,-17 0 1,0 18 0,-1 53-16,-17-36 15,0 36-15,0 0 0,18-18 16,-18 35-16,0-17 16,18 35-16,-18-18 15,0 1 1,0-1 31,17 18-32,-17-18 1,0 1-16,18-1 16,-18 0-16,0 1 0,17-1 15,-17 0 1,18 18-1,-18-17 1,-18 17 78,18 17-79</inkml:trace>
   <inkml:trace contextRef="#ctx0" brushRef="#br0" timeOffset="23491.0339">7743 3951 0,'0'-18'16,"0"1"-16,0-1 15,18 18-15,-18 18 47,18 17-31,-18-17-16,0-1 16,17 36-16,1-35 15,-18 17-15,35 36 16,-35-36-16,18 53 15,-18-35-15,18 53 16,-18-53-16,0 35 16,17-35-16,1 35 15,-18-52-15,18 34 16,-1-35-16,1 36 16,-18-53-16,17 34 15,1-34-15,-18 0 16,0-1-16,0 1 15,18 17-15,-18-17 16,0 17 0,0-17-16,0-1 15,0 1 32,0 0-31,0-1-1,0 1 1,0 0 0,-18-18-16,18 17 15,0 1 17,0 0 30,18-18 32,-18-18-63,0 0 0,0 36 47,0 0-62,0-1 0,0 1-1,0 0 1,0-1 0,0 1-1,-18-18 1,36 0 15,-1-18-15,-17 1-16,0-1 15,0-17-15,18 17 16,-18 0-16,0-17 16,18-18-1,-18 18-15,17 17 0,-17-17 16,18-36-16,0 36 15,-1-35-15,1 17 16,-18-53-16,17 71 16,-17-71-1,0 53-15,18-18 16,-18 36-16,0-18 16,0 35-16,0 1 0,0-36 15,18 18 1,-18-1-16,17 19 15,-17-36-15,18 35 16,-18 0-16,0 1 0,0-1 16,0 1 46,0-1-46,18 18-1,-18-18 48,17 18-47,-17-17-1,0-1 16,0 0-15,0 1 0,18-1-1,-18 36 220,0-1-220,0 1-15,0 0 16,0-1 0,0 1-16,0 0 0,0 17 15,0 0 1,18-17-16,-18-1 15,0 36-15,17-17 16,-17-1 0,18-18-16,-1 19 15,-17-19-15,18 19 16,0-1 0,-18 0-16,17-17 15,-17 17-15,0-17 0,18 35 16,-18-36-16,18 36 15,-1-17-15,-17-1 16,18 0-16,0 0 16,-18-17-16,17 0 15,1 17 1,-18-17-16,18-18 0,-18 17 16,0 1-16,0-1 15,17-17 1,-17 18-1,0 0-15,0-1 16,18-17 15,-18 18-31,0 0 16,0-1 93,0 1-77,0 0-17,0-1 1,0 1-1,0-1-15,17-17 16,-17-17 93,18-18-93,-18 17-16,18-17 16,-18-1-16,0 19 0,17-19 15,-17-16 1,18 16-16,-18 1 0,0 0 16,18-1-16,-18 1 0,17-35 15,-17 34-15,0-34 16,0 34-16,0 19 15,18-36 1,-18 18-16,0-18 16,18 35-16,-18-52 15,0 52-15,17-35 16,1 0 0,-18 35-16,0 1 15,0-1-15,0 1 16,0-1 15,0 0-15,0 1-1,0-1 48,17 18-48,-17-18 1,0 36 93,0 0-93,18-1 0,-18 1-16,0 17 15,0 0 1,0 18-16,18-35 16,-1 53-16,-17-36 15,0-18-15,18 19 16,-18-1-16,18 18 15,-1-18-15,1 18 16,-18-18-16,18 18 16,-1-35-16,1 35 15,-18-35-15,17 17 16,-17-18-16,18 19 16,-18-19-16,0 1 15,18 17-15,-18-17 16,0 0-16,17-1 15,-17 18-15,0-17 16,18 0-16,-18-1 16,0 1-16,0 0 0,18-1 15,-18 1-15,0 0 16,17-1-16,-17 1 16,0-1-1,0 1-15,0 0 16,18-1-1,-18 1-15,0 0 16,0-1-16,18 1 16,-18 0 31,0-1 31,0-34-31,17-1-32,-17-17 1,0 17-16,18-17 15,-18-1-15,18-34 16,-18 35-16,0-71 16,17 53-16,-17-53 15,18 71-15,-18-53 16,17 52-16,-17-34 16,18 52-16,-18-52 15,0 52-15,18-35 16,-18 35-16,17-17 15,-17-18-15,0 36 16,18-1-16,-18 0 0,0 1 16,0-1 31,18 18-1,-18 18 33,0-1-64,17 1-15,-17 17 16,18-17-16,-18-1 15,18 1-15,-18 17 0,17 1 0,-17-19 16,18 54 0,-1-36-16,-17 0 0,18 1 15,-18 52-15,18-35 16,-18-18-16,17 53 16,1-70-16,-18 17 0,18 0 15,-1 1 1,1-19-16,-18 1 0,18 0 15,-1-1-15,-17 1 16,18-18 0,-18 18-16,0-1 15,17-17 1,-17 18-16,0-36 62,0 1-46,0-1-16,0-17 16,0-1-16,18-17 15,-18 18-15,0-18 16,18 0-16,-18 18 0,17-71 16,1 53-1,-18 18-15,18-36 16,-1 19-16,1 16 0,0-34 15,-18 34-15,17 1 16,-17 0-16,0 17 16,18 18-1,-18-17 48,0-1-32,0 0 32,0 36 30,0 0-77,0-1-16,0 19 0,0 16 16,18 37-16,-1-36 15,1 52 1,-1 19-16,-17-71 0,18-18 15,0 18-15,-1-18 0,-17 1 16,36 34 0,-36-35-16,17 1 0,-17 17 15,18-36-15,-18 1 16,0-1-16,18 1 16,-36-36 15</inkml:trace>
   <inkml:trace contextRef="#ctx0" brushRef="#br0" timeOffset="26749.945">10054 5274 0,'0'-18'15,"0"1"1,-17 17 0,17-18-1,-18 18-15,0 18 63,18-36 30,18 18-77,0 0 0,-18-18-1,17 18-15,-17-17 16,0-1 0,18 1-1,-1-1-15,1-35 16,0 35-16,35-52 15,-36 35-15,19-36 16,-19 18-16,18-35 16,-17 35-16,0 0 15,-1 18-15,1-18 0,0-18 16,-18 36-16,0 0 16,17-1-16,-17 19 15,0-1-15,0 1 16,18 17-16,0 0 62,-18 17-30,-18 1-17,18 17 1,18-17-1,-18-1-15,0 1 0,17 35 16,-17-35-16,0 17 16,18 0-16,0 36 15,-18-18-15,17-18 0,-17 18 16,18 17-16,-1-34 16,1-1-16,-18-17 0,18 17 15,-18-18-15,17 1 16,-17-36 78,0 1-63,0-1-31,18 1 15,-18-1 1,0 0-16,0 1 16,0-1-1,18 0-15,-18 1 16,0-1-16,17-35 16,-17 36-16,18-36 15,0 17-15,-18 1 16,17-18-1,1 0-15,-18 18 16,17-18-16,1-18 16,-18 54-16,18-36 15,-18 35 1,17 18 31,-17 18-32,18 0 1,-18 17-16,18 35 16,-1-34-16,1 34 15,0-35-15,17 36 16,-18-36-16,1 1 16,-18-1-16,18-17 0,-1-1 15,1 36 1,-18-35-16,18-1 0,-18 1 15,17 0-15,1-36 79,-18 0-64,0 1 1,0-1-16,0 0 0,18-17 15,-18 18-15,17-36 16,-17 35-16,18-17 16,-18-1-16,0 1 15,18 17-15,-18-34 16,0 34-16,0-35 16,17 35-1,-17 1-15,0-1 63,0 36-16,0-1-32,18 36 1,-1-35-16,-17 17 0,18-17 15,0 17-15,-1 0 0,1 1 16,17 34 0,-17-34-16,0-1 15,-1-18-15,-17 1 0,18 0 0,-18-1 16,17-17-16,-17 18 16,0-36 15,0 1-16,0-1-15,0-17 16,18 0-16,-18 17 16,0 0-16,0-17 0,0 17 15,18-35-15,-18 36 16,0-19 0,17 19-16,-17-18 15,0 52 32,0 1-31,0-1-16,0 1 0,18 17 15,-18-17-15,18 35 16,-1-18-16,1 18 16,0-35-16,-1 17 15,1-17-15,-1-18 16,1 0-1,-18-18 1,0 0 0,18-17-1,-18 0-15,0 17 0,0 1 0,0-19 16,0 1 0,0 0-16,0-1 15,0 19-15,17 17 16,-17 17-1,18 19 1,-18-19 0,18 19-16,-1-1 15,-17 0-15,18-17 0,-18 0 16,35 17-16,-17-18 16,0-17-1,-1-17 1,-17-1-1,18-17-15,-18 17 0,0-35 16,0 18-16,17 0 16,-17 17-16,0 0 15,18 18 1,-18-17-16,0 34 16,0 1-1,18 0-15,-18 17 16,0-17-16,17 17 0,-17-17 0,18 35 15,0-36 1,-1-17-16,1 18 16,0-1-16,-1-17 0,-17-17 15,18 17-15,-18-35 16,17 17-16,-17-17 16,0 17-16,18-17 15,-18 17-15,0 36 47,18-1-31,-18 1-16,17-18 0,1 18 15,0-18 1,-1 0 0,-17-18-1,0 0 1,18 1-16,-18-1 15,0 0-15</inkml:trace>
@@ -936,14 +936,14 @@
   <inkml:trace contextRef="#ctx0" brushRef="#br0" timeOffset="29858.4927">14041 4745 0,'17'0'16,"1"-18"0,-1 18-16,19-17 15,-19 17-15,19 17 16</inkml:trace>
   <inkml:trace contextRef="#ctx0" brushRef="#br1" timeOffset="45280.0735">5450 5944 0,'0'-17'218,"18"17"-218,-18-18 16,0 0 15,18 18-15,-18-17-16,0-1 15,17 18-15,-17-35 16,0 17-16,18-17 16,-18 17-16,0-17 15,18 0-15,-18 17 16,17-35 0,-17 18-16,18 17 0,-18-17 15,18-36-15,-1 36 16,1-35-16,-18 34 15,17-52-15,1 53 16,17-53 0,-17 35-16,0 17 15,-1-69-15,19 16 16,-36 37-16,17-1 16,1 0-16,-18 0 0,17-53 15,1 53-15,-18 0 16,18 18-16,-1-71 15,-17 71-15,36-71 16,-19 71-16,-17-18 0,36-53 16,-19 53-16,1-53 15,0 53-15,17-53 16,-18 36 0,19-18-16,-36 35 0,35-36 15,-35 54 1,18-53-1,-1 35-15,-17 0 0,18-17 0,0-36 16,-18 53 0,17-18-16,-17 54 15,18-1-15,-18 0 0,0 1 16,0-1-16,0 0 16,17 1-16,-17-1 15,0 1-15,18-1 16,-18 0-16,0-17 15,0 17 1,0 1-16,-18 34 16</inkml:trace>
   <inkml:trace contextRef="#ctx0" brushRef="#br1" timeOffset="45523.9823">6121 2663 0,'0'0'15,"0"-17"-15,0-1 0,0 1 0,17-19 16,1-17 0,0 36-16,17-19 15,-17 19-15,17-18 16,-35 17-16,17 18 16,1 18-1,-18-1-15,0 1 0,0-1 16,0 1-16,0 0 15,0-1-15,0 19 16,0-19-16,18 19 16</inkml:trace>
-  <inkml:trace contextRef="#ctx0" brushRef="#br1" timeOffset="47125.6951">6297 2558 0,'0'17'78,"0"1"-47,0 0-15,0-1-1,18-17-15,-18 18 16,0-1-16,0 19 16,17-19-16,-17 19 15,0-19-15,0 1 16,18 17-16,-18-17 15,0 17-15,18-17 0,-18 52 16,0-17-16,17-17 0,-17 34 16,18-35-16,-18 54 15,0-54 1,18 53-16,-18-53 16,17 71-16,-17-53 15,0-18-15,18 36 0,-18-18 16,0 0-16,17 53 15,-17-54-15,0 1 16,0 53-16,0-35 16,18-18-16,-18 0 15,0 17-15,0 1 0,18-18 0,-18 70 16,0-52-16,0-1 16,0 1-16,17 70 15,-17-71-15,18 54 16,0-54-16,-1 54 15,1-71-15,0 0 16,-18-18-16,17 18 0,1 0 16,-18 0-16,18 0 0,-1-18 15,-17 53-15,18-35 16,-18 0-16,17-18 16,-17 54-16,18-54 15,0 35-15,-18-34 16,0-1-16,17 18 15,-17-18-15,18 0 16,0 36-16,-18-36 16,0-17-16,17 17 0,-17 0 15,0 1-15,18-19 16,-18 19-16,0-19 0,18 36 16,-18-18-16,17 18 15,-17-35-15,18 17 16,-1 1-16,-17-19 15,0 18-15,18 1 16,0-19 0,-18 1-1,17 0-15,1-18 32,-18 17-17,0 1-15,0 0 16,18-18-1,-18 17-15,0 1 16,17-1-16,-17 1 16,0 0-1,0-1-15,18 19 16,-18-19-16,0 1 16,18-18-1,-18 18 1,0-1-1,0 1-15,0 0 16,17-1-16,-17 18 16,0-17-16,0 17 15,18-35 1,-18 18-16,0-36 16,0 1-1</inkml:trace>
+  <inkml:trace contextRef="#ctx0" brushRef="#br1" timeOffset="47125.695">6297 2558 0,'0'17'78,"0"1"-47,0 0-15,0-1-1,18-17-15,-18 18 16,0-1-16,0 19 16,17-19-16,-17 19 15,0-19-15,0 1 16,18 17-16,-18-17 15,0 17-15,18-17 0,-18 52 16,0-17-16,17-17 0,-17 34 16,18-35-16,-18 54 15,0-54 1,18 53-16,-18-53 16,17 71-16,-17-53 15,0-18-15,18 36 0,-18-18 16,0 0-16,17 53 15,-17-54-15,0 1 16,0 53-16,0-35 16,18-18-16,-18 0 15,0 17-15,0 1 0,18-18 0,-18 70 16,0-52-16,0-1 16,0 1-16,17 70 15,-17-71-15,18 54 16,0-54-16,-1 54 15,1-71-15,0 0 16,-18-18-16,17 18 0,1 0 16,-18 0-16,18 0 0,-1-18 15,-17 53-15,18-35 16,-18 0-16,17-18 16,-17 54-16,18-54 15,0 35-15,-18-34 16,0-1-16,17 18 15,-17-18-15,18 0 16,0 36-16,-18-36 16,0-17-16,17 17 0,-17 0 15,0 1-15,18-19 16,-18 19-16,0-19 0,18 36 16,-18-18-16,17 18 15,-17-35-15,18 17 16,-1 1-16,-17-19 15,0 18-15,18 1 16,0-19 0,-18 1-1,17 0-15,1-18 32,-18 17-17,0 1-15,0 0 16,18-18-1,-18 17-15,0 1 16,17-1-16,-17 1 16,0 0-1,0-1-15,18 19 16,-18-19-16,0 1 16,18-18-1,-18 18 1,0-1-1,0 1-15,0 0 16,17-1-16,-17 18 16,0-17-16,0 17 15,18-35 1,-18 18-16,0-36 16,0 1-1</inkml:trace>
   <inkml:trace contextRef="#ctx0" brushRef="#br1" timeOffset="47476.3353">6879 7373 0,'18'0'16,"-18"18"-16,17-1 0,19 1 16,-1 53-16,0-36 15,-17-18-15,0 19 0,-1-1 16,1-17-16,-1-1 15,19 1-15,-19-36 16,1 1 0,-18-19-16,18-17 0,-1 18 15,-17-18-15,18 0 0,17-52 16,-17 52-16,0 0 16,-1 53-16,-17-18 15,0 36-15</inkml:trace>
-  <inkml:trace contextRef="#ctx0" brushRef="#br0" timeOffset="81438.4435">27781 5697 0,'0'18'0,"0"17"15,-17 1-15,17 52 16,0-18-16,0-17 16,0 88-1,0-70-15,0 88 16,0-89-16,0 71 15,0-70-15,17 17 16,-17-35-16,0-18 16,0-17-16,0 0 15,0-1-15,0-34 16,0-1-16</inkml:trace>
-  <inkml:trace contextRef="#ctx0" brushRef="#br0" timeOffset="81905.9461">27464 6121 0,'17'0'15,"1"-18"-15,0 0 16,35-34-16,-36 16 15,36-34 1,-35 34-16,17-17 0,0-35 16,1 53-16,-1-53 15,-35 35-15,18 0 16,-1 35-16,-17 36 31,18 17-31,-18 1 16,17-1-16,1 18 0,17 17 15,-17-52-15,17 35 16,-17-36-16,0 1 16,-1 0-16</inkml:trace>
+  <inkml:trace contextRef="#ctx0" brushRef="#br0" timeOffset="81438.4434">27781 5697 0,'0'18'0,"0"17"15,-17 1-15,17 52 16,0-18-16,0-17 16,0 88-1,0-70-15,0 88 16,0-89-16,0 71 15,0-70-15,17 17 16,-17-35-16,0-18 16,0-17-16,0 0 15,0-1-15,0-34 16,0-1-16</inkml:trace>
+  <inkml:trace contextRef="#ctx0" brushRef="#br0" timeOffset="81905.946">27464 6121 0,'17'0'15,"1"-18"-15,0 0 16,35-34-16,-36 16 15,36-34 1,-35 34-16,17-17 0,0-35 16,1 53-16,-1-53 15,-35 35-15,18 0 16,-1 35-16,-17 36 31,18 17-31,-18 1 16,17-1-16,1 18 0,17 17 15,-17-52-15,17 35 16,-17-36-16,0 1 16,-1 0-16</inkml:trace>
   <inkml:trace contextRef="#ctx0" brushRef="#br0" timeOffset="83513.019">28646 5997 0,'-18'-17'16,"-17"17"-1,17 0-15,-35 0 16,35 17 0,1-17-16,17 18 0,-35 0 15,35-1 1,17 18-16,1-17 15,35 35-15,-18-35 16,0-1-16,36 1 16,-54 0-16,19 17 15,-36-18-15,-18 1 16,18 0-16,-53-18 16,36 0-16,-36 0 15,35 0 1,-17-18-16,35 0 15,-18 1-15,18-1 16</inkml:trace>
   <inkml:trace contextRef="#ctx0" brushRef="#br0" timeOffset="83819.1699">28875 5627 0,'18'17'16,"-18"1"-1,0 17-15,17 18 16,-17 0-16,0 35 15,0-35-15,0 0 16,0 53-16,0-53 16,0 18-16,18-54 15,-18 1-15,17 17 16,1-35-16,0 0 16</inkml:trace>
   <inkml:trace contextRef="#ctx0" brushRef="#br0" timeOffset="84626.5237">29228 6103 0,'-18'0'16,"0"0"-16,1 18 15,-1-1-15,18 36 16,0-35-16,35 35 16,-35-36-16,36 1 15,-19 0-15,1-1 16,17-17-16,-17 0 16,-1-17-1,-34-1-15,17 0 16,-18-17-16,1 18 15,-1-19-15,0 19 0,1-1 16,-1 0 0,36 18 15,17 0-31,-17 0 16,17 0-1,-18 0-15,1 0 16,0 0-16,-1 0 15,-17 18 32,0 17-31,0-17-16,18 0 16,-18-1-16,18 1 15,-1-1-15,1-17 16,0 0-16,-18-17 15,17-1 1,-17 1 0,0-1-16,0 0 15,18 1-15,-18 34 32,18 1-32,-1-18 15,1 18 1,-1-1-16,19 1 15,-19-18-15,1 0 16,0 0-16,-18-18 16,17-17-1,-17 17-15,0-17 16,-17 0 0,17-1-16,-18-16 15,18 34-15,0 0 0,-18 18 16,18 18-1</inkml:trace>
-  <inkml:trace contextRef="#ctx0" brushRef="#br0" timeOffset="85932.4027">29863 6191 0,'17'0'32,"19"-17"-32,-36-1 15,17 0-15,1 18 16,-1-17-16,-17-1 0,0 0 16,-17 1-1,-1 17-15,-17 0 16,0 17-16,-1 1 15,36 0-15,-17 17 16,17-17-16,17 17 0,1-17 16,17 17-1,1-35-15,-1 0 16,0 17-16,18-17 0,-18-17 16,-17 17-16,17-18 0,-35 1 0,18-19 15,-18 19-15,0-19 31,-18 36-31,18-17 16,18 17-16,0 0 16,34-18-1,-16 18-15,-1 0 0,-17 0 0,17 0 16</inkml:trace>
+  <inkml:trace contextRef="#ctx0" brushRef="#br0" timeOffset="85932.4026">29863 6191 0,'17'0'32,"19"-17"-32,-36-1 15,17 0-15,1 18 16,-1-17-16,-17-1 0,0 0 16,-17 1-1,-1 17-15,-17 0 16,0 17-16,-1 1 15,36 0-15,-17 17 16,17-17-16,17 17 0,1-17 16,17 17-1,1-35-15,-1 0 16,0 17-16,18-17 0,-18-17 16,-17 17-16,17-18 0,-35 1 0,18-19 15,-18 19-15,0-19 31,-18 36-31,18-17 16,18 17-16,0 0 16,34-18-1,-16 18-15,-1 0 0,-17 0 0,17 0 16</inkml:trace>
   <inkml:trace contextRef="#ctx0" brushRef="#br0" timeOffset="86237.7941">30762 5609 0,'0'35'16,"0"1"-16,18-1 0,-18 0 15,18 71 1,-18-53-16,17 53 16,1-36-16,-18-34 15,17 17-15,1-36 16,0 1-16</inkml:trace>
   <inkml:trace contextRef="#ctx0" brushRef="#br0" timeOffset="86955.2019">30992 6174 0,'35'0'16,"-18"0"-1,1-18-15,53-17 16,-54 17-16,1 0 0,0-17 16,-1 35-16,-34-35 15,-1 17-15,0 18 16,-17 0 0,17 0-16,-17 18 15,17 0-15,1 17 16,17-18-16,0 1 0,35 0 15,0-1-15,36 1 16,-36-18 0,18 0-16,-18 0 15,1-18-15,-19 18 16,1-17-16,0-1 16,-18 0-16,-18 1 15,0 17 1,1 0-16,-1 17 15,0 1-15,1 0 0,17-1 16,0 19-16,17 17 16,1-53-16,17 35 15,1-35-15,-1 0 16,0 0 0,-17-18-16,-18-17 15,0 17-15,0 1 16,-18-19-1,1 19-15,17 34 32,17 1-17,1-18-15,-1 18 16,19-1-16,-19-17 16,1 0-16,-18-17 15,-18-1 1,18 0-1,-17-17-15,17 17 16,0-17-16,17 18 16,1-19-1,0 36-15,-1 0 16,19 0-16,-19 0 16,1 0-16</inkml:trace>
   <inkml:trace contextRef="#ctx0" brushRef="#br0" timeOffset="87237.9804">31662 6174 0,'0'17'15,"0"-34"-15,0 52 0,17-17 0,-17-1 16,18-17-16,-18-17 16,0-1-1,0-17 1,0-1-16,0-17 15,0 36-15,18-1 16,-1 1-16,1 17 16,0 0-16,-1 0 15,1 35 1,-18-18-16,0 1 0,18 17 16,-18-17-16,0 0 15,0-1-15,17 1 16</inkml:trace>
@@ -954,7 +954,7 @@
   <inkml:trace contextRef="#ctx0" brushRef="#br0" timeOffset="91622.0258">27817 7602 0,'35'18'16,"0"-18"-16,0 18 0,54-1 15,-37 1-15,37 35 16,-19 0 0,-52-36-16,0 36 15,-18-35-15,-36 35 16,19-53-16,-19 18 16,1-1-16,0-17 15,-18 18-15,18-18 0,-1 0 16,19 0-1,-1 0-15</inkml:trace>
   <inkml:trace contextRef="#ctx0" brushRef="#br0" timeOffset="91983.1301">26988 7567 0,'0'0'0,"-18"0"15,0 0-15,-35 18 16,18-1-16,0 1 15,-18 0-15,-35 35 16,52-36-16,1 1 0,0-1 16,17 1-16,1 0 0,-1-1 15,18 1-15,18 35 16,-1-35-16,71 52 16,-17-35-16,52 18 15,-17 0 1,-70-35-16</inkml:trace>
   <inkml:trace contextRef="#ctx0" brushRef="#br0" timeOffset="93195.0808">28945 7602 0,'0'-70'15,"0"140"-15,0-175 0,-17 16 0,-1 54 16,-35-18 0,18 36-16,0 17 0,-18 17 15,0 36 1,35-18-16,18 71 16,0-53-16,35 71 15,-17-72-15,0 1 16,-1 0-16,19 0 15,-19-17-15,1-19 0,-18 1 16,0-36 15,-18 1-31,18-1 16,-17 0-16,17 1 16,17 17-16,1-18 15,0 18-15,-1 0 0,54 0 16,-18 0-16,35-18 15,-53 18-15,0 0 16,18-17-16,-35 17 16,-18 17-1,-35 1-15,17 0 16,0-1-16,1 19 0,-1-19 16,18 1-16,-17-1 0,34 19 15,1-19 1,17-17-16,0 0 15,1-17-15,-19 17 0,1-18 16,17-17-16,-17 17 16,-18-17-1,0 17-15,-18 18 16,18-17-16,-17-1 0,-1 18 16,0 0-1,18 18-15,0-1 16,0 1-1,18-18-15,0 0 16,-1 0 0,1 0-16,-18-18 15,0 1-15,17 17 0,1-18 16,0 0-16,-1 18 16,36 18-1,-17 0-15,-19-1 0,36 36 16,-35-35-16,-1-1 15,1-17-15,-36 0 16,-17 0 0,18 0-1,-36-17-15,35-1 16,-17-17-16,17 17 16</inkml:trace>
-  <inkml:trace contextRef="#ctx0" brushRef="#br0" timeOffset="93385.2162">29633 7779 0,'53'0'16,"-106"0"-16,124 0 0,-1-36 16,-52 19-16,17 17 15,-17-18-15,0 1 0,-1 17 16,-17-36-1,0 19-15,-35-19 0,17 19 16</inkml:trace>
+  <inkml:trace contextRef="#ctx0" brushRef="#br0" timeOffset="93385.2161">29633 7779 0,'53'0'16,"-106"0"-16,124 0 0,-1-36 16,-52 19-16,17 17 15,-17-18-15,0 1 0,-1 17 16,-17-36-1,0 19-15,-35-19 0,17 19 16</inkml:trace>
   <inkml:trace contextRef="#ctx0" brushRef="#br0" timeOffset="93551.6553">29739 7497 0,'0'88'15,"0"-176"-15,0 229 0,0-106 16,-17 71-1,17-53-15,0 17 16,17-34-16,1-1 16,-1-35-1</inkml:trace>
   <inkml:trace contextRef="#ctx0" brushRef="#br0" timeOffset="93857.6192">29810 7920 0,'0'0'0,"17"0"16,1 0-16,0-18 15,17 1-15,-17 17 16,-1-18-16,1 18 16,-18-18-16,-18 1 15,1 17 1,-1 0 0,0 35-16,18-17 15,0 35-15,18-36 16,17 18-1,0-17-15,-17-18 0,35 0 16,-35 0-16,-18-18 16,17-17-1,-17 18-15,0-19 16,0 19-16,18-1 0,0 0 16,35 1-1,-36 17-15,18 0 16,-17 17-16</inkml:trace>
   <inkml:trace contextRef="#ctx0" brushRef="#br0" timeOffset="94142.0019">30833 7303 0,'0'0'0,"0"17"0,-18 54 16,18-18-16,18 52 16,-1-52-1,1 71-15,0-71 16,-1 53-16,1-71 15,0 35 1,-18-52-16,17 0 0</inkml:trace>
@@ -986,14 +986,14 @@
   <inkml:trace contextRef="#ctx0" brushRef="#br0" timeOffset="122941.0626">8714 9543 0,'17'0'15,"-17"17"1,0 19 0</inkml:trace>
   <inkml:trace contextRef="#ctx0" brushRef="#br0" timeOffset="123042.5471">8819 9948 0,'0'18'0,"0"-36"0,18 36 16,-18-36-1</inkml:trace>
   <inkml:trace contextRef="#ctx0" brushRef="#br0" timeOffset="132652.1086">5256 10742 0,'-17'-18'16,"-1"1"-16,-17 17 15,0 17-15,-36 36 16,36-17-16,17 17 15,-17 17-15,17-17 0,1 71 16,17-72-16,35 37 16,0-36-16,36-1 15,-36-34-15,71-18 16,-71 0-16,53-18 16,-52 1-16,-19-1 15,1 1-15,-18-1 0,0 0 16,-18 18-1,1 36 1,17-19-16,0 54 16,17-54-16,1 1 15,35 0-15,-36-1 16,36-34-16,-17 17 16,-1-36-16,-35 19 15,0-1-15,0-17 0,-18-18 16,-17 35-16,17 1 15,-35-1 1,18 18-16,35-18 16</inkml:trace>
-  <inkml:trace contextRef="#ctx0" brushRef="#br0" timeOffset="133301.434">5768 11465 0,'0'36'0,"0"-72"0,18 72 16,-18-72-1,0 19-15,0-19 16,0-52 0,0 53-16,0-18 15,0 35-15,17 18 16,-17 18-16,0 0 15,18-1-15,-1 36 16,-17-35-16,36-1 16,-19 1-16,1-18 15,0 0-15,-1-18 16,1 18-16,0-35 16,-18 18-16,0-19 15,17 54 16,-17 0-15,0-1-16,18 18 16,0 1-16,-18-19 15,35 36 1,-35-35-16,17 52 16,-17-17-16,0 18 15,0-53-15,0-1 0,-35 1 16,18-36-1,-1 1-15,0-19 16,18 19-16,-17-72 16,17 54-16,0-18 0,0 18 15,17-53-15,19 35 16,-19 35-16,18 1 16,18-1-1,-35 18-15,0 18 0,-1-1 16,-17 1-16,0 35 15,-17-36-15,-1 1 0,-35 17 16,18-17-16,0-18 16,35-18-1,0-17 1</inkml:trace>
+  <inkml:trace contextRef="#ctx0" brushRef="#br0" timeOffset="133301.4339">5768 11465 0,'0'36'0,"0"-72"0,18 72 16,-18-72-1,0 19-15,0-19 16,0-52 0,0 53-16,0-18 15,0 35-15,17 18 16,-17 18-16,0 0 15,18-1-15,-1 36 16,-17-35-16,36-1 16,-19 1-16,1-18 15,0 0-15,-1-18 16,1 18-16,0-35 16,-18 18-16,0-19 15,17 54 16,-17 0-15,0-1-16,18 18 16,0 1-16,-18-19 15,35 36 1,-35-35-16,17 52 16,-17-17-16,0 18 15,0-53-15,0-1 0,-35 1 16,18-36-1,-1 1-15,0-19 16,18 19-16,-17-72 16,17 54-16,0-18 0,0 18 15,17-53-15,19 35 16,-19 35-16,18 1 16,18-1-1,-35 18-15,0 18 0,-1-1 16,-17 1-16,0 35 15,-17-36-15,-1 1 0,-35 17 16,18-17-16,0-18 16,35-18-1,0-17 1</inkml:trace>
   <inkml:trace contextRef="#ctx0" brushRef="#br0" timeOffset="133753.1897">6244 11236 0,'0'0'15,"0"18"-15,0-1 16,0 19-16,0-19 16,0 1-16,0-1 15,18 1-15,-1 0 16,1-18-16,0 0 16,-1-18-1,1 0-15,-18-17 16,18 18-1,-18-1-15,0 0 16,0 36 0,17 0-1,1-18 1,0 17-16,-1 1 16,1-18-16,-36 0 31,18-18-16,-17 1-15,17-19 16,0 19-16,17-19 16,1 19-1,17 17-15,0-18 16,-17 18-16,17-18 0,-17 1 16,35-18-1,-35 35-15,-1-18 0,1 0 0,-18 1 16,0-1-1,0 0-15,-18 1 16</inkml:trace>
   <inkml:trace contextRef="#ctx0" brushRef="#br0" timeOffset="133908.4558">6579 10866 0,'18'88'15,"-36"-176"-15,36 211 0,-18-17 16,18-53-16,-18 35 15,17-53 1,-17-17-16,18 17 16,0-17-16,-1-18 15</inkml:trace>
   <inkml:trace contextRef="#ctx0" brushRef="#br0" timeOffset="134186.8339">6738 11271 0,'35'0'15,"1"-17"1,-1-19 0,0-17-16,-35 36 15,-35-1 1,0 36 0,-18-1-1,35 19-15,0 17 16,18-36-16,18 19 0,35-1 15,-18-35-15,53 17 16,-35-17-16,0-17 16,0 17-16,-18-18 0,1 18 15,-1-17-15,-17 17 16,-18-18-16</inkml:trace>
   <inkml:trace contextRef="#ctx0" brushRef="#br0" timeOffset="134876.6452">8220 11060 0,'0'0'16,"-71"53"-16,54-18 0,-36 35 15,35-34-15,18-19 16,0 1-16,18 0 0,17-1 16,0-17-16,36-35 15,-36 17-15,36-70 16,-36 53 0,-18-18-16,1-18 0,17-35 15,-35 54-15,-17-19 16,-1 18-16,-35-53 15,18 53-15,-36-17 16,36 52-16,17 1 16,1 17-16,-1 35 0,1 0 15,17 0-15,0 36 0,17-1 16,1 1-16,17 0 0,53 52 16,-52-70-16,16-18 15,37 53-15,-36-70 16,-18 17-16,0-17 0,18 0 15</inkml:trace>
   <inkml:trace contextRef="#ctx0" brushRef="#br0" timeOffset="135360.0085">8767 10777 0,'-18'0'15,"36"0"-15,-36 18 0,0 35 16,1-18 0,17 0-16,0 18 0,0 36 15,17-54-15,-17 0 16,18 0-16,17-17 0,-17 0 15,-1-1-15,1-17 0,17 0 16,-17-17-16,0-19 16,-1 19-1,1-1-15,-18 1 16,18 17-16,17 17 16,-18 1-16,36 17 15,-17-17-15,-1-1 16,0-17-16,53 0 15,-52-17-15,-19-1 0,19-35 16,-36 18-16,-18-36 16,0 36-1,-35-53-15,18 53 16,-35-54-16,34 54 16,19 0-16,-1 17 0,36 36 31,-1-1-16</inkml:trace>
   <inkml:trace contextRef="#ctx0" brushRef="#br0" timeOffset="135576.7067">9631 11201 0,'0'17'16,"0"-34"-16,0 52 0,-18-17 15,1-1-15,-1 1 0,-17 17 16,17-17-16,0 17 16</inkml:trace>
-  <inkml:trace contextRef="#ctx0" brushRef="#br0" timeOffset="136216.9896">10178 11007 0,'0'0'0,"-18"0"0,0 0 0,-17-18 16,0 18-1,0 18-15,17-1 0,0 1 0,1 0 16,-1 35 0,18-18-16,0-18 0,18 1 15,17 17-15,0-35 16,36 0-16,-54 0 15,54-53 1,-53 18-16,-1-35 16,1 34-16,-18-52 15,-18 35-15,-17-53 16,0 53-16,-18-35 16,35 35-16,-35 0 15,18 53-15,17 0 16,1 18-16,17 17 15,17 54-15,1-19 16,35 36-16,0-36 16,-18-34-16,18 17 0,0-18 15,17 36 1,-34-36-16,17 0 16,-36-17-16,1-18 15</inkml:trace>
+  <inkml:trace contextRef="#ctx0" brushRef="#br0" timeOffset="136216.9895">10178 11007 0,'0'0'0,"-18"0"0,0 0 0,-17-18 16,0 18-1,0 18-15,17-1 0,0 1 0,1 0 16,-1 35 0,18-18-16,0-18 0,18 1 15,17 17-15,0-35 16,36 0-16,-54 0 15,54-53 1,-53 18-16,-1-35 16,1 34-16,-18-52 15,-18 35-15,-17-53 16,0 53-16,-18-35 16,35 35-16,-35 0 15,18 53-15,17 0 16,1 18-16,17 17 15,17 54-15,1-19 16,35 36-16,0-36 16,-18-34-16,18 17 0,0-18 15,17 36 1,-34-36-16,17 0 16,-36-17-16,1-18 15</inkml:trace>
   <inkml:trace contextRef="#ctx0" brushRef="#br0" timeOffset="136576.9027">10495 10548 0,'0'35'0,"0"-70"0,0 176 16,0-88-16,0 0 0,0 0 15,18 0-15,-18 0 0,17 17 16,-17-34-16,0 17 16,0-36-1,18-17 1,0-17-16,17-1 16,-17 18-16,17 0 15,-17 0-15,17 18 0,-18-18 16,36 35-16,-35-18 15,0 19 1,-36-19 0,-17-17-16,-1 0 15,19 0-15,-54-17 16,54-1-16,-19 0 16,36 1-16</inkml:trace>
   <inkml:trace contextRef="#ctx0" brushRef="#br0" timeOffset="142612.9056">12153 10901 0,'0'0'0,"-35"0"0,35 17 16,-18-17-16,1 18 0,17 0 15,-18-1-15,18 1 0,18 17 16,-1-17-16,19 0 15,-19-18 1,36 0-16,-35 0 16,35-36-16,-53 19 15,0-36-15,0 35 16,-36-35-16,19 53 16,-19-17-16,19 17 0,-36 17 15,35-17 1,1 53-16</inkml:trace>
   <inkml:trace contextRef="#ctx0" brushRef="#br0" timeOffset="142870.912">12541 11077 0,'-35'0'16,"35"-17"-1,-18-19-15,18 1 16,18 17-16,-18 1 0,35-1 16,-17 18-16,17 0 15,18 0 1,-35 18-16,17-1 0,0 19 16,-35-1-16,18-17 15,-18-1-15,0 19 16,0-19-16,0 1 0</inkml:trace>
@@ -1005,12 +1005,12 @@
   <inkml:trace contextRef="#ctx0" brushRef="#br0" timeOffset="146126.4785">16457 10760 0,'18'35'15,"-36"-70"-15,36 105 0,-1-17 16,-17-35-16,0-1 16,0-34-1,-17-36 1,17 18-1,0-1-15,0 1 16,17 17-16,-17 1 16,36 17-1,-36 17-15,17 1 0,1 17 16,0 1-16,-1-1 16,1-35-1,-1-18 1,-17-17-1,18 17-15,0-17 16,-1 35-16,1-18 16,0 18-16,-1 18 15,-17 17-15,18 1 16,-18 17-16,0-36 16,18 36-16,-18-35 15,17-1-15,1-17 16,17 0-1,-35-17-15,18-1 16</inkml:trace>
   <inkml:trace contextRef="#ctx0" brushRef="#br0" timeOffset="146254.2122">16916 10830 0,'0'0'0,"17"36"15,-17-19-15,0 1 0,18 17 16,0-17-16,17-18 15</inkml:trace>
   <inkml:trace contextRef="#ctx0" brushRef="#br0" timeOffset="146394.2003">16898 10601 0,'0'-18'15,"18"18"1,-18 18 0</inkml:trace>
-  <inkml:trace contextRef="#ctx0" brushRef="#br0" timeOffset="146721.9144">17127 10936 0,'0'18'16,"0"-36"-16,0 53 0,0-52 31,18-19-31,-18 19 16,18-36-16,-18 35 15,0 1-15,17-19 16,-17 19-16,18-1 15,0 18-15,17 18 16,-35 35 0,17 17-1,-17-17-15,0-18 16,18 1-16,0-19 16,-18 1-1,17-36-15</inkml:trace>
-  <inkml:trace contextRef="#ctx0" brushRef="#br0" timeOffset="147028.8845">17463 10883 0,'0'18'31,"0"17"-15,0-17-16,17-1 0,-17 1 15,18 0 1,-18-1-16,0 1 16</inkml:trace>
+  <inkml:trace contextRef="#ctx0" brushRef="#br0" timeOffset="146721.9143">17127 10936 0,'0'18'16,"0"-36"-16,0 53 0,0-52 31,18-19-31,-18 19 16,18-36-16,-18 35 15,0 1-15,17-19 16,-17 19-16,18-1 15,0 18-15,17 18 16,-35 35 0,17 17-1,-17-17-15,0-18 16,18 1-16,0-19 16,-18 1-1,17-36-15</inkml:trace>
+  <inkml:trace contextRef="#ctx0" brushRef="#br0" timeOffset="147028.8844">17463 10883 0,'0'18'31,"0"17"-15,0-17-16,17-1 0,-17 1 15,18 0 1,-18-1-16,0 1 16</inkml:trace>
   <inkml:trace contextRef="#ctx0" brushRef="#br0" timeOffset="147171.468">17445 10672 0,'0'0'0,"18"0"16,-1 17-1</inkml:trace>
   <inkml:trace contextRef="#ctx0" brushRef="#br0" timeOffset="147327.7549">17621 10901 0,'36'0'0,"-19"0"15,18 0-15,1-18 16,-19 18-16,1-17 0,17-1 16</inkml:trace>
   <inkml:trace contextRef="#ctx0" brushRef="#br0" timeOffset="147722.516">17921 10407 0,'0'0'0,"0"88"15,0-53-15,18 71 16,-1-53-16,-17 0 16,18 0-16,-18 0 0,0-18 15,18 0-15,-18-17 0,0 0 16,0-1-16,0 1 16,0-36-1,17 1-15,1-19 16,17 19-16,-17 17 15,52-18-15,-34 36 16,-1-1-16,-17 1 16,-18 0-16,17-1 15,-34 1-15,-1 0 16,-17-18-16,-1 17 16,19-17-16,-1 0 15</inkml:trace>
-  <inkml:trace contextRef="#ctx0" brushRef="#br0" timeOffset="148206.8506">18344 10883 0,'0'0'0,"-17"18"0,-1-1 15,1 1-15,17 17 16,-18 1-16,18-19 15,18 1 1,-1 0-16,1-18 0,17 0 16,-17 0-16,-18-18 15,17 0-15,-17 1 16,0-1-16,-17-17 16,17 17-16,0 0 15,0 1-15,0-1 16,17 36-1,1-18 1,0 17 0,-18 1-16,17-18 0,1 0 15,-18 18 1,0-36 0,-18 18-1,18-18 1,36 18-16,-1 0 15,0-17 1,0 17-16,18-18 16,-17 18-16,-1-17 15,-17-1-15,-36 18 32,0 0-17</inkml:trace>
+  <inkml:trace contextRef="#ctx0" brushRef="#br0" timeOffset="148206.8505">18344 10883 0,'0'0'0,"-17"18"0,-1-1 15,1 1-15,17 17 16,-18 1-16,18-19 15,18 1 1,-1 0-16,1-18 0,17 0 16,-17 0-16,-18-18 15,17 0-15,-17 1 16,0-1-16,-17-17 16,17 17-16,0 0 15,0 1-15,0-1 16,17 36-1,1-18 1,0 17 0,-18 1-16,17-18 0,1 0 15,-18 18 1,0-36 0,-18 18-1,18-18 1,36 18-16,-1 0 15,0-17 1,0 17-16,18-18 16,-17 18-16,-1-17 15,-17-1-15,-36 18 32,0 0-17</inkml:trace>
   <inkml:trace contextRef="#ctx0" brushRef="#br0" timeOffset="148384.8387">18627 10672 0,'0'0'0,"0"52"16,-18-16-16,18-1 0,0 18 15,0-18-15,18 36 16,-18-54-16,17 19 15,1-1 1,-18-17-16</inkml:trace>
   <inkml:trace contextRef="#ctx0" brushRef="#br0" timeOffset="148886.0347">18803 10954 0,'-18'17'16,"1"-17"-16,17 18 0,0 17 16,0-17-16,17 17 15,1-35-15,17 18 16,-17-18-16,17-18 16,1-17-1,-19 17-15,1-35 16,-18 18-16,17-35 15,-17 34-15,-17 1 16,17-18-16,0 0 0,-18 0 0,18 0 16,-17-35-1,17 53-15,-18 35 16,18 18-16,0 17 0,0 18 16,18 17-16,-18 1 0,0 70 15,17-88-15,1 53 16,-18-71-1,17 0-15,1-35 16,-18-17 0,18-1-16,-18 0 0,17 1 15,1-19-15,0 19 16,-1-1 0,-17 36-16,18-18 0,-18 35 15,18 0-15,-18-17 16,0 17-1,0 1-15,0-19 16</inkml:trace>
   <inkml:trace contextRef="#ctx0" brushRef="#br0" timeOffset="149023.911">19420 11060 0,'-17'-18'16,"-18"18"-16,17 0 16</inkml:trace>
@@ -1019,7 +1019,7 @@
   <inkml:trace contextRef="#ctx0" brushRef="#br0" timeOffset="171433.9871">6103 12788 0,'0'-17'0,"0"-1"16,0 0-16,0 1 16,0-1-16,0 0 15,-18 36 16,18 35-15,-17-18 0,17 18-16,0-18 15,0 18-15,0-35 16,17-18-16,-17 18 0,36-1 16,17-34-1,-18-1 1,-17-17-1,-1 35 1,-17 17 0,0 1-16,18 0 0,-1 35 15,19-36-15,-1 18 16,-17-35-16,35 0 16,-36-17-16,1-18 15,-18 17-15,0-53 16,-18 36-16,1 17 15,-19-35 1,1 18-16,17 18 0,1 17 16,34 0-1,1 17 1</inkml:trace>
   <inkml:trace contextRef="#ctx0" brushRef="#br0" timeOffset="171674.9391">6756 12541 0,'35'0'15,"-17"0"-15,35-17 16,-18 17-16,0 0 16,-17 0-1</inkml:trace>
   <inkml:trace contextRef="#ctx0" brushRef="#br0" timeOffset="171790.8577">6809 12788 0,'35'18'0,"-70"-36"0,88 36 16,-36-36-16,18 18 16,-17-17-16,17 17 0,-17 0 15</inkml:trace>
-  <inkml:trace contextRef="#ctx0" brushRef="#br0" timeOffset="173648.8996">8290 13511 0,'0'-17'15,"-17"-1"1,-1-17-16,-17-36 16,17 18-16,-17 0 15,0-105-15,17 70 16,18-1-16,-53-211 15,53 106 1,0 124-16,35-36 16,-17 71-16,0 17 15,17 36 1,0-1-16,-17 19 0,-1-1 16,1 18-16,-18 53 15,0-53-15,0 35 16,0-53-16,0 0 15,0-17-15,0 0 0,18-1 16,-18 1-16,35-18 0,18 18 16,-18-18-16,18 17 15,-18 1-15,-17-1 16,-18 1-16,-35 35 16,-1-35-16,1-1 15,0 1-15,-18-18 0,18 18 16,-36-18-1,53 0-15,1 0 0,-1-18 16,36 0-16,-1 1 16</inkml:trace>
+  <inkml:trace contextRef="#ctx0" brushRef="#br0" timeOffset="173648.8995">8290 13511 0,'0'-17'15,"-17"-1"1,-1-17-16,-17-36 16,17 18-16,-17 0 15,0-105-15,17 70 16,18-1-16,-53-211 15,53 106 1,0 124-16,35-36 16,-17 71-16,0 17 15,17 36 1,0-1-16,-17 19 0,-1-1 16,1 18-16,-18 53 15,0-53-15,0 35 16,0-53-16,0 0 15,0-17-15,0 0 0,18-1 16,-18 1-16,35-18 0,18 18 16,-18-18-16,18 17 15,-18 1-15,-17-1 16,-18 1-16,-35 35 16,-1-35-16,1-1 15,0 1-15,-18-18 0,18 18 16,-36-18-1,53 0-15,1 0 0,-1-18 16,36 0-16,-1 1 16</inkml:trace>
   <inkml:trace contextRef="#ctx0" brushRef="#br0" timeOffset="174038.3737">8678 12347 0,'0'0'15,"0"-17"-15,18 34 16,0 54-1,-1-18-15,19 53 16,-19-54-16,1 1 0,-1 0 16,1-17-16,0-1 0,-1-18 15,19 19-15,-19-36 16,1 0 0,-18-18-16,18-52 15,-18 34-15,-18-52 16,18 53-16,-18-71 15,1 71-15,-1-18 16,18 35-16</inkml:trace>
   <inkml:trace contextRef="#ctx0" brushRef="#br0" timeOffset="175507.0203">9278 12841 0,'0'-18'15,"0"1"-15,0-1 16,-18 18-16,1 0 16,-1 0-1,1 18-15,-19-1 16,19 1-16,17 0 0,-18 35 15,18-36-15,18 19 16,-1-19-16,19 1 16,-19-18-16,18 0 15,-17 0-15,17-35 16,-35 17-16,18-17 16,-18-1-1,-18-17-15,18 18 16,-17-18-16,-1 36 15,0-19-15,18 19 16,-17 17-16,17 17 16,17 19-1,-17-19-15,18 19 16,0 16-16,-1-16 16,1-1-16,0 0 15,17 1 1,-17-19-16,-1-17 0,18 18 15,-17-18-15,-18-18 16</inkml:trace>
   <inkml:trace contextRef="#ctx0" brushRef="#br0" timeOffset="175928.6671">9507 12718 0,'0'35'31,"0"18"-31,0-36 16,18 19-16,-18-19 15,0 19-15,18-1 16,17-17-16,-17-18 16,-1 0-1,1-18 1,-1 0-1,-17 1-15,18-1 16,-18 36 0,18 17-16,-1-17 15,19-1 1,-1-17-16,-17 18 0,35-18 16,-36-18-16,1 18 15,-1-35-15,-17 17 16,0-17-16,0 17 15,-35-35-15,18 36 16,-1-36-16,0 35 16,18 1-1,0-1-15,0 36 16</inkml:trace>
@@ -1038,7 +1038,7 @@
   <inkml:trace contextRef="#ctx0" brushRef="#br0" timeOffset="186701.2723">20585 12100 0,'0'0'0,"17"18"16,-17 0-1,0-1-15,0 18 16,18 36-16,0-36 16,-18 54-1,17-54-15,-17 0 0,18 36 16,-18-54-16,17 1 16,-17 0-16,18-18 15,0-18-15,-1-17 16,1-1-16,0 1 15,-18 0-15,17 0 0,-17-18 16,18 17-16,-18 1 16,0-18-16,0 18 0,0 0 0,-18 17 15,18-17 1,0 17-16,-17 36 16</inkml:trace>
   <inkml:trace contextRef="#ctx0" brushRef="#br0" timeOffset="187505.9826">20973 12577 0,'0'0'16,"17"0"-16,-17-18 0,0 0 16,0 1-1,-17 17 17,-1 0-32,0 0 15,1 17 1,-1 1-16,18 0 15,0-1-15,-18 36 16,18-35-16,18 35 16,0-36-16,35 19 15,-36-36-15,36 0 16,-18 0-16,18-18 16,-35 0-16,0-17 15,-18 17-15,0-35 16,0 36-16,-18-18 15,-17-1-15,17 19 16,-17 17-16,-18 0 16,18 0-1,17 17-15,18 19 16,0-19-16,18 1 16,17 17-16,0-35 15,-17 18-15,-1-18 16,19 0-16,-19 17 0,1-17 15,0 0 1</inkml:trace>
   <inkml:trace contextRef="#ctx0" brushRef="#br0" timeOffset="188003.8778">21414 12294 0,'0'0'0,"17"0"0,1 18 16,0-18-16,34 18 15,-16-18 1,-1 0-16,-17 0 15,-1 0-15</inkml:trace>
-  <inkml:trace contextRef="#ctx0" brushRef="#br0" timeOffset="188130.8664">21519 12418 0,'53'0'16,"-35"17"-16,17-17 15,-17 0 1</inkml:trace>
+  <inkml:trace contextRef="#ctx0" brushRef="#br0" timeOffset="188130.8663">21519 12418 0,'53'0'16,"-35"17"-16,17-17 15,-17 0 1</inkml:trace>
   <inkml:trace contextRef="#ctx0" brushRef="#br0" timeOffset="188658.5899">22049 12965 0,'0'0'16,"0"17"-16,0-34 0,0-1 15,0-17-15,0-36 16,-18 36-16,-17-53 15,17 35 1,-17-71-16,17 54 16,1-1-16,17-35 15,0 71-15,35 0 16,0 17-16,36 18 16,-36 18-16,18 35 15,-36-36-15,1 19 16,-18-19-16,0 36 15,0-35-15,-35-1 16,35 1-16,17 0 31,19-1-15,-19 19 0,1-1-16,-18 0 15,0-17-15,-18-1 16,1-17-16,-36 18 15,35-18-15,-35-18 16,36 18-16,-1 0 16,0-17-16</inkml:trace>
   <inkml:trace contextRef="#ctx0" brushRef="#br0" timeOffset="189581.7667">22525 12277 0,'0'17'32,"18"36"-17,-18 0-15,35 35 16,-18-35-16,19 18 16,-19-36-16,36 18 15,-35-53-15,0 0 16,-1 0-16,18-18 15,-17-17-15,-18 17 16,18-17-16,-18-18 0,0-17 16,-18 34-16,0-16 15,18 16-15,-17 1 16,-1 35 0,18 18-16</inkml:trace>
   <inkml:trace contextRef="#ctx0" brushRef="#br0" timeOffset="190021.2352">23019 12541 0,'0'0'0,"-18"18"0,18 0 16,0-1-16,0 54 15,0-54-15,18 19 0,-1-1 16,1-17-16,0-1 0,35 1 16,-18-18-16,0-18 15,-17 18-15,17-17 0,0-36 16,-17 35-1,0-35-15,-18 35 16,-18-17-16,-17 18 16,-18 17-16,18 0 15,-18 0-15,35 0 16,-17 35 0,35-18-16,0 1 15,0 0-15,35-1 16,-17-17-16,-1 18 15,1-18-15,0 0 0,17 0 16,-18 0-16,1-18 0,0 18 16</inkml:trace>
@@ -1046,19 +1046,19 @@
   <inkml:trace contextRef="#ctx0" brushRef="#br0" timeOffset="190395.3148">23618 12506 0,'0'71'15,"0"-142"-15,18 177 0,0-53 16,-1-36-16,1-17 0</inkml:trace>
   <inkml:trace contextRef="#ctx0" brushRef="#br0" timeOffset="190900.7485">24342 12030 0,'-36'53'16,"72"-106"-16,-107 176 0,53 1 16,1-54-16,17 1 15,17 52 1,1-87-16,0 16 0,-1 1 15,1-17-15,0-19 0,-1 1 16,19 0-16,-19-18 16</inkml:trace>
   <inkml:trace contextRef="#ctx0" brushRef="#br0" timeOffset="191077.1916">24536 12241 0,'0'0'16,"0"106"-16,17-35 0,1 35 15,-18-53-15,18 35 16,-1-71-16,-17 19 16,18-36-16</inkml:trace>
-  <inkml:trace contextRef="#ctx0" brushRef="#br0" timeOffset="191217.3869">24747 12488 0,'0'0'16,"36"0"-16,-19-17 0,19 17 16,16 0-16,-34-18 15,17 18-15</inkml:trace>
-  <inkml:trace contextRef="#ctx0" brushRef="#br0" timeOffset="191684.2544">25083 13000 0,'0'0'0,"17"18"15,1-18-15,-18-36 16,0 19-16,0-19 16,0 1-16,0 0 15,-18-18-15,1-35 16,17 52-16,-18-69 16,18 52-16,0-18 15,18 53-15,-1 1 16,1 17-16,-1 0 0,36 0 15,-35 17-15,0 1 16,-18 17-16,0 1 16,0-19-16,0 19 15,0-19-15,0 1 16,0-1-16,0 1 16,17 0-16,1 17 15,0-17 1,-18-1-16,-18-17 15,0 0 1,1 0-16,-1 0 0,0-17 16,-17 17-1,0-18-15,17 18 0,1 0 16</inkml:trace>
+  <inkml:trace contextRef="#ctx0" brushRef="#br0" timeOffset="191217.3868">24747 12488 0,'0'0'16,"36"0"-16,-19-17 0,19 17 16,16 0-16,-34-18 15,17 18-15</inkml:trace>
+  <inkml:trace contextRef="#ctx0" brushRef="#br0" timeOffset="191684.2543">25083 13000 0,'0'0'0,"17"18"15,1-18-15,-18-36 16,0 19-16,0-19 16,0 1-16,0 0 15,-18-18-15,1-35 16,17 52-16,-18-69 16,18 52-16,0-18 15,18 53-15,-1 1 16,1 17-16,-1 0 0,36 0 15,-35 17-15,0 1 16,-18 17-16,0 1 16,0-19-16,0 19 15,0-19-15,0 1 16,0-1-16,0 1 16,17 0-16,1 17 15,0-17 1,-18-1-16,-18-17 15,0 0 1,1 0-16,-1 0 0,0-17 16,-17 17-1,0-18-15,17 18 0,1 0 16</inkml:trace>
   <inkml:trace contextRef="#ctx0" brushRef="#br0" timeOffset="191940.2034">25277 11977 0,'52'88'15,"-104"-176"-15,140 229 16,-53-18-16,0-70 15,1 71-15,-36-54 16,0-34-16,0 17 0,0-18 16,0 0-16,-18-17 15,0 35-15,1-53 16,-19 17-16</inkml:trace>
   <inkml:trace contextRef="#ctx0" brushRef="#br0" timeOffset="192885.6532">25947 12277 0,'0'0'0,"-18"0"0,18-18 16,-17 18-16,-19 0 15,19 18-15,-1 17 16,-17 18-16,17 0 15,0 35-15,18-35 16,18 35-16,0-53 16,35 36-1,-18-53-15,18-1 16,-18-17-16,0-17 16,1-1-16,17-35 15,-36 18-15,1-1 0,-1 1 16,-17 0-16,0-18 0,-17-35 15,-18 53-15,-36-54 16,36 54-16,-53 0 16,52 35-16,-17 17 15,36 1-15,-19 53 16,54-18 0,17 17-16,1-35 0,-1-17 15,18 17-15,-18-17 16,36 0-16,-54-18 15,19 0-15,-19 0 16</inkml:trace>
-  <inkml:trace contextRef="#ctx0" brushRef="#br0" timeOffset="193318.828">26264 12665 0,'36'17'31,"-19"-17"-31,19 0 16,-19 0-16,18 0 15,-17 0-15,-18-17 16</inkml:trace>
+  <inkml:trace contextRef="#ctx0" brushRef="#br0" timeOffset="193318.8279">26264 12665 0,'36'17'31,"-19"-17"-31,19 0 16,-19 0-16,18 0 15,-17 0-15,-18-17 16</inkml:trace>
   <inkml:trace contextRef="#ctx0" brushRef="#br0" timeOffset="193518.9852">26317 12594 0,'0'35'16,"-17"-17"-16,17 17 16,0 1-16,17 17 15,19-36-15,16 1 16,-34-1-16,53-17 15,-54 0-15,36-17 16,-18-1-16</inkml:trace>
   <inkml:trace contextRef="#ctx0" brushRef="#br0" timeOffset="193964.0024">26793 11853 0,'0'0'0,"0"36"15,-17 17-15,-1-36 16,18 18-16,0-17 0,0 0 16,0-1-16,18 1 15</inkml:trace>
-  <inkml:trace contextRef="#ctx0" brushRef="#br0" timeOffset="194109.1516">26952 11959 0,'0'71'15,"0"-142"-15,-17 159 0,-1-17 16</inkml:trace>
+  <inkml:trace contextRef="#ctx0" brushRef="#br0" timeOffset="194109.1515">26952 11959 0,'0'71'15,"0"-142"-15,-17 159 0,-1-17 16</inkml:trace>
   <inkml:trace contextRef="#ctx0" brushRef="#br0" timeOffset="197234.3908">14323 13070 0,'17'0'16,"36"0"0,-17 0-1,17 0-15,17 0 0,1-17 16,17 17-16,0 0 0,106-18 16,-123 18-16,52 0 15,-70 18-15,0-1 16</inkml:trace>
   <inkml:trace contextRef="#ctx0" brushRef="#br0" timeOffset="200292.8758">5398 13635 0,'0'18'15,"0"-1"-15,17 71 16,1-35-1,-18 0-15,17 0 0,1 18 16,17 52-16,-17-70 16,17 18-16,-17-54 15,0 1-15,-18-36 16,17-52 0,-17 34-1,0-52-15,0 35 16,0 0-16,-17-35 15,17 53-15,0-18 16,0 35-16,0 1 16,0 34-1,0 1-15</inkml:trace>
   <inkml:trace contextRef="#ctx0" brushRef="#br0" timeOffset="200831.4735">5874 14217 0,'-18'0'16,"0"-18"-16,1 1 16,-1 17-1,1 17 1,17 19 0,-18-19-16,18 19 15,0-1-15,18 0 16,-1-17-1,1-1-15,-1-17 16,19-35-16,-19 0 16,1 0-16,-18-1 0,18 1 15,-18 0-15,0-36 16,0 36-16,-18 0 0,18-1 16,-35 1-1,17 17-15,0 18 16,18 18-1,0 53 1,18-19-16,0-16 0,-1 17 16,1-18-16,35 36 15,-18-36-15,1-18 0,-1 1 16,-18 0-16,19-18 16,-19 0-16,1-18 0</inkml:trace>
   <inkml:trace contextRef="#ctx0" brushRef="#br0" timeOffset="201160.6115">6103 14005 0,'18'88'15,"-36"-176"-15,53 229 0,-17-88 0,17-17 16,-17-1-16,17 35 15,-35-52-15,18-18 0,-18 18 16,17-18 0,1-18-16,-18 0 0,0 1 15,18-1-15,-1 1 16,1 17 0,-18 17-1,-18 1 1,1-18-1,-19 0-15,19 0 0,-1 0 16,-17 0-16</inkml:trace>
-  <inkml:trace contextRef="#ctx0" brushRef="#br0" timeOffset="201488.4291">6844 14041 0,'35'0'16,"-17"17"-16,35-17 16,-18 0-16,0 0 15,1-17-15,-19 17 0,1 0 16</inkml:trace>
+  <inkml:trace contextRef="#ctx0" brushRef="#br0" timeOffset="201488.429">6844 14041 0,'35'0'16,"-17"17"-16,35-17 16,-18 0-16,0 0 15,1-17-15,-19 17 0,1 0 16</inkml:trace>
   <inkml:trace contextRef="#ctx0" brushRef="#br0" timeOffset="201616.0263">6879 14199 0,'53'18'0,"-35"-18"15,17 0-15,-17 0 16,17 0-16,0 0 15</inkml:trace>
   <inkml:trace contextRef="#ctx0" brushRef="#br0" timeOffset="202271.4428">8008 14764 0,'0'0'15,"-35"-18"-15,17 18 0,-17-35 16,0-36-16,-1-52 15,36 52-15,-17 1 0,17-89 16,0 71 0,17-53-16,1 88 15,0 0-15,17 0 16,-17 35-16,-1 18 16,1 0-16,-1 0 0,-17 18 0,18 0 15,-18 52 1,0-35-16,-18 36 15,18-53-15,0 17 0,18-18 16,17 1 0,-17-18-16,0 0 15,-1 18 1,-17-1-16,-17 1 0,-1 0 16,0-1-16,-17 19 0,0-19 15,-36 19-15,54-36 16,-19 17-1,36-34 1,18 17-16,35-36 16</inkml:trace>
   <inkml:trace contextRef="#ctx0" brushRef="#br0" timeOffset="202805.0863">8608 13917 0,'0'0'0,"0"53"15,0-18-15,17 36 16,1-36-16,0 0 16,-1 1-16,1-1 15,35 0-15,-35-35 16,-1 18-16,1-36 16,-18-35-1,0 0-15,0 0 16,0 18-16,-18 0 0,18-53 15,0 52 1,0-34-16,0 52 16,0 36-1,18 35 1</inkml:trace>
@@ -1072,7 +1072,7 @@
   <inkml:trace contextRef="#ctx0" brushRef="#br0" timeOffset="206967.1879">12188 13811 0,'0'0'0,"0"53"16,18 0-16,0 0 0,-1 70 15,1-70 1,-18 0-16,18-17 0,-1-1 16,1 0-16,0 0 0,17-17 15</inkml:trace>
   <inkml:trace contextRef="#ctx0" brushRef="#br0" timeOffset="207126.8013">12488 14058 0,'18'0'0,"17"0"15,-17-17-15,35 17 16,-36 0-16,19 0 15,-19 17-15</inkml:trace>
   <inkml:trace contextRef="#ctx0" brushRef="#br0" timeOffset="207556.3309">12876 14552 0,'18'35'16,"-36"-70"-16,54 70 0,-36-70 16,0-18-1,0 18-15,0-18 0,0-35 16,0 35-16,0-53 16,0 53-16,0-35 15,0 70-15,17 1 16,1 17-1,17 17-15,-35 1 16,18 35-16,0-36 16,-18 36-16,17-53 15,-17 36 1,0-19-16,0 1 16,18-18-1,-18 18-15,17-1 16,-17 1-1,-17-18 1,-1 0 0,1 0-16,-19 0 15,19-18-15</inkml:trace>
-  <inkml:trace contextRef="#ctx0" brushRef="#br0" timeOffset="207800.3715">13053 13705 0,'17'18'16,"19"53"0,-1-36-16,53 53 15,-53-35-15,1 0 0,-19 0 16,1-18-16,0 53 15,-18-52-15,-36 34 16,19-52-16,-19-1 16,-16 19-16,34-19 15,0-17-15,1 0 16</inkml:trace>
+  <inkml:trace contextRef="#ctx0" brushRef="#br0" timeOffset="207800.3714">13053 13705 0,'17'18'16,"19"53"0,-1-36-16,53 53 15,-53-35-15,1 0 0,-19 0 16,1-18-16,0 53 15,-18-52-15,-36 34 16,19-52-16,-19-1 16,-16 19-16,34-19 15,0-17-15,1 0 16</inkml:trace>
   <inkml:trace contextRef="#ctx0" brushRef="#br0" timeOffset="209062.2305">12876 13970 0,'18'18'31,"0"-18"-31,-1 0 16,-17-18 31,0 0-31,0 1-16,0-19 15,0 19 1,0-18-16,18 17 15,0 18 1,-1 0 0,1 18-1,0-1 1,-1-17-16,-17 18 16,0-1-16,18 1 0,-18 0 15,0-1-15,-18 1 16,1 0-16,-1-18 15,0 0 1,1 0 0,-1 0-16,0 17 15,36-17 1</inkml:trace>
   <inkml:trace contextRef="#ctx0" brushRef="#br0" timeOffset="209818.5404">14146 14111 0,'-17'-35'0,"-1"17"15,-17 1 1,0-1-16,17 0 15,-17 18-15,-1 0 0,1 0 0,0 0 16,17 18-16,-17-18 0,-18 53 16,35-18-16,1 18 15,17-35-15,0 35 16,17-18-16,1-35 16,0 18-16,-1-18 15,36 0-15,-18-18 16,18-35-16,-35 18 15,0-36 1,-1 18-16,-17-35 16,0 53-16,0-18 15,-17 18-15,17-1 0,-18-17 0,0 18 16,-17-35-16,17 52 16,1-17-16,17 52 15,0 36 1,0-18-16,17 89 15,1-54-15,53 36 16,-36-53-16,35 18 16,-52-54-16,53 19 15,-54-19-15,19-17 16,-19 0-16</inkml:trace>
   <inkml:trace contextRef="#ctx0" brushRef="#br0" timeOffset="210275.1461">14270 13723 0,'18'106'16,"-18"-53"-16,35 53 15,-18-53-15,1 35 16,0-53 0,-1 0-16,-17-17 15,18-36 1,17-35-1,1 18 1,-1 17-16,-18 18 0,19 0 16,34 18-16,-34 0 15,-1 17-15,-35 0 16,0 1-16,0-19 16,-18 1-16,1 0 15,-19-1-15,1-17 0,-36 18 16,36-18-16,-18-18 15,36 1-15,-1-1 16,0 0 0</inkml:trace>
@@ -1097,10 +1097,10 @@
   <inkml:trace contextRef="#ctx0" brushRef="#br0" timeOffset="237141.1732">16140 16616 0,'53'0'15,"-18"0"-15,53-18 16,-53 1-16,53-1 15,-70 18-15,0 0 16,-1 0 0</inkml:trace>
   <inkml:trace contextRef="#ctx0" brushRef="#br0" timeOffset="237809.3448">17145 16228 0,'18'17'0,"-18"1"16,0 35-16,0 70 15,-18-70-15,0 18 0,-35 35 16,18-53-16,-35 35 15,34-70 1,-34-1-16,35-17 16,-18-17-16,35-19 15,0-34-15,36 34 16,17-34-16,1 52 16,34-17-1,-17 35-15,35 18 16,-35 17-16,35 35 15,-52-52-15,34 53 16,-52-54-16,-1 19 16,1-19-16,-18 1 0,0 17 15,-18-35 1</inkml:trace>
   <inkml:trace contextRef="#ctx0" brushRef="#br0" timeOffset="239309.9077">17586 16122 0,'18'0'16,"-1"53"-16,1-18 15,35 106-15,-36-53 16,36 54-16,-35-72 16,35 36-16,-35-53 15,-1-18-15,36-17 16,-35-18-16,17-18 16,-35-17-16,18 0 15,-18-54-15,0 36 16,0 18-16,-18-88 15,18 70-15,-18 0 0,1-53 16,17 71-16,0-18 16,0 35-1,-18 36 1</inkml:trace>
-  <inkml:trace contextRef="#ctx0" brushRef="#br0" timeOffset="239893.9294">18433 16704 0,'-18'-18'0,"-17"1"16,-1 17-1,-16 17 1,16 36-16,19 0 15,17-17-15,17 16 16,-17-34-16,18 0 16,35 17-16,-18-35 15,-17 0-15,-1 0 0,1 0 16,35-18-16,-53 1 16,18-36-1,-18 18-15,0-54 16,-18 54-16,0-53 15,1 35-15,-19-35 16,19 70-16,-19-17 16,19 35-16,-1 17 15,18 19-15,0 34 16,0-17-16,35 35 16,-17-52-16,53 52 15,-36-53-15,53 18 16,-53-35-1,18-1-15,-35 1 16,0-18-16</inkml:trace>
+  <inkml:trace contextRef="#ctx0" brushRef="#br0" timeOffset="239893.9293">18433 16704 0,'-18'-18'0,"-17"1"16,-1 17-1,-16 17 1,16 36-16,19 0 15,17-17-15,17 16 16,-17-34-16,18 0 16,35 17-16,-18-35 15,-17 0-15,-1 0 0,1 0 16,35-18-16,-53 1 16,18-36-1,-18 18-15,0-54 16,-18 54-16,0-53 15,1 35-15,-19-35 16,19 70-16,-19-17 16,19 35-16,-1 17 15,18 19-15,0 34 16,0-17-16,35 35 16,-17-52-16,53 52 15,-36-53-15,53 18 16,-53-35-1,18-1-15,-35 1 16,0-18-16</inkml:trace>
   <inkml:trace contextRef="#ctx0" brushRef="#br0" timeOffset="240356.5076">18680 16457 0,'0'0'16,"0"-18"-16,17 36 15,-17 53 1,18-18-16,-18 35 16,18-35-16,-18-18 15,17 18-15,1 0 16,-1-36-16,1 1 16,0-36-1,-1-17-15,1 18 16,0-1-16,-1 0 15,19 18-15,-19 0 16,1 36-16,-18-1 16,0 0-16,-18-17 15,1-1-15,-19 19 16,1-36-16,-18 0 16,35 0-16,-17-18 15,18 0-15,17 1 0,-18-1 16</inkml:trace>
   <inkml:trace contextRef="#ctx0" brushRef="#br0" timeOffset="269285.9538">17956 9384 0,'-17'0'16,"-1"18"-16,18-36 78,0 0-63,0 1-15,18-36 16,-18 17 0,35-69-16,-17 34 0,-1 0 15,19-70 1,-19 53-16,1-88 15,0 88-15,-18-1 0,17 19 16,1-54 0,-18 71-16,0 1 0,17 16 15,-17 1-15,0 0 16,0 17-16,0 0 16,0 1-16,0 34 78</inkml:trace>
-  <inkml:trace contextRef="#ctx0" brushRef="#br0" timeOffset="269591.6583">17956 7973 0,'0'0'16,"0"-35"-16,0 17 0,0-35 15,18 18-15,-18 17 16,18-17-16,17-18 16,-35 35-16,18 1 15,-1-1-15,1-17 16,0 17-16,-1 18 15,1 18 1,-18 35-16,0-36 16,17 71-16,-17-52 15,0-1-15,0-17 0,18-1 16,-18 1-16,18 0 16,-1-1-16,-17 1 0,36 17 15</inkml:trace>
+  <inkml:trace contextRef="#ctx0" brushRef="#br0" timeOffset="269591.6582">17956 7973 0,'0'0'16,"0"-35"-16,0 17 0,0-35 15,18 18-15,-18 17 16,18-17-16,17-18 16,-35 35-16,18 1 15,-1-1-15,1-17 16,0 17-16,-1 18 15,1 18 1,-18 35-16,0-36 16,17 71-16,-17-52 15,0-1-15,0-17 0,18-1 16,-18 1-16,18 0 16,-1-1-16,-17 1 0,36 17 15</inkml:trace>
   <inkml:trace contextRef="#ctx0" brushRef="#br0" timeOffset="270052.481">18221 7902 0,'18'18'16,"-1"0"-16,1 52 15,0-17-15,-1-18 16,36 89-16,-35-71 16,17 88-1,0 0-15,-35-71 16,18 1-16,0 0 15,-1-19-15,1 1 0,-1 18 16,1-53-16,0-1 0,-1 1 16,-17-1-16,18-17 15,-18-17 1</inkml:trace>
   <inkml:trace contextRef="#ctx0" brushRef="#br0" timeOffset="270319.1855">18450 8855 0,'0'17'16,"0"1"-16,18 17 15,0 1-15,-1 34 16,18 18 0,-17-52-16,-18-1 0,18-17 0,-1-1 15,19 1-15,-19-18 16,1 0-1,-18-18-15,18 1 16,-1-19-16,-17 1 0,0 17 16,0-17-16,0 0 0,0-36 15,0 54-15,0-1 16</inkml:trace>
   <inkml:trace contextRef="#ctx0" brushRef="#br0" timeOffset="270664.3603">18609 9119 0,'0'0'15,"0"-17"1,35-36-16,-35 17 16,18-16-16,0-54 15,-18 53-15,17-71 16,-17 54-16,0-89 16,0 88-16,0-52 15,0 70-15,18-35 16,-18 53-16,18-18 15,-18 35 1,17 0-16</inkml:trace>
@@ -1123,18 +1123,18 @@
   <inkml:trace contextRef="#ctx0" brushRef="#br2" timeOffset="313384.9746">9684 5009 0,'0'0'16,"17"0"-1,19-35 1,17 35-16,35-53 15,-18 18 1,54-18-16,-54 18 16,54 0-16,-71 17 15,53 0 1,-71 1-16,0 17 0,-17 0 16,-1-18-16,-34 18 31,-1 18-31,1-18 15,-1 0 1</inkml:trace>
   <inkml:trace contextRef="#ctx0" brushRef="#br2" timeOffset="313664.429">10336 4657 0,'18'0'16,"17"0"-16,-17-18 0,53 0 16,-36 18-16,35 0 15,-34 18-15,17 0 16,-36-1 0,1-17-16,-1 18 15,-17 0-15,0-1 16,-17-17-16,-1 18 0,1 0 15,-1-18-15,0 17 0,1 1 16,-1-18-16,36 0 16</inkml:trace>
   <inkml:trace contextRef="#ctx0" brushRef="#br2" timeOffset="314313.7576">10848 4763 0,'18'0'125,"-1"0"-109,1 0-1,-1 17-15,36-17 16,-35 18 0,70-18-16,-52 0 15,16 17-15,72 1 16,-71-18-16,0 0 0,0 18 16,0-18-16,-18 0 15,18 0-15,-36 0 0,19 0 16,-1 0-16,-17 0 0,-1 0 15,1 0-15,0-18 16,-18 0 31</inkml:trace>
-  <inkml:trace contextRef="#ctx0" brushRef="#br2" timeOffset="314671.156">11642 4763 0,'17'0'16,"19"0"-1,-1 17 1,0-17-16,0 18 0,-17-1 15,53 1-15,-36-18 16,35 18-16,-52-1 16,35 1-1,-35-18-15,-1 0 0,-17 18 16,0-1 0,-17 1-1,-1-18-15,0 18 16,1-1-16,-1-17 15,18 18-15,-18-1 16,18 1 0,-17-18-16</inkml:trace>
+  <inkml:trace contextRef="#ctx0" brushRef="#br2" timeOffset="314671.1559">11642 4763 0,'17'0'16,"19"0"-1,-1 17 1,0-17-16,0 18 0,-17-1 15,53 1-15,-36-18 16,35 18-16,-52-1 16,35 1-1,-35-18-15,-1 0 0,-17 18 16,0-1 0,-17 1-1,-1-18-15,0 18 16,1-1-16,-1-17 15,18 18-15,-18-1 16,18 1 0,-17-18-16</inkml:trace>
   <inkml:trace contextRef="#ctx0" brushRef="#br2" timeOffset="315586.7137">12136 4886 0,'17'-18'47,"36"1"-32,-35 17-15,17-18 0,0 0 16,1 18-16,52-17 16,-35-1-16,0 18 15,35-17-15,-35-1 16,35 0-16,-53 1 15,18-1-15,-35 18 16,17-18 0,-53 18 31</inkml:trace>
   <inkml:trace contextRef="#ctx0" brushRef="#br2" timeOffset="315916.0697">12700 4621 0,'0'0'0,"18"-17"31,-1 17-16,1 0-15,0 0 16,17 0-16,-18 0 0,19 17 0,-19-17 16,36 0-1,-35 0-15,17 0 16,-17 18-16,-36 0 47,1-1-47,-1 1 15,0 0 1,18-1-16,-17-17 16,17 18-16,-18-18 15</inkml:trace>
   <inkml:trace contextRef="#ctx0" brushRef="#br2" timeOffset="316730.2131">13088 4727 0,'-18'-17'16,"1"17"-16,-1 0 15,36 0 16,-1 0-15,1 0 0,0 0-16,-1 0 15,19 0-15,-19 0 16,1 0-16,52 0 16,-34 17-16,87-17 15,-70 0-15,88 18 16,-70-18-16,52 18 15,-70-18-15,35 0 16,-52 0-16,-1 17 16,-53-34 15,1 17-15,17-18-16,-36 18 15,36-18-15</inkml:trace>
-  <inkml:trace contextRef="#ctx0" brushRef="#br2" timeOffset="317090.1627">13758 4639 0,'-17'-18'16,"17"36"15,17-18-15,1 18-16,17-1 16,-17-17-16,0 18 15,17 0-15,-18-1 0,1-17 16,17 36-16,-35-19 15,0 1 1,-17-18-16,-1 17 16,-35 19-1,36-36-15,-19 17 16,19-17-16,-1 18 0</inkml:trace>
-  <inkml:trace contextRef="#ctx0" brushRef="#br2" timeOffset="317783.6579">14164 4780 0,'0'0'16,"18"0"30,-1 0-30,1-17 0,0 17-16,-1 0 0,19 0 0,-1-18 15,0 18-15,71-18 16,-36 18-16,-17 0 16,0-17-16,53 17 15,0-18 1,-71 18-16,-17 0 0,0 0 15,-1-18-15,-34 18 16,-19 0 0,19 0-16,-1 0 15</inkml:trace>
+  <inkml:trace contextRef="#ctx0" brushRef="#br2" timeOffset="317090.1626">13758 4639 0,'-17'-18'16,"17"36"15,17-18-15,1 18-16,17-1 16,-17-17-16,0 18 15,17 0-15,-18-1 0,1-17 16,17 36-16,-35-19 15,0 1 1,-17-18-16,-1 17 16,-35 19-1,36-36-15,-19 17 16,19-17-16,-1 18 0</inkml:trace>
+  <inkml:trace contextRef="#ctx0" brushRef="#br2" timeOffset="317783.6578">14164 4780 0,'0'0'16,"18"0"30,-1 0-30,1-17 0,0 17-16,-1 0 0,19 0 0,-1-18 15,0 18-15,71-18 16,-36 18-16,-17 0 16,0-17-16,53 17 15,0-18 1,-71 18-16,-17 0 0,0 0 15,-1-18-15,-34 18 16,-19 0 0,19 0-16,-1 0 15</inkml:trace>
   <inkml:trace contextRef="#ctx0" brushRef="#br2" timeOffset="318067.7294">14746 4586 0,'0'0'0,"18"0"15,17 0 1,-17 0-16,35 0 16,-36 0-16,1 0 15,0 18-15,-1-18 16,-17 17-1,0 1-15,0 17 16,-17-17 0,-1 0-16,18-1 15,0 1-15,-18-18 0,18 18 0,18-18 16</inkml:trace>
   <inkml:trace contextRef="#ctx0" brushRef="#br2" timeOffset="318480.9122">15028 4727 0,'18'0'31,"17"18"-15,1-18-16,-1 0 0,18 0 15,-18 0-15,0 0 16,-17 0-16,17 0 16,-35-18 15</inkml:trace>
   <inkml:trace contextRef="#ctx0" brushRef="#br2" timeOffset="318719.3101">15205 4604 0,'17'0'15,"1"17"1,17 1-16,1 17 15,-19-17-15,1 0 16,-1 17 0,-17-17-16,0-1 15,0 1-15,-17 17 16,-1-17-16,-17 17 0,17-17 16,1-1-16,-1 1 15,-17 17-15,-1-17 0</inkml:trace>
   <inkml:trace contextRef="#ctx0" brushRef="#br2" timeOffset="329785.033">6279 4833 0,'-17'0'0,"17"-18"15,0 1 1,-18 17-16,18-18 16,-17 18-16,-1 0 15,0 0 1,1 0 15,17-17-15,-18 17-1,0 0-15,1 0 16,-1 0 0,18 17-16,-18-17 0,1 18 15,17-1 1,17 1-1,19 0-15,34 17 16,-17-17 0,0 17-16,18-17 0,-1 17 15,1 0-15,88 36 16,-71-36-16,-18 0 0,1-17 16,70 17-1,-35 0-15,-71-35 0,-17 18 16,17-18-16,-17 18 15,-36-1 1,0-17 0</inkml:trace>
-  <inkml:trace contextRef="#ctx0" brushRef="#br2" timeOffset="330046.6622">7020 5027 0,'18'35'15,"0"-35"-15,-1 18 0,54 17 16,-54-17-16,54 17 16,-36-17-16,18 17 15,-53 0 1,0 1-16,0-19 15,-35 1-15,-36 17 16,-17 1-16,53-19 16,-18 1-16,0-18 0,18 0 15,-18 0-15</inkml:trace>
-  <inkml:trace contextRef="#ctx0" brushRef="#br2" timeOffset="330625.145">5256 5803 0,'-17'18'15,"34"-36"-15,-34 18 16,52-35-1,-17 0-15,52-36 16,-17 36-16,-18-18 0,18 18 16,71-71-16,-54 53 15,71-71 1,-70 54-16,53-18 16,-89 52-16,0-17 15,-17 53-15,-36 0 16,-17 36-1</inkml:trace>
+  <inkml:trace contextRef="#ctx0" brushRef="#br2" timeOffset="330046.6621">7020 5027 0,'18'35'15,"0"-35"-15,-1 18 0,54 17 16,-54-17-16,54 17 16,-36-17-16,18 17 15,-53 0 1,0 1-16,0-19 15,-35 1-15,-36 17 16,-17 1-16,53-19 16,-18 1-16,0-18 0,18 0 15,-18 0-15</inkml:trace>
+  <inkml:trace contextRef="#ctx0" brushRef="#br2" timeOffset="330625.1449">5256 5803 0,'-17'18'15,"34"-36"-15,-34 18 16,52-35-1,-17 0-15,52-36 16,-17 36-16,-18-18 0,18 18 16,71-71-16,-54 53 15,71-71 1,-70 54-16,53-18 16,-89 52-16,0-17 15,-17 53-15,-36 0 16,-17 36-1</inkml:trace>
   <inkml:trace contextRef="#ctx0" brushRef="#br2" timeOffset="330886.1831">5909 4886 0,'0'0'0,"18"18"15,-1-1 1,19 1-16,-19-18 0,71 18 16,-52-18-1,-1 0-15,18 0 0,-35 0 16,17 0-16,-18 17 16,1 1-16,-36 52 15,1-34-15,-1-1 16,1-17-16,-1 17 0,0 0 15,18-17-15,18 17 16</inkml:trace>
   <inkml:trace contextRef="#ctx0" brushRef="#br1" timeOffset="351746.0812">29069 1517 0,'0'-18'0,"-35"-17"15,17 17-15,-17 1 16,-1-1-16,-16 0 0,-1 1 0,0-1 15,0-17-15,-88 17 16,52 1-16,1 17 0,-123 0 16,-36 0-1,141 17-15,-88 19 16,106-19-16,-54 54 16,72-36-16,17 18 15,0-18-15,0 18 16,0-18-16,0 54 15,53-54-15,0 53 16,18-53-16,53 71 16,-19-71-16,1 18 15,36-17-15,87 17 16,-70-36-16,123 36 16,-105-18-16,17-17 0,0 0 15,141-1-15,-141-17 16,0 0-16,124-35 15,-142 0-15,-17 17 0,53-52 16,-106 17 0,0-36-16,-53 37 15,-36-72-15,-16 54 16,-72-54-16,36 71 16,-106-53-1,88 71-15,-88-18 0,88 53 16,18 0-1,0 0-15,17 0 0</inkml:trace>
   <inkml:trace contextRef="#ctx0" brushRef="#br1" timeOffset="353242.2254">27040 2064 0,'18'0'46,"-18"17"1,0 1-31,0 0-16,0-1 16,0 1-16,18 0 15,-18-1-15,0 1 0,0 35 16,17-36-16,-17 54 15,18-36-15,0 36 16,-1-18 0,19 17-16,-19-34 15,36 34-15,-18-35 16,1 1-16,-1-1 0,0 0 16,71 36-1,-71-36-15,71 18 16,-53-18-16,53 1 15,-36-19-15,72 18 16,-72-35-16,107 18 16,-107-18-16,106 0 15,-87-18-15,-19 18 16,1-17-16,52-1 16,-52 18-16,-18-17 15,0-1-15,0 0 0,-1-17 0,-16 17 16,17-17-16,52-35 15,-52 17-15,0 0 16,0 0-16,18-53 16,-36 35-16,18-17 15,-53 35-15,18-17 16,-18 34-16,0-16 16,0 34-16,0 0 15,0 1-15,17-19 16,-17 19-16,0-1 15</inkml:trace>
@@ -1142,17 +1142,17 @@
   <inkml:trace contextRef="#ctx0" brushRef="#br1" timeOffset="354439.0164">27270 2787 0,'17'0'15,"1"0"-15,0 0 16,-1 0-1,19 0 1,16 18 0,-16-1-16,70 19 15,-36-19-15,89 18 16,-71 1-16,141-1 16,-123-35-16,124 18 15,-107-18-15,36-18 16,-89 0-1,36 1-15,-71-1 16,1 0-16,-19 18 16,-17-17-16,0-1 15,-17 1-15,-1 17 0,18-18 16,-35 18-16</inkml:trace>
   <inkml:trace contextRef="#ctx0" brushRef="#br1" timeOffset="354878.0445">27252 2381 0,'53'0'15,"18"18"1,-19-18-16,72 35 16,-53-17-16,-1 17 0,18 0 15,18-17-15,106 53 16,-89-36-16,124-18 16,-106 1-16,-17-18 0,-1-18 15,-17 1-15,-18-1 0,0-17 16,-52 17-1,-36-35-15</inkml:trace>
   <inkml:trace contextRef="#ctx0" brushRef="#br1" timeOffset="355861.9745">27834 1411 0,'-17'0'16,"-1"0"-1,18 18-15,-35-1 16,17 19 0,0-19-16,18 1 0,-53 53 15,36-19-15,-36 72 16,18-54-16,-1 54 16,19-71-16,17 35 15,-18-53 1,18 18-16</inkml:trace>
-  <inkml:trace contextRef="#ctx0" brushRef="#br1" timeOffset="356523.1677">28099 1411 0,'0'18'31,"-18"17"-31,0 0 16,1 18-16,-1 53 16,18-53-16,-35 70 15,0-52-15,17-18 16,0-18-16,1 18 0,17-18 0,-18 18 15,18-35 1,0 0-16,0-1 16</inkml:trace>
+  <inkml:trace contextRef="#ctx0" brushRef="#br1" timeOffset="356523.1676">28099 1411 0,'0'18'31,"-18"17"-31,0 0 16,1 18-16,-1 53 16,18-53-16,-35 70 15,0-52-15,17-18 16,0-18-16,1 18 0,17-18 0,-18 18 15,18-35 1,0 0-16,0-1 16</inkml:trace>
   <inkml:trace contextRef="#ctx0" brushRef="#br1" timeOffset="356862.5818">28469 1411 0,'0'0'0,"0"53"16,0-18-16,-17 54 16,-1-19-16,-35 54 15,18-54-15,-18 71 16,35-88 0,-17 35-16,35-52 15,0-19-15,0 1 0,18-18 16</inkml:trace>
   <inkml:trace contextRef="#ctx0" brushRef="#br1" timeOffset="357085.3406">28804 1517 0,'0'35'16,"-17"1"-16,-36 52 16,17-35-16,-16 70 15,34-70-15,-17 35 16,17-53-16,18 18 16,0-35-1</inkml:trace>
   <inkml:trace contextRef="#ctx0" brushRef="#br1" timeOffset="357274.5685">29192 1764 0,'18'70'16,"-36"-140"-16,36 193 0,-18-87 0,-18 69 15,18-69-15,-17 17 16,17-18-16,-36 36 16</inkml:trace>
   <inkml:trace contextRef="#ctx0" brushRef="#br1" timeOffset="358353.4956">27252 1993 0,'0'0'0,"18"-17"0,35-36 16,-18 17-16,35 1 15,-34 0-15,87 0 16,-35 17-16,106 0 16,-88 1-16,177-1 15,-142 18 1,141 18-16,-141-1 16,53 36-16,-141-18 15,-18 1-15,0-1 0,-35 0 16</inkml:trace>
-  <inkml:trace contextRef="#ctx0" brushRef="#br1" timeOffset="359064.7027">27746 2134 0,'18'-17'0,"-1"17"15,19 0-15,34-18 16,-35 18-16,106-18 15,-70 18-15,35 0 0,88 0 16,-71 0-16,-17 18 16,106 35-1,-124-18-15,-35 1 0,0-1 16,-18-18-16,0 19 0</inkml:trace>
+  <inkml:trace contextRef="#ctx0" brushRef="#br1" timeOffset="359064.7026">27746 2134 0,'18'-17'0,"-1"17"15,19 0-15,34-18 16,-35 18-16,106-18 15,-70 18-15,35 0 0,88 0 16,-71 0-16,-17 18 16,106 35-1,-124-18-15,-35 1 0,0-1 16,-18-18-16,0 19 0</inkml:trace>
   <inkml:trace contextRef="#ctx0" brushRef="#br1" timeOffset="365426.988">14235 11712 0,'17'-17'16,"-17"34"15,0 1-31,0 0 15,-17 52-15,17-35 16,-36 54 0,19-37-16,-36 54 15,17-18-15,-34 71 16,35-53-16,-54 88 16,37-88-16,-37 88 15,54-106-15,-53 71 16,53-71-16,-36 53 15,36-70-15,-18 52 16,18-52-16,17-18 16,-35 70-16,0-35 15,35-35-15,-17-17 16,0 16 0,17-16-16,1-1 0,17-17 15,0 52-15,0-52 16,35 35-16,0-53 15,36 35-15,-36-35 16,88 0 0,-70 18-16,18-18 0,17 0 15,-17 0-15,105 0 16,-70 0-16,106 0 16,-107-18-16,125 0 15,-124 1-15,70-36 16,-88 18-16,53-18 15,-88 35-15,0 0 16,0-17-16,-35 35 16,-18-18-16,35 1 15,-17-36 1,-18 35-16,17-17 0,18-141 16,1 17-1,-19 71-15,19-142 16,-19 89-16,1 18 15,35-159-15,-35 140 16,34-87 0,-34 141-16,17-53 15,-35 88-15,18-18 16,0 36-16,-18 0 16,0 17-16,0-17 15,-36 0-15,-34-1 16,-1 19-16,-17-1 0,-106-17 15,53 35-15,-141 0 16,141 17-16,-159 36 16,176-17-16,-17 17 15,106-18-15</inkml:trace>
   <inkml:trace contextRef="#ctx0" brushRef="#br1" timeOffset="366011.1033">14411 14781 0,'-18'36'16,"36"-72"-16,-36 89 0,18 36 16,0-37-16,36 54 15,-1-70 1,18 52-16,-18-53 16,53 0-16,18-17 15,0-18 1,-53 0-16,-18-18 15,53-35 1,-70 18-16</inkml:trace>
   <inkml:trace contextRef="#ctx0" brushRef="#br1" timeOffset="366300.275">14111 15028 0,'35'-35'16,"1"0"-16,-1 17 15,53-52 1,-35 34-16,-18-17 0,1 18 16,-1 0-16,-17 0 0,17-1 15,-18 1-15,-17 17 16,18 18-16,0 18 15,-1 35 1,19-35 0,17 34-16,-18-16 15,35-19-15</inkml:trace>
   <inkml:trace contextRef="#ctx0" brushRef="#br1" timeOffset="367030.8383">15716 14958 0,'-35'-35'16,"70"70"-16,-105-70 0,34 35 15,1 17-15,-18 36 16,36-35-16,-36 70 16,53-53-16,-18 36 15,18-36-15,35 0 16,-17-35-16,53 0 15,-36 0-15,18-35 16,-36 0-16,19 17 16,-19-52-1,-17 52-15,18-17 0,-18 17 16,0-17-16,-18 52 31,18 36-15,18-35-16,0 35 15,-1-36-15,36 19 16,-35-19-16,35 1 16,-18-18-16</inkml:trace>
-  <inkml:trace contextRef="#ctx0" brushRef="#br1" timeOffset="367256.6119">16087 14887 0,'-36'0'15,"72"0"-15,-89 18 0,35 17 0,-17 36 16,17-36-16,18 0 16,0 36-16,0-54 15,53 36 1,-18-53-16,-17 18 0,17-18 15,1 0-15,17-18 16</inkml:trace>
+  <inkml:trace contextRef="#ctx0" brushRef="#br1" timeOffset="367256.6118">16087 14887 0,'-36'0'15,"72"0"-15,-89 18 0,35 17 0,-17 36 16,17-36-16,18 0 16,0 36-16,0-54 15,53 36 1,-18-53-16,-17 18 0,17-18 15,1 0-15,17-18 16</inkml:trace>
   <inkml:trace contextRef="#ctx0" brushRef="#br1" timeOffset="367534.2217">16387 14923 0,'-18'0'16,"36"0"-16,-54 17 0,19 18 16,-1 1-16,0 17 15,18-18-15,0-17 16,18 34-1,0-34-15,17 0 16,-17-1-16,-1-17 0,18 0 16,-17 0-16,0 0 15</inkml:trace>
   <inkml:trace contextRef="#ctx0" brushRef="#br1" timeOffset="367936.1863">16633 15099 0,'0'0'16,"18"18"-16,0-18 0,-1 17 0,19-17 15,-19 0 1,1-17-16,0 17 0,-1-18 15,1 0-15,0-17 16,-18 17-16,-18 1 16,0-1-16,-35 0 15,18 18 1,17 18-16,1-18 16,17 18-16,-18 17 15,18 0-15,0-17 16,18 17-16,-1-17 0,1 17 0,0-17 15,52 17-15,-52-35 16,52 18 0,-34-18-16,17-18 15,-18 18-15,-17-18 0,-1 1 16</inkml:trace>
   <inkml:trace contextRef="#ctx0" brushRef="#br1" timeOffset="368201.6964">16951 14464 0,'0'18'16,"18"70"-1,-18-35-15,17 0 0,1-1 16,-18 19-16,18 53 16,-18-72-16,17 1 15,-17-17-15,18-1 0,-1 0 16,1 0-16,0-35 16,-1 0-16</inkml:trace>
@@ -1166,8 +1166,8 @@
   <inkml:trace contextRef="#ctx0" brushRef="#br1" timeOffset="383096.9639">9525 15081 0,'18'36'0,"-18"-1"16,17 53-16,1-53 15,0 36-15,-1-36 16,18 0-16,-17-35 15,-18 18 1,0-36-16,18-17 16,-18 17-16,-18-34 15,18 16-15,0 1 16,0 0-16,0-1 0,0-16 16,18 34-16,-1 0 15</inkml:trace>
   <inkml:trace contextRef="#ctx0" brushRef="#br1" timeOffset="383433.9232">9790 15258 0,'17'0'16,"1"0"-1,0 0-15,17-18 16,-35 0-16,17 1 16,-17-1-16,0 0 0,-17 1 15,-1 17 1,1 0-16,-19 17 16,36 1-16,-17 35 15,17 0 1,17 0-16,19-53 15,16 17-15,-34-17 16,17 0-16,-17 0 0,17-17 16,-17-1-16,0 1 15,-1 17 1,-17-18-16</inkml:trace>
   <inkml:trace contextRef="#ctx0" brushRef="#br1" timeOffset="383723.4449">10072 14799 0,'0'35'0,"17"-17"16,1 70-1,-18-35-15,18-18 0,-1 54 16,-17-54-16,0 0 16,18 0-16,-18 18 15,0-35-15</inkml:trace>
-  <inkml:trace contextRef="#ctx0" brushRef="#br1" timeOffset="383985.3668">10248 15205 0,'0'0'15,"0"35"-15,0-17 16,18-1-16,-1-17 15,19 0-15,-19 0 16,1-17-16,0 17 0,-18-18 16,17-17-1,-17 17-15,-17 0 16,-1 1-16,-17 17 16,17-18-16,0 18 15,1 0-15,-1 18 16</inkml:trace>
-  <inkml:trace contextRef="#ctx0" brushRef="#br1" timeOffset="384313.0567">10548 15099 0,'0'18'16,"-18"-1"-16,18 18 15,0-17 1,0 17-16,18-17 15,-18 0-15,35 17 16,-17-17-16,17-18 16,-17 0-1,0-18 1,-18 0-16,0 1 16</inkml:trace>
+  <inkml:trace contextRef="#ctx0" brushRef="#br1" timeOffset="383985.3667">10248 15205 0,'0'0'15,"0"35"-15,0-17 16,18-1-16,-1-17 15,19 0-15,-19 0 16,1-17-16,0 17 0,-18-18 16,17-17-1,-17 17-15,-17 0 16,-1 1-16,-17 17 16,17-18-16,0 18 15,1 0-15,-1 18 16</inkml:trace>
+  <inkml:trace contextRef="#ctx0" brushRef="#br1" timeOffset="384313.0566">10548 15099 0,'0'18'16,"-18"-1"-16,18 18 15,0-17 1,0 17-16,18-17 15,-18 0-15,35 17 16,-17-17-16,17-18 16,-17 0-1,0-18 1,-18 0-16,0 1 16</inkml:trace>
   <inkml:trace contextRef="#ctx0" brushRef="#br1" timeOffset="384424.1337">10707 15222 0,'17'36'16,"-34"-72"-16,34 89 0,1-35 0,0 0 15</inkml:trace>
   <inkml:trace contextRef="#ctx0" brushRef="#br1" timeOffset="384579.5393">10724 15046 0,'0'18'31,"36"-18"-15</inkml:trace>
   <inkml:trace contextRef="#ctx0" brushRef="#br1" timeOffset="384739.8404">10866 15134 0,'0'0'15,"35"-17"-15,-18-1 0,19 0 16,-19 18-16</inkml:trace>
@@ -1193,11 +1193,11 @@
   <inkml:trace contextRef="#ctx0" brushRef="#br1" timeOffset="405752.0045">4674 15540 0,'18'0'15,"0"0"-15</inkml:trace>
   <inkml:trace contextRef="#ctx0" brushRef="#br1" timeOffset="406245.9938">4674 15540 0,'71'0'15,"-142"0"-15,142-18 0,-89 18 16,18-17 0,0-1-16,0 0 15,18 1 1,-18-1-16,18 0 15,-1-17-15,-17 17 16,18 18 0,-1 0-1,-17 18 1,18-18 15,-36 0 16,18 18-47,-17-18 16,17 17-16,0 1 15,0 0-15,0-1 0,17 1 16,1 17 0,0-17-16,-1 0 15,-17-1 1,0-34-1,0-1-15,-17 0 16,17-35 0,-18 36-16,18-19 15,0 1-15,0 0 0,18 17 0,-18-17 16,17 35-16,1-18 16,0 18-16,-1 18 15,-17 0-15,18 34 16,0-34-1,-18 0-15</inkml:trace>
   <inkml:trace contextRef="#ctx0" brushRef="#br1" timeOffset="406419.3415">5062 15346 0,'0'0'0,"0"35"16,0-17-16,18 35 15,0-36 1,-1 1 0,-17-36-1</inkml:trace>
-  <inkml:trace contextRef="#ctx0" brushRef="#br1" timeOffset="406541.0667">5027 15240 0,'0'-18'16,"18"18"-16,-1 0 16,1 0-16,0 0 15</inkml:trace>
+  <inkml:trace contextRef="#ctx0" brushRef="#br1" timeOffset="406541.0666">5027 15240 0,'0'-18'16,"18"18"-16,-1 0 16,1 0-16,0 0 15</inkml:trace>
   <inkml:trace contextRef="#ctx0" brushRef="#br1" timeOffset="406723.7954">5239 15311 0,'-18'35'15,"36"-70"-15,-36 87 0,18-34 0,0 0 16,18 17-16,-1-35 16,1 18-16,0-1 0,17-17 15,-17 0-15,-1 0 16</inkml:trace>
   <inkml:trace contextRef="#ctx0" brushRef="#br1" timeOffset="406913.5263">5362 15258 0,'18'0'15,"0"0"-15,-1 0 16,18 0-16,-17 0 15,17 0 1,-17 0-16,-18-18 0</inkml:trace>
   <inkml:trace contextRef="#ctx0" brushRef="#br1" timeOffset="407074.9947">5450 15011 0,'18'70'16,"-18"-17"-16,0-18 0,18 18 15,-18 0-15,17-17 0,-17 16 16,18-16-16,0-1 16,-1-17-16</inkml:trace>
-  <inkml:trace contextRef="#ctx0" brushRef="#br1" timeOffset="407202.3412">5627 15293 0,'0'0'0,"17"18"0,-17 34 16,18-52-16</inkml:trace>
+  <inkml:trace contextRef="#ctx0" brushRef="#br1" timeOffset="407202.3411">5627 15293 0,'0'0'0,"17"18"0,-17 34 16,18-52-16</inkml:trace>
   <inkml:trace contextRef="#ctx0" brushRef="#br1" timeOffset="407353.0166">5627 15169 0,'17'0'16,"-34"0"-16,52 0 15,0 18 1</inkml:trace>
   <inkml:trace contextRef="#ctx0" brushRef="#br1" timeOffset="407608.9065">5803 15293 0,'0'0'16,"0"35"-16,18-35 15,-18 18-15,17-1 16,1 1-16,0-18 0,-1 0 15,1-18 1,-18-17 0,0 18-16,-18 17 15,18-18-15,-17 0 16,-1-17-16,0 35 16,18-18-1,18 18 1</inkml:trace>
   <inkml:trace contextRef="#ctx0" brushRef="#br1" timeOffset="407808.2856">6015 15311 0,'0'0'16,"0"-18"15,18 0-16,-1 1-15,1-1 0,-1 18 16,1 0-16,0 0 16,-1 0-1,1 18-15,-18 17 0,18 18 16</inkml:trace>
@@ -1266,7 +1266,7 @@
   <inkml:trace contextRef="#ctx0" brushRef="#br0" timeOffset="47080.511">22366 11871 0,'-18'-35'0,"36"70"0,-36-88 16,18 18-1,18 17-15,0 36 16,-18-1-16,35 89 15,-17-35 1,-1 17-16,1-17 0,0 17 16,-1 0-16,19-17 0,-19-1 15,1-17-15,17 18 16,-17-54-16,17-17 16,-35-17-16,35-36 15,-17 0-15,-18-53 16,0 35-16,-18-52 15,18 52-15,-17-17 16,-1 53-16,0 17 16,1 18-16,-1 35 15,0 1-15,1-1 16</inkml:trace>
   <inkml:trace contextRef="#ctx0" brushRef="#br0" timeOffset="47491.4235">22913 12418 0,'0'0'0,"-35"-18"0,17 18 15,-17 35-15,17-17 16,18 0-16,-18 17 15,18 0-15,0 1 0,0-1 16,18-18-16,0 1 16,17-18-16,0 0 15,1-35-15,-19 17 16,1 1-16,-18-19 16,17-34-16,-17 34 0,-35-52 15,35 53 1,-35 0-16,17 35 15,1-18-15,17 36 16,-18 35 0,18-18-16,18 53 15,-1-53-15,19 36 16,-1-36-16,18 18 16,-18-35-16,18 17 15,-35-35-15</inkml:trace>
   <inkml:trace contextRef="#ctx0" brushRef="#br0" timeOffset="47891.4622">23160 12330 0,'18'35'15,"-18"0"-15,0 36 16,17-18-16,1-18 15,17 35-15,-17-34 16,-1 17-16,1-53 16,0 17-1,-1-34-15,-17-1 16,0 0-16,0-35 16,0 36-16,0-1 15,18 18 1,0 0-16,-18 18 15,17-1-15,1 1 0,-1 0 16,36-1-16,-17-17 16,-19 0-16,1 0 0,35 0 15,-53-17-15,17-19 16,-34 19 0,-1-54-16,1 54 15,-36-36-15,35 35 16,-17-17-16</inkml:trace>
-  <inkml:trace contextRef="#ctx0" brushRef="#br0" timeOffset="49399.2696">21855 13141 0,'0'0'0,"-18"0"0,36 0 16,35 0-1,-1 0-15,107-18 16,-53 18-16,17-17 16,195-1-16,-159 18 15,211-35 1,-176 17-16,0 18 0,0-17 16,0-1-16,-17 18 0,-19-18 15,-34 1-15,52 17 16,-140 0-16,-36 0 15,-18 0-15</inkml:trace>
+  <inkml:trace contextRef="#ctx0" brushRef="#br0" timeOffset="49399.2695">21855 13141 0,'0'0'0,"-18"0"0,36 0 16,35 0-1,-1 0-15,107-18 16,-53 18-16,17-17 16,195-1-16,-159 18 15,211-35 1,-176 17-16,0 18 0,0-17 16,0-1-16,-17 18 0,-19-18 15,-34 1-15,52 17 16,-140 0-16,-36 0 15,-18 0-15</inkml:trace>
   <inkml:trace contextRef="#ctx0" brushRef="#br0" timeOffset="49811.8287">22507 13388 0,'18'18'16,"-36"-36"-16,36 53 0,0 36 15,-1-18-15,-17 88 16,0-71-16,0 54 15,0-71-15,18-18 16,-1 36-16,1-54 16,-18 1-16,18-18 15</inkml:trace>
   <inkml:trace contextRef="#ctx0" brushRef="#br0" timeOffset="49973.1429">22842 13723 0,'36'0'16,"-19"0"-16,71-18 15,-52 18-15,-1 0 0,18 0 16,-35 0-16,-1 0 16</inkml:trace>
   <inkml:trace contextRef="#ctx0" brushRef="#br0" timeOffset="50728.5902">23389 14517 0,'0'0'0,"0"35"15,0-53 1,0-52-1,0 35-15,18-36 16,-18-52-16,0 52 16,35-88-16,-35 71 15,35-88-15,-17 105 16,17-35 0,-17 71-16,0 35 0,17-18 15,-18 18 1,1 36-16,0-19 15,-18 36 1,-18-17-16,0-1 16,1 0-16,17 0 15,-18 18-15,18-35 16,0 35-16,18-36 16,-1 36-1,1-35-15,0 0 16,-18-1-16,0 1 15,0 0-15,-18-18 16,0 0-16,1 0 16,-1-18-1,1 0-15,-1 18 16,0 0-16,1 18 16</inkml:trace>
@@ -1301,7 +1301,7 @@
   <inkml:trace contextRef="#ctx0" brushRef="#br1" timeOffset="133723.9357">19879 7938 0,'35'0'15,"-70"0"-15,106 0 0,-54 0 0,54-36 16,-36 36-16,-17-17 16,-1 17-16</inkml:trace>
   <inkml:trace contextRef="#ctx0" brushRef="#br1" timeOffset="134397.2117">20726 8643 0,'0'35'15,"0"-70"-15,0 53 16,0-36-1,0 0-15,-18-34 0,18-1 16,-18 0-16,-34-88 16,34 70-16,-17-17 15,-1-18-15,19 0 0,-36-106 16,53 124-16,0 0 0,0 35 16,70-17-16,19 17 15,-37 53-15,1 0 16,53 35-1,-71 0-15,-17 1 0,0-1 16,-1 18-16,-17 0 0,-17 17 16,-19-35-16,1 1 15,0-1-15,-36 18 16,36-53-16,17 18 16,1-18-16,17 17 0,17-17 15,19-17 1,17-1-1,-36 18-15</inkml:trace>
   <inkml:trace contextRef="#ctx0" brushRef="#br1" timeOffset="134474.7873">20779 7938 0,'-36'35'15,"72"-70"-15,-72 87 0,19-52 16,-1 18-16,0 0 16</inkml:trace>
-  <inkml:trace contextRef="#ctx0" brushRef="#br1" timeOffset="134863.7845">20779 7938 0,'0'0'0,"-71"0"16,53-18 0,1 0-16,17 1 15,17 17-15,1 0 16,17 0-16,1 17 0,34 1 16,-35 0-16,36 17 15,-36-18-15,1 36 16,-36-35-16,-36 35 15,1-18 1,-36 0-16,19-35 16,-37 18-16,54-18 15,-18 0-15,36-18 16,17 1-16,17 17 16,1 0-1,17 0-15</inkml:trace>
+  <inkml:trace contextRef="#ctx0" brushRef="#br1" timeOffset="134863.7844">20779 7938 0,'0'0'0,"-71"0"16,53-18 0,1 0-16,17 1 15,17 17-15,1 0 16,17 0-16,1 17 0,34 1 16,-35 0-16,36 17 15,-36-18-15,1 36 16,-36-35-16,-36 35 15,1-18 1,-36 0-16,19-35 16,-37 18-16,54-18 15,-18 0-15,36-18 16,17 1-16,17 17 16,1 0-1,17 0-15</inkml:trace>
   <inkml:trace contextRef="#ctx0" brushRef="#br1" timeOffset="135332.2036">21396 7708 0,'18'18'16,"-1"52"0,-17-34-16,36 52 15,-19-35-15,1 0 0,17 35 16,-17-53-16,-1 0 16,1-17-16,0 0 15,-18-36-15,17-17 16,-17-18-16,0-35 15,-17 52 1,17-52-16,-18 53 16,18 0-16,0 17 15,0 53 1</inkml:trace>
   <inkml:trace contextRef="#ctx0" brushRef="#br1" timeOffset="135771.2798">21855 8096 0,'0'-17'16,"0"34"-16,-18-34 0,0 17 0,1 17 15,-1 1 1,0 52-16,18-52 16,0 17-16,18 1 15,0-19-15,17 1 16,-17-18-16,-1-18 0,1-17 16,0 17-1,-18-17-15,17 17 0,-17-17 16,0 0-16,-17 0 0,-1-18 15,18 17-15,-18 19 16,1 17 0,17 35-1,0 18-15,0 18 16,17-36-16,1-18 16,17 54-1,0-36-15,-17-17 0,0 0 16,17-1-1</inkml:trace>
   <inkml:trace contextRef="#ctx0" brushRef="#br1" timeOffset="136143.1077">22102 8132 0,'0'17'31,"0"1"-16,0-1-15,0 19 16,0-19-16,17 19 16,-17-19-16,35 1 15,-17-18 1,0-18-16,-1 18 16,-17-17-16,18 17 0,0 0 15,-18 17 1,17 1-16,-17 0 15,18-18-15,17 17 16,-17 1-16,17-18 16,-17-18-16,-1 1 0,-17-1 15,18-35 1,-18 18-16,-18-18 16,18 18-16,-17-18 15,17 35-15,0 0 16,0 1-16,17 17 15</inkml:trace>
@@ -1399,7 +1399,7 @@
   <inkml:trace contextRef="#ctx0" brushRef="#br0" timeOffset="34350.5032">28893 3422 0,'0'0'16,"-18"-18"-16,53 1 0,-17-1 16,52-35-1,-34 18-15,52-36 16,-71 54-16,36-54 16,-35 53-16,-18-17 15,0 0-15,0 17 16,0 36-1,18 17 1,35 0 0,-36 1-16,54 34 0,-36-52 15</inkml:trace>
   <inkml:trace contextRef="#ctx0" brushRef="#br0" timeOffset="34666.8094">29792 3528 0,'-35'0'16,"17"0"-16,-17 0 16,17 17-16,1 1 15,17 0-15,0 17 16,17-17-16,1-1 0,0 19 0,34 16 15,-34-34 1,35 0-16,-53-1 16,18 1-16,-18 0 31,-18-18-31,-17 17 0,17-17 16,0 0-1,1 0-15,17-17 0,-18-1 16</inkml:trace>
   <inkml:trace contextRef="#ctx0" brushRef="#br0" timeOffset="34879.0575">30074 3228 0,'0'0'15,"0"70"-15,0-17 0,-17 71 16,17-71-16,0 0 0,-18 0 16,18 17-16,0-35 0,18 54 15,-1-54-15,19 0 16,-19-35 0</inkml:trace>
-  <inkml:trace contextRef="#ctx0" brushRef="#br0" timeOffset="35497.2605">30233 3739 0,'-18'0'15,"18"18"-15,0 17 16,0-17 0,18 0-16,17 17 15,-17-17-15,17-18 16,-17 17-16,-18-34 15,0-1 1,0 0-16,-18-17 16,18 17-16,-17-35 15,17 36-15,0-1 16,17 18 0,19 0-1,-19 18-15,1-18 0,35 17 16,-36 1-16,19-18 15,-36 18 1,17-18-16,-17 17 16,-17-17-16,17 18 15,0 17-15,0-17 16,0 0-16,0-1 16,17 1-16,1-18 15,17 17-15,0-34 16,-17-18-1,-18 17 1,0 0 0,0 54-1,18-19 1,-1 36-16,1-35 0,0-1 16,-1-17-16,1 18 15,17-18-15,-17 0 16,35-35-16,-36 17 15,1-35 1,-18 36-16,0-19 16,-18 19-16,18-1 0,-17 0 15,-18 1 1,17 17-16</inkml:trace>
+  <inkml:trace contextRef="#ctx0" brushRef="#br0" timeOffset="35497.2604">30233 3739 0,'-18'0'15,"18"18"-15,0 17 16,0-17 0,18 0-16,17 17 15,-17-17-15,17-18 16,-17 17-16,-18-34 15,0-1 1,0 0-16,-18-17 16,18 17-16,-17-35 15,17 36-15,0-1 16,17 18 0,19 0-1,-19 18-15,1-18 0,35 17 16,-36 1-16,19-18 15,-36 18 1,17-18-16,-17 17 16,-17-17-16,17 18 15,0 17-15,0-17 16,0 0-16,0-1 16,17 1-16,1-18 15,17 17-15,0-34 16,-17-18-1,-18 17 1,0 0 0,0 54-1,18-19 1,-1 36-16,1-35 0,0-1 16,-1-17-16,1 18 15,17-18-15,-17 0 16,35-35-16,-36 17 15,1-35 1,-18 36-16,0-19 16,-18 19-16,18-1 0,-17 0 15,-18 1 1,17 17-16</inkml:trace>
   <inkml:trace contextRef="#ctx0" brushRef="#br0" timeOffset="37737.7596">28769 5609 0,'18'0'15,"-1"0"1,19 0-16,52-17 16,-35 17-16,0 0 15,0 0 1,17 0-16,1 0 0,52 0 15,-70 0-15,18-18 16,-36 18-16,-17 0 0,-1 0 16,-17-18-1</inkml:trace>
   <inkml:trace contextRef="#ctx0" brushRef="#br0" timeOffset="37958.8114">29475 5468 0,'0'0'0,"17"0"0,19 0 16,-1 0 0,35 0-16,-34 0 15,17 0-15,17 18 16,-52-1-16,17 19 16,-35-19-16,0 1 15,0 0-15,-18-1 0,-17 18 16,17-17-16,-34 0 15,16-1-15,1-17 16,0 18-16,-1-18 16</inkml:trace>
   <inkml:trace contextRef="#ctx0" brushRef="#br0" timeOffset="38232.1075">28875 5362 0,'-71'36'0,"142"-72"0,-195 72 16,36 16-16,53-34 15,-18 17 1,35-17-16,18 0 15,0-1-15,0 1 0,53 35 16,0-36-16,35 36 16,-35-35-16,53 17 15,-53-17-15</inkml:trace>
@@ -1410,19 +1410,19 @@
   <inkml:trace contextRef="#ctx0" brushRef="#br0" timeOffset="40335.2164">31168 5592 0,'0'-18'15,"18"18"-15,17-18 16,-18 18-16,19 0 16,-1 0-16,18 0 15,-18 0-15,-17 0 16,0-17-16,-1 17 15,-34-18 1,-1 18 0</inkml:trace>
   <inkml:trace contextRef="#ctx0" brushRef="#br0" timeOffset="40603.1398">31256 5292 0,'0'0'15,"0"35"-15,0-17 0,0 17 0,0 0 16,-18 53-16,18-35 16,-17 0-16,17 0 0,0-18 15,35 54-15,-17-54 16,52 18-1,-34-36-15,34 19 16,-35-36-16,1-18 16,-19 0-16</inkml:trace>
   <inkml:trace contextRef="#ctx0" brushRef="#br0" timeOffset="48231.2126">4233 7920 0,'0'0'0,"-35"0"0,-35 18 16,34-1-16,1 1 16,0 17-16,-1 0 15,1 18-15,17 0 16,1 18-16,17-1 0,17 71 15,1-88-15,53 36 16,-18-54-16,70-18 16,-70-17-16,70-17 15,-52-1-15,17-52 16,-53 17-16,1-36 16,-36 54-16,-53-53 15,18 35-15,-89-35 16,54 53-16,-54-18 15,54 53 1,34-18-16,1 18 0,17 18 16,1 17-16,34 0 15,1-17-15</inkml:trace>
-  <inkml:trace contextRef="#ctx0" brushRef="#br0" timeOffset="48536.767">4815 8555 0,'18'53'16,"-36"-106"-16,36 123 0,-18-52 16,-18-36-1,18-34 1,0 16-16,0-17 15,0-17-15,18 34 16,17 1-16,-17 18 16,35 17-16,-35 17 15,17 36-15,-18-35 16,1 52 0,0-52-16,-18 17 15,0-17-15,0 0 16</inkml:trace>
+  <inkml:trace contextRef="#ctx0" brushRef="#br0" timeOffset="48536.7669">4815 8555 0,'18'53'16,"-36"-106"-16,36 123 0,-18-52 16,-18-36-1,18-34 1,0 16-16,0-17 15,0-17-15,18 34 16,17 1-16,-17 18 16,35 17-16,-35 17 15,17 36-15,-18-35 16,1 52 0,0-52-16,-18 17 15,0-17-15,0 0 16</inkml:trace>
   <inkml:trace contextRef="#ctx0" brushRef="#br0" timeOffset="48986.7846">6209 8255 0,'0'0'0,"18"18"0,-1-1 16,-17 19-16,0-1 0,18 35 15,-1-34 1,1 17-16,-18-36 16,18 1-16,-18-36 31</inkml:trace>
   <inkml:trace contextRef="#ctx0" brushRef="#br0" timeOffset="49105.0501">6209 8043 0,'0'0'16</inkml:trace>
-  <inkml:trace contextRef="#ctx0" brushRef="#br0" timeOffset="49281.7979">6421 8184 0,'35'0'15,"-70"0"-15,105 0 0,-35 0 0,36-17 16,-36 17-16,18-18 16,-35 18-16,-1-17 15,-17-1-15</inkml:trace>
-  <inkml:trace contextRef="#ctx0" brushRef="#br0" timeOffset="49449.2723">6526 7849 0,'0'0'0,"0"18"0,0 53 16,0-19-16,18 1 15,-18 18-15,0-18 0,18 70 16,-1-70-1,19 18-15,-36-36 16,17-17-16</inkml:trace>
+  <inkml:trace contextRef="#ctx0" brushRef="#br0" timeOffset="49281.7978">6421 8184 0,'35'0'15,"-70"0"-15,105 0 0,-35 0 0,36-17 16,-36 17-16,18-18 16,-35 18-16,-1-17 15,-17-1-15</inkml:trace>
+  <inkml:trace contextRef="#ctx0" brushRef="#br0" timeOffset="49449.2722">6526 7849 0,'0'0'0,"0"18"0,0 53 16,0-19-16,18 1 15,-18 18-15,0-18 0,18 70 16,-1-70-1,19 18-15,-36-36 16,17-17-16</inkml:trace>
   <inkml:trace contextRef="#ctx0" brushRef="#br0" timeOffset="50133.6127">6773 8378 0,'0'0'16,"18"0"-16,0 0 0,17-35 16,-17 18-16,34-36 15,-34 35-15,0-17 16,-18 17-16,-36-17 16,19 35-16,-36 0 15,35 17 1,1 1-16,17 0 0,-18 17 15,18 18-15,0-18 16,35 18-16,-17-18 16,35 1-1,-36-36-15,36 17 16,-35-17-16,17-17 16,-35-1-16,18 0 15,-18-17-15,0 17 0,18-17 16,-18 18-16,35-19 15,0 19 1,18 17 0,-18 0-16,18 0 15,-17 0-15,-1 0 16,-18 17-16,1-17 0,-18 18 16,-35 0-1,17 17-15,-17 0 16,17 0-16,18-17 15,0 0-15,0-1 0,18 1 16,0-18-16,34 0 16,-34-18-1,0 1-15,17-19 16,-35 19-16,0-19 16,0 19-16,-18-18 15,1 17-15,17 36 31,17 17-15,1-18-16,35 1 16,-18 0-16,36-18 15,-54 0-15,19 0 16,-19 0-16</inkml:trace>
-  <inkml:trace contextRef="#ctx0" brushRef="#br0" timeOffset="50305.2053">7567 8220 0,'35'0'15,"-70"0"-15,106 0 0,-36 0 16,-17 0-16,17 0 16,0 0-16,0 0 0,18-18 15,-35 18-15,0 0 16,-36 0-16,0 0 15</inkml:trace>
+  <inkml:trace contextRef="#ctx0" brushRef="#br0" timeOffset="50305.2052">7567 8220 0,'35'0'15,"-70"0"-15,106 0 0,-36 0 16,-17 0-16,17 0 16,0 0-16,0 0 0,18-18 15,-35 18-15,0 0 16,-36 0-16,0 0 15</inkml:trace>
   <inkml:trace contextRef="#ctx0" brushRef="#br0" timeOffset="50510.8638">7691 7920 0,'0'35'0,"0"0"15,0 54-15,17-54 16,-17 18-16,0 17 0,18-17 16,-1 35-1,-17-52-15,36 34 16,-19-52-16,1 0 0,0-18 16</inkml:trace>
-  <inkml:trace contextRef="#ctx0" brushRef="#br0" timeOffset="50671.6273">7955 8273 0,'0'0'0,"0"53"16,0-18-16,18 18 16,-18-36-1,17 36-15,1-53 16</inkml:trace>
+  <inkml:trace contextRef="#ctx0" brushRef="#br0" timeOffset="50671.6272">7955 8273 0,'0'0'0,"0"53"16,0-18-16,18 18 16,-18-36-1,17 36-15,1-53 16</inkml:trace>
   <inkml:trace contextRef="#ctx0" brushRef="#br0" timeOffset="50823.433">7973 8079 0,'0'-18'15,"0"36"-15,17-36 31,1 36-31,-18-1 16,18 1-16</inkml:trace>
-  <inkml:trace contextRef="#ctx0" brushRef="#br0" timeOffset="51295.2016">8149 8326 0,'0'35'16,"0"-70"-16,18 87 0,-18-34 0,17 17 15,1-35-15,0 18 16,-1-18 0,1 0-16,0-18 0,-18 1 15,0-19-15,0 19 16,-36-18-16,36 17 16,-35-35-16,17 35 15,1 1 1,-1 17-16,36 0 15,-1 35 1,1-17-16,0-1 0,17 1 16,0 0-16,-17-1 15,0 18-15,-1-17 16,-17 0-16,-17-18 31,34-36-15,-17 19-16,35-36 15,1 35 1,-19 1-16,19-1 0,-19 18 16,1 0-16,17 35 15,-17-17-15,-18 35 16,18-18-16,-18 0 16,0-17-16,17 0 15,-34-18 1</inkml:trace>
-  <inkml:trace contextRef="#ctx0" brushRef="#br0" timeOffset="51718.6283">9560 8149 0,'0'0'16,"71"-17"-16,-36-1 0,0 0 15,36 1-15,-53-1 16,17 18 0,-35-18-16</inkml:trace>
-  <inkml:trace contextRef="#ctx0" brushRef="#br0" timeOffset="51913.567">9737 7938 0,'-18'0'15,"36"0"-15,-54 17 0,19 54 16,-1-36-16,18 53 16,0-35-16,18 0 15,-1-18-15,19 1 0,34 16 16,-34-34 0,69 0-16,-69-18 15,52 0-15,-53-18 16</inkml:trace>
+  <inkml:trace contextRef="#ctx0" brushRef="#br0" timeOffset="51295.2015">8149 8326 0,'0'35'16,"0"-70"-16,18 87 0,-18-34 0,17 17 15,1-35-15,0 18 16,-1-18 0,1 0-16,0-18 0,-18 1 15,0-19-15,0 19 16,-36-18-16,36 17 16,-35-35-16,17 35 15,1 1 1,-1 17-16,36 0 15,-1 35 1,1-17-16,0-1 0,17 1 16,0 0-16,-17-1 15,0 18-15,-1-17 16,-17 0-16,-17-18 31,34-36-15,-17 19-16,35-36 15,1 35 1,-19 1-16,19-1 0,-19 18 16,1 0-16,17 35 15,-17-17-15,-18 35 16,18-18-16,-18 0 16,0-17-16,17 0 15,-34-18 1</inkml:trace>
+  <inkml:trace contextRef="#ctx0" brushRef="#br0" timeOffset="51718.6282">9560 8149 0,'0'0'16,"71"-17"-16,-36-1 0,0 0 15,36 1-15,-53-1 16,17 18 0,-35-18-16</inkml:trace>
+  <inkml:trace contextRef="#ctx0" brushRef="#br0" timeOffset="51913.5669">9737 7938 0,'-18'0'15,"36"0"-15,-54 17 0,19 54 16,-1-36-16,18 53 16,0-35-16,18 0 15,-1-18-15,19 1 0,34 16 16,-34-34 0,69 0-16,-69-18 15,52 0-15,-53-18 16</inkml:trace>
   <inkml:trace contextRef="#ctx0" brushRef="#br0" timeOffset="52066.2423">10248 7885 0,'18'0'0,"-1"0"16,-17 17-16,18 1 15,0 0-15</inkml:trace>
   <inkml:trace contextRef="#ctx0" brushRef="#br0" timeOffset="52168.5148">10354 8308 0,'0'0'0,"18"18"0,-1-18 15</inkml:trace>
   <inkml:trace contextRef="#ctx0" brushRef="#br0" timeOffset="55627.0982">5909 9243 0,'-35'-18'15,"70"36"-15,-88-36 0,-17 71 16,52-18 0,-53 71-16,54-53 15,-1 18-15,18-1 0,-18-17 16,18 53-16,36-71 16,34 36-16,-34-54 15,69-17 1,-34 0-16,17-35 15,-35 18-15,0-19 16,-35 19-16,-18-1 16,0 36-16,-18 35 15,0-36 1,18 36-16,18-35 16,17 17-16,-17-35 15,52 0-15,-52-18 16,35-17-1,-35 17-15,-1-34 16,-17 34-16,-17-17 0,-19-18 16,-34 17-1,52 19-15,-35-1 16,36 18-16,-1 0 16</inkml:trace>
@@ -1452,7 +1452,7 @@
   <inkml:trace contextRef="#ctx0" brushRef="#br0" timeOffset="64731.5924">20990 8661 0,'0'123'16,"0"-246"-16,0 317 0,18-71 15,-18-52-15,18-18 16,-18 0-16,17-18 0,-17 18 15,0-36-15,-17-17 16,17-17-16,0-36 16,17 35-16,18-35 15,-17 36-15,53 17 16,-36 17-16,-17 1 16,-1 0-16,19 35 15,-36-36-15,-18 1 16,0 17-16,1-17 0,-1-1 15,-17-17-15,17 18 0,0-18 16,1 0-16,34 0 16,-17-18-16,53-17 15</inkml:trace>
   <inkml:trace contextRef="#ctx0" brushRef="#br0" timeOffset="65143.2561">21378 9172 0,'0'0'0,"0"18"16,-17 35-1,17-36-15,-18 19 16,18 52 0,18-53-1,35-35-15,-18 0 16,-17-17-16,17-19 16,-35 19-16,0-36 15,0 17-15,-18 19 16,18-1-16,-17 1 15,-19 17-15,36 17 16,0 1-16,0-1 16,18 19-16,0-19 15,17 19-15,-18-36 16,19 0 0,-36-18-16,0 0 15,0 1-15,0-19 16,0 1-16,17 18 15,36-36-15,-17 35 16,-1 0-16,0 1 16,36-19-16,-36 19 15,18-1-15,-53 0 16,-35 18 0,17 0-1</inkml:trace>
   <inkml:trace contextRef="#ctx0" brushRef="#br0" timeOffset="65320.3206">21766 8890 0,'0'53'0,"-17"-18"16,17 53-16,0-35 15,0 36-15,0-54 16,17 0-1,1-17-15,0-1 0,17-17 16</inkml:trace>
-  <inkml:trace contextRef="#ctx0" brushRef="#br0" timeOffset="65687.2139">21943 9225 0,'0'-17'16,"0"34"-16,17-17 16,-17 18-16,0-1 0,36 19 15,-19-19-15,19 1 16,-19 0-1,36-18-15,-35-18 16,17-17-16,-35-1 16,18 19-16,-1-36 0,-17 18 15,0-18-15,0 0 16,0 0-16,0-53 16,0 71-16,-17-53 15,17 70-15,-18 36 16,18 52-16,0 1 15,0 52 1,18-70-16,-1 0 0,1 0 16,35 17-16,-35-52 15,17 17-15,-18-35 16,36 0-16,-35 0 16,17 0-16,-17 0 0,0 36 15,-18-19 1,17 36-16,-34-18 15,-1 1-15</inkml:trace>
+  <inkml:trace contextRef="#ctx0" brushRef="#br0" timeOffset="65687.2138">21943 9225 0,'0'-17'16,"0"34"-16,17-17 16,-17 18-16,0-1 0,36 19 15,-19-19-15,19 1 16,-19 0-1,36-18-15,-35-18 16,17-17-16,-35-1 16,18 19-16,-1-36 0,-17 18 15,0-18-15,0 0 16,0 0-16,0-53 16,0 71-16,-17-53 15,17 70-15,-18 36 16,18 52-16,0 1 15,0 52 1,18-70-16,-1 0 0,1 0 16,35 17-16,-35-52 15,17 17-15,-18-35 16,36 0-16,-35 0 16,17 0-16,-17 0 0,0 36 15,-18-19 1,17 36-16,-34-18 15,-1 1-15</inkml:trace>
   <inkml:trace contextRef="#ctx0" brushRef="#br0" timeOffset="186676.065">6350 10901 0,'-18'0'16,"18"-18"-1,-17 1-15,-1-1 16,0 0 0,-17 18-16,18-17 0,-1 17 0,-17 0 15,-1 17-15,19 1 16,-36 17-16,18 0 16,17 1-16,0 17 15,18-18-15,36 18 16,-1-35-16,0 17 0,0 0 15,54 18 1,-37-18-16,-16 1 0,17 16 16,-53-16-16,0-19 15,0 1-15,-18 17 0,0-17 16,-52 0 0,17-1-16,-35-17 15,52 0-15,1-17 0,0 17 16,17-18-16,18 0 15</inkml:trace>
   <inkml:trace contextRef="#ctx0" brushRef="#br0" timeOffset="188323.3706">6650 11448 0,'-18'0'0,"18"-18"15,-17 0-15,-1 18 16,0 0 0,1 18-16,17 0 15,-18 17-15,18-17 16,0 17-1,0-18-15,18 19 16,-1-36-16,1 0 16,17 0-1,-17 0-15,0-18 0,-1 0 16,-17-17 0,18 0-16,-18 17 15,0-17-15,-18 17 0,1-52 16,-1 35-16,0-18 15,1 17-15,-1 19 0,0-1 16,1 18 0,17 18-1,0 17-15,0 36 16,17-36-16,-17 0 0,0 18 16,36 18-16,-1-19 15,-17-34-15,17 17 16,-18-35-1,-17 18-15,18-18 0,0 0 16</inkml:trace>
   <inkml:trace contextRef="#ctx0" brushRef="#br0" timeOffset="188985.3178">6932 11289 0,'0'0'0,"18"0"16,-18 18 15,0 34-15,0-34-16,0 17 0,0-17 15,17 17-15,-17-17 16,18-18-16,-18 18 0,18-1 16,-1-17-1,-17-17 1,18-1-1,-18 0 1,18 18-16,-1 0 16,18 18-1,-35 0-15,36-18 16,-19 17-16,1-17 16,0 0-16,-1 0 0,19-17 15,-19 17-15,1-36 16,-18 19-16,0-1 0,-35-17 15,17 17-15,0-35 16,1 36 0,-1 17-16,18-18 15</inkml:trace>
@@ -1486,7 +1486,7 @@
   <inkml:trace contextRef="#ctx0" brushRef="#br1" timeOffset="217530.6998">21308 10319 0,'0'0'16,"0"17"-16,-18-17 0,36 18 15,-1 0 1,19-1-16,-19 1 15,19 17 1,-36-17-16,0 0 16,-18-18-16,0 17 15,-17-17-15,17 0 16,1 0-16,-1 0 16,1-17-16,34-1 15</inkml:trace>
   <inkml:trace contextRef="#ctx0" brushRef="#br1" timeOffset="217797.7545">21484 10425 0,'35'-18'16,"-17"0"-16,17 1 16,-17-1-16,17-17 15,-35-1 1,-35 36-1,-18 0-15,35 0 16,-34 36-16,34-19 16,18 1-16,0 17 15,0 1-15,53-19 16,-36 1-16,36-18 16,-35 0-16,17 0 15,-17-18 1,-71 18-16</inkml:trace>
   <inkml:trace contextRef="#ctx0" brushRef="#br1" timeOffset="218396.8206">20779 10231 0,'-18'17'31,"18"1"-31,0-1 15,0 19-15,18-19 0,-1 36 16,-17-35-16,36 0 16,-19-1-1,18-17-15,-17 0 16,0-17-16,-1-1 16,-17 0-1</inkml:trace>
-  <inkml:trace contextRef="#ctx0" brushRef="#br1" timeOffset="224210.4245">15628 11800 0,'18'0'31,"-1"0"-16,19 0 1,-19 0-16,54 0 16,-18 0-16,70 0 15,-35-17-15,18 17 16,-18 0-16,18 0 0,0 0 16,123 0-16,-123 0 15,18 0-15,-36 17 16,106-17-16,-124 0 15,1 18-15,0-18 16,-36 0 0</inkml:trace>
+  <inkml:trace contextRef="#ctx0" brushRef="#br1" timeOffset="224210.4244">15628 11800 0,'18'0'31,"-1"0"-16,19 0 1,-19 0-16,54 0 16,-18 0-16,70 0 15,-35-17-15,18 17 16,-18 0-16,18 0 0,0 0 16,123 0-16,-123 0 15,18 0-15,-36 17 16,106-17-16,-124 0 15,1 18-15,0-18 16,-36 0 0</inkml:trace>
   <inkml:trace contextRef="#ctx0" brushRef="#br0" timeOffset="231082.6877">6562 12435 0,'0'-35'15,"0"18"-15,0-19 16,-18 19-16,18-1 0,-53 0 16,18 18-1,-36 36-15,36-1 16,-36 35-16,54-17 15,-1 36-15,18-54 16,18 18-16,17-18 16,53 18-16,-35-35 15,35 17 1,-52-18-16,-1 1 16,-17 0-16,-1-1 0,-17 1 15,-35-18-15,-36 18 16,36-18-16,-18 0 15,0 17-15,18-17 0,-18 0 16,35 0-16,1 18 0,-1-18 16</inkml:trace>
   <inkml:trace contextRef="#ctx0" brushRef="#br0" timeOffset="231606.2309">6844 12912 0,'0'0'16,"-18"-18"-16,1 0 15,-19 18 1,19 0-16,-19 0 16,19 18-16,-1 17 15,1 1-15,17 17 16,0-36-16,0 1 16,17-1-16,1-17 15,17 18-15,-17-18 16,35-18-16,-36-17 15,1-18-15,0 18 16,-1-18-16,-17 18 16,-17-36-1,17 54-15,-36-54 16,19 53-16,-1 1 16,18 34-1,0 36-15,0-17 16,18 16-16,-18-16 15,35 52-15,18-35 16,-18-18-16,18 0 16,-35-35-16,35 0 15</inkml:trace>
   <inkml:trace contextRef="#ctx0" brushRef="#br0" timeOffset="231939.3188">7073 12594 0,'0'35'16,"0"1"-1,18 70-15,-18-54 16,17 1-16,1 0 0,0 36 16,-1-72-16,-17 1 15,18-1-15,-18 1 16,18-36-1,17-17 1,-17 18-16,-1-1 16,1 18-16,17 18 15,-17-1-15,-18 54 16,0-54 0,-35 1-1,17 0-15,-35-18 16,35 0-16,1 0 15,17-18-15,17 0 16</inkml:trace>
@@ -1500,15 +1500,15 @@
   <inkml:trace contextRef="#ctx0" brushRef="#br0" timeOffset="234904.0203">12330 12541 0,'0'18'0,"17"52"16,-17-17-16,18-17 0,0 17 16,-1-18-16,1 0 0,-1 0 15,19-17 1</inkml:trace>
   <inkml:trace contextRef="#ctx0" brushRef="#br0" timeOffset="235371.3782">13688 12224 0,'0'0'16,"-18"0"-16,1 0 0,-1 53 15,18-18-15,-18 88 16,1-70-16,17 88 15,0-52-15,17-36 16,1 70 0,17-88-16,-17 1 0,17-1 15,36-35-15,-54 0 16,19-18-16</inkml:trace>
   <inkml:trace contextRef="#ctx0" brushRef="#br0" timeOffset="235548.7963">13952 12488 0,'0'0'15,"0"53"-15,0 0 0,0 53 16,0-53-16,18 35 16,0-53-16,35 18 15,-36-35-15,18 0 16,-17-18-16</inkml:trace>
-  <inkml:trace contextRef="#ctx0" brushRef="#br0" timeOffset="235682.8315">14217 12771 0,'0'0'0,"53"0"15,-18 17-15,-17-17 16,35 0-16,-18 0 15,0 0-15</inkml:trace>
+  <inkml:trace contextRef="#ctx0" brushRef="#br0" timeOffset="235682.8314">14217 12771 0,'0'0'0,"53"0"15,-18 17-15,-17-17 16,35 0-16,-18 0 15,0 0-15</inkml:trace>
   <inkml:trace contextRef="#ctx0" brushRef="#br0" timeOffset="236144.1741">14640 13229 0,'0'0'16,"18"35"-16,-18-17 0,0-36 31,0-52-31,-18 35 16,1-54-16,17 37 16,-18-90-16,18 54 15,0-53 1,0 71-16,18-1 15,-1 53-15,36 18 16,-35 18-16,17 17 16,-17 1-16,-18 34 15,0-35-15,-18 18 16,18-17-16,0-19 16,18 1-1,-1-1-15,54 1 0,-53 0 16,35-18-1,-36 17-15,18-17 16,-35 18-16,-17-18 16,-54 0-16,36 0 15,-36 0-15,36 0 16,0 0-16,17 0 16,1-35-16</inkml:trace>
   <inkml:trace contextRef="#ctx0" brushRef="#br0" timeOffset="236360.2101">14975 12241 0,'71'36'16,"-142"-72"-16,195 89 0,-36 36 15,-53-37-15,18 1 0,-17 71 16,-19-71-16,-17 53 15,-17-54 1,-1 19-16,0-36 16,-17 18-16,17-35 15,-17 0-15</inkml:trace>
   <inkml:trace contextRef="#ctx0" brushRef="#br0" timeOffset="237011.7489">15928 12823 0,'0'0'16,"-35"-35"-16,17 35 15,-35 35-15,35-17 16,1 17-16,-18 54 16,35-19-1,0-35-15,0-17 0,52 17 16,-16-17-16,17-36 15,-18 1-15,35-36 16,-34 18-16,-1-54 16,-17 54-16,-18-18 15,0-35-15,-18 17 16,-17-34-16,-1 52 16,1-18-1,0 53-15,17 36 16,1 0-16,17 70 15,17-18-15,36 54 16,-18-54-16,36 19 16,-18-36-16,0-36 15,-18 19-15,36-19 16,-36 1-16,-17-18 16,-1 0-16</inkml:trace>
   <inkml:trace contextRef="#ctx0" brushRef="#br0" timeOffset="237483.9691">16510 12365 0,'18'35'16,"-1"18"-16,-17-18 15,18 36-15,0-18 0,17 88 16,-18-88-16,19 53 16,-36-71-16,17 0 15,-17-17-15,18-36 31,0-35-15,17 36-16,18-1 16,-18 18-16,36 0 15,-36 18-15,0 17 16,1 18 0,-36-35-16,0 17 15,-18-18-15,0 1 0,-52 17 16,34-35-16,1 18 0,-35-18 15,34 0-15,19-18 16,-19 18-16,19-17 16,17-1-16,0 0 15,0 1-15</inkml:trace>
-  <inkml:trace contextRef="#ctx0" brushRef="#br0" timeOffset="238990.9244">17127 12312 0,'-17'0'16,"17"-18"15,0 1-15,17 17-16,-17-18 15,18 18 1,0 0-1,-1 0 1,1 0-16,35 18 16,-36-1-16,19 19 15,-36-19-15,17 36 16,1-35-16,-18 35 16,0-36-1,-35 19-15,35-19 16,-18-17-16,-17 18 15,17-18-15,1 0 16,-1 0-16,0-18 16,1 18-1,17-17-15,17 17 16,1 0 0,0 0-16,-1 0 15,18 0-15,1 17 16,-1-17-16,18 18 15,-35-18-15,35 18 16,-36-1-16,1 1 16,-1-18-16,-17 17 15</inkml:trace>
+  <inkml:trace contextRef="#ctx0" brushRef="#br0" timeOffset="238990.9243">17127 12312 0,'-17'0'16,"17"-18"15,0 1-15,17 17-16,-17-18 15,18 18 1,0 0-1,-1 0 1,1 0-16,35 18 16,-36-1-16,19 19 15,-36-19-15,17 36 16,1-35-16,-18 35 16,0-36-1,-35 19-15,35-19 16,-18-17-16,-17 18 15,17-18-15,1 0 16,-1 0-16,0-18 16,1 18-1,17-17-15,17 17 16,1 0 0,0 0-16,-1 0 15,18 0-15,1 17 16,-1-17-16,18 18 15,-35-18-15,35 18 16,-36-1-16,1 1 16,-1-18-16,-17 17 15</inkml:trace>
   <inkml:trace contextRef="#ctx0" brushRef="#br0" timeOffset="266552.6245">6385 14182 0,'0'35'15,"0"36"1,0-1-16,0 71 16,0-70-16,0 17 15,0 0-15,18 53 16,0-70-16,17-18 15,0-36-15,-17 1 0,35-36 16,-18-17-16,-17 0 16,-1 0-16,1-18 0,-18 17 15,0 1-15,0 0 16,0 17-16,0 0 0,0 36 16,18 0-16,-1 52 15,18-52-15,-17 17 16,53 18-1,-36-35-15,-17-18 0,17 0 16,0 0-16,-17 0 0,-1-53 16,-17 0-16,-17-18 15,-1 18-15,-35-35 16,0 35-16,0-17 16,18 35-1,17 17-15,36 18 16,17 18-1</inkml:trace>
   <inkml:trace contextRef="#ctx0" brushRef="#br0" timeOffset="267015.1653">7197 14534 0,'17'0'16,"-17"18"-16,18-18 15,0 18 1,-1-18-16,1 0 16</inkml:trace>
-  <inkml:trace contextRef="#ctx0" brushRef="#br0" timeOffset="267131.1568">7320 14728 0,'0'0'0,"0"18"15,18-18 1,-18-18 0</inkml:trace>
+  <inkml:trace contextRef="#ctx0" brushRef="#br0" timeOffset="267131.1567">7320 14728 0,'0'0'0,"0"18"15,18-18 1,-18-18 0</inkml:trace>
   <inkml:trace contextRef="#ctx0" brushRef="#br0" timeOffset="267318.9443">7585 14552 0,'53'18'0,"-106"-36"0,141 36 16,-70-18-16,52-18 15,-52 18-15,-1-18 0</inkml:trace>
   <inkml:trace contextRef="#ctx0" brushRef="#br0" timeOffset="267448.1986">7638 14693 0,'35'18'16,"-70"-36"-16,105 53 0,1-35 15,-36 0-15,18 0 16,-35 0-16</inkml:trace>
   <inkml:trace contextRef="#ctx0" brushRef="#br0" timeOffset="268854.7314">8661 14358 0,'-18'-53'15,"36"106"-15,-54-123 0,19 87 16,17 54-16,0-1 15,17 71 1,-17-70-16,18 52 16,0-70-16,-1-17 0,1-1 15,17 0-15,-17-35 16,17-17-16,0-1 16,-17-17-16,0-1 15,-18 1-15,17 0 0,-17-1 16,0 19-16,18 17 15,0 35 1,17 18-16,0-35 16,-17-1-16,17 19 0,53-19 15,-52-17 1,17 0-16,17-35 16,-17-36-1,-35 36-15,-18 0 0,-53-89 16,-18 36-1,36 35-15,-18-17 16,35 52-16,1 0 16,34 18-16,1 0 15,17 18-15</inkml:trace>
@@ -1516,7 +1516,7 @@
   <inkml:trace contextRef="#ctx0" brushRef="#br0" timeOffset="269690.2206">11077 14288 0,'0'17'16,"0"54"-16,-17-36 16,-19 53-16,-17 0 15,18-35-15,0-17 16,0-19-16,-36 18 15,36-17-15,-18-18 16,18-18-16,35 1 16,-18-18-16,36-36 15,-1 36-15,71-18 16,-52 35-16,69 18 16,-69 18-16,17-1 15,-18 19-15,36 17 16,-36-18-16,18 35 15,-53-34-15,17-19 16</inkml:trace>
   <inkml:trace contextRef="#ctx0" brushRef="#br0" timeOffset="272091.8919">12224 14129 0,'0'-18'16,"0"0"-16,17 1 16,-17-1-16,-17 1 15,-1 17 1,-17 0 0,-18 17-16,35 1 0,-52 52 15,52-34 1,-17 34-16,35-52 15,17 35-15,1-36 16,0 1-16,-1 0 0,54-36 16,-36 0-16,0 1 15,1-1-15,-19-35 16,19-17-16,-19 34 16,-17-17-16,0 18 15,0-18-15,-17 18 0,-19-71 16,19 53-16,-36-17 15,35 34-15,1-16 16,-1 52-16,18 17 16,0 36-1,18 0-15,-18-18 16,0 18-16,35 53 16,-35-71-16,17 1 0,19 34 15,-1-35 1,-17-17-16,-1 17 0,1-17 15,17 0-15,1 17 16,-19-17-16,1-1 16</inkml:trace>
   <inkml:trace contextRef="#ctx0" brushRef="#br0" timeOffset="273109.0531">12629 13864 0,'0'-17'16,"0"34"-16,0 1 31,0 35-16,0-18-15,0 18 16,0-18-16,0 0 16,0 18-16,0-17 0,0 34 15,18-34-15,0-1 16,-1-35-16,1 0 16,17-35-16,-17 17 15,0-17-15,-1-1 16,-17 1-16,0 17 15,18 18 1,-18 36-16,0-19 0,35 72 16,-17-54-16,52 18 15,-34-36 1,52 19-16,-53-36 16,53-18-16,-52-17 15,16-18-15,-34 18 16,-18-18-16,0 17 0,-35-52 15,17 53-15,1-18 16,-36 0 0,35 35-16,0 1 15,1 17-15,-1 17 0,0-17 16</inkml:trace>
-  <inkml:trace contextRef="#ctx0" brushRef="#br0" timeOffset="275612.6569">11553 14728 0,'18'0'78,"35"0"-62,-35 0-16,88 0 16,17-17-1,-52 17-15,34 0 16,125 0-16,-107 17 16,195-17-16,-160 0 15,19 0-15,-1 0 16,1 0-16,140 0 15,-176-17-15,-35 17 16,-35 0-16,52 0 0,-105 0 16,17 0-16,-53 0 15,-17 0-15</inkml:trace>
+  <inkml:trace contextRef="#ctx0" brushRef="#br0" timeOffset="275612.6568">11553 14728 0,'18'0'78,"35"0"-62,-35 0-16,88 0 16,17-17-1,-52 17-15,34 0 16,125 0-16,-107 17 16,195-17-16,-160 0 15,19 0-15,-1 0 16,1 0-16,140 0 15,-176-17-15,-35 17 16,-35 0-16,52 0 0,-105 0 16,17 0-16,-53 0 15,-17 0-15</inkml:trace>
   <inkml:trace contextRef="#ctx0" brushRef="#br0" timeOffset="277727.8451">11695 15452 0,'0'17'32,"0"1"-17,0 0 1,17-1-16,1 36 15,-18-35-15,18 17 16,-1 0-16,1-17 0,17 35 16,-17-35-16,17 17 15,-17-35-15,-1 0 16,1-18 0,-18-17-1,0 0-15,0 17 0,0-17 16,0-1-16,-18-16 15,18 16-15,-17-34 16,17 34-16,-18-34 16,0 35-16,1-36 15,17 36-15,-18-18 16,18 35-16,0 1 16,0-1-1,18 18 16,-18-18-15,17 18 0,1 0 15,0 0-15,-1-17-1,1 17-15,0 0 16,-1 0-16,1-18 15,-1 18-15,1 0 16,0 18-16,17-18 16,-17 0-1,-1 0-15,19 17 16,-19-17-16,18 0 0,18 0 16,-17-17-16,34 17 15,-34 0-15,34 0 16,-17 0-16,18 0 15,-36 0-15,35 0 16,-52 0 0,53 0-16,-36 0 15,18 0-15,-36 0 16,19 0-16,-19 0 0,19 0 16,17-18-1,-18 18-15,35-18 16,-34 18-16,34-17 15,-35 17-15,18 0 16,-35 0-16,0 0 16,-1 0-16,1 0 15,0 0 1,-1 0 0,1 0-16,-1-18 15,1 18-15,17 0 16,-17 0-1,17 0 1,-17 0-16,0 0 16,-1 0-16,1 0 0,0 0 15,-1 0-15,1 0 16,17 0-16,-17 0 16,-1 0-1,1 0-15,0 0 16,-1 0-16,1 0 0,0 0 15,-1 0-15,18 0 16,-17-18-16,17 18 16,-17 0-16,0 0 15,-1 0-15,1 0 16,0 0-16,-1 0 16,1 0-16,17-17 31,-17 17-31,-1 0 0,1 0 15,0 0 1,-1 0 0,1 0-1,0 0 1,-18 17 125,0 1-126,0 0-15,17-1 16,-17 1-1,18 0 1,-18-1 0,0 1-16</inkml:trace>
   <inkml:trace contextRef="#ctx0" brushRef="#br0" timeOffset="279094.1839">12506 15346 0,'0'-18'0,"0"1"16,0-1-1,-18 0-15,1 1 16,-1-1-16,-17 18 0,-18 0 16,18 0-16,-1 18 15,1-1-15,17 1 16,-17 17-16,17-17 0,1-1 15,17 1-15,35 0 16,-17-1-16,17-17 16,-17 18-16,17 0 0,18 17 15,-18-17-15,0 17 16,-35-17 0,0 34-16,-17-52 15,-36 36 1,35-36-16,-17 17 0,17-17 15,-17 0-15,17-17 0,-17-1 16,35 0-16,18 1 16,-1-1-16</inkml:trace>
   <inkml:trace contextRef="#ctx0" brushRef="#br0" timeOffset="279616.2506">12682 15593 0,'0'-18'16,"-17"18"-16,-1 18 15,0-1 1,1 19-1,17-1-15,0 0 16,0-17-16,35 17 16,-17-35-1,-1 18-15,1-18 0,0-18 16,-1 18-16,19-17 16,-19-1-16,-17-17 15,0 17-15,0 0 16,0-17-16,-17-18 15,-1 36-15,0-1 0,-17-35 16,35 35-16,-18 1 16,1 17-16,17-18 15,0 36 1,0 17 0,0-17-16,17 52 15,-17-52-15,18 17 16,0 0-16,-18 1 0,35-1 15,-17 0-15,17 0 16,0-17-16,-17 0 16,-1-18-16,1 17 15</inkml:trace>
@@ -1536,7 +1536,7 @@
   <inkml:trace contextRef="#ctx0" brushRef="#br0" timeOffset="292211.7299">21943 15716 0,'0'-35'15,"0"70"-15,-18-88 0,18 36 0,-17-1 16,-1 0-16,0 18 0,-17-17 16,0 34-16,17-17 15,-35 36 1,35-19-16,1 36 15,17-35-15,0 52 16,17-52-16,36 35 16,-17-35-16,-19 17 15,19-17-15,17 17 16,-53-18-16,17 19 16,-17-19-16,-17 1 0,-19-18 15,19 18-15,-54-18 16,53-18-16,1 18 15,-19 0-15,19-18 0,-1 18 16,1-17 0</inkml:trace>
   <inkml:trace contextRef="#ctx0" brushRef="#br0" timeOffset="293541.8912">22154 16104 0,'0'-17'16,"-17"17"0,17-18-1,-18 18 1,1 0-16,-1 18 16,-17 17-1,17-17-15,18-1 16,-35 19-16,35-1 15,0 0-15,17-35 16,19 35 0,-1-35-16,-17 0 0,34-17 15,-34-1-15,17-35 16,-17 36-16,-18-54 16,0 36-16,0-1 15,-18-17-15,1 1 16,-1 34-16,0-17 15,1 35-15,17 17 32,0 36-32,0-18 15,17 36-15,1-36 16,0 1-16,-1-1 0,19-17 16,17 17-1,-36-18-15,18 1 16</inkml:trace>
   <inkml:trace contextRef="#ctx0" brushRef="#br0" timeOffset="293925.0917">22348 15981 0,'0'0'15,"18"53"-15,-18-18 0,0 0 0,18 1 16,-1 17-16,-17-18 16,0-18-16,18 1 15,0-18 1,-1-18-1,1 18-15,0-17 16,-1 17-16,1 0 0,17 17 16,-35 1-16,18 17 15,-18-17-15,0 0 16,-18-18-16,-17 17 16,17-17-16,-17 0 15,17 0-15,-17-35 16,17 35-16,1-18 15</inkml:trace>
-  <inkml:trace contextRef="#ctx0" brushRef="#br0" timeOffset="330546.1708">2769 6579 0,'0'-17'16,"-17"17"-1,17-18 1,-18 0-16,0 1 16,1 17-16,-19 0 15,19 0-15,-36 0 16,35 0-16,-17 17 0,-36 1 16,19-18-16,16 0 15,-34 18 1,-18 17-16,-1 36 15,36-19 1,36 37 0,17-36-16,17 35 15,1-35-15,70 35 16,-35-35-16,35 0 16,-17-18-16,-18-17 15,0-1-15,88-17 16,-88-17-16,70-19 15,-87 1-15,52-36 16,-53 19-16,0-1 16,-17-53-1,-18 35-15,-53-35 0,18 54 16,-89-37-16,71 72 16,-70-19-16,70 36 15,0 18-15,0 0 16,18-1-16</inkml:trace>
+  <inkml:trace contextRef="#ctx0" brushRef="#br0" timeOffset="330546.1707">2769 6579 0,'0'-17'16,"-17"17"-1,17-18 1,-18 0-16,0 1 16,1 17-16,-19 0 15,19 0-15,-36 0 16,35 0-16,-17 17 0,-36 1 16,19-18-16,16 0 15,-34 18 1,-18 17-16,-1 36 15,36-19 1,36 37 0,17-36-16,17 35 15,1-35-15,70 35 16,-35-35-16,35 0 16,-17-18-16,-18-17 15,0-1-15,88-17 16,-88-17-16,70-19 15,-87 1-15,52-36 16,-53 19-16,0-1 16,-17-53-1,-18 35-15,-53-35 0,18 54 16,-89-37-16,71 72 16,-70-19-16,70 36 15,0 18-15,0 0 16,18-1-16</inkml:trace>
   <inkml:trace contextRef="#ctx0" brushRef="#br0" timeOffset="331819.3513">30145 6138 0,'18'0'16,"34"-17"-1,1 17-15,88 0 16,-70 0-16,123 17 16,-88 1-16,0 0 15,0-1-15,-1 1 0,107 17 16,-106 0-16,17-17 15,-87 0-15,-19-18 16</inkml:trace>
   <inkml:trace contextRef="#ctx0" brushRef="#br0" timeOffset="335316.7422">829 4745 0,'0'-18'15,"0"1"1,0-1-1,0 0 17,0 1-17,0-1-15,-18 18 16,1-18-16,-1 1 16,0 17-16,-34 0 15,16 0-15,-34 35 16,34-17-16,-52 52 15,53-52 1,-18 52-16,18-34 16,0 52-16,35-53 15,0 89-15,0-71 16,52 70-16,-16-70 16,52 70-1,-35-70-15,70 18 16,-70-53-16,53 17 15,-53-35-15,35-35 16,-53-1-16,36-52 16,-36 18-16,18-54 15,-35 53-15,-18-52 16,-18 52-16,1 1 16,-54-54-16,36 54 15,-18 35-15,0-1 0,-71 1 16,71 35-1,-35 18-15,53-1 16</inkml:trace>
   <inkml:trace contextRef="#ctx0" brushRef="#br0" timeOffset="337679.9298">29774 4110 0,'-17'0'16,"34"0"31,1 0-32,0 0-15,17 0 0,106 18 16,-70-18-16,123 35 16,-88-18-16,105 19 15,-105-19-15,35 36 16,-70-35-16,-1 17 15</inkml:trace>
@@ -1551,10 +1551,10 @@
   <inkml:trace contextRef="#ctx0" brushRef="#br0" timeOffset="359720.1186">18415 12435 0,'0'0'0,"-35"18"15,-18 17-15,35-17 16,-70 35-16,53-35 16,-53 34-1,52-34-15,1 0 0,-36 17 16,54-35-16,-1 35 16,36-17-1,52 35-15,-17-36 16,71 36-1,-54-35-15,1 0 0,-1-1 16,54 1-16,-71 0 16,-36-18-16,19 17 15</inkml:trace>
   <inkml:trace contextRef="#ctx0" brushRef="#br0" timeOffset="360397.5393">20126 12206 0,'0'18'15,"0"35"-15,0 0 16,0 35-16,0-18 16,18 36-1,-18-53-15,17 35 16,-17-35-16,0-18 0,18 1 16,-18-19-16,0 1 15</inkml:trace>
   <inkml:trace contextRef="#ctx0" brushRef="#br0" timeOffset="361538.5119">20549 12612 0,'18'-18'0,"-36"1"15,1 17-15,-1 0 16,-17 35 0,17-18-16,-17 36 15,17-17-15,18-1 16,0-17-16,0 17 0,18-18 16,17 1-1,-17 0-15,17-18 16,0 0-16,-17-18 0,0 18 15,-1-18-15,1-34 16,-18 34-16,0-17 16,0 17-16,0 0 15,0 1 1,18 17-16,-18 35 16,0-17-16,35 35 15,-18-36-15,19 18 16,-1-17-16,0-18 15,-17 0-15,-18-18 16,-35 1 0,35-18-1,-18-1-15,18 19 16,0-1-16,18-17 16,17 17-1,-17 18-15,34-18 16,-34 18-16,17 0 0,-17 0 15,35-17-15,-35 17 16,-1 0-16,-34 0 31,-19 35-15,19-17-16,-1-1 16,0 1-16,18 17 15,0-17-15,18 0 16,-18-1-16,35-17 15,1 0-15,-1-35 16,-18 35-16,1-35 16,-18 17-16,0 0 15,0 1-15,18 34 32,-18 54-17,17-36-15,1 0 0,-18 1 16,18 52-1,-18-35-15,0-18 16,-18 0-16,0-35 16,18 18-16,-17-18 15,-1 0-15,0-35 16,1 17-16,17 1 0,0-1 16,0-17-16,0-18 15,17 35-15,36 0 16,-35 18-16,17-17 0,1 17 15,34-18 1,-35 0-16,36 1 16,-36-1-16,1-17 15,-19 17-15,18 1 0,-35-1 0,18 0 16,-18 1-16,0-1 0,-35 0 16,17 1-16,-35 17 15,18 0 1,-18 17-16,35-17 15,18 53-15,0-35 16,36 35 0,-1-35-16,0-1 0,1 1 0,16-1 15,37 1-15,-54-18 16,35 0 0,-52 0-16,0 0 15,-36 0-15,0 0 16</inkml:trace>
-  <inkml:trace contextRef="#ctx0" brushRef="#br0" timeOffset="362372.1022">23601 15928 0,'35'0'0,"-17"-18"16,70 1-16,-17 17 15,-1 0-15,124-18 16,-88 18-16,88-18 15,-106 18-15,-17 0 16,35 0-16,-71 0 16,-18 0-16,-52 18 15,-35-18 1,34 0-16</inkml:trace>
+  <inkml:trace contextRef="#ctx0" brushRef="#br0" timeOffset="362372.1021">23601 15928 0,'35'0'0,"-17"-18"16,70 1-16,-17 17 15,-1 0-15,124-18 16,-88 18-16,88-18 15,-106 18-15,-17 0 16,35 0-16,-71 0 16,-18 0-16,-52 18 15,-35-18 1,34 0-16</inkml:trace>
   <inkml:trace contextRef="#ctx0" brushRef="#br0" timeOffset="362811.5734">23989 15610 0,'-35'0'16,"-1"18"-16,19-18 15,-54 35 1,36-17-16,0 0 0,-18-1 16,-18 19-16,36-19 15,-18 36 1,53-35-16,-18 17 0,54 0 16,-19-17-16,71 17 15,-35-17-15,0-1 16,0 1-16,35 17 15,-70-17-15,17 0 16</inkml:trace>
   <inkml:trace contextRef="#ctx0" brushRef="#br0" timeOffset="385991.0124">23760 8273 0,'0'0'15,"0"17"-15,0 1 16,-18-18 15,18-35 1,18-18-17,-18 17-15,17-16 0,19-72 16,-19 54-1,36-89-15,-35 88 16,17-17-16,0 0 0,-17 0 16,35-71-16,-18 71 15,0-71 1,-17 88-16,0-52 16,-18 70-16,17-35 15,-17 53-15,0-18 16,0 35-16,0 0 15,0 1 1,18 17 0,-18-18-16,18 0 15</inkml:trace>
-  <inkml:trace contextRef="#ctx0" brushRef="#br0" timeOffset="386331.0188">23936 6720 0,'0'0'15,"0"-17"1,18-18-1,17-1-15,-17 1 0,-1 0 16,18-1-16,1-34 16,-19 35-16,1 17 0,0-17 15,-1 17 1,-17 36 0,36 35-1,-19-1-15,18-16 0,-17 17 16,35 17-1,-35-52-15,17 35 16,-17-18-16,-1-17 0</inkml:trace>
+  <inkml:trace contextRef="#ctx0" brushRef="#br0" timeOffset="386331.0187">23936 6720 0,'0'0'15,"0"-17"1,18-18-1,17-1-15,-17 1 0,-1 0 16,18-1-16,1-34 16,-19 35-16,1 17 0,0-17 15,-1 17 1,-17 36 0,36 35-1,-19-1-15,18-16 0,-17 17 16,35 17-1,-35-52-15,17 35 16,-17-18-16,-1-17 0</inkml:trace>
   <inkml:trace contextRef="#ctx0" brushRef="#br0" timeOffset="424246.3399">15822 13494 0,'0'-18'31,"18"18"-15,-1-18 0,1 18-16,17-17 0,18 17 15,-18 0-15,18 17 16,0-17-16,18 18 0,105-18 15,-88 0-15,142 0 16,-124-18-16,141 1 16,-142 17-1,72-18-15,-107 18 16,-34 0-16</inkml:trace>
   <inkml:trace contextRef="#ctx0" brushRef="#br0" timeOffset="425947.3892">6544 13511 0,'18'0'16,"35"0"-16,0 0 16,52 0-16,-52 0 15,88 0 1,-70 0-16,-1 0 0,-17 0 15,36 0-15,-54 18 16,-17 0-16</inkml:trace>
   <inkml:trace contextRef="#ctx0" brushRef="#br0" timeOffset="429395.8293">15752 11800 0,'-18'-17'15,"0"17"1,1 0-1,-1 0-15,0 0 16,36 0 15,35 17-15,-18-17-16,71 0 16,-35 0-16,-1 0 15,1 0-15,17 0 16,0 0-16,88 18 15,-70-18-15,-18 0 0,107 0 16,-125-18 0,89 18-16,-106 0 15,0-17-15,17 17 16,-35 0-16,-17 0 16,0 0-16,-18-18 0,-18 18 15,0 0 1,1 0-1,-18 0-15,-18 0 16,35 0-16,-35 0 16,18 18-16,0-18 15,-18 0-15,17 0 0,-69 0 16,52 0 0,-71 17-16,54-17 15,-1 0-15,0 0 0,1 0 16,-18 0-16,17 0 0,-17 0 15,-36 0-15,72 0 16,-37 18 0,54 0-16,0-18 15,17 0-15,1 0 0,34 0 32,18 0-17,-17 0-15,53-18 16,-18 18-16,70-18 15,-52 18-15,123 0 16,-89 0-16,142-17 16,-123 17-16,105 0 15,-123 0-15,35 0 16,-106 0-16,-17 17 16,-18 1-1</inkml:trace>
@@ -1573,7 +1573,7 @@
   <inkml:trace contextRef="#ctx0" brushRef="#br2" timeOffset="456845.6441">8467 4657 0,'17'17'15,"1"1"1,35 17 0,-18-35-16,18 36 15,-18-36-15,1 17 16,-19 1-16,1-1 16,-18 1-16,0 0 0,0-1 15,-35 19 1,17-19-16,0 1 0,1 0 15,-1-18-15,0 17 0,18-34 32</inkml:trace>
   <inkml:trace contextRef="#ctx0" brushRef="#br2" timeOffset="457503.1384">8661 4851 0,'0'0'0,"0"-18"16,17 0-16,1 1 15,53-36-15,-19 35 16,1-35-16,71-17 15,-71 34-15,35-16 16,-35 34-16,-18 0 16,-17 1-16,-1-1 0,1 18 15,-18-18-15,-18 18 16,1 18 0</inkml:trace>
   <inkml:trace contextRef="#ctx0" brushRef="#br2" timeOffset="457774.8965">9155 4357 0,'17'-18'0,"1"1"16,0 17-16,-1 0 15,1 0-15,-1 0 0,36 0 16,-35 17-1,0-17-15,-1 18 0,1-1 16,-18 1-16,0 0 16,-18 17-1,18-17-15,-17-1 0,-1 19 16,18-19-16,0 1 16,0-1-1</inkml:trace>
-  <inkml:trace contextRef="#ctx0" brushRef="#br2" timeOffset="458268.1188">9384 4445 0,'0'0'15,"-18"0"-15,36 18 16,0-1 0,-1 1-16,36 35 15,0-18-15,-18-17 16,36 17-16,-1-17 0,1-1 15,0 19-15,-1-19 0,71 36 16,-88-35-16,53 35 16,-71-36-16,0-17 15,-17 18-15,0 0 0,-1-18 16,-34 0 0,-19 0-1</inkml:trace>
+  <inkml:trace contextRef="#ctx0" brushRef="#br2" timeOffset="458268.1187">9384 4445 0,'0'0'15,"-18"0"-15,36 18 16,0-1 0,-1 1-16,36 35 15,0-18-15,-18-17 16,36 17-16,-1-17 0,1-1 15,0 19-15,-1-19 0,71 36 16,-88-35-16,53 35 16,-71-36-16,0-17 15,-17 18-15,0 0 0,-1-18 16,-34 0 0,-19 0-1</inkml:trace>
   <inkml:trace contextRef="#ctx0" brushRef="#br2" timeOffset="458536.7761">10125 4674 0,'0'18'16,"17"-18"-16,19 18 15,-1-18-15,35 35 16,-34-17-16,-1-1 15,0 1-15,-17-1 16,0 19-16,-1-19 0,1 19 16,-18-1-16,-18-17 15,1-1-15,-36 18 16,17-17-16,19 0 16,-19-1-16,19-17 15,17 18-15</inkml:trace>
   <inkml:trace contextRef="#ctx0" brushRef="#br2" timeOffset="459219.8371">10425 4974 0,'0'-17'16,"17"17"-16,1-18 16,0 18-16,34-18 15,-34 1-15,35-1 16,-18 0-16,53-17 16,-52 0-16,70 0 15,-54-1-15,1 1 16,0 17-16,36-17 15,-72 17-15,18 18 16</inkml:trace>
   <inkml:trace contextRef="#ctx0" brushRef="#br2" timeOffset="459532.0981">11024 4498 0,'53'18'0,"-17"-18"16,34 0-1,18-18-15,-17 18 16,-36 18-16,0-1 15,-17-17-15,-18 18 16,0 17-16,-18-17 16,1-1-16,-1 1 15,0 0-15,1-1 0,17 1 16,0 0 0,0-1-16,17-17 15,-17 18-15</inkml:trace>
@@ -1601,7 +1601,7 @@
   <inkml:trace contextRef="#ctx0" brushRef="#br0" timeOffset="500362.083">22719 1588 0,'18'0'16,"-36"0"-16,53 0 0,-17 0 15,-1 17 1,1 1-1,-18 17-15,18 0 16,-18-17-16,17 0 0,-17-1 16,0 1-16,0 0 15,-17-18 1</inkml:trace>
   <inkml:trace contextRef="#ctx0" brushRef="#br0" timeOffset="500474.6772">22807 1746 0,'0'-17'15,"0"34"-15,18-52 16,17 35-1,-17 0-15,35-18 16,-36 1-16,36-1 16,-35 18-16</inkml:trace>
   <inkml:trace contextRef="#ctx0" brushRef="#br0" timeOffset="501158.0604">24024 2946 0,'0'0'0,"-17"0"16,34 0 0,36 0-1,0 0-15,106 0 16,-71-18-1,141-17-15,-88 35 16,159-35 0,0 17-16,-141 0 0,-18 1 15,106-1 1,-159 18-16,18-18 16,-88 18-16,-18-17 15,-18 17-15,-17 0 16</inkml:trace>
-  <inkml:trace contextRef="#ctx0" brushRef="#br0" timeOffset="501369.1567">25859 2646 0,'35'-18'0,"-17"18"15,70 0-15,-53 0 16,71 18-16,-53-1 16,70 19-1,-17-19-15,-53 1 16,-18-18-16,53 0 15,-70 0-15,-18 18 16,-18-18-16,-17 17 0,-18 1 16,-53 17-16,36-17 15,-18 0 1,52-1-16</inkml:trace>
+  <inkml:trace contextRef="#ctx0" brushRef="#br0" timeOffset="501369.1566">25859 2646 0,'35'-18'0,"-17"18"15,70 0-15,-53 0 16,71 18-16,-53-1 16,70 19-1,-17-19-15,-53 1 16,-18-18-16,53 0 15,-70 0-15,-18 18 16,-18-18-16,-17 17 0,-18 1 16,-53 17-16,36-17 15,-18 0 1,52-1-16</inkml:trace>
   <inkml:trace contextRef="#ctx0" brushRef="#br0" timeOffset="502770.2341">25206 3210 0,'0'-17'0,"-18"17"16,18 17 0,0 1-1,0 17 1,18-17-16,-18-1 0,18 1 15,-1 0-15,36-1 16,-35-17-16,-1 0 0,19-17 16,-19 17-16,-17-18 15,18 18 1,0 0 15,17 18-15,-17-18-16,-1 0 15,1 0-15,-18-18 47,-18 0-31,18 1-16,-17-18 16,17 17-16</inkml:trace>
   <inkml:trace contextRef="#ctx0" brushRef="#br0" timeOffset="503332.0271">25629 3263 0,'18'0'15,"0"0"1,35 0 0,-36 0-16,1 18 15,-1-18-15,-17 17 16,0 1-16,0 0 15,-17-1 1,17 1 0,17-18-16,1 0 15,0 18 1,-1-18-16,1 0 16,-36 17-1,-17-17-15,17 18 16,-34-18-16,34 18 15,-17-18-15</inkml:trace>
   <inkml:trace contextRef="#ctx0" brushRef="#br0" timeOffset="503610.0083">26106 3387 0,'0'0'0,"-18"0"31,18 35-16,-18-17-15,1-1 16,17 1 0,-18 0-16,18-1 15,-18 1-15,1-18 16</inkml:trace>
@@ -1610,8 +1610,8 @@
   <inkml:trace contextRef="#ctx0" brushRef="#br0" timeOffset="504572.288">26741 3316 0,'17'0'16,"-34"0"-16,17 18 0,0-1 15,0 1 1,17 17-1,-17-17-15,18 0 16,-1-1-16</inkml:trace>
   <inkml:trace contextRef="#ctx0" brushRef="#br0" timeOffset="504817.0874">26970 3422 0,'0'0'16,"0"18"-16,0-1 15,0 1 1,-18 0-1</inkml:trace>
   <inkml:trace contextRef="#ctx0" brushRef="#br0" timeOffset="505024.4671">27217 3351 0,'0'0'0,"17"0"15,1 0 1,17 0 0,-17-17-16</inkml:trace>
-  <inkml:trace contextRef="#ctx0" brushRef="#br0" timeOffset="505145.141">27428 3334 0,'18'-18'16,"0"18"-16,-1 0 16,-17-18-16,18 18 15</inkml:trace>
-  <inkml:trace contextRef="#ctx0" brushRef="#br0" timeOffset="505240.6688">27675 3316 0,'0'0'0,"0"-18"16</inkml:trace>
+  <inkml:trace contextRef="#ctx0" brushRef="#br0" timeOffset="505145.1409">27428 3334 0,'18'-18'16,"0"18"-16,-1 0 16,-17-18-16,18 18 15</inkml:trace>
+  <inkml:trace contextRef="#ctx0" brushRef="#br0" timeOffset="505240.6687">27675 3316 0,'0'0'0,"0"-18"16</inkml:trace>
   <inkml:trace contextRef="#ctx0" brushRef="#br0" timeOffset="513170.6241">15663 11853 0,'-17'0'15,"34"0"32,19 0-47,-19 0 16,71 0-1,-52 0-15,34 18 16,1-18-16,-1 0 0,19 0 16,-1 0-16,18 0 0,88-18 15,-89 18-15,90-35 16,-90 17-16,54 1 16,-106 17-16,18-18 15,-36 18-15,-18-17 16,-34 17-1,-18 17-15,-1-17 16,-17 18 0,0-18-16,36 0 0,-1 0 15,-35 0 1,18 0-16,-53 17 16,35-17-16,0 0 0,-18 0 15,-70 18-15,53 0 16,-53-18-16,53 17 15,-53-17 1,52 0-16,19 0 16,-1 0-16,-87 0 15,122 0-15,-17-17 16,71 17 15,53 17-15,-36-17-16,53 0 15,-35 0-15,0 0 0,88 0 16,-70 0-16,17 0 16,18-17-16,-1 17 15,19-18-15,-1 0 0,-17 18 16,18-17-16,70-1 16,-124 18-16,18 0 15,-52 18 1,-36-1-16,-18 1 0</inkml:trace>
   <inkml:trace contextRef="#ctx0" brushRef="#br0" timeOffset="515418.8394">15893 13511 0,'0'0'16,"-36"-17"-16,19 17 16,-1 0-1,0 0-15,36 0 32,0 0-1,35 0-31,-18 0 15,53-18-15,-35 0 16,18 18-16,-18-17 0,88 17 16,-71-18-1,1 18-15,17-17 0,0 17 16,89-36-16,-89 36 16,0-17-16,0 17 0,-35-18 15,18 18-15,17 0 16,-53 0-16,-17 18 0,-1-18 15,1 17 1,-18 1-16,0 0 16,-18-18-16,-17 17 15,17-17-15,-17 0 16,0 0-16,0 0 0,-18 0 16,-53 0-16,35 0 15,-70 0 1,53 0-16,-88 0 15,87 0-15,1 0 0,18 0 16,-1 0-16,-70 18 16,88-18-16,18 17 15,-18 1-15,18 0 0,-1-1 16,19-17-16,17 18 0,-18-18 16,18 18-16,18-18 15,-1 0-15,19 0 0,52-18 16,-18 0-16,54 1 15,-71-1 1,17 18-16,89-18 16,-71 18-16,89 0 15,-72 0-15,-16 0 0,16-17 16,37 17-16,-90 0 16,1 0-16,-35 0 15,-18 17 1</inkml:trace>
   <inkml:trace contextRef="#ctx0" brushRef="#br0" timeOffset="521872.9155">25594 8096 0,'0'18'16,"0"-36"-16,0 54 0,0-19 15,0-52 48,18-36-63,-1 1 15,19-1-15,-19-17 16,1 0-16,17 0 0,0-124 16,-17 106-16,0 0 0,-1 18 15,-17-53 1,18 70-16,-18 19 0,0 16 16,0 1-16,0 17 15,0 36 1,35 53-1,-17-1 1,17 89-16,0-71 16,-17 0-16,35 89 15,-35-107-15,35 89 16,-36-106-16,18 35 16,-35-70-16,18 17 15,-18-17-15,18-18 16,-18-18-16,17-35 15,1 18-15,-18-71 16,18 35-16,-18-70 16,0 71-16,0-18 15,0-1-15,0 1 16,17-53-16,-17 106 16,0-1-16,0 19 15,18 34-15,-18 19 16,35 52-16,-17-18 15,17 54 1,-35-71-16,35 88 16,-17-88-16,-18 17 15,35 36-15,-17-70 0,0 16 16,-18-34-16,17 0 16,1-36-1,-18-52 1,0 34-16,0-70 15,18 54-15,-18-19 0,35-35 16,-35 36-16,35-19 16,-17 54-16,-1 0 15,-17 17-15,18 1 16,0-1-16,-1 36 16,1 52-16,-18-17 15,18 88-15,-1-70 16,1 52-1,-1-70-15,1 35 16,0-52-16,-1 16 16,1-52-16,-18-17 15,18-36 1,-1 18-16,-17-18 16,0 0-16,18 0 0,-18 0 15,18 0-15,-1 0 0,-17 0 16,18 0-16,-18 71 31,18 35-15,-18-18-16,17 0 15,1 1-15,-18-19 0,35 19 16,-17-19-16,-1 1 0,1 0 16,0-18-16,-1 0 0,1 0 15,17-18-15,-17 0 16,-1-35-1,-17 18-15,0-18 16,0 18-16,0 17 16,0 1-16,0-1 15,18 36 1,0 17 0,-18-17-1,17 17-15,1-35 0,0 35 16,-1-17-16,1-18 15,0 0-15,-1-18 16,1 18-16,-1-35 16,-17 17-16,18 1 15,-18-1-15,18-35 16,-18 35-16,0 36 16,0 17-1,0 1-15,17-19 16,-17 18-16,18-17 0,17 35 15,-17-35 1,-18-1-16,18 1 0,-18 0 16,17-18-16,1 17 15,0-17-15,-1 0 16</inkml:trace>
@@ -1628,16 +1628,16 @@
   <inkml:trace contextRef="#ctx0" brushRef="#br1" timeOffset="579568.753">15011 12929 0,'17'0'31,"1"0"0,0 0-31,-1 0 16,-17 18-1,0 0 1,0 17 0,0-17-1,-17-1-15,17 1 16,-18-1-1,0 1-15,18 0 16,-17-18 0,17 17-16,-18-17 0,18 18 15,-18-18 1,1 0 0,34 0 46,1 0-31,0 0-31,-1 0 16,19 0 0,-19 0-16,19 0 15,-19 0-15,18 0 16,-17 0-1,-36 18-15</inkml:trace>
   <inkml:trace contextRef="#ctx0" brushRef="#br1" timeOffset="598267.4229">13458 15558 0,'18'0'16,"0"0"-16,-1 0 15,19 0 1,-19 0-16,19 0 16,-19 0-16,1 0 15,17-18-15</inkml:trace>
   <inkml:trace contextRef="#ctx0" brushRef="#br1" timeOffset="598485.2616">13547 15363 0,'0'36'0,"0"-19"16,0 19-16,17 34 15,-17-52-15,18 52 16,-18-52-16,18 35 16,-1-35-1,1-18-15</inkml:trace>
-  <inkml:trace contextRef="#ctx0" brushRef="#br1" timeOffset="598901.2851">14023 15346 0,'-18'0'31,"-35"17"-31,36 1 16,-36 17-16,35 1 15,-17-1 1,35-17-16,0-1 0,0 1 16,0 0-16,18-18 0,17 17 15,-18-17-15,19 0 16,-19 18-16,1-18 16,0 0-16,-36 0 15,18 17-15,-35 19 16,17-19-1,-17 19-15,35-19 16,0 1-16,0 0 0,17-1 16,1 1-16,0-18 15,35 0 1,-36 0-16,19 0 0,-19 0 16,1 0-16,-1-18 0</inkml:trace>
+  <inkml:trace contextRef="#ctx0" brushRef="#br1" timeOffset="598901.285">14023 15346 0,'-18'0'31,"-35"17"-31,36 1 16,-36 17-16,35 1 15,-17-1 1,35-17-16,0-1 0,0 1 16,0 0-16,18-18 0,17 17 15,-18-17-15,19 0 16,-19 18-16,1-18 16,0 0-16,-36 0 15,18 17-15,-35 19 16,17-19-1,-17 19-15,35-19 16,0 1-16,0 0 0,17-1 16,1 1-16,0-18 15,35 0 1,-36 0-16,19 0 0,-19 0 16,1 0-16,-1-18 0</inkml:trace>
   <inkml:trace contextRef="#ctx0" brushRef="#br1" timeOffset="599924.2113">22631 15963 0,'-18'0'15,"36"0"1,-1 0 0,1 0-1,17 0 1,-17 0-16,0 0 16,-1 0-16,1 0 0,-1 0 15,1 0-15,-18 18 16</inkml:trace>
-  <inkml:trace contextRef="#ctx0" brushRef="#br1" timeOffset="600135.2046">22754 15804 0,'0'0'0,"0"18"15,0 0-15,0-1 0,0 36 16,0-35-16,18 0 16,-18 34-16,0-16 15,0-1-15,0-17 0,17-18 32</inkml:trace>
+  <inkml:trace contextRef="#ctx0" brushRef="#br1" timeOffset="600135.2045">22754 15804 0,'0'0'0,"0"18"15,0 0-15,0-1 0,0 36 16,0-35-16,18 0 16,-18 34-16,0-16 15,0-1-15,0-17 0,17-18 32</inkml:trace>
   <inkml:trace contextRef="#ctx0" brushRef="#br1" timeOffset="600552.9924">22966 15910 0,'0'0'0,"17"-17"0,-17 34 46,-17 1-30,-1 0-16,18-1 0,-17 1 16,-1-18-1,18 17 1,0 1-16,18-18 0,-1 0 16,-17 18-16,18-18 15,-1 0 1,-17 17-16,18-17 0,-18 18 15,-18-18-15,1 18 16,17-1-16,-18-17 16,18 18-16,-17 0 15,34-1-15,1-17 16,17 0 0,-17 0-16,-1 0 15,19-17-15,-19 17 16</inkml:trace>
   <inkml:trace contextRef="#ctx0" brushRef="#br1" timeOffset="603100.369">8255 17039 0,'-18'0'0,"-35"0"16,18 0 0,0 0-16,-18 18 0,18-1 15,-18 1-15,0 0 16,18-1-16,-18 1 0,0 17 16,53-17-16,0 0 15,17-1-15,36-17 16,0 0-16,-17 0 15,-1 0-15,18 0 0,0 0 16,-36 0-16,1 0 16,-18 18-16,-18-1 15,-17 19-15,0-19 0,-1 19 16,1-1-16,18 0 16,-19 1-16,19-19 15,34 18-15,1-35 16,52 0-16,-34 0 15,34-17 1,-34 17-16,-1 0 16,-18 0-16,1-18 0,17 18 0,-17 0 15</inkml:trace>
   <inkml:trace contextRef="#ctx0" brushRef="#br1" timeOffset="603345.5509">8590 17268 0,'35'-17'16,"-70"34"-16,88-34 0,-35 17 0,52-18 15,-34 18-15,-1 0 16,-18 0-16,19 0 16</inkml:trace>
   <inkml:trace contextRef="#ctx0" brushRef="#br1" timeOffset="603466.3715">8643 17392 0,'35'18'15,"1"-18"-15,-1 0 0,35-18 16,-34 0-16,-19 18 16,1 0-16</inkml:trace>
   <inkml:trace contextRef="#ctx0" brushRef="#br1" timeOffset="603973.9342">9384 16916 0,'0'0'15,"18"70"-15,-18-34 0,17 34 16,-17-17-16,0-18 0,0 36 15,0-36-15,18 36 16,-1-54-16,1 1 16,0-18-16</inkml:trace>
   <inkml:trace contextRef="#ctx0" brushRef="#br1" timeOffset="604313.2285">9719 17127 0,'0'0'0,"-18"0"0,-17 18 16,35 17 0,-18 1-16,18 52 15,18-53-15,17 53 16,1-52-16,-1-19 0,53 18 15,-53-35-15,71-17 16,-70-18-16,34-18 16,-52 17-1,-1-34-15,-17 34 16,-53-16-16,18 34 16,-71-17-16,71 35 15,-53 0 1,53 0-16,17 0 15,18-18-15</inkml:trace>
-  <inkml:trace contextRef="#ctx0" brushRef="#br1" timeOffset="604767.1742">10213 16933 0,'-18'0'16,"36"-17"-16,17-1 15,-17 18-15,-1-18 16,1 18-16,17 0 16,-17 0-16,0 0 0</inkml:trace>
+  <inkml:trace contextRef="#ctx0" brushRef="#br1" timeOffset="604767.1741">10213 16933 0,'-18'0'16,"36"-17"-16,17-1 15,-17 18-15,-1-18 16,1 18-16,17 0 16,-17 0-16,0 0 0</inkml:trace>
   <inkml:trace contextRef="#ctx0" brushRef="#br1" timeOffset="605341.0824">10672 16704 0,'0'0'0,"0"-18"16,0 1-16,-18-1 16,0 18-1,-17 0 1,17 0-16,-17 0 15,17 0-15,1 18 16,17-1-16,-18 1 16,36 0-16,-1 17 15,1-17-15,35 35 16,-35-36-16,52 36 16,-52-18-16,17 1 15,-17-19-15,-18 19 16,-18-19-16,0 1 15,-17-1-15,18-17 16,-19 0-16,19-17 16,-19-1-16,19-17 15,17-18-15,0 35 16,35-52-16,0 35 16,18-18-1,-18 17-15,1-17 16,-36 36-16,0-1 15,-18 18-15,0-18 0,-52 1 16,17 17-16,-18 17 16,36 1-16</inkml:trace>
   <inkml:trace contextRef="#ctx0" brushRef="#br1" timeOffset="610685.3832">22825 15416 0,'-18'0'15,"36"0"157,-18-17-172,17 17 16,1 0-16,0 17 15,-1 1 1,1-18-16,0 0 0,-1 0 16,1 0-16,35 0 15,-36 0-15,19 0 0,-1-18 16,-17 1-1,-1 17-15,1 0 16,-18-18 0,0 36 31,18-18-47,-1 0 15,-17 17 32,0 1-31,0 0-16,0 17 15,0-17-15,0-1 16,18 19 0,-18-19-16,0 1 15,17-1-15,-17-34 31</inkml:trace>
   <inkml:trace contextRef="#ctx0" brushRef="#br1" timeOffset="611370.1435">23160 15399 0,'-18'0'62,"-17"0"-46,0 17-16,-18-17 16,35 18-16,0-18 0,1 0 15,-18 0 1,17 18-16</inkml:trace>
@@ -1671,7 +1671,7 @@
   <inkml:trace contextRef="#ctx0" brushRef="#br0">2134 2752 0,'0'0'16,"0"-18"-16,0-17 0,0 17 15,18 18 1,0 18-16,17 35 16,-17-18-16,-1 18 15,18 70-15,-17-52 16,0-1-16,17 89 16,0-88-16,-17-18 15,0 0-15,-1-18 0,1 0 16,17-17-16,-17-18 0,17-18 15,-17-17-15,-1 0 16,-17-18-16,0 0 16,0 0-16,0-88 15,-17 88-15,17-18 0,-18 18 16,0 18-16,1-18 16,-1 36-16,18-1 15,0 36-15</inkml:trace>
   <inkml:trace contextRef="#ctx0" brushRef="#br0" timeOffset="521.5494">2893 3457 0,'0'0'16,"-18"-17"-16,18-1 0,-17 18 0,-19-18 16,1 18-1,17 18-15,1 17 16,17 1-16,0 16 15,0-34-15,17 0 16,1 17 0,0-17-16,-1-18 0,36 0 15,-35-18-15,-1 0 16,1-17 0,-18 0-16,18-18 15,-36 18-15,18-18 16,-18 17-16,1 1 0,-18-53 15,17 70-15,0-17 16,1 35-16,17-18 16,-18 18-16,18 36 15,18-1-15,-18 18 0,17 0 16,1-18-16,17 53 16,-17-52-16,-1-1 15,1 0-15,0-17 0,35 17 16,-36-35-16,19 18 15,-19-18-15</inkml:trace>
   <inkml:trace contextRef="#ctx0" brushRef="#br0" timeOffset="978.1636">3122 3369 0,'-18'18'15,"36"-36"-15,-36 53 0,1 1 16,17-1-16,0-17 0,0 17 16,0-18-16,17 19 15,-17-19-15,18 1 0,0 0 0,-1-18 16,19 0-1,-19 0-15,1 0 0,-18-18 16,18 0-16,-18 1 0,0-1 16,0 0-16,0 1 0,-18 17 15,36 0 1,-1 35 0,1-17-16,-1-1 15,1 1-15,0 0 0,-1-18 16,1 17-16,17-17 15,-17-17-15,-18-1 16,18-17 0,-36 17-16,18-35 15,-18 18-15,1 0 0,-1-1 16,18 19-16,0-1 16</inkml:trace>
-  <inkml:trace contextRef="#ctx0" brushRef="#br0" timeOffset="1201.0142">3651 3122 0,'18'-18'16,"-36"36"-16,54-36 0,-19 18 16,1 0-16,17 0 15,-17 0 1</inkml:trace>
+  <inkml:trace contextRef="#ctx0" brushRef="#br0" timeOffset="1201.0141">3651 3122 0,'18'-18'16,"-36"36"-16,54-36 0,-19 18 16,1 0-16,17 0 15,-17 0 1</inkml:trace>
   <inkml:trace contextRef="#ctx0" brushRef="#br0" timeOffset="1320.9455">3687 3263 0,'0'0'0,"17"0"16,36 18 0,-35-18-16,17-18 0,-17 18 15,35-17 1</inkml:trace>
   <inkml:trace contextRef="#ctx0" brushRef="#br0" timeOffset="1773.7128">4339 2999 0,'-17'-18'0,"-1"18"15,0 0-15,1 18 16,17 17 0,-18-17-16,18 17 0,0 35 15,18-34-15,35 17 16,-36-18-16,54 0 15,-36-35-15,0 18 16,1-18-16,34-36 16,-35 19-16,-17-1 0,0-17 15,-18 0-15,0-1 0,-36-34 16,19 35-16,-71-18 16,52 35-16,-34 0 15,34 18 1,19 0-16,-1 0 0,1 18 15,17 0-15</inkml:trace>
   <inkml:trace contextRef="#ctx0" brushRef="#br0" timeOffset="2217.4902">5292 3298 0,'-36'89'0,"72"-178"0,-107 213 15,53-89-15,-17 18 16,18-35-16,-1 17 0</inkml:trace>
@@ -1679,22 +1679,22 @@
   <inkml:trace contextRef="#ctx0" brushRef="#br0" timeOffset="3374.1334">6526 3228 0,'0'0'16,"0"-18"-16,0 1 0,-17-1 15,-1 18 1,0 0-16,-17 0 16,18 18-16,-19 17 15,19 0-15,-19 18 16,36-18-16,18 18 15,0-35-15,35 0 16,-36-18-16,54-18 16,-54 0-16,36-17 15,-53 17 1,18-17-16,-18 0 0,0 0 0,0-1 16,-18 1-16,-17-36 15,17 54-15,18-18 16,-17 17-16,-1 18 0,-17 0 15,17 18 1,18 34-16,0-16 16,18 34-1,-1-34-15,19 34 16,-19-35-16,36 18 16,-17-17-16,-19-36 15,1 17-15,17 1 16,-17-18-16</inkml:trace>
   <inkml:trace contextRef="#ctx0" brushRef="#br0" timeOffset="3770.0452">6703 3228 0,'0'0'16,"0"18"-16,0-1 0,0 18 15,0 1-15,0-1 16,17 0-16,1-17 15,0 17-15,-1-35 16,19 18-16,-19-36 16,1 1-1,0-1-15,-1-17 16,-17 17-16,0 0 0,0 1 16,0 34-1,18 19 1,-18-19-16,35 19 15,-35-19-15,18-17 16,-1 0-16,19 0 16,-19-17-16,1-19 15,-18 19-15,0-36 16,0 35 0,0-17-16,-18-18 15,18 35-15,-17 1 0,17-1 16,17 18-1</inkml:trace>
   <inkml:trace contextRef="#ctx0" brushRef="#br0" timeOffset="3975.4329">7232 2981 0,'53'0'15,"-106"0"-15,124 0 0,-54 0 0,1 0 0,-1 0 16,19 0 0</inkml:trace>
-  <inkml:trace contextRef="#ctx0" brushRef="#br0" timeOffset="4103.7433">7320 3175 0,'0'0'0,"18"0"0,17 0 16,-17 0-16,-1-18 16,1 18-16,17 0 0,-17-17 15</inkml:trace>
+  <inkml:trace contextRef="#ctx0" brushRef="#br0" timeOffset="4103.7432">7320 3175 0,'0'0'0,"18"0"0,17 0 16,-17 0-16,-1-18 16,1 18-16,17 0 0,-17-17 15</inkml:trace>
   <inkml:trace contextRef="#ctx0" brushRef="#br0" timeOffset="4465.1362">7849 2928 0,'0'0'16,"-35"-18"-16,17 18 0,1 18 0,-36 17 15,53 1 1,0-1-16,0 0 0,0 0 0,35-17 16,18 35-1,-18-18-15,36-17 16,-18-18-16,17 0 16,-34-18-16,17-35 15,-18 18-15,-18-53 16,-17 53-16,-17-54 15,-18 54-15,-54-35 16,54 34-16,-18 36 16,-17 0-1,34 0-15,19 18 0,17 17 16,0-17-16,0 17 0,17-17 16</inkml:trace>
-  <inkml:trace contextRef="#ctx0" brushRef="#br0" timeOffset="4782.9779">8590 3316 0,'0'0'0,"0"-18"16,-17 18-1,-1 0 1</inkml:trace>
+  <inkml:trace contextRef="#ctx0" brushRef="#br0" timeOffset="4782.9778">8590 3316 0,'0'0'0,"0"-18"16,-17 18-1,-1 0 1</inkml:trace>
   <inkml:trace contextRef="#ctx0" brushRef="#br0" timeOffset="8741.1916">9666 2699 0,'0'0'0,"0"-18"0,0 0 16,0 1 0,-18 17-16,18 17 15,36 54 1,-19-18-16,1 18 0,17-1 16,-17 1-16,17-1 0,18 36 15,-18-53-15,18-18 16,-35-17-16,17-36 15,-17 1 1,-18-54-16,18 18 16,-36-53-16,18 53 15,-18 0-15,18 1 0,0 16 16,-17-17-16,17 71 31,0 0-15</inkml:trace>
   <inkml:trace contextRef="#ctx0" brushRef="#br0" timeOffset="9143.7609">10283 3193 0,'-35'-18'16,"18"18"-16,-1-18 15,0 36-15,18 0 16,-17 35 0,34-36-16,19 18 15,-19-17-15,1 0 16,-1-18-16,1 0 16,0 0-16,-1-18 0,1-17 15,-18 0-15,0 17 16,0-17-16,-18-18 15,18 35-15,-17 0 16,-1 18-16,0 18 16,36 35-1,-18-35-15,35 35 16,1-36-16,-1 18 16,0-17-16,1 0 15,-19-18-15,1 0 16,-1-18-1,-17 0-15</inkml:trace>
   <inkml:trace contextRef="#ctx0" brushRef="#br0" timeOffset="9436.0396">10513 2910 0,'17'89'15,"-34"-178"-15,34 231 0,1-37 16,0-52-16,-1 18 15,1-36-15,-18-17 16,18-1-16,-1-17 16,1-35-1,0 35-15,-1-18 16,1 1-16,17 34 16,-35 1-16,0 0 15,18-1-15,-36 19 16,0-19-16,1-17 15,-1 0 1,-17-17-16,17-1 16,18 0-16,0 1 15</inkml:trace>
   <inkml:trace contextRef="#ctx0" brushRef="#br0" timeOffset="9665.1515">11024 3052 0,'-17'0'15,"34"0"-15,-34-18 16,34 18-16,36-18 15,-35 18-15,17 0 16,-17-17-16,-1 17 16</inkml:trace>
-  <inkml:trace contextRef="#ctx0" brushRef="#br0" timeOffset="9769.8869">11113 3140 0,'0'0'0,"0"17"15,0 1-15,17-18 16,1 0-16,-1 0 15,1 0-15,17 0 0</inkml:trace>
+  <inkml:trace contextRef="#ctx0" brushRef="#br0" timeOffset="9769.8868">11113 3140 0,'0'0'0,"0"17"15,0 1-15,17-18 16,1 0-16,-1 0 15,1 0-15,17 0 0</inkml:trace>
   <inkml:trace contextRef="#ctx0" brushRef="#br0" timeOffset="10076.9637">11448 2981 0,'-18'18'15,"0"-1"-15,18 36 16,0-18-16,18-17 16,35 53-16,-35-54 15,52 1-15,-35-18 16,1 0-16,-1-18 16,0 1-16,1-36 15,-19 17-15,-17 1 0,-17-35 16,-1 34-16,-53-34 15,18 52-15,18 1 16,-18 17-16,36 0 16,-19 0-16,1 17 15,35 1-15,18 35 16</inkml:trace>
   <inkml:trace contextRef="#ctx0" brushRef="#br0" timeOffset="10342.2351">12100 3298 0,'0'0'0,"-17"36"16,17-19-16,-36 36 16,36-35-16,-35 17 15,17-17-15,1-18 0,-1 18 16,1-18-16,-1 0 0,0 0 16</inkml:trace>
   <inkml:trace contextRef="#ctx0" brushRef="#br0" timeOffset="10914.9132">13106 2822 0,'-36'-53'0,"72"106"0,-107-123 16,1 34-16,17 36 15,-36 0-15,37 18 16,16 17-16,1-17 15,17 17-15,18 1 0,0 16 16,18-16-16,17-1 16,18-17-16,-18-1 0,18 19 15,0-19-15,36 18 16,-54-17-16,0 35 16,-35-35-16,0-1 0,-35 1 15,17-18-15,-35 18 16,-35-1-16,53-17 15,-1 0-15,1 0 0,18 0 16</inkml:trace>
   <inkml:trace contextRef="#ctx0" brushRef="#br0" timeOffset="11088.4323">13370 3228 0,'0'0'0,"18"-18"0</inkml:trace>
   <inkml:trace contextRef="#ctx0" brushRef="#br0" timeOffset="11723.2351">13370 3228 0,'71'-35'16,"-89"35"46,1 0-30,-1 0-17,0 0-15,1 0 16,-1 35-16,0-17 16,18-1-16,-17 1 0,17-1 15,0 36-15,0-35 16,17 0-16,1-1 15,0-17-15,35 18 16,-36-18-16,1-18 0,-1 1 16,19-1-16,-19-35 15,-17 18-15,0-18 16,0 18-16,-17-1 0,-1-17 16,0 18-16,1 18 15,-1 17 1,1 0-16,-1 17 15,18 36-15,0-18 16,35 36 0,-17-36-16,35 18 15,-18-18-15,18 1 16,-35-19-16,17-17 16,-17 18-16,-1-18 0</inkml:trace>
-  <inkml:trace contextRef="#ctx0" brushRef="#br0" timeOffset="12158.5558">13688 2999 0,'0'35'0,"0"-17"16,17 17-16,-17 0 16,0 0-16,18 1 0,0 17 15,-18-18-15,17-18 16,-17 1-16,0 0 15,18-18-15,0 0 16,-1-18 0,1 18-16,0 18 0,-1-1 15,1 1-15,-18 0 16,0-1-16,-18 1 16,-17-18-1,17 0-15,-17 0 16,17-18-16,-17 1 15,35-1-15,0 0 16</inkml:trace>
+  <inkml:trace contextRef="#ctx0" brushRef="#br0" timeOffset="12158.5557">13688 2999 0,'0'35'0,"0"-17"16,17 17-16,-17 0 16,0 0-16,18 1 0,0 17 15,-18-18-15,17-18 16,-17 1-16,0 0 15,18-18-15,0 0 16,-1-18 0,1 18-16,0 18 0,-1-1 15,1 1-15,-18 0 16,0-1-16,-18 1 16,-17-18-1,17 0-15,-17 0 16,17-18-16,-17 1 15,35-1-15,0 0 16</inkml:trace>
   <inkml:trace contextRef="#ctx0" brushRef="#br0" timeOffset="12372.9377">14146 2981 0,'53'-18'16,"-35"18"-16,35 0 16,-35 0-16,34 0 15</inkml:trace>
-  <inkml:trace contextRef="#ctx0" brushRef="#br0" timeOffset="12484.3766">14199 3069 0,'0'0'0,"0"18"15,0-1-15,36-17 16,17 0 0,-18 0-16,-18 0 0,19-17 15</inkml:trace>
+  <inkml:trace contextRef="#ctx0" brushRef="#br0" timeOffset="12484.3765">14199 3069 0,'0'0'0,"0"18"15,0-1-15,36-17 16,17 0 0,-18 0-16,-18 0 0,19-17 15</inkml:trace>
   <inkml:trace contextRef="#ctx0" brushRef="#br0" timeOffset="12840.4285">14746 2928 0,'0'0'0,"-35"18"15,35-1-15,-18 36 16,18-17-16,0-1 16,18 0-16,17 18 15,0-18-15,1-17 16,-1-18-16,36 18 0,-36-18 16,53-36-1,-53 19-15,36-54 16,-54 36-16,1-36 15,-18 18-15,0 18 0,-70-53 16,34 53-16,-87 17 16,70 0-16,0 18 15,-18 18 1,36-18-16,17 18 0,1-1 16</inkml:trace>
   <inkml:trace contextRef="#ctx0" brushRef="#br0" timeOffset="14479.6526">2611 4374 0,'-36'-35'0,"19"18"15,-1 17-15,-17 17 16,17 1-16,0 17 0,1 18 0,-1-18 16,1 89-1,34-89-15,36 53 16,-18-52-16,18-1 0,0-18 16,0-17-16,0 18 0,0-36 15,35-17-15,-53 18 16,18-72-16,-35 54 15,-18-18-15,-18 0 16,-17 18-16,-53-53 16,35 52-16,0 19 15,-18-1-15,19 1 0,-19 17 16,36 0-16,17 17 16,36 1-16,17 17 15</inkml:trace>
   <inkml:trace contextRef="#ctx0" brushRef="#br0" timeOffset="14785.6431">3210 4780 0,'18'18'0,"-36"-36"0,36 53 16,-36-52 15,18-18-31,0-1 16,0-17-16,0 36 15,18-1-15,-18 0 16,35 1 0,0 17-16,1 17 15,-19 1-15,19 17 16,-19-17-16,-17 17 15,0-17-15,0 17 16</inkml:trace>
@@ -1742,7 +1742,7 @@
   <inkml:trace contextRef="#ctx0" brushRef="#br0" timeOffset="30646.0146">18697 5486 0,'0'0'0,"-35"53"0,17-36 15,1 19-15,17 16 16,0-16-16,17-19 0,19 1 16,34 0-1,-17-36 1,-35 0-16,-18 1 0,17-19 16,-17-16-1,0 34-15,-17-17 16,-1 35-16,18 17 31,0 1-15,0 0-16,18-18 0,-1 17 0,36 18 15,-35-35-15,0 0 16,-1 0-16,-17-17 31,-17-1-31,17-17 16,0 17-1,0 1 1,17 17-16,1-18 0,17 0 16,0 18-16,-17 0 0,53-17 15,-36 17-15,18 0 16,-36 0 0,-34-18 15,-1 0-16,0 1-15</inkml:trace>
   <inkml:trace contextRef="#ctx0" brushRef="#br0" timeOffset="30807.6261">19138 5221 0,'0'18'16,"18"-1"-1,-18 19-15,0-1 0,0 53 16,0-35-16,17 18 15,-17-18-15,0-36 16,0 18-16,0-17 0,18 0 16,-18-1-16,18-17 15</inkml:trace>
   <inkml:trace contextRef="#ctx0" brushRef="#br0" timeOffset="31296.8904">19385 5486 0,'-35'0'16,"17"0"-16,1 35 16,-1-17-16,18 35 15,0-36-15,18 18 16,-1-17-16,1 0 0,35-18 16,-18 0-16,0-18 15,1 0-15,-19 1 16,-17-18-16,18-1 0,0-52 15,-1 35-15,-17-53 16,0 36 0,0-18-16,-17 52 0,17 1 15,-18 17 1,18 54 0,18 52-16,-1 53 15,1-18 1,-1-17-1,1-35-15,-18-54 16,18 1-16,-18 0 16,17-18-16,1-36 15,0 1 1,-1 35-16,1-17 16,0 17-16,17 0 15,-35 17-15,35 18 16,-35-17-16,18 17 15,-18-17-15,17 17 16</inkml:trace>
-  <inkml:trace contextRef="#ctx0" brushRef="#br0" timeOffset="33220.1631">4427 6597 0,'18'0'15,"-18"18"-15,18 17 0,17 71 16,-17-36-16,52 71 16,-52-70-1,17-18-15,0 0 0,54 17 16,-72-52-16,54-18 15,-54 0-15,36-71 16,-53 18-16,18 1 16,-36-37-1,1-16-15,-1 52 16,-17 17-16,17 1 0,-17-18 16</inkml:trace>
+  <inkml:trace contextRef="#ctx0" brushRef="#br0" timeOffset="33220.163">4427 6597 0,'18'0'15,"-18"18"-15,18 17 0,17 71 16,-17-36-16,52 71 16,-52-70-1,17-18-15,0 0 0,54 17 16,-72-52-16,54-18 15,-54 0-15,36-71 16,-53 18-16,18 1 16,-36-37-1,1-16-15,-1 52 16,-17 17-16,17 1 0,-17-18 16</inkml:trace>
   <inkml:trace contextRef="#ctx0" brushRef="#br0" timeOffset="35536.8892">5274 7214 0,'0'-17'16,"0"-1"-16,0 0 16,0 1-16,0-1 15,-18 0 1,1 18-16,-1 0 15,0 18-15,1 0 16,-18 17-16,35 0 16,0 1-16,0-19 15,17 19-15,1-36 16,-1 17 0,1-17-16,0 0 0,17 0 15,-35-17-15,35-19 16,-35 19-16,18-54 15,-18 36-15,-18-36 16,18 36-16,-35-36 16,35 36-16,-18 17 15,1 18-15,17-17 0,0 34 16,0 1-16,17 53 16,1-36-16,0 0 15,35 36 1,-36-54-16,19 19 0,-1-1 15,0 0 1</inkml:trace>
   <inkml:trace contextRef="#ctx0" brushRef="#br0" timeOffset="37370.0372">5521 7038 0,'0'0'16,"0"-18"-16,0 36 16,18 52-1,-18-34 1,35 34-16,-17-52 15,-18 0-15,17-1 0,1 1 16,17-18-16,-17 0 16,-1-18-16,19-35 15,-19 0 1,-17 36-16,0-1 0,0 0 16,18 54 15,-18-19-31,18 1 0,17 17 15,-18-35-15,1 18 16,35-18-16,-35 0 16,-1-18-16,1 18 15,-18-35-15,-18 0 16,1-1-16,-1 19 16,0-1-16,1 1 15</inkml:trace>
   <inkml:trace contextRef="#ctx0" brushRef="#br0" timeOffset="38065.5729">6244 6879 0,'18'0'31,"17"0"-15,18-17-16,-35 17 16,-1 0-16,1 0 15,0 0-15</inkml:trace>
@@ -1757,7 +1757,7 @@
   <inkml:trace contextRef="#ctx0" brushRef="#br0" timeOffset="49665.6783">10901 6509 0,'0'-36'15,"-18"19"1,1-18-16,-1 35 16,0 0-16,-17 52 15,17 107 1,18-88 0,-17 52-16,17-70 0,17 0 15,1 53 1,0-71-16,35 18 15,-18-35-15,35-1 16,-52-17-16,0-17 16</inkml:trace>
   <inkml:trace contextRef="#ctx0" brushRef="#br0" timeOffset="49916.9932">11165 6473 0,'0'53'0,"0"0"16,0-17-16,0 34 0,0-17 16,0 0-16,18 53 15,-18-53-15,0 17 16,18-34-16,-1-1 15,-17-18-15,18-17 16</inkml:trace>
   <inkml:trace contextRef="#ctx0" brushRef="#br0" timeOffset="50071.0989">11430 6932 0,'18'0'16,"-1"0"-16,36-18 16,-35 18-16,35 0 15,-36-17-15</inkml:trace>
-  <inkml:trace contextRef="#ctx0" brushRef="#br0" timeOffset="50584.4912">11942 7479 0,'0'0'15,"-18"-18"-15,-17-35 16,-1-17-16,1-36 16,17 53-16,1-88 15,17 53-15,0 0 16,0-71 0,17 88-16,36-17 15,-35 53-15,53 17 16,-54 36-16,36 35 15,-53-18-15,18 0 16,-18 1-16,0-1 0,0 35 16,0-34-16,0 17 15,0-36-15,0 1 16,35-18 0,-17 17-16,17-17 0,18 18 15,-36 0-15,-17-1 16,0 1-16,-17 0 15,-1-1-15,-17 1 16,-18 0-16,18-1 16,-1 1-16,19-18 15,34 0 1</inkml:trace>
+  <inkml:trace contextRef="#ctx0" brushRef="#br0" timeOffset="50584.4911">11942 7479 0,'0'0'15,"-18"-18"-15,-17-35 16,-1-17-16,1-36 16,17 53-16,1-88 15,17 53-15,0 0 16,0-71 0,17 88-16,36-17 15,-35 53-15,53 17 16,-54 36-16,36 35 15,-53-18-15,18 0 16,-18 1-16,0-1 0,0 35 16,0-34-16,0 17 15,0-36-15,0 1 16,35-18 0,-17 17-16,17-17 0,18 18 15,-36 0-15,-17-1 16,0 1-16,-17 0 15,-1-1-15,-17 1 16,-18 0-16,18-1 16,-1 1-16,19-18 15,34 0 1</inkml:trace>
   <inkml:trace contextRef="#ctx0" brushRef="#br0" timeOffset="50762.8555">12347 7073 0,'0'18'0,"0"-36"0,0 71 16,18-35-16,-18 17 16,0-17-1,18-1-15,-1 1 0,1-18 16,-1 0-16</inkml:trace>
   <inkml:trace contextRef="#ctx0" brushRef="#br0" timeOffset="51050.1265">12541 6491 0,'18'18'16,"35"17"0,-36 0-1,19 1-15,-1-1 0,0 18 16,1 35-16,-1 18 16,-35-71-16,0 18 15,-18 18 1,1-36-16,-36 0 15,35-17-15,0 17 16,1-35-16</inkml:trace>
   <inkml:trace contextRef="#ctx0" brushRef="#br0" timeOffset="52671.4096">13282 6985 0,'0'-18'15,"-35"-17"1,17 35-16,-17-18 16,17 18-16,-35 36 15,36-19-15,-19 36 16,19-35-16,17 52 15,0-34-15,0-19 16,17 1-16,19 0 0,17 17 16,-18-35-16,35-18 15,-34 1-15,-1-1 16,0-17-16,1-36 16,-19 18-16,-17 18 15,0-71-15,0 53 16,-17 0-16,-19-35 15,1 35-15,17 18 0,-17-18 16,17 35-16,1 18 16,17 18-1,0 17-15,0 18 16,0 53-16,17-35 16,36 52-16,-35-70 15,17 0-15,-17 0 0,52 17 16,-52-34-16,17-1 15,18 0 1,-17-35-16</inkml:trace>
@@ -1773,7 +1773,7 @@
   <inkml:trace contextRef="#ctx0" brushRef="#br0" timeOffset="65654.3061">19420 6685 0,'0'18'15,"36"52"1,-19-34-16,1 17 0,0-18 15,17 53 1,-17-53-16,17 18 16,-18-35-16,19-1 15,-19-34-15,1-36 16,-18 18-16,18-54 16,-18 37-1,0 16-15,0-17 0,0 0 16,-18-35-16,18 53 15,0 17-15,0 1 16</inkml:trace>
   <inkml:trace contextRef="#ctx0" brushRef="#br0" timeOffset="67951.395">20038 7056 0,'-18'-18'15,"1"18"1,17-18-16,-18 18 15,0 0-15,1 0 16,-19 0 0,19 18-16,-1 0 15,0 17-15,18 0 16,18-17-16,-18-1 16,35 1-16,-17 0 15,0-18-15,17 0 16,0-18-1,-17 0-15,-1 1 0,1-19 16,-18-16 0,0 16-16,0-34 15,0 52-15,0-17 16,0 17-16,0 1 16,0-1-16,-18 18 0,18 18 15,0 34 1,18-16-1,-18-1-15,35 36 16,-17-36-16,35 0 16,-35-17-16,-1-1 0,18-17 15,-17 0-15</inkml:trace>
   <inkml:trace contextRef="#ctx0" brushRef="#br0" timeOffset="68284.6727">20285 6773 0,'0'0'15,"0"36"-15,17 17 0,-17 52 16,18-52-16,0 35 16,-1-52-16,19 17 15,-19-36 1,1-17-16,-1-17 15,-17-1-15,18 0 0,17-35 16,-17 36 0,0 17-16,-1 0 15,1 17 1,0 1-16,-18 0 0,-36 17 16,1 0-1,17-17-15,1-18 0,-54 18 16,54-36-1,34-17 1</inkml:trace>
-  <inkml:trace contextRef="#ctx0" brushRef="#br0" timeOffset="68623.4622">21043 6862 0,'18'0'16,"35"-18"0,-18 0-16,0 18 15,-17-17-15,17 17 0,1-18 16</inkml:trace>
+  <inkml:trace contextRef="#ctx0" brushRef="#br0" timeOffset="68623.4621">21043 6862 0,'18'0'16,"35"-18"0,-18 0-16,0 18 15,-17-17-15,17 17 0,1-18 16</inkml:trace>
   <inkml:trace contextRef="#ctx0" brushRef="#br0" timeOffset="68773.3707">21131 6738 0,'0'71'15,"0"-142"-15,18 195 0,-18-89 0,35 53 16,-17-53-16,17 18 15,-17-35-15</inkml:trace>
   <inkml:trace contextRef="#ctx0" brushRef="#br0" timeOffset="69297.0596">21960 6421 0,'0'0'0,"-17"0"0,-1 0 15,1 0-15,17 35 0,-36 53 16,19-35-16,-1 88 16,18-70-1,18 52-15,-1-70 16,36 53-16,-18-53 15,18 0-15,-17-36 16,17 1 0,-36-18-16</inkml:trace>
   <inkml:trace contextRef="#ctx0" brushRef="#br0" timeOffset="69517.18">22278 6509 0,'0'0'15,"18"88"-15,-18-17 0,0 34 16,0-34-16,0 35 16,0-53-16,0 0 15,35 17-15,-18-35 16,1-17-16,0-18 15</inkml:trace>
@@ -1790,13 +1790,13 @@
   <inkml:trace contextRef="#ctx0" brushRef="#br0" timeOffset="76843.7052">6650 8731 0,'35'0'0,"-70"0"0,88 0 15,-18 0-15,18 0 16,-35 0-16,-1-17 0,1 17 16</inkml:trace>
   <inkml:trace contextRef="#ctx0" brushRef="#br0" timeOffset="77960.9157">7514 9543 0,'0'-36'31,"0"-34"-15,0 17-16,-17-53 15,-1 36-15,0-1 16,-17 0-16,17 1 16,-35-107-16,36 72 0,-1-1 15,1 18-15,-1 17 16,18 0-16,18 36 0,17 0 16,-18 0-16,19 17 15,17 18-15,-18 0 0,18 35 16,-36-17-16,19 52 15,-36-17 1,0-17-16,0 34 16,0-34-16,0-1 15,0-18-15,17 1 0,19 0 16,69 35 0,-34-18-1,-18 0-15,-53-17 16,0 17-16,-35-17 15,-36 17-15,18-17 16,-17-18-16,17 17 16,35-17-1,-17 0-15,17 0 0,18-17 16</inkml:trace>
   <inkml:trace contextRef="#ctx0" brushRef="#br0" timeOffset="78282.6421">8096 8767 0,'53'-18'15,"-106"36"-15,124-36 0,-54 36 0,19-1 16,-19 1 0,-17 35-16,-17-18 15,17-17-15,-18-1 0,-35 36 16,53-35 0,53-18 15,-35 0-31,35 0 0,17 0 15,-52 0-15,17 0 16</inkml:trace>
-  <inkml:trace contextRef="#ctx0" brushRef="#br0" timeOffset="80040.4676">9155 8449 0,'0'-35'0,"-18"-18"16,0 35-16,1 1 16,-54-19-16,36 19 15,-36 34-15,36-17 16,-36 53-16,54-18 15,-18 18 1,35-17-16,52 34 16,-16-34-16,52 16 15,-35-34-15,53 17 16,-71-17-16,18 17 16,-35-35-16,-18 18 15,-18 0-15,0-1 0,-52 1 16,34-18-16,-52 17 15,71-17-15,-19 18 16,19-18-16</inkml:trace>
+  <inkml:trace contextRef="#ctx0" brushRef="#br0" timeOffset="80040.4675">9155 8449 0,'0'-35'0,"-18"-18"16,0 35-16,1 1 16,-54-19-16,36 19 15,-36 34-15,36-17 16,-36 53-16,54-18 15,-18 18 1,35-17-16,52 34 16,-16-34-16,52 16 15,-35-34-15,53 17 16,-71-17-16,18 17 16,-35-35-16,-18 18 15,-18 0-15,0-1 0,-52 1 16,34-18-16,-52 17 15,71-17-15,-19 18 16,19-18-16</inkml:trace>
   <inkml:trace contextRef="#ctx0" brushRef="#br0" timeOffset="80468.7836">9454 8749 0,'0'0'0,"-35"-18"16,18 18-16,-1 0 0,-17 36 15,17-19 1,18 18 0,0-17-16,18 0 15,-1-1-15,1-17 0,0 0 16,17 0-16,-18 0 15,19-35-15,-19 17 16,1-34-16,-18 16 16,0-34-1,0 34-15,-18 1 0,-17-35 16,17 52-16,1-17 16,-1 17-16,18 36 31,0 35-16,18-18-15,-1 18 0,1 0 16,-18-18-16,35 53 16,-17-53-16,0 1 0,-1-1 15,1-17-15,0-1 16,-1 1-16,1-18 16,-1 0-16</inkml:trace>
   <inkml:trace contextRef="#ctx0" brushRef="#br0" timeOffset="80881.6512">9754 8714 0,'-17'17'16,"17"19"0,0-19-16,0 18 0,0 1 15,17 17 1,1-36-16,0-17 15,-1 18-15,36-18 16,-53-35 0,18 17-16,-18 0 15,0 1-15,0-1 16,0 0-16,0 36 31,17 17-31,1-17 16,17 0-16,1-1 15,-1-17-15,-17 0 16,17-17-16,-18-1 16,1-17-1,-18 17-15,0 0 0,-18-34 16,-34-19 0,34 36-1,0 35-15,36 0 16</inkml:trace>
-  <inkml:trace contextRef="#ctx0" brushRef="#br0" timeOffset="81131.94">10583 8573 0,'36'0'16,"-72"0"-16,107 0 0,-18-36 16,-36 36-1,1-17-15,0 17 0,-1 0 0,-17-18 16</inkml:trace>
+  <inkml:trace contextRef="#ctx0" brushRef="#br0" timeOffset="81131.9399">10583 8573 0,'36'0'16,"-72"0"-16,107 0 0,-18-36 16,-36 36-1,1-17-15,0 17 0,-1 0 0,-17-18 16</inkml:trace>
   <inkml:trace contextRef="#ctx0" brushRef="#br0" timeOffset="81280.9264">10689 8467 0,'18'53'15,"-36"-106"-15,36 141 0,-18-53 16,17-17-16,1 35 15,0-36-15,-1 1 16</inkml:trace>
   <inkml:trace contextRef="#ctx0" brushRef="#br0" timeOffset="81753.1692">11501 8061 0,'0'0'0,"-18"0"0,0 18 16,-17 70-16,35-35 16,0 17-16,0 89 15,18-88-15,17 52 16,0-70-16,36 18 16,-36-36-16,36-18 15,-36-17-15,18-17 16</inkml:trace>
-  <inkml:trace contextRef="#ctx0" brushRef="#br0" timeOffset="81936.9822">11800 8132 0,'18'88'15,"-36"-176"-15,36 246 0,17-17 16,-35-88-1,36 71-15,-19-71 16,19 35-16,-19-53 16,1 0-16,17-17 15</inkml:trace>
+  <inkml:trace contextRef="#ctx0" brushRef="#br0" timeOffset="81936.9821">11800 8132 0,'18'88'15,"-36"-176"-15,36 246 0,17-17 16,-35-88-1,36 71-15,-19-71 16,19 35-16,-19-53 16,1 0-16,17-17 15</inkml:trace>
   <inkml:trace contextRef="#ctx0" brushRef="#br0" timeOffset="82083.0059">12118 8573 0,'35'-18'16,"-70"36"-16,105-54 0,-52 36 0,53 0 15,-54-17 1,19 17-16</inkml:trace>
   <inkml:trace contextRef="#ctx0" brushRef="#br0" timeOffset="82526.1214">12524 9102 0,'0'0'0,"0"17"0,17-34 16,-17-19-1,0-17-15,0 18 0,-17-18 16,-1-70-1,18 52-15,-18 1 0,18-1 16,-17-88-16,-1 106 16,36 1-16,-1 34 15,36 18-15,-35 18 16,35 17-16,-36-18 16,19 36-16,-36-17 15,0 17 1,-18-18-16,0 0 15,1-17-15,17-1 16,0 1-16,0 0 0,17 17 16,1-35-16,17 18 15,1-1-15,-1-17 16,-53 18 0,-17 0-1,0-18-15,-18 0 16,35 0-16,1 0 15</inkml:trace>
   <inkml:trace contextRef="#ctx0" brushRef="#br0" timeOffset="82755.6942">12841 8643 0,'0'0'16,"18"0"-16,-1 0 0,19 18 15,-19-1-15,19 1 16,-36 0-16,0 17 16,0 0-16,0-17 15,-18-1-15,18 1 16,0 0-16,18-18 16,17 0-1,-17-18-15,-1 18 0,18-18 16,-17 1-1</inkml:trace>
@@ -1847,7 +1847,7 @@
   <inkml:trace contextRef="#ctx0" brushRef="#br0" timeOffset="130903.593">28893 8802 0,'0'0'16,"0"-18"-16,17 36 16,1 17-1,-1 0-15,1 1 16,0-19-16,17 36 0,-17-35 16,-18-1-16,0-34 31,0-36-31,0 35 15,-18-52-15,18 17 16,0 18-16,18-1 0,-18-17 16,17 53-16,1 0 15,-18 18-15,18 35 16,-1-18 0,-17 0-16,35 18 15,-35-35-15,18-18 0,0 0 16,17 0-16,-35-18 15,18-17-15,-1-18 16,1-17 0,0 34-16,-1-17 15,1 36-15,-1 17 16,1 53 0,-18-18-16,18 0 0,-18 1 15,17-1-15,-17 0 16,18 0-16,0 36 15,-18-53-15,35-1 16</inkml:trace>
   <inkml:trace contextRef="#ctx0" brushRef="#br0" timeOffset="131176.9717">29563 8555 0,'0'0'16,"-35"0"-16,17 0 0,-17 53 16,17-18-16,36 36 15,-1-36-15,1 0 16,17 0-16,0 18 0,1-17 16,-1 17-16,-17-36 15,-1 18 1,-34-35-16,-19 18 15,19-18-15,-54 0 16,36-18-16,0 18 16,17 0-16</inkml:trace>
   <inkml:trace contextRef="#ctx0" brushRef="#br0" timeOffset="131539.2165">29739 9172 0,'0'71'16,"0"-142"-16,-17 177 0,17-71 0,17 1 15,1 34-15,-1-52 16,-17-36 0,-17-35-1,17 18-15,-18-36 16,18 19-16,18-72 15,-1 53-15,1 19 16,35-54 0,-35 70-16,35 19 0,-36 34 15,1 1-15,-1 17 16,-17 18-16,0-17 16,-52 16-16,16-34 15,19 0-15,-36-1 16,35-17-16,18-17 15,18-1 1,-1 0-16,19 1 0</inkml:trace>
-  <inkml:trace contextRef="#ctx0" brushRef="#br0" timeOffset="131955.361">30074 9013 0,'0'0'0,"-17"36"0,17-19 16,17-17-1,1-17 1,-18-1-16,18 0 16,-1 1-16,-17-18 15,18 35 1,-18-18-16,18 18 16,-1 0-16,1 0 15,-1 0 1,-17 18-16,18-18 15,0 0-15,-1 0 16,1 0 0,0 0-1,-36 17-15,0 1 16,18-1-16,0 19 16,0-19-16,18 1 15,0 0-15,-1-18 16,1-18-16,0 0 15,-18 1-15,0-19 16,0 19-16,-36-18 16,36 17-16,-17 0 15,17 1 1</inkml:trace>
+  <inkml:trace contextRef="#ctx0" brushRef="#br0" timeOffset="131955.3609">30074 9013 0,'0'0'0,"-17"36"0,17-19 16,17-17-1,1-17 1,-18-1-16,18 0 16,-1 1-16,-17-18 15,18 35 1,-18-18-16,18 18 16,-1 0-16,1 0 15,-1 0 1,-17 18-16,18-18 15,0 0-15,-1 0 16,1 0 0,0 0-1,-36 17-15,0 1 16,18-1-16,0 19 16,0-19-16,18 1 15,0 0-15,-1-18 16,1-18-16,0 0 15,-18 1-15,0-19 16,0 19-16,-36-18 16,36 17-16,-17 0 15,17 1 1</inkml:trace>
   <inkml:trace contextRef="#ctx0" brushRef="#br0" timeOffset="132288.3683">30392 9278 0,'0'53'15,"0"-106"-15,-18 141 0,18-70 16,0 0-16,0-36 16,18 0-1,-18-35-15,17 0 16,-17 18-16,18-53 15,0 35-15,17-18 16,-17 36-16,35 0 16,-36 35-16,1 0 15,-18 18-15,17 17 0,1 18 16,-18-36-16,-35 36 16,17-35-16,-35 0 15,36-18-15,-1 0 16,-17-18-16,17 18 15,18-35 1,0 17-16,18 0 16</inkml:trace>
   <inkml:trace contextRef="#ctx0" brushRef="#br0" timeOffset="132522.1388">30921 8396 0,'-18'35'15,"18"-17"-15,0 0 16,18-1-1,-18 1-15,18 0 0</inkml:trace>
   <inkml:trace contextRef="#ctx0" brushRef="#br0" timeOffset="132655.9692">31009 8502 0,'0'0'0,"0"35"0,0 1 16,0-1-16,-17-18 15,17 1-15</inkml:trace>
@@ -1855,16 +1855,16 @@
   <inkml:trace contextRef="#ctx0" brushRef="#br0" timeOffset="133662.6952">32632 9013 0,'35'0'15,"-70"0"-15,88 18 0,-35 0 0,-1 17 16,-17-17-16,0-1 16,0 1-16,-17 0 0,17 17 15,0-17 1,35-1 0,-18-17-16,54 18 15,-36-18-15,-17 17 16,17-17-16,0 18 15,-35 0-15,-17-18 16,-1 0-16</inkml:trace>
   <inkml:trace contextRef="#ctx0" brushRef="#br0" timeOffset="143311.8031">4815 10354 0,'0'-35'16,"0"17"-16,0 0 15,18 18 17,0 36-17,-1-19-15,19 72 16,-19-36-16,1 17 16,0 18-16,17 0 0,0 89 15,0-89-15,-17 0 16,35 53-16,-35-70 15,17 17-15,-18-53 16,1 1-16,0-36 16,-1-18-1,-17-53 1,18-34 0,-18 52-16,0-106 15,18 53-15,-18-106 16,0 107-16,-18-72 15,18 107-15,0 34 16,0 54 0,0 17-1</inkml:trace>
   <inkml:trace contextRef="#ctx0" brushRef="#br0" timeOffset="145178.5501">5680 10160 0,'-18'0'16,"0"0"-1,1 18-15,-1-1 16,1 1-16,-1 0 0,0 34 16,18-34-16,0 35 15,0-35-15,36 35 16,-1-36-16,0-17 15,18 18 1,-18-18-16,36-18 16,-54 18-16,19-17 0</inkml:trace>
-  <inkml:trace contextRef="#ctx0" brushRef="#br0" timeOffset="145501.8694">5980 10301 0,'-18'18'16,"18"-1"-16,-18 19 16,18-19-16,18 1 15,0 0-15,35-1 16,-36-17-16,36 0 15,-35 0 1,-1 0-16,1-17 16,-18-1-16,0 0 15,0 1-15,-35-19 16,17 19-16,-17-1 16,17 0-16,1 18 15,17-17 1</inkml:trace>
+  <inkml:trace contextRef="#ctx0" brushRef="#br0" timeOffset="145501.8693">5980 10301 0,'-18'18'16,"18"-1"-16,-18 19 16,18-19-16,18 1 15,0 0-15,35-1 16,-36-17-16,36 0 15,-35 0 1,-1 0-16,1-17 16,-18-1-16,0 0 15,0 1-15,-35-19 16,17 19-16,-17-1 16,17 0-16,1 18 15,17-17 1</inkml:trace>
   <inkml:trace contextRef="#ctx0" brushRef="#br0" timeOffset="145997.9716">6297 10372 0,'18'17'15,"-1"-17"-15,1 0 16,-36-17 15,18-19-31,-17 19 16,-1-1-16,18 0 0,0 1 15,0-1-15,0-17 0,18 0 16,-1 17-16,19 0 16,-19 18-1,1 18-15,0-18 16</inkml:trace>
-  <inkml:trace contextRef="#ctx0" brushRef="#br0" timeOffset="146230.551">6526 10407 0,'18'0'0,"-36"0"0,36-18 31,-36-17-16,1 17-15,-1-17 16,18 17-16,0 1 16,0-18-1,18-1-15,17 19 16,-17 34 0,-1 1-1</inkml:trace>
-  <inkml:trace contextRef="#ctx0" brushRef="#br0" timeOffset="146581.3591">6668 10336 0,'0'0'0,"17"-17"31,18-1-31,-35 0 16,18 1-16,0-1 0,-18 1 16,17-1-1,-34 18-15,-1 0 16,0 0 0,1 0-16,-1 18 0,1 17 15,17-18-15,0 1 0,17 17 16,-17-17-16,35 0 15,1-18-15,-1 17 16,-17-17-16,17-17 16,-17-1-1,-18 0-15,17 18 16,-17-17-16</inkml:trace>
+  <inkml:trace contextRef="#ctx0" brushRef="#br0" timeOffset="146230.5509">6526 10407 0,'18'0'0,"-36"0"0,36-18 31,-36-17-16,1 17-15,-1-17 16,18 17-16,0 1 16,0-18-1,18-1-15,17 19 16,-17 34 0,-1 1-1</inkml:trace>
+  <inkml:trace contextRef="#ctx0" brushRef="#br0" timeOffset="146581.359">6668 10336 0,'0'0'0,"17"-17"31,18-1-31,-35 0 16,18 1-16,0-1 0,-18 1 16,17-1-1,-34 18-15,-1 0 16,0 0 0,1 0-16,-1 18 0,1 17 15,17-18-15,0 1 0,17 17 16,-17-17-16,35 0 15,1-18-15,-1 17 16,-17-17-16,17-17 16,-17-1-1,-18 0-15,17 18 16,-17-17-16</inkml:trace>
   <inkml:trace contextRef="#ctx0" brushRef="#br0" timeOffset="146891.6975">6862 10266 0,'0'0'0,"0"17"15,0 1 1,0 0-16,17-1 16,1 1-1,-1-18-15,1 0 0,17 0 16,-17 0 0,0-18-16,-1 1 15,-17-1 1,-17 0-16,17 1 15,-18-1-15,18 1 16,0-1-16,18 36 31,-1-18-15,1 0-16,17 0 16,-17 0-16,17 0 15,-17-18 1,-1 18-16,-17-18 15</inkml:trace>
   <inkml:trace contextRef="#ctx0" brushRef="#br0" timeOffset="147065.2955">7108 10054 0,'0'53'16,"0"-106"-16,0 141 0,0-17 15,0-36-15,0 0 0,0 1 16,0-1-16,18 18 16,0-35-1,-1-18-15</inkml:trace>
   <inkml:trace contextRef="#ctx0" brushRef="#br0" timeOffset="147537.2047">7214 10319 0,'0'0'16,"18"17"-16,0-17 0,-1 0 15,1 0-15,0 0 0,-1 0 16,1 0-16,-1-17 16,-34 17 15,-1 17-16,18 1-15,0 0 0,-17-1 16,17 36 0,17-35-16,1 17 15,-1-35-15,19 0 16,-19 0-16,19-17 0,-36-1 16,35-35-1,-35 18-15,0-18 16,0 17-16,0 1 15,0 0-15,0 0 0,-18-54 16,1 54-16,-1-35 16,0 52-16,1 18 15,17 53 1,0-18-16,0 18 16,0-18-16,17 18 0,1 0 0,17-18 15,18 36-15,18-18 16,-54-35-16,36-1 15,-35-17-15,-18 18 16</inkml:trace>
   <inkml:trace contextRef="#ctx0" brushRef="#br0" timeOffset="148845.2407">5856 11430 0,'-35'0'15,"70"0"-15,-88 18 0,18 17 16,17-17-16,1 17 16,-1-18-16,18 36 15,0-35-15,35 17 16,-17-35-16,52 0 15,-52 0-15,53-53 16,-54 18-16,19-35 16,-19 34-16,-17-52 15,-17 35-15,-1-35 16,0 35-16,-35-17 16,36 34-16,-1 1 15,0 35-15,18 35 16,0 53-16,0-35 15,36 71 1,-19-71-16,19 0 0,52 17 16,-53-35-16,0-17 15,1 17-15,-1-35 0,18 18 16,-35-18-16,-1-18 16</inkml:trace>
   <inkml:trace contextRef="#ctx0" brushRef="#br0" timeOffset="149217.0384">6244 11307 0,'0'52'16,"18"-34"-16,-1 53 16,1-54-16,0 19 0,17 16 15,-17-34-15,35 0 16,-36-18-16,1 0 15,-1 0-15,-17-18 16,18-17-16,-18 17 16,0-17-16,18 53 31,17-1-15,-17 1-16,17-1 15,18 1 1,17-18-16,-52-18 0,35-17 15,-35 18 1,-18-19-16,-18-34 0,18 52 16,-35-52-1,17 52-15,0 0 0,1-17 16,-1 35-16,18-18 16</inkml:trace>
-  <inkml:trace contextRef="#ctx0" brushRef="#br0" timeOffset="150517.4542">7973 10936 0,'35'-18'16,"0"18"-16,36-35 15,-36 18-15,18-1 16,-18 18-16,-17 18 15</inkml:trace>
+  <inkml:trace contextRef="#ctx0" brushRef="#br0" timeOffset="150517.4541">7973 10936 0,'35'-18'16,"0"18"-16,36-35 15,-36 18-15,18-1 16,-18 18-16,-17 18 15</inkml:trace>
   <inkml:trace contextRef="#ctx0" brushRef="#br0" timeOffset="150634.9601">8061 11113 0,'18'35'0,"-36"-70"0,71 70 15,-35-35-15,17 0 16,0 0-16,18-18 15</inkml:trace>
   <inkml:trace contextRef="#ctx0" brushRef="#br0" timeOffset="150990.3169">8837 10601 0,'18'71'15,"-36"-142"-15,53 194 0,1 1 0,-19-71 16,36 70 0,-18-70-16,18 35 15,-35-52-15,17-19 16,-17 1-16,-18-36 15,18 1-15,-18-71 16,-18 35-16,18-71 16,-18 54-16,1-54 15,17 54-15,0-19 16,0 72-16,0-1 16,0 0-16,0 36 15,17 0-15</inkml:trace>
   <inkml:trace contextRef="#ctx0" brushRef="#br0" timeOffset="151407.1936">9454 11024 0,'0'0'15,"-17"-17"-15,-1 17 0,1 35 16,-1-17-16,18 17 16,0 0-16,0 0 0,18 18 15,-1-35-15,18 17 16,-17-35-16,0 0 16,-1 0-16,1-17 0,17-36 15,-35 17 1,0-34-16,0 35 15,0-54-15,-17 54 16,-19-35-16,36 52 16,-17 0-16,-1 18 15,18 18 1,0 17-16,18 0 0,-18 1 16,17 17-16,19 35 15,-19-53-15,1 0 0,17 18 16,-17-35-1,-1 0-15,19-1 16</inkml:trace>
@@ -1898,14 +1898,14 @@
   <inkml:trace contextRef="#ctx0" brushRef="#br0" timeOffset="166118.025">23230 11483 0,'18'0'16,"-18"-18"-16,0 1 15,18-19-15,-18 1 0,0-71 16,0 36 0,0-89-16,0 53 15,0 18-15,0-18 0,17-70 16,19 88-1,-1 70-15,18 0 16,-18 36-16,18 17 16,-35-17-16,-1 35 15,-34-18-15,-19 18 16,19-18-16,-19 0 16,19-17-16,17 35 15,0-35-15,53 35 16,-18-36-1,18 36-15,-35-35 16,-1-1-16,1-17 0,-36 18 16,-35-18-1,18 0-15,-18 0 16,18 0-16,0 0 16,17 0-1,36 0-15</inkml:trace>
   <inkml:trace contextRef="#ctx0" brushRef="#br0" timeOffset="166267.6843">23724 11007 0,'18'17'16,"-18"19"-16,0-19 0,0 54 16,0-54-16,0 36 15,18-35-15,-18 17 16</inkml:trace>
   <inkml:trace contextRef="#ctx0" brushRef="#br0" timeOffset="166646.1125">23883 10407 0,'0'-18'16,"35"18"0,-17 0-16,35-17 15,-18 17-15,0-18 16,-17 18-16,0 0 15,-1 0-15</inkml:trace>
-  <inkml:trace contextRef="#ctx0" brushRef="#br0" timeOffset="166828.8593">24059 10266 0,'-17'53'16,"17"-36"-16,0 19 0,0 17 15,17 0 1,1-18-16,17 0 16,1-35-16,17 18 15,-18-18 1,0 0-16</inkml:trace>
+  <inkml:trace contextRef="#ctx0" brushRef="#br0" timeOffset="166828.8592">24059 10266 0,'-17'53'16,"17"-36"-16,0 19 0,0 17 15,17 0 1,1-18-16,17 0 16,1-35-16,17 18 15,-18-18 1,0 0-16</inkml:trace>
   <inkml:trace contextRef="#ctx0" brushRef="#br0" timeOffset="167284.78">24465 10160 0,'0'-18'15,"0"36"-15,18 0 16,17 17-16,0 0 0,54 89 16,-37-71-16,37 88 15,-54-53-15,18 35 16,-53-52-16,0 35 16,0-53-1,-35 17-15,17-34 16,-17 16-16,-1-16 15,1-1-15,0-17 16,17-1-16</inkml:trace>
   <inkml:trace contextRef="#ctx0" brushRef="#br0" timeOffset="168792.2377">5539 12788 0,'-18'-17'0,"36"34"0,-54-52 16,-17 0-16,18 35 16,-53 0-16,35 17 15,0 19-15,-35 34 16,70-35-16,18 71 15,18-53-15,52 53 16,-17-53-16,71 17 16,-71-34-16,35 17 15,-53-36-15,-17 36 16,-18-35 0,-53-1-16,18 1 15,-71-18-15,0-18 16,18 1-1,70 17-15,1 0 16,-1 0-16,36 0 16</inkml:trace>
   <inkml:trace contextRef="#ctx0" brushRef="#br0" timeOffset="169265.4643">6138 13600 0,'0'0'15,"-17"-18"-15,-19 0 0,1 18 16,18 18-16,-36 17 15,35-17-15,0 17 0,18 0 16,-17 1-16,17-19 16,17 19-16,1-19 0,0-17 15,17 18-15,0-36 16,0 1-16,-17-1 0,0-17 16,-1-1-16,-17 1 0,18-53 15,-18 53-15,0-54 16,0 37-1,-18 16-15,1-17 16,-1 53-16,0 0 16,18 18-16,0 0 0,0 70 15,0-35-15,0 0 16,18-18-16,0 18 16,17 35-16,-17-53 15,35 18-15,-36-35 16,1 0-16,-1-18 0,1 0 15</inkml:trace>
   <inkml:trace contextRef="#ctx0" brushRef="#br0" timeOffset="169592.8492">6385 13582 0,'0'0'0,"0"18"15,18 17 1,-18-17-16,0 34 15,0-34-15,0 17 16,0-17-16,18-18 16,-1 18-16,1-18 15,-18-18-15,17 18 16,-17-18 0,18 18-1,0 36-15,-18-19 16,35 1-16,-17 0 15,17-18 1,-17-18-16,-1 0 0,-17 1 16,0-36-1,-17 35-15,-36-35 16,35 36-16,0-1 0,1 0 16</inkml:trace>
   <inkml:trace contextRef="#ctx0" brushRef="#br0" timeOffset="170187.5533">5997 12524 0,'-17'-18'16,"-1"36"-16,0-18 15,18 17-15,-17 1 0,-1 17 16,18 0-16,18 18 16,-1-35-16,19 17 15,-19-17 1,36 0-16,-18-18 16,1-18-16,-19 0 15,1 1-15,-18-1 16,0 0-16,-18 1 15,18 34 1,-17 1 0,17 17-16,35 18 15,-17-35-15,35-1 16,-18 1 0,-18-18-16,36 0 15,-53-18-15,18 1 16,-18-1-16,0 1 0,-18-1 15,1-17-15,-1 17 16,0 0-16,-17 1 16</inkml:trace>
-  <inkml:trace contextRef="#ctx0" brushRef="#br0" timeOffset="170427.3546">6438 12771 0,'0'0'0,"0"17"16,0 1-16,0-36 15,0 1 1,0-1-16,0-17 16,0 17-16,0-35 15,0 35-15,0 1 16,0-1-1,18 18-15,-1 18 0,1-1 16,0 1-16,-1 17 16</inkml:trace>
-  <inkml:trace contextRef="#ctx0" brushRef="#br0" timeOffset="170633.0994">6562 12718 0,'0'0'16,"0"17"-16,17-17 15,-17-17 32,0-1-31,0 0-16,18 1 15,-18-1-15,18-17 16,-1 35-16,1-18 16,-18 36-1,18-1-15,-18 1 16,17 0-16</inkml:trace>
+  <inkml:trace contextRef="#ctx0" brushRef="#br0" timeOffset="170427.3545">6438 12771 0,'0'0'0,"0"17"16,0 1-16,0-36 15,0 1 1,0-1-16,0-17 16,0 17-16,0-35 15,0 35-15,0 1 16,0-1-1,18 18-15,-1 18 0,1-1 16,0 1-16,-1 17 16</inkml:trace>
+  <inkml:trace contextRef="#ctx0" brushRef="#br0" timeOffset="170633.0993">6562 12718 0,'0'0'16,"0"17"-16,17-17 15,-17-17 32,0-1-31,0 0-16,18 1 15,-18-1-15,18-17 16,-1 35-16,1-18 16,-18 36-1,18-1-15,-18 1 16,17 0-16</inkml:trace>
   <inkml:trace contextRef="#ctx0" brushRef="#br0" timeOffset="171439.4351">6685 12700 0,'18'0'32,"17"-18"-17,-17 18-15,-1 0 16,1-17-16,-18-1 31,18 18 0,-1 0-15,1 0 0,0 0-1,-18-18-15,17 18 16,-17-17-16,0-1 15,0 1-15,0-19 0,0 19 16,0-36 0,0 17-16,-17 1 0,17 0 15,-18 0-15,18 17 0,-18 18 16,1 0-16,17 35 16,0 1-16,0-1 15,17 18-15,1-18 0,0 18 16,17 0-1,-18-18-15,1 18 16,-18-35-16,0-1 16,-18-17-16,1 0 15,-1-17-15,18-1 16,-17 0 0,17 1-16,17-1 15,1 18 1,-1 18-16,1-18 15,0 0-15,-1 17 0,1-17 16,0 18 0,-1-18-1,1 0 1,0 0 0,-1 0-16,1 0 15,-1-18 1,-17 1-1,18-1-15,-18 0 16,0-17-16,0 18 16,0-19-16,0 19 0,0-19 15,0 1-15,0 17 16,0 1-16,0-18 16,18 35-16,-18 35 15,0 0-15,17 0 16,-17 18-16,18-17 0,35 34 15,-35-52-15,35 35 16,-36-36-16,18 19 16</inkml:trace>
   <inkml:trace contextRef="#ctx0" brushRef="#br0" timeOffset="171819.6037">8026 12965 0,'53'0'15,"0"-18"-15,-18 18 16,35-35-16,-17 35 16,18 0-16,-54 0 15</inkml:trace>
   <inkml:trace contextRef="#ctx0" brushRef="#br0" timeOffset="171934.71">8149 13176 0,'35'18'15,"-70"-36"-15,106 54 0,17-54 16,-35 18 0,35-35-16,-53 35 15</inkml:trace>
@@ -1929,7 +1929,7 @@
   <inkml:trace contextRef="#ctx0" brushRef="#br0" timeOffset="190013.8433">17674 12665 0,'0'0'15,"18"17"-15,-18 1 16,17-18-16,-17 18 15,-17-36 17,17 0-32,0 1 15,0-36-15,17 35 16,1-17-16,0 17 16,-1 18-1,1-17-15,0 17 16,-18 35-1</inkml:trace>
   <inkml:trace contextRef="#ctx0" brushRef="#br0" timeOffset="190235.672">17833 12682 0,'-18'0'16,"18"-17"-16,0-1 15,18-17 1,-18 17-16,18 1 16,-18-1-16,17 0 0,1 1 15,-1-1 1,-17 36 0,0 17-1,0-17-15</inkml:trace>
   <inkml:trace contextRef="#ctx0" brushRef="#br0" timeOffset="190830.3127">17939 12629 0,'17'0'16,"19"0"0,-19-17-1,-17-1-15,-17 18 31,-1 18-15,0-18-16,18 17 0,0 1 16,0 0-16,0-1 15,18-17-15,0 0 16,-1 18 0,1-18-16,0-18 15,-1 18 1,1-17-16,-18-1 15,18 0-15,-18 1 16,0-1-16,0-35 16,0 36-1,0-19-15,0 19 0,0-54 16,0 36-16,-18-36 16,0 36-16,1 17 15,-1 18-15,0 18 16,18 17-1,0 36-15,0-36 16,18 36-16,0-36 16,17 18-16,-17-35 15,-18-1-15,0 1 16,-18-36 15,18 1-15,-18-1-16,36 18 15,0 0 1,-1 0 0,1 0-16,17 0 15,-17 0-15,-1 0 16</inkml:trace>
-  <inkml:trace contextRef="#ctx0" brushRef="#br0" timeOffset="191547.0245">18239 12612 0,'17'0'16,"19"0"-1,-19 0-15,1 0 16,-1 0-16,-17-18 0,18 1 15,-18-1 1,-18 0 0,1 18-16,-1 0 15,1 18-15,-1-18 16,0 35-16,36-17 16,0 17-1,-1-17-15,1-18 16,-1 17-16,1-17 0,0 0 15,-1 18-15,1-18 0,0-18 16,-18 1 15,17 34-15,1-17 15,0 0-15,-18-17-16,17-19 15,1 1-15,-18 18 0,17-54 16,-17 36-16,-17-1 16,17 1-16,0 0 0,-35 0 15,35 17-15,-18 0 16,18 54 0,0 34-1,0-17-15,35 53 16,-17-71-16,35 36 15,-18-36-15,18 18 16,-18-35-16,36-18 16</inkml:trace>
+  <inkml:trace contextRef="#ctx0" brushRef="#br0" timeOffset="191547.0244">18239 12612 0,'17'0'16,"19"0"-1,-19 0-15,1 0 16,-1 0-16,-17-18 0,18 1 15,-18-1 1,-18 0 0,1 18-16,-1 0 15,1 18-15,-1-18 16,0 35-16,36-17 16,0 17-1,-1-17-15,1-18 16,-1 17-16,1-17 0,0 0 15,-1 18-15,1-18 0,0-18 16,-18 1 15,17 34-15,1-17 15,0 0-15,-18-17-16,17-19 15,1 1-15,-18 18 0,17-54 16,-17 36-16,-17-1 16,17 1-16,0 0 0,-35 0 15,35 17-15,-18 0 16,18 54 0,0 34-1,0-17-15,35 53 16,-17-71-16,35 36 15,-18-36-15,18 18 16,-18-35-16,36-18 16</inkml:trace>
   <inkml:trace contextRef="#ctx0" brushRef="#br0" timeOffset="191832.6893">19173 12806 0,'18'0'16,"53"-18"-16,17 1 16,-53-1-16,36 18 15,-54 0-15,-34 0 16</inkml:trace>
   <inkml:trace contextRef="#ctx0" brushRef="#br0" timeOffset="191949.9993">19297 13000 0,'0'0'16,"88"0"-16,-35 0 0,0-18 15,-18 18-15,36-35 0</inkml:trace>
   <inkml:trace contextRef="#ctx0" brushRef="#br0" timeOffset="192705.3871">20638 12894 0,'-18'-53'0,"36"106"0,-54-141 16,1 53-16,0 17 15,-54 18 1,37 18-16,-37 52 16,72-35-16,-1 18 0,0-17 15,36 17-15,53 35 16,-18-53-16,52 18 16,-52-18-16,0-17 0,18 17 15,-54-17 1,1-1-16,-36-17 15,-34 18-15,16-18 16,-52 0-16,53 0 16,-53 0-1,70-18-15,-17 18 16</inkml:trace>
@@ -1940,7 +1940,7 @@
   <inkml:trace contextRef="#ctx0" brushRef="#br0" timeOffset="195976.6529">22648 12506 0,'0'0'0,"-17"18"16,-1 17-16,0 18 0,-17 70 15,18-52-15,17 17 16,-18-17-16,18-1 0,0 54 16,18-71-16,-1-18 15,54 18 1,-1-18-16,-34-35 16,-1-18-16,-18 1 15</inkml:trace>
   <inkml:trace contextRef="#ctx0" brushRef="#br0" timeOffset="196180.7222">22966 12647 0,'0'0'0,"17"71"16,1-18-16,-18-1 15,35 72-15,-35-53 16,18 34-1,-18-52-15,18 18 16,-1-36-16,1-17 16,0-18-16,-1 0 15</inkml:trace>
   <inkml:trace contextRef="#ctx0" brushRef="#br0" timeOffset="196326.3793">23230 13053 0,'53'0'16,"-35"-18"-16,17 18 0,1 0 16,-1-17-16,0 17 15,-17 0-15,17-18 16</inkml:trace>
-  <inkml:trace contextRef="#ctx0" brushRef="#br0" timeOffset="197103.3204">23848 13758 0,'0'-17'15,"0"34"-15,0-52 0,0-18 16,0 36-16,0-72 16,-18 54-16,18-18 15,-17-70-15,17 52 16,-18-70-16,18 70 16,18-70-16,-18 88 15,52-17 1,-16 52-16,34 18 15,-52 0-15,35 35 16,-36-17-16,-17 35 16,0-18-16,-17-17 15,-1 17-15,1-17 0,-1 17 16,18-17 0,18-1-16,17 1 15,-18-18-15,19 35 16,-19-17-16,1 35 15,-18-35-15,-35 17 16,17 0 0,-17-17-16,17-1 15,-17-17-15,17 0 16,36-17 0</inkml:trace>
+  <inkml:trace contextRef="#ctx0" brushRef="#br0" timeOffset="197103.3203">23848 13758 0,'0'-17'15,"0"34"-15,0-52 0,0-18 16,0 36-16,0-72 16,-18 54-16,18-18 15,-17-70-15,17 52 16,-18-70-16,18 70 16,18-70-16,-18 88 15,52-17 1,-16 52-16,34 18 15,-52 0-15,35 35 16,-36-17-16,-17 35 16,0-18-16,-17-17 15,-1 17-15,1-17 0,-1 17 16,18-17 0,18-1-16,17 1 15,-18-18-15,19 35 16,-19-17-16,1 35 15,-18-35-15,-35 17 16,17 0 0,-17-17-16,17-1 15,-17-17-15,17 0 16,36-17 0</inkml:trace>
   <inkml:trace contextRef="#ctx0" brushRef="#br0" timeOffset="197394.4251">24359 13176 0,'18'0'15,"0"0"-15,-1 18 16,1 0 0,-18 34-16,-18-16 15,1 17-15,-1-36 16,-17 19-16,35-19 16,0 1-1,17-18-15,1 0 0,0 0 16,35-18-16,-18 1 15,-18-1-15</inkml:trace>
   <inkml:trace contextRef="#ctx0" brushRef="#br0" timeOffset="197749.1646">24624 12647 0,'0'0'0,"18"0"31,34 0-31,-34 0 16,17 0-16,18 0 15,-35 0-15,0 0 0,-18-18 16</inkml:trace>
   <inkml:trace contextRef="#ctx0" brushRef="#br0" timeOffset="197943.7669">24783 12506 0,'0'0'15,"-18"53"-15,0-18 16,18 0-16,-17 36 15,17-36-15,35 1 16,-17-19-16,35 1 16,-18-1-16,35-17 15,-52-17-15</inkml:trace>
@@ -1960,7 +1960,7 @@
   <inkml:trace contextRef="#ctx0" brushRef="#br0" timeOffset="217452.4213">13053 14764 0,'0'17'32,"0"19"-17,0-19-15,0 19 16,0-19-16,17 1 16,1-18-16,0 0 15,-1 0-15,1-18 16,-18-17-16,0 0 15,0 17-15,0 0 16,0 1-16,-18-1 0,18 0 16,-17 18-16,-1 0 15</inkml:trace>
   <inkml:trace contextRef="#ctx0" brushRef="#br0" timeOffset="217736.9931">13264 14923 0,'0'0'15,"0"-18"1,18-17-1,-18 17-15,0 0 0,18-17 16,-1-18-16,-17 35 16,18-17-16,0 18 15,-18-1 1,0 36 0,0 17-1</inkml:trace>
   <inkml:trace contextRef="#ctx0" brushRef="#br0" timeOffset="217987.1128">13406 14887 0,'-18'0'15,"18"-17"1,0-1-1,0 0-15,18 1 0,-1-19 16,-17 19-16,18-19 16,-18 19-1,0 34 17,17-17-32,-17 18 15</inkml:trace>
-  <inkml:trace contextRef="#ctx0" brushRef="#br0" timeOffset="218774.8845">13511 14887 0,'18'0'15,"0"0"-15,-1 0 16,1-17-16,0 17 16,-18-18-16,0 0 0,0 1 15,0-1-15,-18 0 16,0 18 0,1 0-1,17 18-15,0 0 16,0 17-1,17-17-15,1-1 16,0 1 0,-1-18-16,1 0 15,0 0-15,-18-18 16,0 1 0,17 17 46,1 0-46,-1 17-16,1-17 15,-18 18 1,18-18 0,-18-18 15,0 1-31,0-1 15,0 0 1,17 18 0,1 0 15,0 0-31,-1-17 16,1 17-1,0-18-15,-1 18 16,-17-18-16,-17 1 15,-1-1-15,0 0 16,1 18-16,17-17 16,0-1-16,0 1 15,0 34 1,0 18 0,0 1-16,17-1 15,-17 18-15,0-18 16,18 36-16,-18-54 15,0 19 1</inkml:trace>
+  <inkml:trace contextRef="#ctx0" brushRef="#br0" timeOffset="218774.8844">13511 14887 0,'18'0'15,"0"0"-15,-1 0 16,1-17-16,0 17 16,-18-18-16,0 0 0,0 1 15,0-1-15,-18 0 16,0 18 0,1 0-1,17 18-15,0 0 16,0 17-1,17-17-15,1-1 16,0 1 0,-1-18-16,1 0 15,0 0-15,-18-18 16,0 1 0,17 17 46,1 0-46,-1 17-16,1-17 15,-18 18 1,18-18 0,-18-18 15,0 1-31,0-1 15,0 0 1,17 18 0,1 0 15,0 0-31,-1-17 16,1 17-1,0-18-15,-1 18 16,-17-18-16,-17 1 15,-1-1-15,0 0 16,1 18-16,17-17 16,0-1-16,0 1 15,0 34 1,0 18 0,0 1-16,17-1 15,-17 18-15,0-18 16,18 36-16,-18-54 15,0 19 1</inkml:trace>
   <inkml:trace contextRef="#ctx0" brushRef="#br0" timeOffset="219025.7397">13899 14923 0,'0'0'0,"18"0"31,17 0-31,-17-18 16,17 18-16,-35-18 15,-17 18 17,17 18-17,0 0-15,0-1 16,0 1-16,17-1 15</inkml:trace>
   <inkml:trace contextRef="#ctx0" brushRef="#br0" timeOffset="219333.9961">14058 15011 0,'18'0'16,"-1"-18"-16,1 18 16,-18-18-1,18 18-15,-1-35 16,1 35-16,0-35 15,-18 17-15,17-17 0,-17 17 16,0-17-16,18-36 16,-18 19-16,-18 16 15,18-17-15,-17 18 0,-19-18 16,36 36-16,-17-1 16,-1 18-16,18 18 15,-18-1-15,18 36 0,0-18 16,18 18-16,0 35 15,-1-35-15,36 36 16,-35-54-16,53 0 16,-36-17-16,0-1 15,18 1 1,-35-18-16</inkml:trace>
   <inkml:trace contextRef="#ctx0" brushRef="#br0" timeOffset="220538.8442">11430 16245 0,'-53'0'16,"35"18"-16,-17-18 0,18 0 16,34 0 15,36-18-31,0 18 15,88 0-15,53 18 16,-70-18-16,211 0 16,-141 0-16,247 0 15,-212 0 1,230 0-16,-248 0 16,1-18-16,0 18 0,-36 0 15,0 0-15,-34 0 0,52 0 16,-159 18-16,0 17 15,-52-17 1,-72 17-16</inkml:trace>
@@ -1997,8 +1997,8 @@
   <inkml:trace contextRef="#ctx0" brushRef="#br0" timeOffset="262159.9957">23495 16422 0,'-18'0'15,"36"0"-15,-53 0 16,35 17-16,-18-17 0,0 36 15,18-19-15,0 1 16,18 0 0,0-1-16,17-17 0,-17 0 15,17-17 1,0-1 0,-17-17-1,-36 35 16,18 17-31,0 1 16,0 0-16,0-1 16,18 1-1,17-18 1,-17-18 0,-18 1-16,0-1 15,0 0 1,0 1-1,0-1-15,0 0 16,17 18-16</inkml:trace>
   <inkml:trace contextRef="#ctx0" brushRef="#br0" timeOffset="262427.806">23795 16510 0,'0'-18'15,"0"1"1,0-1-16,18-17 16,-18 17-16,0 1 15,17 17 16,-17 17-31,18 1 16,-18-1-16,17 1 16</inkml:trace>
   <inkml:trace contextRef="#ctx0" brushRef="#br0" timeOffset="262504.088">23883 16457 0,'0'-18'16</inkml:trace>
-  <inkml:trace contextRef="#ctx0" brushRef="#br0" timeOffset="263166.8579">24007 16439 0,'0'0'0,"0"-17"16,0-1-1,17 18 1,-17-17-16,18 17 15,-18-18-15,17 0 16,-17 1-16,18-19 16,-18 19-16,0-19 15,-18 1 1,18 18-16,-17-1 16,17 0-16,-18 18 15,18 18 1,0 0-16,-17 17 15,17 0-15,17-17 0,-17 35 16,0-36 0,18 19-16,-18-19 15,0-34 17,0-1-17,17 18 1,1 0-1,0 0-15,-1 0 16,1 18 0,0-18-16,-1 0 15,-17-18 1,0 0 0,0 1-1,0-1-15,18 0 16,-18 1-16,18-1 15,-1-17 1,-17 0-16,0 17 16,0 0-16,0 1 15,-17 17-15,17 17 16,0 54 0,0-54-16,0 19 0,0-1 15,35 18 1,-18-18-16,19 0 15,-19-17-15,1 17 16,0-35-16,-18 18 16</inkml:trace>
-  <inkml:trace contextRef="#ctx0" brushRef="#br0" timeOffset="264081.6867">23636 17074 0,'0'-17'0,"-18"-1"16,1 18-16,-1 0 15,1 18-15,-1 17 16,0 0 0,18-17-16,-17 0 0,17 17 15,17-17-15,-17-1 16,18-17-16,0 0 15,-1 0-15,18-35 16,-17 17-16,17-35 0,-35 18 16,18-35-1,-18 52-15,0-17 0,-18-18 16,18 35-16,-17 18 16,17 18-1,0 17 1,0-17-16,0 17 0,17 35 15,-17-52 1,18 17-16,0-17 0,-1 0 16,36 17-16,-35-17 15,17-18-15,-17 0 16</inkml:trace>
+  <inkml:trace contextRef="#ctx0" brushRef="#br0" timeOffset="263166.8578">24007 16439 0,'0'0'0,"0"-17"16,0-1-1,17 18 1,-17-17-16,18 17 15,-18-18-15,17 0 16,-17 1-16,18-19 16,-18 19-16,0-19 15,-18 1 1,18 18-16,-17-1 16,17 0-16,-18 18 15,18 18 1,0 0-16,-17 17 15,17 0-15,17-17 0,-17 35 16,0-36 0,18 19-16,-18-19 15,0-34 17,0-1-17,17 18 1,1 0-1,0 0-15,-1 0 16,1 18 0,0-18-16,-1 0 15,-17-18 1,0 0 0,0 1-1,0-1-15,18 0 16,-18 1-16,18-1 15,-1-17 1,-17 0-16,0 17 16,0 0-16,0 1 15,-17 17-15,17 17 16,0 54 0,0-54-16,0 19 0,0-1 15,35 18 1,-18-18-16,19 0 15,-19-17-15,1 17 16,0-35-16,-18 18 16</inkml:trace>
+  <inkml:trace contextRef="#ctx0" brushRef="#br0" timeOffset="264081.6866">23636 17074 0,'0'-17'0,"-18"-1"16,1 18-16,-1 0 15,1 18-15,-1 17 16,0 0 0,18-17-16,-17 0 0,17 17 15,17-17-15,-17-1 16,18-17-16,0 0 15,-1 0-15,18-35 16,-17 17-16,17-35 0,-35 18 16,18-35-1,-18 52-15,0-17 0,-18-18 16,18 35-16,-17 18 16,17 18-1,0 17 1,0-17-16,0 17 0,17 35 15,-17-52 1,18 17-16,0-17 0,-1 0 16,36 17-16,-35-17 15,17-18-15,-17 0 16</inkml:trace>
   <inkml:trace contextRef="#ctx0" brushRef="#br0" timeOffset="264387.8319">23883 16863 0,'0'35'0,"0"-17"16,0 17-16,0 0 16,0 1-16,18-19 0,-18 36 15,0-35-15,17-1 0,-17 1 16,18-18-1,0 0-15,-1 0 0,19-18 16,-19 18-16,18 0 16,-17 18-1,-36 0 1,18-1-16,-35 1 16,18-18-16,-36 0 15,35-18-15,18 1 16,0-1-1,18-17-15</inkml:trace>
   <inkml:trace contextRef="#ctx0" brushRef="#br0" timeOffset="264632.8986">24571 16775 0,'0'0'16,"53"-18"-16,-35 18 16,52-18-16,-52 1 15,17 17-15,-17 0 16,-18-18-16</inkml:trace>
   <inkml:trace contextRef="#ctx0" brushRef="#br0" timeOffset="264784.1366">24712 16775 0,'0'0'0,"0"53"0,0-1 0,0 19 15,0-53-15,18-1 16,-18 1-16</inkml:trace>
@@ -2051,8 +2051,8 @@
   <inkml:trace contextRef="#ctx0" brushRef="#br0" timeOffset="7506.9053">17762 4075 0,'0'0'16,"0"35"-16,0-17 16,0-1-1,0-34 1,0-1-1,0-17-15,0 17 16,0-17-16,18-1 0,-18 1 16,18 0-16,17-36 15,0 54-15,0-1 16,-17 18-16,0 18 0,-1 35 16,1-18-1,0 35-15,-18-34 0,17-1 16,1 0-16,0-17 15,-18 17-15</inkml:trace>
   <inkml:trace contextRef="#ctx0" brushRef="#br0" timeOffset="7852.551">18115 4075 0,'18'0'0,"-36"0"0,53 0 16,-17 0-16,35 0 16,-18-18-16,36-17 15,-36 17-15,0-17 16,-17 17-16,0-17 0,-18 17 0,0 1 16,0-1-16,-18 18 15,-35-18-15,18 18 16,-18 18-16,18 0 15,-1 34-15,36-16 16,36 17-16,-19-18 16,54 36-16,-18-36 15,35-18 1,-35 1-16,35-18 16,-53 0-16,36-18 15,-36 18-15,-17-17 16</inkml:trace>
   <inkml:trace contextRef="#ctx0" brushRef="#br0" timeOffset="9797.8164">6668 7267 0,'0'0'16,"0"18"-16,0-36 15,0-52-15,0 17 16,-18-35-16,18-1 0,-18-16 15,-17-107 1,0 88-16,-18-123 16,35 124-16,-35-106 15,53 140-15,0-52 16,35 88-16,54-17 16,-36 70-16,0 0 15,-18 18-15,0-1 0,18 71 16,-35-17-16,-18 35 15,0-36-15,0-17 16,-18-17-16,18-1 0,-18 35 16,18-34-16,36 17 15,-19-36-15,19 36 16,-1-35 0,0 17-16,-17-17 15,-1-18-15,-17 17 16,-17-17-16,-1 0 0,-52 18 15,17-18-15,-36 18 16,54-18 0,0 0-16,17 0 15</inkml:trace>
-  <inkml:trace contextRef="#ctx0" brushRef="#br0" timeOffset="9987.3589">7338 6438 0,'0'53'16,"0"-35"-16,0-1 0,0 36 16,17-35-1,19 17-15,-19-17 16,1-18-16</inkml:trace>
-  <inkml:trace contextRef="#ctx0" brushRef="#br0" timeOffset="10542.3662">7938 5909 0,'17'18'31,"1"-18"-15,-18 17-1</inkml:trace>
+  <inkml:trace contextRef="#ctx0" brushRef="#br0" timeOffset="9987.3588">7338 6438 0,'0'53'16,"0"-35"-16,0-1 0,0 36 16,17-35-1,19 17-15,-19-17 16,1-18-16</inkml:trace>
+  <inkml:trace contextRef="#ctx0" brushRef="#br0" timeOffset="10542.3661">7938 5909 0,'17'18'31,"1"-18"-15,-18 17-1</inkml:trace>
   <inkml:trace contextRef="#ctx0" brushRef="#br0" timeOffset="10665.6173">8079 6262 0,'0'0'16,"17"0"-16,-17 17 15</inkml:trace>
   <inkml:trace contextRef="#ctx0" brushRef="#br0" timeOffset="13252.0402">9648 5891 0,'-52'-17'16,"16"34"-16,1 1 16,-53 35-16,70-18 15,1 18-15,-1-18 16,0 54-16,36-54 16,0 18-16,17-36 0,0 19 15,18-19-15,53 1 16,-53-18-16,17-18 0,-17 1 15,35-54 1,-70 36-16,17-36 16,-35 36-16,-53-53 15,18 53-15,-53-18 16,53 35-16,-54 0 16,72 18-16,-36 18 15,53 0 1,18-1-16,17 1 15,18 0-15</inkml:trace>
   <inkml:trace contextRef="#ctx0" brushRef="#br0" timeOffset="13384.428">10231 6191 0,'-18'18'15,"36"-36"-15,-36 54 0</inkml:trace>
@@ -2075,10 +2075,10 @@
   <inkml:trace contextRef="#ctx0" brushRef="#br0" timeOffset="30731.2579">18362 8079 0,'0'17'16,"0"36"0,0 18-1,0-36-15,0 0 0,18 53 16,-18-35-16,35 18 16,-17-36-16,-1-17 15,36 0-15,-35-18 16,-1-18-16,1 18 15,0-18-15,-1-35 16,-17 18-16,0 0 0,0 17 16,0 0-1,0 36 1,36 35-16,-1-18 16,0-17-16,1 0 15,-19-1-15,18 1 0,18-18 16,-17 0-16,-1-18 15,-17 18 1,-18-53-16,-18 36 16,-17-54-16,17 18 15,-17-35 1,17 53-16,0-1 0,1 1 16,-1 18-1,18 34 1</inkml:trace>
   <inkml:trace contextRef="#ctx0" brushRef="#br0" timeOffset="31742.9075">18944 7779 0,'-17'0'16,"-1"0"-16,36 0 15,-1 0-15,18 0 16,1 17-16,17 1 16,-18 0-16,-17-1 0,-1 19 15,-17-19 1,0 19-16,-17-19 15,-19 1 1,19-1-16,-1-17 16,36 0-1,-1 0 1,19 0 0,-1 0-16,-18 0 15,1 0-15,0 0 0,-1 0 16,1 18-16</inkml:trace>
   <inkml:trace contextRef="#ctx0" brushRef="#br0" timeOffset="33116.0872">19420 7585 0,'-17'-18'15,"34"18"16,36 35-15,-17-17-16,52 70 16,-35-35-16,-18 0 15,0 18-15,1-1 0,-1 18 0,-18 1 16,19 105-16,-19-106 16,-17 71-1,-17-89-15,-19 54 16,1-89-16,0 18 15</inkml:trace>
-  <inkml:trace contextRef="#ctx0" brushRef="#br0" timeOffset="35769.1932">7373 10319 0,'0'0'15,"18"-18"-15,-1 0 0,1-34 16,-18 34-16,-18 0 15,1 18-15,-19 0 16,-16 18-16,-1 0 0,0 17 0,0 0 16,-35 18-16,52-18 15,1 1 1,35-19-16,35 1 16,1 0-16,-1-1 15,18-17-15,53 35 16,-71-17-16,35 17 15,-52-17-15,-18 0 16,-18 35-16,-17-18 16,18-18-16,-19 19 15,1-1-15,0-17 0,-1 35 16,19-36-16,34 18 16,1-35-16,53 18 15,-18-18-15,52 0 16,-69 0-16,-1 0 15,0 0-15,-17 0 0,-18 18 16</inkml:trace>
+  <inkml:trace contextRef="#ctx0" brushRef="#br0" timeOffset="35769.1931">7373 10319 0,'0'0'15,"18"-18"-15,-1 0 0,1-34 16,-18 34-16,-18 0 15,1 18-15,-19 0 16,-16 18-16,-1 0 0,0 17 0,0 0 16,-35 18-16,52-18 15,1 1 1,35-19-16,35 1 16,1 0-16,-1-1 15,18-17-15,53 35 16,-71-17-16,35 17 15,-52-17-15,-18 0 16,-18 35-16,-17-18 16,18-18-16,-19 19 15,1-1-15,0-17 0,-1 35 16,19-36-16,34 18 16,1-35-16,53 18 15,-18-18-15,52 0 16,-69 0-16,-1 0 15,0 0-15,-17 0 0,-18 18 16</inkml:trace>
   <inkml:trace contextRef="#ctx0" brushRef="#br0" timeOffset="38965.962">8378 10319 0,'18'0'31,"-18"-18"-15,0 36 0,-18-1-1</inkml:trace>
   <inkml:trace contextRef="#ctx0" brushRef="#br0" timeOffset="39098.4188">8414 10636 0,'0'18'16,"0"-36"-16</inkml:trace>
-  <inkml:trace contextRef="#ctx0" brushRef="#br0" timeOffset="39845.6656">9843 10037 0,'0'0'16,"17"0"-16,1 17 15,-1 18-15,-17 1 0,18-1 16,0 18-16,-18 17 0,17 54 16,-17-71-16,0 70 15,0-87-15,18 52 16,-18-53 0,0-17-16,18 17 0,-18-17 15</inkml:trace>
+  <inkml:trace contextRef="#ctx0" brushRef="#br0" timeOffset="39845.6655">9843 10037 0,'0'0'16,"17"0"-16,1 17 15,-1 18-15,-17 1 0,18-1 16,0 18-16,-18 17 0,17 54 16,-17-71-16,0 70 15,0-87-15,18 52 16,-18-53 0,0-17-16,18 17 0,-18-17 15</inkml:trace>
   <inkml:trace contextRef="#ctx0" brushRef="#br0" timeOffset="40290.3867">10425 10372 0,'0'-36'16,"-18"36"-16,18-17 16,-18 34-16,1 1 15,-1 53-15,0-18 16,18-1-16,0 1 0,36 53 15,-19-53-15,54 18 16,-36-36 0,53-17-16,1-18 15,-37-18-15,-16-17 16,-1-1-16,-17 1 16,-1 0-16,-17-18 0,-17 18 15,-1-18-15,-17 17 0,-18-16 0,18 16 16,-18 1-16,0 0 15,-53-18-15,71 53 16,-18 0-16,35 17 16,36 1-1</inkml:trace>
   <inkml:trace contextRef="#ctx0" brushRef="#br0" timeOffset="41358.4725">10989 10037 0,'18'0'31,"17"-18"-15,-17 18-16,-1-18 16,36 1-1,-35 17-15,17-18 16,-35 0-16</inkml:trace>
   <inkml:trace contextRef="#ctx0" brushRef="#br0" timeOffset="41947.7152">11606 9772 0,'0'0'16,"0"-18"-16,0 1 0,-17-1 15,-1 18-15,0 0 16,1 0-16,-18 0 15,17 0-15,18 18 16,-18-18-16,18 17 16,18 1-16,-18 0 15,35 35-15,0-18 16,-17-18-16,35 54 16,-18-36-16,18 18 15,-35-35-15,0 17 16,-1-17-16,-17-1 0,18-17 15,-18 18-15,0 0 0,-18-18 16,1 0 0,-1 0-16,0 0 0,-17-18 15,0-17-15,-1-1 16,1-16-16,35 34 16,0-17-16,0 17 15,0-17-15,35-18 16,-17 35-16,17-35 0,1 36 15,-19-1-15,1 0 16,0-35-16,-18 36 16,0-1-16,-36 18 15,1 0-15,-18 0 16,35 0-16</inkml:trace>
@@ -2095,7 +2095,7 @@
   <inkml:trace contextRef="#ctx0" brushRef="#br0" timeOffset="77350.9276">4480 13653 0,'0'0'15,"-70"52"-15,52-16 0,0-1 0,1 53 16,17-53 0,0 1-16,17-1 0,1 0 15,17-17-15,18 0 16,-17-18-16,-1-18 0,18 0 15,0-52-15,-18 17 16,-17 18-16,-1-36 0,-17 18 16,-17-88-1,-1 70-15,-17 1 0,-1-1 16,1 1-16,0-1 0,0 18 16,-36-53-16,36 71 15,-1 0 1,36 53-16,0 70 15,53 18 1,-35-36-16,35 71 16,-18-70-16,36 52 15,-36-70-15,36 35 16,-18-35-16,-1 18 16,-16-54-16,-1 1 15,-17 0-15,-1-18 0</inkml:trace>
   <inkml:trace contextRef="#ctx0" brushRef="#br0" timeOffset="78100.5895">5098 13582 0,'-18'0'16,"0"18"-16,1-1 15,-1 36 1,0-35-16,1 52 15,17-34-15,17 34 16,1-52-16,0 17 16,-1-17-16,1-18 0,35 17 15,-35-34-15,17-1 16,-18 0-16,-17-52 16,0 35-16,-17-36 15,-1 18-15,1-17 16,-1 52-16,0 0 15,36 18 1,0 53 0,-1-17-16,36 87 15,-18-88-15,-17 1 16,0-19-16,-1 18 0,1-17 16,-18 0-16,0-36 31,0-17-31,0 17 15,18-52-15,-18 52 16,17-35-16,1 53 16,0 0-1,-18 18 1,17-1-16,1 1 16,-18 0-16,17-18 15,1 0-15,0-18 16,-1-17-1,1 17-15,-18 0 0,18 18 16,-18-17-16,17 17 16,-17 17-1,18 1-15,0 0 16,-1 17-16,1-17 16,17-1-16,-17-17 15,17 0 1,-17-17-16,-1-1 15,36-53-15,-35 54 16,-1-18-16,1 35 16,-18 17-16,0 1 15,0 17-15,0 0 0,18 1 16,-1 17 0,19-1-16,-19 1 15,1-35 1</inkml:trace>
   <inkml:trace contextRef="#ctx0" brushRef="#br0" timeOffset="78417.7977">6350 13229 0,'18'-17'0,"-1"17"16,1 35 0,-18 0-1</inkml:trace>
-  <inkml:trace contextRef="#ctx0" brushRef="#br0" timeOffset="78533.9432">6456 13670 0,'17'0'16,"-34"0"-16,34 18 0,1-18 16</inkml:trace>
+  <inkml:trace contextRef="#ctx0" brushRef="#br0" timeOffset="78533.9431">6456 13670 0,'17'0'16,"-34"0"-16,34 18 0,1-18 16</inkml:trace>
   <inkml:trace contextRef="#ctx0" brushRef="#br0" timeOffset="79663.0624">7938 12894 0,'0'0'0,"0"-35"0,0-1 15,17 36-15,-17-17 0,0 34 16,18 19-16,-1 17 0,1 123 16,0-70-16,-1 17 15,-17 124-15,0-141 16,0 18 0,0-89-16,0-17 15,0-36-15,0-88 16,0 36-16,0-72 15,0 54-15,18-18 16,17-88 0,-17 89-16,17-54 15,-17 106-15,35 0 16,-36 53-16,1 53 16,0 0-16,-1 17 0,1 19 15,0 105 1,17 17-16,-18-140 15,1-1-15,17 1 0,18-1 16,-35-34-16,-18-19 16,0 1-16</inkml:trace>
   <inkml:trace contextRef="#ctx0" brushRef="#br0" timeOffset="79796.2399">8114 13458 0,'35'18'16,"-17"-18"-16,70 18 0,-35-18 16,53 17-1,-53 1-15</inkml:trace>
   <inkml:trace contextRef="#ctx0" brushRef="#br0" timeOffset="80174.5816">8661 13423 0,'-53'71'0,"106"-142"0,-124 195 15,54-18 1,17-71-16,52 35 16,-16-52-16,34 0 15,-34-36-15,34-17 16,-35-1-16,1 1 15,-19 0-15,1-18 0,-18-53 16,0 53-16,-53-70 16,18 52-16,-36-52 15,18 70-15,-17 0 16,52 53-16,0 35 16,18 18-16,0 0 15,18 106 1,53-1-16,-18-87 15,-1-18-15,1 0 0,53 35 16,-53-53-16,-18-17 16,18 0-16,-35-18 0,17 0 15,-17-18-15</inkml:trace>
@@ -2125,9 +2125,9 @@
   <inkml:trace contextRef="#ctx0" brushRef="#br0" timeOffset="91237.372">17868 6615 0,'53'0'15,"-18"-18"-15,18 18 16,71-18 0,-54 18-16,89-17 15,-35 17-15,-72 0 16,1 0-16</inkml:trace>
   <inkml:trace contextRef="#ctx0" brushRef="#br0" timeOffset="92842.7364">14640 8361 0,'-17'0'15,"34"0"-15,-52 17 0</inkml:trace>
   <inkml:trace contextRef="#ctx0" brushRef="#br0" timeOffset="93072.2943">14534 8378 0,'36'0'15,"-72"0"-15,19 0 0,-1 0 0,1 0 16,-1 0-16,0 0 16,36 0 31,0 18-47,17-18 15,53 0-15,-35 0 16,88 0-16,-53-18 15,0 1-15,18-1 16,-18 1-16,89-19 16,-89 36-16,36-17 15,-72 17-15,-16 0 0,17 0 16,-36 0 0</inkml:trace>
-  <inkml:trace contextRef="#ctx0" brushRef="#br0" timeOffset="93332.242">15416 8114 0,'18'0'16,"0"0"-16,35 18 15,-18-1-15,0 1 0,71 17 16,-35-17-16,-1-1 15,1-17-15,-1 18 16,18-18-16,-35 0 16,18 0-16,-36 0 0,-17 18 15,-53-1-15,-54 19 16,36-19-16,-88 54 16</inkml:trace>
+  <inkml:trace contextRef="#ctx0" brushRef="#br0" timeOffset="93332.2419">15416 8114 0,'18'0'16,"0"0"-16,35 18 15,-18-1-15,0 1 0,71 17 16,-35-17-16,-1-1 15,1-17-15,-1 18 16,18-18-16,-35 0 16,18 0-16,-36 0 0,-17 18 15,-53-1-15,-54 19 16,36-19-16,-88 54 16</inkml:trace>
   <inkml:trace contextRef="#ctx0" brushRef="#br0" timeOffset="96297.3526">17745 9049 0,'17'0'16,"1"0"0,70 17-1,-17-17-15,17 0 0,18-17 16,105 17-16,-87 0 15,-1 0-15,-17 0 0,0 0 16,106 17-16,-142 1 16,-17-18-16,-18 18 15,1-18-15</inkml:trace>
-  <inkml:trace contextRef="#ctx0" brushRef="#br0" timeOffset="102608.4448">5327 13758 0,'0'-17'16,"18"-1"-1,-18 0-15,17 18 16,-17 18 15,18 17-31,-18-17 16,0 35-16,0-35 15,0 17-15,0 0 16,18-17-16,-18-1 16,0 1-16,0 0 15,0-36 1,0-17-1,17 17-15,1-52 16,-18 34-16,35-17 16,-17 36-1,-1-19-15,1 36 16,17-17-16,-17 17 16,0 35-1,-18-17-15,0 35 16,0-18-1,-18 18-15,18-36 16,0 1-16,18 0 16,-18-1-16,17-34 15,-17-19 1,0 19-16,18-54 16,-1 54-16,-17-19 15,36 1 1,-36 17-16,35-17 0,-17 35 15,-1 0-15,1 0 0,0 0 16,-1 18-16,18-1 16,-17 1-16,0 17 15,-18-17-15,17 17 16,1 18-16,-18-18 16,35 18-16,-17-35 15,-18 17 1</inkml:trace>
+  <inkml:trace contextRef="#ctx0" brushRef="#br0" timeOffset="102608.4447">5327 13758 0,'0'-17'16,"18"-1"-1,-18 0-15,17 18 16,-17 18 15,18 17-31,-18-17 16,0 35-16,0-35 15,0 17-15,0 0 16,18-17-16,-18-1 16,0 1-16,0 0 15,0-36 1,0-17-1,17 17-15,1-52 16,-18 34-16,35-17 16,-17 36-1,-1-19-15,1 36 16,17-17-16,-17 17 16,0 35-1,-18-17-15,0 35 16,0-18-1,-18 18-15,18-36 16,0 1-16,18 0 16,-18-1-16,17-34 15,-17-19 1,0 19-16,18-54 16,-1 54-16,-17-19 15,36 1 1,-36 17-16,35-17 0,-17 35 15,-1 0-15,1 0 0,0 0 16,-1 18-16,18-1 16,-17 1-16,0 17 15,-18-17-15,17 17 16,1 18-16,-18-18 16,35 18-16,-17-35 15,-18 17 1</inkml:trace>
 </inkml:ink>
 </file>
 
@@ -2171,7 +2171,7 @@
   <inkml:trace contextRef="#ctx0" brushRef="#br1" timeOffset="26882.7643">28187 3334 0,'0'0'0,"18"17"0,-1-17 0,19 0 16,-19-17-16,1-1 16,-1 18-16,1-18 0,-18 1 15,18-1-15,-18 1 16,0-1-16,0 0 15,-18 1-15,0 17 0,1 0 16,-36 0-16,35 0 16,1 17-16,17 19 15,17-1 1,1-18-16,17 1 0,36 0 16,-36-18-16,36 0 15,-36 0-15,0 0 16,-17 0-16,-36 0 31,0 17-15,1-17-16,17 18 15,0 0-15,17-18 16,1 0 0,17 0-16,1-18 0,17-17 15,-18-1-15,18-34 16,-53 17-16,17-53 15,-17 53-15,-35-35 16,17 35-16,-17 0 16,18 36-16,-36 17 15,35 35 1,0 0-16,18 18 0,-17 0 16,17 18-16,35-1 0,18 36 15,35 0 1,-35-71-16,18 18 15,-36-35-15,0-18 16,-17 0-16,-1 0 0,1 0 16,0-18-16,-18-17 15,0 17-15,-18-35 16,0 53-16,1-18 16,-1 18-16,18 18 15,0 0 1,35 17-16,-17-35 15,17 18-15,18-1 16,0-17 0,-35 0-16,-1-17 0,-17-1 15,-17 18 32,34 0-31,19 18-1,17-18-15,-36 0 16,1 0-16,17-18 16,-17 18-16,-1 18 47,19-18-32,-19 17-15,1-17 0,35 18 16,-18-18-16,-17 0 15</inkml:trace>
   <inkml:trace contextRef="#ctx0" brushRef="#br1" timeOffset="27344.0023">30762 3034 0,'0'53'16,"0"-106"-16,-17 159 0,-19-53 0,-17 52 15,18-69-15,-35 34 16,34-52-16,-34 0 16,52-18-16,0 0 15,18-18-15,0 0 0,18-17 16,17 0-16,1 17 15,-1 0-15,0 18 16,0 0-16,1 18 0,-1 0 16,0-1-16,54 36 15,-54-17-15,18 17 16,-18-36-16,-17 36 16,-1-53-16</inkml:trace>
   <inkml:trace contextRef="#ctx0" brushRef="#br1" timeOffset="34202.1009">21802 6597 0,'-18'0'15,"18"18"1,18-1-16,-18 1 15,35 52 1,-17-34-16,35 52 16,-36-53-16,18 18 0,18 35 15,-17-35-15,17 18 16,-36-54-16,1 1 16,-18 17-16,17-35 15,-17 18-15,18 0 16,-36-36 46,1 18-46,-1-18-16,-35 18 16,18 0-16,-18-17 15,18 17-15,-53 0 16,52 0-16,-52 0 15,70 0-15,-52 0 16,52 0 0,-35 0-16,36 0 15,-1 0-15,0-18 16,-17 0 0,18 18-1,-1-17-15,0 17 16,1 0-16,-1 0 15,36 0 48,-18 17-63,0 1 16,0 0-1,0-1-15,0 1 16,0 17-1,0 1-15,0-1 0,0 0 16,-18 0-16,0 71 16,18-71-16,-17 18 0,-1 18 15,18-36-15,-18 18 16,18-35-16,0-1 16,-17 1-16,34-18 78,19 0-63,-1 18 1,-17-18-16,35 0 0,35 17 16,-35-17-16,17 0 15,-17 18-15,71 0 16,-71-1-16,-1 1 0,-16 0 15,34 17 1,-52-35-16,0 17 0,-1-17 16,1 0-16,-18 18 15,17-36 48,1 1-48,0-1-15,17-35 16,0 18-16,1-36 16,-19 54-16,-17-19 15,18 19-15,-18-1 0,17 1 16,-17-1-16,18 18 62,0 0-15,-18 18-47,17-1 16,1 18 0,0-17-16,-1 0 15,19-1-15,-1 36 16,0-35-16,18 17 15,-18-17-15,36 0 16,-36-1-16,0-17 16,18 0-16,-17 0 15,-19 0-15,-17 18 32,-35-18-17,17 17-15,-17 19 16,0-1-16,17-17 0,1 17 15,-19 35 1,19-34-16,-1-1 0,-17 18 16,17-18-16,0 0 0,1 18 15,-18 18 1,17-53-16,0 52 16,18-52-16,0 17 15,0-17-15,0-1 16,18-17-1,-36 0 32,-17 0-47,17-17 16,1 17-16,-36 0 16,17-18-16,-16 0 15,34 18-15,-17-17 0,17-1 16,-17 1-16,-1-1 15,1 0-15,18 1 16,-1-1-16,-17 18 16,17-18-16,0 18 15,1 18 48,-1 0-48,0-18-15,-17 35 0,18 0 16,-19 0 0,19 1-16,-1 17 15,0-18-15,1-17 0,17 17 16,-18 0-16,18 0 0,-18 18 16,18-17-16,0-19 15,0 18 1,0-17-16,0-36 31,-35 1-31,17 17 16,1-18-16,-1 1 0,-17-1 15,-36 0 1,54 1-16,-54-19 16,36 19-16,-36-19 15,1-16-15,35 16 16,-18 1-16,35 17 15,0-35 1,1 36-16,17-1 0,0 1 16,0-19-1,0 19-15,0-19 16,-18 19-16,18-1 16,-18 0-16,1 18 15,-1-17-15,0 17 16,-17 0-16,0 0 15,0 17-15,-1-17 16,-52 36 0,53-36-16,-71 35 0,71-17 15,0-1-15,-18 1 16,0 17-16,17-17 16,19-1-16,-1-17 15,0 0 48,1 36-48,17-19-15,-18-17 16,18 18-16,0 0 0,-17-1 16,17 19-16,0 34 15,0-35-15,0 54 16,17-54-16,-17 0 15,18 0-15,-18 18 16,17-35-16,-17 0 16,18-18-1,-36 0 32,1 17-31,-1-17-16,1 18 15,-36-18 1,35 0-16,-53-18 16,36 1-16,-35-19 15,34 1-15,-17 17 0,-17-17 16,52 17-16,1 1 16,17-1 109,-18 1-110,18-1-15,0 0 0,-18 1 16,18-19-16,-17 19 15,17-36 1,0 18-16,0-1 0,17 19 16,1-19-16,-18 1 0,35-35 15,-17 34-15,17-17 16,-35 36-16,18-19 16,-1 19-16,-17-1 15,0 0 1,0 1-16,-17 17 15,-1 0-15,1 0 16,-1 0-16,-17 0 16,17 0-16,-17 17 0,17-17 15,-53 18-15,54-18 16,-18 0-16,-18 0 16,17 0-16,-17 0 0,-17-18 15,17 18-15,-18-35 16,36 35-16,0-17 15,35-1-15,-18 0 16,36 18 15,0 36-15,-18-19-16,0 1 16,17-18 46,-17 17-46,0 1-16,0 0 15,0 17-15,0 18 16,-17-18-16,17 53 16,0-35-1,-18-17-15,18 17 0,0 35 16,18-53-16,-18 18 15,17-35-15,-17-1 0,18 18 16,-18-17 0,0 0-1,0-1 1,-18-17 0,1 0-1,-1 0 1,0 0-16,1 0 0,-1-17 15,0 17-15,1 0 0,-1 0 16,-17-18-16,17 18 16,-35 0-1,36 0-15,-19 0 16,19 0-16,-1 0 0,0 0 0,1 0 16,17 18-16,0-1 46,0-34 17,0-1-47,0-17-1,0 17-15,-18-35 16,18 18-16,0 0 0,-18-36 15,18 18-15,0 18 16,-17 0-16,17-18 0,-18 18 16,1-54-1,-1 54-15,18 0 16,-18 17-16,18 36 31,-17-1-15,17 1-1,-18 0-15,-35 17 16,18 0-16,-36 18 16,18-35-16,18-1 0,-53 19 15,53-19-15,-18 1 16,35-18-16,0 0 16,1 0-16,-1 0 15,0 0 1,18 18 62,18-18-78,-18 17 16,18-17-16,-1 53 15,1-35-15,17 52 16,-17-52-16,35 35 15,-53-18-15,17-17 16,1-1-16,-18 1 0,18 17 16,-18-17-16,17 0 15,-17-1-15,0 19 16,18-36-16,-18 17 16,0 1-16,18 0 15,-18-1-15,0-34 31,0-1-15,0 0 0,0 1-1,0-1-15</inkml:trace>
-  <inkml:trace contextRef="#ctx0" brushRef="#br1" timeOffset="46931.2279">18644 9243 0,'-17'0'94,"17"17"31,-18-17-109,18 18-16,-18 0 15,18-1-15,-17 1 16,-1 0-16,18-1 16,-18 1-16,18 17 15,-17 0-15,17-17 16,0 0-1,0-1 32,-18-17-31,18-17 93,-17 17-93,17-18-16,0 0 16,-18-17-1,0 0-15,1 0 16,17 17-16,-36-17 15,36 17-15,-17 18 16,-1-35 0,0 35-1,1-18-15,17 1 16,-18-1-16,18 0 16,0 1-1,-17 17-15,17 17 94,-18 1-78,0-18-1,1 18 1,-1-1-16,0-17 15,1 0 1,-19 18-16,19-18 16,-18 0-16,17 0 15,0 0 1,1 0-16,17 17 0,-18-17 94,0 0-63,18 18-15,0 0-16,18-1 15,-18 1-15,18 0 16,-18-1-1,17 1-15,-17 0 16,0-1-16,0 1 16,0-1-16,0 1 15,0 0-15,18-1 16,0-17 0,-1 0 30,-34 0 1,-1 0-31,0 0 0,1 0-1,-1 0 1,0 0-1,1 0 1,-1 0-16,0 0 16,1 18-16,-1-18 15,18 18-15,-18-18 16,18 17 15,-17-17-15,17 18 15,-18-18 16,18-18-16,-17 18-31,17-17 16,0-36-1,-18 35 1,18-17-16,0 17 0,-18-52 16,18 52-16,-17-35 15,17 35-15,0 36 125,-18-18-109,0 18-16,-17-18 16,17 17-16,-17-17 15,18 0 1,-1 0-16,-35 0 15,35 0-15,1 18 16,17 0 93,17-1-93,-17 1 0,18 0-16,-18-1 15,0 1 1,0-1-16,0 1 16,0 0-1,0-1 16,18-17 16,-36 0 0,0 0-31,1 0-1,-1 0 1,0 0-16,1 0 16,-1 0-16,-17 0 15,17 0 1,1 0 0,17-17-16,0-1 15,17 0 1,1 18-16,0-35 15,-1 0 1,-17 0 0,0 17-16,0-17 15,-17 17-15,17 0 16,0 1-16,0-1 0,-18-17 16,18 17-1,18 18 32,-36 0 16,0 18-48,1 0-15,-1-18 16,0 0-16,1 0 15,-1 0-15,0 0 16,1 0-16,-1 0 0,0-18 16,1 18-1,-1 0-15,18-18 0,-17 18 0,-1-17 16,0 17 0,1 0-1,17 17 63,-18-17-78,18 18 16,0 0 0,0-1-16,0 1 15,0-1-15,0 1 47,18-18-31,-1 18-1,-17-1-15,18 1 16,0 0-16,-1-18 16,-17 17-16,-17-17 62,-1 0-46,0 0-1,1 0 1,-1 0-16,0 0 16,1 0-1,-1 0-15,0 0 16,1-17-16,-1 17 15,18-18 17,0 0-17,-17 1 1,17-19 0,-18 19-16,18-1 0,-18 1 15,18-1-15,-17 0 16,-1 18-1,18-17 1,-18 17 0,1 0-1,-1 17 1,0-17-16,-17 36 16,18-36-1,-1 17-15,0 1 16,1-18 62,-1-18-62,0 18 15,36 0 0,0 18-15,-1-1-16,1 1 15,-18 0 1,18-1 0,-18 19-16,0-19 15,17 1-15,-17 0 16,18 17-16,-1-18 15,-17 1 1,18-18-16,-18 18 47,-18-18-47,18 17 16,-17-17-16,17 18 15,-18-18 1,1 0-16,17 18 15,-18-18 1,0 0 62,18 17-62,-17-17-16,-1 0 15,0 0 1,18-17-16,0-1 16,-17 0-16,17 1 0,-18-19 15,18 19-15,-18-1 16,18 1 0,-17 17-1,-1 0 48,0 0-48,1 17 1,-1-17-16,1 0 0,-1 18 16,0-18-16,1 0 15,-1 0-15,0 17 16,36-17 15,-18-17-15,18 17-16,-36 0 78,18-18-63,-35 18 1,17 0 0,0 0-16,1 0 15,17 18 17,0-1-17,-18 1 1,36 0-16,-1-1 15,1 1-15,17 17 16,1-17 0,-19 0-16,1-18 0,0 17 15,-1 1-15,1-18 16,-18 17 78,-18-17-79,18 18 1,-17 0 0,-1-1-16,0 1 15,1 0 1,-1-1-16,18 1 15,-18-18 1,18 18 31,-17-1-16,-1-17 16,0 0-16,1 0-31,-1-17 16,1 17-16,17-18 47,17 0-32,-17 1 1,0-1 0,0 0-1,0-17-15,0 17 16,-17 1-16,-1-1 16,18 1-1,-18 17-15,1 0 16,-1 0-1,0 0-15,-17 17 16,17-17 0,1 0-1,17-17 48,-18 17-1,18 17-46,-17 1 0,17-1-1,0 1-15,0 0 16,-18-18-1,18 17 1,0 1-16,0 0 16,0-1-1,0 1-15,0 0 16,0-1-16,18 1 16,-1 0-16,1-1 15,-18 1-15,17-1 16,-17 1-1,-17-18 1,17 18-16,0-1 31,-18-34 1,1 17-1,-1 0-31,0 17 15,1 1 1,-1 0-16,0-1 16,1-17 62,-1 0-63,0 18 1,1-18-16,-1 0 16,0 0-16,1 0 62,17-18-62,-18 18 16,1 0-16,-1 0 15,-17 0-15,17-17 16,0 17-16,18-18 47,18 18-31,0 0-1,-1 0-15,1 18 16,-18-1-1,18-17-15,-18 18 0,17 0 16,-17-1-16,0 18 16,0-17-1,18 0 32,17-18-31,-17 17-16,17-17 0,-17 0 15,17 18-15,-17-18 0,-1 0 16,36 0-16,-35-18 16,-1 18-1,1-17-15,0 17 16,-18-18-16,35 0 16,-17 1-16,35-1 15,-36 18-15,54 0 16,-54-17-16,19 17 15,-19-18-15,19 18 0,-19 0 16,1 0 47,17 0-48,-17 0-15,17-18 16,18-17-1,-35 17-15,-18 1 16,0-19 0,17 36-16,-17-17 0,-17-18 15,17 17-15,0 0 16,-18-17-16,18 17 16,-18 1-16,1-1 15,-1 0 1,0 18-1,18 18 17,0 0-32,0-1 15,18-17-15,-18 18 32,-18-18-17,1 18 1,-1-18-16,0 0 0,-17 17 15,18-17-15,-1 0 16,0 18-16,1-18 16,-1 18-16,0-18 15,18 17 1,0 1 0,18-1-16,0-17 15,-1 18 1,1 0-16,-18-1 15,-18-17 32,1 0-31,17-17 0,-18 17-16,0 0 46,1 0-30,-1 0-16,-17 0 16,17 0-16,-17 0 15,17 0-15,1 0 16,-1 0-16,-17 0 0,-1 0 16,19 0-1,-1 0-15,1-18 16,-1 18-1,0 0-15,1 0 16,-19-18-16,19 18 16,-1 0-16,0 0 15,1 18 1,17 0-16,-18-18 0,18 17 16,-18-17 30,1 0-46,-1 0 16,1 0 0,-1 0-16,0 0 62,-17-17-46,17 17-16,-35-18 15,36 0-15,-54 1 16,54 17-16,-19 0 0,19 0 16,-1 17-1,0 1-15,18 0 0,0-1 32,0 1-17,0 0-15,-17-1 0,-1 1 16,18 0-16,0-1 15,0 1-15,18-18 16,-1 0 0,1-18-1,0 1-15,-18-19 16,17 19-16,-17-1 16,0-17-1,0 17-15,0 0 16,0 1-16,-17-36 15,17 18-15,0 17 0,0 0 16,0 1-16,17 17 31,1-18-15,0 18 0,-1 0-16,-17-18 15,18 18 1,-18-17-1,18 17 1,-18-18-16,17 0 16,1 18-16,-18-17 0,0-1 15,17 18-15,1-35 16,-18 17-16,18 1 16,-18-1-16,17 0 15,1 1 1,-18-1-1,0 0 1,0 1 0,0-1-1,0 1 1,0 34 15,18 18-31,-18-17 16,17 17-16,-17-17 15,18 17 1,-18-17-16,18 0 16,-1-1-1,1-17 1,-1 0 0,1-17-1,0-1 1,-1 0-1,1 1 1,0 17 0,-1 0-1,1 0 1,-18-18 0,-18 18 77,1 0-77,-1 0 0,0 0-16,18-18 31,18 18-16,17 0-15,-17 0 16,0 0-16,-1 0 0,19 0 16,-19 0-16,1 0 31,-18 18-31,-18 0 16,18-1-1,-17 1-15,17 0 16,-18-1-1,18 1-15,0 17 16,0-17 0,-18-18 15,1-18 16,-1 18-32,0-18 1,1 18-16,-1-17 16,0 17-16,1-18 15,-1 18-15,-17-17 0,17 17 0,-17-18 16,0 0 0,17 18-16,0 0 15,18 18 1,0 0-1,0-1 1,0 1 15,18-18-15,-18 17 0,18 1-16,-18 0 15,0-1-15,0 19 16,0-19-16,0 1 15,-18 0-15,18 17 16,-18-35-16,18 18 16,-17-1-1,-1 1 1,0-1-16,1-17 16,-1 18-1,36-18 16,-1 18-15,1-18 15,0 0-15,-1 0-16,19-18 16,-19 0-16,19 1 15,-19 17-15,-17-18 16,18 18-16,-1 18 15,-17-1-15,18 19 0,0-19 16,-18 19-16,35 17 16,-35-36-16,18 1 15,-1-1-15,-17-34 47,-17-1-47,-1 1 16,18-1-16,0 0 15,0-17-15,0 17 16,18 1 0,-1-1-1,1 18-15,0 0 16,-1 0 0,-17-18 93,-17 1-93,-1-18-16,0 17 15,1 0 1,-1-17-16,0 17 15,1 1-15,17-1 16,-18 18 0,18 18-1,-18-18-15,1 17 16,-1 1-16,18 0 0,-17-18 16,17 17-1,0 1 1,17 0-1,1-18-15,-18 17 0,17-17 16,1 18-16,0-18 16,-1 0-16,1 17 15,0-17 1,-36 0 15,18 18-15,0 0-1,0-1-15,18 1 16,-18 0-16,17-1 0,1-17 16,-18 18-16,-18-36 62,1 1-46,17-1-16,0-17 15,-18 17-15,18 0 16,18-17 0,-1 18-1,1 17 1,0 0 0,-1 0-16,1 0 15,0 0 1,-18 17 15,0-34 0,0-1-15,-18 18 0,18-18-16,-35 1 15,17-1-15,18 0 0,-18 1 16,1 17-16,-1 0 15,0 0-15,1 17 16,17 1-16,-18 17 16,18-17-16,0 52 15,0-34 1,18-36-16,-1 17 16,1-17-16,0 0 15,-1 0-15,1-17 16,0-1-16,-18 0 15,0 1-15,0-1 0,0 1 16,0-1-16,0 0 16,-18 1-16,0-1 0,1 0 15,17 1-15,-18 17 0,-17-18 16,17 36 0,0-1-16,1-17 15,17 18-15,-18 17 16,18-17-16,0 0 0,0-1 15,18 1 1,-1-1-16,1-17 16,0 0-16,-1 0 0,19 18 15,-19-18 1,-17-18 0,0 1-16,0-18 15,-17 17 1,17 0-16,-36-17 15,36 17-15,-35-17 16,17 35-16,1 0 16,17 18-1,-18-1 1,18 1-16,-17 17 16,17-17-16,0 0 15,17-18-15,-17 17 0,18-17 16,-1 18-16,1-18 15,0 0-15,-1 0 16,-17-18 0,-17 18-1,17-17-15,-18-1 16,0 18-16,1-18 16,17 1-16,-18 17 15,1 0 1,17 17-1,0 1-15,35 17 16,0-17 0,-17-18-16,-1 0 0,1 0 15,0-18-15,-18 1 16,0-1-16,0-17 16,-18 17-16,0 18 15,1-35-15,-19 17 16,19 18-1,-1-18-15,1 18 0,-1 0 16,0 18-16,18 0 16,0-1-16,-17 1 0,34 35 15,1-35-15,0-1 16,-1 1-16,1-1 16,17-17-16,-17 0 0,17 0 15,-17 0-15,17 0 16,-35-17-16,18-1 15,-18-17-15,-18 0 0,0-1 16,1 19-16,-1-19 0,0 19 16,-35-19-1,36 36-15,-18-17 16,17 17-16,0 0 0,1 17 16,-1 1-16,0 53 15,18-36-15,0 0 0,18 1 16,0-19-16,52 18 15,-35-35-15,1 18 16,17-18-16,0 0 16,-36-18-16,1-17 15,-18 18-15,0-19 0,-18-17 16,1 36-16,-36-36 16,17 35-1,-17 0-15,36 18 16,-1 0-16,-17 18 15,35 0-15,-18-1 0,1 54 16,17-53-16,17 17 16,1-17-1,17-1-15,0-17 16,-17 0-16,17-17 16,-35-1-16,18 0 0,-18-17 15,-18 17-15,1 1 16,-1-1-16,-52 18 31,52 18-31,18 17 16,18-17-16,-1-1 15</inkml:trace>
+  <inkml:trace contextRef="#ctx0" brushRef="#br1" timeOffset="46931.2278">18644 9243 0,'-17'0'94,"17"17"31,-18-17-109,18 18-16,-18 0 15,18-1-15,-17 1 16,-1 0-16,18-1 16,-18 1-16,18 17 15,-17 0-15,17-17 16,0 0-1,0-1 32,-18-17-31,18-17 93,-17 17-93,17-18-16,0 0 16,-18-17-1,0 0-15,1 0 16,17 17-16,-36-17 15,36 17-15,-17 18 16,-1-35 0,0 35-1,1-18-15,17 1 16,-18-1-16,18 0 16,0 1-1,-17 17-15,17 17 94,-18 1-78,0-18-1,1 18 1,-1-1-16,0-17 15,1 0 1,-19 18-16,19-18 16,-18 0-16,17 0 15,0 0 1,1 0-16,17 17 0,-18-17 94,0 0-63,18 18-15,0 0-16,18-1 15,-18 1-15,18 0 16,-18-1-1,17 1-15,-17 0 16,0-1-16,0 1 16,0-1-16,0 1 15,0 0-15,18-1 16,0-17 0,-1 0 30,-34 0 1,-1 0-31,0 0 0,1 0-1,-1 0 1,0 0-1,1 0 1,-1 0-16,0 0 16,1 18-16,-1-18 15,18 18-15,-18-18 16,18 17 15,-17-17-15,17 18 15,-18-18 16,18-18-16,-17 18-31,17-17 16,0-36-1,-18 35 1,18-17-16,0 17 0,-18-52 16,18 52-16,-17-35 15,17 35-15,0 36 125,-18-18-109,0 18-16,-17-18 16,17 17-16,-17-17 15,18 0 1,-1 0-16,-35 0 15,35 0-15,1 18 16,17 0 93,17-1-93,-17 1 0,18 0-16,-18-1 15,0 1 1,0-1-16,0 1 16,0 0-1,0-1 16,18-17 16,-36 0 0,0 0-31,1 0-1,-1 0 1,0 0-16,1 0 16,-1 0-16,-17 0 15,17 0 1,1 0 0,17-17-16,0-1 15,17 0 1,1 18-16,0-35 15,-1 0 1,-17 0 0,0 17-16,0-17 15,-17 17-15,17 0 16,0 1-16,0-1 0,-18-17 16,18 17-1,18 18 32,-36 0 16,0 18-48,1 0-15,-1-18 16,0 0-16,1 0 15,-1 0-15,0 0 16,1 0-16,-1 0 0,0-18 16,1 18-1,-1 0-15,18-18 0,-17 18 0,-1-17 16,0 17 0,1 0-1,17 17 63,-18-17-78,18 18 16,0 0 0,0-1-16,0 1 15,0-1-15,0 1 47,18-18-31,-1 18-1,-17-1-15,18 1 16,0 0-16,-1-18 16,-17 17-16,-17-17 62,-1 0-46,0 0-1,1 0 1,-1 0-16,0 0 16,1 0-1,-1 0-15,0 0 16,1-17-16,-1 17 15,18-18 17,0 0-17,-17 1 1,17-19 0,-18 19-16,18-1 0,-18 1 15,18-1-15,-17 0 16,-1 18-1,18-17 1,-18 17 0,1 0-1,-1 17 1,0-17-16,-17 36 16,18-36-1,-1 17-15,0 1 16,1-18 62,-1-18-62,0 18 15,36 0 0,0 18-15,-1-1-16,1 1 15,-18 0 1,18-1 0,-18 19-16,0-19 15,17 1-15,-17 0 16,18 17-16,-1-18 15,-17 1 1,18-18-16,-18 18 47,-18-18-47,18 17 16,-17-17-16,17 18 15,-18-18 1,1 0-16,17 18 15,-18-18 1,0 0 62,18 17-62,-17-17-16,-1 0 15,0 0 1,18-17-16,0-1 16,-17 0-16,17 1 0,-18-19 15,18 19-15,-18-1 16,18 1 0,-17 17-1,-1 0 48,0 0-48,1 17 1,-1-17-16,1 0 0,-1 18 16,0-18-16,1 0 15,-1 0-15,0 17 16,36-17 15,-18-17-15,18 17-16,-36 0 78,18-18-63,-35 18 1,17 0 0,0 0-16,1 0 15,17 18 17,0-1-17,-18 1 1,36 0-16,-1-1 15,1 1-15,17 17 16,1-17 0,-19 0-16,1-18 0,0 17 15,-1 1-15,1-18 16,-18 17 78,-18-17-79,18 18 1,-17 0 0,-1-1-16,0 1 15,1 0 1,-1-1-16,18 1 15,-18-18 1,18 18 31,-17-1-16,-1-17 16,0 0-16,1 0-31,-1-17 16,1 17-16,17-18 47,17 0-32,-17 1 1,0-1 0,0 0-1,0-17-15,0 17 16,-17 1-16,-1-1 16,18 1-1,-18 17-15,1 0 16,-1 0-1,0 0-15,-17 17 16,17-17 0,1 0-1,17-17 48,-18 17-1,18 17-46,-17 1 0,17-1-1,0 1-15,0 0 16,-18-18-1,18 17 1,0 1-16,0 0 16,0-1-1,0 1-15,0 0 16,0-1-16,18 1 16,-1 0-16,1-1 15,-18 1-15,17-1 16,-17 1-1,-17-18 1,17 18-16,0-1 31,-18-34 1,1 17-1,-1 0-31,0 17 15,1 1 1,-1 0-16,0-1 16,1-17 62,-1 0-63,0 18 1,1-18-16,-1 0 16,0 0-16,1 0 62,17-18-62,-18 18 16,1 0-16,-1 0 15,-17 0-15,17-17 16,0 17-16,18-18 47,18 18-31,0 0-1,-1 0-15,1 18 16,-18-1-1,18-17-15,-18 18 0,17 0 16,-17-1-16,0 18 16,0-17-1,18 0 32,17-18-31,-17 17-16,17-17 0,-17 0 15,17 18-15,-17-18 0,-1 0 16,36 0-16,-35-18 16,-1 18-1,1-17-15,0 17 16,-18-18-16,35 0 16,-17 1-16,35-1 15,-36 18-15,54 0 16,-54-17-16,19 17 15,-19-18-15,19 18 0,-19 0 16,1 0 47,17 0-48,-17 0-15,17-18 16,18-17-1,-35 17-15,-18 1 16,0-19 0,17 36-16,-17-17 0,-17-18 15,17 17-15,0 0 16,-18-17-16,18 17 16,-18 1-16,1-1 15,-1 0 1,0 18-1,18 18 17,0 0-32,0-1 15,18-17-15,-18 18 32,-18-18-17,1 18 1,-1-18-16,0 0 0,-17 17 15,18-17-15,-1 0 16,0 18-16,1-18 16,-1 18-16,0-18 15,18 17 1,0 1 0,18-1-16,0-17 15,-1 18 1,1 0-16,-18-1 15,-18-17 32,1 0-31,17-17 0,-18 17-16,0 0 46,1 0-30,-1 0-16,-17 0 16,17 0-16,-17 0 15,17 0-15,1 0 16,-1 0-16,-17 0 0,-1 0 16,19 0-1,-1 0-15,1-18 16,-1 18-1,0 0-15,1 0 16,-19-18-16,19 18 16,-1 0-16,0 0 15,1 18 1,17 0-16,-18-18 0,18 17 16,-18-17 30,1 0-46,-1 0 16,1 0 0,-1 0-16,0 0 62,-17-17-46,17 17-16,-35-18 15,36 0-15,-54 1 16,54 17-16,-19 0 0,19 0 16,-1 17-1,0 1-15,18 0 0,0-1 32,0 1-17,0 0-15,-17-1 0,-1 1 16,18 0-16,0-1 15,0 1-15,18-18 16,-1 0 0,1-18-1,0 1-15,-18-19 16,17 19-16,-17-1 16,0-17-1,0 17-15,0 0 16,0 1-16,-17-36 15,17 18-15,0 17 0,0 0 16,0 1-16,17 17 31,1-18-15,0 18 0,-1 0-16,-17-18 15,18 18 1,-18-17-1,18 17 1,-18-18-16,17 0 16,1 18-16,-18-17 0,0-1 15,17 18-15,1-35 16,-18 17-16,18 1 16,-18-1-16,17 0 15,1 1 1,-18-1-1,0 0 1,0 1 0,0-1-1,0 1 1,0 34 15,18 18-31,-18-17 16,17 17-16,-17-17 15,18 17 1,-18-17-16,18 0 16,-1-1-1,1-17 1,-1 0 0,1-17-1,0-1 1,-1 0-1,1 1 1,0 17 0,-1 0-1,1 0 1,-18-18 0,-18 18 77,1 0-77,-1 0 0,0 0-16,18-18 31,18 18-16,17 0-15,-17 0 16,0 0-16,-1 0 0,19 0 16,-19 0-16,1 0 31,-18 18-31,-18 0 16,18-1-1,-17 1-15,17 0 16,-18-1-1,18 1-15,0 17 16,0-17 0,-18-18 15,1-18 16,-1 18-32,0-18 1,1 18-16,-1-17 16,0 17-16,1-18 15,-1 18-15,-17-17 0,17 17 0,-17-18 16,0 0 0,17 18-16,0 0 15,18 18 1,0 0-1,0-1 1,0 1 15,18-18-15,-18 17 0,18 1-16,-18 0 15,0-1-15,0 19 16,0-19-16,0 1 15,-18 0-15,18 17 16,-18-35-16,18 18 16,-17-1-1,-1 1 1,0-1-16,1-17 16,-1 18-1,36-18 16,-1 18-15,1-18 15,0 0-15,-1 0-16,19-18 16,-19 0-16,19 1 15,-19 17-15,-17-18 16,18 18-16,-1 18 15,-17-1-15,18 19 0,0-19 16,-18 19-16,35 17 16,-35-36-16,18 1 15,-1-1-15,-17-34 47,-17-1-47,-1 1 16,18-1-16,0 0 15,0-17-15,0 17 16,18 1 0,-1-1-1,1 18-15,0 0 16,-1 0 0,-17-18 93,-17 1-93,-1-18-16,0 17 15,1 0 1,-1-17-16,0 17 15,1 1-15,17-1 16,-18 18 0,18 18-1,-18-18-15,1 17 16,-1 1-16,18 0 0,-17-18 16,17 17-1,0 1 1,17 0-1,1-18-15,-18 17 0,17-17 16,1 18-16,0-18 16,-1 0-16,1 17 15,0-17 1,-36 0 15,18 18-15,0 0-1,0-1-15,18 1 16,-18 0-16,17-1 0,1-17 16,-18 18-16,-18-36 62,1 1-46,17-1-16,0-17 15,-18 17-15,18 0 16,18-17 0,-1 18-1,1 17 1,0 0 0,-1 0-16,1 0 15,0 0 1,-18 17 15,0-34 0,0-1-15,-18 18 0,18-18-16,-35 1 15,17-1-15,18 0 0,-18 1 16,1 17-16,-1 0 15,0 0-15,1 17 16,17 1-16,-18 17 16,18-17-16,0 52 15,0-34 1,18-36-16,-1 17 16,1-17-16,0 0 15,-1 0-15,1-17 16,0-1-16,-18 0 15,0 1-15,0-1 0,0 1 16,0-1-16,0 0 16,-18 1-16,0-1 0,1 0 15,17 1-15,-18 17 0,-17-18 16,17 36 0,0-1-16,1-17 15,17 18-15,-18 17 16,18-17-16,0 0 0,0-1 15,18 1 1,-1-1-16,1-17 16,0 0-16,-1 0 0,19 18 15,-19-18 1,-17-18 0,0 1-16,0-18 15,-17 17 1,17 0-16,-36-17 15,36 17-15,-35-17 16,17 35-16,1 0 16,17 18-1,-18-1 1,18 1-16,-17 17 16,17-17-16,0 0 15,17-18-15,-17 17 0,18-17 16,-1 18-16,1-18 15,0 0-15,-1 0 16,-17-18 0,-17 18-1,17-17-15,-18-1 16,0 18-16,1-18 16,17 1-16,-18 17 15,1 0 1,17 17-1,0 1-15,35 17 16,0-17 0,-17-18-16,-1 0 0,1 0 15,0-18-15,-18 1 16,0-1-16,0-17 16,-18 17-16,0 18 15,1-35-15,-19 17 16,19 18-1,-1-18-15,1 18 0,-1 0 16,0 18-16,18 0 16,0-1-16,-17 1 0,34 35 15,1-35-15,0-1 16,-1 1-16,1-1 16,17-17-16,-17 0 0,17 0 15,-17 0-15,17 0 16,-35-17-16,18-1 15,-18-17-15,-18 0 0,0-1 16,1 19-16,-1-19 0,0 19 16,-35-19-1,36 36-15,-18-17 16,17 17-16,0 0 0,1 17 16,-1 1-16,0 53 15,18-36-15,0 0 0,18 1 16,0-19-16,52 18 15,-35-35-15,1 18 16,17-18-16,0 0 16,-36-18-16,1-17 15,-18 18-15,0-19 0,-18-17 16,1 36-16,-36-36 16,17 35-1,-17 0-15,36 18 16,-1 0-16,-17 18 15,35 0-15,-18-1 0,1 54 16,17-53-16,17 17 16,1-17-1,17-1-15,0-17 16,-17 0-16,17-17 16,-35-1-16,18 0 0,-18-17 15,-18 17-15,1 1 16,-1-1-16,-52 18 31,52 18-31,18 17 16,18-17-16,-1-1 15</inkml:trace>
   <inkml:trace contextRef="#ctx0" brushRef="#br1" timeOffset="60566.926">26476 3140 0,'0'-18'15,"18"0"1,-18 1 0,-18 17 46,18 17-31,18 1-15,-18 0-16,0-1 0,0 1 16,0 17-16,0-17 0,0 17 15,0 18-15,0-18 16,-18 1-1,18-1-15,-18-17 0,18-1 16,0 1-16,18 0 31</inkml:trace>
   <inkml:trace contextRef="#ctx0" brushRef="#br1" timeOffset="61068.0328">26582 3298 0,'-18'0'31,"18"18"-15,-17 0 0,17 35-1,0-36-15,0 19 16,0-19-16,17 1 15,1-18-15,-1 0 16,1-18-16,0 1 16,-1-1-1,-17-17 1,0 17-16,0 0 16,0 1-16,-17 17 15,17-18-15,0 36 31,0-1-15,0 1-16,0 0 16,0-1-16,0 36 15,0-35-15,0 0 0</inkml:trace>
   <inkml:trace contextRef="#ctx0" brushRef="#br1" timeOffset="62134.7058">28981 3193 0,'0'-18'16,"0"0"-16,0 1 16,-18 17 15,18 53-16,0-18-15,0 0 0,0 18 16,18-18 0,-18-17-16,35 17 15,0-35-15,-17 0 16,17-35-16,-35 17 16,0-35-16,0 18 15,0 18-15,0-19 0,-17-17 16,17 36-1,-18-1-15,18 36 32,18 17-17,-18-17-15,17 35 16,-17-36-16,0 36 16,0-35-16,18 17 15,-18-17-15,17-1 0,1 1 16,0-18-16</inkml:trace>
@@ -2181,7 +2181,7 @@
   <inkml:trace contextRef="#ctx0" brushRef="#br1" timeOffset="64843.5826">24818 4163 0,'-18'0'0,"36"0"31,17-18-31,-17 18 16,17 0-1,-17 0-15,17-17 0,71 17 16,35 0 0,-35 0-16,0 17 15,388-17 1,-71-17-16,88-1 16,54 0-1,-248 1-15,301 17 16,-318 0-16,-18 17 15,18-17-15,-18 18 0,247 17 16,-264-17-16,176-1 16,-265-17-16,141 18 15,-211-18-15,53 0 16,-124 18-16,-52-36 16</inkml:trace>
   <inkml:trace contextRef="#ctx0" brushRef="#br1" timeOffset="70943.318">22878 12735 0,'0'-17'172,"0"-1"-156,-18 18-1,18-18 1,-18 18 15,18-17-31,-17-1 16,-1 0 0,0 1-16,1 17 0,-18-53 15,17 35-15,-53-52 16,36 17-1,0 0-15,-53-53 16,52 35-16,-17-17 0,-17-70 16,17 87-16,18-17 15,-1 17-15,-17 18 0,-17-53 16,52 71-16,-17 0 16,17 17-16,1 1 15,-19-19-15,36 19 16,0-1-16,0 0 15,0 1-15,0-1 0,0 36 94,0-1-94,0 1 16,-17 0-1,-1-1 1,1 1-16,-19 17 0,1 1 16,0-19-16,-54 71 15,37-52-15,-54 52 16,53-53-16,-35 36 16,35-36-16,-35 36 15,52-36-15,1 18 16,17-36-16,1 19 15,17-19-15,0 1 16,0 0 0,0-36 46,0 0-46,0 1-16,0-1 0,-18-53 15,0 36 1,1 0-16,-1 0 0,0-18 16,-34-35-1,16 35-15,1 0 0,0 0 16,-53-53-16,52 71 0,-17-1 16,18-17-16,0 18 15,-36-35-15,18 17 16,18 17-16,-18-34 15,18 35-15,17 17 0,-17-17 16,17 17-16,1 0 16,17 1-16,17-1 31,1 18-31,0-18 16,34 18-16,-34 0 15,53-35-15,-36 35 16,71-53-1,-53 18-15,70-36 16,-52 36-16,52-35 16,-70 52-16,35-35 15,-70 35-15,0 1 16,-1-1 0,-34 18-16,-36-17 15,17 17 1,19 0-16,-1-18 15,0 18-15,1-18 16,-1 18-16,1-17 0,-1-1 16,0 0-16,1 1 0,-19-19 15,19 1 1,-1-18-16,0 36 16,1-19-16,-36-17 15,18 0-15,-1 18 0,-17-35 16,36 52-1,-1 0-15,1 1 0,-1 17 16,0 0-16,18 17 16,-17 1-1,17 0 1,0-1-16,-36 1 16,19 0-16,-1-1 0,0 1 15,-52 17-15,35-17 16,-1-1-16,-17 1 0,18 0 15,-53-1 1,53 1-16,-1 0 0,-34-1 16,35 1-16,-54-1 15,54 1-15,-18 0 16,-17 17-16,34-17 16,-52-1-16,53-17 15,-36 18 1,36-18-16,17 0 0,1 0 15,-1 0-15,-17 0 16,17 0-16,36 18 31,-1-18-31,1 17 16,88 71 0,-36 1-16,-34-54 15,34 53 1,-34-35-16,-1-18 0,35 71 15,-34-71-15,17 36 16,-36-53-16,1-1 0,-18 1 16,18-18-1,-36 0 1,-17-18 0,17 18-16,-17 0 15,-1 0-15,19 0 0,-19 0 16,1 0-16,-35 18 15,34 0-15,-52 17 16,53-35-16,-53 35 16,35-17-16,-18 17 15,18-17-15,0 17 16,18-17-16,17-1 16,1 1-16,-1-1 0,-17 19 15,17-19-15,-35 36 16,36-17-16,-19 16 15,19-16-15,-1-1 16,1-35-16,17 18 16,-18-18-1,0-18 1,1 0-16,-19-35 16,1 18-16,-18-35 15,18 34 1,-18 1-16,18 0 0,-18 0 15,0-1-15,-18 1 16,18 35-16,-17-18 16,35 1-16,-36 17 15,53-18-15,-35 0 16,36 18 0,17-17-1,17 17 1,19-18-16,-19 18 15,54 18 1,-36-18-16,0 0 0,1 17 16,-1-17-16,18 0 0,-18 0 15,36 0-15,-54 0 16,36 0 0,-35-17-16,0-1 0,-1 1 15,1-1-15,0 0 0,17 1 16,-18-1-16,1 0 15,0 18-15,-18-17 0,17 17 16,1 0-16,0 0 0,-18 17 16,17 1-1,1 0-15</inkml:trace>
   <inkml:trace contextRef="#ctx0" brushRef="#br1" timeOffset="73162.0097">18450 10866 0,'-17'17'16,"17"-34"-16,0-1 15,0 0-15,0 1 16,0-19-16,0-17 16,0 18-16,0 0 0,-18-36 15,18 36-15,0-18 16,0 0 0,-18 18-16,18 0 15,-17 35 16,-1 0-15,0 17-16,1 1 16,-18 0-1,-1-1-15,1 1 0,17 17 16,-17-17-16,-35 17 16,34-17-16,-34 17 15,17 0-15,-35 1 16,35-1-16,17-18 0,-52 36 15,53-17 1,0-1-16,35 0 16,-18-17-16,18-1 15,0 1 1,18-18-16,-1 18 0,1-1 16,0-17-1,-18 18-15,0 0 16,0-1-16,0 1 15,0 0-15,-18-1 16,0-17 15,1-17-15,-1 17-16,-17-36 16,17 36-16,-35-35 15,18 17 1,-18 1-16,18 17 15,-36-18-15,53 18 16,-34 0-16,16 0 16,19 18-16,-19-1 0,1 1 15,17 0-15,-17 17 16,35-17 0,-17-1-16,-1 1 0,0 17 15,18-17 1,-17-1-16,17 1 0,-18 0 15,0-1 1,18 1 0,-35-18-16,35 18 15,-18-18-15,1 17 16,-1-17 0,1 0-1,-1 0 1,0 0-16,1 0 15,-1 0 17,18-17-17,-18 17-15,1 0 0,-1 0 16,-35 0 0,35 0-16,-17 0 15,0 17-15,17 1 0,-35 0 16,53-1-16,-17-17 15,17 18-15,17-18 16,1 0-16,17 0 0,18 0 16</inkml:trace>
-  <inkml:trace contextRef="#ctx0" brushRef="#br1" timeOffset="73741.9426">18486 10971 0,'0'0'0,"0"-17"0,17-1 16,-17 0-1,0 1-15,-17 17 32,17 17-32,0 1 15,0 0 1,0-1-16,17 1 0,1 0 16,-1-18-1,-17 17-15</inkml:trace>
+  <inkml:trace contextRef="#ctx0" brushRef="#br1" timeOffset="73741.9425">18486 10971 0,'0'0'0,"0"-17"0,17-1 16,-17 0-1,0 1-15,-17 17 32,17 17-32,0 1 15,0 0 1,0-1-16,17 1 0,1 0 16,-1-18-1,-17 17-15</inkml:trace>
   <inkml:trace contextRef="#ctx0" brushRef="#br1" timeOffset="75199.5385">16563 11289 0,'-18'0'16,"18"-18"93,0 1-93,0-1-16,0-17 15,0 17-15,18-17 16,-18 17-16,0-17 15,18 0-15,-1-1 16,-17 19-16,18-36 16,-1 35-16,19 0 15,-36 1-15,17-1 16,1 18-16,-36 0 47,1 18-32,-1-18-15,-17 35 16,17-35-16,-17 18 16,-36-1-1,36 1-15,-53 0 16,53-1-16,-71 1 16,71 0-16,-36-18 15,53 17-15,-17-17 16,17 18-16,1-18 15,17 18 1,0-1-16,17 1 16,-17-1-1,18 1-15,-18 0 16,0-1-16,0 1 16,-18 0-1,1-18 1,-1-18-1,0-17 1,1 17 0,-18-17-16,17 17 0,0 1 15,-17-1 1,17 0-16,1 1 16,17-1-16,-18 0 15,18 1-15,-18-1 16,1 18 15,17-18-31,0 1 63,-18-1-48,18 0-15,-17 1 16,-1-1-16,18 1 62,18-1-46,-1 18-16,-17-18 16,18 18-16,-18-17 15,17 17-15,-17-18 0,18 18 16,0 0-1,-1 0 1,1 0-16,17 0 16,-17 0-16,17-18 15,-17 18-15</inkml:trace>
   <inkml:trace contextRef="#ctx0" brushRef="#br1" timeOffset="80041.8815">15928 10672 0,'-18'0'16,"36"0"-16,-36-18 46,36 18-30,0 0-16,-18-18 16,17 18-16,1 0 15,-1-17-15,1 17 0,0-18 16,-1 18-16,1-18 16,0 1-16,-1 17 15,1-18-15,35 18 16,-35 0-1,-1 0-15,18 18 16,-17-18-16,0 0 0,-1 0 16,1 0-1,-18-18 32,0 0-31,0 1-1,0-18 1,0 17-16,0-17 16,0 17-16,0 0 47,0 36-32,18-18 1,-18 18-16,17-18 15,1 17 1,0-17 0,-1 0-1,1-17-15,-1-1 16,1 18 0,-18-18-16,0 1 15,0-1 16,-18 18-15,1 0 0,-1 0-1,1 0 1,-1 0-16,0 0 0,-17 0 16,17 18-16,-17-1 15,17-17-15,1 0 0,-1 18 16,1-18-1,17 18-15,-18-18 16,18-18 0,18 18-16,-18-18 15,17 1-15,1-1 16,-1-17-16,-17 17 16,0 0-1,18 18-15,-18-17 16,-18 17-1,1 17 1,-1 1-16,-35 0 16,18-18-16,-36 17 15,36 1-15,-35 0 16,34-1-16,-17-17 16,36 18-16,-1-18 15,0 0 63,1 0-78,-1-18 16,-35 1-16,36 17 16,-36 0-16,17 0 15,1 0 1,18 0-16,-19 17 15,19-17 17,17-17-17,-18-1-15,-17 0 16,17 1-16,-17-1 16,17 18-16,0 0 15,18-18-15,-17 1 0,17-1 16,17 1-1,1-1 1,-18 0 0,18 18-16,-36 0 15,18 18 17,18 17-17,17 0-15,-17 1 16,35-1-16,-18-17 15,18 17-15,-36-35 16,1 0-16,0 18 16,-18-36 15,-18 18-31,0-18 16,18 1-16,0-19 15,-17 36-15,17-35 16,17 35-16,1-18 15,0 18 1,-1 0-16,1 0 16,0-17-16,-18-1 31,0 1-15,0-1 15,17 18 0,1 18-15,0-18-16</inkml:trace>
 </inkml:ink>
@@ -2212,7 +2212,7 @@
     </inkml:brush>
   </inkml:definitions>
   <inkml:trace contextRef="#ctx0" brushRef="#br0">2275 2752 0,'0'-18'16,"0"0"15,0 36-15,18 17 0,-18 1-16,18 87 15,-18-70-15,17 88 16,-17-88-16,18 18 15,0 17-15,-18-35 16,0-18-16,17 0 16,-17 1-16,18-19 15</inkml:trace>
-  <inkml:trace contextRef="#ctx0" brushRef="#br0" timeOffset="644.931">3069 3369 0,'0'0'0,"0"18"0,35-18 16,-17 0-16,35 0 15,-35-18-15,52-35 16,-52 18-16,-1 0 16,1-1-16,-18-34 15,0 52-15,-18-17 16,1 17-16,-18 1 0,-18 17 16,17 0-16,19 17 15,-36 18-15,35 1 16,1 17-1,17-18-15,35 35 16,0-52-16,0 0 0,54-1 16,-37-17-16,1 0 15,0 0-15,36 0 16,-54-17-16,18-1 16</inkml:trace>
+  <inkml:trace contextRef="#ctx0" brushRef="#br0" timeOffset="644.9309">3069 3369 0,'0'0'0,"0"18"0,35-18 16,-17 0-16,35 0 15,-35-18-15,52-35 16,-52 18-16,-1 0 16,1-1-16,-18-34 15,0 52-15,-18-17 16,1 17-16,-18 1 0,-18 17 16,17 0-16,19 17 15,-36 18-15,35 1 16,1 17-1,17-18-15,35 35 16,0-52-16,0 0 0,54-1 16,-37-17-16,1 0 15,0 0-15,36 0 16,-54-17-16,18-1 16</inkml:trace>
   <inkml:trace contextRef="#ctx0" brushRef="#br0" timeOffset="990.1182">3598 3193 0,'0'0'16,"0"17"-16,18 71 15,0 36-15,17-1 16,-17-70-16,-1 53 16,1-71-16,-18 1 15,17-1-15,-17-17 16,-17-36-1,17-17-15,-18-1 16,1-69-16,17 52 16,-18-88-16,0 70 15,18 0-15,0 19 0,0-19 16,36 53 0,-19 18-16,18 0 15,1 18-15,-36 0 16,17 17-16,-17-17 0,0 17 15,0-18-15,-17 19 16,-1-19-16,0 1 16,1-36-1</inkml:trace>
   <inkml:trace contextRef="#ctx0" brushRef="#br0" timeOffset="1240.109">3898 3210 0,'0'53'16,"0"-106"-16,0 124 0,0-36 16,0-17-16,18 17 15,-1-17-15,19-18 16,-1 0-16,0-36 16,-17 19-16,0-19 15,-18 19-15,0-18 16,-18-1-16,0 19 15,1 17-15,-1 0 0,-17 0 16,17 0 0,18 17-16,-18-17 0,18 18 15,18 0-15</inkml:trace>
   <inkml:trace contextRef="#ctx0" brushRef="#br0" timeOffset="1485.3497">4233 3193 0,'-17'0'16,"-1"17"-16,0-17 0,1 36 15,17-19-15,0 1 0,35 17 16,0 0 0,1-17-16,-1-18 15,35-18-15,-52 18 16,17-35-16,1 17 0,-19-17 15,1 0-15,-18 0 16,18-18-16,-18 17 0,0-16 16,0-1-16,-18 0 0,18 0 15</inkml:trace>
@@ -2246,10 +2246,10 @@
   <inkml:trace contextRef="#ctx0" brushRef="#br0" timeOffset="16037.8877">22419 1729 0,'0'0'0,"-18"0"15,1 17-15,-1 1 16,18 17 0,0-17-1,18-1-15,-1 1 16,1-18-16,17 18 16,-17-1-1,-18 1 1,-18-18-16,18 18 0,-17-18 15,-1 17-15,0 1 32,18 0-32,0-1 15,18 1 1,0-1 0,-1-17-16,1 18 15</inkml:trace>
   <inkml:trace contextRef="#ctx0" brushRef="#br0" timeOffset="16372.3736">22595 1834 0,'18'0'15,"0"-17"1,-1 17-16,1 0 16,-18 17-1,0 1-15,0 0 0,-18 17 16,1-17-16,17 17 15,-18-35 1,18 18-16,18-18 16,-1 0-1,1 0-15,0-18 16</inkml:trace>
   <inkml:trace contextRef="#ctx0" brushRef="#br0" timeOffset="16767.5297">22754 1782 0,'18'0'15,"-1"0"1,1 0 0,-18 17 15,0 1 0,0-1-15,0 1-1,0 0 17,18-18-17,-18 17 1,17-17-1,-17 18 1,0 0 0,-17-18-1,17 17 1</inkml:trace>
-  <inkml:trace contextRef="#ctx0" brushRef="#br0" timeOffset="17144.8794">23001 1693 0,'0'0'16,"18"0"-16,-18 18 47,0 35-47,0-35 16,17 17-16,1 18 0,-18-18 15,18 0-15,-1 1 0,19 52 16,-19-53-1,19 36-15,-19-36 16,1 0-16,-18-17 16,17-18-1,-17 17-15</inkml:trace>
+  <inkml:trace contextRef="#ctx0" brushRef="#br0" timeOffset="17144.8793">23001 1693 0,'0'0'16,"18"0"-16,-18 18 47,0 35-47,0-35 16,17 17-16,1 18 0,-18-18 15,18 0-15,-1 1 0,19 52 16,-19-53-1,19 36-15,-19-36 16,1 0-16,-18-17 16,17-18-1,-17 17-15</inkml:trace>
   <inkml:trace contextRef="#ctx0" brushRef="#br0" timeOffset="17872.7436">24130 2064 0,'18'0'16,"-1"-18"0,1 18-16,0 0 15,-1 0-15,18 0 0</inkml:trace>
   <inkml:trace contextRef="#ctx0" brushRef="#br0" timeOffset="18017.6368">24730 2081 0,'17'0'15,"1"0"-15,0 0 16,-1 0-16,19 0 0,-19 0 16</inkml:trace>
-  <inkml:trace contextRef="#ctx0" brushRef="#br0" timeOffset="18156.8593">25188 2081 0,'18'-17'16,"0"17"-16,-1-18 16,1 18-16</inkml:trace>
+  <inkml:trace contextRef="#ctx0" brushRef="#br0" timeOffset="18156.8592">25188 2081 0,'18'-17'16,"0"17"-16,-1-18 16,1 18-16</inkml:trace>
   <inkml:trace contextRef="#ctx0" brushRef="#br0" timeOffset="18257.968">25435 2081 0,'18'-17'0,"0"-1"16</inkml:trace>
   <inkml:trace contextRef="#ctx0" brushRef="#br0" timeOffset="20993.0141">18962 3210 0,'17'0'15,"1"0"1,0 0-1,-1 0 1,1 0-16,35 0 16,-18-17-16,36 17 15,-36-18-15,18 18 0,18 0 16,-19 0-16,1 0 16,-17 0-16,17 18 0,70-18 15,-70 17-15,88 1 16,-70-18-16,70 0 15,-53 0 1,106-18-16,-106 18 16,124-17-16,-106-1 15,17 18-15,1-18 0,-1 1 16,1 17-16,158-36 16,-141 19-16,106-18 15,-124 17-15,1 0 16,105-17-16,-105 17 15,-19 1-15,19-1 16,-1 0-16,-17 18 0,106-35 16,-124 35-16,106-17 15,-106 17-15,89 0 16,-72-18-16,107 18 16,-106 0-16,141 0 15,-106 0-15,141 18 16,-141-18-1,124 0-15,-124 0 16,124 0-16,-142 0 16,106 0-16,-105 0 15,-18 0-15,0 0 0,70 0 16,-70 0 0,88 17-16,-106-17 15,124 18-15,-124-18 16,18 17-16,-18-17 15,18 0-15,-18 18 0,88-18 16,-105 18-16,88-1 16,-89-17-16,89 36 15,-106-36-15,88 17 16,-88-17-16,53 0 16,-53 0-16,35 0 15,-53 0 1,0-17-16,-17 17 15,0-18-15,-1 0 16,-17 1-16,0-1 16</inkml:trace>
   <inkml:trace contextRef="#ctx0" brushRef="#br0" timeOffset="21277.7401">28646 2769 0,'0'0'0,"35"0"0,35 18 16,1 0-16,0-1 16,-1 1-1,-52 0-15,35-1 16,-36 1-16,1 17 15,0-17-15,-36-1 16,0 19 0,1-19-16,17 1 0,-18 35 15,0-18 1,1 0-16,17 1 16,-18-19-1</inkml:trace>
@@ -2260,7 +2260,7 @@
   <inkml:trace contextRef="#ctx0" brushRef="#br0" timeOffset="24291.7712">31415 2681 0,'0'124'0,"0"-248"0,18 301 16,-1-72-16,1-69 16,-1-1-16,1 0 15,-18 0-15,18-17 16</inkml:trace>
   <inkml:trace contextRef="#ctx0" brushRef="#br0" timeOffset="25797.6927">19191 3757 0,'0'0'0,"-18"-18"0,1 18 16,-1 0-1,36 0 16,-18 18-31,17-18 16,19 0-16,-1 0 16,0 18-16,71-18 15,-53-18-15,88 0 16,-53 18-16,124-17 16,-106-1-16,158-17 15,-140 35-15,158-18 16,-123 1-16,141-1 15,-141 0-15,193 1 16,-158 17-16,177-18 16,-177 18-1,194-35-15,-194 35 16,-18-18-16,230-17 16,-212 17-16,0 18 0,-18-17 15,-17 17-15,0 0 0,-18 0 16,124 0-16,-142 0 15,89 17 1,-106 1-16,70 0 16,-70-18-16,70 0 15,-70 0-15,70-18 16,-87 18-16,105 0 16,-106 0-16,88 0 15,-88 18-15,142-18 16,-107 17-16,142 1 15,-142-1-15,107-17 16,-142 18-16,18-18 16,52 18-1,-70-1-15,-17-17 0,0 18 16,34-18-16,-52 0 16,18 18-16,-36-18 15,53 17-15,-52 1 16,34 0-1,-17-1-15,18 18 16,-36-35-16,36 18 16,-36-18-16,18 0 15,-36-18-15,19 1 16,-19 17-16,1-18 16,0 18-1,-18-17-15</inkml:trace>
   <inkml:trace contextRef="#ctx0" brushRef="#br0" timeOffset="26048.9198">28716 3404 0,'53'18'16,"-18"0"-16,36-1 15,-36 1 1,53 17-16,-35-17 15,0 35-15,-35-36 16,-18 1-16,0 17 16,-18 1-16,-52 16 15,34-16-15,-34 34 16,35-34-16,17-19 16,-17 54-16,17-54 15,0 19-15</inkml:trace>
-  <inkml:trace contextRef="#ctx0" brushRef="#br0" timeOffset="26678.1591">29510 3845 0,'18'0'15,"17"18"1,0-18-16,0-18 16,18 1-16,-17-1 0,16-17 15,-34 17-15,-18-35 16,-18 36-16,-34-1 15,16 18-15,-52 35 16,70-17-16,-17 35 16,35-36-1,18 36-15,17-35 16,53 17-16,-35-17 16,35-18-16,-35 0 15,-17 0-15,-1-18 16</inkml:trace>
+  <inkml:trace contextRef="#ctx0" brushRef="#br0" timeOffset="26678.159">29510 3845 0,'18'0'15,"17"18"1,0-18-16,0-18 16,18 1-16,-17-1 0,16-17 15,-34 17-15,-18-35 16,-18 36-16,-34-1 15,16 18-15,-52 35 16,70-17-16,-17 35 16,35-36-1,18 36-15,17-35 16,53 17-16,-35-17 16,35-18-16,-35 0 15,-17 0-15,-1-18 16</inkml:trace>
   <inkml:trace contextRef="#ctx0" brushRef="#br0" timeOffset="26983.7665">30004 4145 0,'0'0'16,"17"106"-16,1-53 0,0-35 15,-18 17-15,17-18 0,1-17 16,-18-17-16,0-36 15,-18 18-15,18-1 16,-17-17-16,17 1 0,0-72 16,0 53-1,35-52-15,-17 88 16,17-1-16,-17 19 0,17 17 16,18 0-16,-36 17 15,1 19 1,-18-19-16,-18 36 15,1-17-15,-36-1 16,35-35-16,1 17 16,-1-17-16</inkml:trace>
   <inkml:trace contextRef="#ctx0" brushRef="#br0" timeOffset="27251.0604">30374 3810 0,'0'0'0,"-17"18"0,17-1 16,0 1-16,0 0 15,17-18-15,1 17 16,35-17-16,-18 0 16,-17 0-16,-1 0 15,1-17-15,0 17 0,-18-36 16,-36 19-1,19-1-15,-1 18 0,-35-18 16,35 18-16,1 0 16,-1 0-16,1 18 15,-1-18-15,36 18 16</inkml:trace>
   <inkml:trace contextRef="#ctx0" brushRef="#br0" timeOffset="27738.1682">30727 3828 0,'-18'17'16,"36"-34"-16,-53 52 0,35-17 0,17-1 15,19 1 1,-19-1-16,36-17 15,-18 0-15,-17 0 16,17-35-16,-17 18 16,-18-36-1,-18 17-15,18 1 0,0-18 16,-17 18-16,17 0 16,0 17-16,0 0 0,-18 1 15,18 34 1,18 36-1,-1-17-15,-17-1 0,18 18 16,0-18-16,-18 0 0,17 1 16,1 16-16,0-34 15,-18 0-15,17-18 16,1 0 0,-18-18-16,17 18 0,1-18 15,0 1-15,17 17 16,-17 0-16,17 0 15,-17 0-15,-1 17 16,-17 1 0,18-18-16,-18 18 15</inkml:trace>
@@ -2276,47 +2276,47 @@
   <inkml:trace contextRef="#ctx0" brushRef="#br0" timeOffset="38322.096">5980 5345 0,'0'0'0,"17"0"47,1 0-31,0 0-16,34 0 15,-16 0-15,17 0 16,0 0-16,-1 0 0,107-18 15,-71 18-15,124-35 16,-106 35 0,158-18-16,-122 0 15,16 18-15,160-17 16,-142 17-16,-17 0 16,17 0-16,18 0 0,177 17 15,-160 1-15,-16-18 16,210 18-16,-193-18 15,194 17-15,-195-17 16,195 18-16,-194-18 16,193 18-16,-211-18 15,159 17 1,-177-17-16,-17 0 16,0 0-16,-36 18 0,1-18 0,-36 0 15,71 18 1,-106-18-16,-18 17 0,-17-17 15,-18 18-15,-18-18 0</inkml:trace>
   <inkml:trace contextRef="#ctx0" brushRef="#br0" timeOffset="39122.1726">6720 5803 0,'0'18'15,"18"-1"-15,-18 1 0,18 17 16,-1 18-16,1 36 16,0-37-16,-18 37 15,0-36-15,0 17 16,0-35-16,0 36 15,17-53-15,-17 17 16,0-18-16,18 1 16,0 0-1,-1-18-15</inkml:trace>
   <inkml:trace contextRef="#ctx0" brushRef="#br0" timeOffset="39399.5133">7267 6262 0,'0'0'15,"36"0"-15,-1 0 0,0 0 0,36-18 16,-36 18-1,0 0-15,53-17 16,-52-1-16,-1 18 0,-17-18 16,17 18-16,-18-17 15,1 17-15,-36 0 16,1 0-16,-18 0 16</inkml:trace>
-  <inkml:trace contextRef="#ctx0" brushRef="#br0" timeOffset="39584.631">7497 6015 0,'17'70'15,"-34"-140"-15,34 176 0,-17-36 16,18-34-16,-18 16 0,0-16 15,0-1-15,17 53 16,-17-53-16</inkml:trace>
+  <inkml:trace contextRef="#ctx0" brushRef="#br0" timeOffset="39584.6309">7497 6015 0,'17'70'15,"-34"-140"-15,34 176 0,-17-36 16,18-34-16,-18 16 0,0-16 15,0-1-15,17 53 16,-17-53-16</inkml:trace>
   <inkml:trace contextRef="#ctx0" brushRef="#br0" timeOffset="41336.9521">8661 6191 0,'-36'-17'16,"72"34"-16,-107-34 16,54 17-16,-1 0 0,-17 17 0,17 1 15,-17 52 1,17-34-16,18 34 15,0-52-15,35 35 16,-17-36-16,0 1 0,35 0 16,-18-18-16,18-18 15,-18 0-15,0-17 16,-35 18 0,0-36-16,0 17 15,0-34-15,-17 17 16,-19-35-16,19 35 15,-19-71 1,19 89-16,-18-36 16,17 71-16,18 18 15,0 0-15,0 70 16,18-35-16,34 70 16,-34-70-16,35 53 15,-18-53-15,18 18 16,-18-54-16,18 36 15,-17-53-15,-19 18 16,1-18-16</inkml:trace>
-  <inkml:trace contextRef="#ctx0" brushRef="#br0" timeOffset="41676.2946">8961 6403 0,'0'0'0,"17"0"16,1 0 0,17-18-16,-17 1 15,-1-1-15,1 0 0,-18-17 16,0 17 0,-18-17-1,1 35-15,-19 0 16,19 0-16,-18 0 0,-1 0 15,19 18-15,17-1 16,0 1 0,0 0-16,35 17 15,0-17-15,-17-18 0,-1 17 16,19-17-16,-19 18 16,36-18-16,-35 0 15,0 18 1,-1-18-16</inkml:trace>
-  <inkml:trace contextRef="#ctx0" brushRef="#br0" timeOffset="42102.0206">9331 6209 0,'-18'0'0,"1"0"15,17 18 1,-18-1 0,18 18-16,0-17 0,0 0 15,18-1-15,-18 1 16,0 0-16,17-1 0,19 19 15,-19-36-15,1 17 0,35-17 16,-36 0-16,1 0 16,0-17-16</inkml:trace>
+  <inkml:trace contextRef="#ctx0" brushRef="#br0" timeOffset="41676.2945">8961 6403 0,'0'0'0,"17"0"16,1 0 0,17-18-16,-17 1 15,-1-1-15,1 0 0,-18-17 16,0 17 0,-18-17-1,1 35-15,-19 0 16,19 0-16,-18 0 0,-1 0 15,19 18-15,17-1 16,0 1 0,0 0-16,35 17 15,0-17-15,-17-18 0,-1 17 16,19-17-16,-19 18 16,36-18-16,-35 0 15,0 18 1,-1-18-16</inkml:trace>
+  <inkml:trace contextRef="#ctx0" brushRef="#br0" timeOffset="42102.0205">9331 6209 0,'-18'0'0,"1"0"15,17 18 1,-18-1 0,18 18-16,0-17 0,0 0 15,18-1-15,-18 1 16,0 0-16,17-1 0,19 19 15,-19-36-15,1 17 0,35-17 16,-36 0-16,1 0 16,0-17-16</inkml:trace>
   <inkml:trace contextRef="#ctx0" brushRef="#br0" timeOffset="42959.9456">9666 6227 0,'-35'0'0,"70"0"0,-70 17 15,17-17-15,1 18 0,-1-1 16,0 19-16,18-1 16,0 0-1,18-17-15,-18 0 0,35-1 16,-17-17-16,17 0 15,-17 0-15,-1-17 16,1 17-16,-18-36 16,18 19-1,-18-19 1,0 19-16,0-19 0,0 1 16,0 18-16,0-1 15,-18 18-15,0 0 16,18 35-1,0 0 1,18 18 0,-18-35-16,18 17 15,-1-17-15,1 0 0,17-1 16,-17-17-16,17 18 16,-17-36-1,-1 18-15,-17-17 16,0-1-16,0 0 15,0-17-15,0 17 16,0 1 0,18 17 15,-18 17-15,0 1-16,18-18 15,-1 0-15,1 0 16,0 0 15,-1-18-31,1 1 16,-18-1-1,0 36 17,18 17-17,-1-17-15,-17 17 0,18-17 16,-18 17-16,35 18 15,-35-18-15,0 0 16,18 1-16,-18-1 0,0-17 16,-18 17-16,18-18 0,-18 1 15,-17 17-15,18-35 16,-36 18-16,35-18 16,-17-18-1,17 1-15,0-19 16,1 19-16,17-18 15,0 17-15,17-17 16,1 35-16</inkml:trace>
   <inkml:trace contextRef="#ctx0" brushRef="#br0" timeOffset="43131.9175">10319 6421 0,'35'17'16,"-70"-34"-16,88 34 0,-36-17 0,1 0 15,0 0-15,-18-17 16,17 17-16</inkml:trace>
   <inkml:trace contextRef="#ctx0" brushRef="#br0" timeOffset="43733.0608">10601 6438 0,'0'0'0,"0"18"0,0-1 15,0-34 16,0-18-15,0 17-16,-18 0 16,18-17-16,0 17 15,0 1-15,0-1 16,18 18 0,17 0-16,-17 0 15,35 0 1,-36 0-16,36-18 15,-35 18-15,0 0 16,-18 18 0,-36 0-1,19-1 1,-1 36-16,18-35 16,0 17-16,0-17 0,0-1 15,18 1-15,-1-18 0,19 0 16,-19 0-16,19-18 15,-19 1-15,1-1 16,-1-17 0,-17 0-1,-17 17 1,17 0-16,-18 18 0,18-17 16,18 34 15,-1 1-31,-17 0 15,18-18-15,-18 17 0,18 1 16,-1-18-16,-17 18 16,18-18-16</inkml:trace>
   <inkml:trace contextRef="#ctx0" brushRef="#br0" timeOffset="43916.0849">10989 6279 0,'0'0'16,"35"0"-16,-17 0 16,0 0-16,-1 0 0,1 0 15,17 0-15,-17 0 16,-1-17-16,-17-1 16,-17 1-1,17-1-15</inkml:trace>
   <inkml:trace contextRef="#ctx0" brushRef="#br0" timeOffset="44113.4272">11077 6085 0,'0'0'15,"0"89"-15,0-54 0,0 18 16,0-18-16,0 0 0,18 18 0,-18-35 15,35 52 1,-35-52-16,18 0 0,-18-1 16,17-17-1</inkml:trace>
-  <inkml:trace contextRef="#ctx0" brushRef="#br0" timeOffset="44417.7966">11218 6456 0,'0'0'16,"18"0"-16,0-18 0,-1 18 16,19-35-1,-19 35-15,1-35 16,-18 17-16,-18 0 16,1 18-16,-36 0 15,35 0-15,-17 0 0,-1 36 16,19-1-16,17 18 15,17-18 1,36 18-16,0-35 16,35-1-16,-35 1 15,36-18-15,-54-18 16,35 1-16,-52-1 16,0 0-1,-36 1-15</inkml:trace>
+  <inkml:trace contextRef="#ctx0" brushRef="#br0" timeOffset="44417.7965">11218 6456 0,'0'0'16,"18"0"-16,0-18 0,-1 18 16,19-35-1,-19 35-15,1-35 16,-18 17-16,-18 0 16,1 18-16,-36 0 15,35 0-15,-17 0 0,-1 36 16,19-1-16,17 18 15,17-18 1,36 18-16,0-35 16,35-1-16,-35 1 15,36-18-15,-54-18 16,35 1-16,-52-1 16,0 0-1,-36 1-15</inkml:trace>
   <inkml:trace contextRef="#ctx0" brushRef="#br0" timeOffset="45095.8425">11959 6227 0,'18'0'31,"17"0"-31,0 0 16,36 0-16,-36 0 15,53-18 1,-17 0-16,-53 18 15,17 0-15,-35-17 16</inkml:trace>
   <inkml:trace contextRef="#ctx0" brushRef="#br0" timeOffset="45251.5065">12259 6085 0,'-18'18'0,"1"17"16,-1-17-16,-17 53 15,17-36-15,-17 35 16,17-52 0,18 17-16,-17-35 0,17 18 15</inkml:trace>
   <inkml:trace contextRef="#ctx0" brushRef="#br0" timeOffset="45428.5988">12047 6085 0,'18'36'0,"0"-1"15,-18-17-15,17 17 0,1 0 16,17 36-16,0-36 16,1 0-1,-19 1-15,19-19 16,-19 1-16</inkml:trace>
   <inkml:trace contextRef="#ctx0" brushRef="#br0" timeOffset="46019.096">12594 6315 0,'0'0'0,"-17"0"0,34 0 31,1 17-16,17-17-15,-17 0 16,35-17-16,-36 17 16,19-36-16,-36 19 15,0-18 1,-18 17-16,-17 0 16,17 18-1,-35 0-15,53 18 16,-35 0-16,35 17 15,0-18-15,0 1 16,17 17-16,19 18 16,-19-35-16,54 0 15,-53-1-15,17-17 0,0 0 16,0 0-16,-17-17 16</inkml:trace>
   <inkml:trace contextRef="#ctx0" brushRef="#br0" timeOffset="46351.496">12929 6473 0,'0'0'16,"18"106"-16,0-53 0,-1 53 15,1-53-15,0-18 16,-18-17-16,17 0 0,-34-36 31,17 0-31,-36-52 16,19 34-16,-19-52 15,19 35-15,17 0 0,0-52 16,17-1 0,1 70-16,35-16 15,-35 52-15,34 0 16,-16 0-16,-19 17 16,-17 1-16,-17 35 15,-1-36 1,-17 19-16,0-36 15,-1 17-15,36 1 16,-17-18-16</inkml:trace>
-  <inkml:trace contextRef="#ctx0" brushRef="#br0" timeOffset="46659.6249">13229 6279 0,'0'0'0,"-17"0"15,-1 18-15,18 0 16,18 17 0,-18-17-16,17-1 0,1-17 15,17 18-15,-17-18 0,17 0 16,-17 0-16,17-18 15,-17 1-15,-18-1 16,-18 0-16,0-17 16,1 17-16,-1 18 15,0-17-15,1 17 16,-1 0-16,0 0 0,1 17 16,34 1-1</inkml:trace>
-  <inkml:trace contextRef="#ctx0" brushRef="#br0" timeOffset="47174.6908">13476 6297 0,'0'0'0,"-18"0"16,18 18-16,0 17 15,0-17 1,18-1-16,17 1 15,-17 0-15,17-18 16,-17 0-16,0-18 16,-1 18-16,1-18 0,0 1 15,-18-1-15,17-35 16,-17 18-16,0-18 16,0 18-16,-17-1 15,17 1-15,-18 0 0,0-53 16,18 52-16,-17 1 15,17 53 1,17 52 0,-17-17-16,18 0 15,-18 18-15,18-18 0,-18-1 0,17-16 16,1 52 0,-18-70-16,17-1 0,-17 1 15,18-36 1,0 1-1,-18-1-15,17 0 16,1 1-16,0 17 16,-1 17-1,-17 1-15,0 0 16,18-1-16,-18 1 0,18-1 16,-1 1-1,1-18-15,-1 0 16</inkml:trace>
+  <inkml:trace contextRef="#ctx0" brushRef="#br0" timeOffset="46659.6248">13229 6279 0,'0'0'0,"-17"0"15,-1 18-15,18 0 16,18 17 0,-18-17-16,17-1 0,1-17 15,17 18-15,-17-18 0,17 0 16,-17 0-16,17-18 15,-17 1-15,-18-1 16,-18 0-16,0-17 16,1 17-16,-1 18 15,0-17-15,1 17 16,-1 0-16,0 0 0,1 17 16,34 1-1</inkml:trace>
+  <inkml:trace contextRef="#ctx0" brushRef="#br0" timeOffset="47174.6907">13476 6297 0,'0'0'0,"-18"0"16,18 18-16,0 17 15,0-17 1,18-1-16,17 1 15,-17 0-15,17-18 16,-17 0-16,0-18 16,-1 18-16,1-18 0,0 1 15,-18-1-15,17-35 16,-17 18-16,0-18 16,0 18-16,-17-1 15,17 1-15,-18 0 0,0-53 16,18 52-16,-17 1 15,17 53 1,17 52 0,-17-17-16,18 0 15,-18 18-15,18-18 0,-18-1 0,17-16 16,1 52 0,-18-70-16,17-1 0,-17 1 15,18-36 1,0 1-1,-18-1-15,17 0 16,1 1-16,0 17 16,-1 17-1,-17 1-15,0 0 16,18-1-16,-18 1 0,18-1 16,-1 1-1,1-18-15,-1 0 16</inkml:trace>
   <inkml:trace contextRef="#ctx0" brushRef="#br0" timeOffset="47333.2322">14041 6385 0,'52'0'16,"-34"0"-16,0 0 0,-1 0 15,1-17-15,0 17 0</inkml:trace>
   <inkml:trace contextRef="#ctx0" brushRef="#br0" timeOffset="47919.7685">14323 6279 0,'17'0'16,"1"36"-16,-18-19 15,0 36-15,18-35 16,-18 0-16,0-1 16,0 1-1,0-36 1,0 1-16,0-36 16,17 35-1,1-35-15,0 35 16,-1 1-16,1-1 15,0 18-15,-18 18 16,17-1-16,-17 36 16,18-35-1,-18 17-15,0-17 16,0 17-16,0-17 16,17 17-16,1-35 15</inkml:trace>
-  <inkml:trace contextRef="#ctx0" brushRef="#br0" timeOffset="48615.2133">14640 6244 0,'0'0'0,"0"53"16,-17-35-16,17 52 15,17-34-15,19 16 16,-19-34-16,1 0 16,-1-1-16,1-17 15,0 18-15,-1-18 16,1-18-16,0 18 0,-1-35 16,1 0-16,0-18 15,-18 35-15,0-35 16,0 36-16,-18-19 15,18 19-15,0 34 32,0 19-32,0-1 15,18 18-15,-18-35 16,17-1-16,1 18 16,0-17-1,-1 0-15,1-18 0,-1-18 31,-17 0-31,0-17 16,0 18-16,18-1 16,-18 0-1,18 18 17,-1 0-17,-17-17 1,18 17-16,-18-18 15,18 18 1,-1 0 0,1 0-16,0 0 15,-1 0-15,1 0 0,-1 0 0,-17 18 16,18-18 0,0 0-16,-18 17 15,17-17-15,1 0 31,0 18-15,-1-18-16,19 18 16,-19-18-16,18 0 15</inkml:trace>
+  <inkml:trace contextRef="#ctx0" brushRef="#br0" timeOffset="48615.2132">14640 6244 0,'0'0'0,"0"53"16,-17-35-16,17 52 15,17-34-15,19 16 16,-19-34-16,1 0 16,-1-1-16,1-17 15,0 18-15,-1-18 16,1-18-16,0 18 0,-1-35 16,1 0-16,0-18 15,-18 35-15,0-35 16,0 36-16,-18-19 15,18 19-15,0 34 32,0 19-32,0-1 15,18 18-15,-18-35 16,17-1-16,1 18 16,0-17-1,-1 0-15,1-18 0,-1-18 31,-17 0-31,0-17 16,0 18-16,18-1 16,-18 0-1,18 18 17,-1 0-17,-17-17 1,18 17-16,-18-18 15,18 18 1,-1 0 0,1 0-16,0 0 15,-1 0-15,1 0 0,-1 0 0,-17 18 16,18-18 0,0 0-16,-18 17 15,17-17-15,1 0 31,0 18-15,-1-18-16,19 18 16,-19-18-16,18 0 15</inkml:trace>
   <inkml:trace contextRef="#ctx0" brushRef="#br0" timeOffset="49160.0106">13194 5415 0,'18'18'32,"-1"-18"-32,1 0 0,17 0 15,53 17-15,-17-17 16,105 0-16,-70 0 15,159 0 1,-107 0-16,178 0 16,-160 18-16,177-18 15,-177 0-15,-17 0 16,0-18-16,-36 18 0,36-35 16,-124 35-16,-17-17 15</inkml:trace>
   <inkml:trace contextRef="#ctx0" brushRef="#br0" timeOffset="50110.5196">15046 6350 0,'-18'18'47,"18"-1"-47,0 19 0,-17-1 16,17 35-16,-18-52 15,18 35-15,0-35 16,-18-18-16,18 17 15,0-34-15,18-1 16,0 0-16,-1-17 16,19-18-16,-19 18 15,1 0-15,17-1 16,-35 19-16,18 17 16,-18 17-16,0 19 15,0-1-15,0 0 16,0 0-16,0-17 0,17 35 15,1-35 1,0-18-16,-18-18 16,35-17-1,-17 17-15,-1 0 0,-17-17 16,18 17-16,0 1 0,-1-1 16,1 1-16,-1 17 15,-17 17-15,18-17 16,-18 35-1,18-17-15,-18 0 0,0-1 16,17 19-16,-17-19 16,18 1-1</inkml:trace>
-  <inkml:trace contextRef="#ctx0" brushRef="#br0" timeOffset="51401.7925">16792 5062 0,'-35'89'16,"17"-37"-16,-17 72 15,0-71-15,17 0 0,-35 35 16,36-53 0,-19 1-16,1-19 15,17-17-15,-35 0 16,36-17-16,-1-1 0,18 0 16,-17-17-16,17 17 0,0-17 15,35-18 1,-18 18-16,19 17 15,-1 18-15,18 18 16,0 35 0,-18-18-16,18 36 0,-35-36 15,-1 0-15,1 0 16,17-17-16,-17 35 16,0-35-16,-18-1 0</inkml:trace>
+  <inkml:trace contextRef="#ctx0" brushRef="#br0" timeOffset="51401.7924">16792 5062 0,'-35'89'16,"17"-37"-16,-17 72 15,0-71-15,17 0 0,-35 35 16,36-53 0,-19 1-16,1-19 15,17-17-15,-35 0 16,36-17-16,-1-1 0,18 0 16,-17-17-16,17 17 0,0-17 15,35-18 1,-18 18-16,19 17 15,-1 18-15,18 18 16,0 35 0,-18-18-16,18 36 0,-35-36 15,-1 0-15,1 0 16,17-17-16,-17 35 16,0-35-16,-18-1 0</inkml:trace>
   <inkml:trace contextRef="#ctx0" brushRef="#br0" timeOffset="51730.1493">17163 5609 0,'-18'0'16,"18"18"-16,-18-1 0,18 1 16,-17 0-16,17 17 15,17-17-15,-17-1 0,53 19 16,-35-36-16,35 0 16,-18 0-16,0-36 15,-35 19-15,18-36 16,-36 35-16,-35-35 15,18 36-15,0-1 16,-53 0 0,35 18-16,18 18 15</inkml:trace>
   <inkml:trace contextRef="#ctx0" brushRef="#br0" timeOffset="55572.7767">8590 6773 0,'18'0'62,"-1"0"-62,36-17 16,-35 17-16,53 0 15,-36 0-15,53-18 16,-53 18-16,89 0 16,-71 18-16,17-18 15,71 17 1,18 1-16,-53 0 15,0-1-15,0-17 0,-1 18 16,107 0-16,-88-18 16,105 0-1,-106 0-15,142-18 16,-142 0-16,19 18 0,-19-17 16,-17-1-16,70 0 15,-105 1-15,-18 17 16,-18 0-16,0 0 0,-17 0 15,-18 17-15</inkml:trace>
   <inkml:trace contextRef="#ctx0" brushRef="#br0" timeOffset="71555.7494">4604 9013 0,'17'-17'0</inkml:trace>
   <inkml:trace contextRef="#ctx0" brushRef="#br0" timeOffset="71866.1599">4480 8590 0,'0'0'15,"-35"71"-15,17-18 16,18 0-16,-17 17 0,-1 71 16,18-70-16,18-18 15,52 35 1,1-18-16,-18-52 0,35 17 15,-35-35 1,-18 18-16,0-18 0,-17-18 16,17 18-16,-35-17 0,18-19 15</inkml:trace>
   <inkml:trace contextRef="#ctx0" brushRef="#br0" timeOffset="72011.8474">4604 9102 0,'17'0'16,"19"0"-16,-19 0 0,19 0 0,-1 0 16,0 0-16,18-18 15,18 18-15,-54 0 16,1-18-16</inkml:trace>
-  <inkml:trace contextRef="#ctx0" brushRef="#br0" timeOffset="72139.4988">4498 8802 0,'35'-35'0,"0"17"15,1 0-15,70 1 16,-53-1-16,-1 18 16</inkml:trace>
+  <inkml:trace contextRef="#ctx0" brushRef="#br0" timeOffset="72139.4987">4498 8802 0,'35'-35'0,"0"17"15,1 0-15,70 1 16,-53-1-16,-1 18 16</inkml:trace>
   <inkml:trace contextRef="#ctx0" brushRef="#br0" timeOffset="72491.3586">5221 9437 0,'0'0'16,"18"141"-16,-1-106 0,-17 0 15,0 1-15,18-19 16,-36-34-1,18-19 1,0 1-16,0 0 0,0-71 16,0 53-16,0-70 15,18 70-15,0 0 16,17-18 0,-17 71-16,35-17 15,-36 34-15,-17 19 16,0-19-16,-35 54 15,17-54-15,1 19 0,-19-1 16,19-17 0,-1-18-16</inkml:trace>
   <inkml:trace contextRef="#ctx0" brushRef="#br0" timeOffset="72740.4211">5521 9208 0,'0'0'16,"0"35"-16,0-18 0,-18 1 16,36 17-16,-18-17 15,35 17-15,-17-35 16,17 0-16,-17 0 16,-1 0-16,19-35 15,-36 17-15,0-35 16,0 36-16,-53-18 15,35 17-15,1 18 16,-19 0-16,19 0 0,-1 0 16,0 0-16,36 18 15</inkml:trace>
   <inkml:trace contextRef="#ctx0" brushRef="#br0" timeOffset="72957.3556">5874 9190 0,'0'0'16,"-18"18"-16,0-1 0,1 1 0,17 17 15,0-17-15,35-1 16,0 1-16,-17-18 16,17 18-16,1-18 15,-19-18-15,36 0 16,-18 1-16,-17-1 0,0-35 15,-1 36 1,-17-19-16</inkml:trace>
   <inkml:trace contextRef="#ctx0" brushRef="#br0" timeOffset="73240.8579">6103 8749 0,'0'123'16,"0"-246"-16,0 317 0,0-53 15,18-70-15,-18-18 0,17 35 16,1-53-16,0-17 16,-1-1-16,1 1 15,35-36-15,-36 1 16,36-36 0,-35 35-16,17-17 15,-17 35-15,0 17 16,-18 36-1,0-35-15,17 17 16,-17-17-16,0 0 0,18-1 16</inkml:trace>
   <inkml:trace contextRef="#ctx0" brushRef="#br0" timeOffset="75793.1137">4480 10037 0,'-17'0'16,"34"0"15,1 0-16,17 0-15,-17 0 16,52 0 0,-34 0-16,34 0 15,18 0-15,-52 0 16,70 17-16,-36-17 16,71 18-16,-70-18 15,123 0 1,-88 0-16,123 17 15,-123-17-15,141 0 16,-106 0-16,123 0 16,-105 0-16,-18 0 15,18 0-15,-18 0 0,177 18 16,-160-18-16,178 0 16,-178 0-16,177 0 15,-176 18-15,18-18 16,-1 0-16,0 0 0,177 0 15,-159 0-15,177-18 16,-177 18-16,0 0 16,0 0-16,0 0 15,0 0-15,0 0 0,0 0 16,211 0-16,-211 0 16,195 0-16,-195 0 15,176 18 1,-176-18-16,-18 0 0,18 17 15,-17-17-15,-18 0 16,-1 18-16,1-18 0,141 18 16,-159-1-16,106 1 15,-141-18-15,-18 0 16,0 18-16,-17-18 0,52 0 16,-70 0-16,18-18 15,-54 0-15</inkml:trace>
   <inkml:trace contextRef="#ctx0" brushRef="#br0" timeOffset="76750.0098">8008 8467 0,'0'17'15,"0"36"1,0 18 0,0-18-16,0 88 0,0-88 15,0 105 1,0-69-16,0 122 15,-18-105-15,18 141 16,-17-106-16,17 141 16,0-140-16,0 16 15,0-17-15,0 18 0,0 176 16,0-176-16,0 194 16,0-159-16,0 159 15,17-159-15,1 158 16,0-175-16,-1 176 15,1-177 1,0 159-16,-18-158 16,17 158-16,1-177 15,-18 178-15,0-178 16,0 142 0,18-141-16,-18-18 0,0 0 15,0 0-15,0 106 16,17-141-16,-17 88 15,18-123-15,-18-1 16,0 1-16,0-18 0,0-18 16,17 18-16,-17-36 0,18 36 15,-18-35-15</inkml:trace>
-  <inkml:trace contextRef="#ctx0" brushRef="#br0" timeOffset="80503.7108">21308 7497 0,'17'70'16,"-17"-35"-16,-35 89 15,0-71-15,17 17 16,-52 54-16,34-89 15,-34 36 1,35-36-16,-18-17 0,17-18 16,1-18-1,17 0-15,1-35 16,17 18-16,17 0 16,1 0-16,0 17 0,52-17 15,-52 35-15,52 0 16,-34 0-16,-1 53 15,-17-18-15,-1 0 16,-17 0-16,18 1 0,-18-19 16,18 54-16,-1-54 15,-17 1-15,18 0 0,0-18 16</inkml:trace>
-  <inkml:trace contextRef="#ctx0" brushRef="#br0" timeOffset="80759.462">21467 8114 0,'-18'35'15,"36"-70"-15,-36 88 0,18-18 16,18-17-16,34-1 16,-34-17-16,0 0 15,17 0-15,-17-17 0,-1-1 16,1 0-16,-36-17 15,18 18-15,-53-36 16,36 35-16,-19 0 16,19 1-16,-1-1 0,-17 0 15,17 18-15,36 0 16</inkml:trace>
+  <inkml:trace contextRef="#ctx0" brushRef="#br0" timeOffset="80503.7107">21308 7497 0,'17'70'16,"-17"-35"-16,-35 89 15,0-71-15,17 17 16,-52 54-16,34-89 15,-34 36 1,35-36-16,-18-17 0,17-18 16,1-18-1,17 0-15,1-35 16,17 18-16,17 0 16,1 0-16,0 17 0,52-17 15,-52 35-15,52 0 16,-34 0-16,-1 53 15,-17-18-15,-1 0 16,-17 0-16,18 1 0,-18-19 16,18 54-16,-1-54 15,-17 1-15,18 0 0,0-18 16</inkml:trace>
+  <inkml:trace contextRef="#ctx0" brushRef="#br0" timeOffset="80759.4619">21467 8114 0,'-18'35'15,"36"-70"-15,-36 88 0,18-18 16,18-17-16,34-1 16,-34-17-16,0 0 15,17 0-15,-17-17 0,-1-1 16,1 0-16,-36-17 15,18 18-15,-53-36 16,36 35-16,-19 0 16,19 1-16,-1-1 0,-17 0 15,17 18-15,36 0 16</inkml:trace>
   <inkml:trace contextRef="#ctx0" brushRef="#br0" timeOffset="80971.0339">21925 7885 0,'35'0'16,"-70"0"-16,106-18 0,-36 18 0,36 0 15,-54 0-15,36 0 16,-35 0-16,-18 18 16</inkml:trace>
-  <inkml:trace contextRef="#ctx0" brushRef="#br0" timeOffset="81092.413">21996 8026 0,'0'0'16,"35"17"-16,-17 1 0,52-18 15,-35 0-15,36 0 16,-36 0 0</inkml:trace>
+  <inkml:trace contextRef="#ctx0" brushRef="#br0" timeOffset="81092.4129">21996 8026 0,'0'0'16,"35"17"-16,-17 1 0,52-18 15,-35 0-15,36 0 16,-36 0 0</inkml:trace>
   <inkml:trace contextRef="#ctx0" brushRef="#br0" timeOffset="81504.4613">22789 7796 0,'0'0'16,"-35"0"-16,18 18 0,-1 0 0,0 17 15,1-17-15,17 17 16,0 0-16,0 0 0,17 1 16,19 17-16,-1-36 15,35 1-15,-34-18 16,34-18-16,-35 18 16,-17-35-16,17-18 15,-35 35-15,0-52 16,-17 52-16,-1-17 15,-52 0-15,34 17 16,1 0-16,17 18 16,36 18-1,0 0 1</inkml:trace>
-  <inkml:trace contextRef="#ctx0" brushRef="#br0" timeOffset="81655.2369">23178 8061 0,'-18'0'15,"36"0"1,-1 0-16,1 0 16,-18-18-1</inkml:trace>
+  <inkml:trace contextRef="#ctx0" brushRef="#br0" timeOffset="81655.2368">23178 8061 0,'-18'0'15,"36"0"1,-1 0-16,1 0 16,-18-18-1</inkml:trace>
   <inkml:trace contextRef="#ctx0" brushRef="#br0" timeOffset="81949.2441">23336 7832 0,'0'0'0,"36"-18"0,-19 18 15,18 18-15,-35-1 16,36 19-16,-36-19 15,0 1-15,0 17 0,-18 0 16,18-17-16,-18 17 16,-17 1-16,35-19 15,0 1-15,0 0 16,18-1-16,-1-17 16,1 0-16,17 0 15,18 0-15,0 0 16,-35 0-16,-18 18 15,-18-18-15</inkml:trace>
   <inkml:trace contextRef="#ctx0" brushRef="#br0" timeOffset="82649.6748">20690 8943 0,'-52'18'15,"104"-36"-15,-140 71 0,53-18 16,17 0-16,18 1 0,-17 17 0,34 0 15,19-18-15,17-18 16,-1-17-16,37-17 16,-54-18-16,18-36 15,-36 36 1,1-71-16,-18 53 16,-35-53-16,17 53 15,1 0-15,-1 0 0,0 18 16,-17 17-16,17 1 15,18 52 1,-17 0-16,17 71 16,17-53-16,1 18 15,0-18-15,17-1 0,35 54 16,-34-70-16,52 17 16,-70-36-16</inkml:trace>
   <inkml:trace contextRef="#ctx0" brushRef="#br0" timeOffset="82950.0994">21043 9102 0,'0'0'15,"18"0"-15,-1 0 0,1 0 16,0-18-16,17 0 16,-17 18-16,17-35 15,-17 17 1,-18 1-16,0-1 0,-18 18 15,0-17-15,1-1 16,-19 18-16,1 0 0,-18 0 16,18 18-16,0 17 15,35-18-15,17 36 16,1-17-16,52 17 16,-34-36-16,52 19 15,-53-36-15,1 17 16,-1-17-16,0 0 0,0 0 15</inkml:trace>
@@ -2329,18 +2329,18 @@
   <inkml:trace contextRef="#ctx0" brushRef="#br0" timeOffset="85603.78">24500 8767 0,'0'0'0,"0"35"15,0 35 1,18-17-16,-18 53 16,0-53-16,0 53 15,18-53-15,-18 0 16,17-18-16,1 36 15,-18-54-15,0 18 16,-18-17 0,1-18-16</inkml:trace>
   <inkml:trace contextRef="#ctx0" brushRef="#br0" timeOffset="87327.5726">10672 8678 0,'17'18'16,"-34"-36"-16,52 71 0,-35-17 15,0 34-15,-18 1 0,1-1 0,-1 1 16,-53 88-16,18-107 16,-52 54-16,34-70 15,-70 16 1,88-52-16,-70 0 15,52-52-15,53 16 16,18-34-16,18 34 16,88 1-1,35 18-15,-71 17 16,89 17-16,-71 18 16,36 18-16,-54-17 15,36 17-15,-70-36 16,-19 1-16,1-1 15,-18 1-15,0 0 0,-18-18 16</inkml:trace>
   <inkml:trace contextRef="#ctx0" brushRef="#br0" timeOffset="87905.7977">5556 10442 0,'0'18'15,"-17"17"-15,17 0 16,0 71-16,0-35 16,0-1-16,17 71 15,-17-52-15,0-19 16,18-17-16,-18 0 0,35 53 16,-35-71-16,18 0 15</inkml:trace>
-  <inkml:trace contextRef="#ctx0" brushRef="#br0" timeOffset="97909.4679">9948 10654 0,'0'0'0,"-17"0"0,-19 0 16,1 0-16,18 0 0,-36 35 15,35 0-15,-35 36 16,35-36-16,18 53 16,0-35-16,36 18 15,-1-53-15,36 17 16,-19-17 0,54-18-16,-53-18 15,53-17-15,-71 17 16,-17-17-16,0-1 0,-1 1 15,-34-35-15,-1 34 16,-53-34 0,36 52-16,-53-17 15,53 17-15,-36 1 16,53 17-16,-17 35 16,35-18-16,18 1 15,-1 0-15</inkml:trace>
+  <inkml:trace contextRef="#ctx0" brushRef="#br0" timeOffset="97909.4678">9948 10654 0,'0'0'0,"-17"0"0,-19 0 16,1 0-16,18 0 0,-36 35 15,35 0-15,-35 36 16,35-36-16,18 53 16,0-35-16,36 18 15,-1-53-15,36 17 16,-19-17 0,54-18-16,-53-18 15,53-17-15,-71 17 16,-17-17-16,0-1 0,-1 1 15,-34-35-15,-1 34 16,-53-34 0,36 52-16,-53-17 15,53 17-15,-36 1 16,53 17-16,-17 35 16,35-18-16,18 1 15,-1 0-15</inkml:trace>
   <inkml:trace contextRef="#ctx0" brushRef="#br0" timeOffset="98116.8812">10583 10901 0,'18'0'16,"-18"17"-16,18-17 15,-18 18 1,17 0 0,1-1-1,0-17-15</inkml:trace>
   <inkml:trace contextRef="#ctx0" brushRef="#br0" timeOffset="98377.0588">11007 10583 0,'0'18'16,"0"0"-16,0-1 0,0 71 15,0-35-15,17-17 16,1 69-1,0-52-15,17 36 16,-17-36-16,-1 17 16,1-52-16,-1 17 15,-17-17-15,0 17 16</inkml:trace>
   <inkml:trace contextRef="#ctx0" brushRef="#br0" timeOffset="101212.0327">2910 6950 0,'0'17'0,"18"36"16,-18-35 0,0 17-16,0 0 0,0-17 15,18 35-15,-1-18 16,1 1-16,0-19 15,52 1-15,-35-18 16,54 18 0,-36-18-16,17 0 0,54 0 15,34 17 1,-69-17-16,-1 18 0,106-18 16,-71 0-16,107 17 15,-107-17-15,124 0 16,-106 0-1,124 18-15,-142-18 16,18 18-16,0-18 16,18 17-16,141 1 0,-159 0 15,177-1-15,-177 1 16,176 17 0,-158-35-16,-18 18 0,159 17 15,-159-17-15,0-1 16,0 1-16,0 0 0,124 17 15,-124-35-15,106 18 16,-124-1 0,107 1-16,-142-18 15,18 0-15,-36 17 0,1 1 16,52 17-16,-70-17 16,0 17-16,-35-17 15,-1 0-15,1 17 16,-18-17-16,18 17 15,-18-18-15,0 1 16,0 0-16,17-18 16,-17-18-1,0 0 1,18-17-16,0 0 16,-18 0-16,35-1 15,0 19-15,18-19 16,-35 19-16,17 17 15,0-18-15,1 0 0,52 1 16,-35 17 0,53-18-16,-54 18 15,90-17-15,-72-1 16,71 0-16,-70 18 16,17 0-16,-17 0 0,123 0 15,-106-17-15,106 17 16,-88 0-1,88 0-15,-88 0 16,-1 0-16,1 0 16,18-18-16,-19 18 0,125 0 15,-107 0-15,-17 0 16,0 0-16,17 0 16,-17 0-16,0 0 0,18 0 0,-19 0 15,125 0-15,-107 0 16,89 0-16,-89 0 15,89 0-15,-89-18 16,1 18-16,105-17 16,-105 17-16,-18 0 15,-1-18-15,-16 18 0,16 0 16,-16 0-16,16 0 0,-16 0 16,105 0-16,-106 0 15,88 0 1,-88 0-16,89-18 15,-89 18-15,106-17 16,-106-1-16,106 18 16,-106-17-16,89-19 15,-107 19-15,54-36 16,-54 17-16,36-34 16,-70 35-16,16-1 15,-16 1-15,-1-18 0,0-17 16,-17 17-16,-36-18 15,1 36-15,-72-18 16</inkml:trace>
   <inkml:trace contextRef="#ctx0" brushRef="#br0" timeOffset="105250.87">5345 12012 0,'-18'0'0,"36"0"0,-54 0 16,36-18-1,18 18-15,35 0 16,0-17-16,0 17 0,53 35 16,-54 0-16,1 1 15,-35-1-15,0 18 0,-1 0 16,-17 17-16,-17-17 16,-54 71-16,36-71 15,-53 35-15,52-35 16,-17 0-16,36-36 15,34 19-15,19-36 16,52 17-16,-18-17 16,54-17-1,-71 17-15,17 0 16</inkml:trace>
   <inkml:trace contextRef="#ctx0" brushRef="#br0" timeOffset="106747.145">9825 12136 0,'-18'-36'0,"36"72"0,-36-89 16,18 35-16,-17 18 16,-1 18-1,0 70-15,1 18 16,-1-53-16,18 70 15,18-70-15,17 35 16,-17-70-16,52 17 16,-17-35-16,35-35 15,-52 0 1,34-36-16,-52 36 16,-18-53-16,0 35 15,-53-18-15,18 53 16,-36-17-16,36 17 15,-1 18-15,19 0 16,-18 18-16,35 0 16,-18 17-16,18-17 0,35 35 15,0-36-15,1 1 16</inkml:trace>
-  <inkml:trace contextRef="#ctx0" brushRef="#br0" timeOffset="106879.4605">10407 12488 0,'0'0'0,"0"18"15</inkml:trace>
+  <inkml:trace contextRef="#ctx0" brushRef="#br0" timeOffset="106879.4604">10407 12488 0,'0'0'0,"0"18"15</inkml:trace>
   <inkml:trace contextRef="#ctx0" brushRef="#br0" timeOffset="107258.618">10866 12118 0,'0'0'15,"-18"18"-15,18-1 0,-35 1 0,-1 70 16,36-35-16,-17 53 16,17-53-16,17 35 15,1-53-15,17 0 16,1-17-16,-19 0 16,54-1-16,-36-17 15,0-17 1,-17-1-16,-18 0 0,0-34 15,-18 34-15,-35-35 16,18 53-16,0-18 16,-36 18-16,54 0 15,-1 0-15,0 18 16,36-18-16</inkml:trace>
   <inkml:trace contextRef="#ctx0" brushRef="#br0" timeOffset="107686.6149">11342 12171 0,'0'-18'16,"17"18"-1,1-17 1,17-1 0,-17 18-16,17 0 0,18-18 15,-35 1-15,35 17 16,-36 0-16,1 0 15,-18 17 1,0 19-16,18-1 16,-18 53-1,0-35-15,17 0 0,1-18 16,17 71-16,-17-71 16,35 18-16,-36-35 15,19 17-15</inkml:trace>
   <inkml:trace contextRef="#ctx0" brushRef="#br0" timeOffset="107820.7971">11536 12488 0,'0'0'15,"70"-17"-15,-34 17 0,17 0 16,35-18-16,-35 0 15,-18 18-15</inkml:trace>
   <inkml:trace contextRef="#ctx0" brushRef="#br0" timeOffset="110656.5009">5468 13406 0,'-18'0'16,"18"-18"0,18 18-16,-18-18 0,35 18 15,18-17-15,18-1 16,-18 18-16,-18 18 15,0-18-15,1 35 16,-19 0-16,-17-17 0,0 52 16,-17-52-1,17 35-15,0-35 16,0 35-16,17-18 16,18 35-16,1-34 15,34 17-15,-52-18 16,17 35-1,-35-52-15,-53 53 16,18-54-16,-88 36 16,-1-35-16,71-18 15,0 0-15,0 0 16,36 0-16,52-36 16,0 36-16,18-17 15</inkml:trace>
-  <inkml:trace contextRef="#ctx0" brushRef="#br0" timeOffset="111396.4638">9701 13529 0,'0'0'16,"-17"0"-16,-1 0 0,0 0 0,-17 35 15,18 1-15,-1 17 16,0 35 0,18-35-16,18-18 0,17 53 15,0-53-15,1-17 16,-1 0-16,18-1 0,35 1 16,-53-18-16,18-35 15,-17 17-15,-19-35 16,-17 35-1,-17-52-15,-1 52 16,-17-17-16,17 17 16,-17 1-16,0 17 0,17-18 0,0 18 15,1 0-15,17 18 16,53-1 0</inkml:trace>
+  <inkml:trace contextRef="#ctx0" brushRef="#br0" timeOffset="111396.4637">9701 13529 0,'0'0'16,"-17"0"-16,-1 0 0,0 0 0,-17 35 15,18 1-15,-1 17 16,0 35 0,18-35-16,18-18 0,17 53 15,0-53-15,1-17 16,-1 0-16,18-1 0,35 1 16,-53-18-16,18-35 15,-17 17-15,-19-35 16,-17 35-1,-17-52-15,-1 52 16,-17-17-16,17 17 16,-17 1-16,0 17 0,17-18 0,0 18 15,1 0-15,17 18 16,53-1 0</inkml:trace>
   <inkml:trace contextRef="#ctx0" brushRef="#br0" timeOffset="111536.0196">10389 13794 0,'0'17'16,"18"-17"0,0 0-1</inkml:trace>
   <inkml:trace contextRef="#ctx0" brushRef="#br0" timeOffset="111953.0741">10866 13547 0,'70'-36'0,"-140"72"0,175-89 16,-87 53-16,0-18 15,-36 18 1,-35 18 0,18-1-16,0 1 0,-18 17 15,35-17-15,0 35 16,18-35-16,18 34 16,17-16-16,18-1 15,-35-17 1,52 35-16,-52-36 15,35 18-15,-35-17 16,-1 17-16,1-35 16,-18 18-16,-18 0 15,1-18 1,17 17-16,-18-17 16,-17 18-16,-1 0 15,19-1-15,-19-17 16,-16 18-1,-37 17-15,36-35 16</inkml:trace>
   <inkml:trace contextRef="#ctx0" brushRef="#br0" timeOffset="112592.9563">5574 14764 0,'-18'0'16,"1"17"0,17 1-16,-18 0 0,0 70 15,1-35-15,17 35 16,0-35-16,35 17 16,0-34-1,36-1-15,-36-17 0,18-1 16,-18-17-16,1 0 15,52 0-15,-53-17 16,0-1-16</inkml:trace>
@@ -2362,7 +2362,7 @@
   <inkml:trace contextRef="#ctx0" brushRef="#br0" timeOffset="124215.7659">19844 13300 0,'-18'0'15,"36"0"32,-18 17 0,0 1-47,17-18 16,1 35-16,0-35 15,35 36 1,-36-19-16,36 18 16,-18-17-16,18 17 15,-17 1-15,17-1 16,-1-17-16,-16 17 16,17-17-16,0 17 0,52 18 15,-34-18-15,52 18 16,-70-18-16,71 0 15,-71 1-15,70-1 16,-52-17-16,35 17 16,-53-17-1,-1-1-15,19-17 0,-36 18 16,71-1-16,-71 1 16,18 0-16,-35-18 15,17 17-15,-17-17 16,-36 0 15,1 0-31</inkml:trace>
   <inkml:trace contextRef="#ctx0" brushRef="#br0" timeOffset="127706.6948">18927 5468 0,'0'0'0,"17"0"16,36 0-16,0 0 15,106 18-15,-71-18 16,124 17 0,-107 1-16,142 0 15,-123-18-15,88 0 16,-124 0-16,-18 0 15,-34 0-15,-19-18 0,-17 18 16</inkml:trace>
   <inkml:trace contextRef="#ctx0" brushRef="#br0" timeOffset="128012.3858">19456 5062 0,'-106'71'16,"212"-142"-16,-283 177 0,107-71 0,-89 36 15,88-18-15,19-18 16,-37 18-1,54 0-15,35-18 0,18 1 16,88 17 0,123 52-1,-159-69-15,107 34 16,-107-35-16,1 1 16</inkml:trace>
-  <inkml:trace contextRef="#ctx0" brushRef="#br0" timeOffset="148066.9264">16422 6050 0,'0'-17'0,"17"17"31,1 0-15,17 17-16,18-17 0,71 0 15,-71 0-15,17 0 16,18 0-16,71 18 16,-88-18-16,-1 0 0,54 0 15,-18 0 1,-89-18-16,1 18 15</inkml:trace>
+  <inkml:trace contextRef="#ctx0" brushRef="#br0" timeOffset="148066.9263">16422 6050 0,'0'-17'0,"17"17"31,1 0-15,17 17-16,18-17 0,71 0 15,-71 0-15,17 0 16,18 0-16,71 18 16,-88-18-16,-1 0 0,54 0 15,-18 0 1,-89-18-16,1 18 15</inkml:trace>
   <inkml:trace contextRef="#ctx0" brushRef="#br0" timeOffset="149467.8871">8537 6826 0,'0'0'0,"-17"0"15,-1 0-15,0 0 0,1 0 16,34 0 31,1 0-32,0 0 1,35 18 0,-36-18-16,54 18 15,-18-18-15,35 0 16,-35 0-16,70-18 15,-70 18-15,0 0 0,71 0 16,-54-18-16,54 18 16,-54 0-1,54 18-15,-54-18 16,1 0-16,-1 0 0,1 0 16,70 18-16,-88-18 15,88 17-15,-71 1 16,72-18-1,-72 0-15,71 0 16,-53 0-16,71 17 16,-88-17-16,17 0 15,-17 0-15,87 0 16,-87 0-16,52 0 16,-70 0-16,35-17 15,-70 17-15,17 0 16,-17 0-16,-18 17 15,-18 1 1,-35 0 0</inkml:trace>
 </inkml:ink>
 </file>
@@ -2392,17 +2392,17 @@
     </inkml:brush>
   </inkml:definitions>
   <inkml:trace contextRef="#ctx0" brushRef="#br0">5874 4251 0,'17'0'15,"1"18"1,-18-1-16,18 36 0,-1 53 15,1-35-15,-18-1 16,-35 107 0,17-89-16,-53 106 15,36-124-15,-71 71 16,71-88-16,-71 18 16,71-53-16,-36-1 15,36-34-15,-18-19 16,18 1-16,17-53 15,18 35-15,0-53 16,18 53-16,17 35 16,1-17-16,-19 18 0,54 17 15,-36 0-15,36 52 16,-36-16 0,0 52-16,18 0 15,-35-35-15,-1 18 16,-17-18-16,0-1 15,0-16-15,18-1 16,-18-17-16,0-1 16</inkml:trace>
-  <inkml:trace contextRef="#ctx0" brushRef="#br0" timeOffset="412.7916">6562 4886 0,'35'18'0,"-70"-36"0,105 36 16,1-18 0,-36-18-16,-17 18 0,17 0 0,0 0 15,-17 18 1,0-18-16,-18 17 0</inkml:trace>
+  <inkml:trace contextRef="#ctx0" brushRef="#br0" timeOffset="412.7915">6562 4886 0,'35'18'0,"-70"-36"0,105 36 16,1-18 0,-36-18-16,-17 18 0,17 0 0,0 0 15,-17 18 1,0-18-16,-18 17 0</inkml:trace>
   <inkml:trace contextRef="#ctx0" brushRef="#br0" timeOffset="540.1555">6632 5115 0,'0'0'15,"53"18"-15,-18 0 0,36-18 16,-36 0-16,-17 0 16</inkml:trace>
   <inkml:trace contextRef="#ctx0" brushRef="#br0" timeOffset="6001.6736">8678 4639 0,'0'-18'0,"0"1"16,-17 17-16,17-18 0,-36 18 16,19 0-16,-36 53 15,18-18-15,-1 54 16,19-19-16,-1 36 16,18-53-1,35 53-15,-17-71 0,53 35 16,-19-52-1,37 0-15,-36-18 16,35-18-16,-53 0 16,0 1-16,-17-18 15,0-54-15,-18 54 16,-18 0-16,-35-71 16,18 71-16,-53-36 15,52 54-15,-34-19 16,34 36-16,1 0 15,18 18-15,34 17 16,18 0-16,36 1 16</inkml:trace>
   <inkml:trace contextRef="#ctx0" brushRef="#br0" timeOffset="6173.2421">9278 5045 0,'18'0'15</inkml:trace>
-  <inkml:trace contextRef="#ctx0" brushRef="#br0" timeOffset="6657.9786">9719 4851 0,'0'0'15,"18"-71"-15,-1 54 16,-17-36-16,-17 35 15,-19-17-15,19 17 16,-1 18-16,-17 0 0,17 0 16,-35 35-1,36-17-15,-1 0 0,0 17 16,18 18-16,0-18 16,18 0-16,0-17 15,52 0-15,-52-18 16,17 0-16,-17 0 15,35-36-15,-36 19 16,19-36-16,-36 35 16,17-35-16,-17 36 15,-17-1-15,17 0 16,0 1-16,0 34 16,0 54-1,0-36-15,17 71 16,-17-53-16,0 17 15,18-17-15,-18 0 0,18 35 16,-1-52-16,1 17 16,-18-36-1,35 1-15,-17-36 16</inkml:trace>
+  <inkml:trace contextRef="#ctx0" brushRef="#br0" timeOffset="6657.9785">9719 4851 0,'0'0'15,"18"-71"-15,-1 54 16,-17-36-16,-17 35 15,-19-17-15,19 17 16,-1 18-16,-17 0 0,17 0 16,-35 35-1,36-17-15,-1 0 0,0 17 16,18 18-16,0-18 16,18 0-16,0-17 15,52 0-15,-52-18 16,17 0-16,-17 0 15,35-36-15,-36 19 16,19-36-16,-36 35 16,17-35-16,-17 36 15,-17-1-15,17 0 16,0 1-16,0 34 16,0 54-1,0-36-15,17 71 16,-17-53-16,0 17 15,18-17-15,-18 0 0,18 35 16,-1-52-16,1 17 16,-18-36-1,35 1-15,-17-36 16</inkml:trace>
   <inkml:trace contextRef="#ctx0" brushRef="#br0" timeOffset="7085.3834">10213 4498 0,'0'-18'0,"18"18"31,-18-17-15,17 17-1,1 0-15,-18-18 16,17 18-16,1 0 0,0-18 16,-1 18-16,1 0 15,0 0-15,-1 0 16,1 0 0,0 0-1</inkml:trace>
   <inkml:trace contextRef="#ctx0" brushRef="#br0" timeOffset="7480.3711">10178 4463 0,'-18'17'0,"18"1"16,0 0-16,0 34 16,0-16-16,0-1 0,0 18 15,18-18-15,-1 1 16,1-19-16,17 18 16,-17-17-1,35 0-15,-18-1 16,18 36-16,-18-35 15,-17 0-15,17 17 0,-17 0 16,-18-17-16,17 17 16,-17 18-16,-17-35 15,-36 34-15,18-52 16,-1 18-16,-52-18 16,53 0-16,-36 0 15,36-18-15,0 1 16,35-1-16,0-17 15,17 17-15,-17 1 16</inkml:trace>
   <inkml:trace contextRef="#ctx0" brushRef="#br0" timeOffset="8163.8897">11042 4057 0,'18'-18'31,"-1"1"-15,-17-1-16,18-17 16,-18 17-16,0-17 15,-18 35-15,18-18 16,-17 18-16,-1 0 16,-17 18-16,17-1 15,-17 19-15,35-1 16,0 36-16,0-54 15,17 19-15,36 16 16,-17-34-16,52-18 16,-35 0-16,17 0 15,-34-18-15,-1 1 16,-18-1-16,1 18 16</inkml:trace>
   <inkml:trace contextRef="#ctx0" brushRef="#br0" timeOffset="8509.7451">11377 4145 0,'18'35'16,"17"71"-1,0-18-15,-17-35 16,0-17-16,-1-1 0,1 0 16,-36-52 15,1-36-31,-1 0 15,-17-35-15,35 17 16,-18-52 0,18 70-16,35-36 15,-35 72-15,36-1 16,-19 18-16,18 18 16,-17-1-16,-18 36 15,0-17-15,-18-1 16,1-17-16,-1-1 15,1-17-15,-1 0 16,36-17 0</inkml:trace>
   <inkml:trace contextRef="#ctx0" brushRef="#br0" timeOffset="8848.2532">11748 4022 0,'0'0'0,"-18"0"16,0 0-16,1 0 16,17 35-1,0-17-15,0-1 16,17 19-16,1-36 15,17 17-15,0-17 16,1 0-16,-19-17 0,1-1 16,0 0-1,-18 1-15,0-1 0,-36-17 16,19 35-16,-1-18 16,0 18-16,1-18 0,-18 18 15,17 0-15,18 18 16,18-18-16,-1 18 15</inkml:trace>
-  <inkml:trace contextRef="#ctx0" brushRef="#br0" timeOffset="9236.4752">12065 4004 0,'-18'0'16,"1"0"-1,17 18 1,0-1-16,17 1 16,1 0-16,17 17 15,-17-35-15,17 18 16,0-18-16,-17-18 16,17 0-1,-17-17-15,-18 17 16,0-17-16,0-36 15,-18 1 1,1 35-16,17-1 0</inkml:trace>
+  <inkml:trace contextRef="#ctx0" brushRef="#br0" timeOffset="9236.4751">12065 4004 0,'-18'0'16,"1"0"-1,17 18 1,0-1-16,17 1 16,1 0-16,17 17 15,-17-35-15,17 18 16,0-18-16,-17-18 16,17 0-1,-17-17-15,-18 17 16,0-17-16,0-36 15,-18 1 1,1 35-16,17-1 0</inkml:trace>
   <inkml:trace contextRef="#ctx0" brushRef="#br0" timeOffset="9498.178">12188 3687 0,'0'35'16,"18"53"0,0 0-16,17 0 15,-35-35 1,35 0-16,-35-35 15,0 0-15,18-1 0,0-17 16,-18-17 0,35-1-1,-35 0-15,18 18 0,-1-17 0,1 17 16,-18 17 0,17-17-1,-17 36-15,0-19 16,0 1-16,0-1 15,18-17 1</inkml:trace>
   <inkml:trace contextRef="#ctx0" brushRef="#br0" timeOffset="9633.3018">12541 4075 0,'36'0'15,"-19"0"1,1 0-16,-1 0 16</inkml:trace>
   <inkml:trace contextRef="#ctx0" brushRef="#br0" timeOffset="9871.2393">12753 3969 0,'0'17'16,"0"1"-16,0 0 16,0-1-16,0 1 15,0 0-15,18 17 0,-18-17 16,17-18-1,1 17-15</inkml:trace>
@@ -2459,40 +2459,40 @@
   <inkml:trace contextRef="#ctx0" brushRef="#br0" timeOffset="41614.515">25735 8378 0,'-35'18'0,"70"-36"0,-70 54 16,17-19-16,18 1 16,18 17-16,0-17 0,34 17 15,1-35-15,-17 18 16,52-18-16,-53-18 16,0-17-16,-35 17 15,-17-17-15,-1 17 16,-17 1-16,0-1 15,-1 0-15,-17 18 0,-17 0 16,17 0-16</inkml:trace>
   <inkml:trace contextRef="#ctx0" brushRef="#br0" timeOffset="47231.8042">7303 10654 0,'0'0'0,"0"18"16,17-1-1,-17 1-15,0 17 0,18 36 16,-18 34-1,17-52-15,-17 18 0,18 88 16,0 17 0,-18-88-16,0 124 15,0-106-15,0 123 16,0-105-16,0-1 16,0 124-16,0 0 15,17-141-15,-17 0 16,0 123-1,-17-106-15,17 1 0,0-18 16,0 0-16,-18-1 0,18 1 16,-35 88-16,35-106 15,-35 71-15,35-88 16,-18 35 0,0-18-16,18-53 0,0 0 15,0-17 1,-17 0-16,17-36 15,0 0 1</inkml:trace>
   <inkml:trace contextRef="#ctx0" brushRef="#br0" timeOffset="48001.3388">6544 14252 0,'18'0'31,"-1"0"-31,1 0 16,0 0-16,17 0 15,18 18-15,35-18 16,-53 0-16,18 0 16,0 0-16,71 0 15,-54 0-15,1 0 0,-1 0 16,107 0-16,-89 0 16,106 0-1,-106 0-15,124 0 16,-89 0-16,-17 0 0,247 0 15,-89 0 1,1-18 0,17 18-1,-141 0-15,159 0 16,-159 0-16,18 0 0,0 0 16,-18 0-16,176 18 15,-158-18-15,176 0 16,-176 0-16,176 18 15,-158-18-15,158 17 16,-177-17-16,178 18 16,-178-18-16,160 0 15,-177 0-15,0 17 16,0-17-16,-17 0 16,-1 0-16,106 0 15,-140 0-15,-1 0 0,71 18 16,-54-18-1,-69 0-15,-1 0 16,-17 18-16,-36-18 16</inkml:trace>
-  <inkml:trace contextRef="#ctx0" brushRef="#br0" timeOffset="49517.7909">10354 15011 0,'18'17'16,"35"-17"-1,0 0-15,-18 0 16,18 0-16,0 0 0,0 0 0,-1 0 15,37 0-15,-54 0 16,0 0 0,-17 0-16,-1 0 0,-34-17 15</inkml:trace>
+  <inkml:trace contextRef="#ctx0" brushRef="#br0" timeOffset="49517.7908">10354 15011 0,'18'17'16,"35"-17"-1,0 0-15,-18 0 16,18 0-16,0 0 0,0 0 0,-1 0 15,37 0-15,-54 0 16,0 0 0,-17 0-16,-1 0 0,-34-17 15</inkml:trace>
   <inkml:trace contextRef="#ctx0" brushRef="#br0" timeOffset="49772.664">10654 14764 0,'0'17'16,"-18"36"0,1 36-16,17-1 15,0-35-15,17 52 16,1-69-16,0-1 15,-1 0-15,18-17 16,36 0-16,-36-1 16,36-17-16,-36 0 15,0-17-15,-17 17 16</inkml:trace>
   <inkml:trace contextRef="#ctx0" brushRef="#br0" timeOffset="56240.3164">6738 12171 0,'0'88'16,"0"-35"-16,0 18 0,-35 34 15,17-52-15,-35 35 16,36-52-16,-19-19 15,19 1-15,-36-18 16,17-18-16,19 18 16,-36-53-16,53 36 15,-18-36-15,36 35 16,17 1-16,-17 17 16,52 0-16,-34 17 15,-1 1-15,0 17 16,1 0-16,-1 1 0,18-1 15,-36-17-15,19-1 16,-19-17-16,1 0 0</inkml:trace>
   <inkml:trace contextRef="#ctx0" brushRef="#br0" timeOffset="57168.7126">7638 11307 0,'0'0'0,"-18"0"0,0 0 16,18-18 15,18 18 0,0 0-31,17 0 16,0 18-16,0-18 15,18 17 1,-35-17-16,17 18 0,1-18 16,17 0-16,17 0 15,-17 0-15,53 0 16,-53 0-16,53 0 16,-54 17-16,54-17 15,-53 18-15,71-18 16,-71 0-16,0 18 15,-18-18-15,18 0 0,35 0 16,-35 0-16,0 0 16,-18 0-16,18 0 15,-18 0-15,1 0 16,-19 0 0,18 17-16,-17-17 15,0 0 1,-1 0-16,1 0 15,0 0-15,-36 0 79</inkml:trace>
   <inkml:trace contextRef="#ctx0" brushRef="#br0" timeOffset="59261.4305">9560 12823 0,'-17'0'16,"-1"0"15,36 0 141,-1 0-156,1 0-16,0 0 15,-1 0-15,1 0 16,-1 0-16,1 0 15,17-17 1,-17 17-16,0 0 0,17 0 16,-17 0-16,17 0 15,0 17-15,-17-17 16,17 0-16,0 0 16,1 0-16,-1 18 15,0-18-15,18 0 16,-35 0-16,-1 0 15,19 18-15,-19-18 0,54 0 16,-36 0-16,18 0 16,-18 0-1,-17 0-15,17-18 0,1 18 16,-19 0-16,18 0 0,-17 0 16,53 0-16,-36 0 15,18 0 1,-18 0-16,0 0 15,-17 0-15,17 0 16,-17 0-16,17 18 16,-17-18-16,17 0 15,-17 0-15,35 0 16,-36 0-16,1 0 16,0 0-16,-1 0 15,1 0 1,-18 17-16,18-17 0,-36 18 62</inkml:trace>
-  <inkml:trace contextRef="#ctx0" brushRef="#br0" timeOffset="60728.2919">11342 13705 0,'17'0'62,"1"0"-30,0 0-32,-1 0 15,19 0 1,-1 0-16,-17 0 0,17 0 16,0 0-16,0 0 15,18 0-15,-17 0 0,17 0 16,-18 0-16,71 18 15,-53 0-15,52-1 16,-52-17-16,53 0 16,-53 0-16,35 0 15,-52 0-15,16 0 16,-16 0-16,-1 0 16,-17 0-16,-1 0 15,1 0 1,-18 18-16,-18-18 31</inkml:trace>
+  <inkml:trace contextRef="#ctx0" brushRef="#br0" timeOffset="60728.2918">11342 13705 0,'17'0'62,"1"0"-30,0 0-32,-1 0 15,19 0 1,-1 0-16,-17 0 0,17 0 16,0 0-16,0 0 15,18 0-15,-17 0 0,17 0 16,-18 0-16,71 18 15,-53 0-15,52-1 16,-52-17-16,53 0 16,-53 0-16,35 0 15,-52 0-15,16 0 16,-16 0-16,-1 0 16,-17 0-16,-1 0 15,1 0 1,-18 18-16,-18-18 31</inkml:trace>
   <inkml:trace contextRef="#ctx0" brushRef="#br0" timeOffset="61746.2032">13000 14146 0,'-18'0'0,"36"0"47,0 0-31,-1 0-1,36 0-15,-18 0 16,1 0-16,-1 0 0,18 0 15,70 0-15,-52 0 16,88 18 0,-89-18-16,71 18 15,-70-18-15,-1 0 0,71 17 16,-88-17-16,0 0 16,0 0-16,0 0 0,18 0 15,-36 0-15,-17 0 16,-1 0-1,-34 0 1,-1 18 0</inkml:trace>
   <inkml:trace contextRef="#ctx0" brushRef="#br0" timeOffset="63715.4639">16969 12612 0,'-53'-18'16,"17"18"-16,-16 18 15,16-1-15,-17 36 16,36-17-16,-19 34 15,36-35-15,0 1 16,0-19-16,0 19 0,36-1 16,-1-35-16,36 0 15,-36-35-15,0 17 16,0-35-16,-17 18 0,17-89 16,-17 71-16,0-52 15,-18 52 1,0-71-16,-18 71 15,0-53-15,-17 71 16,0 0-16,17 35 16,0 35-1,1 18-15,17 18 0,0-1 16,0 1-16,53 70 16,-36-71-16,54 19 15,-36-36-15,36-1 16,-54-34-16,1 0 15,0-18 1,-18-36-16,0 19 16,0-1-16,-18-17 15,36 35 1,-1 35 0,-17-17-16,18-1 15,-18 1-15,18 0 16</inkml:trace>
   <inkml:trace contextRef="#ctx0" brushRef="#br0" timeOffset="64081.3285">17427 12559 0,'0'-18'16,"-17"18"-16,-1 0 16,0 0-16,1 18 0,-1 35 15,18-36-15,0 19 16,0 17-16,18-36 15,35 19-15,-36-19 16,19-17-16,-19 0 0,1 18 16,-36-18 15,-35 17-31,18-17 16,-36 18-16,54-18 15,-19 18-15</inkml:trace>
   <inkml:trace contextRef="#ctx0" brushRef="#br0" timeOffset="64649.8411">17604 12700 0,'-18'0'15,"36"0"-15,-54 0 16,19 18-16,17-1 15,0 19-15,17-19 16,-17 1-16,18-1 0,17-17 16,1 36-1,-19-36-15,1 17 16,-1-17-16,-17-17 31,-17 17-15,17-18-16,0 0 15,0 1 1,0-1 0,17 1-16,-17-1 15,18 18 1,-18 18 0,18-1-1,-1-17-15,1 18 0,17-18 16,36 0-1,-36 0-15,-17-18 16,35 1-16,-71 17 31,0 0-31,-17 0 16,17 0-16,-17 0 16,35 17-1,0 1-15,53-1 16,-35 1-1,52-18-15,-52 18 16,17-18-16,1 0 0,-19 0 16,1-18-16,-36 18 15</inkml:trace>
   <inkml:trace contextRef="#ctx0" brushRef="#br0" timeOffset="64826.3101">16845 12312 0,'18'0'16,"-36"0"-16,71 18 15,-35-1-15,17 1 0,53 17 16</inkml:trace>
   <inkml:trace contextRef="#ctx0" brushRef="#br0" timeOffset="65122.3056">18168 12647 0,'53'-18'16,"-106"36"-16,159-36 0,-71 1 0,18-1 15,-18 18-15,1-17 0,-1-1 16,-35 0 0</inkml:trace>
-  <inkml:trace contextRef="#ctx0" brushRef="#br0" timeOffset="65566.7124">18274 12365 0,'0'106'16,"0"-212"-16,0 265 0,18-54 15,-18-52-15,17 36 16,-17-54-16,18 18 16,-1-36-16,1 1 15,0-18-15,-1 0 16,-17-18-16,18 1 15,0-1-15,-18 0 16,17 18 0,1 0-16,0 0 0,-1 0 15,1 0-15,17 0 16,-17 0-16,17-17 16,0-1-16,-17 1 15,0-1-15,-18 0 16,-53 1-1,35 17-15,-17 0 16,17 17-16,18 1 16,0 17-1,18-17-15,35 17 16,-18-17-16,36-1 16,-36-17-16,-18 0 15,36 0-15</inkml:trace>
-  <inkml:trace contextRef="#ctx0" brushRef="#br0" timeOffset="66027.8122">19950 12471 0,'0'0'0,"0"-18"0,-18 18 16,-17 18-16,17-1 16,18 36-1,0-35-15,35 35 16,1-18-16,-19-17 16,19 17-16,-1 0 15,-18-17-15,-52-18 31,-18 0-15,18-18-16,0 18 16,-18-17-16,35-1 15,0 0-15,18 1 16</inkml:trace>
+  <inkml:trace contextRef="#ctx0" brushRef="#br0" timeOffset="65566.7123">18274 12365 0,'0'106'16,"0"-212"-16,0 265 0,18-54 15,-18-52-15,17 36 16,-17-54-16,18 18 16,-1-36-16,1 1 15,0-18-15,-1 0 16,-17-18-16,18 1 15,0-1-15,-18 0 16,17 18 0,1 0-16,0 0 0,-1 0 15,1 0-15,17 0 16,-17 0-16,17-17 16,0-1-16,-17 1 15,0-1-15,-18 0 16,-53 1-1,35 17-15,-17 0 16,17 17-16,18 1 16,0 17-1,18-17-15,35 17 16,-18-17-16,36-1 16,-36-17-16,-18 0 15,36 0-15</inkml:trace>
+  <inkml:trace contextRef="#ctx0" brushRef="#br0" timeOffset="66027.8121">19950 12471 0,'0'0'0,"0"-18"0,-18 18 16,-17 18-16,17-1 16,18 36-1,0-35-15,35 35 16,1-18-16,-19-17 16,19 17-16,-1 0 15,-18-17-15,-52-18 31,-18 0-15,18-18-16,0 18 16,-18-17-16,35-1 15,0 0-15,18 1 16</inkml:trace>
   <inkml:trace contextRef="#ctx0" brushRef="#br0" timeOffset="66189.1718">20249 12541 0,'0'0'16,"36"-17"-16,-1 17 0,36-36 15,-36 19-15,0 17 16,0-18-16,-17 0 16,-18 1-16,0-1 15,0 1-15</inkml:trace>
   <inkml:trace contextRef="#ctx0" brushRef="#br0" timeOffset="66345.7867">20355 12206 0,'0'53'15,"0"0"-15,18 53 16,-18-53-16,18 0 16,-18 17-16,35 36 15,-35-71-15,35 18 16,-17-18-16,17-17 15,-17-18-15</inkml:trace>
-  <inkml:trace contextRef="#ctx0" brushRef="#br0" timeOffset="66788.9578">20690 12594 0,'0'0'16,"-35"18"-16,18-1 0,-1 19 0,-17-1 15,35 0 1,17 1-16,1-36 16,0 17-16,-1-17 15,18 0-15,-17 0 0,17 0 16,-17-17-16,0 17 0,-1-36 16,-17 19-16,0-1 15,0 0-15,0 1 16,-17 17-16,17 17 15,0 1-15,0 0 16,17-1-16,19 19 16,-1-36-1,0 0-15,-17 0 16,-1 0-16,1 0 16,-18-18-16,0 0 15,0 1-15,18 17 47,-18 35-31,17-17-1,1-18-15</inkml:trace>
+  <inkml:trace contextRef="#ctx0" brushRef="#br0" timeOffset="66788.9577">20690 12594 0,'0'0'16,"-35"18"-16,18-1 0,-1 19 0,-17-1 15,35 0 1,17 1-16,1-36 16,0 17-16,-1-17 15,18 0-15,-17 0 0,17 0 16,-17-17-16,0 17 0,-1-36 16,-17 19-16,0-1 15,0 0-15,0 1 16,-17 17-16,17 17 15,0 1-15,0 0 16,17-1-16,19 19 16,-1-36-1,0 0-15,-17 0 16,-1 0-16,1 0 16,-18-18-16,0 0 15,0 1-15,18 17 47,-18 35-31,17-17-1,1-18-15</inkml:trace>
   <inkml:trace contextRef="#ctx0" brushRef="#br0" timeOffset="67056.3869">20955 12453 0</inkml:trace>
   <inkml:trace contextRef="#ctx0" brushRef="#br0" timeOffset="67445.6044">20937 12700 0,'0'18'16,"0"17"0,0-17-16,0 17 15,0-18-15,0 19 16,18-36-16,-18 17 16,0 1-16,18-18 15</inkml:trace>
   <inkml:trace contextRef="#ctx0" brushRef="#br0" timeOffset="67755.3836">21114 12771 0,'0'0'0,"0"17"15,17 1-15,1-1 16,-18-34 0,0-1-1,0 1-15,0-1 16,0 0-16,0-17 16,0 17-16,18-17 15,-1 17-15,1 18 0,0-17 16,17 17-1,-17 0-15,-1 0 16,1 0-16,-1 17 0,1-17 16,-18 18-16</inkml:trace>
   <inkml:trace contextRef="#ctx0" brushRef="#br0" timeOffset="68953.7614">21590 12629 0,'18'-17'0,"-36"34"0,36-52 16,-18 53-1,0-1-15,-36 54 16,36-53-16,0 17 15,0-17-15,0 17 0,36 0 16,-19-17 0,36-18-16,-18 0 15,36-18-15,-36 18 16,18-35-16,-35 17 16,0-17-1,-18 17-15,0 1 0,-18 17 16,0 0-1,1 0-15,-19 35 16,19-17-16,17 34 16,0-34-16,17 35 15,1-35-15,17-1 16,-17-17-16,35 0 16,-36-17-16,19-1 15,-19 0-15,1 1 16,-18-1-16,0-17 15,0 17-15,-18 1 16,1 17 0,-1-18-16,18 36 15,18-1 1,-1 18-16,1-35 16,0 18-16,-1-18 15,1 0 1,-18-18 15,0 1-31,0-1 16,18-17-1,-18 17-15,17 1 16,1-1-16,-1 0 0,36 1 16,-35 17-16,35 17 15,-35 1-15,17 17 16,-35-17-16,17 17 15,-17-17 1,0 17-16,0-17 16,-17-18-16,-1 17 15,1-17-15,-1-17 16,0 17-16,1-18 16,34 18-1,19 0 1,-19 18-1,18-18-15,-17 0 16,35 0-16,-35 0 16,35-36-16,-36 36 15,1-17 1,0-1-16,-1 1 0,1-1 0,-1 0 16,-17 1-16,-17-19 15,-1 19 1,-35 17-1,36 17-15,-1 1 16,18 0-16,18 35 16,35-18-16,-18 0 15,0-17-15,0-1 0,1-17 16,34 18-16,-52 0 16,52-18-1,-52 0-15,0-18 16</inkml:trace>
   <inkml:trace contextRef="#ctx0" brushRef="#br0" timeOffset="76828.5437">5327 3792 0,'0'0'0,"0"-17"0,-18-1 16,18 0-16,-35 1 0,-18-18 15,18 35-15,17 0 16,-52 0-16,17 17 16,-35 18-16,35-17 15,0 17-15,0 1 0,-35 17 16,35-18-16,17 0 15,-17 0-15,18 1 0,-53 52 16,53-35-16,-36 70 16,36-52-1,0-1-15,17 19 0,-17-19 16,17 18-16,0 1 0,18-1 16,0 70-16,0-87 15,0 105 1,18-105-16,-18 105 15,18-70-15,-1 106 16,-17-106-16,0 141 16,0-124-16,0 124 15,0-123-15,36 87 16,-36-87-16,35 105 16,-17-123-16,17 105 15,-18-105-15,1 88 16,-18-105-16,0 69 15,0-87-15,0 88 16,-18-89 0,-17 54-16,35-71 15,-17-1-15,-1 1 0,0 0 16,18 0-16,-17 0 0,-1-18 16,0 1-16,1 52 15,-1-71-15,0 36 16,1-17-16,17-19 15,-18-17 1,36 0 0,-1 0-1,1 0-15,17 0 16,-17 0 0,17 0-16,-17 0 15,0 0-15,17 0 0,-18 0 16,19 18-16,17 0 15,-18-18-15,0 17 16,-17 19-16,17-19 0,-17 18 16,17 1-16,-17-1 0,-1 18 15,1 53-15,0-36 16,-18-17-16,17 18 0,-17 17 16,0 88-16,0-70 15,0 123 1,0-123-16,0 124 15,18-107-15,0 106 16,-18-105-16,35 105 16,-18-123-16,1 123 15,0-105-15,17 123 16,-17-124-16,-1 142 16,1-142-16,17 142 15,-17-142-15,17 142 16,-17-142-16,17 107 15,-17-124-15,17 105 16,-17-105 0,17 70-16,-18-105 15,19 88-15,-36-106 16,35 70-16,-35-70 16,18 18-16,-1-54 15,1 1 1,0-18-16</inkml:trace>
   <inkml:trace contextRef="#ctx0" brushRef="#br0" timeOffset="77918.8989">5292 14534 0,'0'18'31,"17"35"-15,-17-18-16,53 53 15,-17-52-15,-1-1 0,35 0 16,-34-35-16,-1 18 16,-17-18-16,34 18 15,-34-18-15,0 0 16</inkml:trace>
-  <inkml:trace contextRef="#ctx0" brushRef="#br0" timeOffset="79091.4608">1270 8908 0,'0'0'16,"-18"-89"-16,1 37 0,-19-37 16,19 54-16,-18-35 15,-1 52-15,1 0 16,17 18-16,1 53 16,-1 18-16,18-1 15,18 107 1,-1-1-16,1-88 15,17 106-15,-17-123 16,17 70-16,-17-88 16,-18-18-16,35 0 15,-35-17-15,0-36 16,-18-17 0,1 0-1,-1-18-15,18 18 16,0-36-16,0 36 15,18 17-15,17-35 16,-17 53-16,-1-17 16,1 17-16,-18 17 15,18-17-15,-18 36 16,0-19-16,0 1 16,0-1-16,17 19 15,1-19 1,17-17-1,0 0-15,-17 0 16,0-17-16,-1 17 16,1-18-16,-18 0 15,0 1-15,-18-1 16,18 1-16,-35-19 16,17 19-16,-17-19 15,18 36-15,17-17 16,-18 17-16,36 0 15</inkml:trace>
+  <inkml:trace contextRef="#ctx0" brushRef="#br0" timeOffset="79091.4607">1270 8908 0,'0'0'16,"-18"-89"-16,1 37 0,-19-37 16,19 54-16,-18-35 15,-1 52-15,1 0 16,17 18-16,1 53 16,-1 18-16,18-1 15,18 107 1,-1-1-16,1-88 15,17 106-15,-17-123 16,17 70-16,-17-88 16,-18-18-16,35 0 15,-35-17-15,0-36 16,-18-17 0,1 0-1,-1-18-15,18 18 16,0-36-16,0 36 15,18 17-15,17-35 16,-17 53-16,-1-17 16,1 17-16,-18 17 15,18-17-15,-18 36 16,0-19-16,0 1 16,0-1-16,17 19 15,1-19 1,17-17-1,0 0-15,-17 0 16,0-17-16,-1 17 16,1-18-16,-18 0 15,0 1-15,-18-1 16,18 1-16,-35-19 16,17 19-16,-17-19 15,18 36-15,17-17 16,-18 17-16,36 0 15</inkml:trace>
   <inkml:trace contextRef="#ctx0" brushRef="#br0" timeOffset="79336.9261">1676 9366 0,'0'0'16,"-18"0"-1,0-17-15,1-19 0,-1-17 16,18 36-16,0-54 16,0 36-16,0 0 15,0 17 1,18 18 0,-1 18-1,1-1-15,35 1 16,-35-18-16,-1 18 15</inkml:trace>
   <inkml:trace contextRef="#ctx0" brushRef="#br0" timeOffset="80075.1164">1905 9278 0,'18'71'16,"-36"-142"-16,36 159 0,-1-70 15,-17 0-15,0-36 16,18-17-1,-18-1-15,0 1 16,0 17-16,0-52 16,0 35-16,0-1 15,0 19-15,18 17 16,-1 35 0,-17 18-16,18-35 15,-18 34-15,17-52 16,-17 18-1,18-18-15,0 0 16,-18-18-16,17-17 16,1 18-16,0-36 15,-18 35-15,17 18 32,-17 18-17,0-1 1,0 1-16,18-18 15,17 0 1,-35-18-16,18 18 16,0-17-16,-18-1 0,17 0 0,-17 1 15,18-1 1,-18 0-16,17 18 16,-17 18-16,18 0 15,-18-1-15,18 1 16,-1 0-16,19-18 15,-19 0-15,1 0 16,0-18-16,-18 0 16,0-17-16,0-18 15,-18 35-15,18-17 16,-18-18-16,1 18 0,-19-88 16,19 52-16,-19-52 15,1 52 1,18 18-16,-1 35 15,36 36 1,34 88 0,-34-53-16,53 88 15,-36-71-15,35 54 16,-34-71-16,34 53 16,-52-89-16,17 19 0,18-19 15,0-17 1</inkml:trace>
   <inkml:trace contextRef="#ctx0" brushRef="#br0" timeOffset="80365.0321">2734 8925 0,'-18'0'16,"18"18"0,-17 17-1,34-17-15,1 17 16,0-17-16,-1-18 15,1 0-15,0 0 16,-18-18-16,0 0 16,0 1-16,0-1 0,-18 1 15,18-1 1,18 36 0,17-1-1,-17-17-15,34 18 16,-16-18-1,-19 0-15,19 0 0,-19 0 16,1 17-16</inkml:trace>
   <inkml:trace contextRef="#ctx0" brushRef="#br0" timeOffset="86443.724">4516 16475 0,'0'-53'16,"0"106"-16,0-124 0,17 71 0,18 18 16,-17 35-16,53 105 15,-54-52-15,36 124 16,-35-107-1,-18 106-15,0-140 16,0 16-16,0-69 16,0-54-16,18-17 15,-18-106-15,0 52 16,0-87 0,0 88-16,0-88 15,0 87-15,0-69 16,0 122-16,17 1 15,-17 53-15,18 35 16,-1-1 0,1 54-16,-18-53 15,18-17-15,17 16 16,-35-34-16,18-36 16,-1 1-16,1-18 0,17-1 0,-17-17 15,-1-70 1,1 70-16,0 18 0,-1-36 15,1 53-15,0 36 16,17 70 0,18 36-1,-36-36-15,1 0 0,0 0 16,17 71-16,-17-88 16,35 34-16,-18-69 15,18-1-15</inkml:trace>
   <inkml:trace contextRef="#ctx0" brushRef="#br0" timeOffset="86943.9282">5592 16986 0,'-36'36'0,"72"-72"0,-89 107 15,35-36-15,0 53 16,18-52-16,0-1 15,53 18-15,-35-36 16,52-17-16,-52-17 16,35-19-16,-18 1 15,-17-18 1,-36-17-16,18 52 16,-17-17-16,-19 0 15,19 35-15,-1 17 16,18 1-16,0 17 15,0 0-15,18 1 0,-1-1 16,19 0-16,-1 36 16,-17-54-16,34 19 15,-34-19 1,0-34-16,-18-1 16,0 0-16,0-17 0,0-35 15,0 34-15,0-17 16,0 18-1,17-18-15,1 53 16,0 0 0,-1 35-16,1-17 15,0 17-15,-1 18 16,1-17-16,17-1 16,-17-18-16,17 1 15,-17-18-15</inkml:trace>
-  <inkml:trace contextRef="#ctx0" brushRef="#br0" timeOffset="87294.0164">6156 17057 0,'0'0'0,"-18"17"16,18 19-16,0-1 15,18 0-15,-18-17 16,18 0-16,-1-1 15,19 18-15,-19-17 16,1-18-16,-1 0 16,-17-18-1,0 1-15,18-18 16,-18 17-16,0-17 16,0 17-1,18 18 1,-1 35-1,-17-17-15,36 35 16,-19-36-16,19 1 16,-19-18-16,18 0 15,-17-18-15,0 1 0,-1-18 16,1 35-16</inkml:trace>
+  <inkml:trace contextRef="#ctx0" brushRef="#br0" timeOffset="87294.0163">6156 17057 0,'0'0'0,"-18"17"16,18 19-16,0-1 15,18 0-15,-18-17 16,18 0-16,-1-1 15,19 18-15,-19-17 16,1-18-16,-1 0 16,-17-18-1,0 1-15,18-18 16,-18 17-16,0-17 16,0 17-1,18 18 1,-1 35-1,-17-17-15,36 35 16,-19-36-16,19 1 16,-19-18-16,18 0 15,-17-18-15,0 1 0,-1-18 16,1 35-16</inkml:trace>
   <inkml:trace contextRef="#ctx0" brushRef="#br0" timeOffset="87700.1494">6491 17198 0,'-18'35'0,"36"-70"0,-53 88 16,35-18-16,17-17 16,1-1-16,17-17 15,1 0-15,-1 0 16,0 0 0,-17 0-16,-18-17 15,18 17-15,-18-18 16,-18 18-1,18 18 1,0-36 15,18 0-15,-1 1-16,1-54 16,-1 36-16,-17-53 15,0 35-15,-17 0 16,-18-53-16,17 53 15,-35-35-15,35 70 16,1 18-16,17 36 16,17 70-16,1-36 15,53 71 1,-19-88-16,-16 0 16,17 0-16,0-35 0,35 17 15,-35-35-15,35-18 16</inkml:trace>
   <inkml:trace contextRef="#ctx0" brushRef="#br0" timeOffset="88340.6927">8555 16898 0,'-18'71'15,"36"-142"-15,-53 177 0,35-53 0,0 35 16,0-53-16,17 1 16,1-19-16,17-17 15,0 0-15,18-53 16,-17 18-16,-19-18 16,1-53-16,-18 53 15,0 0-15,-18-17 16,18 17-16,-35-18 0,0-17 15,-1 35-15,-16 0 16,34 36-16,-17 34 16,17 1-16,18 88 15,18-53-15,35 106 16,-18-89-16,53 71 16,-35-88-16,53 18 15,-53-54 1,17 19-16,-35-36 15</inkml:trace>
   <inkml:trace contextRef="#ctx0" brushRef="#br0" timeOffset="88659.7641">8978 17092 0,'35'18'16,"-17"-1"-16,0-17 15,35-17 1,-18-1-16,-17 0 16,-1-17-16,1 18 0,-18-19 15,0 19-15,0-1 0,-18 0 16,1 1-16,-19 17 16,-17 0-16,36 0 15,-1 17-15,-17 19 16,35-1-16,17 0 0,19 18 15,-19-18-15,54 1 16,-18-1-16,17-17 16,-34-1-1,34-17-15,-34 0 16,-19 0-16</inkml:trace>
-  <inkml:trace contextRef="#ctx0" brushRef="#br0" timeOffset="89614.4167">9560 16986 0,'0'0'0,"-17"0"16,-1 0-16,0 0 0,1 18 16,17 0-16,-18 17 15,18-18-15,0 19 0,0-19 16,0 1-16,18 17 0,17-17 15,-17 0-15,17-18 16,0 0-16,0 0 16,1 0-16,-1-18 0,0 0 15,-17 1-15,35-19 16,-35 19-16,-18-19 16,-18 36-1,-17 0 1,17 18-16,0 17 15,18-17-15,0 0 16,0-1-16,36 36 16,-19-53-16,19 18 15,-19-18-15,18 0 0,1 0 0,-1 0 16,18-35-16,-35 17 16,-18 0-16,17 1 15,-17-1-15,-17-17 16,17 17-16,-36 0 15,19 18-15,-1 0 16,0 0 0,18 18-16,0 17 15,18-17-15,17 17 16,-17-35-16,35 18 16,-36-18-16,19-18 15,-19 18-15,1-17 16,-18-1-16,0 0 15,0 1-15,0-19 16,0 19 0,-18 34-16,18 1 15,0 0 1,0-1-16,36 1 16,-36 0-16,17-1 15,1-17-15,0 0 0,-1 18 16,1-18-16,-1-18 15,1 18-15,-18-17 16,18 17 0,-1 17-1,1 36-15,0-18 16,-1 1-16,19 70 16,-19-53-16,1 70 15,-18-52-15,0 17 16,0-53-16,-53 18 15,35-18-15,-35 0 16,18-35-16,0-17 16,17-1-16,18-17 15,0-18-15,0 0 0,18-35 16,35-71 0,0 89-16,17-36 15,-17 70-15,-18 1 16,18 0-16,-35 17 0,17 1 0,-17-19 15,-18 54 1</inkml:trace>
+  <inkml:trace contextRef="#ctx0" brushRef="#br0" timeOffset="89614.4166">9560 16986 0,'0'0'0,"-17"0"16,-1 0-16,0 0 0,1 18 16,17 0-16,-18 17 15,18-18-15,0 19 0,0-19 16,0 1-16,18 17 0,17-17 15,-17 0-15,17-18 16,0 0-16,0 0 16,1 0-16,-1-18 0,0 0 15,-17 1-15,35-19 16,-35 19-16,-18-19 16,-18 36-1,-17 0 1,17 18-16,0 17 15,18-17-15,0 0 16,0-1-16,36 36 16,-19-53-16,19 18 15,-19-18-15,18 0 0,1 0 0,-1 0 16,18-35-16,-35 17 16,-18 0-16,17 1 15,-17-1-15,-17-17 16,17 17-16,-36 0 15,19 18-15,-1 0 16,0 0 0,18 18-16,0 17 15,18-17-15,17 17 16,-17-35-16,35 18 16,-36-18-16,19-18 15,-19 18-15,1-17 16,-18-1-16,0 0 15,0 1-15,0-19 16,0 19 0,-18 34-16,18 1 15,0 0 1,0-1-16,36 1 16,-36 0-16,17-1 15,1-17-15,0 0 0,-1 18 16,1-18-16,-1-18 15,1 18-15,-18-17 16,18 17 0,-1 17-1,1 36-15,0-18 16,-1 1-16,19 70 16,-19-53-16,1 70 15,-18-52-15,0 17 16,0-53-16,-53 18 15,35-18-15,-35 0 16,18-35-16,0-17 16,17-1-16,18-17 15,0-18-15,0 0 0,18-35 16,35-71 0,0 89-16,17-36 15,-17 70-15,-18 1 16,18 0-16,-35 17 0,17 1 0,-17-19 15,-18 54 1</inkml:trace>
   <inkml:trace contextRef="#ctx0" brushRef="#br0" timeOffset="89741.9491">10883 17180 0,'-17'0'0,"-1"0"16</inkml:trace>
   <inkml:trace contextRef="#ctx0" brushRef="#br0" timeOffset="110963.5359">5027 17886 0,'18'0'31,"-1"0"-15,1 0-16,17-18 0,53 18 15,-52 0-15,87-17 16,-70 17-1,88-18-15,-53 0 16,89 18-16,-89-17 16,124 17-16,-106-18 15,17 18-15,-17 0 0,17 0 16,142-18-16,-124 18 16,159-17-1,-141-1-15,140 0 16,-140 18-16,141 0 15,-159 0-15,159 0 16,-141 0-16,-18 0 16,0 0-16,0 0 0,124 0 15,-159 0-15,123 0 16,-106 0-16,71 0 16,-123-17-16,70 17 15,-88 0-15,0-18 16</inkml:trace>
 </inkml:ink>
@@ -2555,7 +2555,7 @@
   <inkml:trace contextRef="#ctx0" brushRef="#br0" timeOffset="21756.2113">32385 1182 0,'35'0'16,"-17"0"-16,0-18 15,-1 1-15,-17-1 16,18 0 0,-36 1-16,1 17 0,17-18 15,-36 18-15,19 0 16,-1 18-1,0-1-15,18 19 16,0-19-16,36 18 16,-19-17-16,1 0 15,0-1-15,17 1 16,-18-18-16,1 0 16,-18 18-16</inkml:trace>
   <inkml:trace contextRef="#ctx0" brushRef="#br0" timeOffset="22000.9836">32597 1111 0,'-18'0'16,"36"0"-16,-36 18 15,18 17-15,0-17 16,0-1-16,0 1 0,0 0 15,18 17 1,-1-17-16,1-18 16,-36 0-1,1 0 1,-1-18-16</inkml:trace>
   <inkml:trace contextRef="#ctx0" brushRef="#br0" timeOffset="22464.098">32720 1252 0,'-17'0'15,"17"18"1,17-18 0,18-18-1,-17 18-15,35 0 16,-35 0-16,-1-17 15,1 17-15,0-18 0,-1 0 16,1 1-16,-18-1 0,17-17 16,-17 0-16,18-36 15,-18 18-15,0 0 16,0 0-16,0-53 16,0 71-16,0 18 0,-18 17 15,18 17-15,-17 36 16,17 53-16,0-53 15,0 70 1,0-70-16,0-17 0,-18 52 16,18-53-1,0-70 1,0 17 0,0 0-16,18-17 0,-1 0 15,19 35 1,34-18-16,-17 18 15,35-17-15,-35 17 16,-17 0-16,-19 0 16</inkml:trace>
-  <inkml:trace contextRef="#ctx0" brushRef="#br0" timeOffset="23156.3791">24836 2364 0,'0'0'0,"0"17"0,0 54 16,17 17-1,18-17-15,-17-36 16,17-18-16,36 1 16,-36-18-16,18 0 0,0-70 15,-35 34-15,17-52 16,-35 53-16,0-18 15,0 18-15,0-1 16,-35 1 0,35 53-1,0 52 1,0-34-16,17-1 0,1 0 16,17 0-16,18 36 0,-18-53 15,18 17 1</inkml:trace>
+  <inkml:trace contextRef="#ctx0" brushRef="#br0" timeOffset="23156.379">24836 2364 0,'0'0'0,"0"17"0,0 54 16,17 17-1,18-17-15,-17-36 16,17-18-16,36 1 16,-36-18-16,18 0 0,0-70 15,-35 34-15,17-52 16,-35 53-16,0-18 15,0 18-15,0-1 16,-35 1 0,35 53-1,0 52 1,0-34-16,17-1 0,1 0 16,17 0-16,18 36 0,-18-53 15,18 17 1</inkml:trace>
   <inkml:trace contextRef="#ctx0" brushRef="#br0" timeOffset="23420.1491">25471 2364 0,'-36'17'15,"72"-34"-15,-89 52 16,35-17-16,18 34 0,0-16 15,18-19-15,-1 19 16,36-1-16,-18-17 16,36 17-16,-53-35 15,-54 0 1,-34 0 0,35 0-1,-1-18-15,19 18 0,-19 0 16,36-17-16</inkml:trace>
   <inkml:trace contextRef="#ctx0" brushRef="#br0" timeOffset="23580.2253">25718 2469 0,'0'0'0,"0"36"15,0-1-15,17 18 16,-17-35-1,35 17-15,-17-35 16,0 17-16,-1-17 0,1 0 16</inkml:trace>
   <inkml:trace contextRef="#ctx0" brushRef="#br0" timeOffset="23919.5026">25770 2540 0,'0'0'15,"0"-18"-15,18 18 16,0 18-16,-1-18 15,19 18 1,-19-1-16,1-17 0,0 18 16,-1-18-16,1 35 15,-1-17-15,1-1 0,0 1 16,-1 53-16,1-36 16,0 53-16,-1-53 15,-17 54 1,0-72-16,0 1 0,-17 0 15,-1-1-15,0-17 16,-17-17-16,17-1 16,-17-35-16,35 18 15,18-36-15,-1 18 16,36-35 0,0 70-16,18-35 15,-36 36-15,18-1 16,-35 1-16,-1 17 15</inkml:trace>
@@ -2574,9 +2574,9 @@
   <inkml:trace contextRef="#ctx0" brushRef="#br0" timeOffset="28880.0056">30709 1870 0,'36'0'15,"-36"17"-15,0 19 16,-18-19-16,0 19 16,18-1-16,0 0 15,0-17 1,0 17-16,18-17 16,-18-1-16,18 1 15,-1 0-15,-17-1 16,18 1-1,-18 0-15,0-1 16,-18-17 0,1 0-1,-1 0-15,0 0 16,-17 18 0</inkml:trace>
   <inkml:trace contextRef="#ctx0" brushRef="#br0" timeOffset="29004.7838">31009 2311 0,'18'0'16,"-36"-18"0</inkml:trace>
   <inkml:trace contextRef="#ctx0" brushRef="#br0" timeOffset="39458.1225">27517 3440 0,'17'0'0,"1"17"16,0 36 0,-18-35-16,0 17 0,17 0 15,-17 1-15,0-1 16,18 18-16,-18-36 15,0 1-15,18 0 0,-18-1 16,17 1 0,1-18-16</inkml:trace>
-  <inkml:trace contextRef="#ctx0" brushRef="#br0" timeOffset="40036.5235">27905 3651 0,'0'0'0,"0"18"16,0 0 0,17-1-1,1 1-15,0-18 0,-1 17 16,36 1-16,-35-18 16,17 0-1,-17 0-15,-1 0 16,-17-18-1,-17 1-15,17-1 16,-18-17 0,0 17-16,18-17 0,-17 17 15,17 1 1,17-1-16,1 18 16,0 0-1,-1 0-15,19-18 16,-19 18-16,1 0 0,17 0 15,-17 0 1,17 18-16,-35 0 16,18 17-1,-18-17-15,0-1 0,0 19 16,0-19 0,17 1-16,1-1 15,0-17-15,17 0 16,-17 0-16,-1-17 15,1-1-15,-18 1 16,-18-19 0,18 19-16,-35-1 15,17 0-15,1 1 16,-1 17-16,18-18 16,18 36 15</inkml:trace>
+  <inkml:trace contextRef="#ctx0" brushRef="#br0" timeOffset="40036.5234">27905 3651 0,'0'0'0,"0"18"16,0 0 0,17-1-1,1 1-15,0-18 0,-1 17 16,36 1-16,-35-18 16,17 0-1,-17 0-15,-1 0 16,-17-18-1,-17 1-15,17-1 16,-18-17 0,0 17-16,18-17 0,-17 17 15,17 1 1,17-1-16,1 18 16,0 0-1,-1 0-15,19-18 16,-19 18-16,1 0 0,17 0 15,-17 0 1,17 18-16,-35 0 16,18 17-1,-18-17-15,0-1 0,0 19 16,0-19 0,17 1-16,1-1 15,0-17-15,17 0 16,-17 0-16,-1-17 15,1-1-15,-18 1 16,-18-19 0,18 19-16,-35-1 15,17 0-15,1 1 16,-1 17-16,18-18 16,18 36 15</inkml:trace>
   <inkml:trace contextRef="#ctx0" brushRef="#br0" timeOffset="40315.9349">28593 3616 0,'0'18'0,"0"17"15,17 0-15,-17 0 16,18-17-16,17 0 16,0-18-16,18 0 15,-17-18-15,17-17 16,-36 17-16,1-35 16,-18 36-16,-35-19 15,17 19-15,-35-1 16,35 18-16,-35 18 15,18-18 1</inkml:trace>
-  <inkml:trace contextRef="#ctx0" brushRef="#br0" timeOffset="42439.2612">25277 3387 0,'-18'53'0,"0"-18"16,18 88-16,0-70 15,18 0-15,-18 18 16,35-18-16,18 35 15,-18-53-15,1-17 0,17-1 16</inkml:trace>
+  <inkml:trace contextRef="#ctx0" brushRef="#br0" timeOffset="42439.2611">25277 3387 0,'-18'53'0,"0"-18"16,18 88-16,0-70 15,18 0-15,-18 18 16,35-18-16,18 35 15,-18-53-15,1-17 0,17-1 16</inkml:trace>
   <inkml:trace contextRef="#ctx0" brushRef="#br0" timeOffset="42760.5476">25612 3669 0,'0'0'15,"-36"18"-15,19-1 0,-19 18 16,36-17-16,0 0 16,18-1-16,0 1 15,-1-18-15,1 18 0,0-18 16,-1 0-16,36-18 16,-35 18-16,0-35 15,-18 17-15,0-17 16,0 0-16,-18 17 15,18 0-15,18 36 32,-1 0-17,18-1-15,-17 1 0,0-1 16,52 19 0,-52-19-16,0-17 15</inkml:trace>
   <inkml:trace contextRef="#ctx0" brushRef="#br0" timeOffset="42999.9292">25964 3616 0,'0'0'16,"-17"35"-16,-1-17 0,18 17 15,18-17-15,-1 17 16,1-17-16,0-1 15,-1 1-15,-17 0 16,-17-1 0,-19-17-1,1 0-15,0 0 16,17 0-16</inkml:trace>
   <inkml:trace contextRef="#ctx0" brushRef="#br0" timeOffset="43434.8384">26388 3704 0,'0'18'32,"0"-1"-32,0 1 15,0 0-15,0-1 0,17 1 16,-17 0-16,18-18 0,0 17 15</inkml:trace>
@@ -2585,7 +2585,7 @@
   <inkml:trace contextRef="#ctx0" brushRef="#br0" timeOffset="44485.2828">26811 3651 0,'0'53'15,"0"-106"-15,0 124 0,18-36 16,-18-17-16,0-1 16,17-17-1,-17-17-15,0-1 0,18 0 16,0-17 0,-1-18-16,-17 36 15,18-19-15,0 36 16,-18 18-1,0 0-15,0-1 0,0 1 16,17 17-16,-17 0 16,18-17-16,0-18 31,-18-18-31,17 1 16,-17-1-16,18 1 15,-1-1 1,1 18-1,-18 18-15,0-1 0,18 1 0,-18-1 16,0 1-16,0 17 16,17-35-16,-17 18 0,18-18 15</inkml:trace>
   <inkml:trace contextRef="#ctx0" brushRef="#br0" timeOffset="44689.6173">27182 3616 0,'17'0'16,"1"-18"-1,-1 18 1,1 0-16,0 0 15,-18 18-15</inkml:trace>
   <inkml:trace contextRef="#ctx0" brushRef="#br0" timeOffset="44779.3527">27182 3616 0,'0'0'16,"70"88"-16,-52-70 0,-1-18 0,36 0 15,-17 0-15</inkml:trace>
-  <inkml:trace contextRef="#ctx0" brushRef="#br0" timeOffset="45638.0294">29051 3246 0,'18'-18'16,"0"36"-16,17-1 15,0 1-15,0 17 16,18 0-16,0 18 0,0-17 16,-18 17-16,36 35 15,-53-35-15,-18 52 16,0-52-16,-71 36 16,36-72-16</inkml:trace>
+  <inkml:trace contextRef="#ctx0" brushRef="#br0" timeOffset="45638.0293">29051 3246 0,'18'-18'16,"0"36"-16,17-1 15,0 1-15,0 17 16,18 0-16,0 18 0,0-17 16,-18 17-16,36 35 15,-53-35-15,-18 52 16,0-52-16,-71 36 16,36-72-16</inkml:trace>
   <inkml:trace contextRef="#ctx0" brushRef="#br0" timeOffset="49490.4442">27481 3052 0,'18'0'46,"35"0"-46,-18 0 16,71 0-16,-35 0 16,-1-18-16,1 18 0,17-18 15,35 1 1,-70 17-16</inkml:trace>
   <inkml:trace contextRef="#ctx0" brushRef="#br0" timeOffset="49990.0855">29669 3069 0,'17'0'16,"54"0"-16,-18 0 15,17 0-15,1 0 16,17 0-16,0 0 0,0 0 0,1 0 16,87 0-16,-123 0 15,53 18 1,-89-18-16</inkml:trace>
   <inkml:trace contextRef="#ctx0" brushRef="#br0" timeOffset="51547.1175">26988 4022 0,'17'0'15,"18"17"-15,-17-17 16,88 0 0,-53-17-16,35 17 0,106-36 15,53 19 1,-124-1-16,124 18 16,-123 18-16,-1-18 15,-17 17-15,0-17 0,88 0 16,-123 0-16,-18 0 15</inkml:trace>
@@ -2601,7 +2601,7 @@
   <inkml:trace contextRef="#ctx0" brushRef="#br0" timeOffset="73820.5547">7355 5433 0,'0'0'15,"36"141"-15,-19-106 0,1 18 16,-18-35 0,-18-36-1,18-17 1,-17 0-16,17-1 0,-18-17 15,18 0-15,0 1 0,0-54 16,0 53-16,0 17 16,0-16-16,18 34 0,17-17 15,-17 35-15,17 17 16,-35 1-16,18 17 16,-36 0-16,-17-17 15,17 0-15,-17-1 16,17-17-1,-17-17-15,35-1 16,0 0-16</inkml:trace>
   <inkml:trace contextRef="#ctx0" brushRef="#br0" timeOffset="74821.527">7126 5168 0,'0'-17'16,"18"17"-16,-18-18 16,-18 18-1,18 18 1,-18-1-1,18 18 1,18 1-16,0-19 16,17 19-16,-17-36 15,-1 0-15,1 0 0,35-18 16,-35 0-16,-1-17 16,-17 17-16,-17-17 15,-1 18 1,-35 17-16,18 0 15,-1 0-15,19 17 16,-1-17-16</inkml:trace>
   <inkml:trace contextRef="#ctx0" brushRef="#br0" timeOffset="75067.7894">6950 5133 0,'0'0'0,"0"70"15,0-34-15,0 17 16,0 17-16,17-52 15,19 17-15,-19-35 16</inkml:trace>
-  <inkml:trace contextRef="#ctx0" brushRef="#br0" timeOffset="75593.2366">8449 5045 0,'0'0'0,"-18"0"15,1 0 1,-1 0-16,0 0 16,1 17-16,17 1 15,0 0 1,17-18-16,-17 17 16,18-17-16,0-17 15,-1-1 1,-17-17-1,0 17-15,-17 0 16,-1 18-16,0 0 16,18 18-1</inkml:trace>
+  <inkml:trace contextRef="#ctx0" brushRef="#br0" timeOffset="75593.2365">8449 5045 0,'0'0'0,"-18"0"15,1 0 1,-1 0-16,0 0 16,1 17-16,17 1 15,0 0 1,17-18-16,-17 17 16,18-17-16,0-17 15,-1-1 1,-17-17-1,0 17-15,-17 0 16,-1 18-16,0 0 16,18 18-1</inkml:trace>
   <inkml:trace contextRef="#ctx0" brushRef="#br0" timeOffset="75850.1344">8555 5133 0,'-18'0'16,"1"0"0,17-18-1,0 1-15,17-19 16,1 1 0,0 35-16,-1-18 15,1 18-15,17 18 16,-35 0-16,35 17 15,-35-17-15,18-1 16,-18 1 0,0 0-16,0-1 15</inkml:trace>
   <inkml:trace contextRef="#ctx0" brushRef="#br0" timeOffset="76341.0101">8326 5045 0,'0'0'0,"-18"-18"16,18 0-16,-18 18 0,1 0 15,-1 0 1,0 0-16,1 18 0,-1 17 15,0-17-15,18 35 16,18-18-16,0-17 16,17-1-16,0 1 15,18-18-15,-35-18 16,35 1 0,-36-1-16,1-17 15,-18 17-15,-18-17 16,1 17-16,-1 1 15,0-1-15,1 0 0,-1 18 0,1 0 16,-19 0-16</inkml:trace>
   <inkml:trace contextRef="#ctx0" brushRef="#br0" timeOffset="76951.0471">9296 4586 0,'17'0'15,"-17"18"-15,18 17 16,17 0-16,-17 1 0,17 17 16,53 35-16,-52-53 15,-1 18-15,71 17 16,-71-34-16,36 17 15,-36-36-15,18 1 16</inkml:trace>
@@ -2633,7 +2633,7 @@
   <inkml:trace contextRef="#ctx0" brushRef="#br0" timeOffset="89347.7249">13159 5680 0,'0'53'0,"0"-36"15,17 19-15,-17 16 16,0-16-16,18-19 15,0 1-15,-1 0 16,1-18-16,-1 0 0,1 0 16,17 0-16,-35-18 15</inkml:trace>
   <inkml:trace contextRef="#ctx0" brushRef="#br0" timeOffset="89514.1914">13370 5750 0,'0'0'0,"0"53"16,0-18-16,0 1 0,0-19 15,18 19-15,0-1 16,-1-35-16,1 0 0,17 0 16,-35-18-16</inkml:trace>
   <inkml:trace contextRef="#ctx0" brushRef="#br0" timeOffset="89792.0017">13529 5662 0,'18'0'16,"-1"0"0,19 0-1,-19 0-15,19 18 16,-19-18-16,18 17 15,-35 1-15,18 0 16,-18 17-16,18 0 0,-1 53 16,-17-52-16,18 17 15,-18-36-15,0 19 16,-18-36 15,-17 0-15,17 0-16,-17-18 0</inkml:trace>
-  <inkml:trace contextRef="#ctx0" brushRef="#br0" timeOffset="94346.0165">10936 5609 0,'0'-17'0,"0"-1"15,-18 0 1,1 1-1,-1 17 1,1 0-16,-19 0 16,19 0-16,-1 35 15,0-35-15,18 18 16,0-1-16,-17-17 16,17 35-16,17-17 15,1 0 1,-18-1-16,18 19 15,-18-19-15,0 19 16,17-19-16,-17 18 16,0-17-16,18-18 0,-18 18 15,-18-18 48,36 0-16,-18-18-32,18 18 1,-18 18 15,0-1-15,-18 1-1,18 0 17,-18-18-17,18-18 79,-17 18 62,-1 0-140,0 0 0,1 0-16,-19 0 15,19 0 1,-1 0-16,1 0 15,17-18-15,17 1 32,1 17-17,-1-18 1,1 18-16,0 0 16,-1 0-16,1 0 15,0 18-15,-1-18 16,1 0-16,-18 17 15,0 1 1,0 0-16,-18 17 16,1-17-16,17-1 15,-18 1 1,18 0-16,18-1 16,-1 1-1,1-18-15,0 17 16,-1-17-16,1 0 15,-1 0-15,1 0 0,0 0 16,-36 0 15</inkml:trace>
+  <inkml:trace contextRef="#ctx0" brushRef="#br0" timeOffset="94346.0164">10936 5609 0,'0'-17'0,"0"-1"15,-18 0 1,1 1-1,-1 17 1,1 0-16,-19 0 16,19 0-16,-1 35 15,0-35-15,18 18 16,0-1-16,-17-17 16,17 35-16,17-17 15,1 0 1,-18-1-16,18 19 15,-18-19-15,0 19 16,17-19-16,-17 18 16,0-17-16,18-18 0,-18 18 15,-18-18 48,36 0-16,-18-18-32,18 18 1,-18 18 15,0-1-15,-18 1-1,18 0 17,-18-18-17,18-18 79,-17 18 62,-1 0-140,0 0 0,1 0-16,-19 0 15,19 0 1,-1 0-16,1 0 15,17-18-15,17 1 32,1 17-17,-1-18 1,1 18-16,0 0 16,-1 0-16,1 0 15,0 18-15,-1-18 16,1 0-16,-18 17 15,0 1 1,0 0-16,-18 17 16,1-17-16,17-1 15,-18 1 1,18 0-16,18-1 16,-1 1-1,1-18-15,0 17 16,-1-17-16,1 0 15,-1 0-15,1 0 0,0 0 16,-36 0 15</inkml:trace>
   <inkml:trace contextRef="#ctx0" brushRef="#br0" timeOffset="95575.6648">11077 5821 0,'18'0'47,"0"17"-47,-1-17 16,18 0-16,-17 0 15,0-17-15,-1 17 16,-34 0 15</inkml:trace>
   <inkml:trace contextRef="#ctx0" brushRef="#br0" timeOffset="95897.6024">11148 5662 0,'0'18'31,"0"-1"-31,0 19 16,-18-19-16,18 36 15,0-18-15,0 1 16,0-1-16,0 18 16,18-35-16,-1 17 15,-17-17-15,18-18 16,0 17-16,-1-17 0,19 0 16,-36-17-1,17-1-15</inkml:trace>
   <inkml:trace contextRef="#ctx0" brushRef="#br0" timeOffset="96480.9917">11342 5556 0,'0'0'0,"17"0"15,1-17 1,0 17-16,17 17 0,-17 1 15,-1-18-15,1 18 16,0-1 0,-18 1-16,-18-1 15,18 1 1,-18-18-16,1 35 16,-1-17-1,18 35-15,0-18 16,0-17-16,35 17 15,-35-17-15,36 17 16,-19-17-16,1-1 16,-1 1-16,1 0 15,-18-1 1,18-17-16,-18 18 16,17 0-16,-17 17 15,0-18 1,-17 1-16,-1 0 15,0-18 1,1 0-16,-18-18 16,-1 18-16,19 0 15,-1-18-15,-17 18 0</inkml:trace>
@@ -2641,12 +2641,12 @@
   <inkml:trace contextRef="#ctx0" brushRef="#br0" timeOffset="101898.8109">6491 7514 0,'0'18'0,"0"52"16,0-17-16,0 18 0,0 70 16,0-53-16,0 53 15,0-88-15,0-18 16,0 1-16,0-19 15,0-34 1,-18-36 0,18 18-16,0-18 15,0 0-15,0 0 0,0-53 16,18 53-16,0-70 16,-1 52-16,19 0 15,-19 54-15,19-1 16,-1 18-16,0 35 15,-17 1-15,17 87 16,-35-52-16,18 52 16,-1-52-16,1 35 15,-18-71 1,0 18-16,0-18 16,-18 0-16,18-17 15</inkml:trace>
   <inkml:trace contextRef="#ctx0" brushRef="#br0" timeOffset="102043.8147">6526 7938 0,'36'0'16,"-72"0"-16,107-18 15,-36 18-15,1-18 16,-1 1-16,-18-1 15</inkml:trace>
   <inkml:trace contextRef="#ctx0" brushRef="#br0" timeOffset="102242.9494">6809 7338 0,'0'0'0,"0"-18"0,35 1 16,18-1 0,-18 18-16,0-18 15,-17 18-15</inkml:trace>
-  <inkml:trace contextRef="#ctx0" brushRef="#br0" timeOffset="102372.246">6879 7355 0,'0'0'16,"18"53"-16,-18-17 0,17-1 0,54 35 16,-53-52-1,35 0 1,-36-18-16,1 0 16</inkml:trace>
+  <inkml:trace contextRef="#ctx0" brushRef="#br0" timeOffset="102372.2459">6879 7355 0,'0'0'16,"18"53"-16,-18-17 0,17-1 0,54 35 16,-53-52-1,35 0 1,-36-18-16,1 0 16</inkml:trace>
   <inkml:trace contextRef="#ctx0" brushRef="#br0" timeOffset="102548.8753">7073 7444 0,'0'53'16,"0"-106"-16,0 123 0,18-35 15,-1-17-15,19-18 16,-19 0-16,-17-18 0</inkml:trace>
   <inkml:trace contextRef="#ctx0" brushRef="#br0" timeOffset="102810.2641">7250 7250 0,'35'17'16,"-70"-34"-16,88 52 0,-53-17 0,17-1 15,1 1-15,-1 35 16,1-18-16,-18-17 16,18 17-16,-18-17 0,0 17 15,0-18-15,-18 1 16,0-18-16,1 0 16,-1 0-16,1-18 15,-1 1-15,0-1 16</inkml:trace>
   <inkml:trace contextRef="#ctx0" brushRef="#br0" timeOffset="103049.3306">7638 7638 0,'35'0'16,"-17"0"-16,34-18 15,-34 18-15,17 0 16</inkml:trace>
   <inkml:trace contextRef="#ctx0" brushRef="#br0" timeOffset="103182.8326">7655 7814 0,'0'0'15,"36"0"-15,-19 0 0,1 0 0,35 0 16,-18 0-1,-17 0-15</inkml:trace>
-  <inkml:trace contextRef="#ctx0" brushRef="#br0" timeOffset="104029.4436">8767 7743 0,'0'-35'0,"0"70"0,0-87 16,-18 52-16,0-18 15,1 18-15,-36 35 16,35-17-16,-17 52 16,17-34-16,1 34 15,17-34-15,17-1 16,1-35-16,35 17 15,-36-34-15,36-1 16,-35 1-16,0-19 16,-18 19-1,17-19-15,-17 54 16,35 35 0,-17-18-16,17 71 15,-17-35-15,17 34 16,-17-52-1,-18-17-15,0 16 16,-18-34-16,-35 0 16,36-1-16,-54-34 15,36-1-15,-36-35 16,54 18-16,-19-53 16,19 35-16,17-71 15,0 71-15</inkml:trace>
+  <inkml:trace contextRef="#ctx0" brushRef="#br0" timeOffset="104029.4435">8767 7743 0,'0'-35'0,"0"70"0,0-87 16,-18 52-16,0-18 15,1 18-15,-36 35 16,35-17-16,-17 52 16,17-34-16,1 34 15,17-34-15,17-1 16,1-35-16,35 17 15,-36-34-15,36-1 16,-35 1-16,0-19 16,-18 19-1,17-19-15,-17 54 16,35 35 0,-17-18-16,17 71 15,-17-35-15,17 34 16,-17-52-1,-18-17-15,0 16 16,-18-34-16,-35 0 16,36-1-16,-54-34 15,36-1-15,-36-35 16,54 18-16,-19-53 16,19 35-16,17-71 15,0 71-15</inkml:trace>
   <inkml:trace contextRef="#ctx0" brushRef="#br0" timeOffset="104355.5459">9013 7426 0,'18'0'16,"-36"0"-16,54 0 15,-19 0-15,1 0 16,0 0 0,-36 0 15,0 0-15,1 0-16,-1 0 0,18 35 15,0-17-15,0 35 16,0-18-16,35 18 15,-17-18-15,35-17 16,-35 0 0,17-18-16,-17 0 15,-1-18-15,1 18 0</inkml:trace>
   <inkml:trace contextRef="#ctx0" brushRef="#br0" timeOffset="104529.2067">9278 7497 0,'0'52'0,"0"-104"0,0 122 16,0-52-16,18-18 16,-18 17-16,17-17 0,1 18 15,0-18-15,-18-18 0</inkml:trace>
   <inkml:trace contextRef="#ctx0" brushRef="#br0" timeOffset="104800.7021">9402 7391 0,'0'0'0,"17"-18"16,1 18-16,-1 0 15,19 0 1,-19 0-16,19 35 15,-36-17-15,35 17 16,-35 1-16,18 16 16,-18-34-16,0 0 31,0-1-31,-18-17 16,0 0-16,1 0 15,-1 0-15,0 0 16</inkml:trace>
@@ -2656,8 +2656,8 @@
   <inkml:trace contextRef="#ctx0" brushRef="#br0" timeOffset="106214.2519">10918 7303 0,'36'-18'15,"-72"36"-15,89-36 0,0 0 16,-17 18-16,-1-17 15,-17 17-15,-36 0 32,0 17-17</inkml:trace>
   <inkml:trace contextRef="#ctx0" brushRef="#br0" timeOffset="106347.6071">10989 7303 0,'-18'17'16,"36"-52"-16,-18 53 0,-18 17 0,18 0 15,18-17-15,-18 17 16,18-17-16,-1-1 0,-17 1 15,18 0-15,0-1 0,-1-17 16,1 18-16,0-18 16,-1-18-16,1 18 15</inkml:trace>
   <inkml:trace contextRef="#ctx0" brushRef="#br0" timeOffset="106532.4394">11236 7355 0,'0'36'15,"0"-19"-15,0 1 0,18 17 16,-1-17-16,1 0 16,0-18-16,-1 0 15</inkml:trace>
-  <inkml:trace contextRef="#ctx0" brushRef="#br0" timeOffset="106820.4482">11342 7285 0,'17'-18'16,"1"18"-16,0 0 15,-1 0-15,19 0 16,-19 0-16,1 18 15,-18 0 1,0 17-16,18-18 0,-1 36 16,-17-35-16,18 35 15,-18-35-15,17-1 16,-17 1-16,-17-18 16,-1 0-1,1 0 1,-1-18-1,0 18-15</inkml:trace>
-  <inkml:trace contextRef="#ctx0" brushRef="#br0" timeOffset="107165.4978">11712 7197 0,'18'0'16,"0"35"-1,17-17-15,0 17 16,18 53-16,-35-35 16,17 106-1,-17-89-15,-18 18 0,17 1 16,-17-19-16,-35 71 16,17-88-16,1-17 0,-54 34 15,36-35-15,-53-17 16</inkml:trace>
+  <inkml:trace contextRef="#ctx0" brushRef="#br0" timeOffset="106820.4481">11342 7285 0,'17'-18'16,"1"18"-16,0 0 15,-1 0-15,19 0 16,-19 0-16,1 18 15,-18 0 1,0 17-16,18-18 0,-1 36 16,-17-35-16,18 35 15,-18-35-15,17-1 16,-17 1-16,-17-18 16,-1 0-1,1 0 1,-1-18-1,0 18-15</inkml:trace>
+  <inkml:trace contextRef="#ctx0" brushRef="#br0" timeOffset="107165.4977">11712 7197 0,'18'0'16,"0"35"-1,17-17-15,0 17 16,18 53-16,-35-35 16,17 106-1,-17-89-15,-18 18 0,17 1 16,-17-19-16,-35 71 16,17-88-16,1-17 0,-54 34 15,36-35-15,-53-17 16</inkml:trace>
   <inkml:trace contextRef="#ctx0" brushRef="#br0" timeOffset="108801.8976">6068 6332 0,'-18'0'0,"36"0"110,-1 0-95,1 18 1,0-18-16,17 0 16,-17 0-16,35-18 15,-18 18-15,35-17 16,-52 17-16,35 0 15,-35 0-15,-18-18 16,17 18-16,1 0 0,-1 0 31,-34 0-15,17 18 31,0-1-47,-18 1 15,18 0 1,-17-18-16,-1 35 16,18-17-16,-18-1 0,18 1 15,-17 52 1,-1-34-16,18 34 16,0-52-16,0 17 15,0-17-15,0 17 0,0 0 16,-18-17-16,18 0 15,0-1 1,-17-17-16,17 18 16,-18-18-16,0 0 31,18 18-15,-17-18-16,-1 17 15,18 1 1,-17-18-1,34 0 17,1 0-1,-1 0-31,1 0 16,17-18-1,-17 18-15,35-17 16,-18 17-16,18-18 15,-18 18-15,-17 0 16,17 0-16,1 0 0,-1 0 16,35 0-16,-34 0 15,-19 0 1,-17-18 0,-17 18-1,-1 0 1,0-17-16,1-1 15</inkml:trace>
   <inkml:trace contextRef="#ctx0" brushRef="#br0" timeOffset="109161.7707">6138 6703 0,'0'0'16,"0"-18"-1,18 18 1,0 0-1,17 0-15,0-17 16,0 17-16,54-18 16,-54 0-1,35 1-15,-34 17 16,-19-18-16,-17 36 31,-35-1-15,17 1-16</inkml:trace>
   <inkml:trace contextRef="#ctx0" brushRef="#br0" timeOffset="112814.0841">6950 8661 0,'0'0'0,"0"17"31,0 1-16,0 0-15</inkml:trace>
@@ -2680,7 +2680,7 @@
   <inkml:trace contextRef="#ctx0" brushRef="#br0" timeOffset="121807.7289">10883 9666 0,'0'0'0,"-17"0"15,-1 35 1,0 1-16,1-1 16,17 106-16,-18-70 15,18 17-15,0-18 16,18 71-16,-18-88 16,35 36-16,-17-54 15,34 18-15,-16-36 16,34-17-1,-34-17-15,-19-1 16</inkml:trace>
   <inkml:trace contextRef="#ctx0" brushRef="#br0" timeOffset="122141.2258">11165 9913 0,'0'0'0,"18"0"0,0 0 15,-1-18-15,1 18 0,17 0 16,53-17-16,-52 17 16,-1 0-16,36 35 15,-36-17-15,0 35 16,-35-18-16,0 35 16,-18-34-16,1-1 15,-1 0-15,-17 1 0,17 34 16,1-35-16,17 1 15,17-19 1,1-17-16,17 18 0,0-18 16,18-18-16,-17 18 15,-1-17-15,-35-1 16,-18 0 0,1 18-16,-19-17 15</inkml:trace>
   <inkml:trace contextRef="#ctx0" brushRef="#br0" timeOffset="122286.894">11395 10160 0,'0'0'16,"53"0"-16,-36 0 0,1 0 16,17 0-16,-17 0 0,-1 0 0,19 0 15,-1-18 1,-17 1-16</inkml:trace>
-  <inkml:trace contextRef="#ctx0" brushRef="#br0" timeOffset="122546.9428">11730 9543 0,'18'0'0,"17"0"16,18 0 0,-18-18-16,0 18 0,18-18 15,-18 18-15,-17-17 16</inkml:trace>
+  <inkml:trace contextRef="#ctx0" brushRef="#br0" timeOffset="122546.9427">11730 9543 0,'18'0'0,"17"0"16,18 0 0,-18-18-16,0 18 0,18-18 15,-18 18-15,-17-17 16</inkml:trace>
   <inkml:trace contextRef="#ctx0" brushRef="#br0" timeOffset="122753.3108">11800 9543 0,'0'35'0,"0"-70"0,0 105 16,0-52-16,0 35 15,0-18-15,18 18 16,-18-35-16,35 17 16,-17-35-16,17 18 15,-17-18-15,0 0 16,-1 0-16,1-18 0,-1 18 16</inkml:trace>
   <inkml:trace contextRef="#ctx0" brushRef="#br0" timeOffset="123117.0778">12153 9525 0,'-17'0'15,"34"0"1,-17 18-16,0-1 16,0 19-16,0-19 15,0 1-15,0 17 16,18 0-1,-1-17-15,1 0 16,0-18-16,-1 0 16,19 0-16,-19 0 15,1-18 1,0 0-16</inkml:trace>
   <inkml:trace contextRef="#ctx0" brushRef="#br0" timeOffset="123442.2496">12330 9507 0,'0'18'16,"35"-18"-16,-17 0 16,-1 0-16,36 0 15,-35 0-15,17 18 16,-17-18-16,-18 17 15,0 19-15,17-19 16,-17 36-16,0-35 16,0-1-16,0 1 0,0 0 15,18-1-15,-36-17 32,1 0-32,-1 0 15,0 0 1,1 0-16,17-17 31</inkml:trace>
@@ -2696,7 +2696,7 @@
   <inkml:trace contextRef="#ctx0" brushRef="#br0" timeOffset="136818.1589">18362 7426 0,'18'53'16,"-1"-35"-16,-17 52 16,18-35-16,0-17 0,-18 0 15,35-1-15,-17-34 16,-18-1-1,0-17-15,0 17 16,0-17-16</inkml:trace>
   <inkml:trace contextRef="#ctx0" brushRef="#br0" timeOffset="136923.2936">18450 7303 0,'0'0'16,"18"52"-16,-18-34 15</inkml:trace>
   <inkml:trace contextRef="#ctx0" brushRef="#br0" timeOffset="137461.8283">18556 7532 0,'0'-35'15,"0"70"-15,0-88 0,18 35 16,-18 1-16,17 17 15,1 17 1,-18 1-16,18 0 16,-1-18-1,1 17-15,0-17 32,-1-17-32,1 17 31,-18 17-16,18-17-15,-18 18 16,17-1-16,-17 1 16,35 35-16,-35-18 15,18 1-15,17 52 16,-17-35-16,0-18 16,-1 18-16,1-18 0,0 0 15,-36-52 1,0-36-1,18 0 1,-17-35-16,17 52 16,0-69-16,0 52 15,17 0-15,-17 18 0,36-18 16,-19 53-16,1 0 16,-1 17-16,-17 1 15,0 17 1,-17-17-16,-1-1 15,1 1-15,-1-18 0,-17 0 16,17-18-16,0 18 0,1-35 16</inkml:trace>
-  <inkml:trace contextRef="#ctx0" brushRef="#br0" timeOffset="137672.8812">19032 7056 0,'0'0'0,"-17"17"16,17 18-16,0 54 15,17-54-15,1 71 16,0-71-16,-1 18 0,1-18 16,17 36-1,-17-36-15,-1 0 16</inkml:trace>
+  <inkml:trace contextRef="#ctx0" brushRef="#br0" timeOffset="137672.8811">19032 7056 0,'0'0'0,"-17"17"16,17 18-16,0 54 15,17-54-15,1 71 16,0-71-16,-1 18 0,1-18 16,17 36-1,-17-36-15,-1 0 16</inkml:trace>
   <inkml:trace contextRef="#ctx0" brushRef="#br0" timeOffset="138168.2591">19191 7514 0,'0'0'16,"35"0"-16,-17 0 0,0-17 0,17 17 15,-17 0-15,-18-18 16,0 0-1,-36 18 1,19-17-16,-1 17 0,0 0 16,1 17-1,17 1-15,0 17 16,17-17-16,1-1 16,0-17-16,35 18 15,-36 0-15,19-18 16,-36-18-16,17 0 15,1 18-15,-18-35 16,0 18-16,0 34 31,17 1-31,-17-1 16,18 1 0,0-18-16,-1 0 15,-17-18 1,0 1-16,0-1 15,0 1 1,18 17 0,17 17-1,-17-17-15,0 18 0,-1-18 16,1 17-16,-1-17 16,1 0-16,-36 0 31</inkml:trace>
   <inkml:trace contextRef="#ctx0" brushRef="#br0" timeOffset="138519.5758">19632 7479 0,'0'18'15,"0"-36"-15,18 36 0,17-1 16,-17-17-16,-1-17 16,1 17-1,0-18-15,-1 0 16,-17 1-16,0-1 31</inkml:trace>
   <inkml:trace contextRef="#ctx0" brushRef="#br0" timeOffset="138751.6501">19703 7320 0,'0'0'15,"0"18"-15,-18-18 0,0 35 16,18-17-16,-17 35 16,17-18-1,0 18-15,0-36 16,17 19-16,19-1 15,-19-35-15,19 18 16,-19-18-16,18 0 16,-17-18-1,-18 0 1,0 1-16</inkml:trace>
@@ -2719,18 +2719,18 @@
   <inkml:trace contextRef="#ctx0" brushRef="#br0" timeOffset="145459.1727">20549 8502 0,'0'-18'16,"0"36"-16,18-36 0,0-17 15,-18 17 1,0 1-16,-18 17 15,0 0 1,1 0-16,-1 17 0,18 1 16,0 0-1,0 17-15,18-17 16,35-18-16,-36 0 16,19 0-1,-19 0-15,1-18 0,-1 18 16,-17-18-1,0 36 1,18-18 0,-18 18-16,18-18 15,-1 17-15,1-17 16,-18 18 0,-18-18-1,1 0-15,-1 0 16,0 0-1,1 0-15,-1 0 16</inkml:trace>
   <inkml:trace contextRef="#ctx0" brushRef="#br0" timeOffset="145704.1624">20726 8079 0,'0'0'0,"0"-18"0,35 18 0,36 0 15,-36 18 1,18-1-16,0 36 16,0-18-16,-18 18 0,18 53 15,-36-53-15,-17 0 0,-17 53 16,-1-71-16,-52 36 15,34-36-15,1-17 16,0-1-16,-18 1 16</inkml:trace>
   <inkml:trace contextRef="#ctx0" brushRef="#br0" timeOffset="164767.4342">4763 11060 0,'0'0'0,"-18"-18"16,0 0-16,-17 18 15,-18 0 1,35 0-16,-17 18 0,-35 53 15,34-19-15,1 72 16,17-54-16,18 1 16,0 70-16,18-70 15,0-18-15,17 0 16,0-18-16,53 18 16,-17-36-16,35-17 15,-53-17-15,35-19 16,-53 1-16,18-35 15,-35 34-15,-18-17 16,-18 36-16,-17 17 16,0 17-1,17 1-15,0 17 16,18-17-16,0 17 0,18 18 16,17-18-16,18 1 15,0-36-15,35 0 16,-53-18-16,36 0 15,-53 1-15,-1-18 16,-17 17-16,-17-17 16,-1 17-16,-35-35 15,18 35-15,-36 1 16,36-1-16,17 18 16,1 0-16,17 18 15</inkml:trace>
-  <inkml:trace contextRef="#ctx0" brushRef="#br0" timeOffset="165184.859">5468 11695 0,'0'53'16,"0"-106"-16,0 123 0,-18-70 0,18 18 0,0-36 31,18-17-16,-18 17-15,0-17 16,0 0-16,0-18 16,0 35-16,18 0 15,-1 18 1,1 36-16,0-19 16,-18 19-16,17-19 0,-17 36 15,18-35-15,0 0 16,-1-18 15,-17-36-31,18 19 16,-18-19-16,17 1 15,1 17 1,-18 36-16,0 17 16,0 18-1,18-35-15,-1 17 16,-17-17-16,18-1 15,0-17-15,-1 18 0</inkml:trace>
+  <inkml:trace contextRef="#ctx0" brushRef="#br0" timeOffset="165184.8589">5468 11695 0,'0'53'16,"0"-106"-16,0 123 0,-18-70 0,18 18 0,0-36 31,18-17-16,-18 17-15,0-17 16,0 0-16,0-18 16,0 35-16,18 0 15,-1 18 1,1 36-16,0-19 16,-18 19-16,17-19 0,-17 36 15,18-35-15,0 0 16,-1-18 15,-17-36-31,18 19 16,-18-19-16,17 1 15,1 17 1,-18 36-16,0 17 16,0 18-1,18-35-15,-1 17 16,-17-17-16,18-1 15,0-17-15,-1 18 0</inkml:trace>
   <inkml:trace contextRef="#ctx0" brushRef="#br0" timeOffset="165499.0751">5803 11853 0,'0'0'0,"0"36"0,18 17 0,-1-36 16,1 54-16,0-54 15,-1 19 1,-17-19-16,0-34 16,-17-1-16,-1-35 15,18 18-15,-18 0 16,18-1-16,0-17 0,0-35 16,18 35-1,17-17-15,-17 52 16,17 18-16,-17 18 15,-18 35-15,0-36 16,-18 54-16,1-54 16,-19 19-1,19-19-15,17-34 16,0-1 0</inkml:trace>
   <inkml:trace contextRef="#ctx0" brushRef="#br0" timeOffset="165792.2056">6050 11712 0,'0'0'0,"0"18"0,0 0 15,0-1-15,18 1 16,-1-18-16,19 17 16,-19-17-1,19-17-15,-19-1 16,1 1-16,-18-1 15,18 0-15,-18 1 0,-18 17 16,18-36 0,0 54-1,0 0 1,18-1-16,-1 19 16,1-19-16,17 1 15,-17-18-15,-1 0 16</inkml:trace>
   <inkml:trace contextRef="#ctx0" brushRef="#br0" timeOffset="165951.9883">6297 11589 0,'0'0'16,"18"0"-16,-1 0 0,36 0 16,-17-18-1,-1 18-15,-18-18 16,19 18-16,-36-17 15,-36 17 1,36-18-16</inkml:trace>
   <inkml:trace contextRef="#ctx0" brushRef="#br0" timeOffset="166130.8049">6403 11218 0,'0'71'15,"18"-18"-15,-18 70 16,17-52-16,-17-18 0,0 0 16,18 0-16,-1 35 15,-17-53-15,36 0 16,-36-17-16,17-18 16,1 0-16</inkml:trace>
-  <inkml:trace contextRef="#ctx0" brushRef="#br0" timeOffset="166447.3834">6632 11659 0,'0'0'16,"36"18"-16,-19-18 16,18 0-16,-35-18 15,18 1 1,0-19-16,-18 19 0,-18-19 15,0 19-15,1-1 16,-1 18-16,1-17 0,-1 17 16,-17 0-16,17 17 15,18 54-15,18-36 16,17 36-16,0-36 16,0 0-16,1-17 15,52 17-15,-53-35 16,0 0-16,-17 0 0,17-18 15,-17 18-15,-36-17 16</inkml:trace>
+  <inkml:trace contextRef="#ctx0" brushRef="#br0" timeOffset="166447.3833">6632 11659 0,'0'0'16,"36"18"-16,-19-18 16,18 0-16,-35-18 15,18 1 1,0-19-16,-18 19 0,-18-19 15,0 19-15,1-1 16,-1 18-16,1-17 0,-1 17 16,-17 0-16,17 17 15,18 54-15,18-36 16,17 36-16,0-36 16,0 0-16,1-17 15,52 17-15,-53-35 16,0 0-16,-17 0 0,17-18 15,-17 18-15,-36-17 16</inkml:trace>
   <inkml:trace contextRef="#ctx0" brushRef="#br0" timeOffset="168849.4668">8290 11395 0,'-53'17'16,"36"1"-16,-1 35 16,0-18-16,18 36 15,0-36-15,18 0 16,17 1-16,-17-19 16,35-17-16,-35 0 15,34-17 1,-34-1-16,0-17 15,-1 35-15,-17 17 32,18 19-32,0-19 15,17 19-15,-17-19 16,-1-17-16,36 0 16,-18 0-16,1-35 15,-19 17-15,-17-35 16,-17 36-16,-36-19 15,35 36-15,-52-17 16,34 17-16,19 17 16</inkml:trace>
   <inkml:trace contextRef="#ctx0" brushRef="#br0" timeOffset="169100.0998">8855 11536 0,'0'0'0,"-36"17"16,19 1-16,-1-18 0,18 18 15,0-1-15,53 19 16,-18-36-16,18 35 16,-35-17-1,17-1-15,-35 1 16,0 0-16,-53-1 15,18-17-15,-18 18 16,18-18-16,0 0 16,17 0-1</inkml:trace>
   <inkml:trace contextRef="#ctx0" brushRef="#br0" timeOffset="169255.1559">9031 11642 0,'35'17'16,"1"-17"0,17 0-16,-36 0 15,19-17-15,16-1 16,-34 18-16,-18-18 16</inkml:trace>
   <inkml:trace contextRef="#ctx0" brushRef="#br0" timeOffset="169467.1115">9102 11359 0,'17'53'0,"1"53"16,-18 0 0,18-71-16,-18 18 15,17 18-15,1-54 16,17 36-16,0-53 15,18 18-15,-17-18 16,17 0-16,-36 0 16,1-18-16</inkml:trace>
   <inkml:trace contextRef="#ctx0" brushRef="#br0" timeOffset="170212.5772">10813 11218 0,'0'0'16,"17"0"-1,36 0-15,0 0 16,-18 0-16,71-17 16,-70-1-16,16 18 15,-34 0-15,-36 0 32,-34 18-32,16-1 15,19 1-15,-19 35 16,36-18-16,18 53 15,0-35-15,17-17 0,35 52 16,-17-71 0,18 36-16,-53-35 15,-1 17-15,-34-17 16,-19 0-16,1-18 16,-71 0-16,53 0 15,-35-18 1,53 18-16,-18-18 15,35 18-15,36 0 16,-1-17-16,36-1 16,-17 18-16</inkml:trace>
-  <inkml:trace contextRef="#ctx0" brushRef="#br0" timeOffset="170673.8364">11871 11395 0,'18'0'15,"-1"0"1,1 0-16,17 0 16,0 0-16,1 0 0,-1 0 0,0-18 15,1 18 1,-19 0-16</inkml:trace>
+  <inkml:trace contextRef="#ctx0" brushRef="#br0" timeOffset="170673.8363">11871 11395 0,'18'0'15,"-1"0"1,1 0-16,17 0 16,0 0-16,1 0 0,-1 0 0,0-18 15,1 18 1,-19 0-16</inkml:trace>
   <inkml:trace contextRef="#ctx0" brushRef="#br0" timeOffset="170813.1543">11889 11536 0,'35'17'0,"-70"-34"0,105 52 15,1-35-15,-36 0 16,0 0-16,18 0 15,-35 0 1</inkml:trace>
   <inkml:trace contextRef="#ctx0" brushRef="#br0" timeOffset="179255.743">13353 11024 0,'-18'0'15,"18"18"1,18 17-1,-18 18-15,0-35 0,17 35 16,-17-18 0,18 18-16,-18-35 15,0-1-15,0 1 0,18-18 16,-18 17-16</inkml:trace>
   <inkml:trace contextRef="#ctx0" brushRef="#br0" timeOffset="179638.3113">12718 11536 0,'0'0'15,"-18"0"-15,0 0 0,36 0 32,35-18-32,-35 18 15,34 0-15,-16 0 16,34 18 0,-34-18-16,69 17 15,-52-17-15,88 0 16,-52 0-16,87 0 15,-70 0-15,70-17 16,-88 17-16,71 0 16,-88 0-16,35 0 15,-71 0-15,0 0 16,-52 0 0,-19 0-16</inkml:trace>
@@ -2739,10 +2739,10 @@
   <inkml:trace contextRef="#ctx0" brushRef="#br0" timeOffset="185343.5348">15487 11077 0,'18'-17'15,"-1"17"-15,-17-18 16,18 0 0,-36 1-1,1 17 1,-1-18-16,-17 18 15,-1 0-15,-17 0 0,-52 18 16,34-18-16,-52 35 16,70-35-1,-35 18-15,70-1 16,36 19-16,-1-19 16,71 36-16,-35-53 15,88 35-15,-70-35 16,35 0-16,-53 0 15,-36 18 1,-52 0-16,-53 35 16,-53 17-1,70-35-15,-17 36 16,53-53-16,35 17 16,17-18-16,72 1 15,-19 0-15,-17-18 16,18 0-16,17 0 0,-35 0 15,70 0-15,-88 0 16,1 0-16,-54 17 16,-17-17-1</inkml:trace>
   <inkml:trace contextRef="#ctx0" brushRef="#br0" timeOffset="185699.6149">14958 11994 0,'0'18'32,"0"17"-17,17 1-15,-17-19 16,0 1-16,0 0 0,0-1 15,0 1-15</inkml:trace>
   <inkml:trace contextRef="#ctx0" brushRef="#br0" timeOffset="185850.8878">14940 11836 0,'0'-18'16,"18"18"-16,-1 0 0,1 0 16,0 0-1</inkml:trace>
-  <inkml:trace contextRef="#ctx0" brushRef="#br0" timeOffset="186000.4891">15099 11906 0,'35'0'15,"-17"0"-15,17 0 16</inkml:trace>
-  <inkml:trace contextRef="#ctx0" brushRef="#br0" timeOffset="186127.9885">15099 11977 0,'0'0'16,"35"0"-16,-17 0 15,17 0-15,0 0 16,18-18-16,-35 18 16</inkml:trace>
+  <inkml:trace contextRef="#ctx0" brushRef="#br0" timeOffset="186000.489">15099 11906 0,'35'0'15,"-17"0"-15,17 0 16</inkml:trace>
+  <inkml:trace contextRef="#ctx0" brushRef="#br0" timeOffset="186127.9884">15099 11977 0,'0'0'16,"35"0"-16,-17 0 15,17 0-15,0 0 16,18-18-16,-35 18 16</inkml:trace>
   <inkml:trace contextRef="#ctx0" brushRef="#br0" timeOffset="186278.7258">15434 11942 0,'0'0'16,"18"17"-16,-18 1 0,0-1 16,17-17-16,-17 18 15,18-18-15</inkml:trace>
-  <inkml:trace contextRef="#ctx0" brushRef="#br0" timeOffset="186801.0842">15117 10883 0,'17'0'16,"-34"0"-16,52-17 0,-18-1 16,1-17-16,0 17 0,-1-53 15,1 36 1,-18 18-16,0-19 15,0 1-15,0 0 0,-18 17 16,-17-17-16,17 35 16,1 17-1,17 1-15,0 0 0,0 52 16,17-17-16,19 53 16,-19-71-16,19 18 15,-19-18-15,19-17 0,-1 35 16,0-35-16,-35-1 15</inkml:trace>
+  <inkml:trace contextRef="#ctx0" brushRef="#br0" timeOffset="186801.0841">15117 10883 0,'17'0'16,"-34"0"-16,52-17 0,-18-1 16,1-17-16,0 17 0,-1-53 15,1 36 1,-18 18-16,0-19 15,0 1-15,0 0 0,-18 17 16,-17-17-16,17 35 16,1 17-1,17 1-15,0 0 0,0 52 16,17-17-16,19 53 16,-19-71-16,19 18 15,-19-18-15,19-17 0,-1 35 16,0-35-16,-35-1 15</inkml:trace>
   <inkml:trace contextRef="#ctx0" brushRef="#br0" timeOffset="188526.2615">16051 11289 0,'18'0'31,"17"-18"-31,-17 1 16,17-1-16,1-17 0,16-36 16,-34 36-1,17-53-15,-17 52 16,-18-34-16,0 52 16,0 1-16,-35-19 15,17 36 1,0 18-16,1 0 0,17 17 15,-18 88-15,18-52 16,0 105-16,-17-88 16,-1 54-16,18-72 15,-18 18-15,1-52 16,-19-1 0,1-35-16,0 0 15,17-18-15,0 1 16,1-1-16,17-17 0,17-18 15,1 17-15,53 19 16,-36 17-16,0 0 16,1 17-16,-1 1 0,35 35 15,-34-35-15,-1 35 16,-35-36-16,0 1 16,0 0-1,-18-18 1</inkml:trace>
   <inkml:trace contextRef="#ctx0" brushRef="#br0" timeOffset="188931.2643">16739 10848 0,'-17'18'16,"17"17"-16,-18 18 16,0 53-16,18-36 15,0 54-15,0-71 16,18 52 0,0-52-16,-1 35 15,1-70-15,17 35 16,-17-35-16,0-18 15,-1 0-15</inkml:trace>
   <inkml:trace contextRef="#ctx0" brushRef="#br0" timeOffset="216042.0908">17251 11377 0,'0'-18'15,"0"1"1,-18 17-16,18 17 16,0 1-16,0 35 15,18-35-15,-1 35 16,1-36-16,17 1 15,1-18-15,-1 0 16,-17-18-16,17-35 16,-17 36-16,-18-36 15,0 17-15,0 1 16,0 18 0,0 52-1,0 0-15,17 71 16,1-53-16,-1-18 15,19 53-15,-19-52 16,1 34-16,-18-52 16,-18 17-1,-17-17-15,-18-18 16,18-18-16,-36-17 16,36 17-16,-18-35 15,18 18-15,17 0 16,18-1-1</inkml:trace>
@@ -2799,7 +2799,7 @@
   <inkml:trace contextRef="#ctx0" brushRef="#br0" timeOffset="241318.8232">26211 10866 0,'18'0'15,"0"0"-15,-1 0 16,1 0-16,-36 17 47,18 1-32,0 17-15,0 18 16,0-35 0,18 35-16,0-18 15,-1-17-15,1-1 16,17 1-16,-17-18 15</inkml:trace>
   <inkml:trace contextRef="#ctx0" brushRef="#br0" timeOffset="241957.3081">26458 10936 0,'0'18'16,"0"-1"-1,18-17 1,-18 18-16,0 0 47,0-1 31,18-17 16,-18 18-94,0-36 31,17 18-15,-17-35-16,18 17 15,-18 1-15,0-1 16,0-17-16,0 17 15,-18 1-15,18-1 16,0 0-16,-17 18 16,17 18 15,-18 17-31,18 18 16,0-18-16,18 18 15,-1-35-15,1 35 16,0-35-16,-1-1 15,1-17 1,-1-17-16</inkml:trace>
   <inkml:trace contextRef="#ctx0" brushRef="#br0" timeOffset="242296.05">26635 10866 0,'17'0'31,"1"-18"-31,0 18 16,-1 0-16,1 0 16,0 0-16,-1 0 15,-17 18 1,0 34-16,0-16 15,-17-1-15,17 0 0,0 1 16,0 17-16,0-36 16,0 18-1,0-17-15,0-36 32,-18 1-32,18-1 15,-18 1 1</inkml:trace>
-  <inkml:trace contextRef="#ctx0" brushRef="#br0" timeOffset="242639.3265">26970 10901 0,'-18'70'16,"36"-140"-16,-36 176 0,18-53 15,0 35 1,18-35-16,-18 53 15,0-71-15,-18 35 16,18-34-16,0 17 16,0-36-16,0 1 15,0-1-15,18-17 16,-18-17 0,0-1-16</inkml:trace>
+  <inkml:trace contextRef="#ctx0" brushRef="#br0" timeOffset="242639.3264">26970 10901 0,'-18'70'16,"36"-140"-16,-36 176 0,18-53 15,0 35 1,18-35-16,-18 53 15,0-71-15,-18 35 16,18-34-16,0 17 16,0-36-16,0 1 15,0-1-15,18-17 16,-18-17 0,0-1-16</inkml:trace>
   <inkml:trace contextRef="#ctx0" brushRef="#br0" timeOffset="242872.0824">27164 10936 0,'0'0'0,"0"18"16,0-1-16,0 19 0,18 34 15,-18-34 1,0 16-16,17 1 0,-17 18 0,0 35 15,0-36 1,0-17-16,18 35 16,-18-52-16,17 17 15,-17-36-15,18 1 16</inkml:trace>
   <inkml:trace contextRef="#ctx0" brushRef="#br0" timeOffset="243142.8308">27446 11589 0,'18'35'15,"-18"-17"-15,0-1 16,0 1 0,0 0-16,17-1 0,-17 1 15,-17-18 17</inkml:trace>
   <inkml:trace contextRef="#ctx0" brushRef="#br0" timeOffset="243308.715">27446 11501 0,'0'-18'0,"18"18"16,-1 0-16,19 0 16,-19 0-16,1 0 15,0 18-15,-1-18 16</inkml:trace>
@@ -2815,11 +2815,11 @@
   <inkml:trace contextRef="#ctx0" brushRef="#br0" timeOffset="270397.221">29051 6244 0,'18'0'0,"-18"18"16,-18-1 0,18 1-16,-35 35 15,35-35-15,-18-1 16,1-17-16,17 18 16,-18 0-16,0-18 15</inkml:trace>
   <inkml:trace contextRef="#ctx0" brushRef="#br0" timeOffset="270658.0726">29298 5680 0,'0'17'0,"18"1"16,17 17-16,0 1 15,36-1-15,-36 0 16,1-17-16,-1 17 16,0-17-16,0 35 15,-17-36-15,0 1 16</inkml:trace>
   <inkml:trace contextRef="#ctx0" brushRef="#br0" timeOffset="270935.9676">29880 5768 0,'0'0'0,"0"-18"15,-17 18 1,-1 0-16,-17 0 15,17 18-15,-35 35 16,18 0-16,17-18 16,-17 36-16,35-36 15,0 35-15,0-34 16,35 34 0,1-34-16,16 52 15,-34-53-15,17 36 16,-17-54-16,-18 36 15,0-35-15,-18-1 16</inkml:trace>
-  <inkml:trace contextRef="#ctx0" brushRef="#br0" timeOffset="271575.647">28099 6703 0,'17'0'16,"-34"0"-16,52 0 0,-17-18 0,52 18 15,-34 0-15,105-17 16,-36 34-16,1-17 16,18 0-16,17 18 0,176-18 15,-158 17-15,176-17 16,-176 0-1,-36-17-15,-17 17 0,-35 0 16,-53-18-16</inkml:trace>
+  <inkml:trace contextRef="#ctx0" brushRef="#br0" timeOffset="271575.6469">28099 6703 0,'17'0'16,"-34"0"-16,52 0 0,-17-18 0,52 18 15,-34 0-15,105-17 16,-36 34-16,1-17 16,18 0-16,17 18 0,176-18 15,-158 17-15,176-17 16,-176 0-1,-36-17-15,-17 17 0,-35 0 16,-53-18-16</inkml:trace>
   <inkml:trace contextRef="#ctx0" brushRef="#br0" timeOffset="272694.3326">27481 3052 0,'0'0'16,"-17"0"-16,-19 17 0,54-17 31,17 0-15,-17 0-16,35 0 15,-35 0-15,17 0 16,0 0-16,0 0 0,18 0 0,0 0 16,88-17-1,-52 17-15,-1 0 0,106 0 16,17-18-1,142 36 1,-229-18-16,-1 0 0,159 17 16,1 1-1,-1-18 1,0 17-16,-141-17 16,71 18-1,-124-18-15,-35 0 0,35 18 16,-53-18-16,-17 17 15,-18 1 1</inkml:trace>
   <inkml:trace contextRef="#ctx0" brushRef="#br0" timeOffset="307652.9272">4568 12735 0,'0'18'16,"0"52"-1,0-17 1,18 18-16,-18 0 0,35 87 16,-17-87-16,17 35 15,-17-71-15,-18-17 16,18-1-16,-1 1 16,1-36-16,-18-17 15,0 17-15,-18-35 0</inkml:trace>
   <inkml:trace contextRef="#ctx0" brushRef="#br0" timeOffset="307985.3924">4551 12665 0,'0'0'0,"35"17"16,36 1-16,-54 0 15,54-1-15,-53 19 16,-1 16-16,-17-34 15,0 35 1,-17-18-16,17 1 0,-18 34 16,18-52-1,18-1-15,34 19 16,19-1-16,-36-17 0,36 17 16,-36-17-16,-17 17 15,-18 18 1,0-18-16,-53 0 15,18 1-15,-1-36 0,1 17 16,-36 1-16,36-1 16,18-17-16,17-17 15,17 17 1</inkml:trace>
-  <inkml:trace contextRef="#ctx0" brushRef="#br0" timeOffset="308540.6407">5327 13212 0,'-35'-18'15,"17"18"-15,-17 18 16,-1-1-16,36 1 16,-35 17-1,35-17-15,0 17 16,18-17-16,17-18 15,-17-18-15,17 0 16,-35 1-16,18-19 16,-1 19-1,-17-18 1,-17 17-16,17 36 16,17 17-1,1-18-15,-18 1 16,35 0-16,-17-18 15,0 17-15,34-17 16,-34 0-16,17-17 16,-35-1-1,0 0-15,-17 1 16,-19-1-16,19 1 16,-1-1-1,18 36 1,18-1-16,-1 1 15,36 17-15,-35-17 16,17-18-16,-17 17 0,35-17 16,-36 0-1,19 0-15,-36-17 16,17-1-16,-17 0 16,0-17-16,0 18 0,0-1 15,-17-17-15,17-1 0,-18-17 16,18 1-16</inkml:trace>
+  <inkml:trace contextRef="#ctx0" brushRef="#br0" timeOffset="308540.6406">5327 13212 0,'-35'-18'15,"17"18"-15,-17 18 16,-1-1-16,36 1 16,-35 17-1,35-17-15,0 17 16,18-17-16,17-18 15,-17-18-15,17 0 16,-35 1-16,18-19 16,-1 19-1,-17-18 1,-17 17-16,17 36 16,17 17-1,1-18-15,-18 1 16,35 0-16,-17-18 15,0 17-15,34-17 16,-34 0-16,17-17 16,-35-1-1,0 0-15,-17 1 16,-19-1-16,19 1 16,-1-1-1,18 36 1,18-1-16,-1 1 15,36 17-15,-35-17 16,17-18-16,-17 17 0,35-17 16,-36 0-1,19 0-15,-36-17 16,17-1-16,-17 0 16,0-17-16,0 18 0,0-1 15,-17-17-15,17-1 0,-18-17 16,18 1-16</inkml:trace>
   <inkml:trace contextRef="#ctx0" brushRef="#br0" timeOffset="308702.8842">5556 12718 0,'36'105'16,"-72"-210"-16,89 263 0,-35-87 0,35 70 16,-36-88-1,1 18-15,17-19 0,1 37 16,-19-54-16,18-17 15,-17-18-15,17-18 16,-17 0-16</inkml:trace>
   <inkml:trace contextRef="#ctx0" brushRef="#br0" timeOffset="308906.4416">5927 13123 0,'0'0'15,"-53"18"-15,17 0 0,-16 17 16,34-17-16,18-1 16,0 1-16,18-1 15,-1-17-15,1 18 0,52 0 16,-34-18-16,-19 0 16,19 17-16,-1-17 0,0 0 15,-17 0-15</inkml:trace>
   <inkml:trace contextRef="#ctx0" brushRef="#br0" timeOffset="309324.5995">6121 13353 0,'0'0'16,"35"105"-16,-17 1 16,-1-35-16,1-18 0,0 17 15,-1-34 1,-17-54 0,0-53-1,-17 19-15,17 16 16,-18-17-16,0-53 15,18 54-15,0-19 0,0-52 16,18 70-16,-18 35 16,18 0-16,-1 18 15,18 18-15,-17 17 16,-18 36-16,0-36 16,0 0-16,-18 1 0,1-19 15,-18 1 1,17-18-16,-17-18 15,17 1-15,18-19 16,0 19-16,18-19 16</inkml:trace>
@@ -2830,7 +2830,7 @@
   <inkml:trace contextRef="#ctx0" brushRef="#br0" timeOffset="311523.2334">9472 13018 0,'-18'0'16,"18"17"-16,-17 1 0,-1 35 16,18-18-1,0 0-15,0 1 16,53 52-16,0-53 15,18-35 1,-19-18-16,19-17 16,-53 17-16,35-34 15,-53 34-15,0-17 16,-18 17-16,-17 18 16,17 18-16,-35 17 15,53 0-15,-18 0 16,36-35-16,17 18 15,1-18 1,17-18-16,-18 18 16,0-35-16,-17 18 15,-18-19 1,0 19-16,-35-1 16,17 18-16,0-18 0,1 1 15</inkml:trace>
   <inkml:trace contextRef="#ctx0" brushRef="#br0" timeOffset="312117.6973">9948 13264 0,'0'0'16,"18"36"-16,-18-19 0,0 1 16,18 0-16,-18-36 31,17-35-16,-17 35-15,0-17 0,0 18 16,0-19-16,0 19 16,0 34-1,18 1 1,-18 0-16,18 34 16,-1-34-16,18 0 15,-17-1-15,17-17 16,-35-17-16,18-1 15,-18 0-15,0 1 16,0-1-16,0 1 16,0 34-1,35 18 1,-35 1-16,36 34 16,-1-17-16,-18 0 0,19 35 15,-36-35-15,17-17 16,-17 16-16,0-16 15,0-1-15,0-17 16,-35-36-16,35 0 16,-35-52-16,17 35 15,-17-54-15,35 19 16,0 17-16,0-18 16,0 1-16,18-18 15,17 70-15,0 18 16,-17 0-16,17 35 15,-35 0-15,-18 18 16,1-17-16,-19-1 16,19-17-16,-1-1 15,18-34-15,18 17 16,-1-36-16</inkml:trace>
   <inkml:trace contextRef="#ctx0" brushRef="#br0" timeOffset="312672.4465">10548 13247 0,'0'0'16,"-18"53"-16,18-36 0,0 1 15,0 0-15,18-18 0,0 0 16,-1 0-16,1 0 16,0-18-16,-1 18 0,1-35 15,-18 17-15,0 0 16,0 1-1,0-1-15,0 1 16,0 34 0,18 1-16,-18-1 15,17-17-15,-17 18 0,18-18 16,-1 18-16,1-18 16,-18-18-1,0 0 1,0 1-1,0-1-15,0 1 16,18 17-16,-18-18 16,17 18-16,1 0 15,-18-18-15,35 18 0,-17 0 16,0-17-16,34-1 16,-34 18-16,0-18 15,-1 18-15,-17-17 0,0-1 16,-17 0-16,-1 1 15,0-18 1,18 17-16,-17 0 16,17 36-1,17 0-15,-17 34 16,18 1-16,0 18 16,-18-18-16,17 17 15,-17-34-15,18-19 16,0 19-16</inkml:trace>
-  <inkml:trace contextRef="#ctx0" brushRef="#br0" timeOffset="313296.6448">12400 13053 0,'0'0'16,"-17"-35"-16,-1 35 16,-35-18-16,0 36 15,18-1-15,-18 36 16,53-18-16,0 1 15,0-1-15,0-17 16,53 17-16,-18-35 16,0 0-16,1 0 0,17-18 15,-1-17-15,-34 0 16,17-1-16,-35 19 16,0-1-16,-17 18 15,17 35 1,0 18-16,17 53 15,-17-35-15,18-1 0,0-17 16,-18 0-16,17 53 16,-17-71-16,-17 18 15,-19-35-15,-34-18 16,35 0-16,-1-18 16,1 0-16,-18-34 15,35 16-15,18-52 16,0 17-16,0 1 15</inkml:trace>
+  <inkml:trace contextRef="#ctx0" brushRef="#br0" timeOffset="313296.6447">12400 13053 0,'0'0'16,"-17"-35"-16,-1 35 16,-35-18-16,0 36 15,18-1-15,-18 36 16,53-18-16,0 1 15,0-1-15,0-17 16,53 17-16,-18-35 16,0 0-16,1 0 0,17-18 15,-1-17-15,-34 0 16,17-1-16,-35 19 16,0-1-16,-17 18 15,17 35 1,0 18-16,17 53 15,-17-35-15,18-1 0,0-17 16,-18 0-16,17 53 16,-17-71-16,-17 18 15,-19-35-15,-34-18 16,35 0-16,-1-18 16,1 0-16,-18-34 15,35 16-15,18-52 16,0 17-16,0 1 15</inkml:trace>
   <inkml:trace contextRef="#ctx0" brushRef="#br0" timeOffset="313392.0425">12594 13353 0,'0'17'15</inkml:trace>
   <inkml:trace contextRef="#ctx0" brushRef="#br0" timeOffset="314275.2248">12647 13229 0,'0'0'16,"-18"-35"-16,1 0 15,17 17-15,0 0 16,17 18-16,1 0 16,0 0-16,17 18 15,-17 0-15,-1-18 16,1 0-16,0 17 0,17-17 15,-18 0 1,-17 18 0,-17 17-1,17-17-15,-18 35 16,18-18-16,0 0 16,18-35-1,-1 0-15,1 0 16,0 0-16,17-35 15,-35 17-15,18 1 0,-18-1 16,0-17-16,0 17 16,-18 1-16,0 17 15,18 17 17,0 1-32,18-1 15,17 1-15,-17-18 16,0 18-16,-1-18 0,19 0 15,-36 17 17,0 1-17,0 0 1,17-18-16,1 17 16,-1-34-1,1 17-15,0-18 16,-18 0-16,17-17 0,-17-18 15,0 18-15,0-53 16,-17 35-16,-19-18 16,19 18-1,-1 18-15,18 17 0,-17 1 16,-1 17-16,0 0 16,1 35-16,17 36 15,0-18-15,35 35 16,-17-53-16,-1 18 15,1-18-15,17 0 0,-17-17 16,35 17-16,-18-35 16,-17 0-16,-1 0 15,1 0-15,-18-17 16,0-1-16,-18 0 16,18 1-16,0-1 15,18 18 1,-18 18-16,17-18 15,19 0-15,-19 0 16,1 0 0,-18-18-16,0 1 15,0-1 1,0 0-16,-18 1 16</inkml:trace>
   <inkml:trace contextRef="#ctx0" brushRef="#br0" timeOffset="314508.7267">13406 13264 0,'0'18'15,"17"-18"1,1-18 0,-1 18-1,1 0 1,0-17-1,-1 17 1,-17-18 0,18 18-16,-18-17 0,18 17 15,-18-18-15,17 0 0,-17-35 16,18 18-16,-18-35 16</inkml:trace>
@@ -2845,7 +2845,7 @@
   <inkml:trace contextRef="#ctx0" brushRef="#br0" timeOffset="317790.223">17163 12665 0,'0'0'16,"17"-18"0,1 18-16,0 0 15,52 18-15,-17-18 0,-18 0 16,1 0-16,34-18 15,-52 18-15,-1-18 0,-34 18 16,-36 0 0,18 18-1,-36 0-15,53 17 16,-17 18-16,35 0 16,0-18-16,35 18 15,-17 0-15,17 0 0,1-18 16,-1 0-16,35 36 15,-34-36-15,-1 18 16,-35-18-16,-18 1 16,1-19-16,-54-17 15,18 0-15,-35 0 16,53-17-16,-18-1 16,53 0-16,0 1 15,17 17-15,36-35 16</inkml:trace>
   <inkml:trace contextRef="#ctx0" brushRef="#br0" timeOffset="318490.8211">17868 12471 0,'0'-18'15,"-17"18"1,-1-18 0,0 18-16,1 18 15,-1-18-15,0 18 16,18 17-16,18 0 16,0-17-16,-1 0 15,1 17-15,0-18 16,17 19-16,-18-19 15,-34 1 1,17 0-16,-18-18 16,1 0-16,-19 17 15,19-17-15,-1 0 16,0 0-16,1 0 16,17 18-1,17 0 1,-17-1-16,18 1 15,0-18-15,-18 17 16,0 1-16,0 0 16,0-1-1,17-17 1,1 0-16</inkml:trace>
   <inkml:trace contextRef="#ctx0" brushRef="#br0" timeOffset="318666.7803">17939 12700 0,'0'0'0,"35"0"0,-17 0 16,-1 0-16,19 0 0,-19-18 16,19 18-16,-19-17 15,-17-1 1</inkml:trace>
-  <inkml:trace contextRef="#ctx0" brushRef="#br0" timeOffset="318852.652">18045 12577 0,'-18'52'15,"0"-16"-15,18-19 16,0 36-1,18-17-15,-18-19 0,35 18 16,-17-17-16,17-18 16,0 0-16,-17-18 15</inkml:trace>
+  <inkml:trace contextRef="#ctx0" brushRef="#br0" timeOffset="318852.6519">18045 12577 0,'-18'52'15,"0"-16"-15,18-19 16,0 36-1,18-17-15,-18-19 0,35 18 16,-17-17-16,17-18 16,0 0-16,-17-18 15</inkml:trace>
   <inkml:trace contextRef="#ctx0" brushRef="#br0" timeOffset="319152.6855">18239 12541 0,'0'0'16,"17"0"-16,1-17 0,0 17 16,-1 0-1,-17 17-15,0 1 16,0 0 0,0-1-16,0 18 15,0-17-15,18 0 16,-1-1-1,1 1-15,0 0 16,-36-18 0,0 0-1,1 0-15,-1 0 0,-17 0 16,35 17 0,-18-17-16,18 18 0,0 0 31</inkml:trace>
   <inkml:trace contextRef="#ctx0" brushRef="#br0" timeOffset="319797.0616">19491 12612 0,'0'0'16,"-53"70"-16,18 1 15,35-1-15,-18 72 16,36-54-16,17 53 16,0-88-16,1 0 0,52 35 15,-53-53-15,36 0 16,-54-35-1</inkml:trace>
   <inkml:trace contextRef="#ctx0" brushRef="#br0" timeOffset="320125.5544">19932 13123 0,'0'89'16,"0"-178"-16,0 230 16,0-105-16,35 34 15,-17-34-15,17-19 16,-17-17-16,-1 0 0,19 0 0,-19 0 16,1-53-16,0 18 15,-18 0-15,0-36 16,0 18-1,0 36-15,-18 17 0,18-18 16,18 53 0,17 18-1,-35-35-15,35 35 16,-17-53-16,-1 17 16</inkml:trace>
@@ -2863,9 +2863,9 @@
   <inkml:trace contextRef="#ctx0" brushRef="#br0" timeOffset="323579.2376">23530 12823 0,'0'0'0,"36"18"0,-1-18 15,35 35-15,-34-17 16,34 17-16,-52 1 15,17-1-15,-17 0 16,-18-17 0</inkml:trace>
   <inkml:trace contextRef="#ctx0" brushRef="#br0" timeOffset="323772.3176">24042 12806 0,'0'0'16,"-53"88"-16,18-35 0,-1 0 16,19 0-16,-19 0 0,19 35 15,17-35 1,17 0-16,1-18 16,0-17-16,17-18 0,-17 17 15</inkml:trace>
   <inkml:trace contextRef="#ctx0" brushRef="#br0" timeOffset="324251.8358">24324 12612 0,'0'0'0,"-18"-18"16,1 18-16,17 18 0,-18-1 15,0-17-15,1 36 0,17-19 16,0 1 0,0 0-16,17-1 0,1 1 15,0-18-15,-1 18 0,1-1 16,0 1-16,-18-1 16,-18 1-16,-17 17 15,17-17 1,0-18-16,1 18 15,17-1-15,0 1 0,0 0 16,17-1 0,1-17-16,17 18 15,-17-18 1,0 0-16</inkml:trace>
-  <inkml:trace contextRef="#ctx0" brushRef="#br0" timeOffset="324446.3482">24518 12823 0,'0'0'16,"53"0"-16,-18-17 15,1 17 1,-19-18-16,18 18 15,-35-17-15,-17-1 16</inkml:trace>
-  <inkml:trace contextRef="#ctx0" brushRef="#br0" timeOffset="324604.1537">24589 12771 0,'0'35'15,"0"-18"-15,0 19 16,17-19-16,-17 36 15,0-35-15,18 35 16,0-53-16,-18 18 16,17-18-16,1 0 15,-1-18-15</inkml:trace>
-  <inkml:trace contextRef="#ctx0" brushRef="#br0" timeOffset="324947.1448">24800 12647 0,'0'0'16,"18"0"-16,0 18 0,-1-1 16,-17 1-16,0 17 15,0-17-15,0 17 0,0-17 16,-17-1-1,17 1-15,0 0 16,0-1-16,17-17 16,1 18-16,-1 0 15,1-18-15,-18 17 16,-18 1 0,1-18-1,-1 0-15,1 0 16,34 0 15,1 0-31</inkml:trace>
+  <inkml:trace contextRef="#ctx0" brushRef="#br0" timeOffset="324446.3481">24518 12823 0,'0'0'16,"53"0"-16,-18-17 15,1 17 1,-19-18-16,18 18 15,-35-17-15,-17-1 16</inkml:trace>
+  <inkml:trace contextRef="#ctx0" brushRef="#br0" timeOffset="324604.1536">24589 12771 0,'0'35'15,"0"-18"-15,0 19 16,17-19-16,-17 36 15,0-35-15,18 35 16,0-53-16,-18 18 16,17-18-16,1 0 15,-1-18-15</inkml:trace>
+  <inkml:trace contextRef="#ctx0" brushRef="#br0" timeOffset="324947.1447">24800 12647 0,'0'0'16,"18"0"-16,0 18 0,-1-1 16,-17 1-16,0 17 15,0-17-15,0 17 0,0-17 16,-17-1-1,17 1-15,0 0 16,0-1-16,17-17 16,1 18-16,-1 0 15,1-18-15,-18 17 16,-18 1 0,1-18-1,-1 0-15,1 0 16,34 0 15,1 0-31</inkml:trace>
   <inkml:trace contextRef="#ctx0" brushRef="#br0" timeOffset="325320.2072">25083 12700 0,'17'18'15,"18"17"1,1-17 0,17 52-16,-18-17 0,-17 0 15,17 0-15,-18 0 16,1 70-16,-18-52 16,-18 35-16,-17-53 15,-18 17-15,18-35 16,17-17-16,-17 0 15,17-18-15,-17 17 16,18-34-16</inkml:trace>
   <inkml:trace contextRef="#ctx0" brushRef="#br0" timeOffset="325820.0644">25418 12506 0,'0'0'15,"17"0"-15,-17 35 16,18 1-16,17 16 0,0 1 0,18 18 16,36 88-1,-36-71-15,17 53 16,-35-53-16,-17 36 16,-36-1-1,1-88-15,-1 18 0,-17-17 16,-36 34-16,36-52 15,-18-1-15,35 1 0,-17-18 16,0 0-16</inkml:trace>
   <inkml:trace contextRef="#ctx0" brushRef="#br0" timeOffset="328313.7975">4815 14446 0,'-17'71'16,"17"-18"-16,-18 123 15,18-70-15,0 88 16,18-106-16,-1-17 15,1-1-15,0-34 0,52-1 16,-34-35-16,16-18 16,-34-17-16,17-36 15,-17 18-15,-18 18 16,0 0-16,0 17 0,18 1 16,-18 34-16,17 19 15,1 16-15,17 19 0,53 17 16,-52-53-1,70 1-15,-54-36 16,-16 0-16,-1-36 0,0 1 16,18-53-16,-53 35 15,-17-70-15,-19 70 16,-34-71 0,34 71-16,-69-35 15,87 70-15,-17 1 16,35 34-16,35 36 15,0-35-15,1 17 16</inkml:trace>
@@ -2879,7 +2879,7 @@
   <inkml:trace contextRef="#ctx0" brushRef="#br0" timeOffset="333438.9359">5750 15099 0,'0'0'16,"-17"18"-16</inkml:trace>
   <inkml:trace contextRef="#ctx0" brushRef="#br0" timeOffset="334329.9574">6738 14728 0,'0'18'16,"0"70"-1,-18-35-15,18 18 0,0 35 16,0-53 0,0 35-16,0-71 15,36 19-15,-19-36 16,1-36 0,0 19-16,-1-19 15,1-16 1,0 52-16,17 0 15,-18 17 1,19 36-16,-1-35 16,18-1-16,-35-17 15,17 0-15,-18-17 16,54-36-16,-53 18 0,-1-18 16,1-36-1,-36-16 1,-35-19-16,0 71 15,18 18 1,35 17-16,-17 36 16</inkml:trace>
   <inkml:trace contextRef="#ctx0" brushRef="#br0" timeOffset="334639.9655">7232 14340 0,'0'0'0,"18"0"0,17 0 16,0 0-16,-17 0 0,17 0 16,-17-17-16</inkml:trace>
-  <inkml:trace contextRef="#ctx0" brushRef="#br0" timeOffset="334806.6927">7267 14411 0,'18'71'0,"-36"-142"0,54 177 16,-19-89-16,-17 1 0,18 17 15,-1-17-15,19 0 16,-19-18-16,1 0 15</inkml:trace>
+  <inkml:trace contextRef="#ctx0" brushRef="#br0" timeOffset="334806.6926">7267 14411 0,'18'71'0,"-36"-142"0,54 177 16,-19-89-16,-17 1 0,18 17 15,-1-17-15,19 0 16,-19-18-16,1 0 15</inkml:trace>
   <inkml:trace contextRef="#ctx0" brushRef="#br0" timeOffset="335112.8011">7514 14517 0,'18'0'15,"-1"0"-15,-17-18 16,18 1-16,0-19 0,-1 1 16,1 0-16,-18-1 15,0 1-15,0 18 16,-18-1-16,1 0 16,-1 36-1,0 0-15,18 34 16,0-34-16,18 17 15,0-17-15,-1 17 16,19 18-16,-19-35 16,36-1-16,-35-17 15,17 18-15,-17-36 16</inkml:trace>
   <inkml:trace contextRef="#ctx0" brushRef="#br0" timeOffset="335380.5879">7814 14217 0,'0'0'15,"35"0"-15,-17 0 16,17 18-16,-17-1 16,0 19-16,-18-19 15,17 36-15,-17-18 16,18 18-16,-18-17 15,0-1 1,0-18-16,0 1 16,-18-18-1,18-18-15,-17 18 16,17-17-16,-18 17 16,0 0-16</inkml:trace>
   <inkml:trace contextRef="#ctx0" brushRef="#br0" timeOffset="335632.5652">8114 14887 0,'53'18'15,"-106"-36"-15,141 36 0,-53-18 0,18 0 16,-17 0-16,16 0 16,-16 0-16</inkml:trace>
@@ -2897,7 +2897,7 @@
   <inkml:trace contextRef="#ctx0" brushRef="#br0" timeOffset="339973.2021">13935 14534 0,'17'-17'16,"1"-1"-16,0-17 15,-1 17 1,1-52-16,0 34 16,-18-34-16,0 35 15,0-1-15,0 1 16,-18 17-16,18 54 16,-18 17-1,18 0-15,18 35 16,0-35-16,-1 17 15,1-35-15,35-17 16,-18 0-16,18-36 16,-18 0-16,-17 1 15</inkml:trace>
   <inkml:trace contextRef="#ctx0" brushRef="#br0" timeOffset="340258.0669">14252 14111 0,'18'0'16,"-36"0"-16,54 0 0,-1 18 15,-18-18-15,19 35 16,-19-17-16,19 35 16,-36-36-16,17 54 15,1-36-15,-18 0 16,18 1-16,-18-1 0,0 18 15,0-36-15,0 1 16,-18-18-16,0 0 16,1 0-1,-1-18 1,0 18-16,18-17 16</inkml:trace>
   <inkml:trace contextRef="#ctx0" brushRef="#br0" timeOffset="340517.7818">14870 14676 0,'0'0'0,"17"0"0,36 0 16,35 0-1,1 0 1,-54-18-16,0 18 0,-17 0 16,-54 0-1</inkml:trace>
-  <inkml:trace contextRef="#ctx0" brushRef="#br0" timeOffset="340624.8677">14958 14799 0,'53'0'16,"-106"0"-16,141 0 0,-70-18 0,-1 18 16</inkml:trace>
+  <inkml:trace contextRef="#ctx0" brushRef="#br0" timeOffset="340624.8676">14958 14799 0,'53'0'16,"-106"0"-16,141 0 0,-70-18 0,-1 18 16</inkml:trace>
   <inkml:trace contextRef="#ctx0" brushRef="#br0" timeOffset="341038.8144">14587 14693 0,'0'18'47,"18"-1"-47,-18 1 15,0 0-15,0-1 16</inkml:trace>
   <inkml:trace contextRef="#ctx0" brushRef="#br0" timeOffset="341107.9834">14587 14834 0,'0'36'16,"0"-19"-1,0-70-15,18 106 0</inkml:trace>
   <inkml:trace contextRef="#ctx0" brushRef="#br0" timeOffset="341747.5247">15840 14411 0,'0'0'15,"17"106"-15,1-36 0,0 89 16,-18-71-1,0-17-15,17-18 0,-17 35 16,0-70-16,18-1 16,-18-34-1,0-1-15,0-17 0,18-1 16,-1 1-16,1 0 16,17-18-16,0 35 15,18 18-15,-35 18 16,0 53-16,-18-36 15,-18 0-15,-53 0 16,36-17-16,-53 0 16,35-18-16,-53 0 15,71 0-15,17-18 16,1-17-16</inkml:trace>
@@ -2906,7 +2906,7 @@
   <inkml:trace contextRef="#ctx0" brushRef="#br0" timeOffset="342522.3819">16457 14376 0,'18'-18'15,"-1"0"1,1 1-16,17-54 16,-35 36-16,18 17 0,-18-52 15,18 52-15,-18 0 16,-18 18-16,0 18 15,18 0-15,0 70 16,0-53 0,0 36-16,0-36 15,36 18-15,-19-35 16,1-18-16,-1 17 16,19-17-16,-19-17 0,1-1 0,0 0 15</inkml:trace>
   <inkml:trace contextRef="#ctx0" brushRef="#br0" timeOffset="342825.9179">16704 14005 0,'0'0'16,"18"18"-16,-1-18 0,-17 18 15,18-1-15,17 18 16,-17-17-16,17 0 15,-17-1-15,-1-17 0,-17 18 16,0 0-16,0-1 16,0 19-16,0-1 15,0 0-15,0-17 16,0-1-16,0 1 0,0 0 16,-17-1-1,-1-17 1,1 0 15</inkml:trace>
   <inkml:trace contextRef="#ctx0" brushRef="#br0" timeOffset="343032.1336">17145 14746 0,'18'0'16,"35"0"0,-18 0-16,18 0 0,0 0 15,-18 0-15,0 18 0,1-18 16</inkml:trace>
-  <inkml:trace contextRef="#ctx0" brushRef="#br0" timeOffset="343459.6477">18344 14517 0,'-35'70'15,"35"-17"-15,0 0 16,-17 0-16,-1 35 15,0-52-15,-17-1 16,17-17-16,-17-18 16,17 0-16,-17 0 0,18 0 15,-1-18-15,-17-35 16,35 18-16,17-1 16,19 36-16,-19-17 0,71 34 15,-35 1-15,53 35 16,-53-35-16,-18-1 15,1 19-15,-1-19 16,-18-17-16,1 18 0</inkml:trace>
+  <inkml:trace contextRef="#ctx0" brushRef="#br0" timeOffset="343459.6476">18344 14517 0,'-35'70'15,"35"-17"-15,0 0 16,-17 0-16,-1 35 15,0-52-15,-17-1 16,17-17-16,-17-18 16,17 0-16,-17 0 0,18 0 15,-1-18-15,-17-35 16,35 18-16,17-1 16,19 36-16,-19-17 0,71 34 15,-35 1-15,53 35 16,-53-35-16,-18-1 15,1 19-15,-1-19 16,-18-17-16,1 18 0</inkml:trace>
   <inkml:trace contextRef="#ctx0" brushRef="#br0" timeOffset="343849.8431">18768 14182 0,'0'0'0,"0"53"16,53 88 0,-36-53-16,19 71 15,-36-89-15,17 1 0,-17-18 16,0 0-16,0-18 0,0-17 15,0-1-15,0 1 0,-17-36 16,17 1-16,0-1 16,35-53-16,0 54 15,36-36-15,-18 53 16,17 0-16,-35 17 16,18 36-16,-53-17 15,-17 17 1,-1-36-16,-17 1 15,0-1-15,-1 1 0,-17-18 16,18 0-16,-35-18 16,52 1-16,18-1 0,0 1 15,0-19-15</inkml:trace>
   <inkml:trace contextRef="#ctx0" brushRef="#br0" timeOffset="344917.6164">18538 14693 0,'0'-17'0,"-17"17"16,-1 0-16,1 17 16,-1-17-16,18 18 15,-18 17-15,1-17 0,17 17 16,0 0-16,0 18 15,0-35-15,17 17 16,19-17-16,-19-18 16,36 0-16,-35-18 15,35-17 1,-36-36-16,1 18 16,-18 18-16,18-18 15,-18 0-15,0 0 0,-36-52 16,19 52-16,-1-18 15,0 18-15,1 18 0,-19 0 16,19 35-16,-36 17 16,53 19-16,-18 69 15,18-34-15,18 17 0,35 53 16,-18-70-16,53 17 16,-52-53-16,69 18 15,-69-35-15,52-18 16</inkml:trace>
   <inkml:trace contextRef="#ctx0" brushRef="#br0" timeOffset="345140.4606">19121 14129 0,'35'-18'15,"-18"18"-15,19-18 16,-19 18-16,19 0 0,-19 0 0,1-17 16</inkml:trace>
@@ -2917,7 +2917,7 @@
   <inkml:trace contextRef="#ctx0" brushRef="#br0" timeOffset="349678.3956">4286 15998 0,'0'18'15,"18"-18"1,52 18-16,-34-18 16,34 17-1,-34-17-15,-19 18 0,1 0 0,-1-1 16,-17 36-1,0-17-15,-17 52 16,-1-53-16,18 36 16,0-36-16,0 0 15,18-17-15,-1-1 16,1 1-16,35-18 16,-35 0-16,17 0 15,-17 0-15,17 35 16,-17-17-1,-18 17-15,0 0 16,0-17-16,0 53 16,-18-54-16,18 1 15,-35 35-15,17-35 16,-35-1-16,35-17 16,-35 0-16,18-17 15,-18-19-15,36 36 16,-1-35-1,18 17-15</inkml:trace>
   <inkml:trace contextRef="#ctx0" brushRef="#br0" timeOffset="440772.9282">15293 16087 0,'18'17'16,"-18"1"-16,35 17 15,-18-17-15,1 0 16,17 17-16,-17-35 16,17 0-1,-17 0-15</inkml:trace>
   <inkml:trace contextRef="#ctx0" brushRef="#br0" timeOffset="440921.418">15469 16069 0,'18'35'0,"-18"-17"16,0 0-16,18 17 15,-1-17-15,1-1 16,0 1-16</inkml:trace>
-  <inkml:trace contextRef="#ctx0" brushRef="#br0" timeOffset="441325.6481">15910 16087 0,'0'-18'16,"0"36"-1,0 17 1,18 0-16,0 53 0,-1-17 16,-17-18-16,18 88 15,-1-88-15,-17 17 16,18-34-16,0 17 0,-1 17 15,-17-52-15,18 0 16,0-18-16</inkml:trace>
+  <inkml:trace contextRef="#ctx0" brushRef="#br0" timeOffset="441325.648">15910 16087 0,'0'-18'16,"0"36"-1,0 17 1,18 0-16,0 53 0,-1-17 16,-17-18-16,18 88 15,-1-88-15,-17 17 16,18-34-16,0 17 0,-1 17 15,-17-52-15,18 0 16,0-18-16</inkml:trace>
   <inkml:trace contextRef="#ctx0" brushRef="#br0" timeOffset="442455.3109">16969 16598 0,'0'18'31,"17"-18"-15,1 0-16,0 0 0,-1 17 15,36-34-15,-35 17 16,17-18-16,-17 18 0,-1-17 16,19-1-1,-36 0-15,0-17 16,0 17-16,0 1 0,-36-19 15,19 19-15,-1-1 16,-17 1-16,-1-1 16,1 18-16,0 18 15,17-1-15,1 1 16,17 17-16,0 0 0,17 18 16,1-17-16,52 16 15,-52-34-15,70 0 16,-52-18-1,34 0-15,-52 0 16,17 0-16,-17 0 16</inkml:trace>
   <inkml:trace contextRef="#ctx0" brushRef="#br0" timeOffset="443079.2999">17515 16510 0,'0'0'0,"53"159"15,-35-89-15,0 1 16,35 70-16,-36-70 16,1-19-16,17 19 15,-35-53-15,0-1 16,-18-34 0,-34-54-1,34 36-15,0-18 16,1 0-16,-1 0 0,0-88 15,1 53-15,17 17 16,0-52-16,17 87 16,19 1-16,-19 35 15,1 0-15,0 18 0,-1-1 16,1 19-16,-1-1 16,1 18-16,-18-18 15,0-17-15,-18 17 16,1-17-16,-1-18 15,1 0-15,-1 0 0,0 0 16,1-18 0</inkml:trace>
   <inkml:trace contextRef="#ctx0" brushRef="#br0" timeOffset="443417.8036">17921 16457 0,'0'0'0,"-18"0"15,1 0-15,-1 18 16,18-1-16,-17 1 16,-1 35-16,18-35 15,0 34-15,0-16 16,35-1-1,-17-35-15,-1 0 0,1 0 0,0 0 16,17 0-16,0-18 16,-35 1-16,18-36 15,-18 35-15,0 1 16,-18-1-16,18 0 0,-35 1 16,17-1-1,1 18 1</inkml:trace>
@@ -3016,7 +3016,7 @@
   <inkml:trace contextRef="#ctx0" brushRef="#br0" timeOffset="18649.6883">10548 10213 0,'0'-18'0,"18"18"15,-36 0 1,0 0 15,18 18-15,-17 0-16,17-1 15,17-17 1,1 0 0,0-17-1,-18-1 1,-36 18 0,19 0-16,-18 0 15,-1 18-15,1 17 16,17-18-16,18 1 15,0 0-15,18-1 16,35-17 0,-35-17-16,17-1 0,0-17 15,-17 35-15,-18-18 16,-18 1 0,-17 17-1,17 0-15,-17 0 16,17 0-16,36 0 15,-18-18-15,53 0 16,-36 1-16</inkml:trace>
   <inkml:trace contextRef="#ctx0" brushRef="#br0" timeOffset="19340.3203">11412 9172 0,'0'-17'16,"0"34"-16,-17-52 0,-1 35 16,0 0-16,18 18 31,36-18-15,-19 0-16,19 0 15,-19 0-15,19-18 16,-36 0-16,0 1 15,0-1 1,-36 18 0,1 0-16,17 0 0,-17 0 15,0 0-15,35 18 16,-18-18-16,18 17 16,0 1-16,35-18 15,1 0-15,-1 0 16,-17-18-16,-1 1 15,-17-1 1,-17 18 0,-1 0-1,-17 0-15,17 18 0,0-18 16,18 17 0,18-17-16,17 0 15</inkml:trace>
   <inkml:trace contextRef="#ctx0" brushRef="#br0" timeOffset="23871.8731">6862 12612 0,'35'17'16,"-70"-34"-16,87 52 0,37-35 16,-36 18-16,-1-18 0,19 0 15,0 0-15,70-18 16,-88 18-16,0 0 0,-1-18 16,37 1-1,-36 17-15,-36 0 16,-34-18-1</inkml:trace>
-  <inkml:trace contextRef="#ctx0" brushRef="#br0" timeOffset="24132.8492">7391 12453 0,'0'-18'15,"35"18"-15,-17-17 16,35 17-1,-18 0-15,18 17 16,-18-17-16,0 18 0,1 0 0,-1-1 16,18 19-16,-36-36 15,1 17-15,-18 1 0,0 17 16,0-17-16,-35 17 16,-1-17-1,-16 35-15,16-36 16,-17 19-16,18-1 15,0 0-15</inkml:trace>
+  <inkml:trace contextRef="#ctx0" brushRef="#br0" timeOffset="24132.8491">7391 12453 0,'0'-18'15,"35"18"-15,-17-17 16,35 17-1,-18 0-15,18 17 16,-18-17-16,0 18 0,1 0 0,-1-1 16,18 19-16,-36-36 15,1 17-15,-18 1 0,0 17 16,0-17-16,-35 17 16,-1-17-1,-16 35-15,16-36 16,-17 19-16,18-1 15,0 0-15</inkml:trace>
   <inkml:trace contextRef="#ctx0" brushRef="#br0" timeOffset="50617.3721">10654 10601 0,'-18'0'16,"1"18"-1,17-1 1,0 19-16,0-19 0,0 18 15,17 36 1,1-36-16,35 36 16,-36-36-16,54 18 15,-18-35-15,17-1 16,-17-17-16,-17 0 16,-1 0-16,18-17 15,-18-1-15,-17 18 0,-1-35 16,-17 17-16</inkml:trace>
   <inkml:trace contextRef="#ctx0" brushRef="#br0" timeOffset="51112.6965">10407 10830 0,'0'0'0,"0"-17"16,0-1 0,18 0-16,-1 1 15,1-36-15,0 18 16,-1 17-16,-17 0 0,18-35 15,-1 36-15,1-1 16,-18 0 0,18 18-16,-1 0 15,19 18 1,-19-18-16,36 18 16,-35-18-16,35 17 15,-18-17-15,-17 18 16</inkml:trace>
   <inkml:trace contextRef="#ctx0" brushRef="#br0" timeOffset="57745.5723">26652 10372 0,'18'0'16,"-18"-18"-16,-18 18 16,18-18-1,-17 18 1,-1-17-1,0 17-15,1 0 16,-1 17-16,1-17 0,-19 36 16,19-19-16,-1 1 0,18 0 15,0 17-15,35-17 16,1-1-16,-19-17 16,36 0-1,-18-17-15,18-19 16,-35 19-16,17-19 15,-35 19-15,0-1 16,0 0-16,-17 1 0,-1-1 0,0 18 16,-52 0-1,34 0-15,-34 35 16,52-17-16,-17 17 16,35 1-1,0-19-15,18-17 0,17 36 16,0-36-16,18 0 15,-18 0-15,1-18 16,-1 0-16,-17 1 16,-1-36-16,-34 0 15,17 35-15,-36-35 16,1 36-16,-18-1 16,18 18-1,17 18-15,-52 17 16,52-18-16,0 1 0,18 17 15,0-17-15,18 17 0,0-17 16,35 0-16,-18-1 16,18-17-1,-18 0-15,0-17 16,-17 17-16,0-18 16,-18-17-16,0 17 0,-18-35 15,0 18-15,-35 0 16,36 17-16,-1 18 15,-35-18-15,36 36 16,-1-18-16,18 35 16,-18-17-16,18-1 0,0 19 0,18-19 15,35 36-15,-36-35 16,19 0-16,-1-18 0,0 17 16,1-17-1,-19-17-15,1 17 16,-18-18-16,0-17 0,-18 17 15,-17-35-15,17 35 16,-35-17-16,36 18 16,-19 17-16,19 0 15,-1 0-15,1 0 16,-1 17-16,18 18 0,0-17 16,18 17-16,-1-35 15,36 18-15,-18 0 16,36-18-1,-53-18-15,17 0 0,0-17 16,-17 17-16,-18-34 16,-18 16-16,0 19 15,1-1-15,-1 0 0,-17-17 16,17 35-16,-52-18 16,34 36-16,19-18 15,-18 35-15,17-17 0,-17 53 16,35-54-16,17 18 15,36 18 1,-35-35-16,52 0 16,-52-1-16,35-17 15,-35-17-15,-18-1 16,-18 0-16,0 18 16,18-17-16,-35-1 15,17 18-15,1 18 16,-1-18-1</inkml:trace>
@@ -3048,12 +3048,12 @@
   <inkml:trace contextRef="#ctx0" brushRef="#br1" timeOffset="132805.0789">26282 12277 0,'0'17'16,"0"1"0,-18-18 15,18-18-15,-17 1-1,17-1-15,-18-17 16,18 17-1,0 0-15,0 1 0,0-1 16,0-17-16,0 0 16,0 17-16,0 0 0,0 1 15,0-1-15,0-17 16,0 0-16,0 17 16,0 0-16,0-17 0,0-36 15,18 36-15,-18-18 16,0 18-16,0 17 15,17-17-15,-17 0 0,0 17 16,0-17 0,0 0-16,0-18 15,0 35-15,0-53 16,0 54-16,0-18 0,0-1 16,18 19-16,-18-36 15,0 17-15,18-16 16,-18 34-16,17 0 15,-17-35-15,0 18 16,18 17-16,-18-17 0,0 0 16,0 0-16,0 17 15,18 0-15,-18 1 0,0-1 16,17-17-16,-17 17 16,18-35-1,-1 36-15,-17-1 0,18-17 16,0-1-16,-18 19 15,0-1-15,17 0 16,-17 1-16,18-1 16,0 18-1,-1-17-15,1 17 16,0-18 0,17 0-1,-18 18-15,-17-17 0,18 17 16,0 0-16,-1-18 15,1 18 1,0 0-16,-1 0 16,1 0-16,0 0 15,-1 0-15,1 0 16,-1 0-16,-17-18 16,18 18-16,0 0 15,-1 18-15,1-18 16,0 18-16,-1-18 15,1 17-15,0-17 16,17 18 0,-17-18-16,17 18 15,-18-1-15,1-17 16,0 18 0,-1-1-16,1 1 15,0 0-15,-1-1 16,1-17-1,17 18-15,-17 0 16,-1-18-16,1 17 0,0 1 16,17 0-1,-35-1-15,18 1 16,-1-18-16,1 35 16,0-17-16,-1-1 15,1 1-15,-18 0 16,17-1-16,1 1 15,0-18-15,-18 18 0,17-18 16,1 17 0,-18 1-16,18-18 15,-18 17-15,17 1 16,1 0-16,0-1 16,-1-17-1,-17 18-15,18-18 0,0 0 16,-18 18-16,17-18 15,-17 17-15,18-17 16,-1 18-16,1 0 16,-18-1-16,18-17 15,-18 18-15,17 0 16,1-18-16,-18 17 16,18-17-16,-18 18 15,17-18 1,-17-18 46,-17 1-46,-1-1 0,18 0-16,-18 1 15,1 17-15,-1-36 16,0 19-16,18-1 15,-17 0-15,-18-17 16,17 17-16,-17-34 16,17 34-16,-17-17 15,-1 17-15,19 0 16,-36-17 0,35 17-16,1 1 0,-36-1 15,17 1-15,19-1 16,-1 18-16,-17-18 0,17 1 15,-17-19 1,0 19-16,-1-1 16,1 0-16,0 1 15,17-1-15,-17 18 0,-18-17 16,18 17-16,-18 0 16,35 0-16,-17 0 15,17 0-15,-17 0 16,17 0-1,1 0 1,-1 0-16,0 0 16,1 0-16,-19 17 15,19-17-15,-1 18 16,1-18-16,-1 0 16,18 17-16,-18 1 15,18 0 1,0-1-1,0 1-15,0 0 16,-17 17-16,17-17 16,-18 17-16,18 0 15,-18-17-15,18 17 0,0 0 16,-17 18-16,17-18 16,0 1-16,-18-19 0,18 54 15,0-18 1,-18-35-16,18 17 15,0 35-15,0-52 16,0 17-16,-17 1 0,17-1 16,0 53-1,0-17-15,-18-19 16,18-16-16,0 52 16,0-53-16,0 18 0,0 18 15,0-18-15,0-18 16,0-17-16,0 17 0,0-18 15,0 36-15,0-35 16,0 0 0,-17-1-16,17 1 15,-18-18 1</inkml:trace>
   <inkml:trace contextRef="#ctx0" brushRef="#br2" timeOffset="159861.1528">19456 6262 0,'0'17'0,"17"-17"63,-17 18-47,0 0-1,-17-18 251</inkml:trace>
   <inkml:trace contextRef="#ctx0" brushRef="#br2" timeOffset="161807.1928">19420 6385 0,'-17'0'125,"17"-17"-125,-18 17 16,18-18-16,-35 0 15,17 1-15,-17-19 16,17 19-16,1-1 16,-19 1-16,-17-36 15,18 17-15,18 19 0,-54-54 16,36 36 0,-1 0-16,-16-18 15,16 17-15,-52-52 0,35 35 16,-53-53-16,53 54 15,-17-1-15,-1 0 0,18 0 16,-17-18-16,-1 18 16,18 0-16,-17 0 0,-71-52 15,88 52-15,-71-53 16,54 53-16,-1-18 16,-52-52-16,52 52 15,-52-52 1,52 52-16,18 18 0,0-17 15,-70-36-15,70 36 16,-35-36-16,35 53 16,-18-71-16,36 89 15,-18-71 1,35 53-16,-17 18 0,17 0 16,1-1-16,-36-34 15,35 52-15,-17-35 16,35 36-16,-35-19 15,35 19-15,-18-1 16,0 0-16,18 1 16,-17 17 46,17 17 1,0 1-48,-18-18-15</inkml:trace>
-  <inkml:trace contextRef="#ctx0" brushRef="#br2" timeOffset="163204.9316">16404 3246 0,'18'0'16,"-18"-18"-1,-18 18 48,1 0-47,-1 0-1,0 18-15,1-18 0,-19 17 16,19-17-16,-36 18 15,35-1-15,1 1 16,-36 0-16,35-18 16,-17 17-1,17-17-15,0 0 0,1 18 16,-1-18-16,0 0 16,18 18-16,-17-18 0,-1 0 31,36 17-16,-1-17 1,19 18 0,-19-18-1,1 0-15,17 0 16,-17 0-16</inkml:trace>
+  <inkml:trace contextRef="#ctx0" brushRef="#br2" timeOffset="163204.9315">16404 3246 0,'18'0'16,"-18"-18"-1,-18 18 48,1 0-47,-1 0-1,0 18-15,1-18 0,-19 17 16,19-17-16,-36 18 15,35-1-15,1 1 16,-36 0-16,35-18 16,-17 17-1,17-17-15,0 0 0,1 18 16,-1-18-16,0 0 16,18 18-16,-17-18 0,-1 0 31,36 17-16,-1-17 1,19 18 0,-19-18-1,1 0-15,17 0 16,-17 0-16</inkml:trace>
   <inkml:trace contextRef="#ctx0" brushRef="#br2" timeOffset="164815.5054">16439 3246 0,'0'0'0,"0"-18"16,-17 18 15,-1 0-15,1 0 15,-1 0 0,0 0-15,1 0 0,-19 18-1,19-1-15,-1 1 16,-17-1-16,17 1 0,-35 17 15,0-17-15,-17 35 16,17-18-16,-35 36 16,35-36-16,-18 18 15,18 0-15,0-18 0,0 18 16,-70 53 0,70-53-16,-18 0 0,-70 70 15,88-52-15,-88 52 16,71-70-16,-71 88 15,70-88-15,-52 71 16,70-54 0,0-17-16,-18 0 0,-35 71 15,54-72-15,-1 1 16,0 0-16,-53 53 16,53-53-16,-53 53 15,53-53-15,-35 35 16,35-35-16,-35 53 15,53-53-15,-54 52 16,54-52-16,-53 53 16,53-70-16,-54 69 15,54-69-15,-35 52 16,17-53-16,-18 53 16,54-52-16,-19-1 15,1 0-15,0 0 16,17 1-16,-35 34 15,18-52-15,-18 52 16,35-34-16,1-19 16,-1 19-16,-17 34 15,17-52-15,0 35 16,1-18-16,17-17 0,-18-1 16,18 19-16,0-19 15,-17 1-15,17-1 16,0 1-16,0 17 15,0-17 1,0 17-16,0-17 16,0 0-16,17-1 15,-17 1-15,0 0 16,0-1 0,18-17-16,-18 18 15,17-18 1,1 0-1,0 0 1,-1 0 15,-17 17 16,0 1-31,18-18-16,0 18 15,-1-1-15,1 1 0,35 17 16,-18 1-16,36 16 16,-36-16-16,0-1 15,18 0-15,-18 18 0,54 18 16,-36-36 0,-18 18-16,53 18 15,-35-36-15,35 35 16,-53-34-16,18-19 15,-17 1-15,-1 0 0,18-18 0,-18 17 16,18-17 0,-18 0-16,18 0 15,-35 0-15,-1 0 16,1 0-16,0 0 16,-1 0-16,1-17 0,17-1 15,-17 0-15,52-52 16,-17 34-1,0-16-15,71-72 16,-71 53-16,17 19 0,1-19 16,88-52-1,-1-19-15,-87 72 0,105-89 16,-105 89 0,88-72-16,-71 54 15,-18 18-15,1 17 16,-18-18-16,70-52 0,-87 70 15,34-18-15,-52 36 16,-18 0 0,0 17-16,-18 0 15,0 18-15,-17 18 16,0 17-16</inkml:trace>
   <inkml:trace contextRef="#ctx0" brushRef="#br2" timeOffset="165349.6776">14093 7990 0,'18'18'15,"17"35"1,1-18-16,-19-17 0,19 17 16,17 36-16,-18-36 15,18 18 1,-36-35-16,19 17 16,-19-18-16,19-17 15,-19-17-15,36-36 16,-18 18-16,54-89 15,-19 36-15,18 0 16,18-18-16,141-159 16,-88 124-16,176-123 15,-176 140-15,123-70 16,-176 106-16,-36 17 0,36-17 16,-88 53-16,-18 0 15,0 17-15</inkml:trace>
   <inkml:trace contextRef="#ctx0" brushRef="#br2" timeOffset="166244.0419">15646 4868 0,'17'0'15,"-34"18"17,-1 17-17,18-17-15,-18 35 16,18-36-16,0 1 15,18 0-15,0-18 0,-1 0 16,19 0-16,34-53 16,-35 35-16,1 1 15,-19-19-15,1 19 0,-18-36 16,0 35-16,-53 18 16,18 0-16,0 18 15,-18-1-15,17 19 0,1-19 16,-18 36-1,53-35-15,-17 17 0,34-35 16,18 18 0,1-18-16,-1 0 15,0-18-15,1 0 0,-1 1 16,-18-1-16,1 18 0,0-35 16,-36 35-16,0-35 15,-52 35 1,35 0-16,17 17 0,-35 1 15,35 0-15,36-18 32,35 0-17,-18-18-15,1 0 0,16-17 16,-34 35-16,0-35 16,-18 17-1,-36 18-15,19 0 16</inkml:trace>
   <inkml:trace contextRef="#ctx0" brushRef="#br2" timeOffset="167051.2955">16245 3387 0,'71'-71'16,"-142"142"-16,213-177 0,-72 71 0,1-1 15,17-17-15,0 18 0,124-53 16,-124 70-16,71 1 16,-89 17-16,18 17 15,-52 19 1,-1 52-16,-35-35 16,-18 70-1,1-52-15,17-1 0,-18-17 0,18 0 16,0 53-16,18-71 15,52 36 1,-34-36-16,69-17 16,-52-1-16,71 1 15,-71 0-15,17 52 16,-35-35-16,1 71 16,-19-35-16,-17 70 15,-17-71-15,17-17 16,0 53-16,35-35 15,18-36-15,0-17 16,17-1-16,89 1 16,-88-18-16,17 18 15,-18-18-15,-17 17 0,53 36 16,-70-18-16,-19 18 16,1 36-16,-18-37 15,-18 54 1,1-53-16,17 0 0,0 0 15,0-18-15,0 54 16,17-37-16,1 1 0,17 36 16,-17-37-16,-18 54 15</inkml:trace>
-  <inkml:trace contextRef="#ctx0" brushRef="#br2" timeOffset="167729.5264">15804 7567 0,'36'53'15,"-72"-106"-15,89 159 0,36 35 16,-54-70-1,106 105-15,-53-70 16,0 0-16,106 105 16,-88-105-16,141 88 15,-123-106-15,158 106 16,-141-105-16,159 105 16,-159-106-16,176 88 15,-175-105-15,140 88 16,-159-89-16,124 36 15,-141-71-15,53 36 16,-106-36 0,-18-17-16,18 17 15,-53-17-15,0-1 16,0 1-16,0-1 0,0 1 16,-18 35-1,1-35-15,-1 17 16</inkml:trace>
+  <inkml:trace contextRef="#ctx0" brushRef="#br2" timeOffset="167729.5263">15804 7567 0,'36'53'15,"-72"-106"-15,89 159 0,36 35 16,-54-70-1,106 105-15,-53-70 16,0 0-16,106 105 16,-88-105-16,141 88 15,-123-106-15,158 106 16,-141-105-16,159 105 16,-159-106-16,176 88 15,-175-105-15,140 88 16,-159-89-16,124 36 15,-141-71-15,53 36 16,-106-36 0,-18-17-16,18 17 15,-53-17-15,0-1 16,0 1-16,0-1 0,0 1 16,-18 35-1,1-35-15,-1 17 16</inkml:trace>
   <inkml:trace contextRef="#ctx0" brushRef="#br2" timeOffset="169186.6591">19297 10425 0,'0'-18'16,"-18"0"-16,18 1 16,0-1-1,0 36 1,0 35 0,0-18-16,-17 88 15,-1-70-15,18 35 16,-35 89-16,-1-71 15,19 17-15,-54 124 16,18-88-16,-52 141 16,34-142-16,18 1 15,-17 35-15,-1-17 0,0 17 16,-87 194-16,87-212 16,-70 195-1,70-213-15,19 19 16,-19-19-16,0 1 0,-70 176 15,71-176-15,-54 176 16,54-176-16,-54 158 16,54-158-16,-36 106 15,71-142-15,-54 71 16,54-123-16,-35 70 16,52-88-16,-35 35 15,35-53-15,-35 18 16,36-35-16,-1 0 15,18-1 1,18-17 15,-1-17-15,1 17 0,0 0-16,-1 0 15,36 0-15,-35 17 16,17-17-16,-17 18 15,17-1-15,0 1 0,54 0 16,-54-1-16,53 1 16,-35 0-16,-18-1 15,53 19-15,-52-36 16,-1 17-16,0-17 0,18 0 16,-18 0-16,-17 0 15,-36 0 16,1-17-15,17-1 0,0-17-1,17-1-15,1-34 0,17 17 16,-17 0-16,53-71 16,-36 54-16,18-1 15,-18 1-15,18-18 0,70-89 16,-70 71-16,71-123 15,-54 106-15,-17-18 16,18-18-16,-1 0 16,1-17-16,17-18 0,-17 0 15,-1 0-15,1 0 0,35-177 16,-53 212-16,35-141 16,-35 177-16,-18 17 15,36-70-15,-36 105 16,18-35-1,-53 53-15,35-17 16,-17 35-16,-1-1 0,1 19 16,0-19-16,-1 19 15,1-1-15,-1 18 0,19-17 16</inkml:trace>
   <inkml:trace contextRef="#ctx0" brushRef="#br2" timeOffset="170465.5691">19844 12541 0,'0'0'0,"-18"0"0,18 18 16,0 0-16,18-1 0,-1 1 15,36 17-15,0-17 16,0-1-16,0 1 15,18 0-15,-1 17 0,107 18 16,-72-18-16,107 36 16,-88-18-16,158 35 15,-141-35-15,176 35 16,-158-35-16,212 35 16,-195-35-16,36-18 15,193 53 1,-193-35-16,-18 0 0,18 0 15,17 0-15,-17 0 0,-1 18 16,1-19-16,211 54 16,-211-53-16,-18-18 0,212 36 15,-212-36 1,0-17-16,194 0 0,-212-18 16,159 0-1,-176 0-15,123-36 16,-141 19-16,-35-1 15,18 18-15,-36-18 0,0 1 16,71-1-16,-89 0 16,36 18-16,-70 0 15,16-17-15,-16 17 16,-19 0-16,1 0 0,-36 17 31,1 1-15,-1-18-16,0 35 15,1-17-15,17 17 0,0 18 16,0-17-16,0 34 0,0-17 16,17 88-16,1-70 15,17 123 1,1-88-16,17 140 16,-36-104-16,18-1 15,-17 0-15,0 18 0,35 158 16,-36-158-16,36 123 15,-35-123-15,35 105 16,-36-140-16,1-18 16,17-1-16,-17 1 0,35 71 15,-35-107-15,-1 18 16,1-35-16,17 36 16,-17-54-16,-1-18 0,-17 1 15,36 0 1,-19-18-16,1 0 15,17 0-15,-17-18 0,70 18 16,-35 0-16,70 0 16,-52 0-16,17 0 15,0 18-15,1-18 16,16 17-16,89 1 16,-88 0-16,0-18 0,0 17 15,88 1-15,-106 0 16,0-18-16,-17 17 15,-1-17-15,1 0 0,-36 0 16,53-17-16,-70-1 16,0-17-16,-1-1 0,-17 1 15,0-18-15,-17-17 16,-1-19-16,-17 1 0,-18-35 0,0-1 16,0 1-16,-70-177 15,52 141-15,0-35 16,-17 35-16,0-17 0,-88-141 15,88 158-15,-1 0 16,-69-123-16,69 141 16,-52-106-1,88 123-15,-70-87 16,88 122-16,-54-69 16,36 105-16,18-18 0,0 18 15</inkml:trace>
   <inkml:trace contextRef="#ctx0" brushRef="#br2" timeOffset="171644.6754">29263 14023 0,'35'-18'0,"-70"36"0,88-36 16,-53 1-1,17 17-15,1-18 16,0 18 0,35-35-16,-18 17 15,71-35-15,-53 18 16,17 0-16,-17-1 0,35 1 16,-17-18-16,-1-17 15,19 17-15,-19-18 0,18 1 16,1-19-16,-19 19 0,89-107 15,-71 72 1,-17-1-16,87-106 16,-69 89-16,-19-1 0,107-123 15,-89 124-15,71-124 16,-71 123-16,-18 1 16,71-124-16,-88 123 15,71-123-15,-71 106 16,0 0-16,0 0 15,-1 0-15,-16 0 0,70-141 16,-71 141-16,53-142 16,-53 142-16,53-141 15,-35 159-15,36-124 16,-54 141-16,35-124 16,-34 125-16,-1-89 15,-17 88 1,17-71-16,-35 89 15,18 0-15,-18-88 16,17 35-16,-17 70 16,18-70-1,-18 88-15,17-53 0,-17 53 16,-17 0 0,17 18-16,-18 0 15,1 35-15,17-18 16,0 18 31,0 18-32,17-18-15,1 17 16,-1-17 0,1 0-16,0 0 0,-1 0 15,-34 0 16,-1 0-15,0 0-16,18-17 16,-17 17-1,-1 0-15,18-18 16,-17 18-16,-19-18 16,19 18-16,-1-17 15,-17-1-15,17 18 16,0 0-16,1 0 15,-1-17-15,1 17 0,-19 0 16,19 0-16,-1 0 16,0 0-16,18-18 15,-17 18-15,-1 0 16,18-18 0,0 1-1,0 34 1,35 1-1,-17 0-15,0-1 0,-1 18 16</inkml:trace>
@@ -3070,14 +3070,14 @@
   <inkml:trace contextRef="#ctx0" brushRef="#br2" timeOffset="177789.7355">26335 8661 0,'0'0'15,"-35"-36"-15,35 1 16,17 35-16,54 53 16,-18 0-1,70 88-15,-35-35 16,89 70-16,-89-87 16,-17-1-16,17-18 0,-18 1 15,-17-18-15,35 53 16,-52-71-16,-1 35 15,-17-52-15,-18 0 16,17-18-16,-17 17 16,-17-17-16</inkml:trace>
   <inkml:trace contextRef="#ctx0" brushRef="#br2" timeOffset="178306.0858">27376 9648 0,'17'0'16,"-17"18"0,18 0-16,17 17 0,-17 0 0,35 36 15,35 70 1,-53-70-16,18-1 0,35 54 15,-52-72-15,-1-16 16,0-1-16,-17-17 0,-1-1 16,19 1-1</inkml:trace>
   <inkml:trace contextRef="#ctx0" brushRef="#br3" timeOffset="200312.9086">26723 10037 0,'0'-36'15,"0"19"1,-35-19-16,17 36 16,-35-17-16,18 17 15,-36 35 1,36 0-16,-36 53 15,54-35-15,-1 0 0,18 0 16,0 0-16,18 35 16,17-52-16,36 17 15,-36-53-15,53 17 16,-35-17-16,18-35 16,-36 0-16,0-18 15,-35 17-15,0 1 16,-53-35-16,-17 17 15,34 35-15,-17 18 16,-35 18 0,0 17-16,53 0 15,17 18-15,18-18 16,35 36-16,-17-53 16,88 17-16,-53-17 15,0-18-15,17 0 0,-17-18 16,35-17-16,-70 17 15,17-35 1,-35 35-16,-53-52 16,18 52-16,-53-35 15,35 53-15,-35 0 16,35 0-16,18 18 16,17 0-16,0 17 0,18-18 15,0 36-15,18-17 16,53-1-16,-36-35 15,18 18-15,53-36 16,-54 0-16,-16 1 16,-1-1-16,-17-17 0,-18-18 15,-18 18-15,0 17 16,-17 0-16,-18 1 0,18 17 16,-53 0-16,35 17 15,0 19-15,35-19 16,1 18-1,17-17-15,17 0 0,19-1 16,-1-17-16,71 0 16,-53-17-16,35-19 15,-53 19-15,0-36 16,-35 35-16,-35 1 16,17-1-16,-70 18 15,53 18-15,-53 17 16,70-17-16,-17 17 15,17-35-15,36 35 16,-1-35-16,36 0 16,-17 0-1,34-35-15,-52 17 16,17-17-16,-35 17 16,-18 1-16,-17-1 15,0 18-15,0 0 16,-36 35-16,36-17 15,0 17-15,35-17 16,0 17-16,35-35 16,35 0-1,-17-18-15,-17 1 0,34-36 16,-52 18 0,-18 17-16,0 0 0,0 1 15,-53-1-15,18 18 16,-1 0-16,-17 18 0,18 17 15,0-17-15,-18 35 16,35-18-16,18-18 0,0 19 16,18-19-1,17 1-15,0-18 0,1 0 16,17-18-16,-18-17 0,0 17 16,18-52-16,-35 52 15,-18-35 1,-18 36-16,-35-19 15,18 36-15,-36 18 16,36 0-16,-18 35 16,53-36-16,18 54 15,17-36-15,36 18 16</inkml:trace>
-  <inkml:trace contextRef="#ctx0" brushRef="#br3" timeOffset="201603.4946">26970 9966 0,'18'0'16,"-18"-18"-1,17 1 1,1-19-16,-1 1 0,19 0 16,-19 0-16,36-89 15,-17 54-15,-1-1 0,0-17 16,0-18-16,54-106 15,-54 106-15,18-17 0,0 0 16,70-160 0,-52 142-16,70-176 15,18-18-15,-71 158 16,-18 1-16,89-177 16,-88 177-16,17-18 0,35-159 15,-52 159 1,52-141-16,-70 176 15,35-123-15,-35 158 16,-17 18-16,-1 1 0,0-1 16,18-53-1,-18 88-15,-35 18 0,0 18 16,0-18-16,0 36 16,-17 17-16,-1 0 0,0 17 15,1 36-15,-1-18 16</inkml:trace>
+  <inkml:trace contextRef="#ctx0" brushRef="#br3" timeOffset="201603.4945">26970 9966 0,'18'0'16,"-18"-18"-1,17 1 1,1-19-16,-1 1 0,19 0 16,-19 0-16,36-89 15,-17 54-15,-1-1 0,0-17 16,0-18-16,54-106 15,-54 106-15,18-17 0,0 0 16,70-160 0,-52 142-16,70-176 15,18-18-15,-71 158 16,-18 1-16,89-177 16,-88 177-16,17-18 0,35-159 15,-52 159 1,52-141-16,-70 176 15,35-123-15,-35 158 16,-17 18-16,-1 1 0,0-1 16,18-53-1,-18 88-15,-35 18 0,0 18 16,0-18-16,0 36 16,-17 17-16,-1 0 0,0 17 15,1 36-15,-1-18 16</inkml:trace>
   <inkml:trace contextRef="#ctx0" brushRef="#br3" timeOffset="202259.0656">26988 9719 0,'-18'-18'16,"36"36"-16,-36-53 0,0 35 15,18 17 16,0 36-31,0-17 16,0-1-16,18 0 0,-18 18 16,18 18-16,-1-36 15,1 18-15,17-36 16,0-17-16,1 0 16,17-17-1,-18-1-15,0 1 16,0-1-16,18 0 0,-35 18 15,17 0-15</inkml:trace>
   <inkml:trace contextRef="#ctx0" brushRef="#br3" timeOffset="202991.4672">29104 3193 0,'0'0'16,"-70"-53"-16,34 53 16,-17-18-16,-70 36 15,70 17-15,-88 53 16,88-35-16,18 0 0,-1-18 16,19 54-1,34-37-15,36-16 0,-17 17 16,34-18-16,18 18 0,71 17 15,-71-52-15,-17 17 16,-18-17-16,0 0 0,-36-1 16,-52 1-1,-53-18 1,17 17-16,-34 1 16,52-18-16,-18 18 15,53-18-15,36 0 16</inkml:trace>
   <inkml:trace contextRef="#ctx0" brushRef="#br3" timeOffset="203332.1988">29422 3722 0,'0'0'15,"-71"0"-15,36 0 0,17 17 16,-17 1-16,17 0 0,1-1 15,17 1-15,-18 17 0,18-17 16,35 35-16,-17-36 16,35 1-16,-18-18 15,18-18 1,-35 18-16,-1-17 16,1-1-16,-18 1 0,0-19 15,0 19-15,0-19 16,-18 36-16,1 0 15,-1 18 1,18 35-16,18-18 16,17-17-16,-17-1 15,17 1-15,35-18 16,-34 0-16,17-18 16,-36 1-16</inkml:trace>
   <inkml:trace contextRef="#ctx0" brushRef="#br3" timeOffset="203661.5581">29722 3775 0,'-18'53'16,"0"-18"-16,18 0 15,0 0-15,0-17 16,0 0-16,0-1 0,18 1 16,0 0-16,17-18 15,-18-18-15,36-17 16,-53-1-16,18 1 15,-18 0-15,0-18 0,-18-35 16,1 17-16,-19-52 16,19 52-16,-36-52 15,35 87-15,1 19 16,-1 17-16,18 35 16,18 53-1,-1-17-15,19 52 16,-1-52-16,-18-18 15,19 0-15,17 53 16,-18-54-16,-17-16 0,34 34 16</inkml:trace>
-  <inkml:trace contextRef="#ctx0" brushRef="#br3" timeOffset="204061.4549">30110 3828 0,'-18'53'0,"36"-106"0,-36 141 15,0-71-15,18 36 16,0-35-16,18-18 0,0 0 16,-1 0-16,36-18 15,-53 1 1,18-19-16,-1-16 15,-17 16-15,0-17 0,-17 0 16,17 1-16,-18-1 0,18-18 16,-35-52-16,17 70 15,-17-18 1,17 53-16,1 18 16,17 36-16,0-1 0,0 53 15,17-17-15,-17-18 16,53 70-1,-35-88-15,52 54 16,-34-36-16,-1-18 0,0-18 16,1 19-16,-1-19 0,-18-17 15,1 18-15,0 0 16</inkml:trace>
+  <inkml:trace contextRef="#ctx0" brushRef="#br3" timeOffset="204061.4548">30110 3828 0,'-18'53'0,"36"-106"0,-36 141 15,0-71-15,18 36 16,0-35-16,18-18 0,0 0 16,-1 0-16,36-18 15,-53 1 1,18-19-16,-1-16 15,-17 16-15,0-17 0,-17 0 16,17 1-16,-18-1 0,18-18 16,-35-52-16,17 70 15,-17-18 1,17 53-16,1 18 16,17 36-16,0-1 0,0 53 15,17-17-15,-17-18 16,53 70-1,-35-88-15,52 54 16,-34-36-16,-1-18 0,0-18 16,1 19-16,-1-19 0,-18-17 15,1 18-15,0 0 16</inkml:trace>
   <inkml:trace contextRef="#ctx0" brushRef="#br3" timeOffset="204368.258">30480 3298 0,'0'0'15,"18"-35"-15,-18 18 0,17 34 31,1 54-15,-18-18-16,18 0 0,-18 0 16,17 17-16,18 54 15,-35-72-15,18-16 16,-18 17-16,18-18 0,-18-17 16,0 17-16,17-18 0,-17 1 15,18-18 1,-18-18-16</inkml:trace>
-  <inkml:trace contextRef="#ctx0" brushRef="#br3" timeOffset="204689.8518">30780 3810 0,'0'0'15,"35"0"-15,-17 0 0,35-18 16,-36 18-16,19-35 15,-19 17-15,-17-17 16,0 0 0,-17 17-16,-19 1 15,19 17-15,-36 0 16,35 17-16,-17 36 16,35-35-16,0 17 15,0 0-15,18 1 0,17-1 16,0 0-16,0-17 0,1-1 15,-1 1-15,0 0 0,0-18 16,1 0-16,-19 0 16,1 0-16,-36 0 15,-35 0 1</inkml:trace>
+  <inkml:trace contextRef="#ctx0" brushRef="#br3" timeOffset="204689.8517">30780 3810 0,'0'0'15,"35"0"-15,-17 0 0,35-18 16,-36 18-16,19-35 15,-19 17-15,-17-17 16,0 0 0,-17 17-16,-19 1 15,19 17-15,-36 0 16,35 17-16,-17 36 16,35-35-16,0 17 15,0 0-15,18 1 0,17-1 16,0 0-16,0-17 0,1-1 15,-1 1-15,0 0 0,0-18 16,1 0-16,-19 0 16,1 0-16,-36 0 15,-35 0 1</inkml:trace>
   <inkml:trace contextRef="#ctx0" brushRef="#br3" timeOffset="205307.9039">30110 4974 0,'17'124'16,"-34"-248"-16,52 318 0,-17-88 16,-1-71-16,1-17 15,-18 0-15,17-1 16,-17-52-1,-17-53-15,-18 35 16,-1-71 0,19 71-16,-1-88 15,18 88-15,35-52 16,1 69-16,-1 19 16,0 17-16,18 0 0,35 17 15,-70 1-15,17 17 16,-35-17-16,0 17 15,-35-17-15,-18-1 16,35-17-16,-35 18 16,36-36-16,17-17 31</inkml:trace>
   <inkml:trace contextRef="#ctx0" brushRef="#br3" timeOffset="205551.9792">30603 4657 0,'0'53'16,"-17"-36"0,17 36-16,0-18 15,17 1 1,1-19-16,0-17 0,35 18 16,-18-18-16,0-18 15,-17 1-15,0-19 16,-18 1-16,0 18 15,-18-1-15,0-17 0,-35 17 16,36 18-16,-36-18 16,53 36-16,-18-18 15</inkml:trace>
   <inkml:trace contextRef="#ctx0" brushRef="#br3" timeOffset="205747.0053">30939 4692 0,'0'18'16,"0"-36"-16,0 53 0,17 18 15,19-18 1,-19-17-16,-17 0 16,18-18-16,-36 0 15,-17-36 1,0 19-16,17-1 15</inkml:trace>
@@ -3125,13 +3125,13 @@
   <inkml:trace contextRef="#ctx0" brushRef="#br0" timeOffset="8492.0152">7373 4198 0,'-18'0'15,"1"0"-15,-1 0 16,36 0 15,-1 0-15,36 0-16,0 18 15,71-1-15,-71-17 16,88 36 0,-71-19-16,-17-17 0,71 36 15,-71-19-15,35 1 16,-53-1-16,0-17 16,-17 0-16,-36 0 31,-17-17-16,17-1-15,-34 1 16,34-1-16,0 0 16</inkml:trace>
   <inkml:trace contextRef="#ctx0" brushRef="#br0" timeOffset="8718.9003">8026 4198 0,'17'0'15,"19"18"1,-19-1-16,54 36 15,-18-35-15,35 17 16,-53-17-16,18 35 16,-18-53-16,-17 35 15,-18-17-15,-35-1 16,-1 1-16,-52 17 16,53-35-16,-36 35 15,36-35-15,18 18 16,-1-18-16,36 0 15</inkml:trace>
   <inkml:trace contextRef="#ctx0" brushRef="#br0" timeOffset="9327.5916">8573 4445 0,'0'-18'16,"-18"18"-1,0 18 1,1 0-16,-1 17 15,18-17-15,0 17 16,18-18 0,-1-17-1,1 0-15,0-17 0,17-18 16,-18 17-16,-17-35 16,0 35-16,-17-17 15,-1 17-15,-35 1 16,18 17-16,17 0 15,1 0-15,-1 17 16,0 1-16,1 0 0,17-1 16,0 36-16,17-35 15,19 0-15,-1-18 16,0 17 0,-17-17-16,17 0 15,-17 0-15</inkml:trace>
-  <inkml:trace contextRef="#ctx0" brushRef="#br0" timeOffset="9570.8871">8573 4445 0,'0'35'16,"17"-35"15,18 18-15,1-18-16,52 18 15,-35-1-15,88 18 16,-53-17-16,53 0 16,-70-1-16,52 19 15,-70-36-15,35 17 16,-52 1-16,-19-18 16,1 0-16,-36 0 15,1 0-15,-1-18 16</inkml:trace>
+  <inkml:trace contextRef="#ctx0" brushRef="#br0" timeOffset="9570.887">8573 4445 0,'0'35'16,"17"-35"15,18 18-15,1-18-16,52 18 15,-35-1-15,88 18 16,-53-17-16,53 0 16,-70-1-16,52 19 15,-70-36-15,35 17 16,-52 1-16,-19-18 16,1 0-16,-36 0 15,1 0-15,-1-18 16</inkml:trace>
   <inkml:trace contextRef="#ctx0" brushRef="#br0" timeOffset="9861.7402">9366 4498 0,'18'0'16,"0"18"-16,17-1 15,0 1-15,36 35 16,-18-36-16,17 19 16,-35-1-16,1 0 15,-19-17-15,-34 0 16,-1-1-16,-35 1 16,18-1-16,-18-17 15,18 0-15,-1 18 0,19-18 16,-19 0-16,54 0 31</inkml:trace>
   <inkml:trace contextRef="#ctx0" brushRef="#br0" timeOffset="11066.048">9807 4798 0,'0'17'15,"36"-17"1,-19 18-16,1-18 0,17 0 15,0 18-15,18-36 16,-35 18 0,0-18-16,-1 18 0,-17-17 0,0-1 15,-17 1 1,-1 17 0,-17-18-16,17 18 0,-35 0 15,35 18-15,-17-1 16,18 1-16,34-1 15,1-17 1,-1 18 0,1-18-16,0 0 15,-1 0-15,-17-18 16,0 1-16,0-1 16,-35 1-1,17 17-15,-17 0 16,0 0-16,0 0 15,17 0-15,0 17 16,18 1-16,18-18 16,0 17-1,-1-17 1,1-17-16,0 17 16,-1-18-1,-17 36 48,0-1-32,18 1-15,-1-18-1,-34 0 32,-1-18-31,18 1-16,-17-1 15,-1 18 1,36 0 78,17 18-79,0-1-15,0 1 0,18 0 0,0-1 16,53 19 0,-35-19-16,70 19 15,-88-19-15,0 1 0,-1-18 16,-16 17-16,-1-17 0,-17 18 15,-1-18-15,1 0 0,-18-18 32,0 1-17,-18-1 1</inkml:trace>
   <inkml:trace contextRef="#ctx0" brushRef="#br0" timeOffset="11367.012">10548 4815 0,'-18'0'15,"36"0"-15,-36 18 16,36 0-16,17 17 15,-17-17-15,35 35 16,-18-36-16,36 36 16,-54-35-16,36 17 15,-53-17-15,0 17 16,0-17-16,-35 17 16,17-18-16,-52 19 15,35-19-15,-18 1 16,35 0-16,-17-18 15,52 0 1,19-18 0</inkml:trace>
   <inkml:trace contextRef="#ctx0" brushRef="#br0" timeOffset="11922.1695">10954 5027 0,'-18'0'0,"36"0"16,-54-18-16,19 18 0,-18 18 15,17 0-15,-17 35 16,35-18-16,-18 18 16,18-36-16,18 19 15,-1-19-15,19-17 16,-19 0-16,36-17 16,-18-1-16,1-17 15,-36 17-15,-18-35 16,0 36-1,-35-1-15,18 18 16,-35 0-16,52 0 16,-35 35-16,35-17 15,18 0-15,18-1 16,17 1 0,-17-18-16</inkml:trace>
   <inkml:trace contextRef="#ctx0" brushRef="#br0" timeOffset="12712.8838">9666 4657 0,'0'17'0,"0"1"31,-18 0-31,36-18 32,0 0-17,-1 0 1,-17 17 15,18-17 47,0 18-62,-1-18-16,36 0 15</inkml:trace>
-  <inkml:trace contextRef="#ctx0" brushRef="#br0" timeOffset="13535.3675">10989 5186 0,'0'-18'16,"0"1"-1,18 17 173,17 0-188,0 17 16,36 18-16,-18-17 15,0 0-15,17-1 0,-17 1 16,18 0-16,-1-1 0,1 1 15,52 0-15,-87-1 16,34 1 0,-35-18-16,-17 0 15,-36 0 1</inkml:trace>
+  <inkml:trace contextRef="#ctx0" brushRef="#br0" timeOffset="13535.3674">10989 5186 0,'0'-18'16,"0"1"-1,18 17 173,17 0-188,0 17 16,36 18-16,-18-17 15,0 0-15,17-1 0,-17 1 16,18 0-16,-1-1 0,1 1 15,52 0-15,-87-1 16,34 1 0,-35-18-16,-17 0 15,-36 0 1</inkml:trace>
   <inkml:trace contextRef="#ctx0" brushRef="#br0" timeOffset="13836.1339">11712 5186 0,'0'17'16,"18"1"-16,17 17 16,0-17-16,1 0 15,17-1-15,0 1 16,-18 0-16,53 17 0,-53-17 15,1 17-15,-19-35 16,-34 35 0,-1-17-16,-35-1 15,18 1-15,-36 17 16,54-35-16,-36 18 16,35-18-16,36 18 15,-1-18 1,19-18-16</inkml:trace>
   <inkml:trace contextRef="#ctx0" brushRef="#br0" timeOffset="14449.7786">12259 5468 0,'-18'0'15,"36"0"-15,-53-18 16,-1 18-16,19 0 16,-18 18-1,35 0-15,-18 17 16,36-17-1,-18-1-15,17 1 0,1-18 16,17 0-16,0 0 16,1 0-16,-19-35 15,1 17-15,-18-35 16,0 35-16,-35-17 16,17 18-16,-35-1 15,18 18-15,-18 18 16,35-1-16,1 18 15,17-17-15,17 35 16,1-53-16,35 18 16,-36-1-16,1-17 15,0 0-15,-1 0 16,-34-17 0,-1 17-1,0 0-15,1 0 16,-1-18-16</inkml:trace>
   <inkml:trace contextRef="#ctx0" brushRef="#br0" timeOffset="14981.8698">12171 5592 0,'17'0'0,"1"0"16,35 17-1,0 1-15,0-1 0,70 1 16,-52 0-16,70 17 16,-70-17-16,-1-1 15,54 1-15,-89 0 16,53-1-16,-70-17 16,17 0-16,-53 0 31,1 0-31,-1 0 15,-17-17-15,17-1 16,1 0-16</inkml:trace>
@@ -3151,7 +3151,7 @@
   <inkml:trace contextRef="#ctx0" brushRef="#br0" timeOffset="21016.0647">18821 7408 0,'-18'18'16,"36"0"-16,17-1 15,18 1-15,17 0 0,1-1 16,17-17-16,-17 18 0,105 35 15,-105-36-15,17-17 16,71 36-16,-54-19 16,-52-17-16,-17 0 15,-1 0 1</inkml:trace>
   <inkml:trace contextRef="#ctx0" brushRef="#br0" timeOffset="21843.7224">19914 7479 0,'0'0'0,"-17"0"0,-19 0 16,19 18-16,-1-18 16,36 17 15,17 1-31,0-1 15,1 1-15,34 17 16,-35-17-16,-17 17 0,0 1 16,-1 34-16,-17-52 15,0 17-15,-35 0 16,0-17-16,-18 17 16,35-17-16,1-18 15,34 0 1,36-35-1,0 17-15</inkml:trace>
   <inkml:trace contextRef="#ctx0" brushRef="#br0" timeOffset="23229.2747">20267 7691 0,'-18'0'16,"1"17"-1,-1-17-15,1 0 16,34 0 31,1 0-32,-1 0-15,1 0 16,-36 0 31,1 0-47,-1 0 15,-17-17-15,0 17 16</inkml:trace>
-  <inkml:trace contextRef="#ctx0" brushRef="#br0" timeOffset="23495.3391">19861 7691 0,'18'0'32,"0"17"-32,17-17 15,-17 18-15,17-1 0,35 19 16,-34-19-16,-19 1 16,19-18-16,-19 18 0,19-18 15,-19 17-15,-34-17 31,-1 0-15,0 0-16,1-17 16</inkml:trace>
+  <inkml:trace contextRef="#ctx0" brushRef="#br0" timeOffset="23495.339">19861 7691 0,'18'0'32,"0"17"-32,17-17 15,-17 18-15,17-1 0,35 19 16,-34-19-16,-19 1 16,19-18-16,-19 18 0,19-18 15,-19 17-15,-34-17 31,-1 0-15,0 0-16,1-17 16</inkml:trace>
   <inkml:trace contextRef="#ctx0" brushRef="#br0" timeOffset="24007.6531">20179 7761 0,'18'0'31,"-18"-18"-15,17 18-16,-17-17 15,0-1 1,18 1-16,-18-1 16,0 0-1,-18 18-15,1 0 16,-1 0-16,0 0 0,1 18 15,-1 35 1,0-18-16,18-17 0,0-1 16,18 1-16,0 0 0,-1-1 15,1-17-15,35 0 16,-18-17-16,0-1 0,1-35 16,-19 35-1,-17-17-15,18-18 16,-36 18-16,1 0 15,-1 17-15,-17 18 16,17 0-16,-17 35 16,17 1-16,18 17 15,0-36-15,35 36 16,-17-35-16,35-1 16,-18-17-16,-17 0 15,-18-17 1,-18-1-16,18 0 15,-17 1-15,-1-1 0,-17 1 16,17 17 0,18 17-1</inkml:trace>
   <inkml:trace contextRef="#ctx0" brushRef="#br0" timeOffset="27271.4344">19773 7620 0,'-17'0'0,"-1"0"16,18-18-1,0 36 48,18 0-63,17-1 15,18 36 1,0-35-16,17 35 16,-34-36-16,-1 19 15,18 17-15,-53-36 0,0 19 16,-18 16-16,18-16 16,-35-19-16,17 19 15,1-19-15,-19 1 0,-17 0 16,36-18-16,-1 17 15,-17-17-15,17 0 16,0 18-16,36-18 16,0 0-1,-1 0-15</inkml:trace>
   <inkml:trace contextRef="#ctx0" brushRef="#br0" timeOffset="27776.6543">20038 7885 0,'0'17'47,"-18"1"-47,1 17 15,-36 18-15,35-18 16,-53 36 0,1-18-16,35-18 15,-36 0-15,53-17 16,1 0-16,-1-18 0,36 0 47,-1 0-32,-17-18-15,18 0 16</inkml:trace>
@@ -3165,7 +3165,7 @@
   <inkml:trace contextRef="#ctx0" brushRef="#br1" timeOffset="37281.0403">19191 9031 0,'0'18'0,"-18"-18"15,36 0 48,0-18-48,-18 0 17,17 18-32,-17-17 15,0 34 63,-17 19-62,-1-1-16,0 0 16,1 54-16,-1-37 15,1 37 1,17-54-16,0 0 0,0-17 15,0 17-15,-18-17 16,18-1-16,0-34 47,0-1-47</inkml:trace>
   <inkml:trace contextRef="#ctx0" brushRef="#br1" timeOffset="37587.5285">18979 9225 0,'0'35'15,"0"1"-15,0-19 0,0 36 16,0-35-1,0 0-15,0-1 0,18 1 16,0-1-16,17-17 16,-17 0-16,17 0 0,-17 0 15,17 0-15,0-17 16,-17 17-16,17-18 0,-17 18 16,-1 0-16,1 0 15,-36 0 1,18 18-1</inkml:trace>
   <inkml:trace contextRef="#ctx0" brushRef="#br1" timeOffset="38088.0164">19050 9578 0,'-18'0'15</inkml:trace>
-  <inkml:trace contextRef="#ctx0" brushRef="#br1" timeOffset="42659.2016">7497 3351 0,'17'0'0,"1"0"15,-1 0 1,19 0-16,-19 0 15,1 0 1,0-17-16,-1 17 0,1 0 16,0 0-16,-1 0 15,1 0-15,17 0 16,-17 0-16,17 17 16,-17-17-16,17 18 15,-17-18-15,-1 0 16,19 18-1,-19-1-15,36-17 16,-18 18-16,-17-18 0,53 18 16,-36-18-16,0 0 15,0 17-15,1-17 0,-1 18 16,0 0-16,53-1 16,-52-17-16,52 18 15,-53-1-15,53 1 16,-35-18-1,-17 18-15,-1-1 0,53 1 16,-53 0-16,53-1 16,-52 1-16,34 17 15,-17-17-15,18-1 16,-36 1-16,36 17 16,-36-17-16,0 0 15,36 17-15,-36-17 16,53 17-16,-53-35 15,54 35 1,-36-17-16,-18-1 0,18-17 16,-18 18-16,18 0 0,35 17 15,-53-17-15,18-1 16,0 1-16,-17 0 0,16-1 16,-16 1-16,17-18 15,0 17-15,35 19 16,-35-19-16,35 19 15,-35-19-15,-18-17 16,18 18-16,-18 0 0,53 17 16,-35-18-16,36 19 15,-36-19-15,-18 1 16,18 17-16,-18-17 0,0 0 16,53 34-16,-52-34 15,-1 0-15,0-1 0,18 1 16,35 35-16,-52-35 15,52 17 1,-53-17-16,53 17 16,-35-18-16,-17 1 0,16 0 15,-16-1-15,17 1 0,-18 0 16,71 17 0,-71-17-16,53 17 15,-35-18-15,-18 1 0,18-18 16,-17 18-16,69 17 15,-52-17-15,36-1 16,-37 1-16,54 17 16,-53-17-16,35-1 15,-35 1-15,0-18 16,0 18-16,0-1 0,53 1 16,-53 0-16,70-1 15,-70-17-15,53 18 16,-53 0-16,-18-18 15,71 35 1,-71-17-16,1-1 0,17-17 16,-18 18-16,0-1 0,53 19 15,-35-36-15,53 35 16,-53-35 0,35 18-16,-35-1 15,0-17-15,0 18 16,0 0-16,-18-1 0,71 1 15,-53-1-15,53 19 16,-53-36-16,52 35 16,-34-35-16,-18 18 15,0-1-15,0-17 0,70 36 16,-70-36-16,53 35 16,-53-18-16,0 1 15,17 0-15,36 17 16,-53-17-16,53 17 15,-53-17-15,0-1 16,0 1-16,70 0 16,-70-1-16,0 1 0,18-18 15,34 35 1,-34-35-16,-18 18 0,17-1 16,-17 1-16,71 17 15,-71-17-15,70 0 16,-17 17-16,-53-18 15,18 1-15,34 17 16,-52-35-16,53 36 16,-53-19-16,0 1 15,53 0-15,-53-1 16,53 18-16,-54-17 16,1 0-16,0-18 0,53 17 15,-53 1-15,53 0 16,-53-18-1,35 17-15,-35-17 16,53 18-16,-71-18 16,53 18-16,-53-18 15,36 17 1,-36 1-16,1-18 0,-1 18 16,0-18-16,53 0 15,-52 17-15,34-17 16,-35 18-16,1-18 15,-1 0-15,0 0 0,1 17 16,-1-17-16,-18 0 0,36 18 16,18 0-1,-53-18-15,17 0 0,35 17 16,-52-17-16,53 18 16,-36-18-16,18 0 15,-36 0-15,19 18 16,-1-18-1,-17 0-15,-1 0 0,1 17 16,0-17-16,17 0 16,-35 18-16,17-18 15,1 0-15,0 0 0,-18 18 16,35-18 0,-17 0-16,-1 17 15,1-17 1,0 0-16,-1 0 15,1 0 17,-36 0-17,1 0 1,-1 0-16</inkml:trace>
+  <inkml:trace contextRef="#ctx0" brushRef="#br1" timeOffset="42659.2015">7497 3351 0,'17'0'0,"1"0"15,-1 0 1,19 0-16,-19 0 15,1 0 1,0-17-16,-1 17 0,1 0 16,0 0-16,-1 0 15,1 0-15,17 0 16,-17 0-16,17 17 16,-17-17-16,17 18 15,-17-18-15,-1 0 16,19 18-1,-19-1-15,36-17 16,-18 18-16,-17-18 0,53 18 16,-36-18-16,0 0 15,0 17-15,1-17 0,-1 18 16,0 0-16,53-1 16,-52-17-16,52 18 15,-53-1-15,53 1 16,-35-18-1,-17 18-15,-1-1 0,53 1 16,-53 0-16,53-1 16,-52 1-16,34 17 15,-17-17-15,18-1 16,-36 1-16,36 17 16,-36-17-16,0 0 15,36 17-15,-36-17 16,53 17-16,-53-35 15,54 35 1,-36-17-16,-18-1 0,18-17 16,-18 18-16,18 0 0,35 17 15,-53-17-15,18-1 16,0 1-16,-17 0 0,16-1 16,-16 1-16,17-18 15,0 17-15,35 19 16,-35-19-16,35 19 15,-35-19-15,-18-17 16,18 18-16,-18 0 0,53 17 16,-35-18-16,36 19 15,-36-19-15,-18 1 16,18 17-16,-18-17 0,0 0 16,53 34-16,-52-34 15,-1 0-15,0-1 0,18 1 16,35 35-16,-52-35 15,52 17 1,-53-17-16,53 17 16,-35-18-16,-17 1 0,16 0 15,-16-1-15,17 1 0,-18 0 16,71 17 0,-71-17-16,53 17 15,-35-18-15,-18 1 0,18-18 16,-17 18-16,69 17 15,-52-17-15,36-1 16,-37 1-16,54 17 16,-53-17-16,35-1 15,-35 1-15,0-18 16,0 18-16,0-1 0,53 1 16,-53 0-16,70-1 15,-70-17-15,53 18 16,-53 0-16,-18-18 15,71 35 1,-71-17-16,1-1 0,17-17 16,-18 18-16,0-1 0,53 19 15,-35-36-15,53 35 16,-53-35 0,35 18-16,-35-1 15,0-17-15,0 18 16,0 0-16,-18-1 0,71 1 15,-53-1-15,53 19 16,-53-36-16,52 35 16,-34-35-16,-18 18 15,0-1-15,0-17 0,70 36 16,-70-36-16,53 35 16,-53-18-16,0 1 15,17 0-15,36 17 16,-53-17-16,53 17 15,-53-17-15,0-1 16,0 1-16,70 0 16,-70-1-16,0 1 0,18-18 15,34 35 1,-34-35-16,-18 18 0,17-1 16,-17 1-16,71 17 15,-71-17-15,70 0 16,-17 17-16,-53-18 15,18 1-15,34 17 16,-52-35-16,53 36 16,-53-19-16,0 1 15,53 0-15,-53-1 16,53 18-16,-54-17 16,1 0-16,0-18 0,53 17 15,-53 1-15,53 0 16,-53-18-1,35 17-15,-35-17 16,53 18-16,-71-18 16,53 18-16,-53-18 15,36 17 1,-36 1-16,1-18 0,-1 18 16,0-18-16,53 0 15,-52 17-15,34-17 16,-35 18-16,1-18 15,-1 0-15,0 0 0,1 17 16,-1-17-16,-18 0 0,36 18 16,18 0-1,-53-18-15,17 0 0,35 17 16,-52-17-16,53 18 16,-36-18-16,18 0 15,-36 0-15,19 18 16,-1-18-1,-17 0-15,-1 0 0,1 17 16,0-17-16,17 0 16,-35 18-16,17-18 15,1 0-15,0 0 0,-18 18 16,35-18 0,-17 0-16,-1 17 15,1-17 1,0 0-16,-1 0 15,1 0 17,-36 0-17,1 0 1,-1 0-16</inkml:trace>
   <inkml:trace contextRef="#ctx0" brushRef="#br1" timeOffset="43393.7445">20443 6826 0,'-35'0'16,"18"0"-16,-36 18 15,35 0-15,0-1 0,18 1 16,-17 35 0,52-18-16,-17-17 0,17-1 15,35-17 1,-34 0-16,-19-17 0,36-1 15,0-17 1,-53-1-16,0 19 16,-35-36-16,-36 53 15,-17 0 1,18 35 0,34-17-1,36 17-15,53-35 16,-17 18-16,16-18 15,-16 0-15,-19 0 16,1 0 0,-36 17-16,-17 1 15,17-18 1</inkml:trace>
   <inkml:trace contextRef="#ctx0" brushRef="#br1" timeOffset="44288.3687">20391 7056 0,'0'-18'16,"0"36"-16,0-54 16,0 19-16,0-1 15,-18 18 1,0 0 0,-17 18-16,0 17 15,-1-17-15,1 17 0,-18 0 16,0 0-16,0 1 15,-17 17-15,-1 17 0,-105 71 16,70-53-16,-106 106 16,107-88-16,-125 124 15,124-125-15,1 19 16,-89 88-16,123-107 16,0 1-16,19 0 15,-72 88-15,89-123 16,-53 87-16,52-87 15,-34 52-15,52-87 16,-17 34-16,17-52 16,18-36-1,18-17 1,0 17-16,-18-17 16</inkml:trace>
   <inkml:trace contextRef="#ctx0" brushRef="#br1" timeOffset="44589.3386">18098 8943 0,'-18'88'0,"36"-176"0,-54 229 16,19-35-16,-1-53 16,-17 53-1,35-53-15,17 17 16,1-70-16,70 18 16,-35-18-16,53-36 15,-53 19-15,70-18 16,-70 17-16,35 18 15</inkml:trace>
@@ -3206,9 +3206,9 @@
   <inkml:trace contextRef="#ctx0" brushRef="#br0" timeOffset="36709.4778">29510 15946 0,'0'17'0,"-18"1"16,18 35-16,0-18 15,0 18 1,0-35-16,0 17 0,0 0 15,0-17-15,18-1 16,0-17-16,-18 18 16,17-18-16,1-18 0</inkml:trace>
   <inkml:trace contextRef="#ctx0" brushRef="#br0" timeOffset="37099.7163">29686 15946 0,'0'-18'16,"0"36"-16,18-36 0,-18 36 16,18-1-16,-18 1 15,0-1 1,0 1-16,17 0 0,-17-1 15,0 1-15,0 0 16,0-1 0,0 1-1,-17 0 1,34-18-16,-17 17 16,18 1-1,-1 0-15,-17-1 16,-17-17-1,-1 0-15,-17 0 16,17 18-16,1-18 16,-1 0-1,18 17-15,18-17 16</inkml:trace>
   <inkml:trace contextRef="#ctx0" brushRef="#br0" timeOffset="37633.7452">29827 16828 0,'0'0'0,"0"17"15,0 1 1,0-1 0,0 1-16,0 0 0,0-1 15,-35 19-15,35-19 16,-18 1-16,1 0 0,-1-1 16</inkml:trace>
-  <inkml:trace contextRef="#ctx0" brushRef="#br0" timeOffset="37899.6231">30039 16298 0,'0'0'0,"18"18"16,17 35 0,0-18-16,1 0 15,16 1-15,-16-1 16,-1 0-16,0 1 0,18-1 16,-35-18-16,-1 1 15,1-18-15,-18 18 0,0-36 16</inkml:trace>
-  <inkml:trace contextRef="#ctx0" brushRef="#br0" timeOffset="38140.7969">30533 16351 0,'-18'0'15,"1"36"1,-1-19-16,0 36 15,18-18-15,-17 18 0,-1 53 16,18-35 0,0-36-16,0 18 0,0 0 15,35 17-15,-35-52 16,36 17 0,-36-17-16,17-18 15,-17-18-15</inkml:trace>
-  <inkml:trace contextRef="#ctx0" brushRef="#br0" timeOffset="38624.1635">30815 15981 0,'0'-18'0,"0"36"0,0-53 15,-17 35 1,-1 0-16,18 35 15,-18-35-15,18 35 16,18-17-16,0 17 16,-18-17-16,35 17 15,-35-17 1,17-1 0,-34 1-16,-1 0 15,1-1-15,-19 1 16,19-1-1,17 1 1,0 0-16,35-1 16,-17 1-16,-1-18 15,18 18 1,-17-18-16,-18-18 16</inkml:trace>
+  <inkml:trace contextRef="#ctx0" brushRef="#br0" timeOffset="37899.623">30039 16298 0,'0'0'0,"18"18"16,17 35 0,0-18-16,1 0 15,16 1-15,-16-1 16,-1 0-16,0 1 0,18-1 16,-35-18-16,-1 1 15,1-18-15,-18 18 0,0-36 16</inkml:trace>
+  <inkml:trace contextRef="#ctx0" brushRef="#br0" timeOffset="38140.7968">30533 16351 0,'-18'0'15,"1"36"1,-1-19-16,0 36 15,18-18-15,-17 18 0,-1 53 16,18-35 0,0-36-16,0 18 0,0 0 15,35 17-15,-35-52 16,36 17 0,-36-17-16,17-18 15,-17-18-15</inkml:trace>
+  <inkml:trace contextRef="#ctx0" brushRef="#br0" timeOffset="38624.1634">30815 15981 0,'0'-18'0,"0"36"0,0-53 15,-17 35 1,-1 0-16,18 35 15,-18-35-15,18 35 16,18-17-16,0 17 16,-18-17-16,35 17 15,-35-17 1,17-1 0,-34 1-16,-1 0 15,1-1-15,-19 1 16,19-1-1,17 1 1,0 0-16,35-1 16,-17 1-16,-1-18 15,18 18 1,-17-18-16,-18-18 16</inkml:trace>
   <inkml:trace contextRef="#ctx0" brushRef="#br0" timeOffset="38806.6389">30956 16157 0,'0'0'0,"18"0"16,0 0-16,34-17 15,-34 17-15,17-18 16,-17 0-16,0 1 15,-18-1 1</inkml:trace>
   <inkml:trace contextRef="#ctx0" brushRef="#br0" timeOffset="38991.4772">31044 16034 0,'0'0'0,"0"17"16,0 1-16,0 17 15,-17 18-15,17-17 16,0-19-16,0 18 0,17 18 16,1-35-16,0 0 15,-1-1 1,1-17-16,0 0 0,-18-17 16</inkml:trace>
   <inkml:trace contextRef="#ctx0" brushRef="#br0" timeOffset="39329.8082">31238 16034 0,'0'0'16,"18"0"-16,0 0 15,-18 17 1,0 1-16,0 0 15,0-1-15,0 1 0,0 0 16,0-1-16,0 1 16,0 0-16,17-1 15,-17 1-15,18-18 16,-18 17-16,18 1 16,-1-18-16,-17 18 15,0-1-15,-17 1 16,-1 0-1,0-18 1,-17 17 0,17-17-16,1 0 15</inkml:trace>
@@ -3218,7 +3218,7 @@
   <inkml:trace contextRef="#ctx0" brushRef="#br0" timeOffset="41365.2792">21925 16510 0,'0'0'16,"35"-18"-16,-17 18 0,17-17 16,18-1-16,-35 0 15,17 18-15,-17-17 16,-1-1-16</inkml:trace>
   <inkml:trace contextRef="#ctx0" brushRef="#br0" timeOffset="41552.354">22031 16193 0,'0'0'0,"0"17"15,0 18-15,18 54 16,-18-19-16,35 36 16,-35-53-16,18 0 15,-1-18-15,1 0 0,17 1 16,-17-19-16,35 1 15,-18 0-15,0-36 16</inkml:trace>
   <inkml:trace contextRef="#ctx0" brushRef="#br0" timeOffset="42265.6189">23019 16087 0,'17'0'0,"19"-18"16,-1 18-16,0-18 0,71 1 16,-53 17-1,18-18-15,17 18 16,-53-18-16,-17 18 15,-1 0-15,-34 0 0,-19 18 16,1-18-16,0 18 16,17-1-16,-17-17 0,0 18 15,-18 17 1,53-17-16,-18 17 0,18-17 16,18 17-16,35 53 15,-36-52-15,19 17 0,-1-18 16,0 18-16,0 17 15,-17-34-15,-18-1 16,0 0-16,-18-17 0,-35 35 16,18-53-16,0 17 15,0 1-15,-18-18 0,17 0 16,-16-18 0,16 18-16,36-35 15,0 17-15,18-17 16</inkml:trace>
-  <inkml:trace contextRef="#ctx0" brushRef="#br0" timeOffset="42905.2899">23901 15752 0,'0'0'15,"0"-18"-15,-18 18 0,0 0 16,-17 18-1,0-1-15,17 1 16,1-1-16,17 19 16,17-19-1,19 1 1,-19 0-16,1-18 0,-1 17 16,1-17-16,0 18 0,-1 17 15,-17-17 1,-17-1-16,-1 1 15,0-18-15,-17 18 16,18-1-16,-1 1 16,18 0-16,18-1 15,-1-17 1,1 0-16,17 18 16,-17-18-16,-1 0 15,-17 18 1</inkml:trace>
+  <inkml:trace contextRef="#ctx0" brushRef="#br0" timeOffset="42905.2898">23901 15752 0,'0'0'15,"0"-18"-15,-18 18 0,0 0 16,-17 18-1,0-1-15,17 1 16,1-1-16,17 19 16,17-19-1,19 1 1,-19 0-16,1-18 0,-1 17 16,1-17-16,0 18 0,-1 17 15,-17-17 1,-17-1-16,-1 1 15,0-18-15,-17 18 16,18-1-16,-1 1 16,18 0-16,18-1 15,-1-17 1,1 0-16,17 18 16,-17-18-16,-1 0 15,-17 18 1</inkml:trace>
   <inkml:trace contextRef="#ctx0" brushRef="#br0" timeOffset="43088.64">24024 15928 0,'0'0'0,"18"0"15,-1 0-15,36 0 16,-35-18-16,0 18 16,-1 0-16,-17-17 15</inkml:trace>
   <inkml:trace contextRef="#ctx0" brushRef="#br0" timeOffset="43301.9415">24095 15804 0,'0'0'0,"0"18"15,0 0-15,0 35 16,0 0 0,0-18-16,0-18 15,0 19-15,0-19 0,17 1 16,-17 0-16,18-18 15,0 0-15,-1 0 16</inkml:trace>
   <inkml:trace contextRef="#ctx0" brushRef="#br0" timeOffset="43661.8131">24289 15769 0,'17'0'31,"-17"18"-31,18-1 16,-18 1-16,0 0 15,0 17 1,18-17-16,-18-1 0,0 1 16,17 0-1,-17-1-15,18 1 16,-18-1-1,18 1-15,-18 0 16,17-1 0,1 1-16,-18 0 15,18-1 1,-36-17 0,-17 18-1,17 0 1,0-18-16,-17 0 15</inkml:trace>
@@ -3240,9 +3240,9 @@
   <inkml:trace contextRef="#ctx0" brushRef="#br0" timeOffset="72318.3886">21625 7038 0,'0'-18'31,"18"18"110,-18 18-47,0 0-79,0-1-15,0 1 16,0-1-16,0-34 94,0-1-79,0 36 95,18-1-95,-18 1 1,0 35-1,0-35-15,0 52 16,0-34-16,-18 16 0,18 1 16,0 88-16,0-70 15,0 0-15,18-1 16,-18 54-16,0-71 16,0 35-16,0-53 15,0 18-15,17-53 16,-17-18-1,18-35 1,-18 18-16,0 0 16,17-53-16,-17 35 15,18-18 1,-18 18-16,18 18 0,-18 0 16,17-1-16,-17 1 0,18-18 0,-18-17 15,0 34 1,18-17-16,-18 18 15,0 18-15,17 17 16,-17 17 0,0 71-16,18-52 15,-18 69 1,18 1-16,-18-70 16,0-19-16,0 36 15,17-53 1,-17-18-1,18 1 1,-18-1-16,18-17 16,-1-53-16,-17 35 15,18 0-15,-18 0 16,17 18-16,-17-1 0,0-16 16,0 34-16,0 36 31,18 52-31,-18-35 15,0 89-15,-18-36 16,18 0-16,-17 18 0,17 35 16,-18 177-1,1-36-15,17-159 16,-18 36-16,18-106 16,18-35-16,-18-54 15,17-87-15,-17 35 16,0-106-1,0 105-15,0 19 0,0-1 16,18 1-16,-1-18 16,-17 70-16,36-53 15,-36 54-15,17-18 0,19-54 16,-36 54-16,17 0 16,1-36-1,-18 54-15,0-19 0,0 19 16,0 34-1,0 54 1,18-18-16,-18 0 16,0 17-16,0 18 0,0 1 15,0 87 1,0-35-16,0-106 16,0 1-16,17-36 15,-17-18-15,18-17 16,-18-53-16,17 35 15,-17-71 1,0 54-16,0 17 0,0 0 16,0 0-16,18-18 15,0 54-15,-18 34 16,0 1 0,0 17-16,17 53 15,-17-35-15,0 88 16,0-70-16,0 17 0,0-17 15,0-1-15,0-17 0,0 18 16,18-71 0,17-35-1,1-1-15,-19-17 0,18-17 16,-17 17-16,17-106 16,-17 71-16,-18-71 15,0 89-15,-18-1 0,18 36 16,0 17-16,18 53 31,0 71-31,-18-53 16,0 35-16,17-17 0,-17 17 15,0 0-15,-17 124 16,17-106-16,-18 123 16,0-105-16,18 70 15,0-124-15,0-35 16,18-17-16,-18-71 15,18 0-15,-1-35 0,-17 0 16,18 0-16,-18-89 16,18 89-16,-18 18 0,17 17 15,19-18 1,-36 53-16,17 1 0,1 17 16,-1 0-1,1 17 1,-18 1-16,18 17 0,-18 1 15,0 17-15,0-1 0,17 72 16,-17-54-16,0 19 16,18 87-16,-18-105 15,18-18-15,-18-36 16,17-34-16,-17-1 0,36-88 16,-19 18-16,36-89 15,-35 89-15,-18 0 16,35-71-16,-35 106 15,18-17-15,-1 70 16,-17 35 0,0 36-1,-17-18-15,17 52 16,-18-52-16,0 18 0,1 88 16,-1-89-16,0 18 15,18-17-15,-17 0 0,17-19 16,17 54-1,1-88-15,0 0 16,-1-36-16,19-17 0,-1-71 16,-35 53-1,18-18-15,-18 18 0,17-70 16,-17 52-16,35 1 16,-35 52-16,18 18 15,0 18-15,-18-1 16,17 19-16,-17 34 15,0-34-15,0 16 16,-17 1-16,17 0 0,-36 71 16,36-54-1,-17 19-15,-1 52 16,1-18-16,17-88 16,17 1-16,1-54 15,-1-35 1,1 0-16,0-88 15,-18 71-15,0-1 0,0-52 16,17 34 0,1 72-16,-18-19 0,18 36 15,-1-35-15,1 35 16,-36 18 15,1 52-31,-1 1 16,18-18-16,-35 106 15,35-89-15,-18 89 16,18-71-16,0-35 16,0 18-16,18-107 15,-1-52 1,1 17-16,0-70 16,-18 71-1,17-18-15,-17 17 0,18 1 0,-18 17 16,35-36-1,-35 72-15,18-54 16,0 54-16,17-54 16,-35 36-16,17-36 15,-17 54-15,0-19 16,0 19-16,0 34 31,0 19-31,0-1 16,0 0-16,0 71 15,0-53-15,0 0 0,18 0 16,-18 88 0,0-71-16,0 19 0,0 87 15,0-88-15,-18 89 16,18-89-16,0 35 16,0-88-16,0-17 15,18-18 1,-18-53-1,0 0-15,18-70 16,-18 52-16,17-52 16,1 52-16,17-17 15,-17 53-15,0-18 16,-1 35-16,1 1 16,17-36-16,-17 17 15,-1 19-15,1-19 16,-18 19-16,0 34 15,-18 54 1,18-18-16,0 70 16,0-52-1,0 88-15,0-71 16,0 0-16,0 0 0,0-17 16,0-1-16,0 1 15,0-53-15,18-36 16,0-17-16,17-71 15,-17 35-15,-18-17 16,17-71-16,1 71 16,-1 35-16,1 0 15,0 18-15,-1 0 0,36 17 16,-35 0-16,0 18 16,-18 18-16,17 17 15,-17-17-15,0 70 16,-17-35-1,17 0-15,0 18 0,0-1 0,-18 1 16,18-1-16,0 1 16,0-1-16,0 19 15,0-54-15,0-18 0,0 1 16,18-36-16,-18 1 16,17-18-16,-17-1 15,18-17-15,-18-88 16,18 71-16,-18-54 15,0 71-15,0-35 16,0 53 0,0 52-1,0 1 1,0 17-16,0 18 0,0 0 0,0 18 16,-18 70-16,18-53 15,0 0-15,0 71 16,-18-71-16,18-35 0,0 0 15,0-18-15,0 1 0,18-36 16,-18-18 0,35-70-16,-35 17 15,35-52-15,-35 52 16,18 1-16,-18-1 0,0 1 16,18-36-1,-1 88-15,1 0 0,-18 36 16,18 17-1,-18 1-15,0-1 16,0 18-16,-18 53 16,18-53-16,0 88 15,18-71-15,-1 71 16,-17-88-16,18 0 16,0-53-16,-1-17 15,1-19-15,-1 1 16,-17-18-16,18 0 0,0-88 15,-1 88 1,-17-106-16,18 89 16,-18-1-16,18 1 0,-1-1 15,-17 54-15,0 34 32,0 54-17,0-18-15,0 88 16,0-71-16,0 1 0,18 88 15,-18-106-15,0 17 16,18-35-16,-18 1 16,17-36-16,1 0 15,17-53-15,-35 0 16,18 0-16,-1-18 0,1 1 16,0-1-16,-1-88 15,-17 89-15,18-54 16,-18 107-16,0-1 0,18 18 15,-18 18-15,0-1 16,17 54-16,-17-18 16,18 53-16,-18-53 15,18 70-15,-18-52 16,17-1-16,-17 1 16,18 70-16,-18-88 15,17 70-15,-17-70 16,36-18-16,-19-35 15,1-17-15,17-1 16,-17-35-16,0 0 0,34-88 16,-34 71-16,0-71 15,-18 70-15,0 18 16,17 18-16,1 0 16,-18 52-16,18 36 15,-18 0-15,0 0 0,0 35 16,0-17-16,0 17 0,17 106 15,-17-88 1,-17 70-16,17-88 16,0 18-16,-18-71 15,18-17-15,18-36 16,-18-34 0,0-54-16,0 53 15,17-18-15,-17-88 16,0 71-16,0-70 15,18 105-15,0 17 16,-18 19-16,17 17 16,1 17-16,-1 1 15,1 17-15,0 18 16,-18-18-16,0 1 16,35 70-16,-35-54 15,18 19-15,17 70 16,-17-70-16,-18-1 0,17-34 15,1 16-15,0-34 16,-1-18-16,1-35 16,17-71-16,-35 53 15,35-123-15,-35 87 16,0 1-16,0-18 16,18-52-16,-18 105 15,0-18-15,0 54 16,0-1-16,0 36 31,0 17-15,-18 0-16,18 18 15,0 88-15,0-53 16,0 18-16,0 124 16,18-107-16,-18 106 15,0-141-15,0 1 0,18-19 16,-18-34-16,0-1 15,17-18-15,-17-34 16,0-36-16,0 0 16,18-18-16,-18 1 0,0-36 0,0 0 15,-18-123 1,18 105-16,0 1 0,-17-106 16,52 70-1,-17 106-15,-1 18 0,18-1 16,-35 19-16,18 17 15,-18 17-15,18 1 16,-18 17-16,17 71 16,-17-35-16,0-1 0,0 1 15,0 105-15,0-88 16,0 1-16,0 87 16,0-88-16,0 0 0,0-17 15,0-1-15,0-17 0,18 0 16,-18-35-16,35-36 15,-17 1 1,0-19-16,-1-52 16,18-53-16,-17 53 15,0 0-15,-1-106 16,19 70 0,-19 89-16,1 17 0,17 36 15,1 17 1,-36 0-16,17 18 0,1 53 15,-1-35-15,-17-1 16,18 1-16,-18 17 16,18-17-16,-18 87 15,17-105-15,-17 0 0,0-17 16,0-1-16,18-35 16,-18-18-16,35-35 15,-35 0-15,18-17 0,0-1 16,-18-17-16,17 0 0,1-89 15,-18 89 1,17 0-16,-17 70 16,18 18-16,0 0 15,-18 53 1,0 0-16,0 88 16,0-52-16,0-19 15,0 1-15,0-1 16,0 1-16,0-18 0,0-18 0,17 0 15,1-88 17,-18 18-32,18-18 0,-18 0 15,17-17-15,1-71 16,-18 52-16,18-52 16,-18 88-16,0 18 0,0 0 15,17 70 16,-17 53-31,0-35 16,18 88-16,-18-53 16,0-17-16,0 0 0,0-1 15,0 54 1,0-71-16,0-1 16,0-34-16,0 0 15,17-36-15,19-35 16,-36 0-16,35-88 15,-17 71-15,-18-19 16,17-16-16,-17 16 0,18-34 16,0 105-16,-18 1 15,17 17-15,1 35 16,-18-17-16,0-1 16,0 1-16,0 17 15,0 18-15,18-18 0,-18 18 0,0 71 16,0-54-1,17 71-15,-17-70 16,0-1-16,0-34 0,18-1 16,-1-35-16,36-53 15,-35 0 1,0 0-16,35-106 16,-18 71-16,0-88 15,-35 88-15,18-71 16,-18 88-16,17 18 15,-17 18-15,0 0 0,0 17 0,0 36 32,0 52-17,0-17-15,0 0 16,0 53-16,-17-35 16,17-18-16,17 70 15,-17-88-15,18 36 16,-18-53-16,0-1 15,18 1-15,-18-1 16,17-34 31,1-36-47,-18 0 16,35-70-16,-35 70 15,18 0-15,-18 17 16,0 19-16,17-1 0,-17 36 15,18 70 1,0-17-16,-1 52 16,1-52-16,0 70 15,-1-88-15,1 123 32,0-158-32,-18-1 0,17-17 15,1-17-15,17-54 16,0 18-16,1-88 15,-1 70-15,-17-17 16,-18 18-16,17-1 0,1 18 16,0-35-1,-1 70-15,-17 36 16,18 0-16,-18 52 16,17-17-16,-17 0 15,0 18-15,18-18 0,-18 70 16,0-52-16,0 52 15,0-52-15,0 17 16,0-53-16,0 18 16,18-53-16,-1-18 15,1-52 1,0 35-16,-1-18 0,1 0 16,-18-53-1,18 35-15,-18 1 0,0-54 16,0 71-16,0 0 15,0 36-15,0-1 0,0 53 16,0 36 0,17 0-16,1 87 15,-18-87 1,17-1-16,-17 19 0,0-19 16,0 18-16,0 71 15,0-88-15,0 52 16,0-88-16,0-17 0,18-18 15,17-53 1,-17 0-16,0-17 16,35-89-16,-53 53 15,17 0-15,1 0 0,-18-105 16,18 140-16,-1 1 16,-17 52-16,18 18 15,-18 18 1,0 35-1,17-18-15,-17 88 16,0-52-16,0 70 16,0-70-16,0-1 0,0 89 15,0-71 1,-17 53 0,17-88-16,0-18 0,17-52 15,1-36-15,0-71 16,-1 36-16,1-71 15,-18 54-15,0-72 16,-18 107 0,18-19-16,18 72 15,-18 34-15,0 1 16,18 53 0,-18-18-16,17-1 0,-17 72 15,18-54-15,-18 54 16,0-54-16,0 1 15,18 53-15,-18-72 16,0 37-16,0-72 16,17-17-1,1-35-15,17-71 16,0 36-16,-35-1 0,36-123 16,-36 106-16,0 0 15,0-71-15,17 106 16,-17 0-1,0 71 1,0 52-16,0-17 16,0 0-16,0 71 15,0-54-15,0 18 0,18 53 16,-18-70-16,0 35 16,0-53-1,18 0-15,-1-36 16,1-17-16,-18-17 15,17-1-15,1-53 16,-18 19-16,18-1 16,-1 0-16,-17-71 15,18 71-15,-18-17 16,18 34-16,-18 1 0,17 0 16,1 35-16,-18 18 15,0 17-15,18 53 16,-18-35-16,17 0 0,1 88 15,0-88 1,-1 70-16,1-87 16,-1 17-16,1-18 0,0-18 15,17 19-15,-17-36 16,35-36 0,-36 1-16,18-71 15,-17 36-15,17-1 0,-17-17 16,0-124-16,-1 124 15,1-53 1,-18 123-16,18 18 16,-18 36-16,0 52 15,0-35-15,17 88 16,-17-71-16,18 54 16,-1-53-16,-17-1 0,0 18 15,0-17-15,0-1 16,-17 1-16,17 35 15,0-71-15,0-17 16,17-36-16,-17-17 0,36-89 16,-36 54-16,17-107 15,-17 107-15,0-89 16,18 106 0,0 0-16,-18 36 15,17 17-15,-17 17 16,0 1-16,0 17 15,0 0-15,-17 54 16,17-36-16,0 70 16,0-52-16,0-1 15,0 106 1,0-140-16,0 34 16,17-52-16,1-36 15,17-35 1,-17 0-16,0 1 0,17-90 15,-18 54-15,1-70 16,0 69-16,17-69 16,-35 122-16,18 19 15,-18 34 1,17 71 0,-17-17-16,18 70 15,-18-53-15,0 71 16,0-71-16,0 53 15,0-88-15,0-17 0,0-19 16,0 1-16,0-36 16,18-17-16,-1-53 15,1 35-15,-18-18 16,17-17-16,1 18 0,-18-107 16,18 89-16,-1-53 15,-17 106 1,0 17-16,18 36 0,-18 17 15,18 71-15,-18-53 16,17 0-16,-17-1 0,18 37 16,-18-36-16,18 70 15,-18-52-15,0 34 16,0-52 0,0 0-16,0-17 0,0-19 15,17-17-15,18-53 16,-17 18-16,17-89 15,-17 36 1,0 0-16,-1-88 16,-17 70-16,18 18 0,-18 17 15,0 18-15,18 36 0,-1 17 16,-17 17-16,0 1 16,0 35-1,0-18-15,18 18 0,-18 70 16,0-52-16,0 17 15,18 71-15,-18-89 16,0 1-16,0 35 16,0-71-16,17 0 0,-17-17 15,18-18-15,-18-35 16,17 0 0,1-89-16,-18 53 15,18-17-15,-1-88 16,-17 70-16,0-70 15,18 105-15,-18 1 16,18 70-16,-1 17 16,-17 54-1,18-36-15,-18 71 16,0-53-16,18 0 0,-18 70 16,0-52-1,0-18-15,0 17 0,0 1 16,0 35-16,17-71 15,1-17-15,-18-36 16,17 0-16,1-17 0,35-71 16,-35 36-1,-1-107-15,1 89 0,-18-18 16,18-70 0,-18 105-16,17 36 0,-17 0 15,0 52 1,0 1-16,0 35 0,0 70 15,18-52-15,-18-1 16,17 89-16,-17-88 16,18 87-16,-18-87 15,0-18-15,18 0 0,-18-18 16,0 18-16,17-53 16,1-35-1,0 0 1,17-89-16,-17 36 15,-1-18-15,1 18 0,0 0 16,-18 17-16,17-35 16,-17 89-16,18 17 0,-1 0 15,-17 17 1,18 36-16,-18-18 16,0 36-16,0-18 15,0 70-15,0-34 16,0-19-16,-18 54 15,36-71-15,-18-36 16,0 1-16,18-18 0,-1-18 16,1-17-16,0 0 15,-1-18-15,19-71 16,-19 54-16,18-89 16,-17 88-16,17-70 15,-17 106-15,0 17 16,-1 36-16,1 35 15,0 70-15,-1-52 16,1-1-16,-18 1 0,35 35 16,-17-71-16,-1 36 15,1-54 1,0-17-16,-1-17 16,1-19-16,17-34 15,-17 17-15,0 0 0,17-35 16,-18 35-1,-17 18-15,18-1 16,0 36-16,-1 18 16,-17 0-16,0-1 0,18 36 15,-18-35-15,0 17 16,18 18-16,-18-35 16,0 35-1,0-36-15,17-17 0,1-17 16,35-19-1,-36 1-15,1 17 0,0-17 16,-1 0-16,1 0 16,-18 17-16,18 18 15,-1 0 1,1 35-16,0-17 16,-1 17-16,1-17 15,-1-1-15,1-17 0,-18 18 16,18 0-16,-1 17 15,1-17 1,0-18-16,-1 0 16</inkml:trace>
   <inkml:trace contextRef="#ctx0" brushRef="#br0" timeOffset="85614.0571">29492 10672 0,'18'0'16,"0"0"-16,34 0 15,1 0-15,0-18 16,18 18-16,88-18 16,-89 1-16,18 17 15,-35-18-15,0 18 0,-18-18 16,1 18-16,-54 0 16,-35 0-1,18 0-15,-53 18 16,52 0-16,-17-1 15,36 1-15,-1 17 16,18-17-16,18 17 16,-1 0-16,36 36 15,-17-18-15,-19-18 16,36 53-16,-35-52 16,0 52-1,-18-53-15,0 0 0,-36 18 16,1-35-16,-18 0 15,18-18-15,-36 0 16,36 0-16,0-18 16,-1 18-16,1-18 15,17 18-15,18-17 16,18 17-16,0-18 16</inkml:trace>
   <inkml:trace contextRef="#ctx0" brushRef="#br0" timeOffset="86344.3509">30692 10248 0,'0'-35'16,"0"70"-16,-18-88 0,0 36 15,1-1 1,-1 18-16,-17 0 15,17 0-15,-17 18 0,17-1 0,1 1 16,-1 17-16,18 0 16,35 1-16,1-19 15,16 19 1,-34-1-16,17-17 0,18 17 16,-35-17-16,0-1 15,-18 1-15,0-1 16,-18 1-16,-17 17 15,-1-17-15,1-18 0,17 18 16,1-18-16,-18 0 16,35 17-1,35 1 1,-18 0 0,19-1-1,-36 1-15,17-18 0,-17 17 16,0 1-16,0 0 0,-17-1 15,17 1 1,0 0-16,17-18 16,1 0-1,0 0-15,-1-18 16</inkml:trace>
-  <inkml:trace contextRef="#ctx0" brushRef="#br0" timeOffset="86572.9173">30850 10530 0,'18'0'0,"17"0"15,-17 0-15,35-17 16,-18 17-16,0 0 15,1-18-15,-1 18 16,-17-17-16,-18-1 16</inkml:trace>
-  <inkml:trace contextRef="#ctx0" brushRef="#br0" timeOffset="86804.9446">30992 10283 0,'-18'36'16,"18"-19"-16,0 19 15,0 34-15,0-34 16,0-1-16,0 35 16,18-34-16,17 17 15,-18-36-15,36 18 16,-35-35-16,17 18 15,-35-36-15,18 18 16</inkml:trace>
-  <inkml:trace contextRef="#ctx0" brushRef="#br0" timeOffset="87322.5123">31309 10283 0,'35'0'0,"-70"0"0,88 0 15,-18-17-15,-17 17 16,17 17-16,-35 1 15,0 0 1,-17-18-16,17 17 16,-18 1-16,0 0 0,1-1 15,17 1-15,0 0 16,0-1-16,0 1 16,17 0-16,-17-1 15,0 1-15,0-1 0,18 1 16,-18 0-1,18-1-15,-18 1 16,0 0-16,17 17 16,1-17-1,-1-1 1,-17 1-16,18-1 16,-18 1-16,-18-18 15,1 18 1,-1-18-16,1 0 15,-1 0 1,0 0 0</inkml:trace>
+  <inkml:trace contextRef="#ctx0" brushRef="#br0" timeOffset="86572.9172">30850 10530 0,'18'0'0,"17"0"15,-17 0-15,35-17 16,-18 17-16,0 0 15,1-18-15,-1 18 16,-17-17-16,-18-1 16</inkml:trace>
+  <inkml:trace contextRef="#ctx0" brushRef="#br0" timeOffset="86804.9445">30992 10283 0,'-18'36'16,"18"-19"-16,0 19 15,0 34-15,0-34 16,0-1-16,0 35 16,18-34-16,17 17 15,-18-36-15,36 18 16,-35-35-16,17 18 15,-35-36-15,18 18 16</inkml:trace>
+  <inkml:trace contextRef="#ctx0" brushRef="#br0" timeOffset="87322.5122">31309 10283 0,'35'0'0,"-70"0"0,88 0 15,-18-17-15,-17 17 16,17 17-16,-35 1 15,0 0 1,-17-18-16,17 17 16,-18 1-16,0 0 0,1-1 15,17 1-15,0 0 16,0-1-16,0 1 16,17 0-16,-17-1 15,0 1-15,0-1 0,18 1 16,-18 0-1,18-1-15,-18 1 16,0 0-16,17 17 16,1-17-1,-1-1 1,-17 1-16,18-1 16,-18 1-16,-18-18 15,1 18 1,-1-18-16,1 0 15,-1 0 1,0 0 0</inkml:trace>
   <inkml:trace contextRef="#ctx0" brushRef="#br0" timeOffset="108834.6173">24906 6738 0,'0'-18'16,"0"36"-1,35 17 1,1-17-16,52 53 16,-53-36-16,18 0 15,0 18-15,0-18 0,35 36 16,-53-36-16,36 18 15,-36-35-15,0 17 16,-17-35-16,-18-18 16,0 1-1</inkml:trace>
   <inkml:trace contextRef="#ctx0" brushRef="#br0" timeOffset="109037.7901">25435 6685 0,'0'0'0,"-17"18"0,-1-1 15,0 19-15,-35 70 16,18-54-16,0 1 0,-18 53 16,35-53-1,1-18-15,-1 1 0,18-1 16,0-17-16,0-1 15</inkml:trace>
   <inkml:trace contextRef="#ctx0" brushRef="#br0" timeOffset="109588.9707">25735 6350 0,'0'-18'16,"0"36"-16,-17-36 0,17 1 16,-18 17-16,0 0 15,18 17 17,0 1-17,0 0-15,18-1 0,-18 1 16,18 0-16,-18-1 15,0 1-15,0-1 0,0 19 16,-18-36-16,18 17 16,-18 1-16,1-18 15,-1 18 1,0-18-16,18 17 16,0 1-16,18-18 15,0 18-15,-1-18 16,1 0-16,17 0 15,-17 0-15,-18 17 32,-18-17-17</inkml:trace>
@@ -3314,7 +3314,7 @@
   <inkml:trace contextRef="#ctx0" brushRef="#br0" timeOffset="377.6722">4233 3298 0,'0'0'16,"36"0"-16,17 0 0,-18-17 0,18 17 15,0-18-15,-18 1 0,35-1 16,-52 18 0</inkml:trace>
   <inkml:trace contextRef="#ctx0" brushRef="#br0" timeOffset="1090.8958">5997 3122 0,'0'0'16,"36"53"-16,-36-18 0,17 1 15,-17-1 1,0-18-16,-17-17 15,-1 0 1,18-70-16,-18 35 16,18-1-16,18-52 15,-18 71-15,18-1 16,-18 0-16,17 18 0,1 0 16,-1 0-16,1 53 15,0-35-15,-1 17 16,-17 0-16,18-17 15,0-18 1,-1-35 0,1 17-16,0 0 0,-18-34 15,17 16 1,1 36-16,-1 36 16,-17-19-16,18 18 15,-18 1-15,18 34 16,-1-52-16,-17 0 15,36 17-15,-19-35 16,1 0-16,17-35 16</inkml:trace>
   <inkml:trace contextRef="#ctx0" brushRef="#br0" timeOffset="1211.2277">6456 3175 0,'0'0'16,"17"35"-16,-17 1 0,18-19 0,0 18 15,-1-17 1,1-18 0,-18-18-16</inkml:trace>
-  <inkml:trace contextRef="#ctx0" brushRef="#br0" timeOffset="1339.1839">6456 2840 0,'0'0'16,"17"-18"-16,1 18 0,-18-17 0,35 17 16</inkml:trace>
+  <inkml:trace contextRef="#ctx0" brushRef="#br0" timeOffset="1339.1838">6456 2840 0,'0'0'16,"17"-18"-16,1 18 0,-18-17 0,35 17 16</inkml:trace>
   <inkml:trace contextRef="#ctx0" brushRef="#br0" timeOffset="1639.421">6668 3316 0,'0'-18'16,"-18"1"-16,18-36 16,-18 35-16,18-17 0,0 17 15,0 1-15,0-1 16,18 18-16,0 0 15,-1 18 1,1-18-16,-1 17 0,-17 1 16,18 35-16,-18-35 15,18 17-15,-18-18 0,0 1 16,17 0-16,-17-1 16,18-17-16,-18-17 0</inkml:trace>
   <inkml:trace contextRef="#ctx0" brushRef="#br0" timeOffset="1953.3692">6932 3157 0,'0'-17'16,"18"-1"-1,-36 18 32</inkml:trace>
   <inkml:trace contextRef="#ctx0" brushRef="#br0" timeOffset="2208.1363">6932 3157 0,'0'-35'0,"0"53"125,0-1-109,0 19-16,0-19 16,18 19-16,-18-19 15,0 18 1,0-17-16,17-18 15,-17-18 1,0 1 0</inkml:trace>
@@ -3332,7 +3332,7 @@
   <inkml:trace contextRef="#ctx0" brushRef="#br0" timeOffset="5538.4268">11853 2840 0,'36'0'16,"-72"0"-16,107 0 0,-36 0 16,36-18-16,-36 18 15,-17 0-15,-1 0 0</inkml:trace>
   <inkml:trace contextRef="#ctx0" brushRef="#br0" timeOffset="5670.5666">11871 2981 0,'35'0'16,"-70"0"-16,106 0 0,-36 0 0,53-18 15,-53 1-15,18 17 16,-18 0-16</inkml:trace>
   <inkml:trace contextRef="#ctx0" brushRef="#br0" timeOffset="6140.1949">12541 2822 0,'18'0'15,"-36"0"-15,54 0 0,-36 18 0,0 35 16,0-36-16,0 19 16,0-19-16,17 19 0,-17-19 15,0 1 1,0 0-16,0-36 16,0-17-1,18 17 1,-18-17-16,17 17 0,1-35 15,-18 36-15,18-1 16,-1 18-16,1 0 16,0 18-1,-18-1-15,17 1 16,-17-1-16,18-17 0,0 18 0,-1-18 16,1 18-16,17-18 15,-17-18-15,-1 18 0,19-18 16,-1 1-1,-17 17 1,-18 17-16,17 1 16,1 17-16,0-17 15,-1 0-15,1-18 16,-1 35-16,1-35 16,0 0-16</inkml:trace>
-  <inkml:trace contextRef="#ctx0" brushRef="#br0" timeOffset="7058.9378">14129 2611 0,'17'0'16,"1"17"-1,0 1 1,-18-1-1</inkml:trace>
+  <inkml:trace contextRef="#ctx0" brushRef="#br0" timeOffset="7058.9377">14129 2611 0,'17'0'16,"1"17"-1,0 1 1,-18-1-1</inkml:trace>
   <inkml:trace contextRef="#ctx0" brushRef="#br0" timeOffset="7162.5609">14217 2928 0,'18'35'15,"-36"-70"-15,36 88 0,-18-35 16</inkml:trace>
   <inkml:trace contextRef="#ctx0" brushRef="#br0" timeOffset="7930.1951">15187 2646 0,'0'0'0,"0"35"16,18 36 0,-1-54-16,19 36 15,-36-35-15,17 0 16,-34-36 0,-19-17-1,19-1-15,17 19 16,-18-19-16,18 1 15,0 0-15,0-18 0,18-18 16,-1 36-16,54 17 16,-36 18-16,18 18 15,-18 0-15,-17-1 16,0 19 0,-18-1-16,-18 0 0,0-17 15,-17 17-15,35-17 16,0-1-16,0 19 15,18-19-15,35 19 16,-18-19 0,0 1-16,1 0 0,-19-1 15,1 1-15,-18-1 0,0 19 16,-53-19 0,18 1-16,-1-18 0,-17 18 15,-17-18 1,35 17-16,-1-17 15</inkml:trace>
   <inkml:trace contextRef="#ctx0" brushRef="#br0" timeOffset="8391.7941">15875 2840 0,'-35'0'16,"-1"0"-16,19 0 0,-1 18 15,-17 34-15,35-16 16,-18 34 0,36-52-16,35 35 15,-18-36-15,0-17 0,1 0 16,-1 0-16,18-17 16,-36-1-16,-17-17 15,0 17-15,0-17 0,-17-18 16,-1 35-1,1 1-15,-1 17 16,18 17-16,0 19 16,18-19-16,-1 1 15,36 0-15,-18-1 16,-17-17-16,17 0 16,-17-17-1,-36-19-15,1 19 16,-19-19-16,36 19 15,0-1-15,0 1 16,36-1 0,-1 18-16,53-18 15,-53 18-15,54-17 16,-54 17-16,0 0 16,-17 0-16,-1 0 0</inkml:trace>
@@ -3365,7 +3365,7 @@
   <inkml:trace contextRef="#ctx0" brushRef="#br0" timeOffset="20214.2565">30110 2646 0,'0'0'0,"53"0"0,-18-18 15,0 18-15,18 0 0,0-17 16,-35 17-16,-1 0 16</inkml:trace>
   <inkml:trace contextRef="#ctx0" brushRef="#br0" timeOffset="20337.9448">30163 2787 0,'0'0'16,"35"18"-16,0-1 0,18-17 15,-18-17-15,18 17 16,-53-18 0</inkml:trace>
   <inkml:trace contextRef="#ctx0" brushRef="#br0" timeOffset="20983.0333">25418 2081 0,'0'-17'16,"-18"17"-16,0 35 15,1-17-15,-19 88 16,19-36-16,17 89 15,0-71-15,17-17 16,54 87-16,-36-87 0,71 52 16,-18-87-16,-17-1 15,17 0 1</inkml:trace>
-  <inkml:trace contextRef="#ctx0" brushRef="#br0" timeOffset="21549.1791">29528 2170 0,'0'0'0,"0"17"31,35 54-31,-18-18 16,1 17-16,0 1 15,-1 52-15,1-52 16,0-18-16,-18 17 0,0-17 16,0 35-1,-18-52-15,0-1 0,1-17 0,-1 17 16,0-17-16,1-1 15</inkml:trace>
+  <inkml:trace contextRef="#ctx0" brushRef="#br0" timeOffset="21549.179">29528 2170 0,'0'0'0,"0"17"31,35 54-31,-18-18 16,1 17-16,0 1 15,-1 52-15,1-52 16,0-18-16,-18 17 0,0-17 16,0 35-1,-18-52-15,0-1 0,1-17 0,-1 17 16,0-17-16,1-1 15</inkml:trace>
   <inkml:trace contextRef="#ctx0" brushRef="#br0" timeOffset="21861.1861">30815 2099 0,'-35'35'0,"70"-70"0,-88 106 16,18 52-16,35-52 15,0 70-15,0-53 16,18-18-16,17 54 15,18-18 1,-18-53-16,-17-18 0,35 18 16,-36-35-16,36-18 15,-35 0 1</inkml:trace>
   <inkml:trace contextRef="#ctx0" brushRef="#br0" timeOffset="22071.6201">31027 2452 0,'35'35'15,"-17"0"-15,17 1 16,0-1-16,18 0 0,-18 0 16,89 36-16,-89-18 15,71 0-15,-71-18 16,36 18-1,-53-35-15</inkml:trace>
   <inkml:trace contextRef="#ctx0" brushRef="#br0" timeOffset="22289.022">31627 2417 0,'-53'70'16,"106"-140"-16,-142 193 0,36 0 15,18-70-15,18 18 0,-36 35 16,35-53-16,0 35 16,18-53-16,0 0 15,0 1 1</inkml:trace>
@@ -3389,7 +3389,7 @@
   <inkml:trace contextRef="#ctx0" brushRef="#br1" timeOffset="180932.1726">8590 4851 0,'0'0'0,"0"53"16,-17-36-16,17 19 16,0-19-1,17 18-15,1-35 16,-1 0-16,19 0 15,-36-17-15,17-36 16,1 18-16,-18-36 16,0 36-16,0-18 15,0 18-15,-18-18 16,18 70 0,0 36-1,18 0-15,17 18 16,-17-36-16,35 36 15,-36-54-15,-17 1 16,18-1-16,-18 1 0,18-18 16,-1 0-1,-17-18-15,18 1 16,0 17 0,-1 0-16,1 17 15,-18 1-15,0 0 16,0-1-16,0 1 15</inkml:trace>
   <inkml:trace contextRef="#ctx0" brushRef="#br1" timeOffset="181472.2746">10407 4516 0,'0'0'15,"-71"0"-15,18 17 16,18 1-16,18-1 0,17 1 16,0 0-16,17 17 0,18-17 15,1-1-15,-1 1 0,71 17 16,-53-17-16,0 17 16,-36-35-1,-17 18-15,0-1 16,-53-17-16,18 18 15,-18-18-15,18 0 16,-36 0-16,54-18 16,-1 1-16,36-18 15</inkml:trace>
   <inkml:trace contextRef="#ctx0" brushRef="#br1" timeOffset="181604.6779">10724 4710 0,'0'0'15,"18"53"-15,-18-18 0,0 0 16,0-17-16,0-1 16,18-17-16,-1-17 15</inkml:trace>
-  <inkml:trace contextRef="#ctx0" brushRef="#br1" timeOffset="181705.9235">10672 4392 0,'17'0'16</inkml:trace>
+  <inkml:trace contextRef="#ctx0" brushRef="#br1" timeOffset="181705.9234">10672 4392 0,'17'0'16</inkml:trace>
   <inkml:trace contextRef="#ctx0" brushRef="#br1" timeOffset="182018.4711">11007 4604 0,'0'0'0,"17"0"0,19 17 15,-19-17-15,1 0 16,-18 18-1,-18-18-15,18 18 16,0-1-16,-17 19 16,17-19-16,0 19 15,0-19-15,17 18 16,1-17-16,0 0 16,-1-18-16</inkml:trace>
   <inkml:trace contextRef="#ctx0" brushRef="#br1" timeOffset="182590.7305">11342 4727 0,'17'0'15,"19"-17"1,-19 17-1,19-18-15,-19 0 16,1 18-16,0-35 16,-36 17-16,-17 18 15,17 0-15,0 0 16,-17 0-16,17 18 0,18 0 16,-17-1-1,17 19-15,17-19 16,19 19-16,-19-36 15,19 0-15,-1 0 0,0 0 16,18 0-16,-18-18 16,-17 18-16</inkml:trace>
   <inkml:trace contextRef="#ctx0" brushRef="#br1" timeOffset="183086.2898">12012 4551 0,'18'0'16,"17"0"-16,-17 0 15,-1 0-15,19-18 16,-19 18-16</inkml:trace>
@@ -3399,9 +3399,9 @@
   <inkml:trace contextRef="#ctx0" brushRef="#br1" timeOffset="184237.3338">14552 4639 0,'35'18'16,"-17"-18"-1</inkml:trace>
   <inkml:trace contextRef="#ctx0" brushRef="#br1" timeOffset="185949.5374">15822 4269 0,'-18'-71'15,"1"36"-15,-36-36 16,18 54-16,-18-36 16,17 53-16,19 0 0,-54 53 15,54-18 1,-1 18-16,0-18 0,36 18 0,0-18 15,35 53 1,-1-52-16,-16-1 0,17 0 16,17 18-16,-35-18 15,-17 1-15,-18-19 16,0 1-16,-18 0 16,1-18-16,-54 35 15,36-35-15,-36 18 16,36-18-16,18 0 15,17-18-15,35-17 16,0 17-16</inkml:trace>
   <inkml:trace contextRef="#ctx0" brushRef="#br1" timeOffset="186082.4391">15946 4480 0,'17'18'15,"18"-18"-15,1 0 16,-1 0-16,36-18 15,-54 1 1,36-19-16,-35 19 16</inkml:trace>
-  <inkml:trace contextRef="#ctx0" brushRef="#br1" timeOffset="186233.4915">16122 4198 0,'0'88'0,"0"-176"0,0 212 15,18-72-15,-18 54 16,0-70-16,17 16 16,1-16-16,-18-1 0,35 0 15,-17-17-15</inkml:trace>
-  <inkml:trace contextRef="#ctx0" brushRef="#br1" timeOffset="186459.9517">16334 4568 0,'0'53'16,"0"-35"-16,0 0 0,35 17 15,-17-35 1,-1 18-16,36-18 16,-35 0-16,17-18 15,-17 0-15,-36-17 16,0 17-16,-35 1 15,36-1 1,-1 18-16,1 0 0,-1 0 16</inkml:trace>
-  <inkml:trace contextRef="#ctx0" brushRef="#br1" timeOffset="186939.3616">16704 4586 0,'-35'18'16,"35"-1"-16,0 1 15,0 0-15,53 17 16,-36-35 0,19 18-16,34-18 15,-52 0-15,35-36 16,-53 19-16,17-1 15,-17-17-15,0 17 0,-17-70 16,17 53-16,-18-71 16,0 53-16,1-35 15,-1 52-15,18 19 16,0 34 0,18 72-16,-1-36 15,1-1-15,0 54 16,-18-35-16,17-18 15,-17-18-15,18 36 16,-18-54-16,18-17 0,-18 18 16,17-36-1,1 1-15,17-19 16,-35 19-16,18-1 16,17 18-16,-17 0 15,-1 0-15,1 18 16,0-1-16,-1 1 15,1 0-15</inkml:trace>
+  <inkml:trace contextRef="#ctx0" brushRef="#br1" timeOffset="186233.4914">16122 4198 0,'0'88'0,"0"-176"0,0 212 15,18-72-15,-18 54 16,0-70-16,17 16 16,1-16-16,-18-1 0,35 0 15,-17-17-15</inkml:trace>
+  <inkml:trace contextRef="#ctx0" brushRef="#br1" timeOffset="186459.9516">16334 4568 0,'0'53'16,"0"-35"-16,0 0 0,35 17 15,-17-35 1,-1 18-16,36-18 16,-35 0-16,17-18 15,-17 0-15,-36-17 16,0 17-16,-35 1 15,36-1 1,-1 18-16,1 0 0,-1 0 16</inkml:trace>
+  <inkml:trace contextRef="#ctx0" brushRef="#br1" timeOffset="186939.3615">16704 4586 0,'-35'18'16,"35"-1"-16,0 1 15,0 0-15,53 17 16,-36-35 0,19 18-16,34-18 15,-52 0-15,35-36 16,-53 19-16,17-1 15,-17-17-15,0 17 0,-17-70 16,17 53-16,-18-71 16,0 53-16,1-35 15,-1 52-15,18 19 16,0 34 0,18 72-16,-1-36 15,1-1-15,0 54 16,-18-35-16,17-18 15,-17-18-15,18 36 16,-18-54-16,18-17 0,-18 18 16,17-36-1,1 1-15,17-19 16,-35 19-16,18-1 16,17 18-16,-17 0 15,-1 0-15,1 18 16,0-1-16,-1 1 15,1 0-15</inkml:trace>
   <inkml:trace contextRef="#ctx0" brushRef="#br1" timeOffset="187205.4759">17321 4586 0,'0'0'15,"-17"0"-15,-1 0 0,-17 18 16,35-1-16,-18 19 15,36-19 1,-1-17-16,1 18 16,0-18-16,-1-18 15,1 1 1,-18-1-16,0-17 16,0 17-16,0 0 15,0 36 1,18 0-1,-1 17 1,19 0-16,-1-17 16</inkml:trace>
   <inkml:trace contextRef="#ctx0" brushRef="#br1" timeOffset="187470.8083">17568 4551 0,'-17'0'16,"-1"17"-16,0-17 16,18 18-16,0 0 0,18 17 15,0-17 1,17 17-16,-17-35 16,-1 18-16,-17-1 15,-17-17 1,-19 0-1,19 0-15,-19 0 16,19 0 0,17-17-16</inkml:trace>
   <inkml:trace contextRef="#ctx0" brushRef="#br1" timeOffset="187593.8059">17709 4621 0,'0'0'16,"36"-17"-16,-19 17 0,1-36 15,0 36 1,-18-17-16,0-18 16,0 17-16,-18-35 0</inkml:trace>
@@ -3420,7 +3420,7 @@
   <inkml:trace contextRef="#ctx0" brushRef="#br1" timeOffset="192217.4303">22595 4498 0,'-17'18'0,"-1"17"15,18-18-15,0 19 0,18 17 16,-1-36-16,19 19 16,-1-19-1,18-17-15,-35 0 16,17 0-16,-18-17 16,1-1-16,-18 0 15,0 1-15,0-1 0,-18 0 16,18 1-16,-17 17 15,17 17 1,0 19 0,0-19-16,17 19 15,1-19-15,35-17 16,-35 18-16,17-18 16,-17 0-16,-1-18 15,-17 1 1,18-1-16,-18 0 15,17 1 1,1 17 0,0 17-1,-1-17 1,1-17-16,0 17 16,-1-36-16,1 1 15,-18-18 1,0 18-16,0 0 0,0-18 15,0 0-15,-18-53 16,18 53-16,-17 0 0,-1 0 16,0 18-16,18 17 0,-17 1 15,17 52 1,0 18-16,0 0 16,35 70-16,-17-70 15,35 53-15,0-18 16,-36-53-16,18 18 15,-35-35 1,-35-18 0,18-18-1</inkml:trace>
   <inkml:trace contextRef="#ctx0" brushRef="#br1" timeOffset="192311.9357">23001 4516 0,'0'-18'16,"0"0"-16,53 89 0,-106-106 0,71-1 15,-1 36-15,1-17 16,17 17-16,36-18 15,-53 18-15,17-18 16</inkml:trace>
   <inkml:trace contextRef="#ctx0" brushRef="#br1" timeOffset="192456.592">23671 4551 0,'18'-18'16,"-18"1"-16</inkml:trace>
-  <inkml:trace contextRef="#ctx0" brushRef="#br1" timeOffset="193312.924">25118 4075 0,'0'-18'16,"0"36"0,-18 35-1,18-1-15,0 54 16,18-35-16,35 35 16,-18-71-16,18 0 15,-18 0-15,18-17 0,0-18 16,-18 18-16,36-18 15,-54-18-15</inkml:trace>
+  <inkml:trace contextRef="#ctx0" brushRef="#br1" timeOffset="193312.9239">25118 4075 0,'0'-18'16,"0"36"0,-18 35-1,18-1-15,0 54 16,18-35-16,35 35 16,-18-71-16,18 0 15,-18 0-15,18-17 0,0-18 16,-18 18-16,36-18 15,-54-18-15</inkml:trace>
   <inkml:trace contextRef="#ctx0" brushRef="#br1" timeOffset="193463.3063">25100 4445 0,'53'0'15,"-18"0"-15,54-18 16,-54 1-16,53-1 15,-70 0 1,-18-17-16,-36 18 16</inkml:trace>
   <inkml:trace contextRef="#ctx0" brushRef="#br1" timeOffset="193591.3707">25083 4145 0,'0'0'16,"52"-17"-16,-16 17 0,34-18 15,-34 18-15,-19 0 16,36 0 0,-35 0-16,-1 0 15</inkml:trace>
   <inkml:trace contextRef="#ctx0" brushRef="#br1" timeOffset="193800.7745">25541 4392 0,'0'0'15,"53"71"-15,-18-36 0,1 18 16,-19-36-16,36 1 16,-35 0-1,-18-36 1,0 0-16,17-34 16,-17 34-16,0-53 15,-17 18-15,17-17 16,0 35-16,0-1 15</inkml:trace>
@@ -3433,7 +3433,7 @@
   <inkml:trace contextRef="#ctx0" brushRef="#br1" timeOffset="196817.7024">29774 4463 0,'0'0'16,"-35"-18"-16,18 0 16,-1 36-16,18 0 15,0-1-15,35 19 16,0-36 0,36 35-16,-36-35 0,36 0 15,-36-18 1,0-17-16,-17 17 15,0 1-15,-1-1 16,-17 36 0,18 17-1,-18-17-15,0-1 16,18 18-16,-18-17 16,-18 0-16,0-18 15,1 0-15,-19 0 0,1-18 16,0 0-16,0 1 15,-36-36-15,36 35 16</inkml:trace>
   <inkml:trace contextRef="#ctx0" brushRef="#br1" timeOffset="196921.6378">29863 4304 0,'35'0'0,"-70"0"0,88 0 16,-36-18-16</inkml:trace>
   <inkml:trace contextRef="#ctx0" brushRef="#br1" timeOffset="197411.5439">30833 4427 0,'0'0'15,"0"18"1,0 17-16,0-17 16,17 17-16,1-17 15,17-1-15,-17-17 16,0 0 0,-1 0-16,-17-17 15,-17-1-15,17 1 16</inkml:trace>
-  <inkml:trace contextRef="#ctx0" brushRef="#br1" timeOffset="197550.3894">30798 4233 0,'0'-17'0,"0"-1"16,17 18-1,1 0-15,-1 0 16,1 0-16,0 0 15</inkml:trace>
+  <inkml:trace contextRef="#ctx0" brushRef="#br1" timeOffset="197550.3893">30798 4233 0,'0'-17'0,"0"-1"16,17 18-1,1 0-15,-1 0 16,1 0-16,0 0 15</inkml:trace>
   <inkml:trace contextRef="#ctx0" brushRef="#br1" timeOffset="197705.9053">31027 4322 0,'17'0'0,"19"-18"15,17 0 1,0-17-1,-36 35-15,1-18 16,-1 18-16,-17-35 16</inkml:trace>
   <inkml:trace contextRef="#ctx0" brushRef="#br1" timeOffset="197855.1851">31168 4057 0,'0'53'16,"0"-106"-16,0 141 0,0 0 15,18-35-15,-1 35 16,1-52-16,-1-1 0,36 36 16,-17-54-16,34 1 15</inkml:trace>
   <inkml:trace contextRef="#ctx0" brushRef="#br1" timeOffset="198184.9576">31962 4251 0,'0'0'16,"-36"-18"-16,19 18 0,17 18 16,-36 17-16,36-17 15,0 0-15,0 17 16,0 18-16,18-18 15,0-17-15,17 17 16,-17-35-16,-1 0 16,-17-18-1,0-35 1,0 36-16,0-1 0,0-17 16,-17 0-16,-1 17 15,-17 0-15,17 18 16,-17 0-16,35 18 15,-18 0 1</inkml:trace>
@@ -3445,7 +3445,7 @@
   <inkml:trace contextRef="#ctx0" brushRef="#br1" timeOffset="200108.4024">27623 5503 0,'0'0'16,"35"0"-16,-18-17 0,1 17 16,0 0-16,-1 0 15</inkml:trace>
   <inkml:trace contextRef="#ctx0" brushRef="#br1" timeOffset="200634.1306">27658 5627 0,'0'17'16,"17"-17"-1,-17 18-15,18-18 16,-18 18 0,18-18-1,-1 17-15,1-17 16,0 18 0</inkml:trace>
   <inkml:trace contextRef="#ctx0" brushRef="#br1" timeOffset="200847.9926">28028 5556 0,'53'-17'16,"-18"-1"-16,1 18 16,-19 0-16,19-18 0,-19 18 15</inkml:trace>
-  <inkml:trace contextRef="#ctx0" brushRef="#br1" timeOffset="201281.0344">28381 5345 0,'0'0'16,"0"123"-16,0-70 0,18 0 15,-18 0-15,17-36 0,-17 19 0,18-19 16,-18 1 0,0-36-16,0 1 15,0-19-15,0-16 16,0 16-16,0-17 16,18 36-1,-18-1-15,17 18 16,1 18-16,17-1 15,-17 19-15,17-1 16,-17 0-16,-18 0 16,0-17-16,0 0 0,-18-1 15,0-17 1,1 0-16,-1 0 16,0-17-16,1 17 0,-1-18 15</inkml:trace>
+  <inkml:trace contextRef="#ctx0" brushRef="#br1" timeOffset="201281.0343">28381 5345 0,'0'0'16,"0"123"-16,0-70 0,18 0 15,-18 0-15,17-36 0,-17 19 0,18-19 16,-18 1 0,0-36-16,0 1 15,0-19-15,0-16 16,0 16-16,0-17 16,18 36-1,-18-1-15,17 18 16,1 18-16,17-1 15,-17 19-15,17-1 16,-17 0-16,-18 0 16,0-17-16,0 0 0,-18-1 15,0-17 1,1 0-16,-1 0 16,0-17-16,1 17 0,-1-18 15</inkml:trace>
   <inkml:trace contextRef="#ctx0" brushRef="#br1" timeOffset="201659.727">28734 5486 0,'0'0'0,"-36"35"0,19-17 0,17-1 16,0 1-16,0 17 15,0-17-15,17-1 16,1 19-16,17-36 0,1 17 16,-1-17-16,-17 0 15,-1-17-15,-17-1 16,0 0-16,-17-17 16,17 0-16,-18 17 15,18 1-15,-18 17 16,36 0 15,17 0-15,-17 17-16,0-17 0,-1 18 15,18-18 1,-17 0-16,0 0 16,-1 0-16,-17-18 15,18 18-15,-18-17 16</inkml:trace>
   <inkml:trace contextRef="#ctx0" brushRef="#br1" timeOffset="202589.2632">29016 5151 0,'0'0'0,"-18"0"0,18 17 15,0 54 1,18-18-16,0 35 16,-1-53-16,1 53 15,-18-52-15,18-1 16,-18 35-1,17-52-15,-17 17 16</inkml:trace>
   <inkml:trace contextRef="#ctx0" brushRef="#br1" timeOffset="202772.1066">28981 5503 0,'0'-17'16,"17"17"-16,-17-18 15,18 18-15,0-18 16,-1 18 0,1 0-16,0 0 0</inkml:trace>
@@ -3499,7 +3499,7 @@
   <inkml:trace contextRef="#ctx0" brushRef="#br1" timeOffset="245264.2227">25700 5151 0,'0'0'0,"18"-18"0,-18 0 16,17 36 0,1 52-1,-18-34 1,35 70-16,-17-53 15,-1 52-15,-17-52 16,0-17-16,0 16 0,0-16 16,0-1-16,0 0 0,-35 36 15,17-54 1,-34 36-16,16-17 16,1-19-16,0 1 0</inkml:trace>
   <inkml:trace contextRef="#ctx0" brushRef="#br1" timeOffset="247395.2384">24659 5203 0,'18'0'125,"-18"-17"-110,17 17-15,1 0 16,0 17 0,-1-17-16,1 18 15,0-18-15,-18 18 16,0-1-16,-18 1 15,0-18-15,1 35 16,-1-17-16,0 17 16,18-17-1,18 0 1,0-1-16,17-17 16,-17 0-16,-1 0 0</inkml:trace>
   <inkml:trace contextRef="#ctx0" brushRef="#br0" timeOffset="270057.0052">6103 14164 0,'-18'0'109,"18"18"-93,0-36 78,0 0-63,-17 18 0,-1 0-31,18 18 16,-17-18-16,17 18 16,0-1-1,17-17 16,1 0-15,-18-17-16,17 17 16,-17-18-16,0 0 15,-17 1 17,17 34 14,17-17-14,-17-17-17,18 17 1,-18-18 46</inkml:trace>
-  <inkml:trace contextRef="#ctx0" brushRef="#br0" timeOffset="272664.3473">2028 3263 0,'-17'0'15,"-1"0"-15,36 0 31,17 18-15,0-18-16,1 17 0,70-17 16,-54 0-16,-16 0 15,17 0-15,52 0 16,-69 0-16,52 0 16,-70 0-16,-1 0 0,1 0 15,-18 18-15</inkml:trace>
+  <inkml:trace contextRef="#ctx0" brushRef="#br0" timeOffset="272664.3472">2028 3263 0,'-17'0'15,"-1"0"-15,36 0 31,17 18-15,0-18-16,1 17 0,70-17 16,-54 0-16,-16 0 15,17 0-15,52 0 16,-69 0-16,52 0 16,-70 0-16,-1 0 0,1 0 15,-18 18-15</inkml:trace>
   <inkml:trace contextRef="#ctx0" brushRef="#br0" timeOffset="272989.4557">2417 3034 0,'0'0'16,"0"18"-1,35-1 1,0 1-16,0-1 16,1 1-16,17 0 15,-18 17-15,18-17 0,-18-1 0,36 36 16,-54-35-16,1-1 16,0 1-16,-1 0 15,1-1-15,-18 1 16,0 0-16,-18-18 15,18 17-15,-17 1 0,-19 0 0,19-1 16,-19-17-16,1 36 16,17-36-16,1 17 15,-1 1-15,-35 17 16</inkml:trace>
   <inkml:trace contextRef="#ctx0" brushRef="#br0" timeOffset="277226.2652">3757 18344 0,'0'0'16,"0"18"-16,0 0 31,-18-1-31,18 1 16,18-18 31,-18-18-32,-18 18 1,1 0 0,-1 0-1,1 0-15,17 18 16,-18 0-1,18-1-15,18-17 16,-1 0 0,1 0-1,-1-17-15,-17-1 16,18 18 0,-18-18-16,0 1 15,-18-1-15,1 0 16,17 36 15,0 0-15,0-1-1,17-17-15,1 0 16,0 0-16,-18-17 62,0-1 188,0 0-125,0 1-109,0-1 0,0 1-16,0-1 15,0-17 1,0 17-16,0 0 16,0 1-16,0-36 15,0 35-15,0-35 16,17 36-16,-17-1 15,0 0-15,0 1 0,0-36 16,0 35-16,0 0 16,0 1-16,0-18 15,0 17-15,0-17 16,0 17 0,0 0-16,0 1 15,0-1-15,0 0 31,0 1-31,0-1 0,0 1 16,0-1 15</inkml:trace>
   <inkml:trace contextRef="#ctx0" brushRef="#br0" timeOffset="277859.1636">3634 17709 0,'0'0'0,"-18"0"15,36 0 16,-1 0-15,1 0-16,0 0 0,-1-17 16,1-1-1,-1 1-15,1 17 16,-18-18-16,18 18 16,-1 0-16,1 0 15,0 35 1,-1-35-1,-17 18-15,18-1 0,-18 1 16,18 0 0,-1-18-16,1 0 15</inkml:trace>
@@ -3525,7 +3525,7 @@
   <inkml:trace contextRef="#ctx0" brushRef="#br1" timeOffset="298906.9129">7391 10830 0,'0'-17'16,"-18"17"-16,0 0 62,18 17-46,0 1-16,18-18 15,0 18 1,-1-18 0,1-18-1,0 18-15,-18-18 32,-18 18-17,0-17 1,1 17-16,-1 0 31,18 17-15,0 1-1,18-18-15,-1 0 16,1 0 0,0 0-16,-18-18 15,0 1 1,-18 17-16,18-18 15,-18 18-15,1 0 16,-1 18 0,18-1-16,0 1 15,0 0-15,35-18 16,-17 0 0,0 0-1,-1-18-15,-17 0 16,-17 18-1,17-17-15,-18 17 16,0 0-16,1 0 16,17 17 15,17-17-15,1 0-1,0 0 1,-18-17 15,-18-1-15,18 0-1,-18 1-15,1 17 16,17-18-16,0 36 31,17-1-15,-17 1-1,18 0 1,0-18-16,-18 17 16,0-34 31,0-1-47,17 18 62,-17-18-46,-17 18 31,17 18-32,-18-18-15</inkml:trace>
   <inkml:trace contextRef="#ctx0" brushRef="#br1" timeOffset="304780.5574">7426 10866 0,'0'17'109,"35"1"-93,-17-1 0,0 1-16,-1 0 0,18 17 15,1-17-15,-19 17 16,1-17-16,17-1 0,1 19 16,-1-19-16,-18 1 15,1-1-15,0-17 16,-1 0-16,-34 0 62,17-17-46,-18 17-16</inkml:trace>
   <inkml:trace contextRef="#ctx0" brushRef="#br1" timeOffset="305515.6086">7761 10989 0,'-18'-18'15,"36"36"-15,-36-53 0,18 52 63,18 1-63,0 17 15,-1-35-15,-17 18 16,18 0-16,0-1 16,-1 1-1,-17 0-15,0-1 16,-17 1-1,-1-1-15,-17-17 16,17 18-16,0-18 0,-34 18 16,34-1-16,0-17 15,18 18 17</inkml:trace>
-  <inkml:trace contextRef="#ctx0" brushRef="#br1" timeOffset="306171.3477">7673 11183 0</inkml:trace>
+  <inkml:trace contextRef="#ctx0" brushRef="#br1" timeOffset="306171.3476">7673 11183 0</inkml:trace>
   <inkml:trace contextRef="#ctx0" brushRef="#br1" timeOffset="306967.2364">7673 11183 0,'18'0'0,"-36"0"0,36 0 0,-1 0 62,-34 0-15,-1 0 391,0 0-438,1-18 15,-1 18-15,0 0 16,-17 0-16,0 18 0,17-18 15,-52 0-15,34 0 16,-17 0-16,36 0 16,-36-18-16,35 18 15,1 0-15,-1 0 16,0 0 31,1 0-32,34 0 17</inkml:trace>
   <inkml:trace contextRef="#ctx0" brushRef="#br1" timeOffset="307333.1926">7285 11042 0,'-18'0'15,"1"0"1,17 18-16,-36-1 16,19 1-1,-1 0-15,18-1 32,0 1-32,0 17 15,18-17-15,-18-1 16,17 1-16,1 17 15,0-17-15,-1 0 16,-17-1-16,18 1 0,0-18 16</inkml:trace>
   <inkml:trace contextRef="#ctx0" brushRef="#br1" timeOffset="307823.1003">7126 11201 0,'0'-18'78,"0"0"-63,0 1-15,0-1 0,0-17 0,0-18 16,0 18 0,0-1-16,0-34 15,0 17-15,0 18 16,0 17-16,0 0 0,0-17 16,0 17 15,-18 18-16,18 18-15</inkml:trace>
@@ -3536,7 +3536,7 @@
   <inkml:trace contextRef="#ctx0" brushRef="#br1" timeOffset="309727.9814">7126 11465 0,'18'18'32,"-18"0"-17,17-1-15,-17 1 16,0-1-16,0 1 0,0 17 16,0-17-16,-35 0 15,17-1-15,-34 19 16,34-19-16,0-17 15,36 0 32</inkml:trace>
   <inkml:trace contextRef="#ctx0" brushRef="#br1" timeOffset="310164.0317">7179 11571 0,'18'0'31,"-1"0"-16,19 0-15,17-18 16,-18 18-16,35-35 16,-34 35-16,-1-17 15,0-1-15,-17 18 0,17-18 16</inkml:trace>
   <inkml:trace contextRef="#ctx0" brushRef="#br1" timeOffset="310943.527">7567 11430 0,'0'18'31,"0"-1"0,18-17-15,-1 18-1,-17-36 64,-17 18-48,17-17-16,-18 17 1,0 0 0,18 17-16,-17-17 0,17 18 15,0 0 1,17-18 0,1 0-16,-36-18 46,1 0-30,-1 18-16,-17-17 16,17-1-16,1 18 15,-1 0-15,0-18 16,36 18 0,0 18-1,-1-18-15,1 18 16,0-18-16,17 17 15,-18-17-15,1 18 16,0-18 0,-18 18-1,0-1 1,-18 1 0,0-1-16,1-17 15,-1 18-15,18 0 16,18-1 15</inkml:trace>
-  <inkml:trace contextRef="#ctx0" brushRef="#br1" timeOffset="311421.0507">7585 11553 0,'-18'0'16,"36"0"31,-18 18-32,17-18-15,1 0 16,0 0 0,-1 0-16,1 0 0,35 0 15,-36 0-15,1 0 16,17 0-1,1 0-15,-19 0 16,1 0-16,0 0 16,-18-18 46,17 18-62</inkml:trace>
+  <inkml:trace contextRef="#ctx0" brushRef="#br1" timeOffset="311421.0506">7585 11553 0,'-18'0'16,"36"0"31,-18 18-32,17-18-15,1 0 16,0 0 0,-1 0-16,1 0 0,35 0 15,-36 0-15,1 0 16,17 0-1,1 0-15,-19 0 16,1 0-16,0 0 16,-18-18 46,17 18-62</inkml:trace>
   <inkml:trace contextRef="#ctx0" brushRef="#br1" timeOffset="312315.2837">7885 11483 0,'17'-18'16,"-17"36"31,0 0-16,18-18 0,-18 17 1,0 1 93,18-1-110,-36-17 48,18-17-48,-18 17 1,18-18-16,-17 18 0,-1-17 16,0-1-1,1 0-15,-1 1 16,0 17-1,1 0 1,-1 0-16,36 0 47,-1 17-31,1 1-16,0-18 15,-1 18-15,1-1 0,0 1 16,17-1-16,-17 1 15,17 0-15,-18-1 16,-34-17 31,-1-17-47,1 17 16,-1 0-1,18 17 1,0 1-1,0 0-15</inkml:trace>
   <inkml:trace contextRef="#ctx0" brushRef="#br1" timeOffset="323349.8646">7920 11642 0,'0'0'0,"-18"0"15,1 17 1,-1-17-16,-17 36 15,17-19-15,-17 36 16,-1-35-16,19-1 16,-1 1-16,1 0 0,17-1 15,-18 1 1,18 0-16,-18-18 47,1 0 78,-1 0-110,0-18-15,1 0 16,-1 18-16,0-17 0,1 17 16,17-18-16,-18 0 15,1 18-15,17-17 16,-18 17 0,18-18 15,-18 18 0,1 18 16,-1-18-31,0 17-1,18 1 1,-17-18-16,-1 18 15,0-1-15,-17 1 16,18-18-16,-1 0 16,-17 0-1,17 0-15,18 18 0,-35-18 16,17 0-16,0 0 16,-17 0-16,17 0 15,1 0 1,-1 0-16,18 17 109,18-17-78,-1 0-15,-17 18 0,-17-18 15,-1-18 31,18 1-46,-17-1 0,-1 0-1,0 1 1,18-1-16,-17 0 31,-1 18 16,0 0-31,1 0-1,-1 0 1,-35 18-16,18 0 16,0-18-16,-18 17 15,17-17-15,19 18 0,-36 0 16,53-1 15,18 1-15,-1 0-16,1-1 15,-1-17-15,-17 18 16,18-1-16,-18 1 0,0 17 16,0-17-16,-18-18 15,1 0 63,-1 0-62,1 0-16,-1 0 16,0 0-1,1 0-15,17-18 16,17 18 15,1 18-15,0-18-16,-1 0 0,1 18 15,17-1-15,-17 1 16,-1 0-16,1-1 16,0 1-16,17-1 0,-17 1 0,34 17 15,-34-35 1,0 0-16,-1 0 15,1 0-15,0 0 94,-1 0-78,1 0-16,-18-17 15,18 17 1,-18-18 0,0 0-16,0-17 15,0 18 1,17-1 15,1 18-15,-1 0-16,1-18 15,0 18 1,-1 18 0,1-18-1,-18 18-15,18-18 0,17 17 16,-17-17 0,-1 0-16,1 0 15,0 0-15,-1-17 16,1 17-1,-1 0-15,1 0 16,-36 17 31,18 1-16,0-1-31,0 1 16,0 17-1,18-17-15,-18 0 0,18-1 16,-18 19 0,17-19-16,-17 1 0,0 0 15,18 17 1,-18-18-16,0 1 16,0 0-16,18-18 15,-18 17 1,0 1 15,0 0 0,-18-18 1,0 0-32,1 0 15,-1 0-15,0-18 16,1 0-16,-1 1 15,1 17-15,-1-18 16,0 0-16,1 18 16,-19 18-16,19-18 15,-1 18-15,18-1 0,-35 1 16,35 0-16,-18-1 16,18 1-16,0 0 15,0-1 1,-18-17-1,18 18-15,-17-1 16,17 1-16,-18-18 16,18 18-16,-17-18 15,17-18 48,-18 18-48,0 0 1,1 0 0,-19 0-1,19 0-15,-1 0 16,0-18-16,1 18 16,-1 18 30,1-18 48,17-18-78,-18 1-16,0-18 15,18-1-15,-17-17 16,-1 36-16,18-1 16,0 0-16,0 1 0,0-1 15,0 1 1,18 17-16,-18-18 16,17 18-16,-34 18 46,-19-1-30,1-17 0,17 0-16,-34 18 15,16-18-15,1 0 0,-36-18 16,36 18 0,0-17-16,-53 17 15,52-18-15,1 18 0,17-18 16,-17 18-16,18 0 15,17-17-15,0 34 32,0 1-17,0 0-15,0-1 16,-18-17-16,18 18 16,18-1-1,-1 1 1,-17 0-16,18-1 15,-1 1-15,-17 0 16,0-1-16,0 1 16,0 17-16,-17 0 15,17-17-15,-18 0 0,18-1 16,0 1 0,-17-18-16,17 18 31,-18-18 16,36 0-16,-1 0-15,1-18-1,-1 18 1,1 0-16,-18-18 0,53 18 15,-18 0-15,-17 0 16,17 18-16,0-18 0,1 0 16,-1 0-16,-17 0 15,-1-18 1,-17 1 0,-17-1-1,17 0-15,0 1 16,0-1-16,0 1 15,0-19 1,17 19-16,1 17 16,-18-18-1,0 36 32,0-1-31,0 1-1,0 0 1,0-1-16,0 1 16,0-1-16,18 1 15,-18 0-15,0-1 0,17 1 16,-34-18 0,-1-18-1,0 1-15,-17-19 16,17 36-16,1-17 15,-36-18 1,18 35-16,-36-18 16,53 0-16,-17 18 0,17-17 15,1 17-15,-1 0 0,-17 0 16,17 0-16,1 17 16,-1 1-1,-17-18 1,17 18-16,0-18 15,1 0-15,17 17 79,17-17-64,-17 18-15,0-1 16,0 1-1,-17 17 1,17-17-16,0 0 0,-18 17 16,18-17-16,0-1 15,-35 18-15,35-17 16,-35 0 0,17-1-16,0 19 15,1-36-15,17 17 16,0 1 31,0 0-32,17-18 1,1 0 0,-18-18-1,18 18-15,-1 0 16,1-18-1,0 18-15,17-17 16,-18 17 0,-17-18-16,18 18 0,0-18 15,-18 1 1,17-1 0,-17 0-16,0 1 31,0-1-16,-17 18 1,17-17 0,-18 17-16,18-18 15,0 0-15,0-17 16,0 17-16,0 1 16,-18-1-16,18 0 0,0-34 15,0 34-15,-17-35 16,17 18-16,-35-18 15,17 35 1,0-35-16,1 53 16,-1-17-16,0-1 78,1 18-63,17-18 1,0 1 15,35 17-15,-17 0-16,52 0 16,-52-18-16,17 18 0,0-18 15,18 1-15,-35 17 16,0-18-16,-1 18 15,1-18-15,-18 1 16,0-1 0,-18 18-1,18 18 1,18-1 0,-18 1-16,35 35 15,-17-35-15,17-1 16,-35 1-16,35 0 15,-35-1-15,18 19 16,-18-19-16,0 1 16,0-1-1,0 1-15,0 0 16,0-1-16,0 1 16,0 0-16,-18-1 15,18 1-15,0 0 0,-17-1 16,17 1-1,0-1-15,-18 1 0,18 0 16,-18-1-16,18 1 0,-17 17 16,-1-35-16,0 18 15,1-18 1,-1 0-16,-17-18 16,0 18-16,-18-17 15,35 17-15,-17-18 16,17 18-16,18 18 15,-17-18-15,17 17 16,0 1 31,0 0-47,17-1 16,18 18-1,-17-17-15,35 0 16,-35-1-16,17-17 15,35 18-15,-34 0 16,-1-1-16,0-17 0,-17 18 16,35 17-16,-36-17 15,1 17 1,-18-17-16,18-1 16,-1-17 15,1 0-31,0 0 15,17-17 1,-17-1-16,-1 1 0,19-1 16,-1 18-1,-18-18-15,19 1 16,-19 17-16,1 0 0,0-18 16,-1 18-16,1 0 0,17-18 15,-17 18 1,-18-17-1,17 17-15,-17 17 16,18 1 0,-18 0-16,18-1 0,-1 1 15,1-18-15,17 18 16,-17-18 0,0 0-16,-1 0 15,1 0-15,-36 0 47,18-18-31,0 0-16,0 1 0,0-19 15,18 36-15,-1-35 16,1 17-16,0 1 16,-1-1-16,19 0 15,-36 1-15,17-1 16,1 1-16,-18 34 47,0 1-47,18 17 15,-18-17-15,17 17 16,1-17-16,0-18 16,-18 35-16,17-17 15,-17 17 1,0-17-16,0 17 15,0-18-15,0 1 16,0 0-16,0-1 16,18 19-16,-18-19 15,0 1-15,17 17 16,1-17-16,-18-1 16,0 1-1,-18-18 1,1 18-16,-1-18 15,1 0-15,-1 17 0,-35-17 16,35 0-16,-17 18 16,0-18-16,-1 0 15,19-18-15,-18 18 0,17-17 16,-17 17-16,17-18 0,0 18 16,-17 0-16,17 0 15,1 18-15,17-1 0,-18 1 16,1 0-16,-1-1 15,0-17 1,1 0 0,17-17-1,0-1-15,-18 0 16,0 1-16,1 17 16,-1-18-16,0 18 15,1 0 1,-1 18-16,18-1 15,-17-17 1,17 18 0,0 0-1,17-18-15,-17 17 16,18 19-16,-18-1 16,17-18-16,1 19 0,0-19 15,-1 1-15,19 35 16,-19-35-16,19-1 15,-19 19 1,1-36-16,-18 17 0,17-17 16,-34 0-1,17 18 1,-18-18-16,1 0 16,-1 0-16,-17 0 15,35-18 1,-18 18-16,0 0 0,-17 0 15,0 0-15,17-17 16,1 17-16,-19 0 16,19 0-16,-36-18 15,17 18-15,19 0 0,-1 0 16,18 18-16,-18-18 0,18 17 16,-17-17-16,17 18 0,17 35 31,1-53-31,-18 17 0,18 1 15,-36-18 17,0 0-17,18-18 1,-17 18-16,-1-17 16,18-1-1,-17 18 1,17-18-16,-18 18 15,18-17 1,0-1-16,-18 1 0,18-1 16,-17 0-16,17-17 15,0 17 1,0 1-16,17 17 0,-17-18 16,0 0-16,0 1 15,0-1 1,-17 18-1,-1 0 1,0 18-16,-17-18 16,17 0-16,-17 0 15,18 0-15,-1 0 16,-35 17-16,35-17 16,-17 0-1,17 0-15,-17 0 0,18 0 16,-1-17-16,0 17 15,1-18-15,-1 0 0,18 1 16,-18 17-16,1-18 16,34 18 31,-34 18 31,17-1-63,0 1 1,-18 0-16,0-1 16,18 1-16,-17 0 15,17-1 1,0 1-16,-18 0 0,18-1 15,18-17 1,-18 18-16,0 0 63,-18-1-32,0-17-31,-17 18 15,18-18 1,-1 0-16,0 17 0,-35-17 16,36 18-1,-19-18-15,19 0 16,-1 0 0,18 18 15,0-1 0,-17-17-15,17 18-16,0 0 31,0-1-31,0 1 16,-18 17-1,18-17-15,0 17 16,0-17-1,18-18-15,-18 17 16,17-17-16,1 0 16,-1 0 15,-17-17-15,18 17-1,-18-18-15,18 18 0,-1-18 16,1 1-16,17 17 15,1-18-15,-1 1 0,-18-1 16,19 18-16,-1-18 0,0 1 16,-17 17-1,0-18-15,-1 18 16,-17 18 0,18-18 46,0 17-62,-1-17 16,1 18-1,-1 0-15,-17-1 16,18 1-16,0-1 16,-18 1-16,35 0 15,-17-1 1,-1 1-1,1 0-15,-18-1 16,18-17-16,-18 18 0,-18-18 31,0 0-15,1 0-16,17-18 16,-18 18-16,0 0 15,1-17-15,-1 17 0,0 0 16,-34 0-1,34 0-15,-17 0 16,17 17-16,0-17 0,18 18 16,-17-18-16,17 18 15,0-36 63,-18 18-31,18-35-47,0 17 16,0-17-16,0 17 16,0-17-1,0 17-15,18 1 31,-18 34 1,-18-17-17,18 18-15,-18-18 0,18 17 16,-17 1-16,-19 17 16,19-17-16,-1 0 15,-35 17 1,18-17-16,17-18 15,-35 17 1,18 1-16,0-18 16,17 17-16,1-17 15,34-17 17,1 17-17,-18 17 32,0 1-31,0 0-16,0-1 15,0 19 1,0-19 0,0 1-1,-18 0-15,18-1 16,-17 1-16,-1 0 15,0-18 17,1 17-17,17 1 1,-18-18 0,18-18 15,18 18-16,-18-17-15,-18 17 16,18-18 0,-18 18 31,1-18-32,-1 18 1,1-17-16,-1 17 31,18-18-31,-18 18 0,1-18 0,-19 1 16,1-1-1,35 0-15,-18 18 0,-17-35 16,35 17 15,18 18-15,-1-17-16,19-18 15,-19 35-15,-17-18 0,18 0 16,0 18-16,-36 0 63,18-17-48,0-1 1,18 0-1,-18 1-15,35-19 16,-35 19-16,35-1 16,-35 1-16,0-1 15,-17 18 1,-1 0 0,0 0-1,18-18-15,-17 1 16,17-1-16,0-17 15,0-1-15,0-34 16,0 35-16,0-36 16,0 53-16,-18 1 15,18-1 1,0 36 31,0-1-16,0 1-15,0 0-16,18 35 15,-18-36-15,35 36 16,-17-35-16,-1 35 16,1-36-16,-1 1 15,1-18-15,0 18 16,-1-18-16,19 17 15,-19 1-15,19 0 0,-1 17 16,-18-18-16,19 1 16,-1-18-16,-17 0 15,-1 0 1,1 0-16,0 0 16,-1 0-1,-17-18 1,18 18-16,-18-17 15,17 17 1,1 0-16,17 0 16,-35 17-1,36-17-15,-1 0 16,-17 0-16,35-17 16,-36-1-1,1 18-15,-1 0 78,1 0-46,0 0-32,-1 0 15,1 0 32,-18 18-31,18-1-1,-1 1-15,1 0 16,-18-1-16,35 1 16,18 17-1,-35-17 1,17 0-1,-17-18 1,-18 17 15,17-17-31,-17 18 16,18-18-16,-18 17 16,18 1-16,-18 0 15,17 17-15,1-17 16,-1-1-1,1-17 1,0 0 0,-18 18-16,0 0 31,-36-18-15,19 17-16,-18-17 15,17 18-15,0-18 0,-17 18 16,17-1-16,1 1 15,-1-1-15,0 1 16,18 17 0,-17-35-16,17 18 0,0 0 15,0-1 1,17 1-16,-17 0 31,0-1 0,-17-17-15,-1 0-16,18 18 0,-17-18 16,-19 17-16,19-17 15,-19 18 1,19-18-16,-19 0 16,19 0-16,-1 0 15,18-18 1,-17 1-16,17-1 15,-18 1-15,18-1 16,-18 0 0,1 18-16,-1 0 15,0 18-15,18 0 16,-17-18-16,-1 17 16,18 1-16,-18-18 15,18 17 16,0 1-15,18-18 0</inkml:trace>
   <inkml:trace contextRef="#ctx0" brushRef="#br1" timeOffset="329478.2229">5927 14552 0,'0'18'47,"0"-1"-31,0 19-1,0-19-15,0 1 16,0 0-16,0-1 15,0 1-15,-18-1 32,0-17-17,1 0 17,-1 0-17,0 0-15,18-17 0,-17 17 16,17-18-1,-18 18 1,1 0-16,17 18 16,-18-18-1,18 17-15,0-34 47,0-1-31,0 1-1,0-1-15,-18 18 16,1-18 0,-19 18-16,19 0 15,-1 0-15,-17-17 16,17 17-16,1 0 0,-1-18 16,0 18-16,1 0 15,17-18 1,17 18 15,-17-17-31,18-1 16,0-35-1,-18 36 1,-18-36-16,0 53 16,1-18-16,17 0 0,-18 1 15,0-19-15,1 36 16,17-17-16,0-1 15,-18 36 17,18-1-1,0-34 0,18 17-15,-18-18-16,0 1 15,17 17 1,-17-18 31,18 18-47,0 18 16,17-18-1,-17 0-15,-1 0 16,1 0-1,-1-18-15,1 18 0,0-35 16,-1 35-16,1-36 16,0 19-16,-18-1 15,17 0 1,-17 1-16,-17 17 31,17 17-31,0-34 47,-18-1-31,18 0 31,-18 18-47,18-17 15,0-1-15,-17 1 16,-1-1-16,0-17 15,18-1 1,-35 1-16,35 17 16,-17 18-16,17-17 15,0-1-15,-18 1 0,18-1 16,0 0-16,0 1 16,-18-1-1,18 0-15,-17 18 16,17-17-16,17 17 47,1-18-32,0 0-15,-1 1 16,1-1-16,-18 1 16,17-1-16,1-17 0,0 17 0,-1-17 15,-17 17 1,18 0-16,0 18 15,-1 18 1,-17 0-16,18-1 16,0 1-16,-18 0 0,17-1 15,18 19 1,-17-36-16,0 17 0,-1-17 16,1 0-16,35 0 15,-35-17-15,17 17 16,-17-18-16,-1 18 15,-17-18-15,18 18 16,-1 0-16,1 18 16,0-18-1,-1 18-15,1-18 16,0 0-16,-1 0 0,36 0 16,-35 0-16,17 0 15,-17 0-15,-1 0 16,-17 17-1,18 1 17,0-18-17,-1 0 1,1 0-16,17 0 16,-17 0-16,-1 0 15,1 0 1,0 0-16,-1 17 15,1 1-15,-18 0 16,0-1 0,0 1-16,-18 17 15,18-17-15,0 0 16,0-1-16,0 18 16,0-17-16,18 17 15,0-35-15,-1 18 16,1-18-1,-36 0 1,1 18 0,-1-18-16,-17 17 15,17-17-15,-17 18 16,17-18 0,1 18-1,-1-18-15,0 0 16,1 0-1,-1 0 17,0-18-17,1 18-15,-1 0 16,18 18 0,0-1-1,18 1-15,-1-1 16,1 1-16,0 0 15,17-1-15,-17-17 16,-1 18-16,1-18 0,-1 0 16,1 18-16,0-1 15,-1-17-15,-17 18 0,0 0 16,18-1 0,-18 1-1,0 0 16,-18-18-15,18 17-16,-17-17 16,-1 18-16,0-1 15,18 1-15</inkml:trace>
@@ -3558,25 +3558,25 @@
   <inkml:trace contextRef="#ctx0" brushRef="#br2" timeOffset="367601.8856">13247 7003 0,'17'0'16,"1"-53"-1,0 35-15,17-17 16,-35 17-16,35 18 16,-17 0-1,-18 35-15,18-35 16,-1 36-1,-17-19-15,18 1 16,-18 0-16,17-18 0,1 17 16,0-17-1</inkml:trace>
   <inkml:trace contextRef="#ctx0" brushRef="#br2" timeOffset="367794.55">12929 6668 0,'0'-18'15,"0"36"-15,18-36 0,17 0 16,-17 18-16</inkml:trace>
   <inkml:trace contextRef="#ctx0" brushRef="#br2" timeOffset="368190.087">13688 6950 0,'0'-18'16,"17"18"-1,19 0 1,-19 0-1,19 0-15,-19 0 0,19 0 16</inkml:trace>
-  <inkml:trace contextRef="#ctx0" brushRef="#br2" timeOffset="368551.1408">13935 6473 0,'0'142'15,"0"-284"-15,0 354 0,0-141 0,17 52 16,-17-52-16,18-36 16,-18 36-16,18-54 15,-1-17-15,1-17 16,0-1-16,17-17 15,-18-1-15,36 19 16,-17 17 0,17 17-16,-36 19 15,1 17-15,-18-36 16,0 18-16,-18-17 0,-17 17 16,0-17-16,17-18 15,0 0-15,1 0 0,-1 0 16,0-18-16,18 1 15</inkml:trace>
-  <inkml:trace contextRef="#ctx0" brushRef="#br2" timeOffset="368968.8187">14323 7003 0,'0'0'15,"17"0"-15,19-36 16,-19 36-16,36-35 15,-35 17-15,0 1 16,-1 17-16,-17-18 0,-17 18 16,-1 18-1,-17-1-15,35 1 16,-18 0-16,18-1 0,0 1 16,0 0-1,18-1-15,17 1 16,18-18-16,-36 0 15,36 0-15,-35-18 16,0-17-16,-18 17 16,17-17-1,-17 17-15,0 1 16,0-1-16,18 18 31,17 0-31,-17 0 16,17 0-1,0 0-15,18-17 16,-35-1-16,0 18 0,-1-18 16,-17-17-16</inkml:trace>
+  <inkml:trace contextRef="#ctx0" brushRef="#br2" timeOffset="368551.1407">13935 6473 0,'0'142'15,"0"-284"-15,0 354 0,0-141 0,17 52 16,-17-52-16,18-36 16,-18 36-16,18-54 15,-1-17-15,1-17 16,0-1-16,17-17 15,-18-1-15,36 19 16,-17 17 0,17 17-16,-36 19 15,1 17-15,-18-36 16,0 18-16,-18-17 0,-17 17 16,0-17-16,17-18 15,0 0-15,1 0 0,-1 0 16,0-18-16,18 1 15</inkml:trace>
+  <inkml:trace contextRef="#ctx0" brushRef="#br2" timeOffset="368968.8186">14323 7003 0,'0'0'15,"17"0"-15,19-36 16,-19 36-16,36-35 15,-35 17-15,0 1 16,-1 17-16,-17-18 0,-17 18 16,-1 18-1,-17-1-15,35 1 16,-18 0-16,18-1 0,0 1 16,0 0-1,18-1-15,17 1 16,18-18-16,-36 0 15,36 0-15,-35-18 16,0-17-16,-18 17 16,17-17-1,-17 17-15,0 1 16,0-1-16,18 18 31,17 0-31,-17 0 16,17 0-1,0 0-15,18-17 16,-35-1-16,0 18 0,-1-18 16,-17-17-16</inkml:trace>
   <inkml:trace contextRef="#ctx0" brushRef="#br2" timeOffset="369479.1764">14711 6650 0,'0'0'16,"0"88"-16,0-35 0,0-18 0,17 18 16,-17-18-16,18 1 15,-18-1-15,18-17 0,-18-1 16,17 1-16,19 0 16,-19-18-16,1-18 15,0 0-15,-18 1 0,0-36 16,0 35-1,0 0-15,0 1 0,0-1 16,17 36 0,-17-1-16,18 19 15,0-19-15,34 36 16,-34-35-16,17-18 16,-17 0-1,0-18-15,-1 1 16,-17-1-1,0 0-15,18 1 16,-18 34 0,18 1-1,-18 0-15,17-1 16,1 1-16,-1 0 16,1-18-16,0 0 15,-18-18 1,0-17-1,0 17-15,0-17 16,0 17-16,0 0 0,17-17 16,-17 18-16,18 17 15</inkml:trace>
   <inkml:trace contextRef="#ctx0" brushRef="#br2" timeOffset="369963.9212">15293 7003 0,'18'17'16,"17"-17"0,-18 0-16,19-17 15,-19 17-15,1-18 16,-18 0-16,0 1 15,-18 17-15,1 0 16,-1 0-16,0 0 0,-17 17 16,18-17-16,-1 53 15,18-35-15,35 35 16,-17-36 0,17 1-16,0-18 0,-17 18 15,35-18-15,-35-18 16,-1 18-16,19-18 15,-36 1-15,0-1 16,0 1 0,17 34-1,1-17 1,17 18-16,0-18 16,-17 0-16,17 0 0,18 0 15,-18 0-15,18-18 16,-35 18-1,0-17-15,-18 34 16,-36 18 0,36-17-16</inkml:trace>
   <inkml:trace contextRef="#ctx0" brushRef="#br2" timeOffset="370497.8097">17180 6562 0,'18'70'15,"-36"-140"-15,54 193 0,-19 1 16,-17-71-16,35 35 16,-17-35-16,0-36 15,-18 1-15,17 0 0,19-1 16,-19-17-16</inkml:trace>
-  <inkml:trace contextRef="#ctx0" brushRef="#br2" timeOffset="371910.6449">18344 6844 0,'-17'0'16,"-1"-18"-16,1 36 15,-19 35 1,19-36-16,-1 19 16,18-1-16,0 0 0,18 18 15,-1-35-15,36-18 16,-18 0-16,18-35 15,-35 17-15,17-35 16,-17 35-16,0-35 16,-18 36-16,0-1 15,0 1-15,-18 34 16,18 18 0,0-17-16,18 35 15,-1-35-15,1-1 16,-1 1-16,1-18 15,0 0-15,-1 0 16,1-18 0,-18 1-1,18-1-15,-18 0 16,17 18-16,1 18 16,0 0-16,-1-18 15,1 17 1,0-17-16,-1 18 15,1-18-15,17 0 16,-17 0 0,-1-18-1,36-17 1,-35-18-16,17 0 16,-17 0-1,-18 18-15,0-36 16,-18 36-16,18 0 15,-17 0-15,-1 17 16,0 18-16,1 35 16,17 1-16,0 52 15,17-35-15,19 35 16,-19-53-16,18 0 16,-17-17-16,17 0 15,54-1-15</inkml:trace>
+  <inkml:trace contextRef="#ctx0" brushRef="#br2" timeOffset="371910.6448">18344 6844 0,'-17'0'16,"-1"-18"-16,1 36 15,-19 35 1,19-36-16,-1 19 16,18-1-16,0 0 0,18 18 15,-1-35-15,36-18 16,-18 0-16,18-35 15,-35 17-15,17-35 16,-17 35-16,0-35 16,-18 36-16,0-1 15,0 1-15,-18 34 16,18 18 0,0-17-16,18 35 15,-1-35-15,1-1 16,-1 1-16,1-18 15,0 0-15,-1 0 16,1-18 0,-18 1-1,18-1-15,-18 0 16,17 18-16,1 18 16,0 0-16,-1-18 15,1 17 1,0-17-16,-1 18 15,1-18-15,17 0 16,-17 0 0,-1-18-1,36-17 1,-35-18-16,17 0 16,-17 0-1,-18 18-15,0-36 16,-18 36-16,18 0 15,-17 0-15,-1 17 16,0 18-16,1 35 16,17 1-16,0 52 15,17-35-15,19 35 16,-19-53-16,18 0 16,-17-17-16,17 0 15,54-1-15</inkml:trace>
   <inkml:trace contextRef="#ctx0" brushRef="#br2" timeOffset="372411.0506">19720 6950 0,'-17'53'16,"34"-106"-16,-34 123 0,17-52 15,0-36 1,17-35-1,1 36-15,17-19 0,-17 1 16,17-18-16,-17 36 16,17 17-16,-17 0 15,-18 17 1,0 1-16,0 0 0,0-1 16,17 36-16,-17-35 15,0-1-15,18-17 16,17-17-1,-17-1-15,17 0 16,18-17-16,18 35 16,-54 0-16,1 0 15,17 18 1,0 52-16,-17-17 16,-18-17-1,0-1 1</inkml:trace>
   <inkml:trace contextRef="#ctx0" brushRef="#br2" timeOffset="373116.7681">16986 7408 0,'18'0'16,"0"0"-16,52 0 16,-17-17-16,70 17 15,-70-18-15,0 18 16,18-18-16</inkml:trace>
   <inkml:trace contextRef="#ctx0" brushRef="#br2" timeOffset="373588.9576">19720 7338 0,'53'17'0,"-106"-34"0,141 34 15,18-17 1,-35 0-16,-1 0 15,19 0-15,69-17 0,-105-1 16,0 18-16</inkml:trace>
   <inkml:trace contextRef="#ctx0" brushRef="#br0" timeOffset="387973.7074">27076 9525 0,'17'35'16,"1"1"-16,0-1 15,-1 18-15,1 17 0,-18 1 0,18 88 16,-1-89 0,1 1-16,-1 17 15,1-53-15,0-17 16,-36-53 0,18-36-1,-18 18-15,1 0 0,-1-17 16,-17-54-16,17 54 15,-17-1-15,17-70 16,54 106 0,17 35-1,35 0-15,-35 0 16,35 35-16,-71 0 16,1 18-16,-18-18 15,0-17-15,-18 17 0,1 1 16,-36 17-16,35-18 15,1 0 1,17-17-16,17-1 16,19 1-16,-1 0 0,0-1 0,36 19 15,-36-19-15,18 18 16,-53-17 0,-18 0-16,1-1 15,-19 1-15,1-18 0,-36 18 16,36-18-16,0 0 15,17 0-15,36 0 16,35-18 0,0 0-16</inkml:trace>
   <inkml:trace contextRef="#ctx0" brushRef="#br0" timeOffset="388314.9362">27869 10001 0,'-17'0'16,"-1"0"-1,-35 36-15,36-19 16,17 18-16,-18 1 16,18-1-16,18 0 0,-18-17 15,35 17-15,-17-17 0,70-1 16,-53-17-16,18-35 16,-35 18-16,-1-36 15,-17 35-15,-35-53 16,17 54-16,-17-36 15,17 53-15,1 0 16,17 18-16,-18 34 16,36-16-1,35 17-15,-18-36 16,18 1-16,0 0 0,-18-18 16,36 0-16,-54 0 15,-17-36-15,0 19 16,-17-36-1,-1 35-15,0 0 0,1-17 16</inkml:trace>
-  <inkml:trace contextRef="#ctx0" brushRef="#br0" timeOffset="388448.8778">28081 9948 0,'35'36'16,"1"-19"0,-19-17-16,19 18 0,52-18 15,-53 0-15,36-18 16,-54 18-16,1-17 15,-36 17-15,-17-18 16</inkml:trace>
-  <inkml:trace contextRef="#ctx0" brushRef="#br0" timeOffset="388632.6769">28293 9754 0,'17'89'16,"-34"-178"-16,34 230 0,-17-88 0,0 53 16,0-53-16,18-18 15,0 1-15,-1-1 16,19-17-16,-1-1 0,0-17 0,-17-17 16</inkml:trace>
+  <inkml:trace contextRef="#ctx0" brushRef="#br0" timeOffset="388448.8777">28081 9948 0,'35'36'16,"1"-19"0,-19-17-16,19 18 0,52-18 15,-53 0-15,36-18 16,-54 18-16,1-17 15,-36 17-15,-17-18 16</inkml:trace>
+  <inkml:trace contextRef="#ctx0" brushRef="#br0" timeOffset="388632.6768">28293 9754 0,'17'89'16,"-34"-178"-16,34 230 0,-17-88 0,0 53 16,0-53-16,18-18 15,0 1-15,-1-1 16,19-17-16,-1-1 0,0-17 0,-17-17 16</inkml:trace>
   <inkml:trace contextRef="#ctx0" brushRef="#br0" timeOffset="389055.2584">28557 10001 0,'-17'36'16,"17"-19"-16,0 18 15,17 18 1,1-35-16,17 0 0,-17-1 16,52 1-16,-34-18 15,-1-18-15,-17 1 0,-1-19 16,19-17-16,-36 1 15,17-37 1,-17 36-16,-17-17 16,-1 17-16,0 0 0,1 18 0,-1-1 15,-17 54 1,35 0-16,-18 70 16,18-35-16,18 17 0,-1-17 15,36 36-15,-35-37 16,17-16-16,-17-19 0,17 1 15,-17 17-15,-1-35 16,1-17 0,0-1-16,-1 0 15,-17 1-15,18 17 0,0 0 16,17 35-16,0-17 16,18 17-16,-35 0 15,35 0 1,-36-35-16,-17 18 0</inkml:trace>
   <inkml:trace contextRef="#ctx0" brushRef="#br0" timeOffset="389939.1193">27481 11095 0,'18'-18'16,"-18"1"-16,-18 17 31,1-18-31,-1 18 16,0 0-1,1 0-15,-18 18 16,17-1-16,-17 19 16,17-1-16,18 18 15,0-18-15,18 18 16,17-18-16,-17-17 15,17-18-15,-18 17 0,54-17 16,-53-17 0,17-18-16,-17 17 15,-18-35-15,0 18 16,0-18-16,-18 35 16,18-17-1,0 53-15,18 52 16,-1-17-16,36 70 15,-35-52-15,17 52 16,-17-70-16,-18 53 16,0-70-1,0-19-15,-18 1 0,-17-1 16,0-17-16,17 0 16,-17-17-16,-1-18 0,1 17 15,-18-53-15,0 1 16,36 34-16,-1 1 15,36-35-15</inkml:trace>
   <inkml:trace contextRef="#ctx0" brushRef="#br0" timeOffset="390585.3864">27975 11148 0,'-35'-18'15,"70"36"-15,-88-36 0,0 36 16,36-18-16,-18 53 16,35-36-16,-18 36 15,36-35-15,17 0 16,-18-18-16,36 0 16,-35 0-16,0 0 15,-1-18-15,1 0 0,-18-17 16,0 17-16,0 1 15,-18-1-15,18 0 16,0 36 0,18-18-1,0 18-15,-1-18 0,1 17 16,-1-17-16,1 18 0,17-18 16,1 0-16,-19 0 15,1 0 1,-18 18 31,18-1-32,-1-17 1,1 0 0,0-17-16,-1-1 0,-17 0 15,18-35-15,-1 18 16,-34-35-1,17 17-15,-18 0 0,1 0 16,-1 0-16,0 0 0,-17 0 16,35 35-16,-18 18 15,1 18 1,17 0-16,0 35 0,17-18 0,1 18 16,0 0-16,35 53 15,-18-53-15,-18-18 16,19 18-16,-19-36 15,1 1-15,0 0 16,-1-18-16</inkml:trace>
   <inkml:trace contextRef="#ctx0" brushRef="#br0" timeOffset="391113.691">27623 11236 0,'0'0'16,"-18"18"-16,18-1 16,0-34-1,18 17 1,-1-18-16,-17 0 15,18-17-15,-18 17 16,0 1-16,17 17 0,-17-18 16,18 18-16,0 0 15,17 18 1</inkml:trace>
   <inkml:trace contextRef="#ctx0" brushRef="#br0" timeOffset="391659.0773">28169 11254 0,'-17'0'15,"-1"0"1,0 0-1,1 17 1,17 1-16,17 17 16,1-17-1,0-1-15,-1-17 16,19 18-16,-1-18 0,-17 0 0,17 0 16,0-18-16,-17 1 15,-18-1-15</inkml:trace>
-  <inkml:trace contextRef="#ctx0" brushRef="#br0" timeOffset="391868.6686">28416 11254 0,'0'35'0,"0"-17"16,18-1-16,17 1 15,-17-18-15,17-18 16</inkml:trace>
+  <inkml:trace contextRef="#ctx0" brushRef="#br0" timeOffset="391868.6685">28416 11254 0,'0'35'0,"0"-17"16,18-1-16,17 1 15,-17-18-15,17-18 16</inkml:trace>
   <inkml:trace contextRef="#ctx0" brushRef="#br0" timeOffset="391975.4511">28469 11060 0</inkml:trace>
   <inkml:trace contextRef="#ctx0" brushRef="#br0" timeOffset="392525.4097">28557 11324 0,'0'0'0,"36"0"0,-19 18 15,1-18-15,17-35 16,-17 35-16,-1-18 0,-17 0 16,18-17-16,-36 17 15,18 1-15,-35-1 16,18 0-1,-1 18-15,18 18 0,0 0 16,0 17 0,18-17-16,17-1 15,-18 1-15,1-18 16,0 0-16,17-18 16,-17 1-16,-1-1 15,1 0-15,-18 1 31,18 17-31,-1 0 16,1 17 0,0 1-16,-1-18 15,1 0-15,-1 0 16,1 0-16,-18-18 16,18 1-1,-18-1 1,17 18-1,-17-18-15,36 18 16,-19 0-16,1-17 16,0 17-1,-1 0-15,1-18 0,-1 18 16,1-17 0,-18-1-16,-18 0 15</inkml:trace>
   <inkml:trace contextRef="#ctx0" brushRef="#br0" timeOffset="392669.0661">28981 10883 0,'17'88'0,"-34"-176"0,52 229 16,-17-70-16,-1-18 0,1 0 16,0-18-16,34 36 15,-34-54-15,0 1 16,-1-18-16</inkml:trace>
@@ -3589,7 +3589,7 @@
   <inkml:trace contextRef="#ctx0" brushRef="#br0" timeOffset="396172.6231">27746 12400 0,'0'35'0,"18"1"15,-1-36-15,1 17 16,17-17-16</inkml:trace>
   <inkml:trace contextRef="#ctx0" brushRef="#br0" timeOffset="396296.2045">27817 12136 0,'17'-18'15,"1"18"-15,-1 0 16,1 0-16,-18 18 0</inkml:trace>
   <inkml:trace contextRef="#ctx0" brushRef="#br0" timeOffset="396558.7734">27922 12418 0,'0'17'16,"0"-34"-16,18 52 0,0-35 15,-18-18 1,0 1-16,0-1 15,0-17 1,17 17-16,-17-17 16,18 17-16,0 18 15,-1 18 1,1 17 0,-18-17-16,17 0 0,-17-1 15,0 18-15,18-17 16,-18 0-16</inkml:trace>
-  <inkml:trace contextRef="#ctx0" brushRef="#br0" timeOffset="396880.042">28258 12383 0,'17'0'15,"-17"-18"-15,35 18 16,-17 0 0</inkml:trace>
+  <inkml:trace contextRef="#ctx0" brushRef="#br0" timeOffset="396880.0419">28258 12383 0,'17'0'15,"-17"-18"-15,35 18 16,-17 0 0</inkml:trace>
   <inkml:trace contextRef="#ctx0" brushRef="#br0" timeOffset="397559.6296">28240 12524 0,'0'17'0,"0"1"16,0 0-16,18-1 15,-1 1-15,-17-1 16,18-17-1,-18 18-15</inkml:trace>
   <inkml:trace contextRef="#ctx0" brushRef="#br0" timeOffset="397908.4441">28434 12012 0,'0'124'0,"0"-248"0,0 318 16,18-88-16,-18-53 15,35 0 1,-35-36-16,0 1 0,17-18 16,-17-18-16,36-17 15,-19 0-15,19-18 16,-19 35-16,19 1 15,-19 17-15,1 17 16,-1 1 0,-17 17-16,0-17 15,-17 0-15,17-1 16,-18 1-16,18-36 31,18 18-15</inkml:trace>
   <inkml:trace contextRef="#ctx0" brushRef="#br0" timeOffset="398870.4399">28822 12312 0,'0'0'15,"-18"18"1,18 17 0,0-17-16,0 34 15,18-52-15,0 18 0,17 0 16,-17-18-16,17-18 15,-18 18-15,-17-35 16,-17 17-16,-1-17 16,18 17-1,-17 18-15,17-17 16,17 34 0,1-17-16,-1 18 15,19-18 1,-19 18-16,1-18 15,-18-18 1,0 0-16,-18 1 16,1-19-16,17 19 15,17-1 1,1 0-16,35 18 16,-18 0-16,18 0 15,-35 0-15,17 0 16,-17 0-16,-18-17 15,-18 17 1,0-36 0,18 19-16,-17-18 15,-1-1-15,18 19 16,-18-1-16,18 0 0,0 36 16,0 35-1,0-18 1,18 53-16,-18-52 15,0 17-15,0-18 0,0 35 16,0-52-16,18 17 16,-1-35-1,1 0-15,0-17 0,-1-1 16,1 0-16,0 1 0,-18-18 16,17 17-16,-17-17 15,0 52 16,0 19-15,18-19-16,-18 18 16,17-17-16,1-18 15,0 0 1,-1-18-16,1-17 0,-18 0 16,18-18-1,-18 18-15,0-36 0,0 36 16,0-18-1,0 71 1,0 34-16,0-16 16,17 52-1,-17-70-15,18 17 0,-18-17 16,18-1-16,-18 1 0,17-18 16,-17-18-1,18 1-15,0 17 16,17 0-1,-18 0-15,1 35 16,0-18-16,-1 19 16,-17-19-16,0 1 15,18 0-15,-36-18 16</inkml:trace>
@@ -3602,7 +3602,7 @@
   <inkml:trace contextRef="#ctx0" brushRef="#br0" timeOffset="401695.6541">32050 12347 0,'0'0'0,"-18"36"0,18 16 16,0-34-16,0 0 15,0-1-15,0-34 16,18-1-1,-18 0-15,18-52 16,-18 35-16,0-1 0,17 19 16,1-19-16,-18 19 15,17 17-15,-17 35 16,0-17-16,0 17 16,0 0-16,0 18 15,0-35-15,0-1 16,18-17-16,0 0 15,-1-17-15,1-18 16,0 17-16,-1-17 16,19 17-1,-19 0-15,1 18 0,-1 0 16,1 18-16,0 0 16,-1-1-16,1 19 15,-18-19-15,18 1 16,-18-1-16,0 1 15,0 0-15,0-36 16</inkml:trace>
   <inkml:trace contextRef="#ctx0" brushRef="#br0" timeOffset="401918.4058">32473 11695 0,'0'0'16,"88"123"-16,-35-35 0,18 0 0,52 54 16,-70-72-16,35 36 15,-88-35 1,18-19-16,-18 1 16,-18 0-16,-17-17 0,-35 69 15,17-69-15,-53 34 16,53-52-16</inkml:trace>
   <inkml:trace contextRef="#ctx0" brushRef="#br0" timeOffset="409303.2453">28540 13159 0,'17'0'0,"1"0"31,-18 17 0,0 1-15,-18 35-1,1-36-15,17 36 16,0-17-16,0-19 0,0 19 16,17-1-1,-17 0-15,18-17 16,-18 17-16,0-17 15,-18 35-15,18-18 16,-17 35-16,17-34 16,-18-19-16,18 19 0,0-1 15,0-17 1,0 17-16,18-35 16,-18 17-1,17-17-15,-17 18 16,18-18-1</inkml:trace>
-  <inkml:trace contextRef="#ctx0" brushRef="#br0" timeOffset="409599.1267">28293 13688 0,'17'53'16,"19"17"-1,-36-34-15,53 34 16,-36-17-16,19-18 16,-19 1-16,1-19 15,17 1-15,0-1 0,36 1 16,-36-18-16,53-53 15,-52 36-15,17-36 16,-36 17-16,1 1 16,-18 17-16,-18 18 15</inkml:trace>
+  <inkml:trace contextRef="#ctx0" brushRef="#br0" timeOffset="409599.1266">28293 13688 0,'17'53'16,"19"17"-1,-36-34-15,53 34 16,-36-17-16,19-18 16,-19 1-16,1-19 15,17 1-15,0-1 0,36 1 16,-36-18-16,53-53 15,-52 36-15,17-36 16,-36 17-16,1 1 16,-18 17-16,-18 18 15</inkml:trace>
   <inkml:trace contextRef="#ctx0" brushRef="#br0" timeOffset="411156.272">27270 14517 0,'35'0'0,"0"0"16,1-18-16,87 1 15,-52 17-15,70-18 16,-88 18-16,0-18 0,-18 18 16,0 0-1,-35 18-15</inkml:trace>
   <inkml:trace contextRef="#ctx0" brushRef="#br0" timeOffset="411328.4421">27623 14605 0,'0'0'16,"35"71"-16,-35-19 0,17 37 15,-17-54-15,18 71 16,-18-71-16,0 53 15,18-70-15,-1 0 16,1-18-16</inkml:trace>
   <inkml:trace contextRef="#ctx0" brushRef="#br0" timeOffset="411868.039">27940 14923 0,'0'52'16,"0"-104"-16,-18 122 0,18-35 0,18 1 16,-18-19-1,53 1-15,-35-18 16,17 0-16,-18 0 16,19 0-16,-19 0 0,19-35 15,-36 17-15,0-35 16,0 35-16,-18-34 15,0 34-15,1-17 16,34 52 15,19-17-15,-19 18-16,19-18 16,-19 0-16,1 0 15,0 0-15,-1 0 16,1 0-1,-18 18-15,0 34 16,0-16-16,0 17 16,17-36-1,1 1-15,0 17 16,17-35-16,18 18 16,-35-18-16,-1 0 0,1 0 0,17-18 15,-17-17 1,-18 17-16,0 1 0,-36-36 15,19 17-15,-36 1 16,35 18-16,1 17 16,-1 0-16,18 17 31,0 1-31</inkml:trace>
@@ -3610,7 +3610,7 @@
   <inkml:trace contextRef="#ctx0" brushRef="#br0" timeOffset="412890.6038">29810 14975 0,'0'0'16,"0"36"-16,0-19 0,17 19 16,1-36-16,35 35 15,-35-35-15,17 0 16,35 0-16,-52-18 15,17-17-15,-17 17 16,-36-35-16,1 36 16,-36-36-16,35 53 15,-35-18 1,36 18-16,-1 0 16,18 18-16</inkml:trace>
   <inkml:trace contextRef="#ctx0" brushRef="#br0" timeOffset="413197.7987">30163 15046 0,'-18'35'16,"36"-70"-16,-36 88 15,18-71 1,18 1-1,-1-19-15,1 1 16,-18 0-16,17 0 16,1 17-16,0 18 15,17-18 1,-17 18-16,-1 36 16,1-19-16,-18 1 0,18 17 15,-18 18-15,17-35 16,1 35-1,-1-36-15,19 1 16</inkml:trace>
   <inkml:trace contextRef="#ctx0" brushRef="#br0" timeOffset="413651.5922">30656 14923 0,'-17'17'0,"-1"-17"15,0 53-15,18-18 16,0-17-16,18 0 16,0 17-1,17-35-15,-17 0 16,-1 0-16,1-35 16,0-1-16,-18 19 15,0-1-15,0 36 31,17 35-15,-17 0-16,18 70 16,0-52-16,-1-1 15,1 1-15,-18-18 0,0 52 16,0-69-16,-35 17 16,-1-53-16,-17 17 15,18-34-15,-18-36 16,35 17-16,-17-34 15,35 17-15,18 18 16,-1-18-16,54-53 16,-18 71-16,-18-1 15,18 19-15,71-36 16,-36 18-16,-53 35 16,0 0-16,-70 0 15</inkml:trace>
-  <inkml:trace contextRef="#ctx0" brushRef="#br0" timeOffset="414380.5427">27623 15946 0,'0'158'0,"0"-316"0,0 405 15,0-142-15,0-34 16,0 17-16,35 18 15,-35-88-15,17 17 16,-17-53-16,0-70 16,0 35-16,0 0 15,0-17-15,-17 17 0,17-18 16,0 1-16,17 17 0,1-88 16,0 88-1,35 0-15,-18 35 16,0 18-16,18 18 15,-35 17-15,-18 36 16,-18-36-16,0 0 16,-34 36-16,16-54 15,1 1-15,17-18 16,1-18-16</inkml:trace>
+  <inkml:trace contextRef="#ctx0" brushRef="#br0" timeOffset="414380.5426">27623 15946 0,'0'158'0,"0"-316"0,0 405 15,0-142-15,0-34 16,0 17-16,35 18 15,-35-88-15,17 17 16,-17-53-16,0-70 16,0 35-16,0 0 15,0-17-15,-17 17 0,17-18 16,0 1-16,17 17 0,1-88 16,0 88-1,35 0-15,-18 35 16,0 18-16,18 18 15,-35 17-15,-18 36 16,-18-36-16,0 0 16,-34 36-16,16-54 15,1 1-15,17-18 16,1-18-16</inkml:trace>
   <inkml:trace contextRef="#ctx0" brushRef="#br0" timeOffset="414769.495">27940 16051 0,'18'0'16,"-1"0"-16,36-17 15,-18-1-15,-17 0 0,17 1 16,1-18-16,-36 17 15,0 0 1,0 1-16,-18 17 0,-35 0 16,35 0-16,1 17 15,-18 19-15,17-1 16,18 35-16,18-34 16,34-1-16,-16-17 15,34-1-15,-34-17 16,34-35-1,-52 17-15,17-35 16,-35 18-16,0-18 16,-18 36-16,18-36 15,0 35-15,18 18 16,17 0 0,1 18-16,-1-18 15</inkml:trace>
   <inkml:trace contextRef="#ctx0" brushRef="#br0" timeOffset="415120.8674">29104 15928 0,'18'88'16,"-36"-176"-16,53 229 0,-17-106 0,17 36 16,-17-53-16,-18-1 15,18-17-15,-1 0 16,-17-17-16</inkml:trace>
   <inkml:trace contextRef="#ctx0" brushRef="#br0" timeOffset="415226.2691">29139 15752 0,'0'0'16,"0"-18"-16,0 36 0</inkml:trace>
@@ -3647,7 +3647,7 @@
   <inkml:trace contextRef="#ctx0" brushRef="#br1" timeOffset="433783.6506">13141 11307 0,'0'0'15,"35"0"-15,-17 17 0,17-17 0,0-35 16,1 35 0,-19-18-16,19-17 15,-19 17-15,-17 1 0,0-1 16,-35-17-16,17 35 15,-35 0 1,18 17-16,18 1 0,-1 0 16,0-1-16,1 1 0,17 35 15,17-18-15,36 0 16,-18-17-16,54 0 16,-54-18-16,35 0 15,-52 0 1</inkml:trace>
   <inkml:trace contextRef="#ctx0" brushRef="#br1" timeOffset="434027.9053">13547 11165 0,'-36'18'16,"72"-36"-16,-89 54 0,35-19 15,18 36-15,0-35 16,0 17-16,18-17 0,17 17 15,-17-17-15,35 17 16,-53-17 0,17-18-16,-17 17 15,-17-17-15,-19 18 16,1-18-16,17 0 0,1 0 16,-19 0-16,19 0 15,-1 0-15</inkml:trace>
   <inkml:trace contextRef="#ctx0" brushRef="#br1" timeOffset="434523.4812">13705 11254 0,'0'0'15,"-17"17"-15,-1 1 16,18 17-1,18-17-15,17 17 16,0-35-16,18 35 16,-17-35-16,-19 0 0,18 0 15,1-17-15,-36-1 16,17-17-16,-17 17 16,-17-35-1,-1 36-15,0-1 0,1 0 16,-18 18-16,17 0 15,0 0-15,18 18 16,18 17-16,0 1 16,17-1-1,-18-18-15,36 1 16,-35-18-16,35 0 16,-35 0-16,-1-18 15,1 1-15,-18-1 16,0 1-16,17-1 15,1 36 17,0 17-32,-1-18 15,1 19 1,0-36-16,-1 17 16,1-17-16,0 0 15</inkml:trace>
-  <inkml:trace contextRef="#ctx0" brushRef="#br1" timeOffset="434690.1417">14340 11218 0,'53'0'0,"-106"0"0,142 0 15,-36 0-15,-36-17 16,18 17-1,-35-18-15</inkml:trace>
+  <inkml:trace contextRef="#ctx0" brushRef="#br1" timeOffset="434690.1416">14340 11218 0,'53'0'0,"-106"0"0,142 0 15,-36 0-15,-36-17 16,18 17-1,-35-18-15</inkml:trace>
   <inkml:trace contextRef="#ctx0" brushRef="#br1" timeOffset="434918.3512">14464 10971 0,'0'0'15,"-18"53"-15,18-17 0,0 34 16,0-35 0,0 18-16,0 18 0,18-36 15,35 0 1,-18-35-16,0 0 16,-17 0-16,17 0 0,1 0 15,-19-17-15,18-1 16,-35 1-16</inkml:trace>
   <inkml:trace contextRef="#ctx0" brushRef="#br1" timeOffset="451196.2269">13441 12136 0,'0'-18'0,"-18"18"16,-17 18 0,17-18-16,-17 52 15,17-34-15,1 35 16,17-35-16,0-1 16,0 1-16,17 0 15,1 17-15,0-17 16,-18 17-16,17-18 15,-17 19-15,-17-1 16,-1 0-16,0-17 16,1 17-1,17-17-15,-18-1 16,18 1-16,0 0 0,18-1 16,-18 1-16,35 17 15,-17-17-15,-1 0 16,1-18-16,-18 17 15,-18 1 1,1-18-16</inkml:trace>
   <inkml:trace contextRef="#ctx0" brushRef="#br1" timeOffset="451463.0129">13106 12700 0,'17'71'16,"-34"-142"-16,34 177 0,-17-71 0,0 0 15,18-17-15,0 17 16,-1-17-16,36 0 16,-35-18-16,70 0 15,-53-18-15,36-17 16,-54 17-16,19-35 15,-36 35-15,0-17 16,-18 35 0,0 0-16</inkml:trace>
@@ -3694,7 +3694,7 @@
   <inkml:trace contextRef="#ctx0" brushRef="#br2" timeOffset="491124.9233">20743 10619 0,'0'17'16,"18"1"-1,-18 0 1,18 17 0,-1-18-16,-17 1 15,18-18-15,0 18 16</inkml:trace>
   <inkml:trace contextRef="#ctx0" brushRef="#br2" timeOffset="491486.9228">20902 10160 0,'0'0'16,"18"123"-16,-18-52 0,0-18 15,17 53 1,-17-71-16,0 0 0,0-17 16,0 17-16,18-35 15,-18-17-15,18-1 16,-1-35 0,19 18-16,-19 35 0,1 0 15,-1 0-15,1 0 16,0 17-16,-18 1 15,17 17-15,-17-17 16,0 0 0</inkml:trace>
   <inkml:trace contextRef="#ctx0" brushRef="#br2" timeOffset="491930.8819">21308 10495 0,'-18'35'16,"18"-17"-16,-17 0 15,17 17-15,0-17 16,17-1-16,1 1 0,-1-18 16,1 0-16,35 0 15,-35 0-15,-1 0 16,1-35-16,-18-1 15,-18 1 1,1 0 0,-1 35-16,18 17 31,35 1-15,-17-18-16,17 18 15,-17-18-15,-18-18 31,-18 0-15,18 1 0,35-1-16,-17 1 15,35-1-15,-18 18 16,18-18-16,-35 18 16,17 0-1,-17 0-15,-18-17 0,-18 17 16,-17-18-1</inkml:trace>
-  <inkml:trace contextRef="#ctx0" brushRef="#br2" timeOffset="492104.1419">21643 10195 0,'0'18'0,"0"-36"0,18 54 0,-18 52 15,0-53-15,0 18 16,-18 35-16,18-35 15,0-18-15,18 18 16,-1-35-16,18 0 16,-17-18-16,17-18 15</inkml:trace>
+  <inkml:trace contextRef="#ctx0" brushRef="#br2" timeOffset="492104.1418">21643 10195 0,'0'18'0,"0"-36"0,18 54 0,-18 52 15,0-53-15,0 18 16,-18 35-16,18-35 15,0-18-15,18 18 16,-1-35-16,18 0 16,-17-18-16,17-18 15</inkml:trace>
   <inkml:trace contextRef="#ctx0" brushRef="#br2" timeOffset="492498.6224">21819 10460 0,'-17'35'15,"17"-17"-15,0 17 16,17-17-16,1 35 16,0-53-1,-1 17-15,1-17 16,0 0-16,17 0 0,-18-17 16,1-1-16,-18-35 15,0 35-15,0-17 16,0 18-16,0-19 0,0 1 0,-18 0 15,18 17 1,0 0-16,0 36 31,0 0-31,0 17 0,18-17 0,-18 17 16,18 0 0,17 18-16,-17-35 15,-1-18 1,1 0-1,0 0-15,-1 0 16,1 17 0,-1 1-1,1 0-15,17-18 16,-17 0-16</inkml:trace>
   <inkml:trace contextRef="#ctx0" brushRef="#br2" timeOffset="493099.8415">22966 10389 0,'-18'-35'0,"36"70"0,-36-88 15,-35 53-15,36 0 16,-36 18 0,35 0-16,-17-1 0,17 1 15,18 0-15,18 35 16,-1-36-16,54 18 16,-18-35-16,35 18 15,-53 0-15,1-18 16,-36 17-1,-18-17-15,0 18 0,-17-18 16,0 0-16,-18 0 16,18 0-16,17 0 0,0 0 15</inkml:trace>
   <inkml:trace contextRef="#ctx0" brushRef="#br2" timeOffset="493254.5818">23142 10495 0,'0'0'16,"0"53"-16,0-18 0,0-17 16,0 17-16,0 1 15,18-19-15,-18 1 16,18-1-16,-1-17 0,1 0 16</inkml:trace>
@@ -3754,7 +3754,7 @@
   <inkml:trace contextRef="#ctx0" brushRef="#br2" timeOffset="522896.5833">21255 15910 0,'-18'0'0,"1"0"16,17 36-1,-18-19 1,18 18-16,0 18 0,0-17 0,0 52 16,0-53-1,18 0-15,-18 1 0,35 34 16,-17-52-16,-1 0 16,18-18-16,-17 0 0,0 0 15</inkml:trace>
   <inkml:trace contextRef="#ctx0" brushRef="#br2" timeOffset="523251.6613">21467 16298 0,'0'0'15,"0"18"-15,0-36 0,0 1 16,17-1 0,1 0-16,-1-17 0,-17 18 15,18-1-15,0 0 0,-1 18 32,-17 36-32,18-1 15,-18-18-15,18 1 16,-1-18-1,1 18-15,0-18 16,17-18-16,-35 0 16,35 1-1,-35-1-15,18 1 0,-18-1 0,0 0 16,0 1 0</inkml:trace>
   <inkml:trace contextRef="#ctx0" brushRef="#br2" timeOffset="523541.9607">21960 16069 0,'0'0'0,"0"-18"0,18 18 16,0 0 0,-18 36-16,17-19 0,1 54 15,-18-36 1,0 18-16,0-18 0,0 18 16,18-17-16,-1-19 15,1-17 1,0 0-16</inkml:trace>
-  <inkml:trace contextRef="#ctx0" brushRef="#br2" timeOffset="524715.1776">22313 16210 0,'0'0'15,"0"18"-15,18-18 0,-18 17 16,17 19-16,-17-19 16,18 36-1,0-35-15,-1-18 0,19 18 16,-19-18-16,1 0 16,-18-18-16,0 0 15,-18-35 1,18 36-16,-17-19 15,17 19 1,-18-1 0,18 1-16,0-1 15,18 18 1,-1 0-16,19 18 16,-19-1-16,1-17 15,0 0 1,-1 0-16,1 0 15,-18-17 1,0-1 15,-18 18-15,18 18-16,18-18 31,-18 17-31,17-17 16,1 0-1,-18-17 17,0-1 15,-18 18-16,18 18-16,-17-18-15,-1 35 16,18-18-16,0 1 16,18 17-16,-18-17 15,35 0 1,-17-18-16,-1 0 16,1 0-16,0 0 0,-1 0 0,19 0 15,-19-18-15,-17 0 16,0 1-16,0-1 15,-17 0 1,17 1-16,-36-1 16,19 1-1,34 17 32,1 0-31,0 17-1,-1-17-15,1 0 16,-1 0-16,1 0 16,0 0-16,-1 0 15,1 0 1,0 0-16,-1 0 16,-17 18-16,0-1 15,0 19 1,0-19-1,18 19 1,0-36-16,-1 17 16,1-17-16,17-17 15,-35-1-15,18 0 16,-18 1 0,-18-19-16,0 36 15,18-17-15,-35-1 16,18 1-1,17-1 1,0 36-16</inkml:trace>
+  <inkml:trace contextRef="#ctx0" brushRef="#br2" timeOffset="524715.1775">22313 16210 0,'0'0'15,"0"18"-15,18-18 0,-18 17 16,17 19-16,-17-19 16,18 36-1,0-35-15,-1-18 0,19 18 16,-19-18-16,1 0 16,-18-18-16,0 0 15,-18-35 1,18 36-16,-17-19 15,17 19 1,-18-1 0,18 1-16,0-1 15,18 18 1,-1 0-16,19 18 16,-19-1-16,1-17 15,0 0 1,-1 0-16,1 0 15,-18-17 1,0-1 15,-18 18-15,18 18-16,18-18 31,-18 17-31,17-17 16,1 0-1,-18-17 17,0-1 15,-18 18-16,18 18-16,-17-18-15,-1 35 16,18-18-16,0 1 16,18 17-16,-18-17 15,35 0 1,-17-18-16,-1 0 16,1 0-16,0 0 0,-1 0 0,19 0 15,-19-18-15,-17 0 16,0 1-16,0-1 15,-17 0 1,17 1-16,-36-1 16,19 1-1,34 17 32,1 0-31,0 17-1,-1-17-15,1 0 16,-1 0-16,1 0 16,0 0-16,-1 0 15,1 0 1,0 0-16,-1 0 16,-17 18-16,0-1 15,0 19 1,0-19-1,18 19 1,0-36-16,-1 17 16,1-17-16,17-17 15,-35-1-15,18 0 16,-18 1 0,-18-19-16,0 36 15,18-17-15,-35-1 16,18 1-1,17-1 1,0 36-16</inkml:trace>
   <inkml:trace contextRef="#ctx0" brushRef="#br2" timeOffset="524943.1716">23072 15981 0,'0'0'15,"35"0"-15,-17 0 0,-1 0 0,36 17 16,-35 19 0,-1-19-16,1 19 0,0-1 15,-1 0-15,-17 1 0,0 34 16,0-35-16,-17 1 15,-1-19-15,-35 36 16</inkml:trace>
   <inkml:trace contextRef="#ctx0" brushRef="#br2" timeOffset="525494.5088">22366 16228 0,'-18'0'31,"18"-18"-31,-17 18 16,17 18 0,0-1-1,-18 19-15,18-19 16</inkml:trace>
   <inkml:trace contextRef="#ctx0" brushRef="#br2" timeOffset="532578.825">20144 17057 0,'0'17'62,"-18"-17"-46,18 18-16,0 17 15,0-17 1,18 0 0,-1-18-16,1 0 15,0-18-15,-1 0 16,-17 1-16,0-1 15,-17-17 1,-1 35 0,0 0-16,1 17 15,-1 19 1,18-19 0,18-17-1,-1 0-15,1 0 0,17 0 16,-35-17 15,0-1-31,-17 18 16,-1-18-1,0 18 1,36 0 0,0 0-1,-1 0 1,-17-17-16,18 17 31,-36 0-15,1 0-16,-1 0 15,0 0 1,1 17-16,17 1 31,17-18-15,19 0-1,-19-18-15,18 18 16,-35-17-16,-17 17 31,-1 0-15,1 0-16,-1 0 16,0 0-16,1 17 15,17 1 1,17-18-1,1 0-15,17-18 16,-17 1-16,-18-1 16,0 1-1,-18-1-15,1 18 16,-1 0 0,18 18-16,-18-1 0,1 18 15,17-17-15,17 0 16,1-1-16,0-17 15,34-17-15,-16 17 16,-19-36-16</inkml:trace>
@@ -3768,7 +3768,7 @@
   <inkml:trace contextRef="#ctx0" brushRef="#br2" timeOffset="537184.6487">23760 17180 0,'-18'-17'15,"36"17"1,-18-18 0,0 0-1,17 36 1,1-18-1,0 18 1,-1-1-16,18 19 16,-17-19-16,0 18 15,-18-17-15,0 0 16,-18-18-16,0 17 0,-17-17 0,-18 0 16,18 0-1,-18-17-15,35-1 16,1 0-16,17 1 15,0-1-15</inkml:trace>
   <inkml:trace contextRef="#ctx0" brushRef="#br2" timeOffset="540543.399">24359 17022 0,'0'17'15,"0"54"-15,0-36 16,0 18-1,18-18-15,-18-17 0,18-1 0,-1-17 16,1 0-16,17-17 16,-17-1-1,-18 1-15,17-36 16,-17 17 0,0 19-1,0 34-15,36 1 16,-19-18-1,1 18-15,35-1 16,-35-17-16,-1 0 16,-17 18-16,-17-18 31,-1-18-31,0 18 16,18-17-16,0-1 15,18 0 1</inkml:trace>
   <inkml:trace contextRef="#ctx0" brushRef="#br2" timeOffset="540692.4012">24783 17110 0,'-36'0'16,"72"0"-16,-72 17 0,19-17 15,17 18-15,0 0 16,17-18-16,1 0 31</inkml:trace>
-  <inkml:trace contextRef="#ctx0" brushRef="#br2" timeOffset="540848.2977">24765 16969 0,'0'0'0,"0"-18"15,18 18-15,-1 0 16,1-18 0,35 18-16</inkml:trace>
+  <inkml:trace contextRef="#ctx0" brushRef="#br2" timeOffset="540848.2976">24765 16969 0,'0'0'0,"0"-18"15,18 18-15,-1 0 16,1-18 0,35 18-16</inkml:trace>
   <inkml:trace contextRef="#ctx0" brushRef="#br2" timeOffset="541028.4244">24888 16969 0,'36'-36'0,"-72"72"15,54-36-15,0 0 16,-1 0 0,36-18-16,-17 18 15,-1-18-15,-17 18 16,-18-17 0,-18 17-16,0-18 15</inkml:trace>
   <inkml:trace contextRef="#ctx0" brushRef="#br2" timeOffset="541204.0357">25012 16757 0,'0'0'0,"0"71"0,0-1 16,0-17-16,0 18 0,0 34 15,0-69 1,18-1-16,-18-17 15,17-18-15,1-18 16,0 0-16,-1-17 0</inkml:trace>
   <inkml:trace contextRef="#ctx0" brushRef="#br2" timeOffset="541482.1656">25153 16775 0,'-18'105'15,"36"-210"-15,-36 263 16,18-105-16,0 0 0,0-18 16,18 1-16,17-1 15,-17-35-15,17 0 16,-35-18-16,18-17 16,0 17-16,-1-17 15,1 35 16,-18 35-31,0-17 16,17 35-16,-17-35 16,18-1-16,0-17 15,-1 18 1</inkml:trace>
@@ -3792,7 +3792,7 @@
   <inkml:trace contextRef="#ctx0" brushRef="#br2" timeOffset="550746.5246">28099 18133 0,'35'0'16,"-70"0"-16,88 0 0</inkml:trace>
   <inkml:trace contextRef="#ctx0" brushRef="#br2" timeOffset="573760.2189">10989 13070 0,'-18'0'31,"1"0"-16,-1 18 1,18 0 0,-18-1-1,18 1 1,18 0 0,-18-1-16,18-17 0,-1-17 15,1-1 1,0 0-16,-18 1 15,17-1-15,-17 0 16,-17 1-16,17-1 16,-18 18-16,0 0 0,1 0 15,-36 18-15,53-1 16,-18 19 0,18-19-16,0 1 15,18-18-15,-1 0 0,19 0 16,-19 0-16,36-18 15,-53 1 1,18-1-16,-18 0 16,-18 18-16,1 0 0,-1 0 15,-17 0-15,-1 18 16,19-18-16,-1 18 0,1-18 16,17 17-16,17-17 31,1 0-31,35 0 15,-36-17-15,19 17 16,-54 0 15,-17 17-15,17 1 0,0-18-16</inkml:trace>
   <inkml:trace contextRef="#ctx0" brushRef="#br2" timeOffset="575600.0254">10989 13088 0,'0'18'47,"18"-18"-16,-1 0-31,1 0 16,0 0-1,-18-18 32,0 0 0,-18 18-31,0 0 15,1 0-15,17-17 31,-18 17 124,0 0 142,1 0-188,-1 0-109,0 0 15,1-18-16,-1 18 1,1-17-16,-1-1 16,-17-17-16,-1-1 15,1 1-15,0 0 16,17 17-16,-17-17 0,17 17 16,-35-35-1,36 36-15,-1-1 0,0 18 16,-17-35-16,18 35 15,-19-18-15,36 0 16,-17 18-16,17-17 16,0 34 156,0 1-126,17-18-30,-34 0 125</inkml:trace>
-  <inkml:trace contextRef="#ctx0" brushRef="#br2" timeOffset="579732.1921">10407 12665 0,'-18'0'156,"18"17"-125,18-17-15,-18 18 0,-18-18 124,18 18-15,-17-1-109,17 1-16,-18 0 15,0-1-15,18 1 0,-35 17 16,17-17 0,1 17-16,-36 36 15,35-36-15,-17 0 0,0 18 16,35-35-16,-18-1 16,18 1-16,-18-18 15,18 18 1,-17-18 31,17 17-32,0-34 235,-18 17-203,18-18 31,-17 18-15,17-18-48,-18 18-15,0 0 16,1 0-16,-1-17 16,0 17-16,1 0 0,-1-18 15,-17 18-15,-18-18 16,35 18-16,-17-17 16,0 17-16,-18-18 0,17 18 15,-69-35-15,69 17 16,-34 1-16,35 17 15,17-18 1,18 0 0,0 36 374,18 0-374,-18-1-16,17 19 16,-17-19-16,18 1 15,-18-1-15,0 19 0,17 17 16,-17-18-1,18 0-15,-18-17 0,0 52 16,0-34-16,18 17 16,-1-36-1,-17 1-15,0-1 16,18-17-16,-18-17 62,-18 17-62,1 0 16,-1 0 0,0 0-1,1 0-15,-18 0 16,17 0-16,-17 0 16,17 0-1,0 0-15,1-18 16,-19 18-1,19 0-15,-1 0 16,-17 0-16,17 18 0,-17-18 16,17 17-16,-17-17 15,17 0-15,1 0 16,-1 0 46,0 0-15,18-17-31,0-1 0,-17 1-1,17-1 1,-18-17-16,18-1 15,-17 1-15,-19-35 16,1 17-16,-18-36 16,18 37-16,-18-1 15,35 35-15,18 0 16,-17 18-16,-1 0 94,0 18-79,1 0-15,-1-1 0,-17 19 16,0-19-16,-18 18 16,17-17-1,19 0-15,-19-1 0,1-17 16,0 18-16,-18 0 15,18-1-15,-18 1 16,35-18-16,0 0 0,1 0 94,-1 0 0,18 18-48,0-1-30,-17 1 0,17-1-16,0 19 15,0-1-15,17 18 16,1 0 0,-1 17-16,-17-34 15,0-1-15,0-17 0,0 52 16,0-52-16,0 35 15,0-36 1,18-17 0,-36 0-1,18-17 1,-17 17 15,-1 0 0,1 0-31,-1 0 16,-17 0 0,17 0-16,0 0 0,-17 0 15,0 0-15,17 0 0,-35 17 16,18-17-16,-18 0 16,35 18-16,-35-18 15,36 18-15,-1-18 16,18-18 140,0 0-140,0-17-16,0 17 15,0-34 1,0 16-16,0-17 16,0 36-16,-17-19 0,17 19 15,-18-1-15,18 0 0,-18 1 16,18-1-16,-17 18 94,-1 0-48,0 0-30,1 18 0,-1-1-1,0-17-15,1 18 16,-1 0-16,-35 17 16,36-17-16,-36 17 15,35-35-15,0 18 0,-17 17 16,18-35-16,-19 18 15,1-18-15,0 17 16,17-17 0,-17 0-1,17 0-15,0 0 16,18 18 78,-17-1-79</inkml:trace>
+  <inkml:trace contextRef="#ctx0" brushRef="#br2" timeOffset="579732.192">10407 12665 0,'-18'0'156,"18"17"-125,18-17-15,-18 18 0,-18-18 124,18 18-15,-17-1-109,17 1-16,-18 0 15,0-1-15,18 1 0,-35 17 16,17-17 0,1 17-16,-36 36 15,35-36-15,-17 0 0,0 18 16,35-35-16,-18-1 16,18 1-16,-18-18 15,18 18 1,-17-18 31,17 17-32,0-34 235,-18 17-203,18-18 31,-17 18-15,17-18-48,-18 18-15,0 0 16,1 0-16,-1-17 16,0 17-16,1 0 0,-1-18 15,-17 18-15,-18-18 16,35 18-16,-17-17 16,0 17-16,-18-18 0,17 18 15,-69-35-15,69 17 16,-34 1-16,35 17 15,17-18 1,18 0 0,0 36 374,18 0-374,-18-1-16,17 19 16,-17-19-16,18 1 15,-18-1-15,0 19 0,17 17 16,-17-18-1,18 0-15,-18-17 0,0 52 16,0-34-16,18 17 16,-1-36-1,-17 1-15,0-1 16,18-17-16,-18-17 62,-18 17-62,1 0 16,-1 0 0,0 0-1,1 0-15,-18 0 16,17 0-16,-17 0 16,17 0-1,0 0-15,1-18 16,-19 18-1,19 0-15,-1 0 16,-17 0-16,17 18 0,-17-18 16,17 17-16,-17-17 15,17 0-15,1 0 16,-1 0 46,0 0-15,18-17-31,0-1 0,-17 1-1,17-1 1,-18-17-16,18-1 15,-17 1-15,-19-35 16,1 17-16,-18-36 16,18 37-16,-18-1 15,35 35-15,18 0 16,-17 18-16,-1 0 94,0 18-79,1 0-15,-1-1 0,-17 19 16,0-19-16,-18 18 16,17-17-1,19 0-15,-19-1 0,1-17 16,0 18-16,-18 0 15,18-1-15,-18 1 16,35-18-16,0 0 0,1 0 94,-1 0 0,18 18-48,0-1-30,-17 1 0,17-1-16,0 19 15,0-1-15,17 18 16,1 0 0,-1 17-16,-17-34 15,0-1-15,0-17 0,0 52 16,0-52-16,0 35 15,0-36 1,18-17 0,-36 0-1,18-17 1,-17 17 15,-1 0 0,1 0-31,-1 0 16,-17 0 0,17 0-16,0 0 0,-17 0 15,0 0-15,17 0 0,-35 17 16,18-17-16,-18 0 16,35 18-16,-35-18 15,36 18-15,-1-18 16,18-18 140,0 0-140,0-17-16,0 17 15,0-34 1,0 16-16,0-17 16,0 36-16,-17-19 0,17 19 15,-18-1-15,18 0 0,-18 1 16,18-1-16,-17 18 94,-1 0-48,0 0-30,1 18 0,-1-1-1,0-17-15,1 18 16,-1 0-16,-35 17 16,36-17-16,-36 17 15,35-35-15,0 18 0,-17 17 16,18-35-16,-19 18 15,1-18-15,0 17 16,17-17 0,-17 0-1,17 0-15,0 0 16,18 18 78,-17-1-79</inkml:trace>
   <inkml:trace contextRef="#ctx0" brushRef="#br2" timeOffset="582073.066">7108 13723 0,'0'18'16,"0"-1"-1,0 1-15,0 17 16,0-17-16,0 35 16,0-18-16,0-17 0,0 17 15,0 0-15,18 1 16,-18-1-16,18 0 15,-18-17 1,17-1-16,-34-17 94,-1 0-79,18-17 1,-18 17-16,1 0 31,17-18-31,-18 18 16,1-18 0,-1 18-1,0 0-15,1 0 16,-1 0-16,0-17 15,1 17-15,-1-18 16,0 18 0,1-17-1,-1-1-15,-17 18 16,17-18-16,1 18 0,-19-17 16,19 17-1,-1 0 16,18 17 157,-18 1-172,18 0-16,-17 17 15,17 0-15,-18 18 16,18-18-16,0-17 15,0 0-15,0 17 16,0-17-16,0-1 16,0 1 46,-17-18-46,-1 0 203,0 17-188,1-17-16,-1 18-15,0-18 16,1 18 0,-19-1-1,36 1-15,-17 0 0,-1-18 16,-17 35-16,17-35 16,1 18-16,-1-1 15,18 1-15,-18-18 16,1 0-1,-1 17 1,0 1-16,1-18 16,-1 0-1,18 18-15,-18-18 94</inkml:trace>
   <inkml:trace contextRef="#ctx0" brushRef="#br2" timeOffset="592985.6633">6279 14587 0,'0'-17'31,"0"-1"110,0 0-141,0 1 15,0-36 1,18-18 0,0 36-16,-18 0 0,17 0 15,1-18-15,-18-18 16,18 36-16,-1-18 15,-17 18-15,18 17 16,-18 0-16,-18 18 156,18-17-140,-17 17 0,-1 0-1,18-18-15,-18 18 16,1 0-16,-1-18 15,0 18-15,1-17 16,-18-1 0,17 18-16,0-18 0,1 1 15,-1 17-15,-35-35 16,18 17-16,17 0 0,-17 18 16,0-17-1,-1 17-15,19-18 16,-1 18-16,0 0 0,1 0 15,-1-18-15,0 18 32,18 18 93,0 0-110,0-1-15,0 36 16,-17-35-16,17 52 16,-18-34-16,-17 17 15,17-36-15,1 36 16,-1-35-1,18-1-15,-18-17 16,1 0 31,34 0 78,-17-17-109,18 17 62,-18 17 78,-18-17-140,36 0 46,0 0-46,-1 0-1,1 0 1,17 0 0,-17 0-16,35 18 15,-18-18-15,-17 0 16,-1 0-16,1 0 0,0 0 15,-1 0-15,-17-18 125,0 1-109,0-1 0,0 0-16,0 1 15,0-1 1,18 1 0,-18-1-16,18 0 15,-18 1-15,0-19 16,0 19-1,0-1 1,0 36 47,0-1-32,17 1-16,-17 0-15,18-1 16,-1 1 0,-17 0-16,18-18 0,0 17 15,-18 1-15,35-1 16,-17 1-16,-1-18 16,-17 18 109,-17-18-125,-1 17 15,18 1-15,-18 0 16,1-1-16,17 1 15,-18 17-15,18-17 0,-18 17 16,18-17-16,0-1 16,0 1-1,0 0 110,-17-18-78,-1 0-31,1 0-16,-1-18 15,0 18 1,1 0 0,-1 0-16,0 0 15,1 0 1,-1 0 15,18-18 141,0 1-141,0-1-15,0 1 0,0-1-1,0 0-15,0-17 16,0 17-16,0 1 15,0-1-15,0 0 0,0-17 16,0 17-16,-18 1 16,18-1-1,18 18 126,0 18-141,-1-18 16,1 0-16,17 17 15,-17-17-15,0 0 16,-1 18-1,1-18-15,-18 18 16,0-1 156,0 1-156,0 0-16,17 17 15,-17-17-15,0 17 16,18-17-16,-18-1 15,18 1-15,-1-1 16,-17-34 156,18 17-156,-18-18-1,18 18-15,-1-17 16,-17-1-1,18 18 1,-18-18-16,18 18 31,-18-17-31,0-1 16,17 18-16,-17-18 16,18 18-16,-18-17 15,17 17-15,-17-18 16,18 18-1,-36-18 48,18 1-16,0-1-32,0 0 32,-17 18 0,-1 18-47,1-18 16,-19 18-1,19-18-15,-1 17 16,0-17-16,-35 18 16,36 0-16,17-1 15</inkml:trace>
 </inkml:ink>
@@ -3876,25 +3876,25 @@
   <inkml:trace contextRef="#ctx0" brushRef="#br0" timeOffset="32072.194">8149 7532 0,'0'-35'16,"0"52"0,18 71-1,-18-35-15,17 53 16,1-53-1,-18 18-15,0-54 16,0 1-16,-18-53 16,18-36-1,0 18-15,18-53 16,0 53 0,-1 0-16,1 18 15,0 35-15,-1 0 16,1 0-16,0 18 0,-1-1 15,-17 1-15,18 17 0,-18 1 16,0-19-16,0 1 16,0-36-1,17-17-15,19-18 16,-19 18-16,19-18 16,-19 35-16,1 18 15,0 0-15,-1 0 16,1 36-16,0-19 15,-1 54-15,-17-36 16,18 36-16,-18-54 16,17 36-16,1-53 15,17 0 1,1 0-16,-19-18 16</inkml:trace>
   <inkml:trace contextRef="#ctx0" brushRef="#br0" timeOffset="32206.7965">8872 7620 0,'0'0'0,"0"35"0,36 53 16,-19-52-16,-17-1 15,18-17-15,0 17 0,-1-17 0,1-18 16,17 0 0,-35-18-16</inkml:trace>
   <inkml:trace contextRef="#ctx0" brushRef="#br0" timeOffset="32339.0019">8908 7320 0,'-18'-35'15,"36"70"-15,-18-88 0,17 53 16,1 0-16,0 0 16,-1 0-16,1 18 15</inkml:trace>
-  <inkml:trace contextRef="#ctx0" brushRef="#br0" timeOffset="32889.0934">9208 7655 0,'0'0'0,"0"36"0,0-1 15,0-18-15,17 1 16,-17 0-16,0 17 0,18-17 16,-18-1-1,0-34-15,0-1 16,0-35-16,0 18 15,17-36-15,-17 54 16,36-36-16,-19 35 16,19 0-1,-19 18-15,19 36 16,-36-1-16,17 36 16,-17-36-16,0 18 15,0-36-15,18 19 16,-1-36-1,1 0-15</inkml:trace>
+  <inkml:trace contextRef="#ctx0" brushRef="#br0" timeOffset="32889.0933">9208 7655 0,'0'0'0,"0"36"0,0-1 15,0-18-15,17 1 16,-17 0-16,0 17 0,18-17 16,-18-1-1,0-34-15,0-1 16,0-35-16,0 18 15,17-36-15,-17 54 16,36-36-16,-19 35 16,19 0-1,-19 18-15,19 36 16,-36-1-16,17 36 16,-17-36-16,0 18 15,0-36-15,18 19 16,-1-36-1,1 0-15</inkml:trace>
   <inkml:trace contextRef="#ctx0" brushRef="#br0" timeOffset="33378.0547">9631 7638 0,'17'0'31,"36"-18"-31,-17 18 16,-19 0-16,19 0 0,-19 0 16,1 0-16,-36 0 31,-17 18-16,17-18-15</inkml:trace>
-  <inkml:trace contextRef="#ctx0" brushRef="#br0" timeOffset="33494.7242">9737 7638 0,'-18'0'15</inkml:trace>
+  <inkml:trace contextRef="#ctx0" brushRef="#br0" timeOffset="33494.7241">9737 7638 0,'-18'0'15</inkml:trace>
   <inkml:trace contextRef="#ctx0" brushRef="#br0" timeOffset="33802.5773">9737 7743 0,'0'18'16,"0"35"-1,0-35-15,17 35 16,19-18 0,-19-17-16,1-1 15</inkml:trace>
   <inkml:trace contextRef="#ctx0" brushRef="#br0" timeOffset="34174.1481">10107 7655 0,'18'-17'0,"-1"17"15,1 0-15,17-18 16,1 0-16,-1 18 0,18-17 16,-36 17-16,1-18 15</inkml:trace>
   <inkml:trace contextRef="#ctx0" brushRef="#br0" timeOffset="34546.5">10389 6985 0,'36'88'0,"-72"-176"0,89 247 16,-17-18-16,-19-53 15,1-35-15,-1 18 16,1-19-16,0 37 15,-18-54-15,0-17 16,0-36-16,0-17 16,0-1-16,17-17 15,1 18-15,53 0 16,-36 35 0,35 0-16,-52 0 15,35 53-15,-35-36 16,-18 19-16,0-19 15,-18 1 1,0 0-16,-17-18 16,35-18-1</inkml:trace>
   <inkml:trace contextRef="#ctx0" brushRef="#br0" timeOffset="34964.4845">11024 7479 0,'0'0'0,"-17"18"0,-19 34 16,1-16-16,35-1 16,0-17-16,0 17 0,18 0 15,-1-17-15,19-18 16,17 0-16,-36-18 16,19-17-16,-19 17 15,-17 1-15,0-19 0,0 19 16,-17-1-16,-1 0 0,0 1 15,-17 17 1,17 0-16,18 35 16,0-17-16,36 17 15,-19-17-15,19-1 0,-19 1 16,18-18-16,1 0 16,-19 0-16,19-35 15,-36 17-15,0 0 0,0-35 16,0 36-16,-18-36 15,18 35 1,18 1-16,-1-1 16,54 0-1,-54 18-15,72-17 16,-36-1-16,-36 18 16,1-18-16</inkml:trace>
-  <inkml:trace contextRef="#ctx0" brushRef="#br0" timeOffset="35119.5956">11395 7214 0,'0'18'15,"0"0"-15,0 17 16,0 0-16,17 0 0,1 1 16,0 52-1,-1-53-15,1 0 0,17 18 16,-17-35-16</inkml:trace>
+  <inkml:trace contextRef="#ctx0" brushRef="#br0" timeOffset="35119.5955">11395 7214 0,'0'18'15,"0"0"-15,0 17 16,0 0-16,17 0 0,1 1 16,0 52-1,-1-53-15,1 0 0,17 18 16,-17-35-16</inkml:trace>
   <inkml:trace contextRef="#ctx0" brushRef="#br0" timeOffset="35580.2665">11695 7444 0,'-18'35'15,"36"-70"-15,-54 88 0,36-36 16,0 18-16,18-17 0,-18 17 15,18-17-15,17 0 0,-17-18 16,34 17 0,-34-34-16,0-1 15,-1 0-15,1-17 0,0-18 16,-1 0-16,1-35 16,-18 35-16,0-53 15,0 53-15,-35-35 16,17 71-16,0-1 15,18 53 1,18 71-16,-18-53 16,18 18-16,-1 34 15,-17-52-15,18 18 16,-18-36-16,18-17 16,-1-18-16,1 0 15,-1 0-15,1-18 16,0 0-16,35 1 0,-36-1 15,19 18 1,-19 0-16,18 18 16,-35-1-16,18 19 15,-18-19-15,0 1 16,-18 0-16,1-1 0</inkml:trace>
   <inkml:trace contextRef="#ctx0" brushRef="#br0" timeOffset="36176.847">13529 7285 0,'0'0'15,"-53"-35"-15,18 17 0,-36 0 16,54 18-16,-36 18 16,53 0-16,0 52 15,17-17-15,1-18 16,17 1-16,71 34 16,-71-35-16,36 1 15,-36-19-15,-35 1 0,18-18 16,-36 0-16,-35 0 15,18 0-15,-36 0 16,54-18-16,-18-17 16,35 0-1,0 0-15</inkml:trace>
   <inkml:trace contextRef="#ctx0" brushRef="#br0" timeOffset="36310.2561">13794 7408 0,'0'0'15,"35"106"-15,-17-53 0,-1-18 0,1 36 16,-1-36 0,1-35-16,0 18 15,-1-18-15,-17-18 0,18 1 16</inkml:trace>
   <inkml:trace contextRef="#ctx0" brushRef="#br0" timeOffset="36415.4286">13829 7197 0,'-18'0'16,"18"17"-16</inkml:trace>
   <inkml:trace contextRef="#ctx0" brushRef="#br0" timeOffset="36888.2089">14005 7355 0,'36'18'15,"-19"-18"-15,18 18 0,1-18 16,-19 17-16,19-17 16,-19 18-16,-17 0 15,-35-1 1,17 1-16,1 17 15,17-17-15,17 17 16,19-17-16,-1-18 16,0 0-16,1 17 15,-1-17-15,0 0 0,-17-17 16,35 17-16,-36-18 16,1-17-16,-18 17 15,0-17-15,0 17 16,-18 1-1,1 17-15,-19 0 16,19 0-16,-1 17 16,18 1-16,0 17 0,0-17 15,35 17-15,-17-17 0,70 17 16,-53-35-16,18 0 16,-17 0-16,-1 0 15,35-18-15,-52 1 16,17-19-16,-35 19 15</inkml:trace>
   <inkml:trace contextRef="#ctx0" brushRef="#br0" timeOffset="37160.1625">14799 7479 0,'18'0'15,"-18"18"1,17-1-16,1 18 16,0-17-16,17 17 15,-17-35-15,-1 18 16,-17 0-16,-17-18 31,-19 0-31,19 0 16,-19-18-16,19 18 15,-1-18-15,0 18 0,1-17 16,-1 17 0</inkml:trace>
-  <inkml:trace contextRef="#ctx0" brushRef="#br0" timeOffset="37346.1649">15346 7020 0,'0'71'0,"0"-142"0,0 159 15</inkml:trace>
+  <inkml:trace contextRef="#ctx0" brushRef="#br0" timeOffset="37346.1648">15346 7020 0,'0'71'0,"0"-142"0,0 159 15</inkml:trace>
   <inkml:trace contextRef="#ctx0" brushRef="#br0" timeOffset="37471.4555">15522 7408 0,'-17'-17'16</inkml:trace>
   <inkml:trace contextRef="#ctx0" brushRef="#br0" timeOffset="38678.371">7461 8925 0,'0'0'15,"-70"36"-15,34-1 0,-52 88 16,35-52-16,0 88 15,53-89-15,18 71 16,35-53 0,-18-52-16,71-1 15,-35-17-15,-18-18 16,17-18-16,-35 0 0,18 1 16,-35-1-16,0 0 0,-36-17 15,0 18-15,1-1 0,-36 18 16,17-18-16,-34 18 0,-54 0 15,72 0 1,-37 18-16,72 0 16,-1-18-16,71-18 15</inkml:trace>
   <inkml:trace contextRef="#ctx0" brushRef="#br0" timeOffset="38906.5833">8043 9031 0,'-35'0'16,"70"0"-16,-88 18 15,18-1-15,18 19 16,-1-1-16,0-17 0,18 17 0,18 0 16,0 0-16,-1-17 0,71 17 15,-35-17-15,53-18 16,-53-18-1,35 1-15,-70 17 16,-1-36-16</inkml:trace>
-  <inkml:trace contextRef="#ctx0" brushRef="#br0" timeOffset="39063.0613">8255 9208 0,'0'0'15,"35"123"-15,-17-52 0,0-19 16,17 37-16,-18-54 16,36 18-1,-35-36-15,0 1 0</inkml:trace>
+  <inkml:trace contextRef="#ctx0" brushRef="#br0" timeOffset="39063.0612">8255 9208 0,'0'0'15,"35"123"-15,-17-52 0,0-19 16,17 37-16,-18-54 16,36 18-1,-35-36-15,0 1 0</inkml:trace>
   <inkml:trace contextRef="#ctx0" brushRef="#br0" timeOffset="42993.462">9825 9454 0,'0'18'0,"0"17"15,0 1-15,-35 34 16,17-35-16,-17 18 16,17-35-16,0-18 15,-17 18 1,0-18-16</inkml:trace>
   <inkml:trace contextRef="#ctx0" brushRef="#br0" timeOffset="43833.8546">10672 8961 0,'0'17'16,"0"18"-16,0-17 15,17 53-15,1-18 16,-18 0-16,17 52 16,1 1-1,-18-53-15,18-18 0,-1 18 16,19-35 0</inkml:trace>
   <inkml:trace contextRef="#ctx0" brushRef="#br0" timeOffset="44116.0192">10989 8996 0,'88'-18'0,"-176"36"0,212-36 16,-72 18-16,54 35 15,-70-17-15,-19 17 0,1 54 16,-18-36-16,-18 52 16,1-69-16,-19 34 15,19-35 1,-1-17-16,18 0 16,18-18-16,52-18 15,-35 0 1,36 1-16</inkml:trace>
@@ -3902,17 +3902,17 @@
   <inkml:trace contextRef="#ctx0" brushRef="#br0" timeOffset="44713.585">12506 9472 0,'-35'88'15,"70"-176"-15,-88 194 0,18-71 16,17-17-16,1-1 0,-36 19 16,17-19-16</inkml:trace>
   <inkml:trace contextRef="#ctx0" brushRef="#br0" timeOffset="47131.7129">13335 8802 0,'18'-35'15,"-36"70"-15,71-88 0,17 35 16,-17 18-16,53 18 15,-70 0-15,-1 17 16,-18 35-16,-17-17 16,-52 53-16,34-53 15,-17 0-15,-1-18 0,19 18 16,-36 18-16,53-36 16,0 18-1,35-35-15,36-1 16,-36-17-16,18 0 15,0 0-15,-18-17 0</inkml:trace>
   <inkml:trace contextRef="#ctx0" brushRef="#br0" timeOffset="47520.8466">14182 8872 0,'0'0'16,"35"-35"-16,0 17 0,36-17 16,-54 18-16,19-1 15,-19 18 1,-34 0-16,-19 18 16,1-1-16,-71 36 15,71-35-15,-36 35 16,54-18-16,-1 0 15,18-17-15,0-1 0,53 36 16,-18-35-16,54 17 16,-36-17-16,-18 0 15,35 35-15,-52-53 16,-36 35-16,1-18 16,-54 1-1,1 0-15,34-18 0,1 17 16,-18-17-1,53-17-15,53-19 16</inkml:trace>
-  <inkml:trace contextRef="#ctx0" brushRef="#br0" timeOffset="47798.7096">15028 8678 0,'0'0'15,"-17"18"-15,-54 35 0,18-18 16,-17 89 0,34-71-16,19 17 0,-1 54 15,36-71-15,35 17 16,0-52-16,35-1 16,-18-17-16,19-17 15,-54-1-15,-18 0 16,1 1-16,-18-18 0,-18-18 15,1 35 1,-54 0-16,36 1 16,-36 17-16,36 17 15</inkml:trace>
+  <inkml:trace contextRef="#ctx0" brushRef="#br0" timeOffset="47798.7095">15028 8678 0,'0'0'15,"-17"18"-15,-54 35 0,18-18 16,-17 89 0,34-71-16,19 17 0,-1 54 15,36-71-15,35 17 16,0-52-16,35-1 16,-18-17-16,19-17 15,-54-1-15,-18 0 16,1 1-16,-18-18 0,-18-18 15,1 35 1,-54 0-16,36 1 16,-36 17-16,36 17 15</inkml:trace>
   <inkml:trace contextRef="#ctx0" brushRef="#br0" timeOffset="47993.0876">15769 9260 0,'0'0'0,"35"18"0,-35 0 0,0 17 16,-35 18-16,0-18 16,-36 36-16,36-54 15,-18 36 1,18-35-16,17-18 15</inkml:trace>
   <inkml:trace contextRef="#ctx0" brushRef="#br0" timeOffset="48793.657">16722 8731 0,'17'0'16,"1"0"-16,0 0 15,17 0-15,0-17 0,36 17 16,-36 0-16,18-18 15,-18 18-15,-17 0 16,-1 0-16,-17 18 16,-17-18-1</inkml:trace>
-  <inkml:trace contextRef="#ctx0" brushRef="#br0" timeOffset="49077.7243">16828 8714 0,'0'0'15,"-18"70"-15,18-35 0,0 54 16,0-36-16,0-18 16,0 0-16,0-17 0,35 35 15,-17-53-15,52 17 16,-17-17-16,-17 0 16,52 0-16,-35 18 15,0 17 1,-36-17-16,-17 17 0,-17 36 15,-19-54-15,1 19 16,-18-19-16,18 1 16,-36-18-1,36-18-15,0-17 16,35 17-16,0-17 16</inkml:trace>
+  <inkml:trace contextRef="#ctx0" brushRef="#br0" timeOffset="49077.7242">16828 8714 0,'0'0'15,"-18"70"-15,18-35 0,0 54 16,0-36-16,0-18 16,0 0-16,0-17 0,35 35 15,-17-53-15,52 17 16,-17-17-16,-17 0 16,52 0-16,-35 18 15,0 17 1,-36-17-16,-17 17 0,-17 36 15,-19-54-15,1 19 16,-18-19-16,18 1 16,-36-18-1,36-18-15,0-17 16,35 17-16,0-17 16</inkml:trace>
   <inkml:trace contextRef="#ctx0" brushRef="#br0" timeOffset="49444.3456">17498 8802 0,'0'70'0,"17"-17"15,-17 0-15,18-18 0,0 18 16,-1-17-16,1 52 16,0-53-16,-1-17 0,1-1 15,-18 1-15,35-18 16,-17-18-16</inkml:trace>
   <inkml:trace contextRef="#ctx0" brushRef="#br0" timeOffset="49717.3499">17833 8802 0,'0'0'16,"70"53"-16,-17-36 0,-17 1 16,52 17-16,-70 1 15,-1 16-15,-34-16 16,-1 17-16,0-18 15,-17 0-15,-18 36 16,53-36-16,0 18 16,18-35-16,-1-18 15,19 17-15,-1-17 0,0 0 0,18 0 16,53-17-16,-71-1 16,18 18-1</inkml:trace>
   <inkml:trace contextRef="#ctx0" brushRef="#br0" timeOffset="60678.5486">7620 10336 0,'0'-17'16,"18"17"-1,-1 0 1,19 0-16,-1 17 15,-18-17-15,1 18 0,0 35 16,-18-18 0,-18 18-16,18-18 15,-18 1-15,-17-1 0,18 18 16,-1-35-16,0-1 16,36 1-1,0-18-15,34 0 16,-16 0-16,-19 0 15,1 0-15,17 0 16,-17 0-16,17 0 16,-17 0-16,0-35 15</inkml:trace>
   <inkml:trace contextRef="#ctx0" brushRef="#br0" timeOffset="60995.207">8167 10195 0,'-18'-17'0,"36"34"0,-53-34 16,17 34-16,0 19 15,18 16 1,0-16-16,0-1 0,18-17 15,17 35-15,-17-36 16,-1-17-16,19 18 16,-19-18-16,1 0 15,-18-18-15,0 1 16,0-1-16,-18 18 0,1-18 16,-1 1-1,0 17-15,1 0 0,-1 17 16,1 1-16</inkml:trace>
   <inkml:trace contextRef="#ctx0" brushRef="#br0" timeOffset="61624.8893">10989 10195 0,'0'0'16,"18"0"-1,-1 0-15,36 36 16,-35-36-16,17 52 15,-17-34-15,-18 35 16,0-35-16,-35 35 16,17-36-1,0 36-15,1-53 16,17 18-16,17-18 0,1 0 16,35 17-16,-36-17 15,36-17 1,-17-1-16,17 1 15</inkml:trace>
   <inkml:trace contextRef="#ctx0" brushRef="#br0" timeOffset="61897.318">11324 10178 0,'0'0'0,"0"-18"0,35 0 16,-17 1-16,35-1 15,-35 18-15,-1-18 16,19 18-16,-19 0 16,1 0-16,-18 18 15,0 17-15,-18 1 16,1 34-16,-1-35 16,18 1-16,0-19 15,18 19 1,-1-36-16,18 17 15,-17-17-15,17-17 16</inkml:trace>
-  <inkml:trace contextRef="#ctx0" brushRef="#br0" timeOffset="62018.6214">11412 10336 0,'0'0'15,"0"-17"-15,36-1 0,34-17 16,-35 35-16,54-35 15,-72 35-15,19 0 16</inkml:trace>
+  <inkml:trace contextRef="#ctx0" brushRef="#br0" timeOffset="62018.6213">11412 10336 0,'0'0'15,"0"-17"-15,36-1 0,34-17 16,-35 35-16,54-35 15,-72 35-15,19 0 16</inkml:trace>
   <inkml:trace contextRef="#ctx0" brushRef="#br0" timeOffset="62657.9833">13847 10054 0,'17'0'16,"1"0"-1,-1 0-15,19 18 16,-19-1-16,-17 36 16,0-35-16,0 17 15,-17 18-15,-1-18 16,18 18-16,0-17 16,0-1-16,18-17 15,-1-1-15,19 1 16,-19-18-16,19 0 0,16 0 15,-34 0-15,17 0 16,-17 0-16</inkml:trace>
   <inkml:trace contextRef="#ctx0" brushRef="#br0" timeOffset="63103.1472">14376 9895 0,'-36'-17'16,"72"34"-16,-89-34 0,35 17 0,1 0 16,34 17-1,1 19 1,-1-19-16,1 1 15,17 17-15,-17-17 0,0 17 16,-1-17-16,1 17 0,-18 0 16,0-17-16,0 0 15,-18-18-15,1 0 16,-1 0-16,0 0 0,1-18 16,-1-17-16,0 17 15,18 0-15,0-34 16,18 16-1,0 19-15,17-1 0,-17 0 16,17-17-16,-17 35 16,-18-18-16,0 1 15,-18 17-15,0 0 16,-35 0-16,36 17 16,-1-17-16,0 18 15,18 0-15</inkml:trace>
   <inkml:trace contextRef="#ctx0" brushRef="#br0" timeOffset="63737.4656">17004 10001 0,'0'0'15,"18"-17"-15,34 17 16,-16 0 0,-1 0-16,18 17 15,-18 1-15,-17 17 16,-1-17-16,-34 52 15,-18-52-15,-18 70 16,17-70-16,-17 52 16,36-52-16,-1 0 15,18-1-15,18 1 0,17-18 16,0 0-16,54 0 16,-54 0-16,18 0 15,17-18 1,-52 18-16</inkml:trace>
@@ -3934,7 +3934,7 @@
   <inkml:trace contextRef="#ctx0" brushRef="#br0" timeOffset="103493.4521">6703 12700 0,'0'0'16,"-35"0"-16,17 0 0,0 35 15,1-17-15,17 0 0,0-1 16,17 1-16,1-1 0,52 36 15,-34-35 1,52 35-16,-53-18 16,0 18-16,-17-35 15,-36 17-15,1-17 16,-54-1 0,36-17-16,-18 0 0,-17 0 15,52-17-15,0-36 16,36 18-16</inkml:trace>
   <inkml:trace contextRef="#ctx0" brushRef="#br0" timeOffset="104039.9904">7091 12859 0,'-18'70'0,"36"-140"0,-36 158 15,18-70-15,0 17 16,18-17-16,17-18 15,-17 0-15,-1 0 0,19-18 16,-19 0-16,19-17 16,-19 17-16,1-35 15,0 18-15,-18 53 32,0 17-17,0-17-15,17-1 16,1-17-16,-18 18 15,17-18-15,1 0 0,-18-18 16,18 1-16,-18-1 16,0 0-16,17 18 15,1 0 1,17 0-16,-17 18 16,35 0-16,-18-18 15,0 0-15,71-18 16,-71 0-1,-35-17 1,-35 0-16,0 17 16,0 18-16,-18 18 15,35-1-15,0 19 16,36-19 0,0 1-16,-1 0 0,36-1 15,35 1-15,-35-18 16,0 0-16,-17 0 0,-1-18 15,0 18-15,-52 0 32,-1 0-32</inkml:trace>
   <inkml:trace contextRef="#ctx0" brushRef="#br0" timeOffset="104711.5901">9507 12647 0,'0'0'0,"18"35"0,35 36 16,-35-18-16,-18 0 15,0-36-15,0 1 16,-18-18 0,-17-35-16,35 17 15,-18-17-15,18 0 0,0-1 16,18-34 0,-1 34-16,1 19 15,0 17-15,17 0 0,0 17 16,-17 19-16,17 17 15,-35-18-15,0 0 16,0-17-16,0-1 16,0-34-1,18-18 1,-1-1-16,19 1 16,-19 17-16,1 1 15,0 17-15,-1 53 16,-17-36-16,18 54 15,-18-36 1,35 18-16,-35-35 16,35 17-16,-17-35 15,0 0-15,-1 0 16,-17-18-16,18 1 0,0-19 16,-18 1-16</inkml:trace>
-  <inkml:trace contextRef="#ctx0" brushRef="#br0" timeOffset="104839.7434">10054 12718 0,'18'17'16,"-1"36"-16,1-35 16,-18 17-16,18-17 0,17 35 15,-17-36 1,-1-17-16,-17-17 16</inkml:trace>
+  <inkml:trace contextRef="#ctx0" brushRef="#br0" timeOffset="104839.7433">10054 12718 0,'18'17'16,"-1"36"-16,1-35 16,-18 17-16,18-17 0,17 35 15,-17-36 1,-1-17-16,-17-17 16</inkml:trace>
   <inkml:trace contextRef="#ctx0" brushRef="#br0" timeOffset="104967.8955">10089 12577 0,'0'0'0,"-17"-18"15,34 0 1,-17 1-16,36-1 16,-19 18-16,1 0 15</inkml:trace>
   <inkml:trace contextRef="#ctx0" brushRef="#br0" timeOffset="105379.8916">10283 12788 0,'0'18'31,"18"-18"-31,-18 17 16,18 1 0,-18 0-16,17-1 15,-17 1-15,-17-18 16,17-35-1,17-18 1,-17 35-16,36-52 16,-19 52-1,19 0-15,-19 18 16,1 18-16,-18 0 16,18-1-16,-18 19 0,0 16 15,17-34 1,-17 17-16,18-17 15,-1-18-15</inkml:trace>
   <inkml:trace contextRef="#ctx0" brushRef="#br0" timeOffset="105534.2843">10689 12735 0,'18'18'16,"-1"-18"-1,1 0-15,0 0 16,17 0 0,-17-18-16</inkml:trace>
@@ -3951,7 +3951,7 @@
   <inkml:trace contextRef="#ctx0" brushRef="#br0" timeOffset="110145.4194">13300 13705 0,'70'53'15,"-140"-106"-15,193 159 0,-70-70 0,0 16 16,-18-16-16,18-1 15,-17 0-15,16-17 16,-16 0-16,-1-1 0</inkml:trace>
   <inkml:trace contextRef="#ctx0" brushRef="#br0" timeOffset="110339.8624">13829 13829 0,'0'0'16,"-18"0"-16,1 18 0,-1 17 0,-17 53 15,17-35 1,0 17-16,1 1 0,17 0 16,-18-1-16,18 1 0,0 35 15,18-54-15,-1 19 16,1-36-16,-18-17 16,18 0-16,-1-18 0</inkml:trace>
   <inkml:trace contextRef="#ctx0" brushRef="#br0" timeOffset="110801.9941">14093 13458 0,'-17'0'15,"-1"0"-15,1 18 16,17 0-1,-18 35-15,18-18 16,0 0-16,18 1 16,-1-1-16,-17-18 15,18-17-15,-1 18 16,-17 0 0,0-1-16,0 1 15,-17 0-15,17 17 16,0-17-16,0 17 15,0-18 1,17-17 0,1 0-1</inkml:trace>
-  <inkml:trace contextRef="#ctx0" brushRef="#br0" timeOffset="110973.9167">14217 13758 0,'35'-17'15,"-70"34"-15,88-34 0,-18-1 0,0 0 16,-17 1 0,-36-1-1</inkml:trace>
+  <inkml:trace contextRef="#ctx0" brushRef="#br0" timeOffset="110973.9166">14217 13758 0,'35'-17'15,"-70"34"-15,88-34 0,-18-1 0,0 0 16,-17 1 0,-36-1-1</inkml:trace>
   <inkml:trace contextRef="#ctx0" brushRef="#br0" timeOffset="111113.4821">14288 13723 0,'0'0'0,"35"53"16,-18-35-16,1-1 0,0 1 16,-1 17-16,1-35 15,0 0-15</inkml:trace>
   <inkml:trace contextRef="#ctx0" brushRef="#br0" timeOffset="111296.0719">14570 13476 0,'53'71'0,"-106"-142"0,123 177 15,-52-53-15,0-18 0,-1 18 16,1-18-16,-18 18 0,17 18 15,-34-36 1,-18 18-16,17-18 16,-35-17-16,35-18 15</inkml:trace>
   <inkml:trace contextRef="#ctx0" brushRef="#br0" timeOffset="112025.1148">14499 12418 0,'0'0'0,"-35"-71"0,17 18 16,-17 0-16,-18-17 15,35 35-15,-17-1 0,0 19 16,0 17-16,17 17 15,-17 54 1,35-18-16,0 88 16,17-71-16,36 72 15,-35-90-15,35 54 16,-36-70-16,19 16 16,-36-34-16,0-36 15,-36-17 1,19 18-1,-1-19-15,1 19 0,17-36 16,0 35-16,17-17 0,54 17 16,-36 1-1,0 17-15,18 0 16,-18 0-16,-17 17 0,-18 1 16,0-1-16,-18 1 15,1 0 1,-1-1-16,1-17 15,17 18-15,17-18 16,18 0-16</inkml:trace>
@@ -4037,9 +4037,9 @@
   <inkml:trace contextRef="#ctx0" brushRef="#br0" timeOffset="131177.9653">29439 10442 0,'-17'0'15,"17"-17"16,0-1-31,0 0 16,0 1-16,17-19 16,1 1-1,-18 17-15,35-17 16,-17 18-16,-18-1 0,18 18 16,-1-18-16,1 1 0,-1-1 15,1 0 1,0 18-16,-1 0 15,1 18 1,0 0 0,-18-1-16,17 1 0,19 0 15,-19-1-15,36 1 16,-35-18-16,-1 0 16,1 17-16</inkml:trace>
   <inkml:trace contextRef="#ctx0" brushRef="#br0" timeOffset="153378.2699">14711 11095 0,'0'-18'0,"0"1"16,0-1-16,17 18 15,1 0 1,0 53 0,-1-18-16,1 18 0,0 0 15,17 70-15,-35-52 16,35 70-1,-17-88-15,35 53 0,-36-71 16,19 0 0,-19-35-16,1 0 0,0 0 15,-18-17-15,17-36 16,-17 18-16,0-71 16,0 53-16,0 0 0,-17 0 15,-1 0-15,18 18 16,-18 0-16,18 17 0,0 0 15,18 36 17</inkml:trace>
   <inkml:trace contextRef="#ctx0" brushRef="#br0" timeOffset="153712.0003">15275 11606 0,'-17'18'0,"17"0"16,0 17-16,0 0 15,35 1 1,-35-19-16,35 1 0,0-18 15,-17 0-15,17 0 16,-35-18-16,18 18 16,-36-53-1,-17 18 1,0 17-16,-18 1 16,35-1-1,36 18 1,0 0-16</inkml:trace>
-  <inkml:trace contextRef="#ctx0" brushRef="#br0" timeOffset="153982.9815">15646 11412 0,'0'0'0,"17"-17"32,19-1-32,-1 18 15,18-18-15,-36 18 16,19 0-16,-19 0 15,1 36 1</inkml:trace>
+  <inkml:trace contextRef="#ctx0" brushRef="#br0" timeOffset="153982.9814">15646 11412 0,'0'0'0,"17"-17"32,19-1-32,-1 18 15,18-18-15,-36 18 16,19 0-16,-19 0 15,1 36 1</inkml:trace>
   <inkml:trace contextRef="#ctx0" brushRef="#br0" timeOffset="154112.6407">15734 11571 0,'0'0'15,"18"0"-15,-1 0 0,18 0 16,-17-18-16,35 18 15,-35-17-15,-1 17 16</inkml:trace>
-  <inkml:trace contextRef="#ctx0" brushRef="#br0" timeOffset="154478.8546">16298 11324 0,'-17'-17'15,"17"-1"-15,-18 18 16,-17 35-16,17-17 16,1-1-16,17 19 15,-18-19-15,36 54 16,-1-36-16,1 0 0,17 1 15,0-19-15,54 19 16,-54-36-16,18 0 0,-18 0 16,53-36-1,-53 19-15,1-1 0,-19-17 16,-17 0-16,0-1 0,0 1 16,-35 17-16,0-17 0,-53-18 15,35 18-15,0 17 16,-18 1-16,18 17 0,-35 0 15</inkml:trace>
+  <inkml:trace contextRef="#ctx0" brushRef="#br0" timeOffset="154478.8545">16298 11324 0,'-17'-17'15,"17"-1"-15,-18 18 16,-17 35-16,17-17 16,1-1-16,17 19 15,-18-19-15,36 54 16,-1-36-16,1 0 0,17 1 15,0-19-15,54 19 16,-54-36-16,18 0 0,-18 0 16,53-36-1,-53 19-15,1-1 0,-19-17 16,-17 0-16,0-1 0,0 1 16,-35 17-16,0-17 0,-53-18 15,35 18-15,0 17 16,-18 1-16,18 17 0,-35 0 15</inkml:trace>
   <inkml:trace contextRef="#ctx0" brushRef="#br0" timeOffset="156576.2216">14923 12330 0,'0'17'16,"0"19"0,17-19-1,1 54-15,-1-36 16,1 53-16,0-53 16,-1 1-16,1-1 0,0 0 15,17 18-15,-17-35 16,17-18-1,-18-18-15,1-35 16,0 0-16,-18-17 16,0 17-16,-18-18 15,0 36 1,1 0-16,-1 35 16,18 17-1,0 1 1</inkml:trace>
   <inkml:trace contextRef="#ctx0" brushRef="#br0" timeOffset="156752.0827">15434 12788 0,'0'53'16,"0"-106"-16,18 141 0,-18-70 15,0 17-15,0-17 16,0 0-16</inkml:trace>
   <inkml:trace contextRef="#ctx0" brushRef="#br0" timeOffset="157242.6084">15787 12541 0,'0'0'15,"-18"0"-15,1 0 16,34 0 0,18 0-1,1 0 1,17-17-16,-18 17 15,18-18-15,-36 0 16,1 18-16</inkml:trace>
@@ -4048,13 +4048,13 @@
   <inkml:trace contextRef="#ctx0" brushRef="#br0" timeOffset="159178.5543">17163 12612 0,'0'0'0</inkml:trace>
   <inkml:trace contextRef="#ctx0" brushRef="#br0" timeOffset="159705.596">17639 12365 0,'0'0'16,"18"-35"-16,-18 17 0,-18-17 16,0 17-1,-17 0 1,17 18-16,-17 0 0,17 0 16,-17 0-16,0 36 15,17-1-15,-17 36 16,35-36-16,0 35 15,0-52-15,35 35 16,1-35-16,-19-1 16,18-17-16,1 0 0,-1 0 15,18-17-15,-18-1 16,-17-17-16,17-54 16,-35 1-1,-18 53 1,-17 0-1,18 52 1,-1 1-16,18 0 0,0 52 16,0 18-1,0-35-15,35 35 16,-17-52-16,-18 17 16,17-18-16,19 18 15,-36-18-15,17 0 16</inkml:trace>
   <inkml:trace contextRef="#ctx0" brushRef="#br0" timeOffset="161464.6233">18256 12383 0,'0'35'0,"0"0"15,18 0-15,0 54 16,-1-37-16,1-16 15,-1-1-15,19 18 16,-19-53-16,19 18 16,-19-36-16,19-17 15,-36 17-15,17-53 16,-17 36-16,0 0 16,0 0-16,-17-18 15,17 17-15,-18 19 0,18-1 16</inkml:trace>
-  <inkml:trace contextRef="#ctx0" brushRef="#br0" timeOffset="161758.8046">18662 12753 0,'18'53'16,"-36"-106"-16,53 123 0,18-52 15,-35-18 1,-1-18-16,1 18 0,17-17 16,-35-1-16,-17 1 15,17-1-15,-36-17 16,1 35-16,0-18 15,17 18-15,1 0 16,34 18 0</inkml:trace>
-  <inkml:trace contextRef="#ctx0" brushRef="#br0" timeOffset="163237.8144">20003 12577 0,'0'-18'15,"17"18"1,18-18 0,1 18-16,-1 0 0,0 0 15,18 0-15,-18 0 0,36 0 16,-36 0-16,18 0 15,-35 0-15</inkml:trace>
+  <inkml:trace contextRef="#ctx0" brushRef="#br0" timeOffset="161758.8045">18662 12753 0,'18'53'16,"-36"-106"-16,53 123 0,18-52 15,-35-18 1,-1-18-16,1 18 0,17-17 16,-35-1-16,-17 1 15,17-1-15,-36-17 16,1 35-16,0-18 15,17 18-15,1 0 16,34 18 0</inkml:trace>
+  <inkml:trace contextRef="#ctx0" brushRef="#br0" timeOffset="163237.8143">20003 12577 0,'0'-18'15,"17"18"1,18-18 0,1 18-16,-1 0 0,0 0 15,18 0-15,-18 0 0,36 0 16,-36 0-16,18 0 15,-35 0-15</inkml:trace>
   <inkml:trace contextRef="#ctx0" brushRef="#br0" timeOffset="163399.2478">20197 12400 0,'0'0'0,"0"35"0,-18 71 15,18-53 1,0 18-16,18-36 16,-18 0-16,17-17 15,1 0-15,-1-18 0</inkml:trace>
   <inkml:trace contextRef="#ctx0" brushRef="#br0" timeOffset="164138.1434">21026 12418 0,'0'0'0,"0"-18"0,17-17 15,-17 17 1,-17 1 0,-1 17-16,-17 17 15,17 1-15,0 0 16,1 17-16,-1 18 15,0 0-15,18-18 0,0 0 16,36 18 0,-1-18-16,-17-17 0,35 0 15,17-18-15,-17 0 16,18-36-16,-36 1 16,0-18-16,-35 36 15,-17-54 1,-1 36-16,-53-18 15,54 18-15,-54 17 16,36 0-16,17 18 16,1 0-16</inkml:trace>
   <inkml:trace contextRef="#ctx0" brushRef="#br0" timeOffset="164299.9083">21519 12559 0,'0'0'15,"0"18"-15,18-18 16,0-18 0</inkml:trace>
   <inkml:trace contextRef="#ctx0" brushRef="#br0" timeOffset="164601.0528">21890 12206 0,'-18'35'16,"1"1"-16,17-1 0,17 36 15,-17-19-15,18 37 16,0-36-16,-1-18 16,1 35-1,-1-52-15,1 35 16,-18-35-16</inkml:trace>
-  <inkml:trace contextRef="#ctx0" brushRef="#br0" timeOffset="165923.4544">22842 12383 0,'0'-36'15,"-17"19"-15,-1-19 16,0 36-1,-17 0 1,18 0-16,-19 36 16,19-1-16,-19 35 15,36-34-15,0 17 0,0-18 16,18 18-16,0-18 0,35 36 16,-36-36-16,71 0 15,-35-35-15,-17 0 16,52 0-1,-35-17-15,17-19 16,-52 1-16,0 17 0,-1-17 16,-17 0-16,0 0 0,-17-54 15,-1 54 1,-17-18-16,-54-35 0,54 53 16,-88-1-1,70 36-15,-35 18 16,35 17-16,35-17 0,0 35 15,1-18-15,52 18 16,-17-18-16,17-17 0,71 17 16,-53-35-1,35 18-15,-35-18 16,-18 0-16,18 0 16</inkml:trace>
+  <inkml:trace contextRef="#ctx0" brushRef="#br0" timeOffset="165923.4543">22842 12383 0,'0'-36'15,"-17"19"-15,-1-19 16,0 36-1,-17 0 1,18 0-16,-19 36 16,19-1-16,-19 35 15,36-34-15,0 17 0,0-18 16,18 18-16,0-18 0,35 36 16,-36-36-16,71 0 15,-35-35-15,-17 0 16,52 0-1,-35-17-15,17-19 16,-52 1-16,0 17 0,-1-17 16,-17 0-16,0 0 0,-17-54 15,-1 54 1,-17-18-16,-54-35 0,54 53 16,-88-1-1,70 36-15,-35 18 16,35 17-16,35-17 0,0 35 15,1-18-15,52 18 16,-17-18-16,17-17 0,71 17 16,-53-35-1,35 18-15,-35-18 16,-18 0-16,18 0 16</inkml:trace>
   <inkml:trace contextRef="#ctx0" brushRef="#br0" timeOffset="167308.6349">23424 12753 0,'18'0'15,"-36"18"48,18 34-48,0-34-15,0 17 0,18-17 16,-18 17-16,0-17 0,18 0 16,-1 17-16,1-17 0</inkml:trace>
   <inkml:trace contextRef="#ctx0" brushRef="#br0" timeOffset="169179.1823">8520 4304 0,'17'0'16,"36"0"-1,-18 0 1,18 0-16,71 0 15,-54 0-15,1 0 0,-1 0 16,54 0-16,-71 0 16,0 0-16,-18 0 0,-17 0 15,17 0-15,-17 18 16,-36-18 0,0 0-16</inkml:trace>
   <inkml:trace contextRef="#ctx0" brushRef="#br0" timeOffset="169550.5978">8996 4004 0,'-18'0'0,"-17"18"16,0-18-16,-36 17 15,36 1-15,-18 0 16,-18 17 0,18-17-16,18-1 0,18 1 15,-36 17-15,35-17 16,36 35-1,-1-36-15,1 1 0,70 52 16,-53-52 0,18 17-16,18 1 0,-18-19 15,53 36-15,-71-18 16,0-17-16,-17 0 0,-18 17 16</inkml:trace>
@@ -4063,7 +4063,7 @@
   <inkml:trace contextRef="#ctx0" brushRef="#br0" timeOffset="172035.9787">15787 13723 0,'35'0'0,"0"0"16,-17 0-16,35 0 15,-35 0-15,-1 0 16</inkml:trace>
   <inkml:trace contextRef="#ctx0" brushRef="#br0" timeOffset="172141.7578">15875 13864 0,'53'0'16,"-106"0"-16,124 0 0,-54 0 0,1 0 15</inkml:trace>
   <inkml:trace contextRef="#ctx0" brushRef="#br0" timeOffset="172759.0501">16775 13705 0,'-18'-35'16,"36"70"-16,-54-87 0,1 52 16,17 0-16,1 0 0,-1 17 15,0 18-15,1 1 0,-1 52 16,18-53-16,18 53 15,-1-52-15,1-1 16,17-17-16,18-1 16,-17-17-16,-1-17 15,18-36-15,-36 17 16,19-34 0,-36 17-16,-18-18 15,0 36-15,-52-18 16,35 18-16,-1 35 0,19-18 15,-19 18-15,19 0 0,-19 36 16,36-19-16,18 1 16,0-1-16</inkml:trace>
-  <inkml:trace contextRef="#ctx0" brushRef="#br0" timeOffset="172908.8545">17110 13776 0,'-18'0'16,"18"18"-16</inkml:trace>
+  <inkml:trace contextRef="#ctx0" brushRef="#br0" timeOffset="172908.8544">17110 13776 0,'-18'0'16,"18"18"-16</inkml:trace>
   <inkml:trace contextRef="#ctx0" brushRef="#br0" timeOffset="173375.5456">17551 13653 0,'-18'-36'16,"36"72"-16,-54-89 15,1 53-15,18 0 16,-36 17-16,17 1 16,-17 17-16,36 0 15,17 1-15,-18-19 0,36 54 16,-1-36-16,1-17 16,35-1-16,-18-17 15,53 0 1,-52-17-16,-1-36 15,-17 35-15,-1-35 16,-17 36-16,-17-36 16,-1 35-16,0 1 15,1 17-15,-1 0 16,18 35-16,0-18 16,0 72-16,0-36 15,18-1-15,17 54 16,-17-70-16,17-1 0,-17 0 15,-1 0-15,1 1 16,-1-36-16,-17 17 16</inkml:trace>
   <inkml:trace contextRef="#ctx0" brushRef="#br0" timeOffset="175940.4339">18115 13635 0,'18'0'15,"-18"-18"1,17 36-1,-17 17 1,18 0-16,-18 18 16,18 18-16,-18-18 15,17 0-15,1-18 0,0 18 16,-18-18-16,17-17 16,1-1-16,0-34 15,17-18 1,-18-1-16,1 1 15,-18-18-15,35-35 16,-17 53-16,-18-18 16,0 17-16,18 1 0,-18 0 15,0 17-15,-18 18 16,18 36 0,-18-19-1</inkml:trace>
   <inkml:trace contextRef="#ctx0" brushRef="#br0" timeOffset="176167.9428">18644 14005 0,'0'0'0,"0"36"0,18-1 16,-18 0-16,0 0 16,18-17-1,-18 0-15,17-18 16</inkml:trace>
@@ -4077,7 +4077,7 @@
   <inkml:trace contextRef="#ctx0" brushRef="#br0" timeOffset="181033.9085">14993 14781 0,'0'0'0,"18"36"0,17 70 16,-17-54-16,35 37 15,-36-36-15,36 17 16,-35-52-16,17-1 16,-17-17-16,-1-17 15,-17-19-15,18 1 16,-18-18-16,0 18 0,18-71 15,-18 53-15,0-35 16,0 53 0,17-1-16,-17 19 0,18-1 15,-1 36 1</inkml:trace>
   <inkml:trace contextRef="#ctx0" brushRef="#br0" timeOffset="181468.8383">15452 14993 0,'0'0'16,"17"0"-16,1 0 0,0 0 16,-1 0-16,1 18 15,-18-1-15,0 19 16,-18-19 0,1 19-1,17-19-15,0 18 0,0-17 16,0 0-16,35 17 15,-17-17-15,34-1 16,-34 1-16,0-18 16,-18 18-16,-18-18 15,0 0-15,-34 17 0,-37 1 16,36-1-16,0-17 16,18 18-16,0 0 0,0-18 15,17 17-15,36-17 16,-1 0-16,19-17 0</inkml:trace>
   <inkml:trace contextRef="#ctx0" brushRef="#br0" timeOffset="181672.7381">15910 15011 0,'0'0'16,"53"0"-16,-35 0 15,17 0-15,0 0 16,-17 0-16,-18 17 16</inkml:trace>
-  <inkml:trace contextRef="#ctx0" brushRef="#br0" timeOffset="181789.8894">16051 15187 0,'89'-18'15,"-178"36"-15,213-36 0,-106 1 16,17 17-16</inkml:trace>
+  <inkml:trace contextRef="#ctx0" brushRef="#br0" timeOffset="181789.8893">16051 15187 0,'89'-18'15,"-178"36"-15,213-36 0,-106 1 16,17 17-16</inkml:trace>
   <inkml:trace contextRef="#ctx0" brushRef="#br0" timeOffset="182357.6133">16722 15064 0,'0'0'15,"-18"-18"-15,18 0 0,-18 18 16,1 0-16,17 36 16,0-1-16,0 53 15,0-35-15,35 35 16,0-70-16,18 35 15,-17-36 1,-1-17-16,35-17 16,-34-1-16,-19 0 0,19-52 15,-36 35-15,0-1 16,-18-52 0,-17 53-16,-18-36 15,0 36-15,-18 0 16,54 17-16,-19 36 15,36-1-15,0 1 16</inkml:trace>
   <inkml:trace contextRef="#ctx0" brushRef="#br0" timeOffset="182469.6774">17180 15152 0,'0'0'0,"0"-18"15</inkml:trace>
   <inkml:trace contextRef="#ctx0" brushRef="#br0" timeOffset="182851.1009">17480 14905 0,'-17'-18'16,"34"36"-16,-52-36 0,17 18 0,1 36 16,-1-19-16,18 54 15,0-36-15,18 0 16,-1-17-16,19 0 16,-1-18-16,0-18 15,-17 0-15,-1-17 16,1 0-1,-18 17-15,0-17 0,0 17 16,-18-17-16,1 35 16,17 18-1,-18 17-15,18 18 16,0 0-16,18 52 16,-1-34-16,-17-18 0,36 35 15,-36-53-15,17-17 16,1 17-1</inkml:trace>
@@ -4085,7 +4085,7 @@
   <inkml:trace contextRef="#ctx0" brushRef="#br0" timeOffset="183777.9039">18450 15064 0,'18'0'0,"17"0"16,-17 17-16,-1-17 15,19 53-15,-19-35 16,-17 17-16,0 18 16,0-18-16,0 1 15,-17-19-15,17 1 0,-18-1 16,18 1-1,18-18-15,-1 0 16,36-18-16,-35 18 16,17 0-1,-17 0-15,0-17 0</inkml:trace>
   <inkml:trace contextRef="#ctx0" brushRef="#br0" timeOffset="184259.9223">20126 15117 0,'18'-18'15,"-36"36"-15,71-36 16,-35 18-16,70-18 15,-53 18-15,0-17 0,36 17 16,-36 0 0,-17 0-16</inkml:trace>
   <inkml:trace contextRef="#ctx0" brushRef="#br0" timeOffset="184409.1339">20338 14993 0,'-18'35'0,"18"1"0,18-107 0,-18 177 16,0-71-16,35 36 15,-17-54-15,-18 19 0,17-19 16</inkml:trace>
-  <inkml:trace contextRef="#ctx0" brushRef="#br0" timeOffset="184876.3586">21167 14993 0,'0'0'16,"-18"0"-16,0 0 0,1 35 16,17 36-1,0-18-15,0-18 16,17 36-16,-17-54 15,53 19-15,-35-19 16,17-34-16,1 17 16,-19-36-16,1 19 15,-1-19-15,-17 19 0,0-54 16,0 36-16,0 17 16,-35-35-16,18 36 15,-1-1-15,0 0 16,-17 18-16,17 18 15,18 17 1,18 1-16,0-19 16</inkml:trace>
+  <inkml:trace contextRef="#ctx0" brushRef="#br0" timeOffset="184876.3585">21167 14993 0,'0'0'16,"-18"0"-16,0 0 0,1 35 16,17 36-1,0-18-15,0-18 16,17 36-16,-17-54 15,53 19-15,-35-19 16,17-34-16,1 17 16,-19-36-16,1 19 15,-1-19-15,-17 19 0,0-54 16,0 36-16,0 17 16,-35-35-16,18 36 15,-1-1-15,0 0 16,-17 18-16,17 18 15,18 17 1,18 1-16,0-19 16</inkml:trace>
   <inkml:trace contextRef="#ctx0" brushRef="#br0" timeOffset="185015.4293">21537 15134 0,'-18'0'0,"36"0"0,-18 0 47</inkml:trace>
   <inkml:trace contextRef="#ctx0" brushRef="#br0" timeOffset="185232.4323">21802 14834 0,'-18'36'16,"18"-1"-16,0 35 16,18-17-16,-18 36 15,17-37-15,1 19 16,-18-53-16,18-1 15,-18 1-15</inkml:trace>
   <inkml:trace contextRef="#ctx0" brushRef="#br0" timeOffset="185862.2939">22631 14993 0,'-18'-18'0,"36"36"0,-54-36 15,19 36 1,-1 0-16,1 35 15,-1-18-15,18 0 0,0 0 16,18 54-16,34-36 16,-16-18-16,-19-18 15,72-17 1,-54 0-16,0-17 0,18-18 16,-18 17-16,-17-17 15,0-1-15,-18 1 0,0 0 16,-18-36-16,0 18 15,-35-17-15,18 35 16,-35-1 0,34 19-16,1 17 0,0 0 15,-1 17-15,19 36 16,17-18-16,0 54 16,17-72-16,19 19 0,34-1 15,-34-18 1,16-17-16,-16 0 0,-1 0 15,0 0-15,18-17 16</inkml:trace>
@@ -4104,7 +4104,7 @@
   <inkml:trace contextRef="#ctx0" brushRef="#br0" timeOffset="210614.5196">17992 17110 0,'-18'-18'0,"36"36"0,-54-54 15,1 36 1,17 0-16,1 0 0,-18 36 16,35-19-1,-18 19-15,18-19 0,0 19 0,0-1 16,18-35-16,-1 17 16,1-17-16,-1 0 0,1 0 15,35-17 1,-35-1-16,-1 1 15,-17-1-15,0 0 0,18 1 0,-18-1 16,0 0-16,0 1 16,-18-1-16,18 36 15,0 17 1,0 18 0,18-18-16,-18 0 0,18 18 15,-18-17-15,17-19 0,-17 19 16,0-1-16,18-17 0,0 17 15,-18-18 1</inkml:trace>
   <inkml:trace contextRef="#ctx0" brushRef="#br0" timeOffset="211726.7686">18397 17092 0,'-17'0'16,"17"18"-1,0-1-15,0 1 0,17 53 16,1-36-16,0 18 16,-1-18-16,1 18 0,17 35 15,-17-53-15,17 36 16,-17-53-16,-1-1 15,19-17 1,-36-17-16,17-36 16,-17-18-1,0 18-15,0 18 16,-17 0-16,17-18 0,-18-18 16,0 36-16,1 0 15,-1 17-15,18 0 16</inkml:trace>
   <inkml:trace contextRef="#ctx0" brushRef="#br0" timeOffset="212103.579">18838 17463 0,'-17'0'16,"34"0"-1,1 0 1,0 0-16,35 0 16,-18 0-16,-18-18 0,36 18 15,-35 0-15,0 0 16,-36-18-1</inkml:trace>
-  <inkml:trace contextRef="#ctx0" brushRef="#br0" timeOffset="212410.3095">18944 17339 0,'0'0'16,"0"18"-16,0-1 15,0 1-15,0 17 16,0-17-16,18 17 16,-18-17-16,0-1 15,17 19-15,1 17 16,-18-36-16,35 19 15,-17-36-15,0 0 16,-1 0 0,1 0-16,0 0 15</inkml:trace>
+  <inkml:trace contextRef="#ctx0" brushRef="#br0" timeOffset="212410.3094">18944 17339 0,'0'0'16,"0"18"-16,0-1 15,0 1-15,0 17 16,0-17-16,18 17 16,-18-17-16,0-1 15,17 19-15,1 17 16,-18-36-16,35 19 15,-17-36-15,0 0 16,-1 0 0,1 0-16,0 0 15</inkml:trace>
   <inkml:trace contextRef="#ctx0" brushRef="#br0" timeOffset="212770.8187">19350 17463 0,'0'17'32,"18"-17"-17,-1 0-15,1 0 16,-1 0-16,19 0 15,-19-17-15,1 17 32</inkml:trace>
   <inkml:trace contextRef="#ctx0" brushRef="#br0" timeOffset="213049.7016">19685 17357 0,'0'0'0,"0"17"16,0 19-1,0-19-15,18 19 16,-18-1 0,17 0-16,-17 0 15,18-17-15,-18 17 16,18-17-16</inkml:trace>
   <inkml:trace contextRef="#ctx0" brushRef="#br0" timeOffset="213810.7163">20796 17233 0,'0'18'15,"18"-18"1,0 0-16,17-18 15,0 18-15,36-17 16,-36 17-16,-17-18 16,17 18-16,-18 0 0,1 0 15,0 0-15,-1-18 16,1 18-16,-36 0 16</inkml:trace>
@@ -4172,10 +4172,10 @@
   <inkml:trace contextRef="#ctx0" brushRef="#br0" timeOffset="18223.1204">15681 3281 0,'18'0'16,"-1"0"0,19-18-16,-1 18 15,-18 0-15,1 0 0,17 0 16,-17 0-1</inkml:trace>
   <inkml:trace contextRef="#ctx0" brushRef="#br0" timeOffset="18489.1374">15752 3087 0,'0'35'0,"0"-17"16,0-1-16,0 54 15,0-36-15,0 0 16,17 1-16,-17-19 0,18 19 16,-1-19-16,1 1 0,35 17 15,-35-17-15,17-18 16,-17 0-16,-1 0 0,18-18 15,1 18-15,-19-17 16,1 17 0</inkml:trace>
   <inkml:trace contextRef="#ctx0" brushRef="#br0" timeOffset="19741.5483">5856 5909 0,'-18'-18'15,"18"1"1,-17-36-16,-1 18 16,1-54-16,-1 19 15,0-71-15,1 35 16,-1 18-16,0-1 15,-17-105-15,35 106 0,0 18 16,18 17 0,17 0-16,-17 18 0,17 17 15,0 18-15,-17 0 0,35 18 16,-36 17-16,19 35 16,-36-34-16,0-1 0,0 18 15,0-35 1,0 17-16,0-18 15,17 1 1,1 17 0,17-17-16,1 35 15,-36-35 1,17 34-16,-17-34 16,-35 17-16,17-17 15,-17 17-15,17-35 16,-17 0-1,17 0-15,1 0 16,17-17-16,0-1 16</inkml:trace>
-  <inkml:trace contextRef="#ctx0" brushRef="#br0" timeOffset="20114.7191">6385 4974 0,'18'0'16,"0"0"-1,34 0 1,-34 0-16,17 0 0,-17 0 15,17 0-15,-17 18 16</inkml:trace>
+  <inkml:trace contextRef="#ctx0" brushRef="#br0" timeOffset="20114.719">6385 4974 0,'18'0'16,"0"0"-1,34 0 1,-34 0-16,17 0 0,-17 0 15,17 0-15,-17 18 16</inkml:trace>
   <inkml:trace contextRef="#ctx0" brushRef="#br0" timeOffset="20251.0453">6456 5186 0,'53'0'15,"-106"0"-15,123 0 0,-17-18 16,-35 18-16,17 0 16,-17 0-16</inkml:trace>
   <inkml:trace contextRef="#ctx0" brushRef="#br0" timeOffset="21427.2104">7320 4921 0,'0'0'16,"-35"0"-16,17 0 0,1 18 15,-19 0-15,19-1 16,-1 54-16,18-36 16,0 18-16,18-18 15,-1 18-15,1-18 0,53 18 16,-36-17-16,0-36 16,0 0-16,54 0 15,-54-18-15,-18-17 0,19-18 16,-19 17-16,-17-34 15,-17 35-15,-36-36 16,18 53 0,-36-17-16,36 18 15,-18-1-15,35 18 16,1 18-16,17-1 16,17 1-16,1-18 0</inkml:trace>
-  <inkml:trace contextRef="#ctx0" brushRef="#br0" timeOffset="21583.1113">7832 5186 0,'17'0'16,"1"0"15,-18-18-16</inkml:trace>
+  <inkml:trace contextRef="#ctx0" brushRef="#br0" timeOffset="21583.1112">7832 5186 0,'17'0'16,"1"0"15,-18-18-16</inkml:trace>
   <inkml:trace contextRef="#ctx0" brushRef="#br0" timeOffset="22026.0501">8273 4939 0,'0'0'15,"0"-53"-15,0 35 0,0 1 16,-53-1-16,35 18 16,-35 18-1,18-1-15,17 1 0,-17 53 16,35-36-16,0 18 16,18-18-16,35 0 15,-36-17-15,54 0 16,-36-18-16,18-18 15,-35 0 1,-1-17-16,-17 17 16,0 1-16,0-19 0,0 19 15,0-36-15,-17 35 16,17-17 0,-18 35-16,18 35 31,0 36-31,18-36 15,-1 71-15,-17-53 16,35 35 0,-17-53-16,0 1 0,-1 17 15,1-36-15,-18 18 16</inkml:trace>
   <inkml:trace contextRef="#ctx0" brushRef="#br0" timeOffset="28349.2046">24218 4004 0,'0'-53'16,"0"35"-1,0 36-15,18 17 16,17 54 0,-17-19-16,17 1 0,18 87 15,-18-87-15,18 52 16,-35-70-16,17 0 15,-17-53-15,-1 18 16,1-36-16,-18 1 16,18-19-16,-18 1 15,0-18-15,0 0 0,0-70 16,0 52-16,0 18 16,0 0-16,-18 1 0,18-19 15,0 53 1,0 36-1,18 35-15,-1-18 16</inkml:trace>
   <inkml:trace contextRef="#ctx0" brushRef="#br0" timeOffset="28517.9307">24747 4533 0,'0'0'0,"18"0"0,17 0 15,-17 0-15,35 0 16,-36-17-16,19-19 16,-19 36-16,1-35 15</inkml:trace>
@@ -4194,12 +4194,12 @@
   <inkml:trace contextRef="#ctx0" brushRef="#br0" timeOffset="34028.0666">25347 5838 0,'-18'-52'16,"36"104"-16,-53-122 0,0 52 15,17 18-15,0 18 0,-17 35 16,17 0-16,1 0 16,-1 53-16,18-54 15,35 37-15,-17-72 16,53 19 0,-36-36-16,-18-18 0,54-17 15,-53-54 1,-1 54-16,-17-53 15,0 53-15,0-1 16,-17-17-16,-1 53 16,18-17-16,0 34 15,0 1 1,0 0-16,18 17 16,-18-17-16,35 17 15,-17-35-15,-1 0 16,1 0-16,-1-18 15,-17 1-15,0-1 0,18 0 16,-18 1-16,0-1 16,0 36-1,35 17 1,-17 0-16,0 1 16,-1-1-16,36 0 15,-35-17-15,17-1 16,-17-17-16,-18-17 15,17-1-15,-17-35 16,0 18 0,0-18-16,0 18 15,0-1-15,18 19 0,0-36 16</inkml:trace>
   <inkml:trace contextRef="#ctx0" brushRef="#br0" timeOffset="34512.3304">25876 6068 0,'18'0'16,"0"0"0,-1 0-16,18 0 15,-17-18-15,35-35 16,-53 36-16,18-1 0,-18-17 15,-18 17-15,0 0 16,1 18-16,-1 0 16,-17 18-1,17-18-15,18 53 16,0-35-16,18 17 16,-1-17-16,36-1 15,-17-17-15,-19 18 0,36-18 16,-35-18-1,-1 18 1,-17-17-16,18-19 16,-18 19-16,0-1 15,18 18-15,-18 18 32,0-1-32,17-17 15,1 18-15,0 0 16,-1-18-16,1 0 15,0 0 1,-1-18 0</inkml:trace>
   <inkml:trace contextRef="#ctx0" brushRef="#br0" timeOffset="34573.168">26317 6050 0,'18'0'16</inkml:trace>
-  <inkml:trace contextRef="#ctx0" brushRef="#br0" timeOffset="35629.6314">26441 5962 0,'0'-18'16,"-18"18"-1,0 0-15,1 18 16,-18 0-16,35-1 16,-18 1-16,18 0 15,0 17-15,0-18 16,18 1-16,-1 0 0,18-18 15,1 0-15,17-18 16,-53 0-16,17 18 16,-17-52-16,0 34 15,0 0-15,-17 1 16,-1-1 0,0 18-16,18 18 15,18-1 1,0 1-1,17 0-15,-17-18 0,17 0 16,-18 0-16,36 0 16,-35 0-16,-18-18 15,0 0 1,-18 18-16,18 18 16,18 17-1,-18-17-15,18 17 0,-1 0 16,-17 1-16,18 34 15,-18-17-15,0-18 0,0-17 16,0 17-16,0 1 16,-18-36-1,1 0-15,-1 0 16,-17-36-16,17 1 16,0-18-16,18 18 15,18-36-15,0 54 16,17-36-16,18 17 15,0 19 1,-18-1-16,-17 1 16,-18-1 15,-18 18-31,0 0 16,36 0 15,0 0-31,-1 18 15,36-1-15,-35-17 16,35 0-16,-35 0 16,17 0-1</inkml:trace>
+  <inkml:trace contextRef="#ctx0" brushRef="#br0" timeOffset="35629.6313">26441 5962 0,'0'-18'16,"-18"18"-1,0 0-15,1 18 16,-18 0-16,35-1 16,-18 1-16,18 0 15,0 17-15,0-18 16,18 1-16,-1 0 0,18-18 15,1 0-15,17-18 16,-53 0-16,17 18 16,-17-52-16,0 34 15,0 0-15,-17 1 16,-1-1 0,0 18-16,18 18 15,18-1 1,0 1-1,17 0-15,-17-18 0,17 0 16,-18 0-16,36 0 16,-35 0-16,-18-18 15,0 0 1,-18 18-16,18 18 16,18 17-1,-18-17-15,18 17 0,-1 0 16,-17 1-16,18 34 15,-18-17-15,0-18 0,0-17 16,0 17-16,0 1 16,-18-36-1,1 0-15,-1 0 16,-17-36-16,17 1 16,0-18-16,18 18 15,18-36-15,0 54 16,17-36-16,18 17 15,0 19 1,-18-1-16,-17 1 16,-18-1 15,-18 18-31,0 0 16,36 0 15,0 0-31,-1 18 15,36-1-15,-35-17 16,35 0-16,-35 0 16,17 0-1</inkml:trace>
   <inkml:trace contextRef="#ctx0" brushRef="#br0" timeOffset="35957.0243">27764 5891 0,'0'0'0,"-36"0"0,19 0 0,-36 18 16,35 0-16,18-1 15,0 19-15,18-19 0,-1 1 16,36 17-16,-35-35 16,35 18-1,-35-18-15,17-18 16,-35-17-16,0 17 16,-18-17-16,18 17 15,-35-35-15,17 53 16,1-17-16</inkml:trace>
   <inkml:trace contextRef="#ctx0" brushRef="#br0" timeOffset="36240.0115">27975 6068 0,'0'17'0,"0"-34"0,0 17 31,18-35-15,-18 17-16,0 0 0,18 1 16,-18-1-16,17-17 15,-17 17 1,18 18 0,-1 18-16,1-1 15,-18 1-15,18 17 16,-18-17-16,17 17 15,-17-17-15,18-18 16,-18 17 0</inkml:trace>
   <inkml:trace contextRef="#ctx0" brushRef="#br0" timeOffset="36774.3612">27922 5768 0,'0'-18'16,"0"36"-16,0-18 15,18 35 1,-18-17-16,18 17 16,-1 0-16,19 36 15,-19-36-15,-17-17 0,18 17 16,-1-17-16,1-1 0,0 1 16,-1-18-1,-17-18-15,0 1 0,18-18 16,-18-1-1,0-17-15,0 18 16,0 17-16,0-17 16,0 17-16,0 1 15</inkml:trace>
   <inkml:trace contextRef="#ctx0" brushRef="#br0" timeOffset="37153.3935">28222 6085 0,'36'0'15,"-72"0"-15,89 0 16,-35-17-16,-1-1 0,1 1 16,17-19-16,-35 19 15,0-19 1,-17 19-16,-1-19 15,0 36-15,1 0 16,17 18 0,0 0-16,0-1 0,0 1 0,17 0 15,-17 35-15,18-36 16,0 18 0,-1-17-16,1-18 0,0 0 15,-1 0-15,1 0 0,17-53 16,-17 36-16,17-36 15,0 35 1,-17 0-16,0 1 0,-1 17 16,19-18-16,-19 18 15,-17 18 1,0-1-16</inkml:trace>
-  <inkml:trace contextRef="#ctx0" brushRef="#br0" timeOffset="37870.2656">25982 7497 0,'0'0'0,"0"-18"15,35-17-15,-17 17 16,53-53-16,-36 19 16,18-19-1,-18 36-15,-17-1 0,-1 19 16,1-1-16,-18 36 15,0 35 1,0-18-16,18 36 16,-18-54-16,35 36 15,0-53-15,0 0 16,1 0 0,-1-35-16,-17 0 15,-1 17-15,1-17 0,0-36 16,-18 53-16,0-17 15,0 53 1,-36 35 0</inkml:trace>
+  <inkml:trace contextRef="#ctx0" brushRef="#br0" timeOffset="37870.2655">25982 7497 0,'0'0'0,"0"-18"15,35-17-15,-17 17 16,53-53-16,-36 19 16,18-19-1,-18 36-15,-17-1 0,-1 19 16,1-1-16,-18 36 15,0 35 1,0-18-16,18 36 16,-18-54-16,35 36 15,0-53-15,0 0 16,1 0 0,-1-35-16,-17 0 15,-1 17-15,1-17 0,0-36 16,-18 53-16,0-17 15,0 53 1,-36 35 0</inkml:trace>
   <inkml:trace contextRef="#ctx0" brushRef="#br0" timeOffset="38199.0262">26194 7814 0,'0'-18'16,"17"-17"-1,1 17-15,17-52 16,-17 35-16,35-36 16,-35 53-16,-1-17 0,1 35 15,-18-17-15,17 17 16,-17 17-16,0 1 0,-17 35 15,17-36-15,17 19 16,1-19 0,0-17-16,-1 18 0,19-36 15,-1 18-15,-17-17 16,34-19 0,-34 19-16,17-19 15,-17 19-15,17-1 16,-17 18-16</inkml:trace>
   <inkml:trace contextRef="#ctx0" brushRef="#br0" timeOffset="38432.6429">27411 6720 0,'0'0'0,"0"-17"0,17 17 16,-17 17-16,0 1 0,0 53 15,0-18-15,18 52 16,0-69 0,-18 17-16,0-1 0,17 1 15,-17-17-15</inkml:trace>
   <inkml:trace contextRef="#ctx0" brushRef="#br0" timeOffset="38661.8764">27093 7320 0,'36'0'0,"-1"0"15,18 0-15,17 0 16,19 0-16,-1 0 0,0 0 0,18 0 15,141-17 1,-124-1-16,1 18 0,105-35 16,-88 17-1,-106 18-15,-17 0 16,-36 18-16</inkml:trace>
@@ -4218,7 +4218,7 @@
   <inkml:trace contextRef="#ctx0" brushRef="#br0" timeOffset="45233.1148">29439 8925 0,'0'0'0,"0"36"0,0-19 16,0 18-16,18-17 16,0 0-16,-1-18 15,1 17-15,0-17 16,-18-17-16,17-1 15,-17 0 1,18 1-16,-18-1 16,0 1-16,17 17 31,-17 17-15,18 1-16,-18-1 15,0 1-15,0 0 16,18-36 15,-18 0-31,17 1 16,-17-1-1,18 1-15,-18-1 16,18 18-16,-1 18 16,1-18-1,17 17 1,-17-17-16,-1 0 15,36-17-15,-17-1 16,-19 18-16,-17-18 0,18 1 16,-18-1-16,-18 18 15,1 0-15,-19 0 16,19 18 0,17 35-16,0-36 15,0 18-15,35 1 16,0-19-16,-17 1 0,35 0 15,-36-18-15,19 0 16</inkml:trace>
   <inkml:trace contextRef="#ctx0" brushRef="#br0" timeOffset="45359.8932">30392 8996 0,'0'0'16,"17"-18"-16,-17 1 15,-17-1-15,-1 18 16</inkml:trace>
   <inkml:trace contextRef="#ctx0" brushRef="#br0" timeOffset="48993.619">10231 4745 0,'17'0'16,"-17"18"-16,18-18 16</inkml:trace>
-  <inkml:trace contextRef="#ctx0" brushRef="#br0" timeOffset="49115.6207">10283 5080 0,'18'35'16,"-36"-70"-16,36 88 0</inkml:trace>
+  <inkml:trace contextRef="#ctx0" brushRef="#br0" timeOffset="49115.6206">10283 5080 0,'18'35'16,"-36"-70"-16,36 88 0</inkml:trace>
   <inkml:trace contextRef="#ctx0" brushRef="#br0" timeOffset="50033.6899">11536 4974 0,'-18'0'0,"36"0"0,-18-17 31,17-36-31,19 0 16,17-18-1,-36 36-15,19 17 0,-36 1 16,17-1-16,1 18 16,0 35-1,-1 18-15,-17-18 16,18 18 0,-18-35-16,17 17 15,1-35-15,-18 18 0,18-18 16,-1 0-16,1 0 15,0-35-15,-1-1 16,1 1-16,-18 0 0,18 0 16,-1-1-1,-17 19-15,0-1 0,18 18 16,-36 18-16</inkml:trace>
   <inkml:trace contextRef="#ctx0" brushRef="#br0" timeOffset="50372.3432">11677 5203 0,'0'-17'32,"0"-1"-32,0 1 0,0-1 15,35-17 1,-35 17-16,18 0 0,17-17 15,-17 35-15,-1 0 16,1 35 0,0 18-1,-1-17-15,1 16 16,0-52-16,17 18 16,0-18-16,0-18 15,-35 1-15,18-18 0,0-1 16,-18-17-1,0 36-15,17-19 16,-17 19-16,18 17 16</inkml:trace>
   <inkml:trace contextRef="#ctx0" brushRef="#br0" timeOffset="50655.786">12506 4639 0,'0'-35'16,"0"70"-16,0-88 0,0 71 15,0 52 1,0-17-1,0 53-15,18 0 16,-18-36-16,35 19 16,-35-54-16,35 35 15,-17-52-15,17 0 16</inkml:trace>
@@ -4253,7 +4253,7 @@
   <inkml:trace contextRef="#ctx0" brushRef="#br0" timeOffset="69352.4019">26811 11959 0,'0'0'16,"18"0"-16,-1-17 16,1 17-16,0 0 15,-1-18-15,19 18 0,-1 0 0,-17-18 16,52 18-16,-52 0 15,-1 0-15,19 18 16</inkml:trace>
   <inkml:trace contextRef="#ctx0" brushRef="#br0" timeOffset="69636.7738">28857 11412 0,'0'0'0,"36"-17"16,-1 17-16,0 0 0,18 0 16,-18 17-1,-17-17-15</inkml:trace>
   <inkml:trace contextRef="#ctx0" brushRef="#br0" timeOffset="69769.3051">28804 11589 0,'18'17'16,"17"-17"-16,-17 0 0,35 0 15,-18-17-15,18 17 0,-18 0 16</inkml:trace>
-  <inkml:trace contextRef="#ctx0" brushRef="#br0" timeOffset="70188.4363">29669 11395 0,'0'0'0,"17"-18"16,54 18-1,-36-18-15,18 18 0,-88 0 31,-36 0-15,18 18-16,-35 0 16,53-18-16,17 17 15,-17 19-15,17-19 0,18 1 16,0 35 0,18-36-16,0 19 0,17-19 15,0 1-15,36 35 16,-54-35-16,19-18 0,-19 17 15,18 1 1,-52-18-16,-36 0 16,18 0-1,-36-18-15,36 1 16,17 17-16,1 0 0,-1 0 16,18 0-16,18 0 15,-1 0 1</inkml:trace>
+  <inkml:trace contextRef="#ctx0" brushRef="#br0" timeOffset="70188.4362">29669 11395 0,'0'0'0,"17"-18"16,54 18-1,-36-18-15,18 18 0,-88 0 31,-36 0-15,18 18-16,-35 0 16,53-18-16,17 17 15,-17 19-15,17-19 0,18 1 16,0 35 0,18-36-16,0 19 0,17-19 15,0 1-15,36 35 16,-54-35-16,19-18 0,-19 17 15,18 1 1,-52-18-16,-36 0 16,18 0-1,-36-18-15,36 1 16,17 17-16,1 0 0,-1 0 16,18 0-16,18 0 15,-1 0 1</inkml:trace>
   <inkml:trace contextRef="#ctx0" brushRef="#br0" timeOffset="70474.9981">30074 11553 0,'-35'18'15,"17"0"-15,1 17 16,-1 0-16,18 1 0,18 34 15,17-52-15,0 17 0,1-17 16,34-1 0,-17-17-16,-18 0 0,36-35 15,-18-18 1,-36 36-16,-17-19 16,18 1-16,-36 0 0,1-1 15,-36-52-15,-18 18 16,36 34-16,-18 1 15,-70-18 1</inkml:trace>
   <inkml:trace contextRef="#ctx0" brushRef="#br0" timeOffset="71872.4781">11748 6350 0,'-18'0'16,"18"-18"15,18-35-15,-1 36-16,18-18 15,-35 17-15,18-17 16,-18 17-16,18 18 15,-18 18 1,0 35 0,0-18-16,17-18 15,1 1-15,-18 0 0,53-1 16,-35-17-16,17 0 16,-18 0-16,1-17 15,-18-19-15,18 19 0,-18-1 16,17-17-1,-17 17-15,0 1 0,0-1 16,-17 53 0</inkml:trace>
   <inkml:trace contextRef="#ctx0" brushRef="#br0" timeOffset="72205.7524">11765 6668 0,'0'-18'16,"18"18"-16,-18-18 15,35-35 1,-17 18-16,17 0 16,-17 17-16,-1 18 0,-17-18 15,18 18-15,0 0 16,-18 36-1,0-19-15,17 19 16,1-19 0,-1-17-1,1 0-15,0 0 0,-1 0 16,-17-17-16,36-19 16,-36 19-16,0-1 15,17 0-15,-17 1 16,18 17-16</inkml:trace>
@@ -4272,18 +4272,18 @@
   <inkml:trace contextRef="#ctx0" brushRef="#br0" timeOffset="155306.4979">6438 8132 0,'0'0'16,"18"0"-16,-1 0 0,36 0 15,0-18-15,18 18 16,-53 0-16,34 18 16,-34-18-16</inkml:trace>
   <inkml:trace contextRef="#ctx0" brushRef="#br0" timeOffset="155428.2439">6579 8378 0,'36'0'16,"-72"0"-16,160 18 16,-89-18-16,18-18 15</inkml:trace>
   <inkml:trace contextRef="#ctx0" brushRef="#br0" timeOffset="158560.3693">7567 8079 0,'0'0'0,"0"-18"0,0-17 16,0 17-16,0-35 15,-18 36-15,18-1 16,-17 18-16,-1-18 0,-17 18 15,0 18 1,17 17-16,0 0 0,1 18 16,-1 0-16,18 53 15,0-53-15,53 18 16,-18-36-16,1-18 0,52 19 16,-35-36-16,35-18 15,-35-17 1,17-18-16,-34 18 15,-19-36-15,-34 18 16,-1 18-16,-35-36 16,0 54-16,-35-1 15,53 18-15,-36 18 16,53-18-16,18 35 16,0-17-16,36-1 15,-1 1-15</inkml:trace>
-  <inkml:trace contextRef="#ctx0" brushRef="#br0" timeOffset="158703.9212">8149 8149 0,'18'0'47</inkml:trace>
+  <inkml:trace contextRef="#ctx0" brushRef="#br0" timeOffset="158703.9211">8149 8149 0,'18'0'47</inkml:trace>
   <inkml:trace contextRef="#ctx0" brushRef="#br0" timeOffset="159105.4192">8449 7902 0,'35'-17'15,"-70"34"-15,88-34 0,-18-1 16,-17 0-16,0 18 16,-1-17-16,-34 17 15,-19 17 1,1 1 0,0 17-16,-36 18 15,53-18-15,1-17 0,-1 17 16,18 18-16,18-35 15,52 35-15,-34-36 16,52 19-16,-35-19 16,-18 1-16,0-18 0,18 18 15,-53-1 1,0 1-16,0 0 0,-17-18 16,-19 17-16,-34 18 15,17-35-15,18 18 16,-1-18-16,-34 18 15,34-18-15,19 0 0,-18 17 16</inkml:trace>
   <inkml:trace contextRef="#ctx0" brushRef="#br0" timeOffset="160105.4279">10460 7938 0,'18'0'0,"-1"0"15,-17 17-15,18-17 16</inkml:trace>
   <inkml:trace contextRef="#ctx0" brushRef="#br0" timeOffset="160240.5358">10495 8273 0,'0'0'0,"18"0"0,-18 17 15,17-17 1</inkml:trace>
   <inkml:trace contextRef="#ctx0" brushRef="#br0" timeOffset="162919.5601">24024 7497 0,'0'0'16,"18"0"-1,52 0-15,1-18 16,70 18-16,-53 0 16,71-18-1,-88 18-15,34 0 16,-52 0-16,-17-17 0,-19 17 16,1-18-16</inkml:trace>
   <inkml:trace contextRef="#ctx0" brushRef="#br0" timeOffset="163136.1372">24677 7285 0,'17'0'16,"19"0"-16,-19 0 0,36 0 15,-17 0-15,34 18 16,-17-18-16,18 0 0,-1 17 16,-17 1-16,18 17 15,-71 0-15,-18 36 16,0-53-16,-52 52 15,17-52-15,-35 17 16,52-17-16,-34-1 16,52 1-16,1-18 15,-1 0-15</inkml:trace>
-  <inkml:trace contextRef="#ctx0" brushRef="#br0" timeOffset="164421.859">11448 8061 0,'17'0'0,"-17"-18"15,18 1-15,17-19 16,-35 19-16,35-36 16,-17 35-16,0 1 15,-1-1-15,-17 0 0,18 18 16,-18 18 0,0 35-1,0-35-15,18 17 16,-18-18-16,35-17 15,-17 0-15,-1 0 0,19-17 16,-19-1 0,1 1-16,17-36 15,-17 17 1</inkml:trace>
-  <inkml:trace contextRef="#ctx0" brushRef="#br0" timeOffset="164783.3846">11589 8255 0,'0'0'15,"0"-18"-15,0 1 16,35-19-1,-17 19-15,-1-18 16,1 17 0,0 36-1,-18-1-15,17-17 16,-17 18-16,36-1 16,-19 1-16,1-18 15,-1 0 1,1 0-16,0 0 0,-18-18 15,17 1 1,1-18 0,-18-1-1,18 36 1,-1-17-16</inkml:trace>
+  <inkml:trace contextRef="#ctx0" brushRef="#br0" timeOffset="164421.8589">11448 8061 0,'17'0'0,"-17"-18"15,18 1-15,17-19 16,-35 19-16,35-36 16,-17 35-16,0 1 15,-1-1-15,-17 0 0,18 18 16,-18 18 0,0 35-1,0-35-15,18 17 16,-18-18-16,35-17 15,-17 0-15,-1 0 0,19-17 16,-19-1 0,1 1-16,17-36 15,-17 17 1</inkml:trace>
+  <inkml:trace contextRef="#ctx0" brushRef="#br0" timeOffset="164783.3845">11589 8255 0,'0'0'15,"0"-18"-15,0 1 16,35-19-1,-17 19-15,-1-18 16,1 17 0,0 36-1,-18-1-15,17-17 16,-17 18-16,36-1 16,-19 1-16,1-18 15,-1 0 1,1 0-16,0 0 0,-18-18 15,17 1 1,1-18 0,-18-1-1,18 36 1,-1-17-16</inkml:trace>
   <inkml:trace contextRef="#ctx0" brushRef="#br0" timeOffset="165193.8383">12488 7673 0,'0'0'15,"18"0"1,35 0 0,-18 0-16,0 0 0,1 18 0,-1-1 15,0 36-15,-17-35 16,-18 17-16,0 0 0,-35 54 15,-1-54 1,-17 18-16,36-36 16,17 19-16,17-1 15,19-35-15,-1 18 16,53-18 0,-35 0-16,-18 17 0,36-17 15,-36 18-15</inkml:trace>
   <inkml:trace contextRef="#ctx0" brushRef="#br0" timeOffset="165984.9146">13970 8008 0,'-18'-35'16,"36"70"-16,-36-88 0,-17 36 16,17 17-16,1 0 15,-36 0-15,35 35 16,-17 18-16,17-36 15,18 36-15,0-17 16,0-1-16,18-18 16,35-17-1,-35 0-15,34 0 16,-34-17-16,17-18 16,-17 17-16,0-53 15,-1 54-15,-17-71 16,-17 35-16,-1-53 15,0 35-15,-17-17 16,35 70-16,-18-17 16,18 53-1,0 52 1,0-17-16,18 0 0,0 18 16,35 35-1,-18-71-15,-17 18 0,17-18 16,0-17-16,18 17 0,-18-17 15,36 17 1,-36-35-16,-17 0 16</inkml:trace>
   <inkml:trace contextRef="#ctx0" brushRef="#br0" timeOffset="166846.116">14323 7938 0,'0'0'0,"-18"0"0,1 17 15,-1 1-15,18-1 0,0 19 16,0-19-16,0 19 0,18-1 16,-1-17-16,18-1 15,1 1-15,-19-18 16,1 0 0,-18-35-16,18 17 15,-18 0-15,-18-17 16,18 0-16,-18-1 15,18 19-15,-17 17 0,17 17 32,17 36-17,-17-17-15,36 17 16,-19-36-16,19 18 16,-19-17-16,1 0 15,-1-1-15,1-17 0,17 18 16,-17-18-1,-18-35-15,18 17 16,-18-17-16,-18-18 16,18 35-16,-18 1 15,18 34 17,36 19-17,-1-19-15,-17 1 16,17-1-16,-18-17 15,19 0 1,-36-17-16,17-1 0,-17 1 16,0-36-16,-17 35 15,-1-17-15,18 17 16,-18 18-16,18 18 16,36 35-1,-19-18-15,36 35 16,-17-34-16,-1 34 15,-17-34-15,17 34 16,-35-52-16,-18 35 16,18-36-16,-17-17 15,-1 0-15,-17-35 16,35 17 0,-18-52-16,0 35 15,18-54-15,18 36 16,17-17-1,1 17-15,-19 35 16,18 1-16,1 17 16,-1 17-16,0 19 15,-17-1-15,-18 0 16,0 0-16,0-17 16,0 0-16,-53-18 15,35 0-15,-35 0 16,18-18-16,-18-17 15,36 17-15</inkml:trace>
-  <inkml:trace contextRef="#ctx0" brushRef="#br0" timeOffset="215312.8545">16951 3087 0,'-18'0'16,"36"0"31,17 0-31,1 0-16,-1 0 15,53 0-15,-17 0 16,70 0-16,17 0 15,-87 0 1,0 0-16,52 17 16,-70-17-16,35 0 15,-53 0-15,1 0 16,-36-17 0,-18-1-16,-17 1 15,-1-1-15</inkml:trace>
+  <inkml:trace contextRef="#ctx0" brushRef="#br0" timeOffset="215312.8544">16951 3087 0,'-18'0'16,"36"0"31,17 0-31,1 0-16,-1 0 15,53 0-15,-17 0 16,70 0-16,17 0 15,-87 0 1,0 0-16,52 17 16,-70-17-16,35 0 15,-53 0-15,1 0 16,-36-17 0,-18-1-16,-17 1 15,-1-1-15</inkml:trace>
   <inkml:trace contextRef="#ctx0" brushRef="#br0" timeOffset="215873.5997">17427 2734 0,'18'0'16,"-36"0"-16,1 18 16,-1-1-16,-17 1 15,-18 0-15,17-1 16,-52 19-16,35-19 15,-52 18 1,69-17-16,-52 0 16,70-1-16,-17-17 15,35 18-15,-17-18 0,17 18 0,17-1 16,1 1-16,-1 17 16,36 18-1,0-35-15,-17 17 0,-1-17 16,18 17-16,17 0 15,-34 0-15,-1-17 0,-18-18 16,1 18-16,0 17 16,-18-17-16</inkml:trace>
   <inkml:trace contextRef="#ctx0" brushRef="#br0" timeOffset="221963.6838">18062 529 0,'0'-17'0,"0"34"0,18-52 16,-18 17-16,0 1 15,0-1 1,18 18 0,-18 18-1,0 35-15,0-1 16,0-16-16,0 17 0,0 17 16,0-35-16,0 18 15,0-35 1,0 0-16,17-1 15,1 1-15,-1-18 16,1 0-16,17 0 0,71 0 16,-53 0-1,88-18-15,-88 1 0,53-1 16,-53 18 0,-18 0-16,0-18 0,-17 18 15,0 0-15,-36-17 16,0 17-1</inkml:trace>
   <inkml:trace contextRef="#ctx0" brushRef="#br0" timeOffset="222522.8281">18591 282 0,'0'18'15,"0"35"1,0-18-16,-17 0 15,17-17-15,-18 17 16,0-35-16,18 18 16,-17-36-16,17-35 15,17 36-15,1-54 16,0 36-16,-1 17 16,-17 1-16,36 17 15,-19 0-15,1 17 16,-18 19-16,18-1 0,-18 0 15,0 18-15,17-35 16,-17 17-16,0-17 0,0-1 16,0-34-1,36-36 1,-36 17-16,17 1 16,1 17-16,-1-17 15,1 35-15,-18-17 0,35 17 16,-35 17-16,18 36 15,-18-18-15,0 18 16,0-17-16,18 16 16,-1-34-16,1 0 15,0-18-15</inkml:trace>
@@ -4335,7 +4335,7 @@
   <inkml:trace contextRef="#ctx0" brushRef="#br0" timeOffset="8708.6633">22983 3157 0,'0'18'16,"18"17"-16,-18-17 15,18 35-15,-1-36 16,-17 19-16,18-19 16,-18 1-16,18 35 15,-18-35-15,0-1 16,-18 1-16,0-18 0,-17 18 15,17-18-15,1 0 16,-1-18-16,1-17 16,17 17-16,17-17 15,18 17-15,18-35 16,-17 35-16,-19-17 16,36-18-16,0 0 15,-35 36-15,-18-19 16,0 1-1,-53 0-15,35 35 16,-17-18-16,0 18 0,-36 18 16,36 0-16,17-18 15,1 17-15</inkml:trace>
   <inkml:trace contextRef="#ctx0" brushRef="#br0" timeOffset="11867.3318">26158 2858 0,'-35'-18'16,"18"18"-16,-1 18 16,-17-1-16,-1 18 15,-17 71-15,36-53 16,17 53-16,17-71 16,36 36-1,-17-54-15,34 1 0,-35-18 16,36-35-1,-53 17-15,17-17 0,-17 0 16,-1-1-16,-17-52 16,0 53-16,-35-18 15,0 35-15,17 1 0,-35-1 16,35 18-16,-17 35 16,53 18-1</inkml:trace>
   <inkml:trace contextRef="#ctx0" brushRef="#br0" timeOffset="12034.62">26793 3193 0,'-17'-18'15,"17"0"-15,0 1 31,17-1-31,-17 0 16</inkml:trace>
-  <inkml:trace contextRef="#ctx0" brushRef="#br0" timeOffset="12423.3664">26988 2893 0,'35'-18'16,"-18"1"-16,19 17 0,-1-18 16,36 0-1,-36 1-15,0-1 16,-17 18-16,-36 0 16,0 18-16,-34-1 15,16 19-15,-34-1 16,34-18-16,19 1 15,17 0-15,0 35 16,17-36-16,19 19 16,-19-19-16,19 18 0,34 18 15,-35-35-15,1 17 16,-19-17 0,1 17-16,-53-17 15,17-18-15,-52 0 16,34 0-16,1 0 15,0 0-15,-1 0 16,-16 0-16,16 0 16</inkml:trace>
+  <inkml:trace contextRef="#ctx0" brushRef="#br0" timeOffset="12423.3663">26988 2893 0,'35'-18'16,"-18"1"-16,19 17 0,-1-18 16,36 0-1,-36 1-15,0-1 16,-17 18-16,-36 0 16,0 18-16,-34-1 15,16 19-15,-34-1 16,34-18-16,19 1 15,17 0-15,0 35 16,17-36-16,19 19 16,-19-19-16,19 18 0,34 18 15,-35-35-15,1 17 16,-19-17 0,1 17-16,-53-17 15,17-18-15,-52 0 16,34 0-16,1 0 15,0 0-15,-1 0 16,-16 0-16,16 0 16</inkml:trace>
 </inkml:ink>
 </file>
 
@@ -4404,9 +4404,9 @@
   <inkml:trace contextRef="#ctx0" brushRef="#br1" timeOffset="40681.8784">15081 11924 0,'18'-18'31,"0"18"-15,-1 0-16</inkml:trace>
   <inkml:trace contextRef="#ctx0" brushRef="#br1" timeOffset="41020.4179">15434 11677 0,'0'0'16,"0"18"-1,0 35 1,0-1-1,18-16-15,-18 17 0,0 70 16,0-70-16,17 35 16,-17-53-16,18 1 15,0-1-15,-1-35 16,-17-18-16</inkml:trace>
   <inkml:trace contextRef="#ctx0" brushRef="#br1" timeOffset="41832.0478">16228 11712 0,'0'0'0,"-18"-17"16,-17-1-16,0 0 15,-1 18-15,19 18 16,-19 0-16,19-1 0,-19 36 16,36 0-1,0-18-15,0 71 16,18-71-16,17 54 15,-17-54-15,17 0 0,18-17 16,35-1-16,-35-17 16,36-17-1,-54-1-15,18 1 0,-18-36 16,-17 17-16,-18 1 16,0 0-16,-36-36 15,1 36-15,0 0 16,0-1-16,-18 19 0,17-18 15,-17 17-15,-35 0 16,53 18-16,0 0 16,17 18-16,0 0 0,1 34 15,17-34-15,53 35 16,0-35-16,-18-1 16,0 1-16,0 0 0,1-18 15,-1 17-15,0-17 0,18 0 16,-35 0-16,17 0 15</inkml:trace>
-  <inkml:trace contextRef="#ctx0" brushRef="#br1" timeOffset="42687.7618">16775 12118 0,'17'0'16,"-17"-18"0,18 1-1,0-1-15,-18 0 16,-18 18 0,0 0-16,-35 0 15,36 18-15,-19 0 16,1-1-1,17 19-15,1-1 16,17-18-16,35 19 16,-17-36-16,-1 17 15,19-17-15,-1 0 0,18-17 16,-35 17-16,17-36 16,-18 36-16,-17-35 15,0 18-15,-17-1 16,-1 0-1,1 18 1,-1 18-16,18 17 16,18 0-16,-18-17 15,17 17-15,1 18 16,-1-35-16,-17 17 16,18-17-16,-18 35 0,18-36 15,-18 1-15,0 0 16</inkml:trace>
+  <inkml:trace contextRef="#ctx0" brushRef="#br1" timeOffset="42687.7617">16775 12118 0,'17'0'16,"-17"-18"0,18 1-1,0-1-15,-18 0 16,-18 18 0,0 0-16,-35 0 15,36 18-15,-19 0 16,1-1-1,17 19-15,1-1 16,17-18-16,35 19 16,-17-36-16,-1 17 15,19-17-15,-1 0 0,18-17 16,-35 17-16,17-36 16,-18 36-16,-17-35 15,0 18-15,-17-1 16,-1 0-1,1 18 1,-1 18-16,18 17 16,18 0-16,-18-17 15,17 17-15,1 18 16,-1-35-16,-17 17 16,18-17-16,-18 35 0,18-36 15,-18 1-15,0 0 16</inkml:trace>
   <inkml:trace contextRef="#ctx0" brushRef="#br1" timeOffset="43062.0438">17163 12136 0,'35'-53'0,"-70"106"0,88-124 16,-53 53-16,-18 1 15,0 17-15,-17 35 16,17 0-16,1-17 16,-19 52-16,36-34 15,0-1-15,0-17 16,18-1-16,0 1 0,-1-18 0,1 0 16,0 0-16,35-18 15,-36 1-15,1-19 16,-1 1-16,-17 17 15,0 1-15,0-1 0,0 1 16,-17 17 0,17 52-1,0-34-15,17 53 16,-17-54-16,18 36 16,0-17-16,-1-1 15,1-35-15,-18 17 16</inkml:trace>
-  <inkml:trace contextRef="#ctx0" brushRef="#br1" timeOffset="43685.1936">14376 11359 0,'-36'18'0,"36"0"16,-17-1-16,-18 36 15,17-17-15,0 16 0,1-16 16,17 70 0,0-1-16,17-52 15,1 0-15,0-17 0,-1 16 16,18 1-16,1-17 16,-1-1-16,-17-17 15,-1-1 1</inkml:trace>
+  <inkml:trace contextRef="#ctx0" brushRef="#br1" timeOffset="43685.1935">14376 11359 0,'-36'18'0,"36"0"16,-17-1-16,-18 36 15,17-17-15,0 16 0,1-16 16,17 70 0,0-1-16,17-52 15,1 0-15,0-17 0,-1 16 16,18 1-16,1-17 16,-1-1-16,-17-17 15,-1-1 1</inkml:trace>
   <inkml:trace contextRef="#ctx0" brushRef="#br1" timeOffset="44757.5702">4710 7620 0,'17'0'15,"36"0"1,0 0-16,0 0 16,18 18-16,87-1 15,-70-17-15,1 18 0,105 0 16,-88-18-16,-1 17 15,89-17-15,-105 0 16,-19 0-16,1 0 16,-36 0-16,0 0 0,1 0 15,-19 18-15,-34-1 16</inkml:trace>
   <inkml:trace contextRef="#ctx0" brushRef="#br1" timeOffset="45397.0758">8678 7691 0,'0'0'16,"-17"-18"-16,17 0 0,-18 18 0,0-17 15,-17-1 1,18 18-16,-19 0 16,19-18-16,-1 18 15,36 0 1,17 18 0,0-18-16,18 18 0,71-1 15,-54 1-15,106 0 16,-87-1-16,17-17 15,88 0-15,-89 0 16,72 0-16,-124-17 16,35 17-16,-53 17 15,-17 1-15,-18-1 16,-35 1 0</inkml:trace>
   <inkml:trace contextRef="#ctx0" brushRef="#br1" timeOffset="46589.971">18150 11942 0,'18'0'16,"17"17"0,1-17-16,69 0 15,-52-17-15,0 17 16,35-18-16,-52 18 15,17-18-15,-36 18 16</inkml:trace>
@@ -4414,7 +4414,7 @@
   <inkml:trace contextRef="#ctx0" brushRef="#br1" timeOffset="47422.581">19121 11765 0,'0'0'0,"-18"0"31,0 18-16,18-1-15,0 19 16,-17-1-16,17 0 0,0 1 16,35 34-1,-17-35-15,34 36 0,-16-53 16,-1-1-16,0 1 0,18-18 16,-17 0-16,-1-18 15,0 1-15,-17-1 0,17-35 16,-35 0-16,-18 18 15,1 0-15,-36-54 16,18 72-16,-1-19 16,1 36-16,-36-17 15,36 17-15,0 17 16,35 1-16,17 0 16,36-1-16,-17 1 15</inkml:trace>
   <inkml:trace contextRef="#ctx0" brushRef="#br1" timeOffset="47565.5228">19685 11977 0,'18'0'47</inkml:trace>
   <inkml:trace contextRef="#ctx0" brushRef="#br1" timeOffset="47994.1072">20055 11800 0,'0'-35'15,"0"70"-15,-17-70 0,-1 18 16,1 17-16,-36 0 16,35 17-16,0 1 0,-17 35 15,17-36-15,18 54 16,18-53-16,0-1 16,35 18-1,-18-35-15,-17 0 0,34 0 16,-34-17-16,0-1 15,-1 1-15,-17-1 0,0 0 16,0-35-16,0 36 16,-17-19-1,17 19-15,0 34 16,0 36 0,0-17-16,17 52 15,-17-35-15,18 35 16,0-53-1,17 36-15,-35-54 16,35 36-16,-35-35 16</inkml:trace>
-  <inkml:trace contextRef="#ctx0" brushRef="#br1" timeOffset="49385.1997">20638 11906 0,'0'18'31,"17"52"-15,-17-34-16,18 52 16,-1-53-16,1 18 15,17 0-15,-17-18 16,17-17-16,-17 0 0,0-18 16,34 0-16,-34-18 15,0-53-15,-18 36 16,17-35-1,-17 17-15,-17 17 0,17-52 16,-18 71-16,18-36 16,0 35-16,0 36 31</inkml:trace>
+  <inkml:trace contextRef="#ctx0" brushRef="#br1" timeOffset="49385.1996">20638 11906 0,'0'18'31,"17"52"-15,-17-34-16,18 52 16,-1-53-16,1 18 15,17 0-15,-17-18 16,17-17-16,-17 0 0,0-18 16,34 0-16,-34-18 15,0-53-15,-18 36 16,17-35-1,-17 17-15,-17 17 0,17-52 16,-18 71-16,18-36 16,0 35-16,0 36 31</inkml:trace>
   <inkml:trace contextRef="#ctx0" brushRef="#br1" timeOffset="49811.522">21220 12065 0,'0'0'0,"0"-18"0,-18 18 16,0 0-1,1 18-15,-1 0 16,0 17-16,18-17 16,0-1-16,0 1 0,18-1 15,0 1-15,-1 0 16,19-18 0,-19 0-16,1-36 15,-18 19-15,18-1 0,-18 1 16,0-1-16,0 0 15,0 36 17,0 35-17,17-36-15,1 36 16,-1-35-16,1 17 16,0-17-16,-18 0 15,17-1-15</inkml:trace>
   <inkml:trace contextRef="#ctx0" brushRef="#br1" timeOffset="50228.877">21484 12083 0,'0'0'16,"-17"-18"-16,-1 18 15,18 18 1,0 17-16,18-17 16,-1-1-16,-17 18 15,18-17-15,-1 0 0,1 35 16,0-36-16,-18 19 16,-18-36-16,0 17 15,1-17 1,-18 0-1,-1 0-15,1-35 16,17 35-16,1-18 16,17 1-16,35-1 15,0 18-15,18-35 16,-18 35-16,18-36 16,-17 19-16,-19-36 15,1 35-15,-36-17 16,1 17-16,-1 18 15,-17-17-15,17 17 16,-17 0-16,17 0 16</inkml:trace>
   <inkml:trace contextRef="#ctx0" brushRef="#br1" timeOffset="50686.4892">21696 11377 0,'0'-35'16,"17"35"0,36 35-1,-17 0 1,52 18-16,-35 0 15,-18 0-15,0 0 16,1 0-16,-1 18 0,18 70 16,-36-71-16,1 71 15,-18-88-15,0 18 16,-18 17-16,1-53 16,-36 18-16,18-35 15,-18 17-15,17-17 16,19-18-16</inkml:trace>
@@ -4423,8 +4423,8 @@
   <inkml:trace contextRef="#ctx0" brushRef="#br2" timeOffset="64432.8424">20549 11624 0,'0'0'16,"-17"0"-16,17 18 15,17 17 1,19-17-16,-1 17 0,159 88 15,-35-34 1,-18-1 0,-53-35-16,53 35 15,-88-53-15,18 0 16,-36 1-16,18-19 16,-36 1-16,19 0 0,-72-36 31</inkml:trace>
   <inkml:trace contextRef="#ctx0" brushRef="#br2" timeOffset="64672.5875">20814 12471 0,'-18'17'0,"36"-34"0,-18 34 16,18-34-1,-1-19-15,54-52 16,35-18 0,-54 36-16,1-1 0,89-52 15,-90 52-15,37-17 16,-72 53-16,36-18 16,-53 35-16,0 1 15</inkml:trace>
   <inkml:trace contextRef="#ctx0" brushRef="#br2" timeOffset="65206.3894">21273 11465 0,'-36'-17'0,"72"34"0,-72-52 16,1-18-16,35 18 16,-18 0-16,18-18 0,0-53 15,0 35 1,-17-70-16,-1 71 16,0-54-16,1 89 15,17-36 1,0 36-16,0 17 0,0-17 15,17 35-15,54-18 16,-36 18 0,53-17-16,-17 17 15,-18-18-15,17 18 16,1 0-16,17 0 0,71-17 16,-71 17-16,53 0 15,-88 0-15,0 0 0,-18 17 16,-52-17-1,-1 18 1</inkml:trace>
-  <inkml:trace contextRef="#ctx0" brushRef="#br2" timeOffset="65611.7927">20973 11113 0,'17'35'16,"-17"-18"-16,18 1 15,0 17-15,-1 1 0,18 52 16,1-53-16,34 53 16,-34-70-16,-1 17 15,0-17-15,0-18 0,-17 0 16,17 0-16,1 0 16,17-35-16,-18-1 15,0 1-15,0-18 16,1 18-16,52-71 0,-53 71 15,0 17-15,-17-17 16,0 17-16</inkml:trace>
-  <inkml:trace contextRef="#ctx0" brushRef="#br2" timeOffset="67608.232">23178 10319 0,'17'-18'0,"-17"0"15,0 1 1,0-1-16,-17 18 31,-19 0-15,19 18-16,-19 35 16,19-18-16,-1 0 0,0 54 15,18-54-15,36 35 16,-19-34-16,19-19 15,-1 19-15,18-36 0,-18 17 16,18-17-16,0 0 0,17-35 16,-34 17-1,17-52-15,-36 34 16,-34-34-16,-1 17 16,-35-18-16,18 54 15,-36-19 1,54 36-16,-36 0 15,35 18-15,18 0 16,0-1-16,53 19 16,-18-19-16</inkml:trace>
+  <inkml:trace contextRef="#ctx0" brushRef="#br2" timeOffset="65611.7926">20973 11113 0,'17'35'16,"-17"-18"-16,18 1 15,0 17-15,-1 1 0,18 52 16,1-53-16,34 53 16,-34-70-16,-1 17 15,0-17-15,0-18 0,-17 0 16,17 0-16,1 0 16,17-35-16,-18-1 15,0 1-15,0-18 16,1 18-16,52-71 0,-53 71 15,0 17-15,-17-17 16,0 17-16</inkml:trace>
+  <inkml:trace contextRef="#ctx0" brushRef="#br2" timeOffset="67608.2319">23178 10319 0,'17'-18'0,"-17"0"15,0 1 1,0-1-16,-17 18 31,-19 0-15,19 18-16,-19 35 16,19-18-16,-1 0 0,0 54 15,18-54-15,36 35 16,-19-34-16,19-19 15,-1 19-15,18-36 0,-18 17 16,18-17-16,0 0 0,17-35 16,-34 17-1,17-52-15,-36 34 16,-34-34-16,-1 17 16,-35-18-16,18 54 15,-36-19 1,54 36-16,-36 0 15,35 18-15,18 0 16,0-1-16,53 19 16,-18-19-16</inkml:trace>
   <inkml:trace contextRef="#ctx0" brushRef="#br2" timeOffset="67769.8471">23707 10495 0,'17'0'47</inkml:trace>
   <inkml:trace contextRef="#ctx0" brushRef="#br2" timeOffset="68035.6327">23971 10336 0,'0'18'15,"-17"35"1,17-35-16,0 52 16,0-35-16,17 1 0,1 34 15,0-34-15,-1 16 16,1-34-16,-18 0 16,17-18-16,1 0 0</inkml:trace>
   <inkml:trace contextRef="#ctx0" brushRef="#br2" timeOffset="68837.0819">24659 10407 0,'-35'-18'16,"70"36"-16,-88-53 0,18 35 0,-18 17 15,18 1 1,0 53-1,17-36-15,18 0 0,0 53 16,18-52-16,34 52 16,-16-53-16,34 0 15,-17-17-15,35 0 16,-35-36-16,18-17 16,-54-1-16,1-34 15,-18 35-15,-18-36 16,1 18-16,-54-17 15,18 34-15,0 1 16,18 0-16,-18 17 16,18 18-16,0 0 0,-1 18 15,19-1-15,17 1 16,0 17-16,17-17 16,1 17-16,17-17 0,36 35 15,-36-36-15,0 1 16,18-18-16,-35 18 0,35-1 15,-35-17-15,-1 18 16</inkml:trace>
@@ -4433,9 +4433,9 @@
   <inkml:trace contextRef="#ctx0" brushRef="#br2" timeOffset="70143.5287">26141 10636 0,'0'-17'15,"17"17"1,36 0-1,36 0 1,-54 0-16,53 0 16,-53 0-16,18 0 15,-35 0-15,0 0 16</inkml:trace>
   <inkml:trace contextRef="#ctx0" brushRef="#br2" timeOffset="70355.0259">26388 10442 0,'0'0'0,"0"36"16,-18-1-16,18 0 15,0 18-15,0-18 16,18 1-16,-1-1 0,-17-18 15,36 36-15,-36-35 16,17-18-16,1 18 16</inkml:trace>
   <inkml:trace contextRef="#ctx0" brushRef="#br2" timeOffset="70911.8515">27305 10513 0,'0'0'16,"35"-35"-16,-17 35 0,0-18 15,-36 18 1,-17 35 0,-1 0-16,1 18 15,35-17-15,-18 34 16,36-35-16,17 18 16,-17-35-16,17 0 15,1-1-15,34-17 16,-35-17-16,18-19 15,-35 1-15,-18 17 16,0-17-16,0 0 0,-35-36 16,17 36-16,-35 0 15,35 17-15,-17 18 16,18 0-16,17 35 16,17-35-1</inkml:trace>
-  <inkml:trace contextRef="#ctx0" brushRef="#br2" timeOffset="71051.4322">27799 10636 0,'-18'0'16,"36"0"15,0 0-15</inkml:trace>
+  <inkml:trace contextRef="#ctx0" brushRef="#br2" timeOffset="71051.4321">27799 10636 0,'-18'0'16,"36"0"15,0 0-15</inkml:trace>
   <inkml:trace contextRef="#ctx0" brushRef="#br2" timeOffset="71440.1624">28205 10460 0,'-18'-35'15,"36"70"-15,-54-88 0,19 35 0,-1 1 16,-17 17-16,17 0 0,-17 35 15,17-17-15,18 17 16,-17 0-16,17 0 0,17 18 16,1-17-16,17-1 15,0-17 1,1-18-16,-1 0 16,-17-18-16,-1-17 15,-17-1-15,0 19 0,18-19 16,-18 1-16,0 0 15,0 17-15,0-17 16,0 53 0,18 52-1,-18-35-15,17 18 0,1 36 16,-1-37-16,1-16 16,0 17-16,-1-18 0,19 35 15,-19-34 1,19-19-16</inkml:trace>
-  <inkml:trace contextRef="#ctx0" brushRef="#br2" timeOffset="71768.4127">28610 10813 0,'0'0'15,"0"53"-15,18-18 0,0 18 16,-1-36-16,1 19 0,-1-19 16,19 1-1,-19-18-15,1 0 0,0-18 16,-18-17-16,17-18 15,-17 35-15,0-17 16,0 0-16,0 0 16,0 17-16,0-17 0,0 17 15,0 0-15,18 18 16,-18 18 0</inkml:trace>
+  <inkml:trace contextRef="#ctx0" brushRef="#br2" timeOffset="71768.4126">28610 10813 0,'0'0'15,"0"53"-15,18-18 0,0 18 16,-1-36-16,1 19 0,-1-19 16,19 1-1,-19-18-15,1 0 0,0-18 16,-18-17-16,17-18 15,-17 35-15,0-17 16,0 0-16,0 0 16,0 17-16,0-17 0,0 17 15,0 0-15,18 18 16,-18 18 0</inkml:trace>
   <inkml:trace contextRef="#ctx0" brushRef="#br2" timeOffset="72247.9886">29069 10883 0,'-18'0'15,"1"0"1,-1 0 0,0 0-16,-17 35 15,35-17-15,0 0 16,0 17-16,0-17 16,18-1-16,-1-17 15,-17 18-15,18-18 0,-18-18 16,35 1-1,-17-1-15,0-17 16,-18 17-16,0-17 16,0 17-1,0 36 1,0 17 0,17 0-16,-17 18 15,18-35-15,-18 0 16,17 35-16,-17-36 15,18 1-15,-18-36 47</inkml:trace>
   <inkml:trace contextRef="#ctx0" brushRef="#br2" timeOffset="72563.2094">29210 10936 0,'18'-18'31,"-1"18"-15,1 0-16,0 0 16,-1-17-16,1 17 15,-1 0-15,19 0 16,-19 0-16,-17 17 15,0 1 1,0 35 0,0-35-16,0-1 0,0 36 15,18-17-15,-18-19 16,18 18-16,-1-17 16,1 0-16,0-18 15,-18 17-15</inkml:trace>
   <inkml:trace contextRef="#ctx0" brushRef="#br2" timeOffset="72717.621">29369 11060 0,'70'0'0,"-140"0"0,158 0 16,-53 0-16,1-18 0,-1 18 15,18-18 1,-36 18-16</inkml:trace>
@@ -4445,24 +4445,24 @@
   <inkml:trace contextRef="#ctx0" brushRef="#br0" timeOffset="83124.6542">6526 13635 0,'-17'18'16,"34"-36"-16,-17 36 31,18-18-31</inkml:trace>
   <inkml:trace contextRef="#ctx0" brushRef="#br0" timeOffset="83364.1627">6985 13317 0,'18'0'16,"-18"36"0,17 34-16,1-35 15,0 89-15,-1-53 16,1 52-1,-18-70-15,35 17 16,-17-34-16,17-19 16,-17-17-16</inkml:trace>
   <inkml:trace contextRef="#ctx0" brushRef="#br0" timeOffset="83858.1427">7726 13388 0,'-18'0'0,"36"0"0,-53 0 15,17 0-15,0 18 16,-17 17-1,35 0-15,-35 53 16,35-35-16,0 0 16,17-18-16,1 18 0,17-17 0,18 17 15,35-36 1,-52-17-16,17 0 16,17-35-16,1-36 15,-54 36-15,1-35 16,-18 34-16,-18 1 15,1 0-15,-19-1 0,-52-17 16,53 36-16,-53-1 16,35 1-1,-18 34-15,36-17 16,0 53-16,35-35 16,17 35-16,19-18 15,34 0 1,-35-17-16,54 0 15,-36-18-15,17 0 16,-52-18-16,17 18 16,-17-18-16</inkml:trace>
-  <inkml:trace contextRef="#ctx0" brushRef="#br0" timeOffset="84124.9478">8308 13670 0,'18'18'15,"-18"-1"-15,0 19 16,0-19-16,0 1 15,0 17-15,0-17 0,17 35 16,-17-36-16,18 1 16,-1-18-1</inkml:trace>
+  <inkml:trace contextRef="#ctx0" brushRef="#br0" timeOffset="84124.9477">8308 13670 0,'18'18'15,"-18"-1"-15,0 19 16,0-19-16,0 1 15,0 17-15,0-17 0,17 35 16,-17-36-16,18 1 16,-1-18-1</inkml:trace>
   <inkml:trace contextRef="#ctx0" brushRef="#br0" timeOffset="84681.4241">8537 13741 0,'-17'53'0,"34"-106"0,-34 123 16,17-17-16,17-35 16,36 17-16,-18-35 15,18 0 1,0-18-16,-35 1 15,-18-1-15,0-17 16,-18 17-16,1 1 16,17-1-16,-18 0 15,0 18-15,1-17 0,-1-1 16,36 18 15,35-18-31,-36 18 16,19 0-16,-19 0 0,18 0 15,1 0 1,-19 0-16,-17 18 16,0 0-16,-17-1 15,-1 19 1,18-19-16,-18 19 0,18-19 16,0 1-16,18-1 15,0 1-15,35 0 16,-36-18-16,1 0 15,35-36 1,-53 19-16,17-1 0,-17 1 16,0-1-16,-17 0 0,-1-17 15,-35 0 1,36 35-16,-1-18 16,-17 18-16</inkml:trace>
   <inkml:trace contextRef="#ctx0" brushRef="#br0" timeOffset="85226.1078">10054 13670 0,'18'18'16,"35"-18"-1,-18 17-15,0-17 16,36 0-1,-18 0-15,0-17 16,-36 17-16,1 0 0,0 0 16</inkml:trace>
   <inkml:trace contextRef="#ctx0" brushRef="#br0" timeOffset="85394.4357">10248 13511 0,'0'0'16,"18"89"-16,-18-36 0,17-18 16,1 18-16,-18 0 15,18 0-15,17 17 16,-17-52-16</inkml:trace>
   <inkml:trace contextRef="#ctx0" brushRef="#br0" timeOffset="87230.108">16157 12647 0,'18'0'63,"0"0"-63,-1 0 15,71 0-15,-35 18 16,88-18-16,-70 0 16,105 0-1,-70 0-15,-18 0 0,1 0 16,-1-18-16,-18 18 0,54 0 15,-89 0-15,18-18 16,-71 18 0</inkml:trace>
-  <inkml:trace contextRef="#ctx0" brushRef="#br0" timeOffset="93541.7436">11677 13670 0,'-18'-17'15,"1"17"-15,-36 17 16,35 1-16,0-1 0,-34 54 15,52-36 1,-18 53-16,18-52 16,0 17-16,18-18 0,17 35 15,-18-34-15,1-19 16,0 1-16,17 0 16,-17-18-16,-1 0 0,1-18 15,0 18-15,-1-53 16,1 35-16,-18-52 15,0 35-15,0-1 16,-35-34-16,35 35 0,-36-18 16,19 35-16,17 0 15,0 36 1,0 0 0,17-1-16,-17 1 15</inkml:trace>
+  <inkml:trace contextRef="#ctx0" brushRef="#br0" timeOffset="93541.7435">11677 13670 0,'-18'-17'15,"1"17"-15,-36 17 16,35 1-16,0-1 0,-34 54 15,52-36 1,-18 53-16,18-52 16,0 17-16,18-18 0,17 35 15,-18-34-15,1-19 16,0 1-16,17 0 16,-17-18-16,-1 0 0,1-18 15,0 18-15,-1-53 16,1 35-16,-18-52 15,0 35-15,0-1 16,-35-34-16,35 35 0,-36-18 16,19 35-16,17 0 15,0 36 1,0 0 0,17-1-16,-17 1 15</inkml:trace>
   <inkml:trace contextRef="#ctx0" brushRef="#br0" timeOffset="93684.8987">11889 13917 0,'0'0'0,"0"-18"15</inkml:trace>
   <inkml:trace contextRef="#ctx0" brushRef="#br0" timeOffset="93934.4874">12083 13723 0,'17'35'16,"-17"1"-16,18 34 16,-18-35-16,18 36 15,-18-18 1,17-35-16,-17 52 0,0-52 16,18-1-1</inkml:trace>
   <inkml:trace contextRef="#ctx0" brushRef="#br0" timeOffset="95020.2414">12594 13882 0,'18'17'0,"-1"1"15,19 0 1,-19-18-16,19 17 16,-19-17-16,1 18 15,-18 0 1</inkml:trace>
   <inkml:trace contextRef="#ctx0" brushRef="#br0" timeOffset="95193.1342">12718 13829 0,'-36'35'16,"72"-70"-16,-89 105 0,35-52 16,0 53-16,1-54 15,17 1-15,0 35 16</inkml:trace>
-  <inkml:trace contextRef="#ctx0" brushRef="#br0" timeOffset="95626.4146">13264 13758 0,'-17'0'16,"-1"18"-1,1-18-15,-19 53 16,36-35-16,-17 52 15,17-35-15,17 1 16,1-1-16,-18 0 0,53 36 16,-36-54-16,36 1 15,-17 0-15,17-36 16,-36 18-16,18-35 16,-17 17-16,-18-35 15,-18 18 1,-17-18-16,18 35 15,-1 1-15,0-1 16,1 0-16,-19 18 0,36 18 16,0 0-1</inkml:trace>
-  <inkml:trace contextRef="#ctx0" brushRef="#br0" timeOffset="95764.2924">13582 13970 0,'18'0'31</inkml:trace>
+  <inkml:trace contextRef="#ctx0" brushRef="#br0" timeOffset="95626.4145">13264 13758 0,'-17'0'16,"-1"18"-1,1-18-15,-19 53 16,36-35-16,-17 52 15,17-35-15,17 1 16,1-1-16,-18 0 0,53 36 16,-36-54-16,36 1 15,-17 0-15,17-36 16,-36 18-16,18-35 16,-17 17-16,-18-35 15,-18 18 1,-17-18-16,18 35 15,-1 1-15,0-1 16,1 0-16,-19 18 0,36 18 16,0 0-1</inkml:trace>
+  <inkml:trace contextRef="#ctx0" brushRef="#br0" timeOffset="95764.2923">13582 13970 0,'18'0'31</inkml:trace>
   <inkml:trace contextRef="#ctx0" brushRef="#br0" timeOffset="96175.7594">13882 13776 0,'-18'-18'0,"36"36"0,-53-36 16,17 18-16,0 0 15,1 18-15,17 17 16,-18-17-16,18 17 0,0 0 15,0-17-15,18 17 16,-1-17-16,19-18 16,-19 0-16,1-18 15,-1 1-15,1-36 16,-18 35-16,18-17 16,-18 17-16,0 1 15,17 34 16,-17 54-15,18-36-16,0 18 0,-1 35 16,-17-35-1,18 18-15,0-36 16,-18-17-16,0 17 16,0-17-16</inkml:trace>
   <inkml:trace contextRef="#ctx0" brushRef="#br0" timeOffset="96605.6323">14411 14041 0,'-18'0'0,"36"0"32</inkml:trace>
   <inkml:trace contextRef="#ctx0" brushRef="#br0" timeOffset="97131.8627">14958 13723 0,'0'-18'15,"0"36"-15,-18-36 0,18 1 0,-17 17 16,-36 35-16,35-17 15,-17 17-15,17 0 0,0 1 16,1 52-16,17-35 16,17 35-1,1-53-15,35 18 16,-18-35-16,53-1 16,-52-17-16,34-17 15,-34-19-15,-1 19 16,35-89-1,-70 35-15,-35-17 16,0 53-16,-36-36 16,18 36-16,18 17 15,-18 18-15,18-17 0,-36 34 16,54-17-16,-1 53 16,18-35-1,35 53-15,1-54 16,17 18-16,-18-17 15,0 17 1,18-35-16,-35 18 16,-1-18-1</inkml:trace>
   <inkml:trace contextRef="#ctx0" brushRef="#br0" timeOffset="97595.0414">15452 14005 0,'17'0'16,"-34"0"-16,34-17 15,-34 17 1,-1 0-16,-17 17 16,-1 19-1,36-19-15,-17 1 0,17 17 16,0-17-16,0-1 16,17-17-16,1 0 15,0 0-15,-1 0 16,19 0-16,-19-17 0,1-1 15,-18 0-15,35-17 16,-35 18-16,0-1 16,0 0-1,0 36 1,18 0 0,-18-1-16,0 18 0,18 1 15,-1-1-15,-17-17 16,0 17-16,0 0 15,18-17 1,-18 0-16</inkml:trace>
   <inkml:trace contextRef="#ctx0" brushRef="#br0" timeOffset="98011.1791">15893 13988 0,'-18'0'16,"36"0"-16,-54 0 0,19 0 0,-19 35 15,19-17-15,17-1 0,-18 18 16,18-17-16,0 0 0,18-1 16,-1 1-1,1-18-15,17 0 16,-17-18-16,0 1 15,-1-1 1,-17-17-16,0 17 16,18 1-1,-18 34 17,18 36-17,-18-18-15,17 18 16,-17-17-16,0-1 15,0 0-15,18-17 0,-18-1 16,0 1-16,0 0 16,-18-18-16</inkml:trace>
-  <inkml:trace contextRef="#ctx0" brushRef="#br0" timeOffset="101285.9119">24359 11307 0,'18'0'31,"0"0"-31,52 0 16,-17 0-16,88 0 15,-70 17-15,105 1 16,-88-18 0,18 17-16,-18-17 0,89 0 15,-107 0-15,18 0 16,-70 0 0,0 0-16</inkml:trace>
+  <inkml:trace contextRef="#ctx0" brushRef="#br0" timeOffset="101285.9118">24359 11307 0,'18'0'31,"0"0"-31,52 0 16,-17 0-16,88 0 15,-70 17-15,105 1 16,-88-18 0,18 17-16,-18-17 0,89 0 15,-107 0-15,18 0 16,-70 0 0,0 0-16</inkml:trace>
   <inkml:trace contextRef="#ctx0" brushRef="#br0" timeOffset="121463.6265">23530 11148 0,'0'17'31,"0"1"-31,0 17 16,0-17-16,0 0 16,0 35-16,0-18 15,0 18-15,0-18 16,0 18 0,0-35-16,18 17 0,-18-18 15,18 1-15,-18 0 16,0-36-1</inkml:trace>
   <inkml:trace contextRef="#ctx0" brushRef="#br0" timeOffset="121907.0864">23372 11377 0,'0'-18'63,"0"1"-63,17 17 15,-17-35 1,18 17-16,-18 0 0,17 1 16,-17-1-16,18-17 15,0 17-15,-18 0 0,17 1 16,1-18-16,0 17 16,-1 18-16,1-18 0,0 18 15,-18-17-15,17 17 31,-17 17-31,0 1 16,18 0-16,-18 17 0,17 0 16,1-17-16,0-1 15,-1 1-15,-17 0 0,18-18 16,17 17 0,1-17-16</inkml:trace>
   <inkml:trace contextRef="#ctx0" brushRef="#br0" timeOffset="122864.037">19650 12541 0,'0'18'78,"0"0"-62,0 17-1,0 0 1,0-17-16,0-1 0,0 19 16,17-19-16,-17 36 15,0-18-15,0 1 16,0-1-16,18-17 16,-18-1-1,18 1-15,-1-18 16,-34-18 15,-1 18-15,0 0-16</inkml:trace>
@@ -4484,7 +4484,7 @@
   <inkml:trace contextRef="#ctx0" brushRef="#br0" timeOffset="134186.7991">22507 14076 0,'0'0'16,"0"-18"-16,-17 18 0,-1 0 15,-17 0 1,17 18-16,0-1 16,1 1-16,17 0 0,0 17 15,0-17 1,17-1-16,-17 1 0,36-18 16,-19 0-16,19 0 15,-19-18-15,1 1 16,0-19-1,-18 19-15,0-19 16,17 54 15,-17 35-15,18-35-16,-18 52 16,17-52-16,1 17 15,-18-17-15,0-1 0,18 1 16</inkml:trace>
   <inkml:trace contextRef="#ctx0" brushRef="#br0" timeOffset="134593.9253">22737 14041 0,'-18'0'0,"36"0"0,-36 17 31,18 18-15,18 1-16,-18-1 15,17 0-15,1 1 0,-1-1 16,19 18-16,-19-36 16,1 1-16,-18 17 15,-18-35 1,1 0-1,-19-35 1,19 17-16,-1 1 0,18-18 16,-17-1-16,17 19 15,17-19-15,-17 19 16,35-36-16,-17 35 16,-18-17-1,18 17-15,-18 1 16,0-1-16,-18 0 15,0 18-15,-17 18 16</inkml:trace>
   <inkml:trace contextRef="#ctx0" brushRef="#br0" timeOffset="135198.5735">23460 14023 0,'17'0'0,"1"0"16,0 0-1,17 0-15,18-18 16,-36 18-16,19 0 16,-1-17-16,0 17 15,-17 0-15,0 0 0,-1 0 16,-17-18-1</inkml:trace>
-  <inkml:trace contextRef="#ctx0" brushRef="#br0" timeOffset="135366.8635">23671 13864 0,'0'71'16,"0"-36"-16,18 0 15,-18 36-15,18-36 16,-1 0-16,-17 1 16,18-1-16</inkml:trace>
+  <inkml:trace contextRef="#ctx0" brushRef="#br0" timeOffset="135366.8634">23671 13864 0,'0'71'16,"0"-36"-16,18 0 15,-18 36-15,18-36 16,-1 0-16,-17 1 16,18-1-16</inkml:trace>
   <inkml:trace contextRef="#ctx0" brushRef="#br0" timeOffset="136784.6704">24642 13829 0,'-18'-18'0,"18"1"15,-18 17-15,1 0 16,-1 0-1,0 17-15,1 19 0,-1-1 16,0 35-16,18 1 16,0-36-16,18-17 15,0 35-15,17-36 16,0-17-16,1 0 16,16 0-1,-34-17-15,0-1 0,17-52 16,-17 34-16,-18-34 15,0 34-15,-36-34 16,19 52-16,-19-17 16,19 35-16,-1 0 15,1 0-15,17 18 16,0-1-16,17 19 16,1-1-16,-1-18 15</inkml:trace>
   <inkml:trace contextRef="#ctx0" brushRef="#br0" timeOffset="137023.937">25030 14005 0,'17'0'15,"-34"0"79,-1 0-78</inkml:trace>
   <inkml:trace contextRef="#ctx0" brushRef="#br0" timeOffset="137313.6142">25382 13670 0,'0'-17'15,"0"34"1,0 54-16,18-36 16,-18 71-1,0-53-15,0 53 16,0-54-16,18-16 16,-18-1-16,0 0 0,0 1 15,17-19-15</inkml:trace>
@@ -4498,7 +4498,7 @@
   <inkml:trace contextRef="#ctx0" brushRef="#br0" timeOffset="141283.4426">28769 14129 0,'-18'-18'0,"36"36"0,-53-54 15,-1 36 1,19 0-16,-1 36 15,1-36-15,-1 17 0,18 1 16,-18 35 0,36-35-16,-18-1 0,35 1 15,-17-18-15,-1 0 16,1 0-16,0-18 16,-18 1-1,0-1 1,0 36-1,17 17 1,-17-17-16,0 17 16,18-18-16,0 1 15,-18 0-15,17-1 0,1 19 16,-18-19-16,18-17 16</inkml:trace>
   <inkml:trace contextRef="#ctx0" brushRef="#br0" timeOffset="141616.9208">28928 14164 0,'17'0'16,"1"0"0,0 0-16,-1 0 15,1 0-15,0 0 16,-1 0-16,1 18 0,0-1 16,-18 1-16,17 35 15,-17-18-15,18-17 16,-18 35-1,17 0-15,-17-18 0,18 0 16,-36-17 0</inkml:trace>
   <inkml:trace contextRef="#ctx0" brushRef="#br0" timeOffset="141745.6062">29034 14340 0,'35'-17'0,"-70"34"0,88-34 16,-36-1-16,18 18 16,-17 0-16,17 0 0,18-17 15</inkml:trace>
-  <inkml:trace contextRef="#ctx0" brushRef="#br0" timeOffset="142118.8205">29457 14058 0,'35'0'16,"-17"-17"-16,52 17 15,-34-18-15,34 0 16,-34 18 0,-1-35-16,-18 35 15</inkml:trace>
+  <inkml:trace contextRef="#ctx0" brushRef="#br0" timeOffset="142118.8204">29457 14058 0,'35'0'16,"-17"-17"-16,52 17 15,-34-18-15,34 0 16,-34 18 0,-1-35-16,-18 35 15</inkml:trace>
   <inkml:trace contextRef="#ctx0" brushRef="#br0" timeOffset="142257.6211">29598 13882 0,'0'0'16,"18"53"-16,-1 17 16,-17-34-16,18 16 0,35 19 15,-35-53-15,-1-1 16</inkml:trace>
   <inkml:trace contextRef="#ctx0" brushRef="#br0" timeOffset="142567.508">30163 13847 0,'0'17'16,"-18"1"-16,18 52 0,0-34 15,18 52 1,-18-53-16,52 0 15,-34-17-15,0 0 16,17-18-16,-17 0 0,35-18 16,-36 0-16,1 1 15,-18-36 1,0 18-16,0-18 0,-18 17 16,-17 1-16,17 17 15,1 18-15,-1 18 16,18 0-16</inkml:trace>
   <inkml:trace contextRef="#ctx0" brushRef="#br0" timeOffset="142711.7406">30603 14005 0,'0'-17'16,"0"-1"15</inkml:trace>
@@ -4514,19 +4514,19 @@
   <inkml:trace contextRef="#ctx0" brushRef="#br0" timeOffset="146967.2808">33232 14199 0,'17'-17'16,"-17"-1"15,-17 18-31,-1 18 16,0-18-16,1 17 0,-19 19 15,36-19-15,-17 19 16,17-19 0,17 1-16,1-1 15,-18 1-15,18-18 0,-1 0 16,1 0-1,0-18-15,-18 1 16,0-1-16,17 1 16,-17-1-1,18 0-15,-18 36 32,18 0-17,-18-1-15,0 18 0,17-17 16,-17 0-16,0-1 0,0 1 15,0 0-15,-17-1 16</inkml:trace>
   <inkml:trace contextRef="#ctx0" brushRef="#br0" timeOffset="147255.7813">33390 14164 0,'0'0'16,"-17"53"-16,-1-18 0,18 36 15,0-18-15,0 17 16,18-34-16,17 16 16,-17-34-16,35 0 15,-36-18-15,1-18 16,17 0-16,-35 1 15,0-18-15,0-1 16,-17 19-16,-19-19 16,19 19-16,-19 17 0,1 0 15,0 0-15,0 0 0</inkml:trace>
   <inkml:trace contextRef="#ctx0" brushRef="#br0" timeOffset="148557.2491">9878 15011 0,'17'0'16,"1"0"-1,0-18-15,17 18 0,0 0 16,36 0-16,-36 0 16,36 0-16,-36 0 15,35-18-15,-52 18 16</inkml:trace>
-  <inkml:trace contextRef="#ctx0" brushRef="#br0" timeOffset="148746.5815">10072 14781 0,'0'0'15,"0"106"-15,17-53 0,-17 0 0,18 53 16,0-71-16,17 36 16,-17-54-16,-1-17 15</inkml:trace>
+  <inkml:trace contextRef="#ctx0" brushRef="#br0" timeOffset="148746.5814">10072 14781 0,'0'0'15,"0"106"-15,17-53 0,-17 0 0,18 53 16,0-71-16,17 36 16,-17-54-16,-1-17 15</inkml:trace>
   <inkml:trace contextRef="#ctx0" brushRef="#br0" timeOffset="149030.0978">10971 14958 0</inkml:trace>
   <inkml:trace contextRef="#ctx0" brushRef="#br0" timeOffset="149168.5692">11236 14923 0,'18'0'15</inkml:trace>
   <inkml:trace contextRef="#ctx0" brushRef="#br0" timeOffset="149307.191">11536 14887 0,'0'0'15,"17"0"-15</inkml:trace>
-  <inkml:trace contextRef="#ctx0" brushRef="#br0" timeOffset="160864.3212">7638 14270 0,'0'0'0,"17"0"31,1 0-15,0 0 0,-1 0-16,18 18 15,1-18-15,52 17 16,-35-17-16,17 0 16,1 0-16,17 0 0,0 0 0,-17-17 15,17 17-15,0 0 0,53 0 16,-70 0-1,35 17-15,-53-17 16,-18 0-16,18 0 16,-35 0-16</inkml:trace>
+  <inkml:trace contextRef="#ctx0" brushRef="#br0" timeOffset="160864.3211">7638 14270 0,'0'0'0,"17"0"31,1 0-15,0 0 0,-1 0-16,18 18 15,1-18-15,52 17 16,-35-17-16,17 0 16,1 0-16,17 0 0,0 0 0,-17-17 15,17 17-15,0 0 0,53 0 16,-70 0-1,35 17-15,-53-17 16,-18 0-16,18 0 16,-35 0-16</inkml:trace>
   <inkml:trace contextRef="#ctx0" brushRef="#br0" timeOffset="164329.4709">2628 12629 0,'18'0'31,"70"0"-15,-35 0-16,18-17 0,87 17 16,-52 0-16,106 0 15,-106 0 1,105 0-16,-105 17 16,70 1-16,-87 0 15,52-1-15,-88-17 16,53 18-1,-71-18-15,-18 0 16</inkml:trace>
   <inkml:trace contextRef="#ctx0" brushRef="#br0" timeOffset="169940.9621">7638 14305 0,'17'0'110,"1"0"-79,0 18-16,-1-1 1,1-17-16,35 0 16,-18 0-16,71 0 15,-53 0 1,0 0-16,17 0 0,-17 18 16,0-18-16,71 18 15,-72-1-15,1 1 0,53 0 16,-53-1-1,0-17-15,53 0 16,-53 0-16,-18 0 0,0 0 16,1 0-16,-1-17 15,-17 17-15,-1 0 0,1 0 16,-1 0-16,-34 0 31,-1 0-15,1 0-16</inkml:trace>
   <inkml:trace contextRef="#ctx0" brushRef="#br0" timeOffset="170724.2389">7796 14323 0,'0'0'0,"-17"0"0,-36 0 16,35 0-16,36 0 31,35 0-16,0 0-15,53 0 16,-36 0-16,89 0 16,-71 0-16,88 0 15,-87 0-15,-1 0 16,-18 0-16,71 0 16,-70 0-16,-18 0 15,-18 0-15,0 0 0,1 0 16,-54 0-1,-35 17 1,36-17 0,-19 0-16,-17 0 0,18 18 0,-53-18 15,53 0 1,-18 0-16,-35 0 16,35-18-16,-53 1 15,53 17-15,18 0 16,-18-18-16,17 18 0,-17 0 15,36 0-15,-1 0 16,36 0 0,17 0-1,0 18-15,1-18 0,-1 0 0,71 0 16,-53 0-16,53 17 16,-71-17-1,53 18-15,-53-18 16,18 0-16,-35 0 15,-1 0-15,-34 0 16,-1 0 0</inkml:trace>
-  <inkml:trace contextRef="#ctx0" brushRef="#br0" timeOffset="171858.3537">14940 14570 0,'-17'0'0,"-1"0"15,0 0-15,18-18 16,-17 18-16,-1 0 16,18-18-1,18 18 16,35 18-15,-1-18-16,54 18 16,-53-1-16,88 1 15,-53-18-15,71 0 16,-88 0-16,70 0 16,-88 0-16,35 18 15,-53-18-15,1 0 16,-54 0-1,-35 0 1,35 17-16,1-17 16,-19 0-16</inkml:trace>
+  <inkml:trace contextRef="#ctx0" brushRef="#br0" timeOffset="171858.3536">14940 14570 0,'-17'0'0,"-1"0"15,0 0-15,18-18 16,-17 18-16,-1 0 16,18-18-1,18 18 16,35 18-15,-1-18-16,54 18 16,-53-1-16,88 1 15,-53-18-15,71 0 16,-88 0-16,70 0 16,-88 0-16,35 18 15,-53-18-15,1 0 16,-54 0-1,-35 0 1,35 17-16,1-17 16,-19 0-16</inkml:trace>
   <inkml:trace contextRef="#ctx0" brushRef="#br0" timeOffset="172809.1233">21696 14676 0,'-18'0'15,"36"0"1,17 0-1,0 17 1,18-17-16,71 18 16,-54-18-16,124 17 15,-105 1-15,122-18 16,-105 0-16,70 18 16,-105-18-16,-36 17 15,1-17-15,-36 18 16,-18-18-16</inkml:trace>
   <inkml:trace contextRef="#ctx0" brushRef="#br0" timeOffset="174211.9762">28187 14781 0,'18'18'16,"35"-18"0,-18 0-16,18 0 0,70 0 15,89 18 1,-71-18 0,-70 0-16,-1 0 0,36 17 15,-18-17 1,-70 0-16,-1 0 15</inkml:trace>
   <inkml:trace contextRef="#ctx0" brushRef="#br0" timeOffset="174967.6495">32579 14817 0,'0'0'0,"18"0"0,35 17 16,-18-17-16,0 0 0,89 18 16,-54 0-1,124-1-15,-106 1 16,18-18-16,53 35 15,-88-35-15,17 18 16</inkml:trace>
-  <inkml:trace contextRef="#ctx0" brushRef="#br0" timeOffset="193341.9894">19667 2734 0,'0'-18'16,"18"18"0,0 0-1,-18 18-15,17-18 16,-17 18-16,18 35 16,0-18-16,-18 88 15,0-34-15,17 16 16,-17-16-16,0 34 0,18-17 15,-18 0-15,17 0 0,19 88 16,-19-106-16,1 106 16,-18-106-16,18 88 15,-18-87-15,0 52 16,0-71-16,0 36 16,0-53-16,0 53 15,-18-71-15,0 53 16,1-52-1,-19 34-15,19-52 16,-1-1-16</inkml:trace>
+  <inkml:trace contextRef="#ctx0" brushRef="#br0" timeOffset="193341.9893">19667 2734 0,'0'-18'16,"18"18"0,0 0-1,-18 18-15,17-18 16,-17 18-16,18 35 16,0-18-16,-18 88 15,0-34-15,17 16 16,-17-16-16,0 34 0,18-17 15,-18 0-15,17 0 0,19 88 16,-19-106-16,1 106 16,-18-106-16,18 88 15,-18-87-15,0 52 16,0-71-16,0 36 16,0-53-16,0 53 15,-18-71-15,0 53 16,1-52-1,-19 34-15,19-52 16,-1-1-16</inkml:trace>
   <inkml:trace contextRef="#ctx0" brushRef="#br0" timeOffset="194126.6013">19173 4815 0,'0'0'15,"-17"0"-15,34 0 16,36 0 0,-35 18-16,70 0 15,-35-18-15,0 0 16,18 17-16,-1 1 16,107 0-16,-89-1 15,35-17-15,124 18 16,-106 0-16,177-1 15,-142-17-15,195 18 16,-160-18-16,213 17 16,-213-17-16,213 18 15,-213-18-15,213 18 16,-230-18-16,194 17 16,-194-17-16,123 0 15,-176 0 1,124 18-16,-142-18 15,-34 18-15,-1-18 0,-35 0 16,53 17-16,-71-17 16,-18 0-1,-34 0-15</inkml:trace>
   <inkml:trace contextRef="#ctx0" brushRef="#br0" timeOffset="197801.8137">18997 3404 0,'-18'-17'15,"18"-1"1,-17 18 31,17 18-31,-18-1-1</inkml:trace>
   <inkml:trace contextRef="#ctx0" brushRef="#br0" timeOffset="198284.9742">18997 3404 0,'0'0'0,"-18"-53"0,1 53 15,-1 0-15,1 0 16,17 18 0,-18-18-16,0 53 15,1-18-15,17 18 16,0 0-16,0-18 0,17 36 16,1-36-16,35 18 15,-18-35-15,18 17 16,-18-35-16,36-18 15,-36 1 1,18-19 0,-35 1-16,-1 0 0,-17-18 15,-17 18-15,-19-36 16,1 36-16,-35-36 16,17 54-16,-36-19 15,54 36-15,-35 36 16,52-19-16,-17 54 15,35-36-15,53 53 16,-18-52-16,0-1 16,18 0-16,0-17 0,53 17 15,-71-35 1,36 18-16,-36-18 16,-17 17-16</inkml:trace>
@@ -4537,19 +4537,19 @@
   <inkml:trace contextRef="#ctx0" brushRef="#br0" timeOffset="202450.5263">24289 3087 0,'-18'0'16,"0"17"-16,-17 19 0,-18 34 15,18-34-15,-18 34 16,18-35-16,35 1 15,-18-1-15</inkml:trace>
   <inkml:trace contextRef="#ctx0" brushRef="#br0" timeOffset="204363.6318">23548 3545 0,'0'18'16,"18"0"0,-1 17-16,18 18 15,-17-35-15,0 17 0,35 18 16,-36-53-1,1 35-15,0-17 16</inkml:trace>
   <inkml:trace contextRef="#ctx0" brushRef="#br0" timeOffset="204531.2631">23707 3616 0,'-18'35'16,"0"-17"0,18 17-16,-35 0 15,35 1-15,-18 17 16,1-36-16,17 19 16</inkml:trace>
-  <inkml:trace contextRef="#ctx0" brushRef="#br0" timeOffset="204917.8241">23089 3193 0,'18'17'32,"0"19"-17,17-1-15,-17-18 0,-1 1 16,1 17-16,-1 1 16,1-36-16,-18 17 15</inkml:trace>
+  <inkml:trace contextRef="#ctx0" brushRef="#br0" timeOffset="204917.824">23089 3193 0,'18'17'32,"0"19"-17,17-1-15,-17-18 0,-1 1 16,1 17-16,-1 1 16,1-36-16,-18 17 15</inkml:trace>
   <inkml:trace contextRef="#ctx0" brushRef="#br0" timeOffset="205082.5009">23213 3210 0,'0'0'16,"-18"18"-16,1 0 0,17 52 15,-18-52-15,18 17 16,0 0-16,-18 36 15,18-36-15,0 0 0</inkml:trace>
   <inkml:trace contextRef="#ctx0" brushRef="#br0" timeOffset="205425.9386">22983 4075 0,'18'0'16,"-18"17"0,35 1-1,-17 0-15,35 17 16,-35-18-16,-1 1 0,19 35 16,-19-35-16,1-1 15</inkml:trace>
   <inkml:trace contextRef="#ctx0" brushRef="#br0" timeOffset="205619.5278">23142 4057 0,'-17'35'0,"34"-70"0,-52 106 16,17-54-16,1 54 15,-1-36-15,18 0 0,0-17 16,0 17 0,0-17-16,18-1 0</inkml:trace>
   <inkml:trace contextRef="#ctx0" brushRef="#br0" timeOffset="206188.2855">22437 4163 0,'17'17'16,"1"1"-16,0 0 15,-1-1 1,36 19-16,-35-36 16,-1 35-16,1-17 15,-18-1-15</inkml:trace>
   <inkml:trace contextRef="#ctx0" brushRef="#br0" timeOffset="206365.7567">22543 4180 0,'-18'18'15,"36"-36"-15,-54 54 0,19-1 16,17-17-16,-18-1 0,0 19 15,18-19-15,0 18 16,0-17-16,18-18 16</inkml:trace>
-  <inkml:trace contextRef="#ctx0" brushRef="#br0" timeOffset="206993.9345">22031 3510 0,'0'0'0,"-18"-17"16,36 17 0,0 17-1,17-17-15,-17 18 16,-1-1-16,18 1 15,-17 0-15,0-1 16,-1 1-16,-17 0 16</inkml:trace>
+  <inkml:trace contextRef="#ctx0" brushRef="#br0" timeOffset="206993.9344">22031 3510 0,'0'0'0,"-18"-17"16,36 17 0,0 17-1,17-17-15,-17 18 16,-1-1-16,18 1 15,-17 0-15,0-1 16,-1 1-16,-17 0 16</inkml:trace>
   <inkml:trace contextRef="#ctx0" brushRef="#br0" timeOffset="207144.0921">22137 3457 0,'-35'53'16,"70"-106"-16,-88 124 0,53-36 0,-18-17 15,18 17-15,0-17 0,0 17 16,0-17-16,18 17 16</inkml:trace>
-  <inkml:trace contextRef="#ctx0" brushRef="#br0" timeOffset="207566.8295">21766 4128 0,'0'-18'15,"0"36"-15,18-1 16,17 1-16,1 35 16,-19-18-16,36 18 15,-53-35-15,35-1 16</inkml:trace>
+  <inkml:trace contextRef="#ctx0" brushRef="#br0" timeOffset="207566.8294">21766 4128 0,'0'-18'15,"0"36"-15,18-1 16,17 1-16,1 35 16,-19-18-16,36 18 15,-53-35-15,35-1 16</inkml:trace>
   <inkml:trace contextRef="#ctx0" brushRef="#br0" timeOffset="207689.0951">21872 4128 0,'-17'52'15,"34"-104"-15,-34 140 0,17-35 16,0 17-16</inkml:trace>
   <inkml:trace contextRef="#ctx0" brushRef="#br0" timeOffset="208268.9402">24536 5609 0,'17'0'15,"1"18"1,17-18 0,1 0-16,-19 0 0,1 0 15,-1 0 1,1 0-16</inkml:trace>
   <inkml:trace contextRef="#ctx0" brushRef="#br0" timeOffset="208387.3483">24606 5697 0,'18'0'16,"-36"0"-16,54 0 0,-19 0 0,18-17 15,-17 17-15</inkml:trace>
-  <inkml:trace contextRef="#ctx0" brushRef="#br0" timeOffset="208584.8892">24853 5627 0,'0'17'16,"0"1"0,18 35-16,-18-35 15,17-1-15,-17 19 0,18-1 16,0-18-1,-1-17 1</inkml:trace>
+  <inkml:trace contextRef="#ctx0" brushRef="#br0" timeOffset="208584.8891">24853 5627 0,'0'17'16,"0"1"0,18 35-16,-18-35 15,17-1-15,-17 19 0,18-1 16,0-18-1,-1-17 1</inkml:trace>
   <inkml:trace contextRef="#ctx0" brushRef="#br0" timeOffset="209079.0492">25047 5715 0,'0'18'15,"0"-36"-15,-17 36 0,17-1 16,0 1-16,17 0 16,1-18-16,0 17 15,-1-17 1,-17-17 0,0-19-1,-17 19 1,-1-19-1,18 19-15,0-1 16,18 18 0,17 18-1,-18-18-15,19 17 16,-19 1 0,1-18-16,0 18 0,-1-18 15,-17 17 1,0 1 15,18-18-15,0 18-16,-1-18 0,1 17 31,-1-17-31,1 0 0,0-17 16,-18-1-16,0 0 15,-18 1-15,-17-1 16,0 0-1,-18-17-15</inkml:trace>
   <inkml:trace contextRef="#ctx0" brushRef="#br0" timeOffset="209636.8493">23795 4974 0,'0'0'0,"18"-17"15,-18-1-15,0 36 31,0-1-15,0 1-16,0 35 16,0 17-16,0-52 15,17 0-15,-17 17 16</inkml:trace>
   <inkml:trace contextRef="#ctx0" brushRef="#br0" timeOffset="209985.6563">23372 4974 0,'0'18'31,"0"35"-31,0-18 15,17 0-15,-17 53 16,18-70-16,-18 35 16,17-35-16</inkml:trace>
@@ -4572,7 +4572,7 @@
   <inkml:trace contextRef="#ctx0" brushRef="#br0" timeOffset="222755.1786">19032 6632 0,'0'0'0,"-17"0"0,-1 18 16,18 0-16,-18 17 15,18-18-15,18 19 16,0-36-16,17 17 16,-17-17-1,17 18-15,-17-18 16,-1 0-16,-17-18 16,0 1-1,-17-1 1,-1 0-16,0 1 15,1-1-15,-1 1 16,0 17-16,36 0 31,0 0-15</inkml:trace>
   <inkml:trace contextRef="#ctx0" brushRef="#br0" timeOffset="222917.5006">19244 6703 0,'18'0'31,"-1"0"-31,1 0 16,17-18-16</inkml:trace>
   <inkml:trace contextRef="#ctx0" brushRef="#br0" timeOffset="223088.2703">19438 6562 0,'0'17'16,"18"36"-1,-18-17-15,0 34 16,17-35-16,-17 1 0,18-1 15,-18-17-15,18 17 0,-1-18 16</inkml:trace>
-  <inkml:trace contextRef="#ctx0" brushRef="#br0" timeOffset="224812.3816">23936 7197 0,'0'0'0,"-18"0"47,1 0-31,17 17-1,0 1-15,0 0 16,17-18 0,1 17-16,0-17 15,-1 0 1,-17-17-16,18-1 16,-18 0-16,-18 1 15,18-1 1,-17 0-16,-1 18 15,0 0 1,1 0-16,17 36 16,-18-36-16,18 35 15,18-17 1,-1-18-16,1 17 16,0-17-1,-1-17-15,1-1 16,-18 0-1,0 1 1,-18-1-16,1 18 16,-1 0-16,0 0 15,1 18 1,17-1-16,17 1 31,1-18-31,0 0 16,-18-18-1,0 1 1,0-1 0,0 0-16,-18 1 15,0 17-15,36 17 47,0 1-31</inkml:trace>
+  <inkml:trace contextRef="#ctx0" brushRef="#br0" timeOffset="224812.3815">23936 7197 0,'0'0'0,"-18"0"47,1 0-31,17 17-1,0 1-15,0 0 16,17-18 0,1 17-16,0-17 15,-1 0 1,-17-17-16,18-1 16,-18 0-16,-18 1 15,18-1 1,-17 0-16,-1 18 15,0 0 1,1 0-16,17 36 16,-18-36-16,18 35 15,18-17 1,-1-18-16,1 17 16,0-17-1,-1-17-15,1-1 16,-18 0-1,0 1 1,-18-1-16,1 18 16,-1 0-16,0 0 15,1 18 1,17-1-16,17 1 31,1-18-31,0 0 16,-18-18-1,0 1 1,0-1 0,0 0-16,-18 1 15,0 17-15,36 17 47,0 1-31</inkml:trace>
   <inkml:trace contextRef="#ctx0" brushRef="#br0" timeOffset="226380.4187">11518 14429 0,'0'17'16,"18"-17"-16,17 18 15,18 0 1,0-18-16,35 17 15,-35-17-15,18 0 0,-1 0 16,107 18 0,-89-18-16,35 17 0,107 1 15,-107 0-15,142-1 16,-124 1-16,106-18 16,-106 0-16,-35 0 15,-1 0-15,1-18 0,53 18 16,-106 0-1,35 18-15,-70-18 16,17 18-16,-53-18 31,-17 0-31</inkml:trace>
   <inkml:trace contextRef="#ctx0" brushRef="#br0" timeOffset="227289.6203">17762 14658 0,'18'-18'16,"53"18"-1,-19 0-15,37 0 16,-1 0-16,18 18 15,35-18-15,-18 18 0,195-18 16,-142 0-16,230 0 16,-212 0-16,176 17 15,-229-17-15,124 18 16,-177-1-16,36 1 16,-89-18-16</inkml:trace>
   <inkml:trace contextRef="#ctx0" brushRef="#br0" timeOffset="229294.6358">23442 7514 0,'0'18'31,"0"-1"-15,0 1-16,0 0 15,18-1 1,-1-17-16,1 0 15,0 0 1,-1 0-16,-17-17 16,0-1-16,0 0 15,-17 1 1,-1 17-16,0 0 16,1 0-1,17 17-15,0 1 16,17-18-1,1 18 1,0-18-16,-18-18 16,0 0 31,-18 18-47,18 18 31,0 0-16,18-18-15,-1 17 16,-17 1-16,18-18 16,-18-18 15,-35 1-31,17-1 16,-17 0-16,17 1 15,0 17 1,18 17-1,18 1 1,0-18-16,17 0 16,-17 18-16,-1-18 15,-34 0 1,-1 0 0,0 0-16,-17 17 15</inkml:trace>
@@ -4604,13 +4604,13 @@
   <inkml:trace contextRef="#ctx0" brushRef="#br0" timeOffset="260498.1042">24289 6826 0,'-18'0'31,"18"18"-31,0 0 16,-18-18-16,18 17 0,-17 18 16,-1 1-16,1-19 15,-19 19 1,1-1-16,17-17 0,-35 17 15,36-18-15,-36 19 16,18-19-16,-1 1 16,19 17-16,-19-17 0,1 0 15,-18 17 1,18-17-16,-18 34 16,18-52-16,-18 36 15,18-19-15,-1 1 16,19-18-16,-19 18 0,-17 17 15,18-17-15,-18 17 16,36-18-16,-19 1 16,19 0-16,-19-1 15,19-17-15,17 18 16,-18-18-16,-17 18 16,17-1-16,-17 1 15,17 0-15,1-1 16,-19-17-16,1 35 15,17-17-15,-17 0 16,18-18-16,-19 17 16,19 1-16,-1 0 15,-17-1 1,17 1-16,0 0 16,1-18-16,-1 17 15,1-17-15,-1 18 0,0-18 16,1 18-1,-1-18-15,0 17 0,1-17 16,-1 18-16,-17-18 16,17 17-1,-17-17-15,17 18 16,1-18-16,-19 18 16,19-18-16,-1 0 15,0 0-15,-17 17 16,0-17-16,-18 0 15,18 18-15,-36-18 16,36 0-16,0 18 16,-36-18-1,36 17-15,-1-17 0,1 0 16,-18 18-16,36-18 16,-19 0-16,19 0 0,-36 18 15,17-18-15,19 0 16,-18 0-16,17 0 0,-17 0 15,-18 17 1,17-17-16,-16 18 16,16-18-16,1 0 15,17 17-15,1-17 0,-19 0 16,19 0-16,-18 0 16,17 0-16,-17 18 15,17-18 1,0 18-16,1-18 15,17 17 220,17-17-141,1 0-48,0 0-30,-1 0 0,1 0-1,-18-17-15</inkml:trace>
   <inkml:trace contextRef="#ctx0" brushRef="#br2" timeOffset="277371.2336">6015 14199 0,'0'18'31,"0"0"-15,0 17 0,0-17-1,0-1-15,0 1 0,18 17 16,-18-17-16,17 17 15,1-17-15,52-1 16,-34 1-16,87-18 16,-52 18-16,87-18 15,-87 0-15,88 17 16,-89-17-16,1-17 16,52-19-1,-70 36-15,-18-35 0,1 17 16,-19 1-16,1-1 0,-18 0 15,0 1-15,0-1 0,0 1 16,-35-1-16,17 18 16,-17 0-1</inkml:trace>
   <inkml:trace contextRef="#ctx0" brushRef="#br2" timeOffset="278951.1196">11359 14517 0,'0'-18'16,"0"1"-16,0 34 47,18 1-32,-18-1-15,0 1 16,0 0-16,18-1 15,-18 1-15,17-18 16,19 18 0,-19-1-16,1-17 0,17 18 15,36-18-15,-36 0 16,71 0-16,-53 0 16,53 18-1,-36-18-15,18 0 0,-17 17 0,105 1 16,-87-18-1,105 17-15,-89-17 16,72 18-16,-71 0 16,88-18-16,-89 17 15,89-17 1,-88 0-16,0 0 0,-18 0 16,-17 0-16,-1 0 0,1 0 15,-18 0-15,0 0 0,-18 0 16,53-17-16,-52 17 15,34 0 1,-35 17-16,18-17 16,-35 0-16,0 0 15,-18-17-15,0-1 16,0-35 0,0 36-1,-18-19-15,0-17 16,1 18-16,17 17 0,0 1 15,-18 17-15</inkml:trace>
-  <inkml:trace contextRef="#ctx0" brushRef="#br2" timeOffset="280435.1659">17798 14429 0,'0'17'78,"0"19"-63,17-1-15,-17-18 16,0 19-16,0-1 16,18-17-16,-18 35 15,0-36-15,18 1 16,-18-1-16,0 1 47,17 0-32,1-1-15,-1 1 16,1 0-16,35-1 16,-35-17-1,35 0-15,-18 0 16,53 0-16,-53 0 16,54 0-16,-37 0 15,37 0-15,-36 0 16,70 0-16,-70 0 15,53 36 1,-53-36-16,17 17 0,-17-17 16,71 18-1,-71-18-15,70 18 0,-52-18 16,-1 0-16,-17 0 16,88 17-16,-88-17 15,18 0-15,-18 0 0,17 18 16,1-18-16,87 0 15,-69 0-15,-1 0 0,88 0 16,-88 0 0,-17 0-16,0 0 0,-19-18 15,54 18-15,-53 0 16,-18 0-16,18 18 16,-17-18-16,-19 0 0,1 0 15,0 0 1,-1 0-16,1 0 31,-1-18-15,1 18-16,-18-17 0,18 17 15,-18-18-15,0 0 16,0 1-16,0-1 0,0-17 16,-18 17-1,0 0-15,18 1 16,-17-1-16</inkml:trace>
+  <inkml:trace contextRef="#ctx0" brushRef="#br2" timeOffset="280435.1658">17798 14429 0,'0'17'78,"0"19"-63,17-1-15,-17-18 16,0 19-16,0-1 16,18-17-16,-18 35 15,0-36-15,18 1 16,-18-1-16,0 1 47,17 0-32,1-1-15,-1 1 16,1 0-16,35-1 16,-35-17-1,35 0-15,-18 0 16,53 0-16,-53 0 16,54 0-16,-37 0 15,37 0-15,-36 0 16,70 0-16,-70 0 15,53 36 1,-53-36-16,17 17 0,-17-17 16,71 18-1,-71-18-15,70 18 0,-52-18 16,-1 0-16,-17 0 16,88 17-16,-88-17 15,18 0-15,-18 0 0,17 18 16,1-18-16,87 0 15,-69 0-15,-1 0 0,88 0 16,-88 0 0,-17 0-16,0 0 0,-19-18 15,54 18-15,-53 0 16,-18 0-16,18 18 16,-17-18-16,-19 0 0,1 0 15,0 0 1,-1 0-16,1 0 31,-1-18-15,1 18-16,-18-17 0,18 17 15,-18-18-15,0 0 16,0 1-16,0-1 0,0-17 16,-18 17-1,0 0-15,18 1 16,-17-1-16</inkml:trace>
   <inkml:trace contextRef="#ctx0" brushRef="#br2" timeOffset="281636.98">24430 14640 0,'0'18'15,"0"0"1,0-1-16,0 1 15,0-1-15,0 19 16,0-1 0,0 0-16,0-17 15,0 17-15,0 1 16,18-19-16,17 1 16,18-1-1,-18-17-15,18 0 0,53 0 16,17 0-1,-52 18-15,105-18 16,-70 0-16,106-18 16,-89 18-16,142-17 15,-124 17-15,141-18 16,-158 18-16,140-17 16,-140 17-16,105 17 15,-141-17-15,18 0 16,-36 0-16,19 0 0,16 0 15,-52 0-15,18 0 16,-53 0 0,17 0-16,-17 0 15,-1 0-15,1 0 47,-1 0-31,1-17-16,0 17 15,-1 0-15,1-18 16,-18 0 0,18 1-1,-36-1-15,0-17 16</inkml:trace>
   <inkml:trace contextRef="#ctx0" brushRef="#br2" timeOffset="282984.4346">30163 14570 0,'0'17'0,"17"-17"16,-17 18-16,0 0 15,0-1 1,0 19-16,0-1 0,0-18 16,0 1-16,0 0 15,0-1-15,0 1 16,18 0-16,-1-18 16,36 17-16,-17-17 15,-1 0-15,124 18 16,-36-18-1,-52 18-15,17-18 16,53 17 0,-53 1-16,71 0 0,-89-18 15,107 17-15,-89-17 16,106 0 0,-106 0-16,0 0 0,-17-17 15,53 17-15,-72 0 16,19-18-16,-36 18 15,1 0-15,-19 0 16,18 0 0,-17 0-16,17 0 15,-17 18-15,0-18 32,-1 0-1,-17-18-31,18-17 15,-18 17 1,0-17-16,-18-1 16,18 19-1</inkml:trace>
-  <inkml:trace contextRef="#ctx0" brushRef="#br0" timeOffset="309523.5517">7567 16510 0,'0'-18'15,"0"1"1,0-1-16,0-17 16,0 17-16,0-17 15,-18 35-15,-17-18 16,0 18-16,0 0 16,17 18-16,-17 0 0,-36 52 15,54-35 1,-19 71-16,19-53 15,17 18-15,35 52 16,-17-70-16,17 0 16,53 35-16,-35-70 15,0-1-15,53-17 16,-53-17-16,35-18 16,-53-1-16,0-52 15,-17 35-15,-36-53 16,-17 18-1,-53 0-15,53 53 16,-1-1-16,-52 1 16,53 35-16,-18-18 15,35 18-15,18 18 16,18-18-16,17 0 16</inkml:trace>
+  <inkml:trace contextRef="#ctx0" brushRef="#br0" timeOffset="309523.5516">7567 16510 0,'0'-18'15,"0"1"1,0-1-16,0-17 16,0 17-16,0-17 15,-18 35-15,-17-18 16,0 18-16,0 0 16,17 18-16,-17 0 0,-36 52 15,54-35 1,-19 71-16,19-53 15,17 18-15,35 52 16,-17-70-16,17 0 16,53 35-16,-35-70 15,0-1-15,53-17 16,-53-17-16,35-18 16,-53-1-16,0-52 15,-17 35-15,-36-53 16,-17 18-1,-53 0-15,53 53 16,-1-1-16,-52 1 16,53 35-16,-18-18 15,35 18-15,18 18 16,18-18-16,17 0 16</inkml:trace>
   <inkml:trace contextRef="#ctx0" brushRef="#br0" timeOffset="310037.1302">8061 16792 0,'0'18'31,"18"0"-15,-1-18 0,-17 17-16,18-17 0</inkml:trace>
   <inkml:trace contextRef="#ctx0" brushRef="#br0" timeOffset="310504.7574">8484 16457 0,'0'0'16,"0"-35"-16,0 17 0,-17 18 15,-1 0-15,0 0 16,-35 53-16,36-35 16,-1 35-16,1 35 15,-1-35-15,18-18 0,0 0 16,18 1-16,-1-1 0,18 0 16,-17-17-1,35-18-15,-35-18 16,35-17-16,-36 17 15,1-35-15,0 18 16,-18-36 0,0 36-16,0-35 15,0 34-15,0 1 16,-18 35-16,36 35 16,-18 54-1,17 16 1,-17-34-16,18-18 15,-18 17-15,17 36 16,1-70-16,0 34 16,-1-52-16,-17-1 0,18 1 15,0 0-15</inkml:trace>
-  <inkml:trace contextRef="#ctx0" brushRef="#br0" timeOffset="312051.0482">8855 16087 0,'0'17'16,"0"19"0,17-19-16,-17 36 15,0-35-15,18 17 16,-18 0-16,0-17 16,0 0-16,18-18 0,-1 0 15</inkml:trace>
+  <inkml:trace contextRef="#ctx0" brushRef="#br0" timeOffset="312051.0481">8855 16087 0,'0'17'16,"0"19"0,17-19-16,-17 36 15,0-35-15,18 17 16,-18 0-16,0-17 16,0 0-16,18-18 0,-1 0 15</inkml:trace>
   <inkml:trace contextRef="#ctx0" brushRef="#br0" timeOffset="312329.7277">9066 16140 0,'0'0'15,"0"53"-15,0-18 0,0-18 16,18 36-16,0-35 15,-1 0-15,54-1 16,-53-34-16,52-19 16,-52 19-16,17-36 15,-35 35-15,-18-17 16,1 17-16,-1 1 16,-52-1-16,34 18 15,-17 18-15,36-1 16,17 1-16,0 0 15</inkml:trace>
   <inkml:trace contextRef="#ctx0" brushRef="#br0" timeOffset="313947.3695">9772 16757 0,'18'0'31,"-1"-35"-15,1-1-16,17-17 16,-17 18-1,-1 18-15,1-19 16,-18 19-16,18 34 16,-18 54-1,0-36-15,17 18 16,-17-18-1,18 1-15,0-19 16,-1-17-16,1 0 16,0 0-16,-1-17 0,1-19 15,-1 19-15,1-19 0,0-17 16,-1 18 0,-17 18-16,18-1 15,-18 36 1,0-1-16,0 1 15</inkml:trace>
   <inkml:trace contextRef="#ctx0" brushRef="#br0" timeOffset="314264.8849">9825 17039 0,'0'0'16,"0"-17"-16,18-1 16,-1 0-16,1 1 0,-1-1 15,19-17 1,-19 35-16,1 0 16,-18 17-1,0 19-15,0-19 16,18 1-16,-1-18 15,19 0 1,-19-18-16,-17 1 16,18 17-16,-1-18 0,1-17 15,0 17-15,-1 0 16</inkml:trace>
@@ -4628,8 +4628,8 @@
   <inkml:trace contextRef="#ctx0" brushRef="#br0" timeOffset="323667.268">18045 16563 0,'17'0'15,"-34"0"-15,70 0 0,-36 0 0,54 0 16,-36 0 0,18 0-16,-18 0 15</inkml:trace>
   <inkml:trace contextRef="#ctx0" brushRef="#br0" timeOffset="324196.8367">18750 16404 0,'0'-17'15,"-17"17"-15,-1 0 16,0 17-16,1 1 16,-1-1-16,-35 36 15,35-35-15,1 17 16,-1-17-16,36 17 16,-18-17-16,17-18 0,36 17 15,-35-17-15,0 0 16,-1 0-16,1 0 15,-36 0 1,-17 18 0,17 0-16,1-1 0,17 1 15,-18 35-15,18-35 16,0 17-16,18-17 16,17-1-1,0-17-15,18 0 16,-18 0-16,-17 0 15,0-17-15</inkml:trace>
   <inkml:trace contextRef="#ctx0" brushRef="#br0" timeOffset="324920.5634">18927 16016 0,'17'0'31,"1"18"-15,-1-1-16,1 1 0,17 53 15,18-1 1,-17-17-16,-1 0 15,18 70-15,-18-52 16,0 52-16,-35-70 16,0 0-16,0 0 0,-17 53 15,-1-71-15,-17 36 16,17-36 0,-35 18-16,18-35 15</inkml:trace>
-  <inkml:trace contextRef="#ctx0" brushRef="#br0" timeOffset="329146.145">17374 17321 0,'0'-17'31,"0"34"0,0 1-15,18 0-16,0-18 15,17 35 1,-17-35-16,-1 18 0,18-18 0,1 17 16,-1-17-16,36 0 15,-19 0-15,72 18 16,-71-18-16,17 18 16,1-1-16,17 1 0,71-1 15,-71-17-15,106-17 16,-106 17-1,-17-18-15,35 18 16,-53-17-16,17 17 16,-52 17-16,-1-17 0,19 0 15,-19 0 1</inkml:trace>
-  <inkml:trace contextRef="#ctx0" brushRef="#br0" timeOffset="329630.5507">18027 17727 0,'-35'18'0,"70"-36"0,-106 53 16,54-17-16,-1 0 0,0 52 15,1-35-15,17 54 16,0-54-16,0 0 16,53 1-1,-18-19-15,36-17 16,17-35 0,-71 17-16,19-17 0,-19 17 0,1-17 15,-18 17-15,-18-35 16,1 36-16,-36-18 15,18 17-15,-1 0 16,19 18-16,-19 0 16,19 18-16,-1-18 0,0 35 15,36-17 1</inkml:trace>
+  <inkml:trace contextRef="#ctx0" brushRef="#br0" timeOffset="329146.1449">17374 17321 0,'0'-17'31,"0"34"0,0 1-15,18 0-16,0-18 15,17 35 1,-17-35-16,-1 18 0,18-18 0,1 17 16,-1-17-16,36 0 15,-19 0-15,72 18 16,-71-18-16,17 18 16,1-1-16,17 1 0,71-1 15,-71-17-15,106-17 16,-106 17-1,-17-18-15,35 18 16,-53-17-16,17 17 16,-52 17-16,-1-17 0,19 0 15,-19 0 1</inkml:trace>
+  <inkml:trace contextRef="#ctx0" brushRef="#br0" timeOffset="329630.5506">18027 17727 0,'-35'18'0,"70"-36"0,-106 53 16,54-17-16,-1 0 0,0 52 15,1-35-15,17 54 16,0-54-16,0 0 16,53 1-1,-18-19-15,36-17 16,17-35 0,-71 17-16,19-17 0,-19 17 0,1-17 15,-18 17-15,-18-35 16,1 36-16,-36-18 15,18 17-15,-1 0 16,19 18-16,-19 0 16,19 18-16,-1-18 0,0 35 15,36-17 1</inkml:trace>
   <inkml:trace contextRef="#ctx0" brushRef="#br0" timeOffset="329780.3933">18256 17868 0,'-17'0'16,"34"-17"0,1 17-16</inkml:trace>
   <inkml:trace contextRef="#ctx0" brushRef="#br0" timeOffset="330141.2901">18627 17692 0,'0'0'16,"-18"0"-16,0 0 0,1 17 15,-1-17-15,-17 53 16,35-17-16,-18 34 15,18-52-15,0 17 16,35 0 0,-17-17-16,35-18 15,-18-18-15,18-17 16,-35 17-16,-18 1 0,18-54 16,-18 54-16,0-19 15,-18 19-15,0 17 16,1 17-1,-1 1-15,18 53 16,0-19-16,18 54 16,-1-70-16,1-1 0,35 0 15,-36-17-15,-17-1 16,18-17-16</inkml:trace>
   <inkml:trace contextRef="#ctx0" brushRef="#br0" timeOffset="331921.0733">19350 15734 0,'0'-18'0,"18"18"31,-18 18 0,0 17-31,0 0 16,0 18-16,0-17 16,17 17-1,-17-36-15,0 1 0,0-1 16,18-17-16,-18 18 16,17-18-16,-17-18 15</inkml:trace>
@@ -4639,7 +4639,7 @@
   <inkml:trace contextRef="#ctx0" brushRef="#br0" timeOffset="333949.9954">20567 16704 0,'0'0'0,"18"18"15,17-18-15,18 0 16,-18 0-16,0 0 0,18 0 15</inkml:trace>
   <inkml:trace contextRef="#ctx0" brushRef="#br0" timeOffset="335614.8705">21555 16122 0,'0'-18'16,"17"18"-1,-17 18 17,0 53-17,0-36-15,0 71 16,0-71-16,18 18 0,-18-18 15,18 18-15,-1-35 16,-17 17-16,0-17 16,0-1-16</inkml:trace>
   <inkml:trace contextRef="#ctx0" brushRef="#br0" timeOffset="335885.319">21237 16722 0,'-17'0'0,"34"0"0,-17 0 16,36 0 0,-1 0-16,0 0 15,18-18-15,70 18 16,-70 0-16,71 0 15,-71 18-15,-18-18 16,18 0-16,-18 0 0,-17 0 0,0 0 16,17 0-16,-53 0 31</inkml:trace>
-  <inkml:trace contextRef="#ctx0" brushRef="#br0" timeOffset="336715.3827">21519 17110 0,'0'17'16,"18"-17"0,0 18-1,-1-18-15,19 0 0,-1 0 16,0 0-16,0 0 15,-17 0-15,17-18 16,-17 18 0,-18-17-16,-18-1 15,1 0 1,-1 18-16,-17-35 16,17 35-16,-17-17 15,0 17-15,17 0 16,0 0-16,-17 0 0,17 0 15,-34 35-15,34-18 16,-17 36-16,35-35 16,-18 53-1,18-54-15,0 18 0,35 18 16,1-35-16,-1 0 16,0-18-16,36 35 15,-18-35-15,-18 0 0,71 0 16,-89 0-1</inkml:trace>
+  <inkml:trace contextRef="#ctx0" brushRef="#br0" timeOffset="336715.3826">21519 17110 0,'0'17'16,"18"-17"0,0 18-1,-1-18-15,19 0 0,-1 0 16,0 0-16,0 0 15,-17 0-15,17-18 16,-17 18 0,-18-17-16,-18-1 15,1 0 1,-1 18-16,-17-35 16,17 35-16,-17-17 15,0 17-15,17 0 16,0 0-16,-17 0 0,17 0 15,-34 35-15,34-18 16,-17 36-16,35-35 16,-18 53-1,18-54-15,0 18 0,35 18 16,1-35-16,-1 0 16,0-18-16,36 35 15,-18-35-15,-18 0 0,71 0 16,-89 0-1</inkml:trace>
   <inkml:trace contextRef="#ctx0" brushRef="#br0" timeOffset="342580.3979">22490 8714 0,'-36'0'16,"19"0"-16,-19 0 16,19-18-16,-1 18 15,0 0 1,36 0 15,0 0-31,-1 18 0,36-18 16,36 17-16,-19-17 15,71 18 1,-53-18-16,1 18 0,105-18 16,-89 17-16,89-17 15,-105 0-15,-1 0 16,53 0-16,-88 0 16,0-17-1,-36 17-15,-34 0 16,-18 0-1,17 0-15</inkml:trace>
   <inkml:trace contextRef="#ctx0" brushRef="#br0" timeOffset="342865.9499">23707 8625 0,'0'18'16,"0"-36"-16,17 36 0,54 17 16,-36-17-16,36-18 15,-18 18-15,0-18 0,-1 17 0,19-17 16,-36 18-16,1 0 0,16-1 16,-34-17-1,-18 18-15,-18-1 16,1-17-16,-54 18 15,36-18-15,-18 18 16,35-18-16,1 0 0,-18 0 16,17 0-1</inkml:trace>
   <inkml:trace contextRef="#ctx0" brushRef="#br0" timeOffset="343438.0605">22772 8608 0,'17'-18'16,"-34"18"-1,-1 0-15,-17 18 16,-18-1-16,18-17 15,-18 36-15,18-36 16,-18 35 0,17-35-16,1 18 15,17-18-15,1 17 16,17 1-16,17 0 0,1-1 16,17 1-16,54 35 15,-54-36-15,53 19 16,-53-36-16</inkml:trace>
@@ -4657,7 +4657,7 @@
   <inkml:trace contextRef="#ctx0" brushRef="#br0" timeOffset="395735.6662">25665 16704 0,'0'0'16,"0"-35"-16,0 17 0,-18-17 15,0 17-15,-17-17 16,17 35-16,1 0 15,-19 0 1,1 35-16,18-17 16,-1 17-16,18 36 15,0-36-15,0 0 0,53 18 16,-36-35-16,19-18 16,-1 17-16,-17-17 0,17 0 15,-17 0-15,17-17 16,-17-1-16,-1 1 0,-17-19 15,18 19-15,-18-36 16,0 17-16,-18-17 16,18 36-16,-17-1 0,-1-17 15,18 53 17,0 34-32,18 37 15,-1-36-15,1 35 16,-1-53-16,19 53 15,-36-52-15,17 16 16,-17-16-16,18-1 16</inkml:trace>
   <inkml:trace contextRef="#ctx0" brushRef="#br0" timeOffset="396135.7726">25947 16545 0,'0'0'15,"-53"-17"-15,35 17 0,1 17 16,-1 36 0,18-18-16,18 1 0,-1 17 15,36 35-15,0-53 16,-18 18-16,1-35 0,17 17 15,-18 0-15,-18-17 16,1 17-16,-18-17 0,-18 35 16,-17-36-16,0 1 15,0 0-15,-18-18 0,-35 0 16,35 0-16,17-18 16,1-17-16,53 17 15,-1-17-15,19 17 16,69-52-16,-34 17 15,35-18-15,-53 18 16,-18 18-16,0 17 0,-17 1 16,-18-1-16,-53 0 15,18 18-15,-18-17 16,0 17-16</inkml:trace>
   <inkml:trace contextRef="#ctx0" brushRef="#br0" timeOffset="396931.9094">25259 16898 0,'18'0'31,"-1"0"-16,1 0 1,-18-18 0,-18 1-1,1 17 17,34 0-17,-17 17 1,18-17-16,-1 0 15,-17-17-15,18 17 16,-18-18 0,-18 18-16,1 0 15,-1 18 1,18-1-16,0 1 16,0 0-1,18-18-15,-1 0 16,1 0-1,0 0-15,-36-18 16,18 0-16,-35 18 16,17 0-16,1 0 15,-1 0 1,36 18 0,-1-18-1,1 0-15,-1 0 16</inkml:trace>
-  <inkml:trace contextRef="#ctx0" brushRef="#br0" timeOffset="397798.6483">25964 16669 0,'-17'-18'15,"17"0"1,-18 18-1,1-17-15,17-1 16,-18 18-16,18-17 16,18 17-16,-1-18 15,1 18-15,17 0 0,18 0 16,-18 0-16,18 0 16,-18 18-1,-17-1-15</inkml:trace>
+  <inkml:trace contextRef="#ctx0" brushRef="#br0" timeOffset="397798.6482">25964 16669 0,'-17'-18'15,"17"0"1,-18 18-1,1-17-15,17-1 16,-18 18-16,18-17 16,18 17-16,-1-18 15,1 18-15,17 0 0,18 0 16,-18 0-16,18 0 16,-18 18-1,-17-1-15</inkml:trace>
   <inkml:trace contextRef="#ctx0" brushRef="#br0" timeOffset="400246.0464">26511 15822 0,'0'0'0,"18"-18"16,17 1-16,0-1 16,36 18-16,-18 0 15,17 0 1,-52 18-16,0-1 0,-1 1 16,-17 17-16,0-17 0,-17 17 15,-1-17-15,0 17 0,-17-17 16,18 17-16,-19 0 15,19-17-15,17 0 16,0-1-16,0 1 0,17-18 16,19 0-1,-19 18-15</inkml:trace>
   <inkml:trace contextRef="#ctx0" brushRef="#br0" timeOffset="400367.934">26776 16334 0,'0'0'16,"17"35"-16,1-35 0,0 0 0,-1 18 16,1-18-16</inkml:trace>
   <inkml:trace contextRef="#ctx0" brushRef="#br0" timeOffset="402254.7049">25594 18062 0,'0'0'16,"-35"-17"-16,17-1 0,0 18 16,-17 0-1,18 0-15,-36 53 16,35-35-16,0 34 0,-17 37 15,35-36-15,18 35 16,17-53-16,36 36 16,-36-54-1,71-17-15,-53 0 0,35-35 16,-71 0 0,19-18-16,-36 17 15,-18-34-15,-17 52 16,17-17-16,-17 0 0,0 17 15,-36-17-15,36 17 16,-18 18 0,53 18-16,0-1 0,0 1 15,35 0-15,0-1 0</inkml:trace>
@@ -4665,13 +4665,13 @@
   <inkml:trace contextRef="#ctx0" brushRef="#br0" timeOffset="402754.2742">26370 18045 0,'-70'0'16,"52"0"-16,-17 17 0,-18 19 15,35-1-15,0 35 16,18-52-16,18 35 15,0-18-15,17-17 16,0-18-16,18-18 16,-35 1-16,0-1 15,17-35 1,-18 0-16,-17 18 16,0 17-16,-17 1 0,-1-1 15,18 36 1,0 52-1,0-35-15,18 71 16,-18-53-16,17 0 16,1-18-16,17 36 15,-17-54-15,0 19 16</inkml:trace>
   <inkml:trace contextRef="#ctx0" brushRef="#br0" timeOffset="403149.9438">26670 18133 0,'0'0'0,"-18"-18"0,1 18 0,-1 18 16,0-18-16,18 35 0,0 18 16,0-18-16,18 18 15,0-18-15,-1 1 16,19-1-16,17 18 15,-36-35-15,1 34 16,-1-34-16,-52 17 16,18-17-16,-1-18 15,-17 18-15,-36-18 16,53-18-16,1 0 0,-18-35 16,17 18-16,18 0 15,35-18-15,0 18 16,36-18-1,-36 18-15,1-1 0,-1 1 16,-18 17-16,1-17 0,0 0 16,-36 17-16,0 1 15,-17 17-15,-18 0 16,18 17-16,-18 1 16</inkml:trace>
   <inkml:trace contextRef="#ctx0" brushRef="#br0" timeOffset="404385.4544">27076 17657 0,'17'0'16,"-17"-18"-16,36 18 16,-19 0-16,-17-18 15,18 18-15,0 0 16,-36 0 0,0 0-1,1 0-15,-36 0 16,35 18-1,0 0-15,1-1 0,-1 1 16,1-1-16,17 1 16,17 0-1,1-1-15,35 19 16,-36-36-16,36 17 16,-17 1-16,-19 0 0,-17-1 15,18-17-15,-18 18 0,-18-1 16,1-17-16,-19 0 15,1 18-15,0-18 16,17 0-16,-17-18 16,52 36 15</inkml:trace>
-  <inkml:trace contextRef="#ctx0" brushRef="#br0" timeOffset="404683.7468">27393 17762 0,'-35'53'15,"35"-35"-15,0 17 16,18-17-16,-1 17 0,36 0 15,-18-35-15,1 0 16,-1 0-16,53-17 16,-70-1-16,35-52 15,-53 34-15,0 19 0,-18-54 16,-17 53-16,17 1 16,-17-1-16,-18 1 15,18 17-15,-36 17 16,36 1-16</inkml:trace>
+  <inkml:trace contextRef="#ctx0" brushRef="#br0" timeOffset="404683.7467">27393 17762 0,'-35'53'15,"35"-35"-15,0 17 16,18-17-16,-1 17 0,36 0 15,-18-35-15,1 0 16,-1 0-16,53-17 16,-70-1-16,35-52 15,-53 34-15,0 19 0,-18-54 16,-17 53-16,17 1 16,-17-1-16,-18 1 15,18 17-15,-36 17 16,36 1-16</inkml:trace>
   <inkml:trace contextRef="#ctx0" brushRef="#br0" timeOffset="405785.5396">28222 18397 0,'18'-17'15,"0"-1"1,-1 0-16,18-34 15,1 16-15,-1 1 16,-17 35-16,-18-18 16,17 18-16,1 0 15,-18 18-15,0 0 0,0-1 16,0 1-16,-18 35 16,18-36-16,0 1 15,0 0-15,18-1 0,0 1 16,17-36-1,0 18-15,0-35 16,-17 35-16,0-35 16,-1 17-16,-17 1 15,18-1-15,-18 0 0,-18 18 32,18 18-17</inkml:trace>
   <inkml:trace contextRef="#ctx0" brushRef="#br0" timeOffset="406141.8307">28328 18538 0,'0'18'15,"18"-18"1,17-18-1,-17 1-15,35-1 16,-36 18-16,1 0 31,-18 18-15,-18-18-16,36 17 31,-1-17-31,1 18 16,17-18-1,-17 0-15,17 0 16,-17-18-16,0 1 16,-18-1-1,0 1 1,17-1-16,-17 0 0</inkml:trace>
   <inkml:trace contextRef="#ctx0" brushRef="#br0" timeOffset="406418.0986">29051 17745 0,'0'0'0,"-17"0"0,17 35 15,-18 18 1,18-18-16,0 36 16,0-18-16,18 0 0,-18 0 15,17-18-15,1 0 0,17 36 16,-35-54-16,35 19 16</inkml:trace>
   <inkml:trace contextRef="#ctx0" brushRef="#br0" timeOffset="406602.7136">28875 18415 0,'0'0'16,"53"-18"-16,0 18 0,0-17 0,0-1 15,70-17-15,-35 17 16,53-17-1,-88 35-15,-17 0 0,-19 0 16,-34 18 0</inkml:trace>
   <inkml:trace contextRef="#ctx0" brushRef="#br0" timeOffset="407091.4008">29104 18644 0,'0'0'0,"18"0"15,-1 0-15,1 0 0,17 18 16,18-36-16,-35 18 16,35-17-16,-36-1 15,19 0 1,-36 1-16,-18-1 16,0 18-16,1-18 15,-54 18-15,54 0 16,-54 18-16,36-18 15,-18 35 1,35-17-16,1 17 16,17 1-16,0-19 15,17 1-15,1 17 0,17-17 0,-17-18 16,17 17-16,18-17 0,35 18 16,-35-18-16,18 0 15,-36 0-15,-17 0 16,-1 0-16,-34 0 15,-54 0 1</inkml:trace>
-  <inkml:trace contextRef="#ctx0" brushRef="#br0" timeOffset="408526.5481">24148 18468 0,'-18'0'16,"18"18"0,18-18-1,35 0 1,-18 0-1,53-18-15,0 18 16,-52-18-16,16 18 16,-16 0-16,17 0 15,-36 0-15,1 18 16,0-18-16</inkml:trace>
+  <inkml:trace contextRef="#ctx0" brushRef="#br0" timeOffset="408526.548">24148 18468 0,'-18'0'16,"18"18"0,18-18-1,35 0 1,-18 0-1,53-18-15,0 18 16,-52-18-16,16 18 16,-16 0-16,17 0 15,-36 0-15,1 18 16,0-18-16</inkml:trace>
   <inkml:trace contextRef="#ctx0" brushRef="#br0" timeOffset="408748.8353">24500 18362 0,'0'0'0,"18"0"0,0 0 16,35 18-16,-18-18 16,18 17-1,-18 1-15,-17 0 0,-1-1 16,-17 1-16,0 17 0,-17 18 15,-19-18-15,-34 1 16,35-19-16,-18 1 16,-18 17-16,36-35 15,17 0-15</inkml:trace>
   <inkml:trace contextRef="#ctx0" brushRef="#br0" timeOffset="411206.988">25453 18909 0,'0'-18'15,"0"1"48,-18 17-47,1 0-1,17 17 1,-18-17-16,18 18 31,18-36-15,-1 18-1,1 0-15,17-17 16,-17 17-16,70-18 16,-53 18-16,18 0 0,0 0 15,0 0-15,18 0 16,-1 0-16,1 0 0,-1 0 0,18 0 15,124-18 1,-106 1-16,123-1 16,-123 0-16,53 18 15,-89 0-15,19 18 16,-36 0-16,-36-1 16,18 1-16,-17 0 15,-18-1-15,18-17 0,-18-17 31</inkml:trace>
   <inkml:trace contextRef="#ctx0" brushRef="#br0" timeOffset="419259.086">27146 18256 0,'18'0'31,"-18"-17"-15</inkml:trace>
@@ -4783,7 +4783,7 @@
           <a:p>
             <a:fld id="{7627361B-9EE3-994B-868D-94E57ECC4CDF}" type="datetimeFigureOut">
               <a:rPr lang="en-US" smtClean="0"/>
-              <a:t>9/10/2017</a:t>
+              <a:t>1/23/18</a:t>
             </a:fld>
             <a:endParaRPr lang="en-US"/>
           </a:p>
@@ -5179,7 +5179,7 @@
           <a:p>
             <a:fld id="{456513CB-B5C6-794C-B9FC-914286F7D4D4}" type="datetimeFigureOut">
               <a:rPr lang="en-US" smtClean="0"/>
-              <a:t>9/10/2017</a:t>
+              <a:t>1/23/18</a:t>
             </a:fld>
             <a:endParaRPr lang="en-US"/>
           </a:p>
@@ -5347,7 +5347,7 @@
           <a:p>
             <a:fld id="{456513CB-B5C6-794C-B9FC-914286F7D4D4}" type="datetimeFigureOut">
               <a:rPr lang="en-US" smtClean="0"/>
-              <a:t>9/10/2017</a:t>
+              <a:t>1/23/18</a:t>
             </a:fld>
             <a:endParaRPr lang="en-US"/>
           </a:p>
@@ -5525,7 +5525,7 @@
           <a:p>
             <a:fld id="{456513CB-B5C6-794C-B9FC-914286F7D4D4}" type="datetimeFigureOut">
               <a:rPr lang="en-US" smtClean="0"/>
-              <a:t>9/10/2017</a:t>
+              <a:t>1/23/18</a:t>
             </a:fld>
             <a:endParaRPr lang="en-US"/>
           </a:p>
@@ -5706,7 +5706,7 @@
           <a:p>
             <a:fld id="{456513CB-B5C6-794C-B9FC-914286F7D4D4}" type="datetimeFigureOut">
               <a:rPr lang="en-US" smtClean="0"/>
-              <a:t>9/10/2017</a:t>
+              <a:t>1/23/18</a:t>
             </a:fld>
             <a:endParaRPr lang="en-US"/>
           </a:p>
@@ -5980,7 +5980,7 @@
           <a:p>
             <a:fld id="{456513CB-B5C6-794C-B9FC-914286F7D4D4}" type="datetimeFigureOut">
               <a:rPr lang="en-US" smtClean="0"/>
-              <a:t>9/10/2017</a:t>
+              <a:t>1/23/18</a:t>
             </a:fld>
             <a:endParaRPr lang="en-US"/>
           </a:p>
@@ -6209,7 +6209,7 @@
           <a:p>
             <a:fld id="{456513CB-B5C6-794C-B9FC-914286F7D4D4}" type="datetimeFigureOut">
               <a:rPr lang="en-US" smtClean="0"/>
-              <a:t>9/10/2017</a:t>
+              <a:t>1/23/18</a:t>
             </a:fld>
             <a:endParaRPr lang="en-US"/>
           </a:p>
@@ -6573,7 +6573,7 @@
           <a:p>
             <a:fld id="{456513CB-B5C6-794C-B9FC-914286F7D4D4}" type="datetimeFigureOut">
               <a:rPr lang="en-US" smtClean="0"/>
-              <a:t>9/10/2017</a:t>
+              <a:t>1/23/18</a:t>
             </a:fld>
             <a:endParaRPr lang="en-US"/>
           </a:p>
@@ -6690,7 +6690,7 @@
           <a:p>
             <a:fld id="{456513CB-B5C6-794C-B9FC-914286F7D4D4}" type="datetimeFigureOut">
               <a:rPr lang="en-US" smtClean="0"/>
-              <a:t>9/10/2017</a:t>
+              <a:t>1/23/18</a:t>
             </a:fld>
             <a:endParaRPr lang="en-US"/>
           </a:p>
@@ -6785,7 +6785,7 @@
           <a:p>
             <a:fld id="{456513CB-B5C6-794C-B9FC-914286F7D4D4}" type="datetimeFigureOut">
               <a:rPr lang="en-US" smtClean="0"/>
-              <a:t>9/10/2017</a:t>
+              <a:t>1/23/18</a:t>
             </a:fld>
             <a:endParaRPr lang="en-US"/>
           </a:p>
@@ -7060,7 +7060,7 @@
           <a:p>
             <a:fld id="{456513CB-B5C6-794C-B9FC-914286F7D4D4}" type="datetimeFigureOut">
               <a:rPr lang="en-US" smtClean="0"/>
-              <a:t>9/10/2017</a:t>
+              <a:t>1/23/18</a:t>
             </a:fld>
             <a:endParaRPr lang="en-US"/>
           </a:p>
@@ -7312,7 +7312,7 @@
           <a:p>
             <a:fld id="{456513CB-B5C6-794C-B9FC-914286F7D4D4}" type="datetimeFigureOut">
               <a:rPr lang="en-US" smtClean="0"/>
-              <a:t>9/10/2017</a:t>
+              <a:t>1/23/18</a:t>
             </a:fld>
             <a:endParaRPr lang="en-US"/>
           </a:p>
@@ -7523,7 +7523,7 @@
           <a:p>
             <a:fld id="{456513CB-B5C6-794C-B9FC-914286F7D4D4}" type="datetimeFigureOut">
               <a:rPr lang="en-US" smtClean="0"/>
-              <a:t>9/10/2017</a:t>
+              <a:t>1/23/18</a:t>
             </a:fld>
             <a:endParaRPr lang="en-US"/>
           </a:p>
@@ -8064,7 +8064,7 @@
           <p:cNvPr id="12" name="Group 11">
             <a:extLst>
               <a:ext uri="{FF2B5EF4-FFF2-40B4-BE49-F238E27FC236}">
-                <a16:creationId xmlns:a16="http://schemas.microsoft.com/office/drawing/2014/main" id="{94E5968C-CCF4-43FF-B85F-BE950CD4A528}"/>
+                <a16:creationId xmlns:a16="http://schemas.microsoft.com/office/drawing/2014/main" xmlns="" id="{94E5968C-CCF4-43FF-B85F-BE950CD4A528}"/>
               </a:ext>
             </a:extLst>
           </p:cNvPr>
@@ -8084,7 +8084,7 @@
             <p:cNvPr id="13" name="Picture 12">
               <a:extLst>
                 <a:ext uri="{FF2B5EF4-FFF2-40B4-BE49-F238E27FC236}">
-                  <a16:creationId xmlns:a16="http://schemas.microsoft.com/office/drawing/2014/main" id="{DF45BF25-4467-43A0-A613-67A6CCF398DC}"/>
+                  <a16:creationId xmlns:a16="http://schemas.microsoft.com/office/drawing/2014/main" xmlns="" id="{DF45BF25-4467-43A0-A613-67A6CCF398DC}"/>
                 </a:ext>
               </a:extLst>
             </p:cNvPr>
@@ -8114,7 +8114,7 @@
             <p:cNvPr id="14" name="Title 1">
               <a:extLst>
                 <a:ext uri="{FF2B5EF4-FFF2-40B4-BE49-F238E27FC236}">
-                  <a16:creationId xmlns:a16="http://schemas.microsoft.com/office/drawing/2014/main" id="{073FE5B0-2CAF-49A6-9789-5EEBF87010F8}"/>
+                  <a16:creationId xmlns:a16="http://schemas.microsoft.com/office/drawing/2014/main" xmlns="" id="{073FE5B0-2CAF-49A6-9789-5EEBF87010F8}"/>
                 </a:ext>
               </a:extLst>
             </p:cNvPr>
@@ -8515,14 +8515,14 @@
           </p:txBody>
         </p:sp>
       </p:grpSp>
-      <mc:AlternateContent xmlns:mc="http://schemas.openxmlformats.org/markup-compatibility/2006" xmlns:p14="http://schemas.microsoft.com/office/powerpoint/2010/main">
-        <mc:Choice Requires="p14">
+      <mc:AlternateContent xmlns:mc="http://schemas.openxmlformats.org/markup-compatibility/2006">
+        <mc:Choice xmlns:p14="http://schemas.microsoft.com/office/powerpoint/2010/main" Requires="p14">
           <p:contentPart p14:bwMode="auto" r:id="rId6">
             <p14:nvContentPartPr>
               <p14:cNvPr id="12" name="Ink 11">
                 <a:extLst>
                   <a:ext uri="{FF2B5EF4-FFF2-40B4-BE49-F238E27FC236}">
-                    <a16:creationId xmlns:a16="http://schemas.microsoft.com/office/drawing/2014/main" id="{BAAE0C59-923F-4BA1-A184-4D963C132BF7}"/>
+                    <a16:creationId xmlns:a16="http://schemas.microsoft.com/office/drawing/2014/main" xmlns="" id="{BAAE0C59-923F-4BA1-A184-4D963C132BF7}"/>
                   </a:ext>
                 </a:extLst>
               </p14:cNvPr>
@@ -8535,13 +8535,13 @@
             </p14:xfrm>
           </p:contentPart>
         </mc:Choice>
-        <mc:Fallback xmlns="">
+        <mc:Fallback>
           <p:pic>
             <p:nvPicPr>
               <p:cNvPr id="12" name="Ink 11">
                 <a:extLst>
                   <a:ext uri="{FF2B5EF4-FFF2-40B4-BE49-F238E27FC236}">
-                    <a16:creationId xmlns:a16="http://schemas.microsoft.com/office/drawing/2014/main" id="{BAAE0C59-923F-4BA1-A184-4D963C132BF7}"/>
+                    <a16:creationId xmlns:a16="http://schemas.microsoft.com/office/drawing/2014/main" xmlns:p14="http://schemas.microsoft.com/office/powerpoint/2010/main" xmlns="" id="{BAAE0C59-923F-4BA1-A184-4D963C132BF7}"/>
                   </a:ext>
                 </a:extLst>
               </p:cNvPr>
@@ -8845,7 +8845,7 @@
           <p:cNvPr id="12" name="Group 11">
             <a:extLst>
               <a:ext uri="{FF2B5EF4-FFF2-40B4-BE49-F238E27FC236}">
-                <a16:creationId xmlns:a16="http://schemas.microsoft.com/office/drawing/2014/main" id="{94E5968C-CCF4-43FF-B85F-BE950CD4A528}"/>
+                <a16:creationId xmlns:a16="http://schemas.microsoft.com/office/drawing/2014/main" xmlns="" id="{94E5968C-CCF4-43FF-B85F-BE950CD4A528}"/>
               </a:ext>
             </a:extLst>
           </p:cNvPr>
@@ -8865,7 +8865,7 @@
             <p:cNvPr id="13" name="Picture 12">
               <a:extLst>
                 <a:ext uri="{FF2B5EF4-FFF2-40B4-BE49-F238E27FC236}">
-                  <a16:creationId xmlns:a16="http://schemas.microsoft.com/office/drawing/2014/main" id="{DF45BF25-4467-43A0-A613-67A6CCF398DC}"/>
+                  <a16:creationId xmlns:a16="http://schemas.microsoft.com/office/drawing/2014/main" xmlns="" id="{DF45BF25-4467-43A0-A613-67A6CCF398DC}"/>
                 </a:ext>
               </a:extLst>
             </p:cNvPr>
@@ -8895,7 +8895,7 @@
             <p:cNvPr id="14" name="Title 1">
               <a:extLst>
                 <a:ext uri="{FF2B5EF4-FFF2-40B4-BE49-F238E27FC236}">
-                  <a16:creationId xmlns:a16="http://schemas.microsoft.com/office/drawing/2014/main" id="{073FE5B0-2CAF-49A6-9789-5EEBF87010F8}"/>
+                  <a16:creationId xmlns:a16="http://schemas.microsoft.com/office/drawing/2014/main" xmlns="" id="{073FE5B0-2CAF-49A6-9789-5EEBF87010F8}"/>
                 </a:ext>
               </a:extLst>
             </p:cNvPr>
@@ -9304,7 +9304,7 @@
               <p:cNvPr id="13" name="TextBox 12">
                 <a:extLst>
                   <a:ext uri="{FF2B5EF4-FFF2-40B4-BE49-F238E27FC236}">
-                    <a16:creationId xmlns:a16="http://schemas.microsoft.com/office/drawing/2014/main" id="{0A9DAB78-883A-4F50-8E1D-888E6754DAB8}"/>
+                    <a16:creationId xmlns:a16="http://schemas.microsoft.com/office/drawing/2014/main" xmlns="" id="{0A9DAB78-883A-4F50-8E1D-888E6754DAB8}"/>
                   </a:ext>
                 </a:extLst>
               </p:cNvPr>
@@ -9338,7 +9338,7 @@
                         <m:sSubPr>
                           <m:ctrlPr>
                             <a:rPr lang="en-US" sz="2800" b="0" i="1" smtClean="0">
-                              <a:latin typeface="Cambria Math" panose="02040503050406030204" pitchFamily="18" charset="0"/>
+                              <a:latin typeface="Cambria Math" charset="0"/>
                             </a:rPr>
                           </m:ctrlPr>
                         </m:sSubPr>
@@ -9376,7 +9376,7 @@
                         <m:sSubPr>
                           <m:ctrlPr>
                             <a:rPr lang="en-US" sz="2800" b="0" i="1" smtClean="0">
-                              <a:latin typeface="Cambria Math" panose="02040503050406030204" pitchFamily="18" charset="0"/>
+                              <a:latin typeface="Cambria Math" charset="0"/>
                             </a:rPr>
                           </m:ctrlPr>
                         </m:sSubPr>
@@ -9433,7 +9433,7 @@
                         <m:sSubPr>
                           <m:ctrlPr>
                             <a:rPr lang="en-US" sz="2800" b="0" i="1" smtClean="0">
-                              <a:latin typeface="Cambria Math" panose="02040503050406030204" pitchFamily="18" charset="0"/>
+                              <a:latin typeface="Cambria Math" charset="0"/>
                             </a:rPr>
                           </m:ctrlPr>
                         </m:sSubPr>
@@ -9514,7 +9514,7 @@
               <p14:cNvPr id="3" name="Ink 2">
                 <a:extLst>
                   <a:ext uri="{FF2B5EF4-FFF2-40B4-BE49-F238E27FC236}">
-                    <a16:creationId xmlns:a16="http://schemas.microsoft.com/office/drawing/2014/main" id="{39CD52D0-CC5F-4F6D-8F07-859FDDDCA1A9}"/>
+                    <a16:creationId xmlns:a16="http://schemas.microsoft.com/office/drawing/2014/main" xmlns="" id="{39CD52D0-CC5F-4F6D-8F07-859FDDDCA1A9}"/>
                   </a:ext>
                 </a:extLst>
               </p14:cNvPr>
@@ -9770,7 +9770,7 @@
                         <m:sSubPr>
                           <m:ctrlPr>
                             <a:rPr lang="en-US" sz="2800" b="0" i="1" smtClean="0">
-                              <a:latin typeface="Cambria Math" panose="02040503050406030204" pitchFamily="18" charset="0"/>
+                              <a:latin typeface="Cambria Math" charset="0"/>
                             </a:rPr>
                           </m:ctrlPr>
                         </m:sSubPr>
@@ -9801,7 +9801,7 @@
                         <m:sSubPr>
                           <m:ctrlPr>
                             <a:rPr lang="en-US" sz="2800" b="0" i="1" smtClean="0">
-                              <a:latin typeface="Cambria Math" panose="02040503050406030204" pitchFamily="18" charset="0"/>
+                              <a:latin typeface="Cambria Math" charset="0"/>
                             </a:rPr>
                           </m:ctrlPr>
                         </m:sSubPr>
@@ -9832,7 +9832,7 @@
                         <m:sSubPr>
                           <m:ctrlPr>
                             <a:rPr lang="en-US" sz="2800" b="0" i="1" smtClean="0">
-                              <a:latin typeface="Cambria Math" panose="02040503050406030204" pitchFamily="18" charset="0"/>
+                              <a:latin typeface="Cambria Math" charset="0"/>
                             </a:rPr>
                           </m:ctrlPr>
                         </m:sSubPr>
@@ -9935,7 +9935,7 @@
                         <m:sSubPr>
                           <m:ctrlPr>
                             <a:rPr lang="en-US" sz="2800" b="0" i="1" smtClean="0">
-                              <a:latin typeface="Cambria Math" panose="02040503050406030204" pitchFamily="18" charset="0"/>
+                              <a:latin typeface="Cambria Math" charset="0"/>
                             </a:rPr>
                           </m:ctrlPr>
                         </m:sSubPr>
@@ -9966,7 +9966,7 @@
                         <m:sSubPr>
                           <m:ctrlPr>
                             <a:rPr lang="en-US" sz="2800" b="0" i="1" smtClean="0">
-                              <a:latin typeface="Cambria Math" panose="02040503050406030204" pitchFamily="18" charset="0"/>
+                              <a:latin typeface="Cambria Math" charset="0"/>
                             </a:rPr>
                           </m:ctrlPr>
                         </m:sSubPr>
@@ -9997,7 +9997,7 @@
                         <m:sSubPr>
                           <m:ctrlPr>
                             <a:rPr lang="en-US" sz="2800" b="0" i="1" smtClean="0">
-                              <a:latin typeface="Cambria Math" panose="02040503050406030204" pitchFamily="18" charset="0"/>
+                              <a:latin typeface="Cambria Math" charset="0"/>
                             </a:rPr>
                           </m:ctrlPr>
                         </m:sSubPr>
@@ -10100,7 +10100,7 @@
                         <m:sSubPr>
                           <m:ctrlPr>
                             <a:rPr lang="en-US" sz="2800" b="0" i="1" smtClean="0">
-                              <a:latin typeface="Cambria Math" panose="02040503050406030204" pitchFamily="18" charset="0"/>
+                              <a:latin typeface="Cambria Math" charset="0"/>
                             </a:rPr>
                           </m:ctrlPr>
                         </m:sSubPr>
@@ -10131,7 +10131,7 @@
                         <m:sSubPr>
                           <m:ctrlPr>
                             <a:rPr lang="en-US" sz="2800" b="0" i="1" smtClean="0">
-                              <a:latin typeface="Cambria Math" panose="02040503050406030204" pitchFamily="18" charset="0"/>
+                              <a:latin typeface="Cambria Math" charset="0"/>
                             </a:rPr>
                           </m:ctrlPr>
                         </m:sSubPr>
@@ -10162,7 +10162,7 @@
                         <m:sSubPr>
                           <m:ctrlPr>
                             <a:rPr lang="en-US" sz="2800" b="0" i="1" smtClean="0">
-                              <a:latin typeface="Cambria Math" panose="02040503050406030204" pitchFamily="18" charset="0"/>
+                              <a:latin typeface="Cambria Math" charset="0"/>
                             </a:rPr>
                           </m:ctrlPr>
                         </m:sSubPr>
@@ -10321,7 +10321,7 @@
               <p:cNvPr id="7" name="TextBox 6">
                 <a:extLst>
                   <a:ext uri="{FF2B5EF4-FFF2-40B4-BE49-F238E27FC236}">
-                    <a16:creationId xmlns:a16="http://schemas.microsoft.com/office/drawing/2014/main" id="{E81F884E-87D1-4589-8EBC-FBE5FDF89450}"/>
+                    <a16:creationId xmlns:a16="http://schemas.microsoft.com/office/drawing/2014/main" xmlns="" id="{E81F884E-87D1-4589-8EBC-FBE5FDF89450}"/>
                   </a:ext>
                 </a:extLst>
               </p:cNvPr>
@@ -10355,7 +10355,7 @@
                         <m:sSubPr>
                           <m:ctrlPr>
                             <a:rPr lang="en-US" sz="2800" b="0" i="1" smtClean="0">
-                              <a:latin typeface="Cambria Math" panose="02040503050406030204" pitchFamily="18" charset="0"/>
+                              <a:latin typeface="Cambria Math" charset="0"/>
                             </a:rPr>
                           </m:ctrlPr>
                         </m:sSubPr>
@@ -10393,7 +10393,7 @@
                         <m:sSubPr>
                           <m:ctrlPr>
                             <a:rPr lang="en-US" sz="2800" b="0" i="1" smtClean="0">
-                              <a:latin typeface="Cambria Math" panose="02040503050406030204" pitchFamily="18" charset="0"/>
+                              <a:latin typeface="Cambria Math" charset="0"/>
                             </a:rPr>
                           </m:ctrlPr>
                         </m:sSubPr>
@@ -10450,7 +10450,7 @@
                         <m:sSubPr>
                           <m:ctrlPr>
                             <a:rPr lang="en-US" sz="2800" b="0" i="1" smtClean="0">
-                              <a:latin typeface="Cambria Math" panose="02040503050406030204" pitchFamily="18" charset="0"/>
+                              <a:latin typeface="Cambria Math" charset="0"/>
                             </a:rPr>
                           </m:ctrlPr>
                         </m:sSubPr>
@@ -10531,7 +10531,7 @@
               <p14:cNvPr id="4" name="Ink 3">
                 <a:extLst>
                   <a:ext uri="{FF2B5EF4-FFF2-40B4-BE49-F238E27FC236}">
-                    <a16:creationId xmlns:a16="http://schemas.microsoft.com/office/drawing/2014/main" id="{514E78E0-A76E-408F-A025-10B8049C9B4A}"/>
+                    <a16:creationId xmlns:a16="http://schemas.microsoft.com/office/drawing/2014/main" xmlns="" id="{514E78E0-A76E-408F-A025-10B8049C9B4A}"/>
                   </a:ext>
                 </a:extLst>
               </p14:cNvPr>
@@ -10883,7 +10883,7 @@
                         <m:sSubPr>
                           <m:ctrlPr>
                             <a:rPr lang="en-US" sz="2800" b="0" i="1" smtClean="0">
-                              <a:latin typeface="Cambria Math" panose="02040503050406030204" pitchFamily="18" charset="0"/>
+                              <a:latin typeface="Cambria Math" charset="0"/>
                             </a:rPr>
                           </m:ctrlPr>
                         </m:sSubPr>
@@ -10992,7 +10992,7 @@
                         <m:sSubPr>
                           <m:ctrlPr>
                             <a:rPr lang="en-US" sz="2800" b="0" i="1" smtClean="0">
-                              <a:latin typeface="Cambria Math" panose="02040503050406030204" pitchFamily="18" charset="0"/>
+                              <a:latin typeface="Cambria Math" charset="0"/>
                             </a:rPr>
                           </m:ctrlPr>
                         </m:sSubPr>
@@ -11029,7 +11029,7 @@
                         <m:sSubPr>
                           <m:ctrlPr>
                             <a:rPr lang="en-US" sz="2800" b="0" i="1" smtClean="0">
-                              <a:latin typeface="Cambria Math" panose="02040503050406030204" pitchFamily="18" charset="0"/>
+                              <a:latin typeface="Cambria Math" charset="0"/>
                             </a:rPr>
                           </m:ctrlPr>
                         </m:sSubPr>
@@ -11072,7 +11072,7 @@
                         <m:sSubPr>
                           <m:ctrlPr>
                             <a:rPr lang="en-US" sz="2800" b="0" i="1" smtClean="0">
-                              <a:latin typeface="Cambria Math" panose="02040503050406030204" pitchFamily="18" charset="0"/>
+                              <a:latin typeface="Cambria Math" charset="0"/>
                             </a:rPr>
                           </m:ctrlPr>
                         </m:sSubPr>
@@ -11259,7 +11259,7 @@
                         <m:sSubPr>
                           <m:ctrlPr>
                             <a:rPr lang="en-US" sz="2800" b="0" i="1" smtClean="0">
-                              <a:latin typeface="Cambria Math" panose="02040503050406030204" pitchFamily="18" charset="0"/>
+                              <a:latin typeface="Cambria Math" charset="0"/>
                             </a:rPr>
                           </m:ctrlPr>
                         </m:sSubPr>
@@ -11296,7 +11296,7 @@
                         <m:sSubPr>
                           <m:ctrlPr>
                             <a:rPr lang="en-US" sz="2800" b="0" i="1" smtClean="0">
-                              <a:latin typeface="Cambria Math" panose="02040503050406030204" pitchFamily="18" charset="0"/>
+                              <a:latin typeface="Cambria Math" charset="0"/>
                             </a:rPr>
                           </m:ctrlPr>
                         </m:sSubPr>
@@ -11339,7 +11339,7 @@
                         <m:sSubPr>
                           <m:ctrlPr>
                             <a:rPr lang="en-US" sz="2800" b="0" i="1" smtClean="0">
-                              <a:latin typeface="Cambria Math" panose="02040503050406030204" pitchFamily="18" charset="0"/>
+                              <a:latin typeface="Cambria Math" charset="0"/>
                             </a:rPr>
                           </m:ctrlPr>
                         </m:sSubPr>
@@ -11442,7 +11442,7 @@
                         <m:sSubPr>
                           <m:ctrlPr>
                             <a:rPr lang="en-US" sz="2800" b="0" i="1" smtClean="0">
-                              <a:latin typeface="Cambria Math" panose="02040503050406030204" pitchFamily="18" charset="0"/>
+                              <a:latin typeface="Cambria Math" charset="0"/>
                             </a:rPr>
                           </m:ctrlPr>
                         </m:sSubPr>
@@ -11479,7 +11479,7 @@
                         <m:sSubPr>
                           <m:ctrlPr>
                             <a:rPr lang="en-US" sz="2800" b="0" i="1" smtClean="0">
-                              <a:latin typeface="Cambria Math" panose="02040503050406030204" pitchFamily="18" charset="0"/>
+                              <a:latin typeface="Cambria Math" charset="0"/>
                             </a:rPr>
                           </m:ctrlPr>
                         </m:sSubPr>
@@ -11522,7 +11522,7 @@
                         <m:sSubPr>
                           <m:ctrlPr>
                             <a:rPr lang="en-US" sz="2800" b="0" i="1" smtClean="0">
-                              <a:latin typeface="Cambria Math" panose="02040503050406030204" pitchFamily="18" charset="0"/>
+                              <a:latin typeface="Cambria Math" charset="0"/>
                             </a:rPr>
                           </m:ctrlPr>
                         </m:sSubPr>
@@ -11597,7 +11597,7 @@
               <p14:cNvPr id="3" name="Ink 2">
                 <a:extLst>
                   <a:ext uri="{FF2B5EF4-FFF2-40B4-BE49-F238E27FC236}">
-                    <a16:creationId xmlns:a16="http://schemas.microsoft.com/office/drawing/2014/main" id="{A3C46DCB-CA1D-4EF4-8522-E73160F79251}"/>
+                    <a16:creationId xmlns:a16="http://schemas.microsoft.com/office/drawing/2014/main" xmlns="" id="{A3C46DCB-CA1D-4EF4-8522-E73160F79251}"/>
                   </a:ext>
                 </a:extLst>
               </p14:cNvPr>
@@ -12030,7 +12030,7 @@
           <p:cNvPr id="12" name="Group 11">
             <a:extLst>
               <a:ext uri="{FF2B5EF4-FFF2-40B4-BE49-F238E27FC236}">
-                <a16:creationId xmlns:a16="http://schemas.microsoft.com/office/drawing/2014/main" id="{94E5968C-CCF4-43FF-B85F-BE950CD4A528}"/>
+                <a16:creationId xmlns:a16="http://schemas.microsoft.com/office/drawing/2014/main" xmlns="" id="{94E5968C-CCF4-43FF-B85F-BE950CD4A528}"/>
               </a:ext>
             </a:extLst>
           </p:cNvPr>
@@ -12050,7 +12050,7 @@
             <p:cNvPr id="13" name="Picture 12">
               <a:extLst>
                 <a:ext uri="{FF2B5EF4-FFF2-40B4-BE49-F238E27FC236}">
-                  <a16:creationId xmlns:a16="http://schemas.microsoft.com/office/drawing/2014/main" id="{DF45BF25-4467-43A0-A613-67A6CCF398DC}"/>
+                  <a16:creationId xmlns:a16="http://schemas.microsoft.com/office/drawing/2014/main" xmlns="" id="{DF45BF25-4467-43A0-A613-67A6CCF398DC}"/>
                 </a:ext>
               </a:extLst>
             </p:cNvPr>
@@ -12080,7 +12080,7 @@
             <p:cNvPr id="14" name="Title 1">
               <a:extLst>
                 <a:ext uri="{FF2B5EF4-FFF2-40B4-BE49-F238E27FC236}">
-                  <a16:creationId xmlns:a16="http://schemas.microsoft.com/office/drawing/2014/main" id="{073FE5B0-2CAF-49A6-9789-5EEBF87010F8}"/>
+                  <a16:creationId xmlns:a16="http://schemas.microsoft.com/office/drawing/2014/main" xmlns="" id="{073FE5B0-2CAF-49A6-9789-5EEBF87010F8}"/>
                 </a:ext>
               </a:extLst>
             </p:cNvPr>
@@ -12458,14 +12458,14 @@
           </a:prstGeom>
         </p:spPr>
       </p:pic>
-      <mc:AlternateContent xmlns:mc="http://schemas.openxmlformats.org/markup-compatibility/2006" xmlns:a14="http://schemas.microsoft.com/office/drawing/2010/main">
-        <mc:Choice Requires="a14">
+      <mc:AlternateContent xmlns:mc="http://schemas.openxmlformats.org/markup-compatibility/2006">
+        <mc:Choice xmlns:a14="http://schemas.microsoft.com/office/drawing/2010/main" Requires="a14">
           <p:sp>
             <p:nvSpPr>
               <p:cNvPr id="13" name="TextBox 12">
                 <a:extLst>
                   <a:ext uri="{FF2B5EF4-FFF2-40B4-BE49-F238E27FC236}">
-                    <a16:creationId xmlns:a16="http://schemas.microsoft.com/office/drawing/2014/main" id="{8DE6DF41-A6D9-4089-80D8-D35937CD259B}"/>
+                    <a16:creationId xmlns:a16="http://schemas.microsoft.com/office/drawing/2014/main" xmlns="" id="{8DE6DF41-A6D9-4089-80D8-D35937CD259B}"/>
                   </a:ext>
                 </a:extLst>
               </p:cNvPr>
@@ -12499,7 +12499,7 @@
                         <m:sSubPr>
                           <m:ctrlPr>
                             <a:rPr lang="en-US" sz="2800" b="0" i="1" smtClean="0">
-                              <a:latin typeface="Cambria Math" panose="02040503050406030204" pitchFamily="18" charset="0"/>
+                              <a:latin typeface="Cambria Math" charset="0"/>
                             </a:rPr>
                           </m:ctrlPr>
                         </m:sSubPr>
@@ -12537,7 +12537,7 @@
                         <m:sSubPr>
                           <m:ctrlPr>
                             <a:rPr lang="en-US" sz="2800" b="0" i="1" smtClean="0">
-                              <a:latin typeface="Cambria Math" panose="02040503050406030204" pitchFamily="18" charset="0"/>
+                              <a:latin typeface="Cambria Math" charset="0"/>
                             </a:rPr>
                           </m:ctrlPr>
                         </m:sSubPr>
@@ -12594,7 +12594,7 @@
                         <m:sSubPr>
                           <m:ctrlPr>
                             <a:rPr lang="en-US" sz="2800" b="0" i="1" smtClean="0">
-                              <a:latin typeface="Cambria Math" panose="02040503050406030204" pitchFamily="18" charset="0"/>
+                              <a:latin typeface="Cambria Math" charset="0"/>
                             </a:rPr>
                           </m:ctrlPr>
                         </m:sSubPr>
@@ -12623,13 +12623,13 @@
             </p:txBody>
           </p:sp>
         </mc:Choice>
-        <mc:Fallback xmlns="">
+        <mc:Fallback>
           <p:sp>
             <p:nvSpPr>
               <p:cNvPr id="13" name="TextBox 12">
                 <a:extLst>
                   <a:ext uri="{FF2B5EF4-FFF2-40B4-BE49-F238E27FC236}">
-                    <a16:creationId xmlns:a16="http://schemas.microsoft.com/office/drawing/2014/main" id="{8DE6DF41-A6D9-4089-80D8-D35937CD259B}"/>
+                    <a16:creationId xmlns:a16="http://schemas.microsoft.com/office/drawing/2014/main" xmlns:a14="http://schemas.microsoft.com/office/drawing/2010/main" xmlns="" id="{8DE6DF41-A6D9-4089-80D8-D35937CD259B}"/>
                   </a:ext>
                 </a:extLst>
               </p:cNvPr>
@@ -12646,7 +12646,7 @@
               <a:prstGeom prst="rect">
                 <a:avLst/>
               </a:prstGeom>
-              <a:blipFill>
+              <a:blipFill rotWithShape="0">
                 <a:blip r:embed="rId5"/>
                 <a:stretch>
                   <a:fillRect/>
@@ -12658,7 +12658,7 @@
               <a:lstStyle/>
               <a:p>
                 <a:r>
-                  <a:rPr lang="en-US">
+                  <a:rPr lang="zh-CN" altLang="en-US">
                     <a:noFill/>
                   </a:rPr>
                   <a:t> </a:t>
@@ -12668,14 +12668,14 @@
           </p:sp>
         </mc:Fallback>
       </mc:AlternateContent>
-      <mc:AlternateContent xmlns:mc="http://schemas.openxmlformats.org/markup-compatibility/2006" xmlns:p14="http://schemas.microsoft.com/office/powerpoint/2010/main">
-        <mc:Choice Requires="p14">
+      <mc:AlternateContent xmlns:mc="http://schemas.openxmlformats.org/markup-compatibility/2006">
+        <mc:Choice xmlns:p14="http://schemas.microsoft.com/office/powerpoint/2010/main" Requires="p14">
           <p:contentPart p14:bwMode="auto" r:id="rId6">
             <p14:nvContentPartPr>
               <p14:cNvPr id="4" name="Ink 3">
                 <a:extLst>
                   <a:ext uri="{FF2B5EF4-FFF2-40B4-BE49-F238E27FC236}">
-                    <a16:creationId xmlns:a16="http://schemas.microsoft.com/office/drawing/2014/main" id="{DBCB9B54-DAAA-4B96-913F-AEE9BEC072A0}"/>
+                    <a16:creationId xmlns:a16="http://schemas.microsoft.com/office/drawing/2014/main" xmlns="" id="{DBCB9B54-DAAA-4B96-913F-AEE9BEC072A0}"/>
                   </a:ext>
                 </a:extLst>
               </p14:cNvPr>
@@ -12688,13 +12688,13 @@
             </p14:xfrm>
           </p:contentPart>
         </mc:Choice>
-        <mc:Fallback xmlns="">
+        <mc:Fallback>
           <p:pic>
             <p:nvPicPr>
               <p:cNvPr id="4" name="Ink 3">
                 <a:extLst>
                   <a:ext uri="{FF2B5EF4-FFF2-40B4-BE49-F238E27FC236}">
-                    <a16:creationId xmlns:a16="http://schemas.microsoft.com/office/drawing/2014/main" id="{DBCB9B54-DAAA-4B96-913F-AEE9BEC072A0}"/>
+                    <a16:creationId xmlns:a16="http://schemas.microsoft.com/office/drawing/2014/main" xmlns:p14="http://schemas.microsoft.com/office/powerpoint/2010/main" xmlns="" id="{DBCB9B54-DAAA-4B96-913F-AEE9BEC072A0}"/>
                   </a:ext>
                 </a:extLst>
               </p:cNvPr>
@@ -13003,7 +13003,7 @@
           <p:cNvPr id="12" name="Group 11">
             <a:extLst>
               <a:ext uri="{FF2B5EF4-FFF2-40B4-BE49-F238E27FC236}">
-                <a16:creationId xmlns:a16="http://schemas.microsoft.com/office/drawing/2014/main" id="{94E5968C-CCF4-43FF-B85F-BE950CD4A528}"/>
+                <a16:creationId xmlns:a16="http://schemas.microsoft.com/office/drawing/2014/main" xmlns="" id="{94E5968C-CCF4-43FF-B85F-BE950CD4A528}"/>
               </a:ext>
             </a:extLst>
           </p:cNvPr>
@@ -13023,7 +13023,7 @@
             <p:cNvPr id="13" name="Picture 12">
               <a:extLst>
                 <a:ext uri="{FF2B5EF4-FFF2-40B4-BE49-F238E27FC236}">
-                  <a16:creationId xmlns:a16="http://schemas.microsoft.com/office/drawing/2014/main" id="{DF45BF25-4467-43A0-A613-67A6CCF398DC}"/>
+                  <a16:creationId xmlns:a16="http://schemas.microsoft.com/office/drawing/2014/main" xmlns="" id="{DF45BF25-4467-43A0-A613-67A6CCF398DC}"/>
                 </a:ext>
               </a:extLst>
             </p:cNvPr>
@@ -13053,7 +13053,7 @@
             <p:cNvPr id="14" name="Title 1">
               <a:extLst>
                 <a:ext uri="{FF2B5EF4-FFF2-40B4-BE49-F238E27FC236}">
-                  <a16:creationId xmlns:a16="http://schemas.microsoft.com/office/drawing/2014/main" id="{073FE5B0-2CAF-49A6-9789-5EEBF87010F8}"/>
+                  <a16:creationId xmlns:a16="http://schemas.microsoft.com/office/drawing/2014/main" xmlns="" id="{073FE5B0-2CAF-49A6-9789-5EEBF87010F8}"/>
                 </a:ext>
               </a:extLst>
             </p:cNvPr>
@@ -13415,7 +13415,7 @@
               <p14:cNvPr id="4" name="Ink 3">
                 <a:extLst>
                   <a:ext uri="{FF2B5EF4-FFF2-40B4-BE49-F238E27FC236}">
-                    <a16:creationId xmlns:a16="http://schemas.microsoft.com/office/drawing/2014/main" id="{F8E616FC-88DC-4720-A581-FD865AFC3777}"/>
+                    <a16:creationId xmlns:a16="http://schemas.microsoft.com/office/drawing/2014/main" xmlns="" id="{F8E616FC-88DC-4720-A581-FD865AFC3777}"/>
                   </a:ext>
                 </a:extLst>
               </p14:cNvPr>
@@ -13551,7 +13551,7 @@
                         <m:sSubPr>
                           <m:ctrlPr>
                             <a:rPr lang="en-US" sz="3200" b="0" i="1" dirty="0" smtClean="0">
-                              <a:latin typeface="Cambria Math" panose="02040503050406030204" pitchFamily="18" charset="0"/>
+                              <a:latin typeface="Cambria Math" charset="0"/>
                             </a:rPr>
                           </m:ctrlPr>
                         </m:sSubPr>
@@ -13588,7 +13588,7 @@
                         <m:sSubPr>
                           <m:ctrlPr>
                             <a:rPr lang="en-US" sz="3200" b="0" i="1" dirty="0" smtClean="0">
-                              <a:latin typeface="Cambria Math" panose="02040503050406030204" pitchFamily="18" charset="0"/>
+                              <a:latin typeface="Cambria Math" charset="0"/>
                             </a:rPr>
                           </m:ctrlPr>
                         </m:sSubPr>
@@ -13619,7 +13619,7 @@
                         <m:dPr>
                           <m:ctrlPr>
                             <a:rPr lang="en-US" sz="3200" b="0" i="1" dirty="0" smtClean="0">
-                              <a:latin typeface="Cambria Math" panose="02040503050406030204" pitchFamily="18" charset="0"/>
+                              <a:latin typeface="Cambria Math" charset="0"/>
                             </a:rPr>
                           </m:ctrlPr>
                         </m:dPr>
@@ -13726,7 +13726,7 @@
                         <m:sSubPr>
                           <m:ctrlPr>
                             <a:rPr lang="en-US" sz="3200" b="0" i="1" dirty="0" smtClean="0">
-                              <a:latin typeface="Cambria Math" panose="02040503050406030204" pitchFamily="18" charset="0"/>
+                              <a:latin typeface="Cambria Math" charset="0"/>
                             </a:rPr>
                           </m:ctrlPr>
                         </m:sSubPr>
@@ -13763,7 +13763,7 @@
                         <m:sSubPr>
                           <m:ctrlPr>
                             <a:rPr lang="en-US" sz="3200" b="0" i="1" dirty="0" smtClean="0">
-                              <a:latin typeface="Cambria Math" panose="02040503050406030204" pitchFamily="18" charset="0"/>
+                              <a:latin typeface="Cambria Math" charset="0"/>
                             </a:rPr>
                           </m:ctrlPr>
                         </m:sSubPr>
@@ -13794,7 +13794,7 @@
                         <m:dPr>
                           <m:ctrlPr>
                             <a:rPr lang="en-US" sz="3200" b="0" i="1" dirty="0" smtClean="0">
-                              <a:latin typeface="Cambria Math" panose="02040503050406030204" pitchFamily="18" charset="0"/>
+                              <a:latin typeface="Cambria Math" charset="0"/>
                             </a:rPr>
                           </m:ctrlPr>
                         </m:dPr>
@@ -13931,7 +13931,7 @@
                         <m:sSubPr>
                           <m:ctrlPr>
                             <a:rPr lang="en-US" sz="3200" b="0" i="1" dirty="0" smtClean="0">
-                              <a:latin typeface="Cambria Math" panose="02040503050406030204" pitchFamily="18" charset="0"/>
+                              <a:latin typeface="Cambria Math" charset="0"/>
                             </a:rPr>
                           </m:ctrlPr>
                         </m:sSubPr>
@@ -14462,7 +14462,7 @@
                         <m:sSubPr>
                           <m:ctrlPr>
                             <a:rPr lang="en-US" sz="3200" b="0" i="1" dirty="0" smtClean="0">
-                              <a:latin typeface="Cambria Math" panose="02040503050406030204" pitchFamily="18" charset="0"/>
+                              <a:latin typeface="Cambria Math" charset="0"/>
                             </a:rPr>
                           </m:ctrlPr>
                         </m:sSubPr>
@@ -14635,7 +14635,7 @@
               <p14:cNvPr id="3" name="Ink 2">
                 <a:extLst>
                   <a:ext uri="{FF2B5EF4-FFF2-40B4-BE49-F238E27FC236}">
-                    <a16:creationId xmlns:a16="http://schemas.microsoft.com/office/drawing/2014/main" id="{5DC78AB4-18FE-4BF3-823A-4009CFE61299}"/>
+                    <a16:creationId xmlns:a16="http://schemas.microsoft.com/office/drawing/2014/main" xmlns="" id="{5DC78AB4-18FE-4BF3-823A-4009CFE61299}"/>
                   </a:ext>
                 </a:extLst>
               </p14:cNvPr>
@@ -14797,7 +14797,7 @@
               <p14:cNvPr id="4" name="Ink 3">
                 <a:extLst>
                   <a:ext uri="{FF2B5EF4-FFF2-40B4-BE49-F238E27FC236}">
-                    <a16:creationId xmlns:a16="http://schemas.microsoft.com/office/drawing/2014/main" id="{C04EE8EA-7D8F-40C6-831F-0200E2910CF8}"/>
+                    <a16:creationId xmlns:a16="http://schemas.microsoft.com/office/drawing/2014/main" xmlns="" id="{C04EE8EA-7D8F-40C6-831F-0200E2910CF8}"/>
                   </a:ext>
                 </a:extLst>
               </p14:cNvPr>
@@ -15001,7 +15001,7 @@
           <p:cNvPr id="12" name="Group 11">
             <a:extLst>
               <a:ext uri="{FF2B5EF4-FFF2-40B4-BE49-F238E27FC236}">
-                <a16:creationId xmlns:a16="http://schemas.microsoft.com/office/drawing/2014/main" id="{94E5968C-CCF4-43FF-B85F-BE950CD4A528}"/>
+                <a16:creationId xmlns:a16="http://schemas.microsoft.com/office/drawing/2014/main" xmlns="" id="{94E5968C-CCF4-43FF-B85F-BE950CD4A528}"/>
               </a:ext>
             </a:extLst>
           </p:cNvPr>
@@ -15021,7 +15021,7 @@
             <p:cNvPr id="13" name="Picture 12">
               <a:extLst>
                 <a:ext uri="{FF2B5EF4-FFF2-40B4-BE49-F238E27FC236}">
-                  <a16:creationId xmlns:a16="http://schemas.microsoft.com/office/drawing/2014/main" id="{DF45BF25-4467-43A0-A613-67A6CCF398DC}"/>
+                  <a16:creationId xmlns:a16="http://schemas.microsoft.com/office/drawing/2014/main" xmlns="" id="{DF45BF25-4467-43A0-A613-67A6CCF398DC}"/>
                 </a:ext>
               </a:extLst>
             </p:cNvPr>
@@ -15051,7 +15051,7 @@
             <p:cNvPr id="14" name="Title 1">
               <a:extLst>
                 <a:ext uri="{FF2B5EF4-FFF2-40B4-BE49-F238E27FC236}">
-                  <a16:creationId xmlns:a16="http://schemas.microsoft.com/office/drawing/2014/main" id="{073FE5B0-2CAF-49A6-9789-5EEBF87010F8}"/>
+                  <a16:creationId xmlns:a16="http://schemas.microsoft.com/office/drawing/2014/main" xmlns="" id="{073FE5B0-2CAF-49A6-9789-5EEBF87010F8}"/>
                 </a:ext>
               </a:extLst>
             </p:cNvPr>
@@ -15414,7 +15414,7 @@
               <p14:cNvPr id="3" name="Ink 2">
                 <a:extLst>
                   <a:ext uri="{FF2B5EF4-FFF2-40B4-BE49-F238E27FC236}">
-                    <a16:creationId xmlns:a16="http://schemas.microsoft.com/office/drawing/2014/main" id="{A21FACA4-E3B0-410A-9A64-C97FDE43DB51}"/>
+                    <a16:creationId xmlns:a16="http://schemas.microsoft.com/office/drawing/2014/main" xmlns="" id="{A21FACA4-E3B0-410A-9A64-C97FDE43DB51}"/>
                   </a:ext>
                 </a:extLst>
               </p14:cNvPr>
@@ -15624,7 +15624,7 @@
           <p:cNvPr id="12" name="Group 11">
             <a:extLst>
               <a:ext uri="{FF2B5EF4-FFF2-40B4-BE49-F238E27FC236}">
-                <a16:creationId xmlns:a16="http://schemas.microsoft.com/office/drawing/2014/main" id="{94E5968C-CCF4-43FF-B85F-BE950CD4A528}"/>
+                <a16:creationId xmlns:a16="http://schemas.microsoft.com/office/drawing/2014/main" xmlns="" id="{94E5968C-CCF4-43FF-B85F-BE950CD4A528}"/>
               </a:ext>
             </a:extLst>
           </p:cNvPr>
@@ -15644,7 +15644,7 @@
             <p:cNvPr id="13" name="Picture 12">
               <a:extLst>
                 <a:ext uri="{FF2B5EF4-FFF2-40B4-BE49-F238E27FC236}">
-                  <a16:creationId xmlns:a16="http://schemas.microsoft.com/office/drawing/2014/main" id="{DF45BF25-4467-43A0-A613-67A6CCF398DC}"/>
+                  <a16:creationId xmlns:a16="http://schemas.microsoft.com/office/drawing/2014/main" xmlns="" id="{DF45BF25-4467-43A0-A613-67A6CCF398DC}"/>
                 </a:ext>
               </a:extLst>
             </p:cNvPr>
@@ -15674,7 +15674,7 @@
             <p:cNvPr id="14" name="Title 1">
               <a:extLst>
                 <a:ext uri="{FF2B5EF4-FFF2-40B4-BE49-F238E27FC236}">
-                  <a16:creationId xmlns:a16="http://schemas.microsoft.com/office/drawing/2014/main" id="{073FE5B0-2CAF-49A6-9789-5EEBF87010F8}"/>
+                  <a16:creationId xmlns:a16="http://schemas.microsoft.com/office/drawing/2014/main" xmlns="" id="{073FE5B0-2CAF-49A6-9789-5EEBF87010F8}"/>
                 </a:ext>
               </a:extLst>
             </p:cNvPr>
@@ -15789,7 +15789,7 @@
               <p14:cNvPr id="3" name="Ink 2">
                 <a:extLst>
                   <a:ext uri="{FF2B5EF4-FFF2-40B4-BE49-F238E27FC236}">
-                    <a16:creationId xmlns:a16="http://schemas.microsoft.com/office/drawing/2014/main" id="{28299C00-3CCC-40E8-99C8-B6D5585933C2}"/>
+                    <a16:creationId xmlns:a16="http://schemas.microsoft.com/office/drawing/2014/main" xmlns="" id="{28299C00-3CCC-40E8-99C8-B6D5585933C2}"/>
                   </a:ext>
                 </a:extLst>
               </p14:cNvPr>
@@ -15808,7 +15808,7 @@
               <p:cNvPr id="3" name="Ink 2">
                 <a:extLst>
                   <a:ext uri="{FF2B5EF4-FFF2-40B4-BE49-F238E27FC236}">
-                    <a16:creationId xmlns:a16="http://schemas.microsoft.com/office/drawing/2014/main" id="{28299C00-3CCC-40E8-99C8-B6D5585933C2}"/>
+                    <a16:creationId xmlns:a16="http://schemas.microsoft.com/office/drawing/2014/main" xmlns:p14="http://schemas.microsoft.com/office/powerpoint/2010/main" xmlns="" id="{28299C00-3CCC-40E8-99C8-B6D5585933C2}"/>
                   </a:ext>
                 </a:extLst>
               </p:cNvPr>
@@ -15878,46 +15878,6 @@
           <a:p>
             <a:pPr algn="ctr"/>
             <a:endParaRPr lang="en-US"/>
-          </a:p>
-        </p:txBody>
-      </p:sp>
-      <p:sp>
-        <p:nvSpPr>
-          <p:cNvPr id="5" name="Rectangle 4"/>
-          <p:cNvSpPr/>
-          <p:nvPr/>
-        </p:nvSpPr>
-        <p:spPr>
-          <a:xfrm>
-            <a:off x="4382037" y="3244334"/>
-            <a:ext cx="3427926" cy="369332"/>
-          </a:xfrm>
-          <a:prstGeom prst="rect">
-            <a:avLst/>
-          </a:prstGeom>
-        </p:spPr>
-        <p:txBody>
-          <a:bodyPr wrap="none">
-            <a:spAutoFit/>
-          </a:bodyPr>
-          <a:lstStyle/>
-          <a:p>
-            <a:r>
-              <a:rPr lang="en-US" dirty="0" err="1"/>
-              <a:t>yhat</a:t>
-            </a:r>
-            <a:r>
-              <a:rPr lang="en-US" dirty="0"/>
-              <a:t> = </a:t>
-            </a:r>
-            <a:r>
-              <a:rPr lang="en-US" dirty="0" err="1"/>
-              <a:t>np.array</a:t>
-            </a:r>
-            <a:r>
-              <a:rPr lang="en-US" dirty="0"/>
-              <a:t>([.9, 0.2, 0.1, .4, .9])</a:t>
-            </a:r>
           </a:p>
         </p:txBody>
       </p:sp>
@@ -16026,79 +15986,14 @@
           </a:p>
         </p:txBody>
       </p:sp>
-      <p:pic>
-        <p:nvPicPr>
-          <p:cNvPr id="3" name="Picture 2">
-            <a:extLst>
-              <a:ext uri="{FF2B5EF4-FFF2-40B4-BE49-F238E27FC236}">
-                <a16:creationId xmlns:a16="http://schemas.microsoft.com/office/drawing/2014/main" id="{B3F7D1E7-D0D3-45E5-B73E-55EC6F946402}"/>
-              </a:ext>
-            </a:extLst>
-          </p:cNvPr>
-          <p:cNvPicPr>
-            <a:picLocks noChangeAspect="1"/>
-          </p:cNvPicPr>
-          <p:nvPr/>
-        </p:nvPicPr>
-        <p:blipFill>
-          <a:blip r:embed="rId2"/>
-          <a:stretch>
-            <a:fillRect/>
-          </a:stretch>
-        </p:blipFill>
-        <p:spPr>
-          <a:xfrm>
-            <a:off x="8484555" y="3539176"/>
-            <a:ext cx="2431801" cy="2431801"/>
-          </a:xfrm>
-          <a:prstGeom prst="rect">
-            <a:avLst/>
-          </a:prstGeom>
-        </p:spPr>
-      </p:pic>
-      <p:sp>
-        <p:nvSpPr>
-          <p:cNvPr id="4" name="Rectangle 3">
-            <a:extLst>
-              <a:ext uri="{FF2B5EF4-FFF2-40B4-BE49-F238E27FC236}">
-                <a16:creationId xmlns:a16="http://schemas.microsoft.com/office/drawing/2014/main" id="{2586C950-1612-49D4-9BEF-0FBC74637242}"/>
-              </a:ext>
-            </a:extLst>
-          </p:cNvPr>
-          <p:cNvSpPr/>
-          <p:nvPr/>
-        </p:nvSpPr>
-        <p:spPr>
-          <a:xfrm>
-            <a:off x="8708052" y="5891954"/>
-            <a:ext cx="1984805" cy="461665"/>
-          </a:xfrm>
-          <a:prstGeom prst="rect">
-            <a:avLst/>
-          </a:prstGeom>
-        </p:spPr>
-        <p:txBody>
-          <a:bodyPr wrap="square">
-            <a:spAutoFit/>
-          </a:bodyPr>
-          <a:lstStyle/>
-          <a:p>
-            <a:pPr algn="ctr"/>
-            <a:r>
-              <a:rPr lang="en-US" sz="2400" dirty="0"/>
-              <a:t>Adam Coates</a:t>
-            </a:r>
-          </a:p>
-        </p:txBody>
-      </p:sp>
-      <mc:AlternateContent xmlns:mc="http://schemas.openxmlformats.org/markup-compatibility/2006" xmlns:p14="http://schemas.microsoft.com/office/powerpoint/2010/main">
-        <mc:Choice Requires="p14">
-          <p:contentPart p14:bwMode="auto" r:id="rId3">
+      <mc:AlternateContent xmlns:mc="http://schemas.openxmlformats.org/markup-compatibility/2006">
+        <mc:Choice xmlns:p14="http://schemas.microsoft.com/office/powerpoint/2010/main" Requires="p14">
+          <p:contentPart p14:bwMode="auto" r:id="rId2">
             <p14:nvContentPartPr>
               <p14:cNvPr id="5" name="Ink 4">
                 <a:extLst>
                   <a:ext uri="{FF2B5EF4-FFF2-40B4-BE49-F238E27FC236}">
-                    <a16:creationId xmlns:a16="http://schemas.microsoft.com/office/drawing/2014/main" id="{B3A8DAEB-6BA3-46D0-972A-8CE9BD208D81}"/>
+                    <a16:creationId xmlns:a16="http://schemas.microsoft.com/office/drawing/2014/main" xmlns="" id="{B3A8DAEB-6BA3-46D0-972A-8CE9BD208D81}"/>
                   </a:ext>
                 </a:extLst>
               </p14:cNvPr>
@@ -16111,13 +16006,13 @@
             </p14:xfrm>
           </p:contentPart>
         </mc:Choice>
-        <mc:Fallback xmlns="">
+        <mc:Fallback>
           <p:pic>
             <p:nvPicPr>
               <p:cNvPr id="5" name="Ink 4">
                 <a:extLst>
                   <a:ext uri="{FF2B5EF4-FFF2-40B4-BE49-F238E27FC236}">
-                    <a16:creationId xmlns:a16="http://schemas.microsoft.com/office/drawing/2014/main" id="{B3A8DAEB-6BA3-46D0-972A-8CE9BD208D81}"/>
+                    <a16:creationId xmlns:a16="http://schemas.microsoft.com/office/drawing/2014/main" xmlns:p14="http://schemas.microsoft.com/office/powerpoint/2010/main" xmlns="" id="{B3A8DAEB-6BA3-46D0-972A-8CE9BD208D81}"/>
                   </a:ext>
                 </a:extLst>
               </p:cNvPr>
@@ -16125,7 +16020,7 @@
               <p:nvPr/>
             </p:nvPicPr>
             <p:blipFill>
-              <a:blip r:embed="rId4"/>
+              <a:blip r:embed="rId3"/>
               <a:stretch>
                 <a:fillRect/>
               </a:stretch>
@@ -16155,107 +16050,9 @@
   <p:timing>
     <p:tnLst>
       <p:par>
-        <p:cTn id="1" dur="indefinite" restart="never" nodeType="tmRoot">
-          <p:childTnLst>
-            <p:seq concurrent="1" nextAc="seek">
-              <p:cTn id="2" dur="indefinite" nodeType="mainSeq">
-                <p:childTnLst>
-                  <p:par>
-                    <p:cTn id="3" fill="hold">
-                      <p:stCondLst>
-                        <p:cond delay="indefinite"/>
-                      </p:stCondLst>
-                      <p:childTnLst>
-                        <p:par>
-                          <p:cTn id="4" fill="hold">
-                            <p:stCondLst>
-                              <p:cond delay="0"/>
-                            </p:stCondLst>
-                            <p:childTnLst>
-                              <p:par>
-                                <p:cTn id="5" presetID="1" presetClass="entr" presetSubtype="0" fill="hold" nodeType="clickEffect">
-                                  <p:stCondLst>
-                                    <p:cond delay="0"/>
-                                  </p:stCondLst>
-                                  <p:childTnLst>
-                                    <p:set>
-                                      <p:cBhvr>
-                                        <p:cTn id="6" dur="1" fill="hold">
-                                          <p:stCondLst>
-                                            <p:cond delay="0"/>
-                                          </p:stCondLst>
-                                        </p:cTn>
-                                        <p:tgtEl>
-                                          <p:spTgt spid="3"/>
-                                        </p:tgtEl>
-                                        <p:attrNameLst>
-                                          <p:attrName>style.visibility</p:attrName>
-                                        </p:attrNameLst>
-                                      </p:cBhvr>
-                                      <p:to>
-                                        <p:strVal val="visible"/>
-                                      </p:to>
-                                    </p:set>
-                                  </p:childTnLst>
-                                </p:cTn>
-                              </p:par>
-                              <p:par>
-                                <p:cTn id="7" presetID="1" presetClass="entr" presetSubtype="0" fill="hold" grpId="0" nodeType="withEffect">
-                                  <p:stCondLst>
-                                    <p:cond delay="0"/>
-                                  </p:stCondLst>
-                                  <p:childTnLst>
-                                    <p:set>
-                                      <p:cBhvr>
-                                        <p:cTn id="8" dur="1" fill="hold">
-                                          <p:stCondLst>
-                                            <p:cond delay="0"/>
-                                          </p:stCondLst>
-                                        </p:cTn>
-                                        <p:tgtEl>
-                                          <p:spTgt spid="4"/>
-                                        </p:tgtEl>
-                                        <p:attrNameLst>
-                                          <p:attrName>style.visibility</p:attrName>
-                                        </p:attrNameLst>
-                                      </p:cBhvr>
-                                      <p:to>
-                                        <p:strVal val="visible"/>
-                                      </p:to>
-                                    </p:set>
-                                  </p:childTnLst>
-                                </p:cTn>
-                              </p:par>
-                            </p:childTnLst>
-                          </p:cTn>
-                        </p:par>
-                      </p:childTnLst>
-                    </p:cTn>
-                  </p:par>
-                </p:childTnLst>
-              </p:cTn>
-              <p:prevCondLst>
-                <p:cond evt="onPrev" delay="0">
-                  <p:tgtEl>
-                    <p:sldTgt/>
-                  </p:tgtEl>
-                </p:cond>
-              </p:prevCondLst>
-              <p:nextCondLst>
-                <p:cond evt="onNext" delay="0">
-                  <p:tgtEl>
-                    <p:sldTgt/>
-                  </p:tgtEl>
-                </p:cond>
-              </p:nextCondLst>
-            </p:seq>
-          </p:childTnLst>
-        </p:cTn>
+        <p:cTn id="1" dur="indefinite" restart="never" nodeType="tmRoot"/>
       </p:par>
     </p:tnLst>
-    <p:bldLst>
-      <p:bldP spid="4" grpId="0"/>
-    </p:bldLst>
   </p:timing>
 </p:sld>
 </file>
@@ -16413,7 +16210,7 @@
           <p:cNvPr id="12" name="Group 11">
             <a:extLst>
               <a:ext uri="{FF2B5EF4-FFF2-40B4-BE49-F238E27FC236}">
-                <a16:creationId xmlns:a16="http://schemas.microsoft.com/office/drawing/2014/main" id="{94E5968C-CCF4-43FF-B85F-BE950CD4A528}"/>
+                <a16:creationId xmlns:a16="http://schemas.microsoft.com/office/drawing/2014/main" xmlns="" id="{94E5968C-CCF4-43FF-B85F-BE950CD4A528}"/>
               </a:ext>
             </a:extLst>
           </p:cNvPr>
@@ -16433,7 +16230,7 @@
             <p:cNvPr id="13" name="Picture 12">
               <a:extLst>
                 <a:ext uri="{FF2B5EF4-FFF2-40B4-BE49-F238E27FC236}">
-                  <a16:creationId xmlns:a16="http://schemas.microsoft.com/office/drawing/2014/main" id="{DF45BF25-4467-43A0-A613-67A6CCF398DC}"/>
+                  <a16:creationId xmlns:a16="http://schemas.microsoft.com/office/drawing/2014/main" xmlns="" id="{DF45BF25-4467-43A0-A613-67A6CCF398DC}"/>
                 </a:ext>
               </a:extLst>
             </p:cNvPr>
@@ -16463,7 +16260,7 @@
             <p:cNvPr id="14" name="Title 1">
               <a:extLst>
                 <a:ext uri="{FF2B5EF4-FFF2-40B4-BE49-F238E27FC236}">
-                  <a16:creationId xmlns:a16="http://schemas.microsoft.com/office/drawing/2014/main" id="{073FE5B0-2CAF-49A6-9789-5EEBF87010F8}"/>
+                  <a16:creationId xmlns:a16="http://schemas.microsoft.com/office/drawing/2014/main" xmlns="" id="{073FE5B0-2CAF-49A6-9789-5EEBF87010F8}"/>
                 </a:ext>
               </a:extLst>
             </p:cNvPr>
@@ -16777,7 +16574,7 @@
               <p14:cNvPr id="8" name="Ink 7">
                 <a:extLst>
                   <a:ext uri="{FF2B5EF4-FFF2-40B4-BE49-F238E27FC236}">
-                    <a16:creationId xmlns:a16="http://schemas.microsoft.com/office/drawing/2014/main" id="{DA8AA275-7E05-456F-AF8E-6F4BE2533983}"/>
+                    <a16:creationId xmlns:a16="http://schemas.microsoft.com/office/drawing/2014/main" xmlns="" id="{DA8AA275-7E05-456F-AF8E-6F4BE2533983}"/>
                   </a:ext>
                 </a:extLst>
               </p14:cNvPr>
@@ -16885,7 +16682,7 @@
               <p14:cNvPr id="3" name="Ink 2">
                 <a:extLst>
                   <a:ext uri="{FF2B5EF4-FFF2-40B4-BE49-F238E27FC236}">
-                    <a16:creationId xmlns:a16="http://schemas.microsoft.com/office/drawing/2014/main" id="{0E2E4522-18C8-46AE-9908-5AACACEA0350}"/>
+                    <a16:creationId xmlns:a16="http://schemas.microsoft.com/office/drawing/2014/main" xmlns="" id="{0E2E4522-18C8-46AE-9908-5AACACEA0350}"/>
                   </a:ext>
                 </a:extLst>
               </p14:cNvPr>
@@ -16998,7 +16795,7 @@
               <p14:cNvPr id="3" name="Ink 2">
                 <a:extLst>
                   <a:ext uri="{FF2B5EF4-FFF2-40B4-BE49-F238E27FC236}">
-                    <a16:creationId xmlns:a16="http://schemas.microsoft.com/office/drawing/2014/main" id="{76A2B10B-C462-40AA-A658-EB6AEB3B1F85}"/>
+                    <a16:creationId xmlns:a16="http://schemas.microsoft.com/office/drawing/2014/main" xmlns="" id="{76A2B10B-C462-40AA-A658-EB6AEB3B1F85}"/>
                   </a:ext>
                 </a:extLst>
               </p14:cNvPr>
@@ -17208,7 +17005,7 @@
           <p:cNvPr id="12" name="Group 11">
             <a:extLst>
               <a:ext uri="{FF2B5EF4-FFF2-40B4-BE49-F238E27FC236}">
-                <a16:creationId xmlns:a16="http://schemas.microsoft.com/office/drawing/2014/main" id="{94E5968C-CCF4-43FF-B85F-BE950CD4A528}"/>
+                <a16:creationId xmlns:a16="http://schemas.microsoft.com/office/drawing/2014/main" xmlns="" id="{94E5968C-CCF4-43FF-B85F-BE950CD4A528}"/>
               </a:ext>
             </a:extLst>
           </p:cNvPr>
@@ -17228,7 +17025,7 @@
             <p:cNvPr id="13" name="Picture 12">
               <a:extLst>
                 <a:ext uri="{FF2B5EF4-FFF2-40B4-BE49-F238E27FC236}">
-                  <a16:creationId xmlns:a16="http://schemas.microsoft.com/office/drawing/2014/main" id="{DF45BF25-4467-43A0-A613-67A6CCF398DC}"/>
+                  <a16:creationId xmlns:a16="http://schemas.microsoft.com/office/drawing/2014/main" xmlns="" id="{DF45BF25-4467-43A0-A613-67A6CCF398DC}"/>
                 </a:ext>
               </a:extLst>
             </p:cNvPr>
@@ -17258,7 +17055,7 @@
             <p:cNvPr id="14" name="Title 1">
               <a:extLst>
                 <a:ext uri="{FF2B5EF4-FFF2-40B4-BE49-F238E27FC236}">
-                  <a16:creationId xmlns:a16="http://schemas.microsoft.com/office/drawing/2014/main" id="{073FE5B0-2CAF-49A6-9789-5EEBF87010F8}"/>
+                  <a16:creationId xmlns:a16="http://schemas.microsoft.com/office/drawing/2014/main" xmlns="" id="{073FE5B0-2CAF-49A6-9789-5EEBF87010F8}"/>
                 </a:ext>
               </a:extLst>
             </p:cNvPr>
@@ -17373,7 +17170,7 @@
               <p14:cNvPr id="3" name="Ink 2">
                 <a:extLst>
                   <a:ext uri="{FF2B5EF4-FFF2-40B4-BE49-F238E27FC236}">
-                    <a16:creationId xmlns:a16="http://schemas.microsoft.com/office/drawing/2014/main" id="{32966E81-1364-431D-90AE-9DC020D72BFE}"/>
+                    <a16:creationId xmlns:a16="http://schemas.microsoft.com/office/drawing/2014/main" xmlns="" id="{32966E81-1364-431D-90AE-9DC020D72BFE}"/>
                   </a:ext>
                 </a:extLst>
               </p14:cNvPr>
@@ -17799,7 +17596,7 @@
           <p:cNvPr id="14" name="Group 13">
             <a:extLst>
               <a:ext uri="{FF2B5EF4-FFF2-40B4-BE49-F238E27FC236}">
-                <a16:creationId xmlns:a16="http://schemas.microsoft.com/office/drawing/2014/main" id="{5523BC91-4C19-472D-8E21-5E9C4BB48609}"/>
+                <a16:creationId xmlns:a16="http://schemas.microsoft.com/office/drawing/2014/main" xmlns="" id="{5523BC91-4C19-472D-8E21-5E9C4BB48609}"/>
               </a:ext>
             </a:extLst>
           </p:cNvPr>
@@ -17819,7 +17616,7 @@
             <p:cNvPr id="15" name="Straight Arrow Connector 14">
               <a:extLst>
                 <a:ext uri="{FF2B5EF4-FFF2-40B4-BE49-F238E27FC236}">
-                  <a16:creationId xmlns:a16="http://schemas.microsoft.com/office/drawing/2014/main" id="{6D8322C3-FB04-40B1-BB95-B0153FA8952D}"/>
+                  <a16:creationId xmlns:a16="http://schemas.microsoft.com/office/drawing/2014/main" xmlns="" id="{6D8322C3-FB04-40B1-BB95-B0153FA8952D}"/>
                 </a:ext>
               </a:extLst>
             </p:cNvPr>
@@ -17863,7 +17660,7 @@
             <p:cNvPr id="17" name="Straight Arrow Connector 16">
               <a:extLst>
                 <a:ext uri="{FF2B5EF4-FFF2-40B4-BE49-F238E27FC236}">
-                  <a16:creationId xmlns:a16="http://schemas.microsoft.com/office/drawing/2014/main" id="{E1C9426E-BF9F-4FD8-A1BC-E4C25B963372}"/>
+                  <a16:creationId xmlns:a16="http://schemas.microsoft.com/office/drawing/2014/main" xmlns="" id="{E1C9426E-BF9F-4FD8-A1BC-E4C25B963372}"/>
                 </a:ext>
               </a:extLst>
             </p:cNvPr>
@@ -17907,7 +17704,7 @@
             <p:cNvPr id="19" name="Straight Arrow Connector 18">
               <a:extLst>
                 <a:ext uri="{FF2B5EF4-FFF2-40B4-BE49-F238E27FC236}">
-                  <a16:creationId xmlns:a16="http://schemas.microsoft.com/office/drawing/2014/main" id="{EEB39916-FFCC-487E-98FF-73D717AF52A6}"/>
+                  <a16:creationId xmlns:a16="http://schemas.microsoft.com/office/drawing/2014/main" xmlns="" id="{EEB39916-FFCC-487E-98FF-73D717AF52A6}"/>
                 </a:ext>
               </a:extLst>
             </p:cNvPr>
@@ -17954,7 +17751,7 @@
               <p14:cNvPr id="4" name="Ink 3">
                 <a:extLst>
                   <a:ext uri="{FF2B5EF4-FFF2-40B4-BE49-F238E27FC236}">
-                    <a16:creationId xmlns:a16="http://schemas.microsoft.com/office/drawing/2014/main" id="{1062D620-59BD-4D45-B27A-8D8676F09522}"/>
+                    <a16:creationId xmlns:a16="http://schemas.microsoft.com/office/drawing/2014/main" xmlns="" id="{1062D620-59BD-4D45-B27A-8D8676F09522}"/>
                   </a:ext>
                 </a:extLst>
               </p14:cNvPr>
@@ -18246,7 +18043,7 @@
           <p:cNvPr id="4" name="TextBox 3">
             <a:extLst>
               <a:ext uri="{FF2B5EF4-FFF2-40B4-BE49-F238E27FC236}">
-                <a16:creationId xmlns:a16="http://schemas.microsoft.com/office/drawing/2014/main" id="{5243F428-B165-48A1-9092-AE29B93779A5}"/>
+                <a16:creationId xmlns:a16="http://schemas.microsoft.com/office/drawing/2014/main" xmlns="" id="{5243F428-B165-48A1-9092-AE29B93779A5}"/>
               </a:ext>
             </a:extLst>
           </p:cNvPr>
@@ -18301,7 +18098,7 @@
               <p14:cNvPr id="6" name="Ink 5">
                 <a:extLst>
                   <a:ext uri="{FF2B5EF4-FFF2-40B4-BE49-F238E27FC236}">
-                    <a16:creationId xmlns:a16="http://schemas.microsoft.com/office/drawing/2014/main" id="{190A55BA-7986-4E92-A00C-9B0B0FA253DD}"/>
+                    <a16:creationId xmlns:a16="http://schemas.microsoft.com/office/drawing/2014/main" xmlns="" id="{190A55BA-7986-4E92-A00C-9B0B0FA253DD}"/>
                   </a:ext>
                 </a:extLst>
               </p14:cNvPr>
@@ -18646,7 +18443,7 @@
           <p:cNvPr id="12" name="Group 11">
             <a:extLst>
               <a:ext uri="{FF2B5EF4-FFF2-40B4-BE49-F238E27FC236}">
-                <a16:creationId xmlns:a16="http://schemas.microsoft.com/office/drawing/2014/main" id="{94E5968C-CCF4-43FF-B85F-BE950CD4A528}"/>
+                <a16:creationId xmlns:a16="http://schemas.microsoft.com/office/drawing/2014/main" xmlns="" id="{94E5968C-CCF4-43FF-B85F-BE950CD4A528}"/>
               </a:ext>
             </a:extLst>
           </p:cNvPr>
@@ -18666,7 +18463,7 @@
             <p:cNvPr id="13" name="Picture 12">
               <a:extLst>
                 <a:ext uri="{FF2B5EF4-FFF2-40B4-BE49-F238E27FC236}">
-                  <a16:creationId xmlns:a16="http://schemas.microsoft.com/office/drawing/2014/main" id="{DF45BF25-4467-43A0-A613-67A6CCF398DC}"/>
+                  <a16:creationId xmlns:a16="http://schemas.microsoft.com/office/drawing/2014/main" xmlns="" id="{DF45BF25-4467-43A0-A613-67A6CCF398DC}"/>
                 </a:ext>
               </a:extLst>
             </p:cNvPr>
@@ -18696,7 +18493,7 @@
             <p:cNvPr id="14" name="Title 1">
               <a:extLst>
                 <a:ext uri="{FF2B5EF4-FFF2-40B4-BE49-F238E27FC236}">
-                  <a16:creationId xmlns:a16="http://schemas.microsoft.com/office/drawing/2014/main" id="{073FE5B0-2CAF-49A6-9789-5EEBF87010F8}"/>
+                  <a16:creationId xmlns:a16="http://schemas.microsoft.com/office/drawing/2014/main" xmlns="" id="{073FE5B0-2CAF-49A6-9789-5EEBF87010F8}"/>
                 </a:ext>
               </a:extLst>
             </p:cNvPr>
@@ -19248,7 +19045,7 @@
               <p14:cNvPr id="3" name="Ink 2">
                 <a:extLst>
                   <a:ext uri="{FF2B5EF4-FFF2-40B4-BE49-F238E27FC236}">
-                    <a16:creationId xmlns:a16="http://schemas.microsoft.com/office/drawing/2014/main" id="{2485B48B-5D3E-4401-96D8-F0E3AD9FEE0C}"/>
+                    <a16:creationId xmlns:a16="http://schemas.microsoft.com/office/drawing/2014/main" xmlns="" id="{2485B48B-5D3E-4401-96D8-F0E3AD9FEE0C}"/>
                   </a:ext>
                 </a:extLst>
               </p14:cNvPr>
@@ -19630,7 +19427,7 @@
               <p14:cNvPr id="8" name="Ink 7">
                 <a:extLst>
                   <a:ext uri="{FF2B5EF4-FFF2-40B4-BE49-F238E27FC236}">
-                    <a16:creationId xmlns:a16="http://schemas.microsoft.com/office/drawing/2014/main" id="{92A7E2B9-2FA8-4BF4-9D3D-2B2F29429D30}"/>
+                    <a16:creationId xmlns:a16="http://schemas.microsoft.com/office/drawing/2014/main" xmlns="" id="{92A7E2B9-2FA8-4BF4-9D3D-2B2F29429D30}"/>
                   </a:ext>
                 </a:extLst>
               </p14:cNvPr>
@@ -19784,7 +19581,7 @@
           <p:cNvPr id="5" name="Title 1">
             <a:extLst>
               <a:ext uri="{FF2B5EF4-FFF2-40B4-BE49-F238E27FC236}">
-                <a16:creationId xmlns:a16="http://schemas.microsoft.com/office/drawing/2014/main" id="{146AFFCA-910F-480F-BB51-4320AF092BFF}"/>
+                <a16:creationId xmlns:a16="http://schemas.microsoft.com/office/drawing/2014/main" xmlns="" id="{146AFFCA-910F-480F-BB51-4320AF092BFF}"/>
               </a:ext>
             </a:extLst>
           </p:cNvPr>
@@ -19819,7 +19616,7 @@
               <p14:cNvPr id="6" name="Ink 5">
                 <a:extLst>
                   <a:ext uri="{FF2B5EF4-FFF2-40B4-BE49-F238E27FC236}">
-                    <a16:creationId xmlns:a16="http://schemas.microsoft.com/office/drawing/2014/main" id="{36D5A5D8-B118-4998-A739-1D108249C5E5}"/>
+                    <a16:creationId xmlns:a16="http://schemas.microsoft.com/office/drawing/2014/main" xmlns="" id="{36D5A5D8-B118-4998-A739-1D108249C5E5}"/>
                   </a:ext>
                 </a:extLst>
               </p14:cNvPr>
@@ -20022,7 +19819,7 @@
           <p:cNvPr id="12" name="Group 11">
             <a:extLst>
               <a:ext uri="{FF2B5EF4-FFF2-40B4-BE49-F238E27FC236}">
-                <a16:creationId xmlns:a16="http://schemas.microsoft.com/office/drawing/2014/main" id="{94E5968C-CCF4-43FF-B85F-BE950CD4A528}"/>
+                <a16:creationId xmlns:a16="http://schemas.microsoft.com/office/drawing/2014/main" xmlns="" id="{94E5968C-CCF4-43FF-B85F-BE950CD4A528}"/>
               </a:ext>
             </a:extLst>
           </p:cNvPr>
@@ -20042,7 +19839,7 @@
             <p:cNvPr id="13" name="Picture 12">
               <a:extLst>
                 <a:ext uri="{FF2B5EF4-FFF2-40B4-BE49-F238E27FC236}">
-                  <a16:creationId xmlns:a16="http://schemas.microsoft.com/office/drawing/2014/main" id="{DF45BF25-4467-43A0-A613-67A6CCF398DC}"/>
+                  <a16:creationId xmlns:a16="http://schemas.microsoft.com/office/drawing/2014/main" xmlns="" id="{DF45BF25-4467-43A0-A613-67A6CCF398DC}"/>
                 </a:ext>
               </a:extLst>
             </p:cNvPr>
@@ -20072,7 +19869,7 @@
             <p:cNvPr id="14" name="Title 1">
               <a:extLst>
                 <a:ext uri="{FF2B5EF4-FFF2-40B4-BE49-F238E27FC236}">
-                  <a16:creationId xmlns:a16="http://schemas.microsoft.com/office/drawing/2014/main" id="{073FE5B0-2CAF-49A6-9789-5EEBF87010F8}"/>
+                  <a16:creationId xmlns:a16="http://schemas.microsoft.com/office/drawing/2014/main" xmlns="" id="{073FE5B0-2CAF-49A6-9789-5EEBF87010F8}"/>
                 </a:ext>
               </a:extLst>
             </p:cNvPr>
@@ -20388,7 +20185,7 @@
                         <m:sSubPr>
                           <m:ctrlPr>
                             <a:rPr lang="en-US" sz="2400" b="0" i="1" smtClean="0">
-                              <a:latin typeface="Cambria Math" panose="02040503050406030204" pitchFamily="18" charset="0"/>
+                              <a:latin typeface="Cambria Math" charset="0"/>
                             </a:rPr>
                           </m:ctrlPr>
                         </m:sSubPr>
@@ -20516,7 +20313,7 @@
                         <m:sSubPr>
                           <m:ctrlPr>
                             <a:rPr lang="en-US" sz="2400" b="0" i="1" smtClean="0">
-                              <a:latin typeface="Cambria Math" panose="02040503050406030204" pitchFamily="18" charset="0"/>
+                              <a:latin typeface="Cambria Math" charset="0"/>
                             </a:rPr>
                           </m:ctrlPr>
                         </m:sSubPr>
@@ -20644,7 +20441,7 @@
                         <m:sSubPr>
                           <m:ctrlPr>
                             <a:rPr lang="en-US" sz="2400" b="0" i="1" smtClean="0">
-                              <a:latin typeface="Cambria Math" panose="02040503050406030204" pitchFamily="18" charset="0"/>
+                              <a:latin typeface="Cambria Math" charset="0"/>
                             </a:rPr>
                           </m:ctrlPr>
                         </m:sSubPr>
@@ -20889,7 +20686,7 @@
                         <m:sSubPr>
                           <m:ctrlPr>
                             <a:rPr lang="en-US" sz="2400" b="0" i="1" smtClean="0">
-                              <a:latin typeface="Cambria Math" panose="02040503050406030204" pitchFamily="18" charset="0"/>
+                              <a:latin typeface="Cambria Math" charset="0"/>
                             </a:rPr>
                           </m:ctrlPr>
                         </m:sSubPr>
@@ -21017,7 +20814,7 @@
                         <m:sSubPr>
                           <m:ctrlPr>
                             <a:rPr lang="en-US" sz="2400" b="0" i="1" smtClean="0">
-                              <a:latin typeface="Cambria Math" panose="02040503050406030204" pitchFamily="18" charset="0"/>
+                              <a:latin typeface="Cambria Math" charset="0"/>
                             </a:rPr>
                           </m:ctrlPr>
                         </m:sSubPr>
@@ -21294,7 +21091,7 @@
               <p14:cNvPr id="6" name="Ink 5">
                 <a:extLst>
                   <a:ext uri="{FF2B5EF4-FFF2-40B4-BE49-F238E27FC236}">
-                    <a16:creationId xmlns:a16="http://schemas.microsoft.com/office/drawing/2014/main" id="{847D76D8-0F69-40F4-9022-A7772EB50C12}"/>
+                    <a16:creationId xmlns:a16="http://schemas.microsoft.com/office/drawing/2014/main" xmlns="" id="{847D76D8-0F69-40F4-9022-A7772EB50C12}"/>
                   </a:ext>
                 </a:extLst>
               </p14:cNvPr>

</xml_diff>